<commit_message>
Added first slides on sequences
</commit_message>
<xml_diff>
--- a/Python/biopython.pptx
+++ b/Python/biopython.pptx
@@ -7,6 +7,10 @@
   <p:sldIdLst>
     <p:sldId id="256" r:id="rId2"/>
     <p:sldId id="257" r:id="rId3"/>
+    <p:sldId id="258" r:id="rId4"/>
+    <p:sldId id="259" r:id="rId5"/>
+    <p:sldId id="260" r:id="rId6"/>
+    <p:sldId id="261" r:id="rId7"/>
   </p:sldIdLst>
   <p:sldSz cx="9144000" cy="6858000" type="screen4x3"/>
   <p:notesSz cx="6858000" cy="9144000"/>
@@ -105,6 +109,11 @@
       </a:defRPr>
     </a:lvl9pPr>
   </p:defaultTextStyle>
+  <p:extLst>
+    <p:ext uri="{EFAFB233-063F-42B5-8137-9DF3F51BA10A}">
+      <p15:sldGuideLst xmlns:p15="http://schemas.microsoft.com/office/powerpoint/2012/main"/>
+    </p:ext>
+  </p:extLst>
 </p:presentation>
 </file>
 
@@ -239,7 +248,7 @@
           <a:p>
             <a:fld id="{1A389DA7-706A-472A-BD21-8BAE9F41F237}" type="datetimeFigureOut">
               <a:rPr lang="en-US" smtClean="0"/>
-              <a:t>2016-06-16</a:t>
+              <a:t>2016-06-27</a:t>
             </a:fld>
             <a:endParaRPr lang="en-US"/>
           </a:p>
@@ -409,7 +418,7 @@
           <a:p>
             <a:fld id="{1A389DA7-706A-472A-BD21-8BAE9F41F237}" type="datetimeFigureOut">
               <a:rPr lang="en-US" smtClean="0"/>
-              <a:t>2016-06-16</a:t>
+              <a:t>2016-06-27</a:t>
             </a:fld>
             <a:endParaRPr lang="en-US"/>
           </a:p>
@@ -589,7 +598,7 @@
           <a:p>
             <a:fld id="{1A389DA7-706A-472A-BD21-8BAE9F41F237}" type="datetimeFigureOut">
               <a:rPr lang="en-US" smtClean="0"/>
-              <a:t>2016-06-16</a:t>
+              <a:t>2016-06-27</a:t>
             </a:fld>
             <a:endParaRPr lang="en-US"/>
           </a:p>
@@ -759,7 +768,7 @@
           <a:p>
             <a:fld id="{1A389DA7-706A-472A-BD21-8BAE9F41F237}" type="datetimeFigureOut">
               <a:rPr lang="en-US" smtClean="0"/>
-              <a:t>2016-06-16</a:t>
+              <a:t>2016-06-27</a:t>
             </a:fld>
             <a:endParaRPr lang="en-US"/>
           </a:p>
@@ -1003,7 +1012,7 @@
           <a:p>
             <a:fld id="{1A389DA7-706A-472A-BD21-8BAE9F41F237}" type="datetimeFigureOut">
               <a:rPr lang="en-US" smtClean="0"/>
-              <a:t>2016-06-16</a:t>
+              <a:t>2016-06-27</a:t>
             </a:fld>
             <a:endParaRPr lang="en-US"/>
           </a:p>
@@ -1235,7 +1244,7 @@
           <a:p>
             <a:fld id="{1A389DA7-706A-472A-BD21-8BAE9F41F237}" type="datetimeFigureOut">
               <a:rPr lang="en-US" smtClean="0"/>
-              <a:t>2016-06-16</a:t>
+              <a:t>2016-06-27</a:t>
             </a:fld>
             <a:endParaRPr lang="en-US"/>
           </a:p>
@@ -1602,7 +1611,7 @@
           <a:p>
             <a:fld id="{1A389DA7-706A-472A-BD21-8BAE9F41F237}" type="datetimeFigureOut">
               <a:rPr lang="en-US" smtClean="0"/>
-              <a:t>2016-06-16</a:t>
+              <a:t>2016-06-27</a:t>
             </a:fld>
             <a:endParaRPr lang="en-US"/>
           </a:p>
@@ -1720,7 +1729,7 @@
           <a:p>
             <a:fld id="{1A389DA7-706A-472A-BD21-8BAE9F41F237}" type="datetimeFigureOut">
               <a:rPr lang="en-US" smtClean="0"/>
-              <a:t>2016-06-16</a:t>
+              <a:t>2016-06-27</a:t>
             </a:fld>
             <a:endParaRPr lang="en-US"/>
           </a:p>
@@ -1815,7 +1824,7 @@
           <a:p>
             <a:fld id="{1A389DA7-706A-472A-BD21-8BAE9F41F237}" type="datetimeFigureOut">
               <a:rPr lang="en-US" smtClean="0"/>
-              <a:t>2016-06-16</a:t>
+              <a:t>2016-06-27</a:t>
             </a:fld>
             <a:endParaRPr lang="en-US"/>
           </a:p>
@@ -2092,7 +2101,7 @@
           <a:p>
             <a:fld id="{1A389DA7-706A-472A-BD21-8BAE9F41F237}" type="datetimeFigureOut">
               <a:rPr lang="en-US" smtClean="0"/>
-              <a:t>2016-06-16</a:t>
+              <a:t>2016-06-27</a:t>
             </a:fld>
             <a:endParaRPr lang="en-US"/>
           </a:p>
@@ -2349,7 +2358,7 @@
           <a:p>
             <a:fld id="{1A389DA7-706A-472A-BD21-8BAE9F41F237}" type="datetimeFigureOut">
               <a:rPr lang="en-US" smtClean="0"/>
-              <a:t>2016-06-16</a:t>
+              <a:t>2016-06-27</a:t>
             </a:fld>
             <a:endParaRPr lang="en-US"/>
           </a:p>
@@ -2562,7 +2571,7 @@
           <a:p>
             <a:fld id="{1A389DA7-706A-472A-BD21-8BAE9F41F237}" type="datetimeFigureOut">
               <a:rPr lang="en-US" smtClean="0"/>
-              <a:t>2016-06-16</a:t>
+              <a:t>2016-06-27</a:t>
             </a:fld>
             <a:endParaRPr lang="en-US"/>
           </a:p>
@@ -3073,19 +3082,12 @@
               <a:rPr lang="nl-BE" dirty="0">
                 <a:hlinkClick r:id="rId3"/>
               </a:rPr>
-              <a:t>http://creativecommons.org/publicdomain/zero/1.0</a:t>
-            </a:r>
-            <a:r>
-              <a:rPr lang="nl-BE" dirty="0">
-                <a:hlinkClick r:id="rId3"/>
-              </a:rPr>
-              <a:t>/</a:t>
+              <a:t>http://creativecommons.org/publicdomain/zero/1.0/</a:t>
             </a:r>
             <a:r>
               <a:rPr lang="nl-BE" dirty="0"/>
               <a:t> </a:t>
             </a:r>
-            <a:endParaRPr lang="nl-BE" dirty="0"/>
           </a:p>
         </p:txBody>
       </p:sp>
@@ -3191,7 +3193,15 @@
             <a:pPr lvl="1"/>
             <a:r>
               <a:rPr lang="en-US" dirty="0" smtClean="0"/>
-              <a:t>utilities to read biological data files</a:t>
+              <a:t>utilities to </a:t>
+            </a:r>
+            <a:r>
+              <a:rPr lang="en-US" dirty="0" smtClean="0"/>
+              <a:t>read/write </a:t>
+            </a:r>
+            <a:r>
+              <a:rPr lang="en-US" dirty="0" smtClean="0"/>
+              <a:t>biological data files</a:t>
             </a:r>
           </a:p>
           <a:p>
@@ -3201,6 +3211,41 @@
               <a:t>utilities to interact with databases</a:t>
             </a:r>
             <a:endParaRPr lang="en-US" dirty="0"/>
+          </a:p>
+        </p:txBody>
+      </p:sp>
+      <p:sp>
+        <p:nvSpPr>
+          <p:cNvPr id="4" name="TextBox 3"/>
+          <p:cNvSpPr txBox="1"/>
+          <p:nvPr/>
+        </p:nvSpPr>
+        <p:spPr>
+          <a:xfrm>
+            <a:off x="2171698" y="4675906"/>
+            <a:ext cx="4946419" cy="584775"/>
+          </a:xfrm>
+          <a:prstGeom prst="rect">
+            <a:avLst/>
+          </a:prstGeom>
+          <a:noFill/>
+          <a:ln>
+            <a:solidFill>
+              <a:schemeClr val="tx1"/>
+            </a:solidFill>
+          </a:ln>
+        </p:spPr>
+        <p:txBody>
+          <a:bodyPr wrap="none" rtlCol="0">
+            <a:spAutoFit/>
+          </a:bodyPr>
+          <a:lstStyle/>
+          <a:p>
+            <a:r>
+              <a:rPr lang="en-US" sz="3200" dirty="0" smtClean="0"/>
+              <a:t>Do not reinvent the wheel!!!</a:t>
+            </a:r>
+            <a:endParaRPr lang="en-US" sz="3200" dirty="0"/>
           </a:p>
         </p:txBody>
       </p:sp>
@@ -3208,6 +3253,906 @@
     <p:extLst>
       <p:ext uri="{BB962C8B-B14F-4D97-AF65-F5344CB8AC3E}">
         <p14:creationId xmlns:p14="http://schemas.microsoft.com/office/powerpoint/2010/main" val="1473171029"/>
+      </p:ext>
+    </p:extLst>
+  </p:cSld>
+  <p:clrMapOvr>
+    <a:masterClrMapping/>
+  </p:clrMapOvr>
+  <p:timing>
+    <p:tnLst>
+      <p:par>
+        <p:cTn id="1" dur="indefinite" restart="never" nodeType="tmRoot"/>
+      </p:par>
+    </p:tnLst>
+  </p:timing>
+</p:sld>
+</file>
+
+<file path=ppt/slides/slide3.xml><?xml version="1.0" encoding="utf-8"?>
+<p:sld xmlns:a="http://schemas.openxmlformats.org/drawingml/2006/main" xmlns:r="http://schemas.openxmlformats.org/officeDocument/2006/relationships" xmlns:p="http://schemas.openxmlformats.org/presentationml/2006/main">
+  <p:cSld>
+    <p:spTree>
+      <p:nvGrpSpPr>
+        <p:cNvPr id="1" name=""/>
+        <p:cNvGrpSpPr/>
+        <p:nvPr/>
+      </p:nvGrpSpPr>
+      <p:grpSpPr>
+        <a:xfrm>
+          <a:off x="0" y="0"/>
+          <a:ext cx="0" cy="0"/>
+          <a:chOff x="0" y="0"/>
+          <a:chExt cx="0" cy="0"/>
+        </a:xfrm>
+      </p:grpSpPr>
+      <p:sp>
+        <p:nvSpPr>
+          <p:cNvPr id="2" name="Title 1"/>
+          <p:cNvSpPr>
+            <a:spLocks noGrp="1"/>
+          </p:cNvSpPr>
+          <p:nvPr>
+            <p:ph type="title"/>
+          </p:nvPr>
+        </p:nvSpPr>
+        <p:spPr/>
+        <p:txBody>
+          <a:bodyPr/>
+          <a:lstStyle/>
+          <a:p>
+            <a:r>
+              <a:rPr lang="en-US" dirty="0" smtClean="0"/>
+              <a:t>Sequences</a:t>
+            </a:r>
+            <a:endParaRPr lang="en-US" dirty="0"/>
+          </a:p>
+        </p:txBody>
+      </p:sp>
+      <p:sp>
+        <p:nvSpPr>
+          <p:cNvPr id="3" name="Text Placeholder 2"/>
+          <p:cNvSpPr>
+            <a:spLocks noGrp="1"/>
+          </p:cNvSpPr>
+          <p:nvPr>
+            <p:ph type="body" idx="1"/>
+          </p:nvPr>
+        </p:nvSpPr>
+        <p:spPr/>
+        <p:txBody>
+          <a:bodyPr/>
+          <a:lstStyle/>
+          <a:p>
+            <a:endParaRPr lang="en-US"/>
+          </a:p>
+        </p:txBody>
+      </p:sp>
+    </p:spTree>
+    <p:extLst>
+      <p:ext uri="{BB962C8B-B14F-4D97-AF65-F5344CB8AC3E}">
+        <p14:creationId xmlns:p14="http://schemas.microsoft.com/office/powerpoint/2010/main" val="2536757022"/>
+      </p:ext>
+    </p:extLst>
+  </p:cSld>
+  <p:clrMapOvr>
+    <a:masterClrMapping/>
+  </p:clrMapOvr>
+  <p:timing>
+    <p:tnLst>
+      <p:par>
+        <p:cTn id="1" dur="indefinite" restart="never" nodeType="tmRoot"/>
+      </p:par>
+    </p:tnLst>
+  </p:timing>
+</p:sld>
+</file>
+
+<file path=ppt/slides/slide4.xml><?xml version="1.0" encoding="utf-8"?>
+<p:sld xmlns:a="http://schemas.openxmlformats.org/drawingml/2006/main" xmlns:r="http://schemas.openxmlformats.org/officeDocument/2006/relationships" xmlns:p="http://schemas.openxmlformats.org/presentationml/2006/main">
+  <p:cSld>
+    <p:spTree>
+      <p:nvGrpSpPr>
+        <p:cNvPr id="1" name=""/>
+        <p:cNvGrpSpPr/>
+        <p:nvPr/>
+      </p:nvGrpSpPr>
+      <p:grpSpPr>
+        <a:xfrm>
+          <a:off x="0" y="0"/>
+          <a:ext cx="0" cy="0"/>
+          <a:chOff x="0" y="0"/>
+          <a:chExt cx="0" cy="0"/>
+        </a:xfrm>
+      </p:grpSpPr>
+      <p:sp>
+        <p:nvSpPr>
+          <p:cNvPr id="2" name="Title 1"/>
+          <p:cNvSpPr>
+            <a:spLocks noGrp="1"/>
+          </p:cNvSpPr>
+          <p:nvPr>
+            <p:ph type="title"/>
+          </p:nvPr>
+        </p:nvSpPr>
+        <p:spPr/>
+        <p:txBody>
+          <a:bodyPr/>
+          <a:lstStyle/>
+          <a:p>
+            <a:r>
+              <a:rPr lang="en-US" dirty="0" smtClean="0"/>
+              <a:t>Reading sequence files</a:t>
+            </a:r>
+            <a:endParaRPr lang="en-US" dirty="0"/>
+          </a:p>
+        </p:txBody>
+      </p:sp>
+      <p:sp>
+        <p:nvSpPr>
+          <p:cNvPr id="3" name="Content Placeholder 2"/>
+          <p:cNvSpPr>
+            <a:spLocks noGrp="1"/>
+          </p:cNvSpPr>
+          <p:nvPr>
+            <p:ph idx="1"/>
+          </p:nvPr>
+        </p:nvSpPr>
+        <p:spPr/>
+        <p:txBody>
+          <a:bodyPr>
+            <a:normAutofit fontScale="92500" lnSpcReduction="10000"/>
+          </a:bodyPr>
+          <a:lstStyle/>
+          <a:p>
+            <a:r>
+              <a:rPr lang="en-US" dirty="0" smtClean="0"/>
+              <a:t>Import </a:t>
+            </a:r>
+            <a:r>
+              <a:rPr lang="en-US" dirty="0" err="1" smtClean="0">
+                <a:latin typeface="Courier New" panose="02070309020205020404" pitchFamily="49" charset="0"/>
+                <a:cs typeface="Courier New" panose="02070309020205020404" pitchFamily="49" charset="0"/>
+              </a:rPr>
+              <a:t>SeqIO</a:t>
+            </a:r>
+            <a:r>
+              <a:rPr lang="en-US" dirty="0" smtClean="0"/>
+              <a:t> module</a:t>
+            </a:r>
+          </a:p>
+          <a:p>
+            <a:pPr marL="0" indent="0">
+              <a:buNone/>
+            </a:pPr>
+            <a:endParaRPr lang="en-US" dirty="0" smtClean="0"/>
+          </a:p>
+          <a:p>
+            <a:r>
+              <a:rPr lang="en-US" dirty="0" smtClean="0"/>
+              <a:t>Read sequence file, inferring alphabet</a:t>
+            </a:r>
+          </a:p>
+          <a:p>
+            <a:endParaRPr lang="en-US" dirty="0"/>
+          </a:p>
+          <a:p>
+            <a:r>
+              <a:rPr lang="en-US" dirty="0" smtClean="0"/>
+              <a:t>Read sequence file, specify alphabet</a:t>
+            </a:r>
+          </a:p>
+          <a:p>
+            <a:endParaRPr lang="en-US" dirty="0"/>
+          </a:p>
+          <a:p>
+            <a:endParaRPr lang="en-US" dirty="0" smtClean="0"/>
+          </a:p>
+          <a:p>
+            <a:endParaRPr lang="en-US" dirty="0"/>
+          </a:p>
+          <a:p>
+            <a:r>
+              <a:rPr lang="en-US" dirty="0" smtClean="0"/>
+              <a:t>Alphabets: </a:t>
+            </a:r>
+            <a:r>
+              <a:rPr lang="en-US" dirty="0" err="1" smtClean="0">
+                <a:latin typeface="Courier New" panose="02070309020205020404" pitchFamily="49" charset="0"/>
+                <a:cs typeface="Courier New" panose="02070309020205020404" pitchFamily="49" charset="0"/>
+              </a:rPr>
+              <a:t>generic_dna</a:t>
+            </a:r>
+            <a:r>
+              <a:rPr lang="en-US" dirty="0" smtClean="0"/>
+              <a:t>, </a:t>
+            </a:r>
+            <a:r>
+              <a:rPr lang="en-US" dirty="0" err="1" smtClean="0">
+                <a:latin typeface="Courier New" panose="02070309020205020404" pitchFamily="49" charset="0"/>
+                <a:cs typeface="Courier New" panose="02070309020205020404" pitchFamily="49" charset="0"/>
+              </a:rPr>
+              <a:t>generic_rna</a:t>
+            </a:r>
+            <a:r>
+              <a:rPr lang="en-US" dirty="0" smtClean="0"/>
+              <a:t>, </a:t>
+            </a:r>
+            <a:r>
+              <a:rPr lang="en-US" dirty="0" err="1" smtClean="0">
+                <a:latin typeface="Courier New" panose="02070309020205020404" pitchFamily="49" charset="0"/>
+                <a:cs typeface="Courier New" panose="02070309020205020404" pitchFamily="49" charset="0"/>
+              </a:rPr>
+              <a:t>generic_protein</a:t>
+            </a:r>
+            <a:r>
+              <a:rPr lang="en-US" dirty="0" smtClean="0"/>
+              <a:t>, …</a:t>
+            </a:r>
+            <a:endParaRPr lang="en-US" dirty="0"/>
+          </a:p>
+        </p:txBody>
+      </p:sp>
+      <p:sp>
+        <p:nvSpPr>
+          <p:cNvPr id="4" name="TextBox 3"/>
+          <p:cNvSpPr txBox="1"/>
+          <p:nvPr/>
+        </p:nvSpPr>
+        <p:spPr>
+          <a:xfrm>
+            <a:off x="987139" y="2265216"/>
+            <a:ext cx="3079689" cy="369332"/>
+          </a:xfrm>
+          <a:prstGeom prst="rect">
+            <a:avLst/>
+          </a:prstGeom>
+          <a:solidFill>
+            <a:schemeClr val="bg1">
+              <a:lumMod val="75000"/>
+            </a:schemeClr>
+          </a:solidFill>
+          <a:ln>
+            <a:solidFill>
+              <a:schemeClr val="tx1"/>
+            </a:solidFill>
+          </a:ln>
+        </p:spPr>
+        <p:txBody>
+          <a:bodyPr wrap="none" rtlCol="0">
+            <a:spAutoFit/>
+          </a:bodyPr>
+          <a:lstStyle/>
+          <a:p>
+            <a:r>
+              <a:rPr lang="en-US" dirty="0" smtClean="0">
+                <a:latin typeface="Courier New" panose="02070309020205020404" pitchFamily="49" charset="0"/>
+                <a:cs typeface="Courier New" panose="02070309020205020404" pitchFamily="49" charset="0"/>
+              </a:rPr>
+              <a:t>from Bio import </a:t>
+            </a:r>
+            <a:r>
+              <a:rPr lang="en-US" dirty="0" err="1" smtClean="0">
+                <a:latin typeface="Courier New" panose="02070309020205020404" pitchFamily="49" charset="0"/>
+                <a:cs typeface="Courier New" panose="02070309020205020404" pitchFamily="49" charset="0"/>
+              </a:rPr>
+              <a:t>SeqIO</a:t>
+            </a:r>
+            <a:endParaRPr lang="en-US" dirty="0" smtClean="0">
+              <a:latin typeface="Courier New" panose="02070309020205020404" pitchFamily="49" charset="0"/>
+              <a:cs typeface="Courier New" panose="02070309020205020404" pitchFamily="49" charset="0"/>
+            </a:endParaRPr>
+          </a:p>
+        </p:txBody>
+      </p:sp>
+      <p:sp>
+        <p:nvSpPr>
+          <p:cNvPr id="5" name="TextBox 4"/>
+          <p:cNvSpPr txBox="1"/>
+          <p:nvPr/>
+        </p:nvSpPr>
+        <p:spPr>
+          <a:xfrm>
+            <a:off x="983674" y="3124191"/>
+            <a:ext cx="6801862" cy="369332"/>
+          </a:xfrm>
+          <a:prstGeom prst="rect">
+            <a:avLst/>
+          </a:prstGeom>
+          <a:solidFill>
+            <a:schemeClr val="bg1">
+              <a:lumMod val="75000"/>
+            </a:schemeClr>
+          </a:solidFill>
+          <a:ln>
+            <a:solidFill>
+              <a:schemeClr val="tx1"/>
+            </a:solidFill>
+          </a:ln>
+        </p:spPr>
+        <p:txBody>
+          <a:bodyPr wrap="none" rtlCol="0">
+            <a:spAutoFit/>
+          </a:bodyPr>
+          <a:lstStyle/>
+          <a:p>
+            <a:r>
+              <a:rPr lang="en-US" dirty="0" err="1" smtClean="0">
+                <a:latin typeface="Courier New" panose="02070309020205020404" pitchFamily="49" charset="0"/>
+                <a:cs typeface="Courier New" panose="02070309020205020404" pitchFamily="49" charset="0"/>
+              </a:rPr>
+              <a:t>seq_records</a:t>
+            </a:r>
+            <a:r>
+              <a:rPr lang="en-US" dirty="0" smtClean="0">
+                <a:latin typeface="Courier New" panose="02070309020205020404" pitchFamily="49" charset="0"/>
+                <a:cs typeface="Courier New" panose="02070309020205020404" pitchFamily="49" charset="0"/>
+              </a:rPr>
+              <a:t> = </a:t>
+            </a:r>
+            <a:r>
+              <a:rPr lang="en-US" dirty="0" err="1" smtClean="0">
+                <a:latin typeface="Courier New" panose="02070309020205020404" pitchFamily="49" charset="0"/>
+                <a:cs typeface="Courier New" panose="02070309020205020404" pitchFamily="49" charset="0"/>
+              </a:rPr>
+              <a:t>SeqIO.parse</a:t>
+            </a:r>
+            <a:r>
+              <a:rPr lang="en-US" dirty="0" smtClean="0">
+                <a:latin typeface="Courier New" panose="02070309020205020404" pitchFamily="49" charset="0"/>
+                <a:cs typeface="Courier New" panose="02070309020205020404" pitchFamily="49" charset="0"/>
+              </a:rPr>
+              <a:t>('</a:t>
+            </a:r>
+            <a:r>
+              <a:rPr lang="en-US" dirty="0" err="1" smtClean="0">
+                <a:latin typeface="Courier New" panose="02070309020205020404" pitchFamily="49" charset="0"/>
+                <a:cs typeface="Courier New" panose="02070309020205020404" pitchFamily="49" charset="0"/>
+              </a:rPr>
+              <a:t>data.fasta</a:t>
+            </a:r>
+            <a:r>
+              <a:rPr lang="en-US" dirty="0" smtClean="0">
+                <a:latin typeface="Courier New" panose="02070309020205020404" pitchFamily="49" charset="0"/>
+                <a:cs typeface="Courier New" panose="02070309020205020404" pitchFamily="49" charset="0"/>
+              </a:rPr>
+              <a:t>', '</a:t>
+            </a:r>
+            <a:r>
+              <a:rPr lang="en-US" dirty="0" err="1" smtClean="0">
+                <a:latin typeface="Courier New" panose="02070309020205020404" pitchFamily="49" charset="0"/>
+                <a:cs typeface="Courier New" panose="02070309020205020404" pitchFamily="49" charset="0"/>
+              </a:rPr>
+              <a:t>fasta</a:t>
+            </a:r>
+            <a:r>
+              <a:rPr lang="en-US" dirty="0" smtClean="0">
+                <a:latin typeface="Courier New" panose="02070309020205020404" pitchFamily="49" charset="0"/>
+                <a:cs typeface="Courier New" panose="02070309020205020404" pitchFamily="49" charset="0"/>
+              </a:rPr>
+              <a:t>')</a:t>
+            </a:r>
+            <a:endParaRPr lang="en-US" dirty="0">
+              <a:latin typeface="Courier New" panose="02070309020205020404" pitchFamily="49" charset="0"/>
+              <a:cs typeface="Courier New" panose="02070309020205020404" pitchFamily="49" charset="0"/>
+            </a:endParaRPr>
+          </a:p>
+        </p:txBody>
+      </p:sp>
+      <p:sp>
+        <p:nvSpPr>
+          <p:cNvPr id="6" name="TextBox 5"/>
+          <p:cNvSpPr txBox="1"/>
+          <p:nvPr/>
+        </p:nvSpPr>
+        <p:spPr>
+          <a:xfrm>
+            <a:off x="990600" y="4035123"/>
+            <a:ext cx="6794936" cy="1200329"/>
+          </a:xfrm>
+          <a:prstGeom prst="rect">
+            <a:avLst/>
+          </a:prstGeom>
+          <a:solidFill>
+            <a:schemeClr val="bg1">
+              <a:lumMod val="75000"/>
+            </a:schemeClr>
+          </a:solidFill>
+          <a:ln>
+            <a:solidFill>
+              <a:schemeClr val="tx1"/>
+            </a:solidFill>
+          </a:ln>
+        </p:spPr>
+        <p:txBody>
+          <a:bodyPr wrap="square" rtlCol="0">
+            <a:spAutoFit/>
+          </a:bodyPr>
+          <a:lstStyle/>
+          <a:p>
+            <a:r>
+              <a:rPr lang="en-US" dirty="0" smtClean="0">
+                <a:latin typeface="Courier New" panose="02070309020205020404" pitchFamily="49" charset="0"/>
+                <a:cs typeface="Courier New" panose="02070309020205020404" pitchFamily="49" charset="0"/>
+              </a:rPr>
+              <a:t>from </a:t>
+            </a:r>
+            <a:r>
+              <a:rPr lang="en-US" dirty="0" err="1" smtClean="0">
+                <a:latin typeface="Courier New" panose="02070309020205020404" pitchFamily="49" charset="0"/>
+                <a:cs typeface="Courier New" panose="02070309020205020404" pitchFamily="49" charset="0"/>
+              </a:rPr>
+              <a:t>Bio.Seq.Alphabet</a:t>
+            </a:r>
+            <a:r>
+              <a:rPr lang="en-US" dirty="0" smtClean="0">
+                <a:latin typeface="Courier New" panose="02070309020205020404" pitchFamily="49" charset="0"/>
+                <a:cs typeface="Courier New" panose="02070309020205020404" pitchFamily="49" charset="0"/>
+              </a:rPr>
+              <a:t> import </a:t>
+            </a:r>
+            <a:r>
+              <a:rPr lang="en-US" dirty="0" err="1" smtClean="0">
+                <a:latin typeface="Courier New" panose="02070309020205020404" pitchFamily="49" charset="0"/>
+                <a:cs typeface="Courier New" panose="02070309020205020404" pitchFamily="49" charset="0"/>
+              </a:rPr>
+              <a:t>generic_dna</a:t>
+            </a:r>
+            <a:endParaRPr lang="en-US" dirty="0" smtClean="0">
+              <a:latin typeface="Courier New" panose="02070309020205020404" pitchFamily="49" charset="0"/>
+              <a:cs typeface="Courier New" panose="02070309020205020404" pitchFamily="49" charset="0"/>
+            </a:endParaRPr>
+          </a:p>
+          <a:p>
+            <a:r>
+              <a:rPr lang="en-US" dirty="0" smtClean="0">
+                <a:latin typeface="Courier New" panose="02070309020205020404" pitchFamily="49" charset="0"/>
+                <a:cs typeface="Courier New" panose="02070309020205020404" pitchFamily="49" charset="0"/>
+              </a:rPr>
+              <a:t>…</a:t>
+            </a:r>
+          </a:p>
+          <a:p>
+            <a:r>
+              <a:rPr lang="en-US" dirty="0" err="1" smtClean="0">
+                <a:latin typeface="Courier New" panose="02070309020205020404" pitchFamily="49" charset="0"/>
+                <a:cs typeface="Courier New" panose="02070309020205020404" pitchFamily="49" charset="0"/>
+              </a:rPr>
+              <a:t>seq_records</a:t>
+            </a:r>
+            <a:r>
+              <a:rPr lang="en-US" dirty="0" smtClean="0">
+                <a:latin typeface="Courier New" panose="02070309020205020404" pitchFamily="49" charset="0"/>
+                <a:cs typeface="Courier New" panose="02070309020205020404" pitchFamily="49" charset="0"/>
+              </a:rPr>
+              <a:t> = </a:t>
+            </a:r>
+            <a:r>
+              <a:rPr lang="en-US" dirty="0" err="1" smtClean="0">
+                <a:latin typeface="Courier New" panose="02070309020205020404" pitchFamily="49" charset="0"/>
+                <a:cs typeface="Courier New" panose="02070309020205020404" pitchFamily="49" charset="0"/>
+              </a:rPr>
+              <a:t>SeqIO.parse</a:t>
+            </a:r>
+            <a:r>
+              <a:rPr lang="en-US" dirty="0" smtClean="0">
+                <a:latin typeface="Courier New" panose="02070309020205020404" pitchFamily="49" charset="0"/>
+                <a:cs typeface="Courier New" panose="02070309020205020404" pitchFamily="49" charset="0"/>
+              </a:rPr>
+              <a:t>('</a:t>
+            </a:r>
+            <a:r>
+              <a:rPr lang="en-US" dirty="0" err="1" smtClean="0">
+                <a:latin typeface="Courier New" panose="02070309020205020404" pitchFamily="49" charset="0"/>
+                <a:cs typeface="Courier New" panose="02070309020205020404" pitchFamily="49" charset="0"/>
+              </a:rPr>
+              <a:t>data.fasta</a:t>
+            </a:r>
+            <a:r>
+              <a:rPr lang="en-US" dirty="0" smtClean="0">
+                <a:latin typeface="Courier New" panose="02070309020205020404" pitchFamily="49" charset="0"/>
+                <a:cs typeface="Courier New" panose="02070309020205020404" pitchFamily="49" charset="0"/>
+              </a:rPr>
+              <a:t>', '</a:t>
+            </a:r>
+            <a:r>
+              <a:rPr lang="en-US" dirty="0" err="1" smtClean="0">
+                <a:latin typeface="Courier New" panose="02070309020205020404" pitchFamily="49" charset="0"/>
+                <a:cs typeface="Courier New" panose="02070309020205020404" pitchFamily="49" charset="0"/>
+              </a:rPr>
+              <a:t>fasta</a:t>
+            </a:r>
+            <a:r>
+              <a:rPr lang="en-US" dirty="0" smtClean="0">
+                <a:latin typeface="Courier New" panose="02070309020205020404" pitchFamily="49" charset="0"/>
+                <a:cs typeface="Courier New" panose="02070309020205020404" pitchFamily="49" charset="0"/>
+              </a:rPr>
+              <a:t>'</a:t>
+            </a:r>
+          </a:p>
+          <a:p>
+            <a:r>
+              <a:rPr lang="en-US" dirty="0">
+                <a:latin typeface="Courier New" panose="02070309020205020404" pitchFamily="49" charset="0"/>
+                <a:cs typeface="Courier New" panose="02070309020205020404" pitchFamily="49" charset="0"/>
+              </a:rPr>
+              <a:t> </a:t>
+            </a:r>
+            <a:r>
+              <a:rPr lang="en-US" dirty="0" smtClean="0">
+                <a:latin typeface="Courier New" panose="02070309020205020404" pitchFamily="49" charset="0"/>
+                <a:cs typeface="Courier New" panose="02070309020205020404" pitchFamily="49" charset="0"/>
+              </a:rPr>
+              <a:t>                         alphabet=</a:t>
+            </a:r>
+            <a:r>
+              <a:rPr lang="en-US" dirty="0" err="1" smtClean="0">
+                <a:latin typeface="Courier New" panose="02070309020205020404" pitchFamily="49" charset="0"/>
+                <a:cs typeface="Courier New" panose="02070309020205020404" pitchFamily="49" charset="0"/>
+              </a:rPr>
+              <a:t>generic_dna</a:t>
+            </a:r>
+            <a:r>
+              <a:rPr lang="en-US" dirty="0" smtClean="0">
+                <a:latin typeface="Courier New" panose="02070309020205020404" pitchFamily="49" charset="0"/>
+                <a:cs typeface="Courier New" panose="02070309020205020404" pitchFamily="49" charset="0"/>
+              </a:rPr>
+              <a:t>)</a:t>
+            </a:r>
+            <a:endParaRPr lang="en-US" dirty="0">
+              <a:latin typeface="Courier New" panose="02070309020205020404" pitchFamily="49" charset="0"/>
+              <a:cs typeface="Courier New" panose="02070309020205020404" pitchFamily="49" charset="0"/>
+            </a:endParaRPr>
+          </a:p>
+        </p:txBody>
+      </p:sp>
+    </p:spTree>
+    <p:extLst>
+      <p:ext uri="{BB962C8B-B14F-4D97-AF65-F5344CB8AC3E}">
+        <p14:creationId xmlns:p14="http://schemas.microsoft.com/office/powerpoint/2010/main" val="2709363111"/>
+      </p:ext>
+    </p:extLst>
+  </p:cSld>
+  <p:clrMapOvr>
+    <a:masterClrMapping/>
+  </p:clrMapOvr>
+  <p:timing>
+    <p:tnLst>
+      <p:par>
+        <p:cTn id="1" dur="indefinite" restart="never" nodeType="tmRoot"/>
+      </p:par>
+    </p:tnLst>
+  </p:timing>
+</p:sld>
+</file>
+
+<file path=ppt/slides/slide5.xml><?xml version="1.0" encoding="utf-8"?>
+<p:sld xmlns:a="http://schemas.openxmlformats.org/drawingml/2006/main" xmlns:r="http://schemas.openxmlformats.org/officeDocument/2006/relationships" xmlns:p="http://schemas.openxmlformats.org/presentationml/2006/main">
+  <p:cSld>
+    <p:spTree>
+      <p:nvGrpSpPr>
+        <p:cNvPr id="1" name=""/>
+        <p:cNvGrpSpPr/>
+        <p:nvPr/>
+      </p:nvGrpSpPr>
+      <p:grpSpPr>
+        <a:xfrm>
+          <a:off x="0" y="0"/>
+          <a:ext cx="0" cy="0"/>
+          <a:chOff x="0" y="0"/>
+          <a:chExt cx="0" cy="0"/>
+        </a:xfrm>
+      </p:grpSpPr>
+      <p:sp>
+        <p:nvSpPr>
+          <p:cNvPr id="2" name="Title 1"/>
+          <p:cNvSpPr>
+            <a:spLocks noGrp="1"/>
+          </p:cNvSpPr>
+          <p:nvPr>
+            <p:ph type="title"/>
+          </p:nvPr>
+        </p:nvSpPr>
+        <p:spPr/>
+        <p:txBody>
+          <a:bodyPr/>
+          <a:lstStyle/>
+          <a:p>
+            <a:r>
+              <a:rPr lang="en-US" dirty="0" smtClean="0"/>
+              <a:t>Sequence records</a:t>
+            </a:r>
+            <a:endParaRPr lang="en-US" dirty="0"/>
+          </a:p>
+        </p:txBody>
+      </p:sp>
+      <p:sp>
+        <p:nvSpPr>
+          <p:cNvPr id="3" name="Content Placeholder 2"/>
+          <p:cNvSpPr>
+            <a:spLocks noGrp="1"/>
+          </p:cNvSpPr>
+          <p:nvPr>
+            <p:ph idx="1"/>
+          </p:nvPr>
+        </p:nvSpPr>
+        <p:spPr/>
+        <p:txBody>
+          <a:bodyPr/>
+          <a:lstStyle/>
+          <a:p>
+            <a:r>
+              <a:rPr lang="en-US" dirty="0" smtClean="0"/>
+              <a:t>Record has attributes</a:t>
+            </a:r>
+          </a:p>
+          <a:p>
+            <a:pPr lvl="1"/>
+            <a:r>
+              <a:rPr lang="en-US" dirty="0" smtClean="0"/>
+              <a:t>ID</a:t>
+            </a:r>
+          </a:p>
+          <a:p>
+            <a:pPr lvl="1"/>
+            <a:r>
+              <a:rPr lang="en-US" dirty="0" smtClean="0"/>
+              <a:t>sequence</a:t>
+            </a:r>
+          </a:p>
+          <a:p>
+            <a:pPr lvl="1"/>
+            <a:r>
+              <a:rPr lang="en-US" dirty="0" smtClean="0"/>
+              <a:t>name</a:t>
+            </a:r>
+          </a:p>
+          <a:p>
+            <a:pPr lvl="1"/>
+            <a:r>
+              <a:rPr lang="en-US" dirty="0" smtClean="0"/>
+              <a:t>description</a:t>
+            </a:r>
+          </a:p>
+          <a:p>
+            <a:endParaRPr lang="en-US" dirty="0"/>
+          </a:p>
+        </p:txBody>
+      </p:sp>
+      <p:sp>
+        <p:nvSpPr>
+          <p:cNvPr id="4" name="TextBox 3"/>
+          <p:cNvSpPr txBox="1"/>
+          <p:nvPr/>
+        </p:nvSpPr>
+        <p:spPr>
+          <a:xfrm>
+            <a:off x="990600" y="4128642"/>
+            <a:ext cx="7491153" cy="1477328"/>
+          </a:xfrm>
+          <a:prstGeom prst="rect">
+            <a:avLst/>
+          </a:prstGeom>
+          <a:solidFill>
+            <a:schemeClr val="bg1">
+              <a:lumMod val="75000"/>
+            </a:schemeClr>
+          </a:solidFill>
+          <a:ln>
+            <a:solidFill>
+              <a:schemeClr val="tx1"/>
+            </a:solidFill>
+          </a:ln>
+        </p:spPr>
+        <p:txBody>
+          <a:bodyPr wrap="none" rtlCol="0">
+            <a:spAutoFit/>
+          </a:bodyPr>
+          <a:lstStyle/>
+          <a:p>
+            <a:r>
+              <a:rPr lang="en-US" dirty="0" smtClean="0">
+                <a:latin typeface="Courier New" panose="02070309020205020404" pitchFamily="49" charset="0"/>
+                <a:cs typeface="Courier New" panose="02070309020205020404" pitchFamily="49" charset="0"/>
+              </a:rPr>
+              <a:t>for record in records:</a:t>
+            </a:r>
+          </a:p>
+          <a:p>
+            <a:r>
+              <a:rPr lang="en-US" dirty="0">
+                <a:latin typeface="Courier New" panose="02070309020205020404" pitchFamily="49" charset="0"/>
+                <a:cs typeface="Courier New" panose="02070309020205020404" pitchFamily="49" charset="0"/>
+              </a:rPr>
+              <a:t> </a:t>
+            </a:r>
+            <a:r>
+              <a:rPr lang="en-US" dirty="0" smtClean="0">
+                <a:latin typeface="Courier New" panose="02070309020205020404" pitchFamily="49" charset="0"/>
+                <a:cs typeface="Courier New" panose="02070309020205020404" pitchFamily="49" charset="0"/>
+              </a:rPr>
+              <a:t>   print('id: {0}, name: {1}'.format(record.id,</a:t>
+            </a:r>
+          </a:p>
+          <a:p>
+            <a:r>
+              <a:rPr lang="en-US" dirty="0">
+                <a:latin typeface="Courier New" panose="02070309020205020404" pitchFamily="49" charset="0"/>
+                <a:cs typeface="Courier New" panose="02070309020205020404" pitchFamily="49" charset="0"/>
+              </a:rPr>
+              <a:t> </a:t>
+            </a:r>
+            <a:r>
+              <a:rPr lang="en-US" dirty="0" smtClean="0">
+                <a:latin typeface="Courier New" panose="02070309020205020404" pitchFamily="49" charset="0"/>
+                <a:cs typeface="Courier New" panose="02070309020205020404" pitchFamily="49" charset="0"/>
+              </a:rPr>
+              <a:t>                                     record.name))</a:t>
+            </a:r>
+          </a:p>
+          <a:p>
+            <a:r>
+              <a:rPr lang="en-US" dirty="0">
+                <a:latin typeface="Courier New" panose="02070309020205020404" pitchFamily="49" charset="0"/>
+                <a:cs typeface="Courier New" panose="02070309020205020404" pitchFamily="49" charset="0"/>
+              </a:rPr>
+              <a:t> </a:t>
+            </a:r>
+            <a:r>
+              <a:rPr lang="en-US" dirty="0" smtClean="0">
+                <a:latin typeface="Courier New" panose="02070309020205020404" pitchFamily="49" charset="0"/>
+                <a:cs typeface="Courier New" panose="02070309020205020404" pitchFamily="49" charset="0"/>
+              </a:rPr>
+              <a:t>   print('</a:t>
+            </a:r>
+            <a:r>
+              <a:rPr lang="en-US" dirty="0" err="1" smtClean="0">
+                <a:latin typeface="Courier New" panose="02070309020205020404" pitchFamily="49" charset="0"/>
+                <a:cs typeface="Courier New" panose="02070309020205020404" pitchFamily="49" charset="0"/>
+              </a:rPr>
+              <a:t>descr</a:t>
+            </a:r>
+            <a:r>
+              <a:rPr lang="en-US" dirty="0" smtClean="0">
+                <a:latin typeface="Courier New" panose="02070309020205020404" pitchFamily="49" charset="0"/>
+                <a:cs typeface="Courier New" panose="02070309020205020404" pitchFamily="49" charset="0"/>
+              </a:rPr>
+              <a:t>.: {0}'.format(</a:t>
+            </a:r>
+            <a:r>
+              <a:rPr lang="en-US" dirty="0" err="1" smtClean="0">
+                <a:latin typeface="Courier New" panose="02070309020205020404" pitchFamily="49" charset="0"/>
+                <a:cs typeface="Courier New" panose="02070309020205020404" pitchFamily="49" charset="0"/>
+              </a:rPr>
+              <a:t>record.description</a:t>
+            </a:r>
+            <a:r>
+              <a:rPr lang="en-US" dirty="0" smtClean="0">
+                <a:latin typeface="Courier New" panose="02070309020205020404" pitchFamily="49" charset="0"/>
+                <a:cs typeface="Courier New" panose="02070309020205020404" pitchFamily="49" charset="0"/>
+              </a:rPr>
+              <a:t>))</a:t>
+            </a:r>
+          </a:p>
+          <a:p>
+            <a:r>
+              <a:rPr lang="en-US" dirty="0">
+                <a:latin typeface="Courier New" panose="02070309020205020404" pitchFamily="49" charset="0"/>
+                <a:cs typeface="Courier New" panose="02070309020205020404" pitchFamily="49" charset="0"/>
+              </a:rPr>
+              <a:t> </a:t>
+            </a:r>
+            <a:r>
+              <a:rPr lang="en-US" dirty="0" smtClean="0">
+                <a:latin typeface="Courier New" panose="02070309020205020404" pitchFamily="49" charset="0"/>
+                <a:cs typeface="Courier New" panose="02070309020205020404" pitchFamily="49" charset="0"/>
+              </a:rPr>
+              <a:t>   print(</a:t>
+            </a:r>
+            <a:r>
+              <a:rPr lang="en-US" dirty="0" err="1" smtClean="0">
+                <a:latin typeface="Courier New" panose="02070309020205020404" pitchFamily="49" charset="0"/>
+                <a:cs typeface="Courier New" panose="02070309020205020404" pitchFamily="49" charset="0"/>
+              </a:rPr>
+              <a:t>record.seq</a:t>
+            </a:r>
+            <a:r>
+              <a:rPr lang="en-US" dirty="0" smtClean="0">
+                <a:latin typeface="Courier New" panose="02070309020205020404" pitchFamily="49" charset="0"/>
+                <a:cs typeface="Courier New" panose="02070309020205020404" pitchFamily="49" charset="0"/>
+              </a:rPr>
+              <a:t>)</a:t>
+            </a:r>
+            <a:endParaRPr lang="en-US" dirty="0">
+              <a:latin typeface="Courier New" panose="02070309020205020404" pitchFamily="49" charset="0"/>
+              <a:cs typeface="Courier New" panose="02070309020205020404" pitchFamily="49" charset="0"/>
+            </a:endParaRPr>
+          </a:p>
+        </p:txBody>
+      </p:sp>
+    </p:spTree>
+    <p:extLst>
+      <p:ext uri="{BB962C8B-B14F-4D97-AF65-F5344CB8AC3E}">
+        <p14:creationId xmlns:p14="http://schemas.microsoft.com/office/powerpoint/2010/main" val="2599700189"/>
+      </p:ext>
+    </p:extLst>
+  </p:cSld>
+  <p:clrMapOvr>
+    <a:masterClrMapping/>
+  </p:clrMapOvr>
+  <p:timing>
+    <p:tnLst>
+      <p:par>
+        <p:cTn id="1" dur="indefinite" restart="never" nodeType="tmRoot"/>
+      </p:par>
+    </p:tnLst>
+  </p:timing>
+</p:sld>
+</file>
+
+<file path=ppt/slides/slide6.xml><?xml version="1.0" encoding="utf-8"?>
+<p:sld xmlns:a="http://schemas.openxmlformats.org/drawingml/2006/main" xmlns:r="http://schemas.openxmlformats.org/officeDocument/2006/relationships" xmlns:p="http://schemas.openxmlformats.org/presentationml/2006/main">
+  <p:cSld>
+    <p:spTree>
+      <p:nvGrpSpPr>
+        <p:cNvPr id="1" name=""/>
+        <p:cNvGrpSpPr/>
+        <p:nvPr/>
+      </p:nvGrpSpPr>
+      <p:grpSpPr>
+        <a:xfrm>
+          <a:off x="0" y="0"/>
+          <a:ext cx="0" cy="0"/>
+          <a:chOff x="0" y="0"/>
+          <a:chExt cx="0" cy="0"/>
+        </a:xfrm>
+      </p:grpSpPr>
+      <p:sp>
+        <p:nvSpPr>
+          <p:cNvPr id="2" name="Title 1"/>
+          <p:cNvSpPr>
+            <a:spLocks noGrp="1"/>
+          </p:cNvSpPr>
+          <p:nvPr>
+            <p:ph type="title"/>
+          </p:nvPr>
+        </p:nvSpPr>
+        <p:spPr/>
+        <p:txBody>
+          <a:bodyPr/>
+          <a:lstStyle/>
+          <a:p>
+            <a:r>
+              <a:rPr lang="en-US" dirty="0" smtClean="0"/>
+              <a:t>Sequence utilities</a:t>
+            </a:r>
+            <a:endParaRPr lang="en-US" dirty="0"/>
+          </a:p>
+        </p:txBody>
+      </p:sp>
+      <p:sp>
+        <p:nvSpPr>
+          <p:cNvPr id="3" name="Content Placeholder 2"/>
+          <p:cNvSpPr>
+            <a:spLocks noGrp="1"/>
+          </p:cNvSpPr>
+          <p:nvPr>
+            <p:ph idx="1"/>
+          </p:nvPr>
+        </p:nvSpPr>
+        <p:spPr/>
+        <p:txBody>
+          <a:bodyPr/>
+          <a:lstStyle/>
+          <a:p>
+            <a:endParaRPr lang="en-US"/>
+          </a:p>
+        </p:txBody>
+      </p:sp>
+    </p:spTree>
+    <p:extLst>
+      <p:ext uri="{BB962C8B-B14F-4D97-AF65-F5344CB8AC3E}">
+        <p14:creationId xmlns:p14="http://schemas.microsoft.com/office/powerpoint/2010/main" val="3996819160"/>
       </p:ext>
     </p:extLst>
   </p:cSld>

</xml_diff>

<commit_message>
Added slides on sequence methods
</commit_message>
<xml_diff>
--- a/Python/biopython.pptx
+++ b/Python/biopython.pptx
@@ -4,13 +4,18 @@
   <p:sldMasterIdLst>
     <p:sldMasterId id="2147483660" r:id="rId1"/>
   </p:sldMasterIdLst>
+  <p:notesMasterIdLst>
+    <p:notesMasterId r:id="rId10"/>
+  </p:notesMasterIdLst>
   <p:sldIdLst>
     <p:sldId id="256" r:id="rId2"/>
     <p:sldId id="257" r:id="rId3"/>
     <p:sldId id="258" r:id="rId4"/>
     <p:sldId id="259" r:id="rId5"/>
     <p:sldId id="260" r:id="rId6"/>
-    <p:sldId id="261" r:id="rId7"/>
+    <p:sldId id="262" r:id="rId7"/>
+    <p:sldId id="263" r:id="rId8"/>
+    <p:sldId id="261" r:id="rId9"/>
   </p:sldIdLst>
   <p:sldSz cx="9144000" cy="6858000" type="screen4x3"/>
   <p:notesSz cx="6858000" cy="9144000"/>
@@ -117,6 +122,440 @@
 </p:presentation>
 </file>
 
+<file path=ppt/notesMasters/notesMaster1.xml><?xml version="1.0" encoding="utf-8"?>
+<p:notesMaster xmlns:a="http://schemas.openxmlformats.org/drawingml/2006/main" xmlns:r="http://schemas.openxmlformats.org/officeDocument/2006/relationships" xmlns:p="http://schemas.openxmlformats.org/presentationml/2006/main">
+  <p:cSld>
+    <p:bg>
+      <p:bgRef idx="1001">
+        <a:schemeClr val="bg1"/>
+      </p:bgRef>
+    </p:bg>
+    <p:spTree>
+      <p:nvGrpSpPr>
+        <p:cNvPr id="1" name=""/>
+        <p:cNvGrpSpPr/>
+        <p:nvPr/>
+      </p:nvGrpSpPr>
+      <p:grpSpPr>
+        <a:xfrm>
+          <a:off x="0" y="0"/>
+          <a:ext cx="0" cy="0"/>
+          <a:chOff x="0" y="0"/>
+          <a:chExt cx="0" cy="0"/>
+        </a:xfrm>
+      </p:grpSpPr>
+      <p:sp>
+        <p:nvSpPr>
+          <p:cNvPr id="2" name="Header Placeholder 1"/>
+          <p:cNvSpPr>
+            <a:spLocks noGrp="1"/>
+          </p:cNvSpPr>
+          <p:nvPr>
+            <p:ph type="hdr" sz="quarter"/>
+          </p:nvPr>
+        </p:nvSpPr>
+        <p:spPr>
+          <a:xfrm>
+            <a:off x="0" y="0"/>
+            <a:ext cx="2971800" cy="458788"/>
+          </a:xfrm>
+          <a:prstGeom prst="rect">
+            <a:avLst/>
+          </a:prstGeom>
+        </p:spPr>
+        <p:txBody>
+          <a:bodyPr vert="horz" lIns="91440" tIns="45720" rIns="91440" bIns="45720" rtlCol="0"/>
+          <a:lstStyle>
+            <a:lvl1pPr algn="l">
+              <a:defRPr sz="1200"/>
+            </a:lvl1pPr>
+          </a:lstStyle>
+          <a:p>
+            <a:endParaRPr lang="en-US"/>
+          </a:p>
+        </p:txBody>
+      </p:sp>
+      <p:sp>
+        <p:nvSpPr>
+          <p:cNvPr id="3" name="Date Placeholder 2"/>
+          <p:cNvSpPr>
+            <a:spLocks noGrp="1"/>
+          </p:cNvSpPr>
+          <p:nvPr>
+            <p:ph type="dt" idx="1"/>
+          </p:nvPr>
+        </p:nvSpPr>
+        <p:spPr>
+          <a:xfrm>
+            <a:off x="3884613" y="0"/>
+            <a:ext cx="2971800" cy="458788"/>
+          </a:xfrm>
+          <a:prstGeom prst="rect">
+            <a:avLst/>
+          </a:prstGeom>
+        </p:spPr>
+        <p:txBody>
+          <a:bodyPr vert="horz" lIns="91440" tIns="45720" rIns="91440" bIns="45720" rtlCol="0"/>
+          <a:lstStyle>
+            <a:lvl1pPr algn="r">
+              <a:defRPr sz="1200"/>
+            </a:lvl1pPr>
+          </a:lstStyle>
+          <a:p>
+            <a:fld id="{E50739E9-DC4A-4901-8195-7CE430F840D8}" type="datetimeFigureOut">
+              <a:rPr lang="en-US" smtClean="0"/>
+              <a:t>2016-06-28</a:t>
+            </a:fld>
+            <a:endParaRPr lang="en-US"/>
+          </a:p>
+        </p:txBody>
+      </p:sp>
+      <p:sp>
+        <p:nvSpPr>
+          <p:cNvPr id="4" name="Slide Image Placeholder 3"/>
+          <p:cNvSpPr>
+            <a:spLocks noGrp="1" noRot="1" noChangeAspect="1"/>
+          </p:cNvSpPr>
+          <p:nvPr>
+            <p:ph type="sldImg" idx="2"/>
+          </p:nvPr>
+        </p:nvSpPr>
+        <p:spPr>
+          <a:xfrm>
+            <a:off x="1371600" y="1143000"/>
+            <a:ext cx="4114800" cy="3086100"/>
+          </a:xfrm>
+          <a:prstGeom prst="rect">
+            <a:avLst/>
+          </a:prstGeom>
+          <a:noFill/>
+          <a:ln w="12700">
+            <a:solidFill>
+              <a:prstClr val="black"/>
+            </a:solidFill>
+          </a:ln>
+        </p:spPr>
+        <p:txBody>
+          <a:bodyPr vert="horz" lIns="91440" tIns="45720" rIns="91440" bIns="45720" rtlCol="0" anchor="ctr"/>
+          <a:lstStyle/>
+          <a:p>
+            <a:endParaRPr lang="en-US"/>
+          </a:p>
+        </p:txBody>
+      </p:sp>
+      <p:sp>
+        <p:nvSpPr>
+          <p:cNvPr id="5" name="Notes Placeholder 4"/>
+          <p:cNvSpPr>
+            <a:spLocks noGrp="1"/>
+          </p:cNvSpPr>
+          <p:nvPr>
+            <p:ph type="body" sz="quarter" idx="3"/>
+          </p:nvPr>
+        </p:nvSpPr>
+        <p:spPr>
+          <a:xfrm>
+            <a:off x="685800" y="4400550"/>
+            <a:ext cx="5486400" cy="3600450"/>
+          </a:xfrm>
+          <a:prstGeom prst="rect">
+            <a:avLst/>
+          </a:prstGeom>
+        </p:spPr>
+        <p:txBody>
+          <a:bodyPr vert="horz" lIns="91440" tIns="45720" rIns="91440" bIns="45720" rtlCol="0"/>
+          <a:lstStyle/>
+          <a:p>
+            <a:pPr lvl="0"/>
+            <a:r>
+              <a:rPr lang="en-US" smtClean="0"/>
+              <a:t>Click to edit Master text styles</a:t>
+            </a:r>
+          </a:p>
+          <a:p>
+            <a:pPr lvl="1"/>
+            <a:r>
+              <a:rPr lang="en-US" smtClean="0"/>
+              <a:t>Second level</a:t>
+            </a:r>
+          </a:p>
+          <a:p>
+            <a:pPr lvl="2"/>
+            <a:r>
+              <a:rPr lang="en-US" smtClean="0"/>
+              <a:t>Third level</a:t>
+            </a:r>
+          </a:p>
+          <a:p>
+            <a:pPr lvl="3"/>
+            <a:r>
+              <a:rPr lang="en-US" smtClean="0"/>
+              <a:t>Fourth level</a:t>
+            </a:r>
+          </a:p>
+          <a:p>
+            <a:pPr lvl="4"/>
+            <a:r>
+              <a:rPr lang="en-US" smtClean="0"/>
+              <a:t>Fifth level</a:t>
+            </a:r>
+            <a:endParaRPr lang="en-US"/>
+          </a:p>
+        </p:txBody>
+      </p:sp>
+      <p:sp>
+        <p:nvSpPr>
+          <p:cNvPr id="6" name="Footer Placeholder 5"/>
+          <p:cNvSpPr>
+            <a:spLocks noGrp="1"/>
+          </p:cNvSpPr>
+          <p:nvPr>
+            <p:ph type="ftr" sz="quarter" idx="4"/>
+          </p:nvPr>
+        </p:nvSpPr>
+        <p:spPr>
+          <a:xfrm>
+            <a:off x="0" y="8685213"/>
+            <a:ext cx="2971800" cy="458787"/>
+          </a:xfrm>
+          <a:prstGeom prst="rect">
+            <a:avLst/>
+          </a:prstGeom>
+        </p:spPr>
+        <p:txBody>
+          <a:bodyPr vert="horz" lIns="91440" tIns="45720" rIns="91440" bIns="45720" rtlCol="0" anchor="b"/>
+          <a:lstStyle>
+            <a:lvl1pPr algn="l">
+              <a:defRPr sz="1200"/>
+            </a:lvl1pPr>
+          </a:lstStyle>
+          <a:p>
+            <a:endParaRPr lang="en-US"/>
+          </a:p>
+        </p:txBody>
+      </p:sp>
+      <p:sp>
+        <p:nvSpPr>
+          <p:cNvPr id="7" name="Slide Number Placeholder 6"/>
+          <p:cNvSpPr>
+            <a:spLocks noGrp="1"/>
+          </p:cNvSpPr>
+          <p:nvPr>
+            <p:ph type="sldNum" sz="quarter" idx="5"/>
+          </p:nvPr>
+        </p:nvSpPr>
+        <p:spPr>
+          <a:xfrm>
+            <a:off x="3884613" y="8685213"/>
+            <a:ext cx="2971800" cy="458787"/>
+          </a:xfrm>
+          <a:prstGeom prst="rect">
+            <a:avLst/>
+          </a:prstGeom>
+        </p:spPr>
+        <p:txBody>
+          <a:bodyPr vert="horz" lIns="91440" tIns="45720" rIns="91440" bIns="45720" rtlCol="0" anchor="b"/>
+          <a:lstStyle>
+            <a:lvl1pPr algn="r">
+              <a:defRPr sz="1200"/>
+            </a:lvl1pPr>
+          </a:lstStyle>
+          <a:p>
+            <a:fld id="{2A1E1445-6A86-4E52-99ED-D45CD2104D31}" type="slidenum">
+              <a:rPr lang="en-US" smtClean="0"/>
+              <a:t>‹#›</a:t>
+            </a:fld>
+            <a:endParaRPr lang="en-US"/>
+          </a:p>
+        </p:txBody>
+      </p:sp>
+    </p:spTree>
+    <p:extLst>
+      <p:ext uri="{BB962C8B-B14F-4D97-AF65-F5344CB8AC3E}">
+        <p14:creationId xmlns:p14="http://schemas.microsoft.com/office/powerpoint/2010/main" val="2054892654"/>
+      </p:ext>
+    </p:extLst>
+  </p:cSld>
+  <p:clrMap bg1="lt1" tx1="dk1" bg2="lt2" tx2="dk2" accent1="accent1" accent2="accent2" accent3="accent3" accent4="accent4" accent5="accent5" accent6="accent6" hlink="hlink" folHlink="folHlink"/>
+  <p:notesStyle>
+    <a:lvl1pPr marL="0" algn="l" defTabSz="914400" rtl="0" eaLnBrk="1" latinLnBrk="0" hangingPunct="1">
+      <a:defRPr sz="1200" kern="1200">
+        <a:solidFill>
+          <a:schemeClr val="tx1"/>
+        </a:solidFill>
+        <a:latin typeface="+mn-lt"/>
+        <a:ea typeface="+mn-ea"/>
+        <a:cs typeface="+mn-cs"/>
+      </a:defRPr>
+    </a:lvl1pPr>
+    <a:lvl2pPr marL="457200" algn="l" defTabSz="914400" rtl="0" eaLnBrk="1" latinLnBrk="0" hangingPunct="1">
+      <a:defRPr sz="1200" kern="1200">
+        <a:solidFill>
+          <a:schemeClr val="tx1"/>
+        </a:solidFill>
+        <a:latin typeface="+mn-lt"/>
+        <a:ea typeface="+mn-ea"/>
+        <a:cs typeface="+mn-cs"/>
+      </a:defRPr>
+    </a:lvl2pPr>
+    <a:lvl3pPr marL="914400" algn="l" defTabSz="914400" rtl="0" eaLnBrk="1" latinLnBrk="0" hangingPunct="1">
+      <a:defRPr sz="1200" kern="1200">
+        <a:solidFill>
+          <a:schemeClr val="tx1"/>
+        </a:solidFill>
+        <a:latin typeface="+mn-lt"/>
+        <a:ea typeface="+mn-ea"/>
+        <a:cs typeface="+mn-cs"/>
+      </a:defRPr>
+    </a:lvl3pPr>
+    <a:lvl4pPr marL="1371600" algn="l" defTabSz="914400" rtl="0" eaLnBrk="1" latinLnBrk="0" hangingPunct="1">
+      <a:defRPr sz="1200" kern="1200">
+        <a:solidFill>
+          <a:schemeClr val="tx1"/>
+        </a:solidFill>
+        <a:latin typeface="+mn-lt"/>
+        <a:ea typeface="+mn-ea"/>
+        <a:cs typeface="+mn-cs"/>
+      </a:defRPr>
+    </a:lvl4pPr>
+    <a:lvl5pPr marL="1828800" algn="l" defTabSz="914400" rtl="0" eaLnBrk="1" latinLnBrk="0" hangingPunct="1">
+      <a:defRPr sz="1200" kern="1200">
+        <a:solidFill>
+          <a:schemeClr val="tx1"/>
+        </a:solidFill>
+        <a:latin typeface="+mn-lt"/>
+        <a:ea typeface="+mn-ea"/>
+        <a:cs typeface="+mn-cs"/>
+      </a:defRPr>
+    </a:lvl5pPr>
+    <a:lvl6pPr marL="2286000" algn="l" defTabSz="914400" rtl="0" eaLnBrk="1" latinLnBrk="0" hangingPunct="1">
+      <a:defRPr sz="1200" kern="1200">
+        <a:solidFill>
+          <a:schemeClr val="tx1"/>
+        </a:solidFill>
+        <a:latin typeface="+mn-lt"/>
+        <a:ea typeface="+mn-ea"/>
+        <a:cs typeface="+mn-cs"/>
+      </a:defRPr>
+    </a:lvl6pPr>
+    <a:lvl7pPr marL="2743200" algn="l" defTabSz="914400" rtl="0" eaLnBrk="1" latinLnBrk="0" hangingPunct="1">
+      <a:defRPr sz="1200" kern="1200">
+        <a:solidFill>
+          <a:schemeClr val="tx1"/>
+        </a:solidFill>
+        <a:latin typeface="+mn-lt"/>
+        <a:ea typeface="+mn-ea"/>
+        <a:cs typeface="+mn-cs"/>
+      </a:defRPr>
+    </a:lvl7pPr>
+    <a:lvl8pPr marL="3200400" algn="l" defTabSz="914400" rtl="0" eaLnBrk="1" latinLnBrk="0" hangingPunct="1">
+      <a:defRPr sz="1200" kern="1200">
+        <a:solidFill>
+          <a:schemeClr val="tx1"/>
+        </a:solidFill>
+        <a:latin typeface="+mn-lt"/>
+        <a:ea typeface="+mn-ea"/>
+        <a:cs typeface="+mn-cs"/>
+      </a:defRPr>
+    </a:lvl8pPr>
+    <a:lvl9pPr marL="3657600" algn="l" defTabSz="914400" rtl="0" eaLnBrk="1" latinLnBrk="0" hangingPunct="1">
+      <a:defRPr sz="1200" kern="1200">
+        <a:solidFill>
+          <a:schemeClr val="tx1"/>
+        </a:solidFill>
+        <a:latin typeface="+mn-lt"/>
+        <a:ea typeface="+mn-ea"/>
+        <a:cs typeface="+mn-cs"/>
+      </a:defRPr>
+    </a:lvl9pPr>
+  </p:notesStyle>
+</p:notesMaster>
+</file>
+
+<file path=ppt/notesSlides/notesSlide1.xml><?xml version="1.0" encoding="utf-8"?>
+<p:notes xmlns:a="http://schemas.openxmlformats.org/drawingml/2006/main" xmlns:r="http://schemas.openxmlformats.org/officeDocument/2006/relationships" xmlns:p="http://schemas.openxmlformats.org/presentationml/2006/main">
+  <p:cSld>
+    <p:spTree>
+      <p:nvGrpSpPr>
+        <p:cNvPr id="1" name=""/>
+        <p:cNvGrpSpPr/>
+        <p:nvPr/>
+      </p:nvGrpSpPr>
+      <p:grpSpPr>
+        <a:xfrm>
+          <a:off x="0" y="0"/>
+          <a:ext cx="0" cy="0"/>
+          <a:chOff x="0" y="0"/>
+          <a:chExt cx="0" cy="0"/>
+        </a:xfrm>
+      </p:grpSpPr>
+      <p:sp>
+        <p:nvSpPr>
+          <p:cNvPr id="2" name="Slide Image Placeholder 1"/>
+          <p:cNvSpPr>
+            <a:spLocks noGrp="1" noRot="1" noChangeAspect="1"/>
+          </p:cNvSpPr>
+          <p:nvPr>
+            <p:ph type="sldImg"/>
+          </p:nvPr>
+        </p:nvSpPr>
+        <p:spPr/>
+      </p:sp>
+      <p:sp>
+        <p:nvSpPr>
+          <p:cNvPr id="3" name="Notes Placeholder 2"/>
+          <p:cNvSpPr>
+            <a:spLocks noGrp="1"/>
+          </p:cNvSpPr>
+          <p:nvPr>
+            <p:ph type="body" idx="1"/>
+          </p:nvPr>
+        </p:nvSpPr>
+        <p:spPr/>
+        <p:txBody>
+          <a:bodyPr/>
+          <a:lstStyle/>
+          <a:p>
+            <a:endParaRPr lang="en-US"/>
+          </a:p>
+        </p:txBody>
+      </p:sp>
+      <p:sp>
+        <p:nvSpPr>
+          <p:cNvPr id="4" name="Slide Number Placeholder 3"/>
+          <p:cNvSpPr>
+            <a:spLocks noGrp="1"/>
+          </p:cNvSpPr>
+          <p:nvPr>
+            <p:ph type="sldNum" sz="quarter" idx="10"/>
+          </p:nvPr>
+        </p:nvSpPr>
+        <p:spPr/>
+        <p:txBody>
+          <a:bodyPr/>
+          <a:lstStyle/>
+          <a:p>
+            <a:fld id="{2A1E1445-6A86-4E52-99ED-D45CD2104D31}" type="slidenum">
+              <a:rPr lang="en-US" smtClean="0"/>
+              <a:t>7</a:t>
+            </a:fld>
+            <a:endParaRPr lang="en-US"/>
+          </a:p>
+        </p:txBody>
+      </p:sp>
+    </p:spTree>
+    <p:extLst>
+      <p:ext uri="{BB962C8B-B14F-4D97-AF65-F5344CB8AC3E}">
+        <p14:creationId xmlns:p14="http://schemas.microsoft.com/office/powerpoint/2010/main" val="2939767004"/>
+      </p:ext>
+    </p:extLst>
+  </p:cSld>
+  <p:clrMapOvr>
+    <a:masterClrMapping/>
+  </p:clrMapOvr>
+</p:notes>
+</file>
+
 <file path=ppt/slideLayouts/slideLayout1.xml><?xml version="1.0" encoding="utf-8"?>
 <p:sldLayout xmlns:a="http://schemas.openxmlformats.org/drawingml/2006/main" xmlns:r="http://schemas.openxmlformats.org/officeDocument/2006/relationships" xmlns:p="http://schemas.openxmlformats.org/presentationml/2006/main" type="title" preserve="1">
   <p:cSld name="Title Slide">
@@ -246,9 +685,9 @@
           <a:bodyPr/>
           <a:lstStyle/>
           <a:p>
-            <a:fld id="{1A389DA7-706A-472A-BD21-8BAE9F41F237}" type="datetimeFigureOut">
-              <a:rPr lang="en-US" smtClean="0"/>
-              <a:t>2016-06-27</a:t>
+            <a:fld id="{EBC2714F-B822-455B-B016-0228B6AA8BE9}" type="datetime1">
+              <a:rPr lang="en-US" smtClean="0"/>
+              <a:t>2016-06-28</a:t>
             </a:fld>
             <a:endParaRPr lang="en-US"/>
           </a:p>
@@ -416,9 +855,9 @@
           <a:bodyPr/>
           <a:lstStyle/>
           <a:p>
-            <a:fld id="{1A389DA7-706A-472A-BD21-8BAE9F41F237}" type="datetimeFigureOut">
-              <a:rPr lang="en-US" smtClean="0"/>
-              <a:t>2016-06-27</a:t>
+            <a:fld id="{F3822F19-B516-497C-9005-1997989AD109}" type="datetime1">
+              <a:rPr lang="en-US" smtClean="0"/>
+              <a:t>2016-06-28</a:t>
             </a:fld>
             <a:endParaRPr lang="en-US"/>
           </a:p>
@@ -596,9 +1035,9 @@
           <a:bodyPr/>
           <a:lstStyle/>
           <a:p>
-            <a:fld id="{1A389DA7-706A-472A-BD21-8BAE9F41F237}" type="datetimeFigureOut">
-              <a:rPr lang="en-US" smtClean="0"/>
-              <a:t>2016-06-27</a:t>
+            <a:fld id="{DC6E6076-3AC8-4591-A5B3-5701E86BC391}" type="datetime1">
+              <a:rPr lang="en-US" smtClean="0"/>
+              <a:t>2016-06-28</a:t>
             </a:fld>
             <a:endParaRPr lang="en-US"/>
           </a:p>
@@ -766,9 +1205,9 @@
           <a:bodyPr/>
           <a:lstStyle/>
           <a:p>
-            <a:fld id="{1A389DA7-706A-472A-BD21-8BAE9F41F237}" type="datetimeFigureOut">
-              <a:rPr lang="en-US" smtClean="0"/>
-              <a:t>2016-06-27</a:t>
+            <a:fld id="{10101B39-3B57-4A7B-8CB6-E6BDB118061D}" type="datetime1">
+              <a:rPr lang="en-US" smtClean="0"/>
+              <a:t>2016-06-28</a:t>
             </a:fld>
             <a:endParaRPr lang="en-US"/>
           </a:p>
@@ -1010,9 +1449,9 @@
           <a:bodyPr/>
           <a:lstStyle/>
           <a:p>
-            <a:fld id="{1A389DA7-706A-472A-BD21-8BAE9F41F237}" type="datetimeFigureOut">
-              <a:rPr lang="en-US" smtClean="0"/>
-              <a:t>2016-06-27</a:t>
+            <a:fld id="{C27B26EE-8ECF-4FF3-9A38-87EFFDA62A28}" type="datetime1">
+              <a:rPr lang="en-US" smtClean="0"/>
+              <a:t>2016-06-28</a:t>
             </a:fld>
             <a:endParaRPr lang="en-US"/>
           </a:p>
@@ -1242,9 +1681,9 @@
           <a:bodyPr/>
           <a:lstStyle/>
           <a:p>
-            <a:fld id="{1A389DA7-706A-472A-BD21-8BAE9F41F237}" type="datetimeFigureOut">
-              <a:rPr lang="en-US" smtClean="0"/>
-              <a:t>2016-06-27</a:t>
+            <a:fld id="{6742683C-23EC-4C0D-AC9A-17C98B40DAA7}" type="datetime1">
+              <a:rPr lang="en-US" smtClean="0"/>
+              <a:t>2016-06-28</a:t>
             </a:fld>
             <a:endParaRPr lang="en-US"/>
           </a:p>
@@ -1609,9 +2048,9 @@
           <a:bodyPr/>
           <a:lstStyle/>
           <a:p>
-            <a:fld id="{1A389DA7-706A-472A-BD21-8BAE9F41F237}" type="datetimeFigureOut">
-              <a:rPr lang="en-US" smtClean="0"/>
-              <a:t>2016-06-27</a:t>
+            <a:fld id="{61B639F5-7095-4C4C-8D13-AB3C116C2681}" type="datetime1">
+              <a:rPr lang="en-US" smtClean="0"/>
+              <a:t>2016-06-28</a:t>
             </a:fld>
             <a:endParaRPr lang="en-US"/>
           </a:p>
@@ -1727,9 +2166,9 @@
           <a:bodyPr/>
           <a:lstStyle/>
           <a:p>
-            <a:fld id="{1A389DA7-706A-472A-BD21-8BAE9F41F237}" type="datetimeFigureOut">
-              <a:rPr lang="en-US" smtClean="0"/>
-              <a:t>2016-06-27</a:t>
+            <a:fld id="{565C75B5-128F-4C63-85A2-EABB3B9088B2}" type="datetime1">
+              <a:rPr lang="en-US" smtClean="0"/>
+              <a:t>2016-06-28</a:t>
             </a:fld>
             <a:endParaRPr lang="en-US"/>
           </a:p>
@@ -1822,9 +2261,9 @@
           <a:bodyPr/>
           <a:lstStyle/>
           <a:p>
-            <a:fld id="{1A389DA7-706A-472A-BD21-8BAE9F41F237}" type="datetimeFigureOut">
-              <a:rPr lang="en-US" smtClean="0"/>
-              <a:t>2016-06-27</a:t>
+            <a:fld id="{EB500747-7144-41D3-89B7-0E40926A8757}" type="datetime1">
+              <a:rPr lang="en-US" smtClean="0"/>
+              <a:t>2016-06-28</a:t>
             </a:fld>
             <a:endParaRPr lang="en-US"/>
           </a:p>
@@ -2099,9 +2538,9 @@
           <a:bodyPr/>
           <a:lstStyle/>
           <a:p>
-            <a:fld id="{1A389DA7-706A-472A-BD21-8BAE9F41F237}" type="datetimeFigureOut">
-              <a:rPr lang="en-US" smtClean="0"/>
-              <a:t>2016-06-27</a:t>
+            <a:fld id="{09A9D774-0B51-4CD9-9147-A6BD4D353F07}" type="datetime1">
+              <a:rPr lang="en-US" smtClean="0"/>
+              <a:t>2016-06-28</a:t>
             </a:fld>
             <a:endParaRPr lang="en-US"/>
           </a:p>
@@ -2356,9 +2795,9 @@
           <a:bodyPr/>
           <a:lstStyle/>
           <a:p>
-            <a:fld id="{1A389DA7-706A-472A-BD21-8BAE9F41F237}" type="datetimeFigureOut">
-              <a:rPr lang="en-US" smtClean="0"/>
-              <a:t>2016-06-27</a:t>
+            <a:fld id="{2618F069-DB72-4F16-8512-37A179AE1774}" type="datetime1">
+              <a:rPr lang="en-US" smtClean="0"/>
+              <a:t>2016-06-28</a:t>
             </a:fld>
             <a:endParaRPr lang="en-US"/>
           </a:p>
@@ -2569,9 +3008,9 @@
             </a:lvl1pPr>
           </a:lstStyle>
           <a:p>
-            <a:fld id="{1A389DA7-706A-472A-BD21-8BAE9F41F237}" type="datetimeFigureOut">
-              <a:rPr lang="en-US" smtClean="0"/>
-              <a:t>2016-06-27</a:t>
+            <a:fld id="{7784AB71-9685-428C-BE48-FB64D9C8B81F}" type="datetime1">
+              <a:rPr lang="en-US" smtClean="0"/>
+              <a:t>2016-06-28</a:t>
             </a:fld>
             <a:endParaRPr lang="en-US"/>
           </a:p>
@@ -2676,6 +3115,7 @@
     <p:sldLayoutId id="2147483670" r:id="rId10"/>
     <p:sldLayoutId id="2147483671" r:id="rId11"/>
   </p:sldLayoutIdLst>
+  <p:hf hdr="0" ftr="0" dt="0"/>
   <p:txStyles>
     <p:titleStyle>
       <a:lvl1pPr algn="l" defTabSz="914400" rtl="0" eaLnBrk="1" latinLnBrk="0" hangingPunct="1">
@@ -3091,6 +3531,29 @@
           </a:p>
         </p:txBody>
       </p:sp>
+      <p:sp>
+        <p:nvSpPr>
+          <p:cNvPr id="5" name="Slide Number Placeholder 4"/>
+          <p:cNvSpPr>
+            <a:spLocks noGrp="1"/>
+          </p:cNvSpPr>
+          <p:nvPr>
+            <p:ph type="sldNum" sz="quarter" idx="12"/>
+          </p:nvPr>
+        </p:nvSpPr>
+        <p:spPr/>
+        <p:txBody>
+          <a:bodyPr/>
+          <a:lstStyle/>
+          <a:p>
+            <a:fld id="{CA586AD6-E5F2-4F25-940D-C674496063E2}" type="slidenum">
+              <a:rPr lang="en-US" smtClean="0"/>
+              <a:t>1</a:t>
+            </a:fld>
+            <a:endParaRPr lang="en-US"/>
+          </a:p>
+        </p:txBody>
+      </p:sp>
     </p:spTree>
     <p:extLst>
       <p:ext uri="{BB962C8B-B14F-4D97-AF65-F5344CB8AC3E}">
@@ -3249,6 +3712,29 @@
           </a:p>
         </p:txBody>
       </p:sp>
+      <p:sp>
+        <p:nvSpPr>
+          <p:cNvPr id="5" name="Slide Number Placeholder 4"/>
+          <p:cNvSpPr>
+            <a:spLocks noGrp="1"/>
+          </p:cNvSpPr>
+          <p:nvPr>
+            <p:ph type="sldNum" sz="quarter" idx="12"/>
+          </p:nvPr>
+        </p:nvSpPr>
+        <p:spPr/>
+        <p:txBody>
+          <a:bodyPr/>
+          <a:lstStyle/>
+          <a:p>
+            <a:fld id="{CA586AD6-E5F2-4F25-940D-C674496063E2}" type="slidenum">
+              <a:rPr lang="en-US" smtClean="0"/>
+              <a:t>2</a:t>
+            </a:fld>
+            <a:endParaRPr lang="en-US"/>
+          </a:p>
+        </p:txBody>
+      </p:sp>
     </p:spTree>
     <p:extLst>
       <p:ext uri="{BB962C8B-B14F-4D97-AF65-F5344CB8AC3E}">
@@ -3262,9 +3748,80 @@
   <p:timing>
     <p:tnLst>
       <p:par>
-        <p:cTn id="1" dur="indefinite" restart="never" nodeType="tmRoot"/>
+        <p:cTn id="1" dur="indefinite" restart="never" nodeType="tmRoot">
+          <p:childTnLst>
+            <p:seq concurrent="1" nextAc="seek">
+              <p:cTn id="2" dur="indefinite" nodeType="mainSeq">
+                <p:childTnLst>
+                  <p:par>
+                    <p:cTn id="3" fill="hold">
+                      <p:stCondLst>
+                        <p:cond delay="indefinite"/>
+                      </p:stCondLst>
+                      <p:childTnLst>
+                        <p:par>
+                          <p:cTn id="4" fill="hold">
+                            <p:stCondLst>
+                              <p:cond delay="0"/>
+                            </p:stCondLst>
+                            <p:childTnLst>
+                              <p:par>
+                                <p:cTn id="5" presetID="1" presetClass="entr" presetSubtype="0" fill="hold" grpId="0" nodeType="clickEffect">
+                                  <p:stCondLst>
+                                    <p:cond delay="0"/>
+                                  </p:stCondLst>
+                                  <p:childTnLst>
+                                    <p:set>
+                                      <p:cBhvr>
+                                        <p:cTn id="6" dur="1" fill="hold">
+                                          <p:stCondLst>
+                                            <p:cond delay="0"/>
+                                          </p:stCondLst>
+                                        </p:cTn>
+                                        <p:tgtEl>
+                                          <p:spTgt spid="4"/>
+                                        </p:tgtEl>
+                                        <p:attrNameLst>
+                                          <p:attrName>style.visibility</p:attrName>
+                                        </p:attrNameLst>
+                                      </p:cBhvr>
+                                      <p:to>
+                                        <p:strVal val="visible"/>
+                                      </p:to>
+                                    </p:set>
+                                  </p:childTnLst>
+                                </p:cTn>
+                              </p:par>
+                            </p:childTnLst>
+                          </p:cTn>
+                        </p:par>
+                      </p:childTnLst>
+                    </p:cTn>
+                  </p:par>
+                </p:childTnLst>
+              </p:cTn>
+              <p:prevCondLst>
+                <p:cond evt="onPrev" delay="0">
+                  <p:tgtEl>
+                    <p:sldTgt/>
+                  </p:tgtEl>
+                </p:cond>
+              </p:prevCondLst>
+              <p:nextCondLst>
+                <p:cond evt="onNext" delay="0">
+                  <p:tgtEl>
+                    <p:sldTgt/>
+                  </p:tgtEl>
+                </p:cond>
+              </p:nextCondLst>
+            </p:seq>
+          </p:childTnLst>
+        </p:cTn>
       </p:par>
     </p:tnLst>
+    <p:bldLst>
+      <p:bldP spid="4" grpId="0" animBg="1"/>
+    </p:bldLst>
   </p:timing>
 </p:sld>
 </file>
@@ -3324,6 +3881,29 @@
           <a:bodyPr/>
           <a:lstStyle/>
           <a:p>
+            <a:endParaRPr lang="en-US"/>
+          </a:p>
+        </p:txBody>
+      </p:sp>
+      <p:sp>
+        <p:nvSpPr>
+          <p:cNvPr id="4" name="Slide Number Placeholder 3"/>
+          <p:cNvSpPr>
+            <a:spLocks noGrp="1"/>
+          </p:cNvSpPr>
+          <p:nvPr>
+            <p:ph type="sldNum" sz="quarter" idx="12"/>
+          </p:nvPr>
+        </p:nvSpPr>
+        <p:spPr/>
+        <p:txBody>
+          <a:bodyPr/>
+          <a:lstStyle/>
+          <a:p>
+            <a:fld id="{CA586AD6-E5F2-4F25-940D-C674496063E2}" type="slidenum">
+              <a:rPr lang="en-US" smtClean="0"/>
+              <a:t>3</a:t>
+            </a:fld>
             <a:endParaRPr lang="en-US"/>
           </a:p>
         </p:txBody>
@@ -3806,6 +4386,29 @@
           </a:p>
         </p:txBody>
       </p:sp>
+      <p:sp>
+        <p:nvSpPr>
+          <p:cNvPr id="7" name="Slide Number Placeholder 6"/>
+          <p:cNvSpPr>
+            <a:spLocks noGrp="1"/>
+          </p:cNvSpPr>
+          <p:nvPr>
+            <p:ph type="sldNum" sz="quarter" idx="12"/>
+          </p:nvPr>
+        </p:nvSpPr>
+        <p:spPr/>
+        <p:txBody>
+          <a:bodyPr/>
+          <a:lstStyle/>
+          <a:p>
+            <a:fld id="{CA586AD6-E5F2-4F25-940D-C674496063E2}" type="slidenum">
+              <a:rPr lang="en-US" smtClean="0"/>
+              <a:t>4</a:t>
+            </a:fld>
+            <a:endParaRPr lang="en-US"/>
+          </a:p>
+        </p:txBody>
+      </p:sp>
     </p:spTree>
     <p:extLst>
       <p:ext uri="{BB962C8B-B14F-4D97-AF65-F5344CB8AC3E}">
@@ -3819,9 +4422,336 @@
   <p:timing>
     <p:tnLst>
       <p:par>
-        <p:cTn id="1" dur="indefinite" restart="never" nodeType="tmRoot"/>
+        <p:cTn id="1" dur="indefinite" restart="never" nodeType="tmRoot">
+          <p:childTnLst>
+            <p:seq concurrent="1" nextAc="seek">
+              <p:cTn id="2" dur="indefinite" nodeType="mainSeq">
+                <p:childTnLst>
+                  <p:par>
+                    <p:cTn id="3" fill="hold">
+                      <p:stCondLst>
+                        <p:cond delay="indefinite"/>
+                        <p:cond evt="onBegin" delay="0">
+                          <p:tn val="2"/>
+                        </p:cond>
+                      </p:stCondLst>
+                      <p:childTnLst>
+                        <p:par>
+                          <p:cTn id="4" fill="hold">
+                            <p:stCondLst>
+                              <p:cond delay="0"/>
+                            </p:stCondLst>
+                            <p:childTnLst>
+                              <p:par>
+                                <p:cTn id="5" presetID="1" presetClass="entr" presetSubtype="0" fill="hold" grpId="0" nodeType="withEffect">
+                                  <p:stCondLst>
+                                    <p:cond delay="0"/>
+                                  </p:stCondLst>
+                                  <p:childTnLst>
+                                    <p:set>
+                                      <p:cBhvr>
+                                        <p:cTn id="6" dur="1" fill="hold">
+                                          <p:stCondLst>
+                                            <p:cond delay="0"/>
+                                          </p:stCondLst>
+                                        </p:cTn>
+                                        <p:tgtEl>
+                                          <p:spTgt spid="3">
+                                            <p:txEl>
+                                              <p:pRg st="0" end="0"/>
+                                            </p:txEl>
+                                          </p:spTgt>
+                                        </p:tgtEl>
+                                        <p:attrNameLst>
+                                          <p:attrName>style.visibility</p:attrName>
+                                        </p:attrNameLst>
+                                      </p:cBhvr>
+                                      <p:to>
+                                        <p:strVal val="visible"/>
+                                      </p:to>
+                                    </p:set>
+                                  </p:childTnLst>
+                                </p:cTn>
+                              </p:par>
+                            </p:childTnLst>
+                          </p:cTn>
+                        </p:par>
+                      </p:childTnLst>
+                    </p:cTn>
+                  </p:par>
+                  <p:par>
+                    <p:cTn id="7" fill="hold">
+                      <p:stCondLst>
+                        <p:cond delay="indefinite"/>
+                      </p:stCondLst>
+                      <p:childTnLst>
+                        <p:par>
+                          <p:cTn id="8" fill="hold">
+                            <p:stCondLst>
+                              <p:cond delay="0"/>
+                            </p:stCondLst>
+                            <p:childTnLst>
+                              <p:par>
+                                <p:cTn id="9" presetID="1" presetClass="entr" presetSubtype="0" fill="hold" grpId="0" nodeType="clickEffect">
+                                  <p:stCondLst>
+                                    <p:cond delay="0"/>
+                                  </p:stCondLst>
+                                  <p:childTnLst>
+                                    <p:set>
+                                      <p:cBhvr>
+                                        <p:cTn id="10" dur="1" fill="hold">
+                                          <p:stCondLst>
+                                            <p:cond delay="0"/>
+                                          </p:stCondLst>
+                                        </p:cTn>
+                                        <p:tgtEl>
+                                          <p:spTgt spid="4"/>
+                                        </p:tgtEl>
+                                        <p:attrNameLst>
+                                          <p:attrName>style.visibility</p:attrName>
+                                        </p:attrNameLst>
+                                      </p:cBhvr>
+                                      <p:to>
+                                        <p:strVal val="visible"/>
+                                      </p:to>
+                                    </p:set>
+                                  </p:childTnLst>
+                                </p:cTn>
+                              </p:par>
+                            </p:childTnLst>
+                          </p:cTn>
+                        </p:par>
+                      </p:childTnLst>
+                    </p:cTn>
+                  </p:par>
+                  <p:par>
+                    <p:cTn id="11" fill="hold">
+                      <p:stCondLst>
+                        <p:cond delay="indefinite"/>
+                      </p:stCondLst>
+                      <p:childTnLst>
+                        <p:par>
+                          <p:cTn id="12" fill="hold">
+                            <p:stCondLst>
+                              <p:cond delay="0"/>
+                            </p:stCondLst>
+                            <p:childTnLst>
+                              <p:par>
+                                <p:cTn id="13" presetID="1" presetClass="entr" presetSubtype="0" fill="hold" grpId="0" nodeType="clickEffect">
+                                  <p:stCondLst>
+                                    <p:cond delay="0"/>
+                                  </p:stCondLst>
+                                  <p:childTnLst>
+                                    <p:set>
+                                      <p:cBhvr>
+                                        <p:cTn id="14" dur="1" fill="hold">
+                                          <p:stCondLst>
+                                            <p:cond delay="0"/>
+                                          </p:stCondLst>
+                                        </p:cTn>
+                                        <p:tgtEl>
+                                          <p:spTgt spid="3">
+                                            <p:txEl>
+                                              <p:pRg st="2" end="2"/>
+                                            </p:txEl>
+                                          </p:spTgt>
+                                        </p:tgtEl>
+                                        <p:attrNameLst>
+                                          <p:attrName>style.visibility</p:attrName>
+                                        </p:attrNameLst>
+                                      </p:cBhvr>
+                                      <p:to>
+                                        <p:strVal val="visible"/>
+                                      </p:to>
+                                    </p:set>
+                                  </p:childTnLst>
+                                </p:cTn>
+                              </p:par>
+                              <p:par>
+                                <p:cTn id="15" presetID="1" presetClass="entr" presetSubtype="0" fill="hold" grpId="0" nodeType="withEffect">
+                                  <p:stCondLst>
+                                    <p:cond delay="0"/>
+                                  </p:stCondLst>
+                                  <p:childTnLst>
+                                    <p:set>
+                                      <p:cBhvr>
+                                        <p:cTn id="16" dur="1" fill="hold">
+                                          <p:stCondLst>
+                                            <p:cond delay="0"/>
+                                          </p:stCondLst>
+                                        </p:cTn>
+                                        <p:tgtEl>
+                                          <p:spTgt spid="5"/>
+                                        </p:tgtEl>
+                                        <p:attrNameLst>
+                                          <p:attrName>style.visibility</p:attrName>
+                                        </p:attrNameLst>
+                                      </p:cBhvr>
+                                      <p:to>
+                                        <p:strVal val="visible"/>
+                                      </p:to>
+                                    </p:set>
+                                  </p:childTnLst>
+                                </p:cTn>
+                              </p:par>
+                            </p:childTnLst>
+                          </p:cTn>
+                        </p:par>
+                      </p:childTnLst>
+                    </p:cTn>
+                  </p:par>
+                  <p:par>
+                    <p:cTn id="17" fill="hold">
+                      <p:stCondLst>
+                        <p:cond delay="indefinite"/>
+                      </p:stCondLst>
+                      <p:childTnLst>
+                        <p:par>
+                          <p:cTn id="18" fill="hold">
+                            <p:stCondLst>
+                              <p:cond delay="0"/>
+                            </p:stCondLst>
+                            <p:childTnLst>
+                              <p:par>
+                                <p:cTn id="19" presetID="1" presetClass="entr" presetSubtype="0" fill="hold" grpId="0" nodeType="clickEffect">
+                                  <p:stCondLst>
+                                    <p:cond delay="0"/>
+                                  </p:stCondLst>
+                                  <p:childTnLst>
+                                    <p:set>
+                                      <p:cBhvr>
+                                        <p:cTn id="20" dur="1" fill="hold">
+                                          <p:stCondLst>
+                                            <p:cond delay="0"/>
+                                          </p:stCondLst>
+                                        </p:cTn>
+                                        <p:tgtEl>
+                                          <p:spTgt spid="3">
+                                            <p:txEl>
+                                              <p:pRg st="4" end="4"/>
+                                            </p:txEl>
+                                          </p:spTgt>
+                                        </p:tgtEl>
+                                        <p:attrNameLst>
+                                          <p:attrName>style.visibility</p:attrName>
+                                        </p:attrNameLst>
+                                      </p:cBhvr>
+                                      <p:to>
+                                        <p:strVal val="visible"/>
+                                      </p:to>
+                                    </p:set>
+                                  </p:childTnLst>
+                                </p:cTn>
+                              </p:par>
+                              <p:par>
+                                <p:cTn id="21" presetID="1" presetClass="entr" presetSubtype="0" fill="hold" grpId="0" nodeType="withEffect">
+                                  <p:stCondLst>
+                                    <p:cond delay="0"/>
+                                  </p:stCondLst>
+                                  <p:childTnLst>
+                                    <p:set>
+                                      <p:cBhvr>
+                                        <p:cTn id="22" dur="1" fill="hold">
+                                          <p:stCondLst>
+                                            <p:cond delay="0"/>
+                                          </p:stCondLst>
+                                        </p:cTn>
+                                        <p:tgtEl>
+                                          <p:spTgt spid="6"/>
+                                        </p:tgtEl>
+                                        <p:attrNameLst>
+                                          <p:attrName>style.visibility</p:attrName>
+                                        </p:attrNameLst>
+                                      </p:cBhvr>
+                                      <p:to>
+                                        <p:strVal val="visible"/>
+                                      </p:to>
+                                    </p:set>
+                                  </p:childTnLst>
+                                </p:cTn>
+                              </p:par>
+                            </p:childTnLst>
+                          </p:cTn>
+                        </p:par>
+                      </p:childTnLst>
+                    </p:cTn>
+                  </p:par>
+                  <p:par>
+                    <p:cTn id="23" fill="hold">
+                      <p:stCondLst>
+                        <p:cond delay="indefinite"/>
+                      </p:stCondLst>
+                      <p:childTnLst>
+                        <p:par>
+                          <p:cTn id="24" fill="hold">
+                            <p:stCondLst>
+                              <p:cond delay="0"/>
+                            </p:stCondLst>
+                            <p:childTnLst>
+                              <p:par>
+                                <p:cTn id="25" presetID="1" presetClass="entr" presetSubtype="0" fill="hold" grpId="0" nodeType="clickEffect">
+                                  <p:stCondLst>
+                                    <p:cond delay="0"/>
+                                  </p:stCondLst>
+                                  <p:childTnLst>
+                                    <p:set>
+                                      <p:cBhvr>
+                                        <p:cTn id="26" dur="1" fill="hold">
+                                          <p:stCondLst>
+                                            <p:cond delay="0"/>
+                                          </p:stCondLst>
+                                        </p:cTn>
+                                        <p:tgtEl>
+                                          <p:spTgt spid="3">
+                                            <p:txEl>
+                                              <p:pRg st="8" end="8"/>
+                                            </p:txEl>
+                                          </p:spTgt>
+                                        </p:tgtEl>
+                                        <p:attrNameLst>
+                                          <p:attrName>style.visibility</p:attrName>
+                                        </p:attrNameLst>
+                                      </p:cBhvr>
+                                      <p:to>
+                                        <p:strVal val="visible"/>
+                                      </p:to>
+                                    </p:set>
+                                  </p:childTnLst>
+                                </p:cTn>
+                              </p:par>
+                            </p:childTnLst>
+                          </p:cTn>
+                        </p:par>
+                      </p:childTnLst>
+                    </p:cTn>
+                  </p:par>
+                </p:childTnLst>
+              </p:cTn>
+              <p:prevCondLst>
+                <p:cond evt="onPrev" delay="0">
+                  <p:tgtEl>
+                    <p:sldTgt/>
+                  </p:tgtEl>
+                </p:cond>
+              </p:prevCondLst>
+              <p:nextCondLst>
+                <p:cond evt="onNext" delay="0">
+                  <p:tgtEl>
+                    <p:sldTgt/>
+                  </p:tgtEl>
+                </p:cond>
+              </p:nextCondLst>
+            </p:seq>
+          </p:childTnLst>
+        </p:cTn>
       </p:par>
     </p:tnLst>
+    <p:bldLst>
+      <p:bldP spid="3" grpId="0" uiExpand="1" build="p"/>
+      <p:bldP spid="4" grpId="0" animBg="1"/>
+      <p:bldP spid="5" grpId="0" animBg="1"/>
+      <p:bldP spid="6" grpId="0" animBg="1"/>
+    </p:bldLst>
   </p:timing>
 </p:sld>
 </file>
@@ -4070,6 +5000,29 @@
           </a:p>
         </p:txBody>
       </p:sp>
+      <p:sp>
+        <p:nvSpPr>
+          <p:cNvPr id="5" name="Slide Number Placeholder 4"/>
+          <p:cNvSpPr>
+            <a:spLocks noGrp="1"/>
+          </p:cNvSpPr>
+          <p:nvPr>
+            <p:ph type="sldNum" sz="quarter" idx="12"/>
+          </p:nvPr>
+        </p:nvSpPr>
+        <p:spPr/>
+        <p:txBody>
+          <a:bodyPr/>
+          <a:lstStyle/>
+          <a:p>
+            <a:fld id="{CA586AD6-E5F2-4F25-940D-C674496063E2}" type="slidenum">
+              <a:rPr lang="en-US" smtClean="0"/>
+              <a:t>5</a:t>
+            </a:fld>
+            <a:endParaRPr lang="en-US"/>
+          </a:p>
+        </p:txBody>
+      </p:sp>
     </p:spTree>
     <p:extLst>
       <p:ext uri="{BB962C8B-B14F-4D97-AF65-F5344CB8AC3E}">
@@ -4083,9 +5036,80 @@
   <p:timing>
     <p:tnLst>
       <p:par>
-        <p:cTn id="1" dur="indefinite" restart="never" nodeType="tmRoot"/>
+        <p:cTn id="1" dur="indefinite" restart="never" nodeType="tmRoot">
+          <p:childTnLst>
+            <p:seq concurrent="1" nextAc="seek">
+              <p:cTn id="2" dur="indefinite" nodeType="mainSeq">
+                <p:childTnLst>
+                  <p:par>
+                    <p:cTn id="3" fill="hold">
+                      <p:stCondLst>
+                        <p:cond delay="indefinite"/>
+                      </p:stCondLst>
+                      <p:childTnLst>
+                        <p:par>
+                          <p:cTn id="4" fill="hold">
+                            <p:stCondLst>
+                              <p:cond delay="0"/>
+                            </p:stCondLst>
+                            <p:childTnLst>
+                              <p:par>
+                                <p:cTn id="5" presetID="1" presetClass="entr" presetSubtype="0" fill="hold" grpId="0" nodeType="clickEffect">
+                                  <p:stCondLst>
+                                    <p:cond delay="0"/>
+                                  </p:stCondLst>
+                                  <p:childTnLst>
+                                    <p:set>
+                                      <p:cBhvr>
+                                        <p:cTn id="6" dur="1" fill="hold">
+                                          <p:stCondLst>
+                                            <p:cond delay="0"/>
+                                          </p:stCondLst>
+                                        </p:cTn>
+                                        <p:tgtEl>
+                                          <p:spTgt spid="4"/>
+                                        </p:tgtEl>
+                                        <p:attrNameLst>
+                                          <p:attrName>style.visibility</p:attrName>
+                                        </p:attrNameLst>
+                                      </p:cBhvr>
+                                      <p:to>
+                                        <p:strVal val="visible"/>
+                                      </p:to>
+                                    </p:set>
+                                  </p:childTnLst>
+                                </p:cTn>
+                              </p:par>
+                            </p:childTnLst>
+                          </p:cTn>
+                        </p:par>
+                      </p:childTnLst>
+                    </p:cTn>
+                  </p:par>
+                </p:childTnLst>
+              </p:cTn>
+              <p:prevCondLst>
+                <p:cond evt="onPrev" delay="0">
+                  <p:tgtEl>
+                    <p:sldTgt/>
+                  </p:tgtEl>
+                </p:cond>
+              </p:prevCondLst>
+              <p:nextCondLst>
+                <p:cond evt="onNext" delay="0">
+                  <p:tgtEl>
+                    <p:sldTgt/>
+                  </p:tgtEl>
+                </p:cond>
+              </p:nextCondLst>
+            </p:seq>
+          </p:childTnLst>
+        </p:cTn>
       </p:par>
     </p:tnLst>
+    <p:bldLst>
+      <p:bldP spid="4" grpId="0" animBg="1"/>
+    </p:bldLst>
   </p:timing>
 </p:sld>
 </file>
@@ -4124,6 +5148,2500 @@
           <a:p>
             <a:r>
               <a:rPr lang="en-US" dirty="0" smtClean="0"/>
+              <a:t>Sequences</a:t>
+            </a:r>
+            <a:endParaRPr lang="en-US" dirty="0"/>
+          </a:p>
+        </p:txBody>
+      </p:sp>
+      <p:sp>
+        <p:nvSpPr>
+          <p:cNvPr id="3" name="Content Placeholder 2"/>
+          <p:cNvSpPr>
+            <a:spLocks noGrp="1"/>
+          </p:cNvSpPr>
+          <p:nvPr>
+            <p:ph idx="1"/>
+          </p:nvPr>
+        </p:nvSpPr>
+        <p:spPr>
+          <a:xfrm>
+            <a:off x="628650" y="1864807"/>
+            <a:ext cx="7886700" cy="4351338"/>
+          </a:xfrm>
+        </p:spPr>
+        <p:txBody>
+          <a:bodyPr>
+            <a:normAutofit fontScale="92500" lnSpcReduction="20000"/>
+          </a:bodyPr>
+          <a:lstStyle/>
+          <a:p>
+            <a:r>
+              <a:rPr lang="en-US" dirty="0" smtClean="0"/>
+              <a:t>Sequence has</a:t>
+            </a:r>
+          </a:p>
+          <a:p>
+            <a:pPr lvl="1"/>
+            <a:r>
+              <a:rPr lang="en-US" dirty="0" smtClean="0"/>
+              <a:t>contents</a:t>
+            </a:r>
+          </a:p>
+          <a:p>
+            <a:pPr lvl="1"/>
+            <a:r>
+              <a:rPr lang="en-US" dirty="0" smtClean="0"/>
+              <a:t>alphabet</a:t>
+            </a:r>
+          </a:p>
+          <a:p>
+            <a:r>
+              <a:rPr lang="en-US" dirty="0" smtClean="0"/>
+              <a:t>Create new sequence</a:t>
+            </a:r>
+          </a:p>
+          <a:p>
+            <a:endParaRPr lang="en-US" dirty="0"/>
+          </a:p>
+          <a:p>
+            <a:endParaRPr lang="en-US" dirty="0" smtClean="0"/>
+          </a:p>
+          <a:p>
+            <a:endParaRPr lang="en-US" dirty="0"/>
+          </a:p>
+          <a:p>
+            <a:r>
+              <a:rPr lang="en-US" dirty="0" smtClean="0"/>
+              <a:t>Contains subsequence?</a:t>
+            </a:r>
+          </a:p>
+          <a:p>
+            <a:endParaRPr lang="en-US" dirty="0" smtClean="0"/>
+          </a:p>
+          <a:p>
+            <a:endParaRPr lang="en-US" dirty="0"/>
+          </a:p>
+          <a:p>
+            <a:r>
+              <a:rPr lang="en-US" dirty="0" smtClean="0"/>
+              <a:t>Count subsequences</a:t>
+            </a:r>
+            <a:endParaRPr lang="en-US" dirty="0"/>
+          </a:p>
+        </p:txBody>
+      </p:sp>
+      <p:sp>
+        <p:nvSpPr>
+          <p:cNvPr id="4" name="TextBox 3"/>
+          <p:cNvSpPr txBox="1"/>
+          <p:nvPr/>
+        </p:nvSpPr>
+        <p:spPr>
+          <a:xfrm>
+            <a:off x="990600" y="3193461"/>
+            <a:ext cx="7353295" cy="1200329"/>
+          </a:xfrm>
+          <a:prstGeom prst="rect">
+            <a:avLst/>
+          </a:prstGeom>
+          <a:solidFill>
+            <a:schemeClr val="bg1">
+              <a:lumMod val="75000"/>
+            </a:schemeClr>
+          </a:solidFill>
+          <a:ln>
+            <a:solidFill>
+              <a:schemeClr val="tx1"/>
+            </a:solidFill>
+          </a:ln>
+        </p:spPr>
+        <p:txBody>
+          <a:bodyPr wrap="none" rtlCol="0">
+            <a:spAutoFit/>
+          </a:bodyPr>
+          <a:lstStyle/>
+          <a:p>
+            <a:r>
+              <a:rPr lang="en-US" dirty="0" smtClean="0">
+                <a:latin typeface="Courier New" panose="02070309020205020404" pitchFamily="49" charset="0"/>
+                <a:cs typeface="Courier New" panose="02070309020205020404" pitchFamily="49" charset="0"/>
+              </a:rPr>
+              <a:t>from </a:t>
+            </a:r>
+            <a:r>
+              <a:rPr lang="en-US" dirty="0" err="1" smtClean="0">
+                <a:latin typeface="Courier New" panose="02070309020205020404" pitchFamily="49" charset="0"/>
+                <a:cs typeface="Courier New" panose="02070309020205020404" pitchFamily="49" charset="0"/>
+              </a:rPr>
+              <a:t>Bio.Seq</a:t>
+            </a:r>
+            <a:r>
+              <a:rPr lang="en-US" dirty="0" smtClean="0">
+                <a:latin typeface="Courier New" panose="02070309020205020404" pitchFamily="49" charset="0"/>
+                <a:cs typeface="Courier New" panose="02070309020205020404" pitchFamily="49" charset="0"/>
+              </a:rPr>
+              <a:t> import </a:t>
+            </a:r>
+            <a:r>
+              <a:rPr lang="en-US" dirty="0" err="1" smtClean="0">
+                <a:latin typeface="Courier New" panose="02070309020205020404" pitchFamily="49" charset="0"/>
+                <a:cs typeface="Courier New" panose="02070309020205020404" pitchFamily="49" charset="0"/>
+              </a:rPr>
+              <a:t>Seq</a:t>
+            </a:r>
+            <a:endParaRPr lang="en-US" dirty="0" smtClean="0">
+              <a:latin typeface="Courier New" panose="02070309020205020404" pitchFamily="49" charset="0"/>
+              <a:cs typeface="Courier New" panose="02070309020205020404" pitchFamily="49" charset="0"/>
+            </a:endParaRPr>
+          </a:p>
+          <a:p>
+            <a:r>
+              <a:rPr lang="en-US" dirty="0" smtClean="0">
+                <a:latin typeface="Courier New" panose="02070309020205020404" pitchFamily="49" charset="0"/>
+                <a:cs typeface="Courier New" panose="02070309020205020404" pitchFamily="49" charset="0"/>
+              </a:rPr>
+              <a:t>…</a:t>
+            </a:r>
+          </a:p>
+          <a:p>
+            <a:r>
+              <a:rPr lang="en-US" dirty="0" err="1" smtClean="0">
+                <a:latin typeface="Courier New" panose="02070309020205020404" pitchFamily="49" charset="0"/>
+                <a:cs typeface="Courier New" panose="02070309020205020404" pitchFamily="49" charset="0"/>
+              </a:rPr>
+              <a:t>seq</a:t>
+            </a:r>
+            <a:r>
+              <a:rPr lang="en-US" dirty="0" smtClean="0">
+                <a:latin typeface="Courier New" panose="02070309020205020404" pitchFamily="49" charset="0"/>
+                <a:cs typeface="Courier New" panose="02070309020205020404" pitchFamily="49" charset="0"/>
+              </a:rPr>
+              <a:t> = </a:t>
+            </a:r>
+            <a:r>
+              <a:rPr lang="en-US" dirty="0" err="1" smtClean="0">
+                <a:latin typeface="Courier New" panose="02070309020205020404" pitchFamily="49" charset="0"/>
+                <a:cs typeface="Courier New" panose="02070309020205020404" pitchFamily="49" charset="0"/>
+              </a:rPr>
+              <a:t>Seq</a:t>
+            </a:r>
+            <a:r>
+              <a:rPr lang="en-US" dirty="0" smtClean="0">
+                <a:latin typeface="Courier New" panose="02070309020205020404" pitchFamily="49" charset="0"/>
+                <a:cs typeface="Courier New" panose="02070309020205020404" pitchFamily="49" charset="0"/>
+              </a:rPr>
+              <a:t>('AAGCTTCAAAG', </a:t>
+            </a:r>
+            <a:r>
+              <a:rPr lang="en-US" dirty="0" err="1" smtClean="0">
+                <a:latin typeface="Courier New" panose="02070309020205020404" pitchFamily="49" charset="0"/>
+                <a:cs typeface="Courier New" panose="02070309020205020404" pitchFamily="49" charset="0"/>
+              </a:rPr>
+              <a:t>Bio.Alphabet.DNAAlphabet</a:t>
+            </a:r>
+            <a:r>
+              <a:rPr lang="en-US" dirty="0" smtClean="0">
+                <a:latin typeface="Courier New" panose="02070309020205020404" pitchFamily="49" charset="0"/>
+                <a:cs typeface="Courier New" panose="02070309020205020404" pitchFamily="49" charset="0"/>
+              </a:rPr>
+              <a:t>())</a:t>
+            </a:r>
+          </a:p>
+          <a:p>
+            <a:r>
+              <a:rPr lang="en-US" dirty="0" smtClean="0">
+                <a:latin typeface="Courier New" panose="02070309020205020404" pitchFamily="49" charset="0"/>
+                <a:cs typeface="Courier New" panose="02070309020205020404" pitchFamily="49" charset="0"/>
+              </a:rPr>
+              <a:t>…</a:t>
+            </a:r>
+            <a:endParaRPr lang="en-US" dirty="0">
+              <a:latin typeface="Courier New" panose="02070309020205020404" pitchFamily="49" charset="0"/>
+              <a:cs typeface="Courier New" panose="02070309020205020404" pitchFamily="49" charset="0"/>
+            </a:endParaRPr>
+          </a:p>
+        </p:txBody>
+      </p:sp>
+      <p:sp>
+        <p:nvSpPr>
+          <p:cNvPr id="5" name="TextBox 4"/>
+          <p:cNvSpPr txBox="1"/>
+          <p:nvPr/>
+        </p:nvSpPr>
+        <p:spPr>
+          <a:xfrm>
+            <a:off x="997526" y="4821369"/>
+            <a:ext cx="3210622" cy="646331"/>
+          </a:xfrm>
+          <a:prstGeom prst="rect">
+            <a:avLst/>
+          </a:prstGeom>
+          <a:solidFill>
+            <a:schemeClr val="bg1">
+              <a:lumMod val="75000"/>
+            </a:schemeClr>
+          </a:solidFill>
+          <a:ln>
+            <a:solidFill>
+              <a:schemeClr val="tx1"/>
+            </a:solidFill>
+          </a:ln>
+        </p:spPr>
+        <p:txBody>
+          <a:bodyPr wrap="square" rtlCol="0">
+            <a:spAutoFit/>
+          </a:bodyPr>
+          <a:lstStyle/>
+          <a:p>
+            <a:r>
+              <a:rPr lang="en-US" dirty="0" smtClean="0">
+                <a:latin typeface="Courier New" panose="02070309020205020404" pitchFamily="49" charset="0"/>
+                <a:cs typeface="Courier New" panose="02070309020205020404" pitchFamily="49" charset="0"/>
+              </a:rPr>
+              <a:t>if 'GCT' in </a:t>
+            </a:r>
+            <a:r>
+              <a:rPr lang="en-US" dirty="0" err="1" smtClean="0">
+                <a:latin typeface="Courier New" panose="02070309020205020404" pitchFamily="49" charset="0"/>
+                <a:cs typeface="Courier New" panose="02070309020205020404" pitchFamily="49" charset="0"/>
+              </a:rPr>
+              <a:t>seq</a:t>
+            </a:r>
+            <a:r>
+              <a:rPr lang="en-US" dirty="0" smtClean="0">
+                <a:latin typeface="Courier New" panose="02070309020205020404" pitchFamily="49" charset="0"/>
+                <a:cs typeface="Courier New" panose="02070309020205020404" pitchFamily="49" charset="0"/>
+              </a:rPr>
+              <a:t>:</a:t>
+            </a:r>
+          </a:p>
+          <a:p>
+            <a:r>
+              <a:rPr lang="en-US" dirty="0">
+                <a:latin typeface="Courier New" panose="02070309020205020404" pitchFamily="49" charset="0"/>
+                <a:cs typeface="Courier New" panose="02070309020205020404" pitchFamily="49" charset="0"/>
+              </a:rPr>
+              <a:t> </a:t>
+            </a:r>
+            <a:r>
+              <a:rPr lang="en-US" dirty="0" smtClean="0">
+                <a:latin typeface="Courier New" panose="02070309020205020404" pitchFamily="49" charset="0"/>
+                <a:cs typeface="Courier New" panose="02070309020205020404" pitchFamily="49" charset="0"/>
+              </a:rPr>
+              <a:t>   …</a:t>
+            </a:r>
+            <a:endParaRPr lang="en-US" dirty="0">
+              <a:latin typeface="Courier New" panose="02070309020205020404" pitchFamily="49" charset="0"/>
+              <a:cs typeface="Courier New" panose="02070309020205020404" pitchFamily="49" charset="0"/>
+            </a:endParaRPr>
+          </a:p>
+        </p:txBody>
+      </p:sp>
+      <p:sp>
+        <p:nvSpPr>
+          <p:cNvPr id="6" name="TextBox 5"/>
+          <p:cNvSpPr txBox="1"/>
+          <p:nvPr/>
+        </p:nvSpPr>
+        <p:spPr>
+          <a:xfrm>
+            <a:off x="990600" y="6031479"/>
+            <a:ext cx="3217547" cy="369332"/>
+          </a:xfrm>
+          <a:prstGeom prst="rect">
+            <a:avLst/>
+          </a:prstGeom>
+          <a:solidFill>
+            <a:schemeClr val="bg1">
+              <a:lumMod val="75000"/>
+            </a:schemeClr>
+          </a:solidFill>
+          <a:ln>
+            <a:solidFill>
+              <a:schemeClr val="tx1"/>
+            </a:solidFill>
+          </a:ln>
+        </p:spPr>
+        <p:txBody>
+          <a:bodyPr wrap="none" rtlCol="0">
+            <a:spAutoFit/>
+          </a:bodyPr>
+          <a:lstStyle/>
+          <a:p>
+            <a:r>
+              <a:rPr lang="en-US" dirty="0" smtClean="0">
+                <a:latin typeface="Courier New" panose="02070309020205020404" pitchFamily="49" charset="0"/>
+                <a:cs typeface="Courier New" panose="02070309020205020404" pitchFamily="49" charset="0"/>
+              </a:rPr>
+              <a:t>print(</a:t>
+            </a:r>
+            <a:r>
+              <a:rPr lang="en-US" dirty="0" err="1" smtClean="0">
+                <a:latin typeface="Courier New" panose="02070309020205020404" pitchFamily="49" charset="0"/>
+                <a:cs typeface="Courier New" panose="02070309020205020404" pitchFamily="49" charset="0"/>
+              </a:rPr>
+              <a:t>seq.count</a:t>
+            </a:r>
+            <a:r>
+              <a:rPr lang="en-US" dirty="0" smtClean="0">
+                <a:latin typeface="Courier New" panose="02070309020205020404" pitchFamily="49" charset="0"/>
+                <a:cs typeface="Courier New" panose="02070309020205020404" pitchFamily="49" charset="0"/>
+              </a:rPr>
+              <a:t>('AA'))</a:t>
+            </a:r>
+            <a:endParaRPr lang="en-US" dirty="0">
+              <a:latin typeface="Courier New" panose="02070309020205020404" pitchFamily="49" charset="0"/>
+              <a:cs typeface="Courier New" panose="02070309020205020404" pitchFamily="49" charset="0"/>
+            </a:endParaRPr>
+          </a:p>
+        </p:txBody>
+      </p:sp>
+      <p:grpSp>
+        <p:nvGrpSpPr>
+          <p:cNvPr id="12" name="Group 11"/>
+          <p:cNvGrpSpPr/>
+          <p:nvPr/>
+        </p:nvGrpSpPr>
+        <p:grpSpPr>
+          <a:xfrm>
+            <a:off x="4412342" y="6047507"/>
+            <a:ext cx="1043235" cy="369332"/>
+            <a:chOff x="4412342" y="6047507"/>
+            <a:chExt cx="1043235" cy="369332"/>
+          </a:xfrm>
+        </p:grpSpPr>
+        <p:sp>
+          <p:nvSpPr>
+            <p:cNvPr id="7" name="TextBox 6"/>
+            <p:cNvSpPr txBox="1"/>
+            <p:nvPr/>
+          </p:nvSpPr>
+          <p:spPr>
+            <a:xfrm>
+              <a:off x="5153891" y="6047507"/>
+              <a:ext cx="301686" cy="369332"/>
+            </a:xfrm>
+            <a:prstGeom prst="rect">
+              <a:avLst/>
+            </a:prstGeom>
+            <a:solidFill>
+              <a:schemeClr val="tx1"/>
+            </a:solidFill>
+          </p:spPr>
+          <p:txBody>
+            <a:bodyPr wrap="none" rtlCol="0">
+              <a:spAutoFit/>
+            </a:bodyPr>
+            <a:lstStyle/>
+            <a:p>
+              <a:r>
+                <a:rPr lang="en-US" b="1" dirty="0">
+                  <a:solidFill>
+                    <a:schemeClr val="bg1"/>
+                  </a:solidFill>
+                </a:rPr>
+                <a:t>2</a:t>
+              </a:r>
+            </a:p>
+          </p:txBody>
+        </p:sp>
+        <p:cxnSp>
+          <p:nvCxnSpPr>
+            <p:cNvPr id="11" name="Straight Connector 10"/>
+            <p:cNvCxnSpPr/>
+            <p:nvPr/>
+          </p:nvCxnSpPr>
+          <p:spPr>
+            <a:xfrm>
+              <a:off x="4412342" y="6238917"/>
+              <a:ext cx="551206" cy="10391"/>
+            </a:xfrm>
+            <a:prstGeom prst="line">
+              <a:avLst/>
+            </a:prstGeom>
+            <a:ln w="25400">
+              <a:solidFill>
+                <a:schemeClr val="tx1"/>
+              </a:solidFill>
+              <a:tailEnd type="stealth" w="lg" len="lg"/>
+            </a:ln>
+          </p:spPr>
+          <p:style>
+            <a:lnRef idx="1">
+              <a:schemeClr val="accent1"/>
+            </a:lnRef>
+            <a:fillRef idx="0">
+              <a:schemeClr val="accent1"/>
+            </a:fillRef>
+            <a:effectRef idx="0">
+              <a:schemeClr val="accent1"/>
+            </a:effectRef>
+            <a:fontRef idx="minor">
+              <a:schemeClr val="tx1"/>
+            </a:fontRef>
+          </p:style>
+        </p:cxnSp>
+      </p:grpSp>
+      <p:sp>
+        <p:nvSpPr>
+          <p:cNvPr id="13" name="Slide Number Placeholder 12"/>
+          <p:cNvSpPr>
+            <a:spLocks noGrp="1"/>
+          </p:cNvSpPr>
+          <p:nvPr>
+            <p:ph type="sldNum" sz="quarter" idx="12"/>
+          </p:nvPr>
+        </p:nvSpPr>
+        <p:spPr/>
+        <p:txBody>
+          <a:bodyPr/>
+          <a:lstStyle/>
+          <a:p>
+            <a:fld id="{CA586AD6-E5F2-4F25-940D-C674496063E2}" type="slidenum">
+              <a:rPr lang="en-US" smtClean="0"/>
+              <a:t>6</a:t>
+            </a:fld>
+            <a:endParaRPr lang="en-US"/>
+          </a:p>
+        </p:txBody>
+      </p:sp>
+      <p:sp>
+        <p:nvSpPr>
+          <p:cNvPr id="14" name="TextBox 13"/>
+          <p:cNvSpPr txBox="1"/>
+          <p:nvPr/>
+        </p:nvSpPr>
+        <p:spPr>
+          <a:xfrm>
+            <a:off x="6234545" y="5850079"/>
+            <a:ext cx="1286378" cy="646331"/>
+          </a:xfrm>
+          <a:prstGeom prst="rect">
+            <a:avLst/>
+          </a:prstGeom>
+          <a:noFill/>
+          <a:ln>
+            <a:solidFill>
+              <a:schemeClr val="tx1"/>
+            </a:solidFill>
+          </a:ln>
+        </p:spPr>
+        <p:txBody>
+          <a:bodyPr wrap="none" rtlCol="0">
+            <a:spAutoFit/>
+          </a:bodyPr>
+          <a:lstStyle/>
+          <a:p>
+            <a:r>
+              <a:rPr lang="en-US" dirty="0" smtClean="0"/>
+              <a:t>May be</a:t>
+            </a:r>
+          </a:p>
+          <a:p>
+            <a:r>
+              <a:rPr lang="en-US" dirty="0" smtClean="0"/>
+              <a:t>unexpected</a:t>
+            </a:r>
+            <a:endParaRPr lang="en-US" dirty="0"/>
+          </a:p>
+        </p:txBody>
+      </p:sp>
+    </p:spTree>
+    <p:extLst>
+      <p:ext uri="{BB962C8B-B14F-4D97-AF65-F5344CB8AC3E}">
+        <p14:creationId xmlns:p14="http://schemas.microsoft.com/office/powerpoint/2010/main" val="3577117719"/>
+      </p:ext>
+    </p:extLst>
+  </p:cSld>
+  <p:clrMapOvr>
+    <a:masterClrMapping/>
+  </p:clrMapOvr>
+  <p:timing>
+    <p:tnLst>
+      <p:par>
+        <p:cTn id="1" dur="indefinite" restart="never" nodeType="tmRoot">
+          <p:childTnLst>
+            <p:seq concurrent="1" nextAc="seek">
+              <p:cTn id="2" dur="indefinite" nodeType="mainSeq">
+                <p:childTnLst>
+                  <p:par>
+                    <p:cTn id="3" fill="hold">
+                      <p:stCondLst>
+                        <p:cond delay="indefinite"/>
+                      </p:stCondLst>
+                      <p:childTnLst>
+                        <p:par>
+                          <p:cTn id="4" fill="hold">
+                            <p:stCondLst>
+                              <p:cond delay="0"/>
+                            </p:stCondLst>
+                            <p:childTnLst>
+                              <p:par>
+                                <p:cTn id="5" presetID="1" presetClass="entr" presetSubtype="0" fill="hold" grpId="0" nodeType="clickEffect">
+                                  <p:stCondLst>
+                                    <p:cond delay="0"/>
+                                  </p:stCondLst>
+                                  <p:childTnLst>
+                                    <p:set>
+                                      <p:cBhvr>
+                                        <p:cTn id="6" dur="1" fill="hold">
+                                          <p:stCondLst>
+                                            <p:cond delay="0"/>
+                                          </p:stCondLst>
+                                        </p:cTn>
+                                        <p:tgtEl>
+                                          <p:spTgt spid="3">
+                                            <p:txEl>
+                                              <p:pRg st="0" end="0"/>
+                                            </p:txEl>
+                                          </p:spTgt>
+                                        </p:tgtEl>
+                                        <p:attrNameLst>
+                                          <p:attrName>style.visibility</p:attrName>
+                                        </p:attrNameLst>
+                                      </p:cBhvr>
+                                      <p:to>
+                                        <p:strVal val="visible"/>
+                                      </p:to>
+                                    </p:set>
+                                  </p:childTnLst>
+                                </p:cTn>
+                              </p:par>
+                              <p:par>
+                                <p:cTn id="7" presetID="1" presetClass="entr" presetSubtype="0" fill="hold" grpId="0" nodeType="withEffect">
+                                  <p:stCondLst>
+                                    <p:cond delay="0"/>
+                                  </p:stCondLst>
+                                  <p:childTnLst>
+                                    <p:set>
+                                      <p:cBhvr>
+                                        <p:cTn id="8" dur="1" fill="hold">
+                                          <p:stCondLst>
+                                            <p:cond delay="0"/>
+                                          </p:stCondLst>
+                                        </p:cTn>
+                                        <p:tgtEl>
+                                          <p:spTgt spid="3">
+                                            <p:txEl>
+                                              <p:pRg st="1" end="1"/>
+                                            </p:txEl>
+                                          </p:spTgt>
+                                        </p:tgtEl>
+                                        <p:attrNameLst>
+                                          <p:attrName>style.visibility</p:attrName>
+                                        </p:attrNameLst>
+                                      </p:cBhvr>
+                                      <p:to>
+                                        <p:strVal val="visible"/>
+                                      </p:to>
+                                    </p:set>
+                                  </p:childTnLst>
+                                </p:cTn>
+                              </p:par>
+                              <p:par>
+                                <p:cTn id="9" presetID="1" presetClass="entr" presetSubtype="0" fill="hold" grpId="0" nodeType="withEffect">
+                                  <p:stCondLst>
+                                    <p:cond delay="0"/>
+                                  </p:stCondLst>
+                                  <p:childTnLst>
+                                    <p:set>
+                                      <p:cBhvr>
+                                        <p:cTn id="10" dur="1" fill="hold">
+                                          <p:stCondLst>
+                                            <p:cond delay="0"/>
+                                          </p:stCondLst>
+                                        </p:cTn>
+                                        <p:tgtEl>
+                                          <p:spTgt spid="3">
+                                            <p:txEl>
+                                              <p:pRg st="2" end="2"/>
+                                            </p:txEl>
+                                          </p:spTgt>
+                                        </p:tgtEl>
+                                        <p:attrNameLst>
+                                          <p:attrName>style.visibility</p:attrName>
+                                        </p:attrNameLst>
+                                      </p:cBhvr>
+                                      <p:to>
+                                        <p:strVal val="visible"/>
+                                      </p:to>
+                                    </p:set>
+                                  </p:childTnLst>
+                                </p:cTn>
+                              </p:par>
+                            </p:childTnLst>
+                          </p:cTn>
+                        </p:par>
+                      </p:childTnLst>
+                    </p:cTn>
+                  </p:par>
+                  <p:par>
+                    <p:cTn id="11" fill="hold">
+                      <p:stCondLst>
+                        <p:cond delay="indefinite"/>
+                      </p:stCondLst>
+                      <p:childTnLst>
+                        <p:par>
+                          <p:cTn id="12" fill="hold">
+                            <p:stCondLst>
+                              <p:cond delay="0"/>
+                            </p:stCondLst>
+                            <p:childTnLst>
+                              <p:par>
+                                <p:cTn id="13" presetID="1" presetClass="entr" presetSubtype="0" fill="hold" grpId="0" nodeType="clickEffect">
+                                  <p:stCondLst>
+                                    <p:cond delay="0"/>
+                                  </p:stCondLst>
+                                  <p:childTnLst>
+                                    <p:set>
+                                      <p:cBhvr>
+                                        <p:cTn id="14" dur="1" fill="hold">
+                                          <p:stCondLst>
+                                            <p:cond delay="0"/>
+                                          </p:stCondLst>
+                                        </p:cTn>
+                                        <p:tgtEl>
+                                          <p:spTgt spid="3">
+                                            <p:txEl>
+                                              <p:pRg st="3" end="3"/>
+                                            </p:txEl>
+                                          </p:spTgt>
+                                        </p:tgtEl>
+                                        <p:attrNameLst>
+                                          <p:attrName>style.visibility</p:attrName>
+                                        </p:attrNameLst>
+                                      </p:cBhvr>
+                                      <p:to>
+                                        <p:strVal val="visible"/>
+                                      </p:to>
+                                    </p:set>
+                                  </p:childTnLst>
+                                </p:cTn>
+                              </p:par>
+                              <p:par>
+                                <p:cTn id="15" presetID="1" presetClass="entr" presetSubtype="0" fill="hold" grpId="0" nodeType="withEffect">
+                                  <p:stCondLst>
+                                    <p:cond delay="0"/>
+                                  </p:stCondLst>
+                                  <p:childTnLst>
+                                    <p:set>
+                                      <p:cBhvr>
+                                        <p:cTn id="16" dur="1" fill="hold">
+                                          <p:stCondLst>
+                                            <p:cond delay="0"/>
+                                          </p:stCondLst>
+                                        </p:cTn>
+                                        <p:tgtEl>
+                                          <p:spTgt spid="4"/>
+                                        </p:tgtEl>
+                                        <p:attrNameLst>
+                                          <p:attrName>style.visibility</p:attrName>
+                                        </p:attrNameLst>
+                                      </p:cBhvr>
+                                      <p:to>
+                                        <p:strVal val="visible"/>
+                                      </p:to>
+                                    </p:set>
+                                  </p:childTnLst>
+                                </p:cTn>
+                              </p:par>
+                            </p:childTnLst>
+                          </p:cTn>
+                        </p:par>
+                      </p:childTnLst>
+                    </p:cTn>
+                  </p:par>
+                  <p:par>
+                    <p:cTn id="17" fill="hold">
+                      <p:stCondLst>
+                        <p:cond delay="indefinite"/>
+                      </p:stCondLst>
+                      <p:childTnLst>
+                        <p:par>
+                          <p:cTn id="18" fill="hold">
+                            <p:stCondLst>
+                              <p:cond delay="0"/>
+                            </p:stCondLst>
+                            <p:childTnLst>
+                              <p:par>
+                                <p:cTn id="19" presetID="1" presetClass="entr" presetSubtype="0" fill="hold" grpId="0" nodeType="clickEffect">
+                                  <p:stCondLst>
+                                    <p:cond delay="0"/>
+                                  </p:stCondLst>
+                                  <p:childTnLst>
+                                    <p:set>
+                                      <p:cBhvr>
+                                        <p:cTn id="20" dur="1" fill="hold">
+                                          <p:stCondLst>
+                                            <p:cond delay="0"/>
+                                          </p:stCondLst>
+                                        </p:cTn>
+                                        <p:tgtEl>
+                                          <p:spTgt spid="3">
+                                            <p:txEl>
+                                              <p:pRg st="7" end="7"/>
+                                            </p:txEl>
+                                          </p:spTgt>
+                                        </p:tgtEl>
+                                        <p:attrNameLst>
+                                          <p:attrName>style.visibility</p:attrName>
+                                        </p:attrNameLst>
+                                      </p:cBhvr>
+                                      <p:to>
+                                        <p:strVal val="visible"/>
+                                      </p:to>
+                                    </p:set>
+                                  </p:childTnLst>
+                                </p:cTn>
+                              </p:par>
+                              <p:par>
+                                <p:cTn id="21" presetID="1" presetClass="entr" presetSubtype="0" fill="hold" grpId="0" nodeType="withEffect">
+                                  <p:stCondLst>
+                                    <p:cond delay="0"/>
+                                  </p:stCondLst>
+                                  <p:childTnLst>
+                                    <p:set>
+                                      <p:cBhvr>
+                                        <p:cTn id="22" dur="1" fill="hold">
+                                          <p:stCondLst>
+                                            <p:cond delay="0"/>
+                                          </p:stCondLst>
+                                        </p:cTn>
+                                        <p:tgtEl>
+                                          <p:spTgt spid="5"/>
+                                        </p:tgtEl>
+                                        <p:attrNameLst>
+                                          <p:attrName>style.visibility</p:attrName>
+                                        </p:attrNameLst>
+                                      </p:cBhvr>
+                                      <p:to>
+                                        <p:strVal val="visible"/>
+                                      </p:to>
+                                    </p:set>
+                                  </p:childTnLst>
+                                </p:cTn>
+                              </p:par>
+                            </p:childTnLst>
+                          </p:cTn>
+                        </p:par>
+                      </p:childTnLst>
+                    </p:cTn>
+                  </p:par>
+                  <p:par>
+                    <p:cTn id="23" fill="hold">
+                      <p:stCondLst>
+                        <p:cond delay="indefinite"/>
+                      </p:stCondLst>
+                      <p:childTnLst>
+                        <p:par>
+                          <p:cTn id="24" fill="hold">
+                            <p:stCondLst>
+                              <p:cond delay="0"/>
+                            </p:stCondLst>
+                            <p:childTnLst>
+                              <p:par>
+                                <p:cTn id="25" presetID="1" presetClass="entr" presetSubtype="0" fill="hold" grpId="0" nodeType="clickEffect">
+                                  <p:stCondLst>
+                                    <p:cond delay="0"/>
+                                  </p:stCondLst>
+                                  <p:childTnLst>
+                                    <p:set>
+                                      <p:cBhvr>
+                                        <p:cTn id="26" dur="1" fill="hold">
+                                          <p:stCondLst>
+                                            <p:cond delay="0"/>
+                                          </p:stCondLst>
+                                        </p:cTn>
+                                        <p:tgtEl>
+                                          <p:spTgt spid="3">
+                                            <p:txEl>
+                                              <p:pRg st="10" end="10"/>
+                                            </p:txEl>
+                                          </p:spTgt>
+                                        </p:tgtEl>
+                                        <p:attrNameLst>
+                                          <p:attrName>style.visibility</p:attrName>
+                                        </p:attrNameLst>
+                                      </p:cBhvr>
+                                      <p:to>
+                                        <p:strVal val="visible"/>
+                                      </p:to>
+                                    </p:set>
+                                  </p:childTnLst>
+                                </p:cTn>
+                              </p:par>
+                              <p:par>
+                                <p:cTn id="27" presetID="1" presetClass="entr" presetSubtype="0" fill="hold" grpId="0" nodeType="withEffect">
+                                  <p:stCondLst>
+                                    <p:cond delay="0"/>
+                                  </p:stCondLst>
+                                  <p:childTnLst>
+                                    <p:set>
+                                      <p:cBhvr>
+                                        <p:cTn id="28" dur="1" fill="hold">
+                                          <p:stCondLst>
+                                            <p:cond delay="0"/>
+                                          </p:stCondLst>
+                                        </p:cTn>
+                                        <p:tgtEl>
+                                          <p:spTgt spid="6"/>
+                                        </p:tgtEl>
+                                        <p:attrNameLst>
+                                          <p:attrName>style.visibility</p:attrName>
+                                        </p:attrNameLst>
+                                      </p:cBhvr>
+                                      <p:to>
+                                        <p:strVal val="visible"/>
+                                      </p:to>
+                                    </p:set>
+                                  </p:childTnLst>
+                                </p:cTn>
+                              </p:par>
+                            </p:childTnLst>
+                          </p:cTn>
+                        </p:par>
+                      </p:childTnLst>
+                    </p:cTn>
+                  </p:par>
+                  <p:par>
+                    <p:cTn id="29" fill="hold">
+                      <p:stCondLst>
+                        <p:cond delay="indefinite"/>
+                      </p:stCondLst>
+                      <p:childTnLst>
+                        <p:par>
+                          <p:cTn id="30" fill="hold">
+                            <p:stCondLst>
+                              <p:cond delay="0"/>
+                            </p:stCondLst>
+                            <p:childTnLst>
+                              <p:par>
+                                <p:cTn id="31" presetID="1" presetClass="entr" presetSubtype="0" fill="hold" nodeType="clickEffect">
+                                  <p:stCondLst>
+                                    <p:cond delay="0"/>
+                                  </p:stCondLst>
+                                  <p:childTnLst>
+                                    <p:set>
+                                      <p:cBhvr>
+                                        <p:cTn id="32" dur="1" fill="hold">
+                                          <p:stCondLst>
+                                            <p:cond delay="0"/>
+                                          </p:stCondLst>
+                                        </p:cTn>
+                                        <p:tgtEl>
+                                          <p:spTgt spid="12"/>
+                                        </p:tgtEl>
+                                        <p:attrNameLst>
+                                          <p:attrName>style.visibility</p:attrName>
+                                        </p:attrNameLst>
+                                      </p:cBhvr>
+                                      <p:to>
+                                        <p:strVal val="visible"/>
+                                      </p:to>
+                                    </p:set>
+                                  </p:childTnLst>
+                                </p:cTn>
+                              </p:par>
+                            </p:childTnLst>
+                          </p:cTn>
+                        </p:par>
+                      </p:childTnLst>
+                    </p:cTn>
+                  </p:par>
+                  <p:par>
+                    <p:cTn id="33" fill="hold">
+                      <p:stCondLst>
+                        <p:cond delay="indefinite"/>
+                      </p:stCondLst>
+                      <p:childTnLst>
+                        <p:par>
+                          <p:cTn id="34" fill="hold">
+                            <p:stCondLst>
+                              <p:cond delay="0"/>
+                            </p:stCondLst>
+                            <p:childTnLst>
+                              <p:par>
+                                <p:cTn id="35" presetID="1" presetClass="entr" presetSubtype="0" fill="hold" grpId="0" nodeType="clickEffect">
+                                  <p:stCondLst>
+                                    <p:cond delay="0"/>
+                                  </p:stCondLst>
+                                  <p:childTnLst>
+                                    <p:set>
+                                      <p:cBhvr>
+                                        <p:cTn id="36" dur="1" fill="hold">
+                                          <p:stCondLst>
+                                            <p:cond delay="0"/>
+                                          </p:stCondLst>
+                                        </p:cTn>
+                                        <p:tgtEl>
+                                          <p:spTgt spid="14"/>
+                                        </p:tgtEl>
+                                        <p:attrNameLst>
+                                          <p:attrName>style.visibility</p:attrName>
+                                        </p:attrNameLst>
+                                      </p:cBhvr>
+                                      <p:to>
+                                        <p:strVal val="visible"/>
+                                      </p:to>
+                                    </p:set>
+                                  </p:childTnLst>
+                                </p:cTn>
+                              </p:par>
+                            </p:childTnLst>
+                          </p:cTn>
+                        </p:par>
+                      </p:childTnLst>
+                    </p:cTn>
+                  </p:par>
+                </p:childTnLst>
+              </p:cTn>
+              <p:prevCondLst>
+                <p:cond evt="onPrev" delay="0">
+                  <p:tgtEl>
+                    <p:sldTgt/>
+                  </p:tgtEl>
+                </p:cond>
+              </p:prevCondLst>
+              <p:nextCondLst>
+                <p:cond evt="onNext" delay="0">
+                  <p:tgtEl>
+                    <p:sldTgt/>
+                  </p:tgtEl>
+                </p:cond>
+              </p:nextCondLst>
+            </p:seq>
+          </p:childTnLst>
+        </p:cTn>
+      </p:par>
+    </p:tnLst>
+    <p:bldLst>
+      <p:bldP spid="3" grpId="0" uiExpand="1" build="p"/>
+      <p:bldP spid="4" grpId="0" animBg="1"/>
+      <p:bldP spid="5" grpId="0" animBg="1"/>
+      <p:bldP spid="6" grpId="0" animBg="1"/>
+      <p:bldP spid="14" grpId="0" animBg="1"/>
+    </p:bldLst>
+  </p:timing>
+</p:sld>
+</file>
+
+<file path=ppt/slides/slide7.xml><?xml version="1.0" encoding="utf-8"?>
+<p:sld xmlns:a="http://schemas.openxmlformats.org/drawingml/2006/main" xmlns:r="http://schemas.openxmlformats.org/officeDocument/2006/relationships" xmlns:p="http://schemas.openxmlformats.org/presentationml/2006/main">
+  <p:cSld>
+    <p:spTree>
+      <p:nvGrpSpPr>
+        <p:cNvPr id="1" name=""/>
+        <p:cNvGrpSpPr/>
+        <p:nvPr/>
+      </p:nvGrpSpPr>
+      <p:grpSpPr>
+        <a:xfrm>
+          <a:off x="0" y="0"/>
+          <a:ext cx="0" cy="0"/>
+          <a:chOff x="0" y="0"/>
+          <a:chExt cx="0" cy="0"/>
+        </a:xfrm>
+      </p:grpSpPr>
+      <p:sp>
+        <p:nvSpPr>
+          <p:cNvPr id="2" name="Title 1"/>
+          <p:cNvSpPr>
+            <a:spLocks noGrp="1"/>
+          </p:cNvSpPr>
+          <p:nvPr>
+            <p:ph type="title"/>
+          </p:nvPr>
+        </p:nvSpPr>
+        <p:spPr/>
+        <p:txBody>
+          <a:bodyPr/>
+          <a:lstStyle/>
+          <a:p>
+            <a:r>
+              <a:rPr lang="en-US" dirty="0" smtClean="0"/>
+              <a:t>Sequences</a:t>
+            </a:r>
+            <a:endParaRPr lang="en-US" dirty="0"/>
+          </a:p>
+        </p:txBody>
+      </p:sp>
+      <p:sp>
+        <p:nvSpPr>
+          <p:cNvPr id="3" name="Content Placeholder 2"/>
+          <p:cNvSpPr>
+            <a:spLocks noGrp="1"/>
+          </p:cNvSpPr>
+          <p:nvPr>
+            <p:ph idx="1"/>
+          </p:nvPr>
+        </p:nvSpPr>
+        <p:spPr/>
+        <p:txBody>
+          <a:bodyPr/>
+          <a:lstStyle/>
+          <a:p>
+            <a:r>
+              <a:rPr lang="en-US" dirty="0" smtClean="0"/>
+              <a:t>Complement</a:t>
+            </a:r>
+          </a:p>
+          <a:p>
+            <a:endParaRPr lang="en-US" dirty="0"/>
+          </a:p>
+          <a:p>
+            <a:r>
+              <a:rPr lang="en-US" dirty="0" smtClean="0"/>
+              <a:t>Length</a:t>
+            </a:r>
+          </a:p>
+          <a:p>
+            <a:endParaRPr lang="en-US" dirty="0"/>
+          </a:p>
+          <a:p>
+            <a:r>
+              <a:rPr lang="en-US" dirty="0" smtClean="0"/>
+              <a:t>Transcribe</a:t>
+            </a:r>
+          </a:p>
+          <a:p>
+            <a:endParaRPr lang="en-US" dirty="0"/>
+          </a:p>
+          <a:p>
+            <a:r>
+              <a:rPr lang="en-US" dirty="0" smtClean="0"/>
+              <a:t>Translate</a:t>
+            </a:r>
+            <a:endParaRPr lang="en-US" dirty="0"/>
+          </a:p>
+        </p:txBody>
+      </p:sp>
+      <p:sp>
+        <p:nvSpPr>
+          <p:cNvPr id="4" name="TextBox 3"/>
+          <p:cNvSpPr txBox="1"/>
+          <p:nvPr/>
+        </p:nvSpPr>
+        <p:spPr>
+          <a:xfrm>
+            <a:off x="1004452" y="2324087"/>
+            <a:ext cx="3602014" cy="369332"/>
+          </a:xfrm>
+          <a:prstGeom prst="rect">
+            <a:avLst/>
+          </a:prstGeom>
+          <a:solidFill>
+            <a:schemeClr val="bg1">
+              <a:lumMod val="75000"/>
+            </a:schemeClr>
+          </a:solidFill>
+          <a:ln>
+            <a:solidFill>
+              <a:schemeClr val="tx1"/>
+            </a:solidFill>
+          </a:ln>
+        </p:spPr>
+        <p:txBody>
+          <a:bodyPr wrap="square" rtlCol="0">
+            <a:spAutoFit/>
+          </a:bodyPr>
+          <a:lstStyle/>
+          <a:p>
+            <a:r>
+              <a:rPr lang="en-US" dirty="0" smtClean="0">
+                <a:latin typeface="Courier New" panose="02070309020205020404" pitchFamily="49" charset="0"/>
+                <a:cs typeface="Courier New" panose="02070309020205020404" pitchFamily="49" charset="0"/>
+              </a:rPr>
+              <a:t>print(</a:t>
+            </a:r>
+            <a:r>
+              <a:rPr lang="en-US" dirty="0" err="1" smtClean="0">
+                <a:latin typeface="Courier New" panose="02070309020205020404" pitchFamily="49" charset="0"/>
+                <a:cs typeface="Courier New" panose="02070309020205020404" pitchFamily="49" charset="0"/>
+              </a:rPr>
+              <a:t>seq.complement</a:t>
+            </a:r>
+            <a:r>
+              <a:rPr lang="en-US" dirty="0" smtClean="0">
+                <a:latin typeface="Courier New" panose="02070309020205020404" pitchFamily="49" charset="0"/>
+                <a:cs typeface="Courier New" panose="02070309020205020404" pitchFamily="49" charset="0"/>
+              </a:rPr>
+              <a:t>())</a:t>
+            </a:r>
+            <a:endParaRPr lang="en-US" dirty="0">
+              <a:latin typeface="Courier New" panose="02070309020205020404" pitchFamily="49" charset="0"/>
+              <a:cs typeface="Courier New" panose="02070309020205020404" pitchFamily="49" charset="0"/>
+            </a:endParaRPr>
+          </a:p>
+        </p:txBody>
+      </p:sp>
+      <p:grpSp>
+        <p:nvGrpSpPr>
+          <p:cNvPr id="5" name="Group 4"/>
+          <p:cNvGrpSpPr/>
+          <p:nvPr/>
+        </p:nvGrpSpPr>
+        <p:grpSpPr>
+          <a:xfrm>
+            <a:off x="4796809" y="2337950"/>
+            <a:ext cx="2528784" cy="369332"/>
+            <a:chOff x="4412342" y="6047507"/>
+            <a:chExt cx="2528784" cy="369332"/>
+          </a:xfrm>
+        </p:grpSpPr>
+        <p:sp>
+          <p:nvSpPr>
+            <p:cNvPr id="6" name="TextBox 5"/>
+            <p:cNvSpPr txBox="1"/>
+            <p:nvPr/>
+          </p:nvSpPr>
+          <p:spPr>
+            <a:xfrm>
+              <a:off x="5153891" y="6047507"/>
+              <a:ext cx="1787235" cy="369332"/>
+            </a:xfrm>
+            <a:prstGeom prst="rect">
+              <a:avLst/>
+            </a:prstGeom>
+            <a:solidFill>
+              <a:schemeClr val="tx1"/>
+            </a:solidFill>
+          </p:spPr>
+          <p:txBody>
+            <a:bodyPr wrap="square" rtlCol="0">
+              <a:spAutoFit/>
+            </a:bodyPr>
+            <a:lstStyle/>
+            <a:p>
+              <a:r>
+                <a:rPr lang="en-US" b="1" dirty="0">
+                  <a:solidFill>
+                    <a:schemeClr val="bg1"/>
+                  </a:solidFill>
+                </a:rPr>
+                <a:t>TTCGAAGTTTC </a:t>
+              </a:r>
+            </a:p>
+          </p:txBody>
+        </p:sp>
+        <p:cxnSp>
+          <p:nvCxnSpPr>
+            <p:cNvPr id="7" name="Straight Connector 6"/>
+            <p:cNvCxnSpPr/>
+            <p:nvPr/>
+          </p:nvCxnSpPr>
+          <p:spPr>
+            <a:xfrm>
+              <a:off x="4412342" y="6238917"/>
+              <a:ext cx="551206" cy="10391"/>
+            </a:xfrm>
+            <a:prstGeom prst="line">
+              <a:avLst/>
+            </a:prstGeom>
+            <a:ln w="25400">
+              <a:solidFill>
+                <a:schemeClr val="tx1"/>
+              </a:solidFill>
+              <a:tailEnd type="stealth" w="lg" len="lg"/>
+            </a:ln>
+          </p:spPr>
+          <p:style>
+            <a:lnRef idx="1">
+              <a:schemeClr val="accent1"/>
+            </a:lnRef>
+            <a:fillRef idx="0">
+              <a:schemeClr val="accent1"/>
+            </a:fillRef>
+            <a:effectRef idx="0">
+              <a:schemeClr val="accent1"/>
+            </a:effectRef>
+            <a:fontRef idx="minor">
+              <a:schemeClr val="tx1"/>
+            </a:fontRef>
+          </p:style>
+        </p:cxnSp>
+      </p:grpSp>
+      <p:sp>
+        <p:nvSpPr>
+          <p:cNvPr id="8" name="TextBox 7"/>
+          <p:cNvSpPr txBox="1"/>
+          <p:nvPr/>
+        </p:nvSpPr>
+        <p:spPr>
+          <a:xfrm>
+            <a:off x="1004452" y="3370107"/>
+            <a:ext cx="3602014" cy="369332"/>
+          </a:xfrm>
+          <a:prstGeom prst="rect">
+            <a:avLst/>
+          </a:prstGeom>
+          <a:solidFill>
+            <a:schemeClr val="bg1">
+              <a:lumMod val="75000"/>
+            </a:schemeClr>
+          </a:solidFill>
+          <a:ln>
+            <a:solidFill>
+              <a:schemeClr val="tx1"/>
+            </a:solidFill>
+          </a:ln>
+        </p:spPr>
+        <p:txBody>
+          <a:bodyPr wrap="square" rtlCol="0">
+            <a:spAutoFit/>
+          </a:bodyPr>
+          <a:lstStyle/>
+          <a:p>
+            <a:r>
+              <a:rPr lang="en-US" dirty="0" smtClean="0">
+                <a:latin typeface="Courier New" panose="02070309020205020404" pitchFamily="49" charset="0"/>
+                <a:cs typeface="Courier New" panose="02070309020205020404" pitchFamily="49" charset="0"/>
+              </a:rPr>
+              <a:t>print(</a:t>
+            </a:r>
+            <a:r>
+              <a:rPr lang="en-US" dirty="0" err="1" smtClean="0">
+                <a:latin typeface="Courier New" panose="02070309020205020404" pitchFamily="49" charset="0"/>
+                <a:cs typeface="Courier New" panose="02070309020205020404" pitchFamily="49" charset="0"/>
+              </a:rPr>
+              <a:t>len</a:t>
+            </a:r>
+            <a:r>
+              <a:rPr lang="en-US" dirty="0" smtClean="0">
+                <a:latin typeface="Courier New" panose="02070309020205020404" pitchFamily="49" charset="0"/>
+                <a:cs typeface="Courier New" panose="02070309020205020404" pitchFamily="49" charset="0"/>
+              </a:rPr>
+              <a:t>(</a:t>
+            </a:r>
+            <a:r>
+              <a:rPr lang="en-US" dirty="0" err="1" smtClean="0">
+                <a:latin typeface="Courier New" panose="02070309020205020404" pitchFamily="49" charset="0"/>
+                <a:cs typeface="Courier New" panose="02070309020205020404" pitchFamily="49" charset="0"/>
+              </a:rPr>
+              <a:t>seq</a:t>
+            </a:r>
+            <a:r>
+              <a:rPr lang="en-US" dirty="0" smtClean="0">
+                <a:latin typeface="Courier New" panose="02070309020205020404" pitchFamily="49" charset="0"/>
+                <a:cs typeface="Courier New" panose="02070309020205020404" pitchFamily="49" charset="0"/>
+              </a:rPr>
+              <a:t>))</a:t>
+            </a:r>
+            <a:endParaRPr lang="en-US" dirty="0">
+              <a:latin typeface="Courier New" panose="02070309020205020404" pitchFamily="49" charset="0"/>
+              <a:cs typeface="Courier New" panose="02070309020205020404" pitchFamily="49" charset="0"/>
+            </a:endParaRPr>
+          </a:p>
+        </p:txBody>
+      </p:sp>
+      <p:grpSp>
+        <p:nvGrpSpPr>
+          <p:cNvPr id="9" name="Group 8"/>
+          <p:cNvGrpSpPr/>
+          <p:nvPr/>
+        </p:nvGrpSpPr>
+        <p:grpSpPr>
+          <a:xfrm>
+            <a:off x="4814126" y="3383970"/>
+            <a:ext cx="2511467" cy="369332"/>
+            <a:chOff x="4412342" y="6047507"/>
+            <a:chExt cx="2511467" cy="369332"/>
+          </a:xfrm>
+        </p:grpSpPr>
+        <p:sp>
+          <p:nvSpPr>
+            <p:cNvPr id="10" name="TextBox 9"/>
+            <p:cNvSpPr txBox="1"/>
+            <p:nvPr/>
+          </p:nvSpPr>
+          <p:spPr>
+            <a:xfrm>
+              <a:off x="5136574" y="6047507"/>
+              <a:ext cx="1787235" cy="369332"/>
+            </a:xfrm>
+            <a:prstGeom prst="rect">
+              <a:avLst/>
+            </a:prstGeom>
+            <a:solidFill>
+              <a:schemeClr val="tx1"/>
+            </a:solidFill>
+          </p:spPr>
+          <p:txBody>
+            <a:bodyPr wrap="square" rtlCol="0">
+              <a:spAutoFit/>
+            </a:bodyPr>
+            <a:lstStyle/>
+            <a:p>
+              <a:r>
+                <a:rPr lang="en-US" b="1" dirty="0" smtClean="0">
+                  <a:solidFill>
+                    <a:schemeClr val="bg1"/>
+                  </a:solidFill>
+                </a:rPr>
+                <a:t>11</a:t>
+              </a:r>
+              <a:endParaRPr lang="en-US" b="1" dirty="0">
+                <a:solidFill>
+                  <a:schemeClr val="bg1"/>
+                </a:solidFill>
+              </a:endParaRPr>
+            </a:p>
+          </p:txBody>
+        </p:sp>
+        <p:cxnSp>
+          <p:nvCxnSpPr>
+            <p:cNvPr id="11" name="Straight Connector 10"/>
+            <p:cNvCxnSpPr/>
+            <p:nvPr/>
+          </p:nvCxnSpPr>
+          <p:spPr>
+            <a:xfrm>
+              <a:off x="4412342" y="6238917"/>
+              <a:ext cx="551206" cy="10391"/>
+            </a:xfrm>
+            <a:prstGeom prst="line">
+              <a:avLst/>
+            </a:prstGeom>
+            <a:ln w="25400">
+              <a:solidFill>
+                <a:schemeClr val="tx1"/>
+              </a:solidFill>
+              <a:tailEnd type="stealth" w="lg" len="lg"/>
+            </a:ln>
+          </p:spPr>
+          <p:style>
+            <a:lnRef idx="1">
+              <a:schemeClr val="accent1"/>
+            </a:lnRef>
+            <a:fillRef idx="0">
+              <a:schemeClr val="accent1"/>
+            </a:fillRef>
+            <a:effectRef idx="0">
+              <a:schemeClr val="accent1"/>
+            </a:effectRef>
+            <a:fontRef idx="minor">
+              <a:schemeClr val="tx1"/>
+            </a:fontRef>
+          </p:style>
+        </p:cxnSp>
+      </p:grpSp>
+      <p:sp>
+        <p:nvSpPr>
+          <p:cNvPr id="12" name="TextBox 11"/>
+          <p:cNvSpPr txBox="1"/>
+          <p:nvPr/>
+        </p:nvSpPr>
+        <p:spPr>
+          <a:xfrm>
+            <a:off x="1004452" y="4369827"/>
+            <a:ext cx="3602014" cy="369332"/>
+          </a:xfrm>
+          <a:prstGeom prst="rect">
+            <a:avLst/>
+          </a:prstGeom>
+          <a:solidFill>
+            <a:schemeClr val="bg1">
+              <a:lumMod val="75000"/>
+            </a:schemeClr>
+          </a:solidFill>
+          <a:ln>
+            <a:solidFill>
+              <a:schemeClr val="tx1"/>
+            </a:solidFill>
+          </a:ln>
+        </p:spPr>
+        <p:txBody>
+          <a:bodyPr wrap="square" rtlCol="0">
+            <a:spAutoFit/>
+          </a:bodyPr>
+          <a:lstStyle/>
+          <a:p>
+            <a:r>
+              <a:rPr lang="en-US" dirty="0" smtClean="0">
+                <a:latin typeface="Courier New" panose="02070309020205020404" pitchFamily="49" charset="0"/>
+                <a:cs typeface="Courier New" panose="02070309020205020404" pitchFamily="49" charset="0"/>
+              </a:rPr>
+              <a:t>print(</a:t>
+            </a:r>
+            <a:r>
+              <a:rPr lang="en-US" dirty="0" err="1" smtClean="0">
+                <a:latin typeface="Courier New" panose="02070309020205020404" pitchFamily="49" charset="0"/>
+                <a:cs typeface="Courier New" panose="02070309020205020404" pitchFamily="49" charset="0"/>
+              </a:rPr>
+              <a:t>seq.transcribe</a:t>
+            </a:r>
+            <a:r>
+              <a:rPr lang="en-US" dirty="0" smtClean="0">
+                <a:latin typeface="Courier New" panose="02070309020205020404" pitchFamily="49" charset="0"/>
+                <a:cs typeface="Courier New" panose="02070309020205020404" pitchFamily="49" charset="0"/>
+              </a:rPr>
+              <a:t>())</a:t>
+            </a:r>
+            <a:endParaRPr lang="en-US" dirty="0">
+              <a:latin typeface="Courier New" panose="02070309020205020404" pitchFamily="49" charset="0"/>
+              <a:cs typeface="Courier New" panose="02070309020205020404" pitchFamily="49" charset="0"/>
+            </a:endParaRPr>
+          </a:p>
+        </p:txBody>
+      </p:sp>
+      <p:grpSp>
+        <p:nvGrpSpPr>
+          <p:cNvPr id="13" name="Group 12"/>
+          <p:cNvGrpSpPr/>
+          <p:nvPr/>
+        </p:nvGrpSpPr>
+        <p:grpSpPr>
+          <a:xfrm>
+            <a:off x="4814126" y="4383690"/>
+            <a:ext cx="2511467" cy="369332"/>
+            <a:chOff x="4412342" y="6047507"/>
+            <a:chExt cx="2511467" cy="369332"/>
+          </a:xfrm>
+        </p:grpSpPr>
+        <p:sp>
+          <p:nvSpPr>
+            <p:cNvPr id="14" name="TextBox 13"/>
+            <p:cNvSpPr txBox="1"/>
+            <p:nvPr/>
+          </p:nvSpPr>
+          <p:spPr>
+            <a:xfrm>
+              <a:off x="5136574" y="6047507"/>
+              <a:ext cx="1787235" cy="369332"/>
+            </a:xfrm>
+            <a:prstGeom prst="rect">
+              <a:avLst/>
+            </a:prstGeom>
+            <a:solidFill>
+              <a:schemeClr val="tx1"/>
+            </a:solidFill>
+          </p:spPr>
+          <p:txBody>
+            <a:bodyPr wrap="square" rtlCol="0">
+              <a:spAutoFit/>
+            </a:bodyPr>
+            <a:lstStyle/>
+            <a:p>
+              <a:r>
+                <a:rPr lang="en-US" b="1" dirty="0" smtClean="0">
+                  <a:solidFill>
+                    <a:schemeClr val="bg1"/>
+                  </a:solidFill>
+                </a:rPr>
+                <a:t>AAGCUUCAAAG</a:t>
+              </a:r>
+              <a:endParaRPr lang="en-US" b="1" dirty="0">
+                <a:solidFill>
+                  <a:schemeClr val="bg1"/>
+                </a:solidFill>
+              </a:endParaRPr>
+            </a:p>
+          </p:txBody>
+        </p:sp>
+        <p:cxnSp>
+          <p:nvCxnSpPr>
+            <p:cNvPr id="15" name="Straight Connector 14"/>
+            <p:cNvCxnSpPr/>
+            <p:nvPr/>
+          </p:nvCxnSpPr>
+          <p:spPr>
+            <a:xfrm>
+              <a:off x="4412342" y="6238917"/>
+              <a:ext cx="551206" cy="10391"/>
+            </a:xfrm>
+            <a:prstGeom prst="line">
+              <a:avLst/>
+            </a:prstGeom>
+            <a:ln w="25400">
+              <a:solidFill>
+                <a:schemeClr val="tx1"/>
+              </a:solidFill>
+              <a:tailEnd type="stealth" w="lg" len="lg"/>
+            </a:ln>
+          </p:spPr>
+          <p:style>
+            <a:lnRef idx="1">
+              <a:schemeClr val="accent1"/>
+            </a:lnRef>
+            <a:fillRef idx="0">
+              <a:schemeClr val="accent1"/>
+            </a:fillRef>
+            <a:effectRef idx="0">
+              <a:schemeClr val="accent1"/>
+            </a:effectRef>
+            <a:fontRef idx="minor">
+              <a:schemeClr val="tx1"/>
+            </a:fontRef>
+          </p:style>
+        </p:cxnSp>
+      </p:grpSp>
+      <p:sp>
+        <p:nvSpPr>
+          <p:cNvPr id="16" name="TextBox 15"/>
+          <p:cNvSpPr txBox="1"/>
+          <p:nvPr/>
+        </p:nvSpPr>
+        <p:spPr>
+          <a:xfrm>
+            <a:off x="4800597" y="4810989"/>
+            <a:ext cx="3431837" cy="369332"/>
+          </a:xfrm>
+          <a:prstGeom prst="rect">
+            <a:avLst/>
+          </a:prstGeom>
+          <a:noFill/>
+          <a:ln>
+            <a:solidFill>
+              <a:schemeClr val="tx1"/>
+            </a:solidFill>
+          </a:ln>
+        </p:spPr>
+        <p:txBody>
+          <a:bodyPr wrap="none" rtlCol="0">
+            <a:spAutoFit/>
+          </a:bodyPr>
+          <a:lstStyle/>
+          <a:p>
+            <a:r>
+              <a:rPr lang="en-US" dirty="0" smtClean="0"/>
+              <a:t>Note: alphabet is </a:t>
+            </a:r>
+            <a:r>
+              <a:rPr lang="en-US" dirty="0" err="1" smtClean="0">
+                <a:latin typeface="Courier New" panose="02070309020205020404" pitchFamily="49" charset="0"/>
+                <a:cs typeface="Courier New" panose="02070309020205020404" pitchFamily="49" charset="0"/>
+              </a:rPr>
+              <a:t>RNAAlphabet</a:t>
+            </a:r>
+            <a:r>
+              <a:rPr lang="en-US" dirty="0" smtClean="0"/>
+              <a:t>!</a:t>
+            </a:r>
+            <a:endParaRPr lang="en-US" dirty="0"/>
+          </a:p>
+        </p:txBody>
+      </p:sp>
+      <p:sp>
+        <p:nvSpPr>
+          <p:cNvPr id="17" name="TextBox 16"/>
+          <p:cNvSpPr txBox="1"/>
+          <p:nvPr/>
+        </p:nvSpPr>
+        <p:spPr>
+          <a:xfrm>
+            <a:off x="1021769" y="5384673"/>
+            <a:ext cx="3588002" cy="646331"/>
+          </a:xfrm>
+          <a:prstGeom prst="rect">
+            <a:avLst/>
+          </a:prstGeom>
+          <a:solidFill>
+            <a:schemeClr val="bg1">
+              <a:lumMod val="75000"/>
+            </a:schemeClr>
+          </a:solidFill>
+          <a:ln>
+            <a:solidFill>
+              <a:schemeClr val="tx1"/>
+            </a:solidFill>
+          </a:ln>
+        </p:spPr>
+        <p:txBody>
+          <a:bodyPr wrap="square" rtlCol="0">
+            <a:spAutoFit/>
+          </a:bodyPr>
+          <a:lstStyle/>
+          <a:p>
+            <a:r>
+              <a:rPr lang="en-US" dirty="0" err="1" smtClean="0">
+                <a:latin typeface="Courier New" panose="02070309020205020404" pitchFamily="49" charset="0"/>
+                <a:cs typeface="Courier New" panose="02070309020205020404" pitchFamily="49" charset="0"/>
+              </a:rPr>
+              <a:t>seq_p</a:t>
+            </a:r>
+            <a:r>
+              <a:rPr lang="en-US" dirty="0" smtClean="0">
+                <a:latin typeface="Courier New" panose="02070309020205020404" pitchFamily="49" charset="0"/>
+                <a:cs typeface="Courier New" panose="02070309020205020404" pitchFamily="49" charset="0"/>
+              </a:rPr>
+              <a:t> = </a:t>
+            </a:r>
+            <a:r>
+              <a:rPr lang="en-US" dirty="0" err="1" smtClean="0">
+                <a:latin typeface="Courier New" panose="02070309020205020404" pitchFamily="49" charset="0"/>
+                <a:cs typeface="Courier New" panose="02070309020205020404" pitchFamily="49" charset="0"/>
+              </a:rPr>
+              <a:t>seq</a:t>
+            </a:r>
+            <a:r>
+              <a:rPr lang="en-US" dirty="0" smtClean="0">
+                <a:latin typeface="Courier New" panose="02070309020205020404" pitchFamily="49" charset="0"/>
+                <a:cs typeface="Courier New" panose="02070309020205020404" pitchFamily="49" charset="0"/>
+              </a:rPr>
+              <a:t> + </a:t>
+            </a:r>
+            <a:r>
+              <a:rPr lang="en-US" dirty="0" err="1" smtClean="0">
+                <a:latin typeface="Courier New" panose="02070309020205020404" pitchFamily="49" charset="0"/>
+                <a:cs typeface="Courier New" panose="02070309020205020404" pitchFamily="49" charset="0"/>
+              </a:rPr>
+              <a:t>Seq</a:t>
+            </a:r>
+            <a:r>
+              <a:rPr lang="en-US" dirty="0" smtClean="0">
+                <a:latin typeface="Courier New" panose="02070309020205020404" pitchFamily="49" charset="0"/>
+                <a:cs typeface="Courier New" panose="02070309020205020404" pitchFamily="49" charset="0"/>
+              </a:rPr>
+              <a:t>('N')</a:t>
+            </a:r>
+          </a:p>
+          <a:p>
+            <a:r>
+              <a:rPr lang="en-US" dirty="0" smtClean="0">
+                <a:latin typeface="Courier New" panose="02070309020205020404" pitchFamily="49" charset="0"/>
+                <a:cs typeface="Courier New" panose="02070309020205020404" pitchFamily="49" charset="0"/>
+              </a:rPr>
+              <a:t>print(</a:t>
+            </a:r>
+            <a:r>
+              <a:rPr lang="en-US" dirty="0" err="1" smtClean="0">
+                <a:latin typeface="Courier New" panose="02070309020205020404" pitchFamily="49" charset="0"/>
+                <a:cs typeface="Courier New" panose="02070309020205020404" pitchFamily="49" charset="0"/>
+              </a:rPr>
+              <a:t>seq_p.translate</a:t>
+            </a:r>
+            <a:r>
+              <a:rPr lang="en-US" dirty="0" smtClean="0">
+                <a:latin typeface="Courier New" panose="02070309020205020404" pitchFamily="49" charset="0"/>
+                <a:cs typeface="Courier New" panose="02070309020205020404" pitchFamily="49" charset="0"/>
+              </a:rPr>
+              <a:t>())</a:t>
+            </a:r>
+            <a:endParaRPr lang="en-US" dirty="0">
+              <a:latin typeface="Courier New" panose="02070309020205020404" pitchFamily="49" charset="0"/>
+              <a:cs typeface="Courier New" panose="02070309020205020404" pitchFamily="49" charset="0"/>
+            </a:endParaRPr>
+          </a:p>
+        </p:txBody>
+      </p:sp>
+      <p:grpSp>
+        <p:nvGrpSpPr>
+          <p:cNvPr id="18" name="Group 17"/>
+          <p:cNvGrpSpPr/>
+          <p:nvPr/>
+        </p:nvGrpSpPr>
+        <p:grpSpPr>
+          <a:xfrm>
+            <a:off x="4831443" y="5668702"/>
+            <a:ext cx="2511467" cy="369332"/>
+            <a:chOff x="4412342" y="6047507"/>
+            <a:chExt cx="2511467" cy="369332"/>
+          </a:xfrm>
+        </p:grpSpPr>
+        <p:sp>
+          <p:nvSpPr>
+            <p:cNvPr id="19" name="TextBox 18"/>
+            <p:cNvSpPr txBox="1"/>
+            <p:nvPr/>
+          </p:nvSpPr>
+          <p:spPr>
+            <a:xfrm>
+              <a:off x="5136574" y="6047507"/>
+              <a:ext cx="1787235" cy="369332"/>
+            </a:xfrm>
+            <a:prstGeom prst="rect">
+              <a:avLst/>
+            </a:prstGeom>
+            <a:solidFill>
+              <a:schemeClr val="tx1"/>
+            </a:solidFill>
+          </p:spPr>
+          <p:txBody>
+            <a:bodyPr wrap="square" rtlCol="0">
+              <a:spAutoFit/>
+            </a:bodyPr>
+            <a:lstStyle/>
+            <a:p>
+              <a:r>
+                <a:rPr lang="en-US" b="1" dirty="0">
+                  <a:solidFill>
+                    <a:schemeClr val="bg1"/>
+                  </a:solidFill>
+                </a:rPr>
+                <a:t>KLQX</a:t>
+              </a:r>
+            </a:p>
+          </p:txBody>
+        </p:sp>
+        <p:cxnSp>
+          <p:nvCxnSpPr>
+            <p:cNvPr id="20" name="Straight Connector 19"/>
+            <p:cNvCxnSpPr/>
+            <p:nvPr/>
+          </p:nvCxnSpPr>
+          <p:spPr>
+            <a:xfrm>
+              <a:off x="4412342" y="6238917"/>
+              <a:ext cx="551206" cy="10391"/>
+            </a:xfrm>
+            <a:prstGeom prst="line">
+              <a:avLst/>
+            </a:prstGeom>
+            <a:ln w="25400">
+              <a:solidFill>
+                <a:schemeClr val="tx1"/>
+              </a:solidFill>
+              <a:tailEnd type="stealth" w="lg" len="lg"/>
+            </a:ln>
+          </p:spPr>
+          <p:style>
+            <a:lnRef idx="1">
+              <a:schemeClr val="accent1"/>
+            </a:lnRef>
+            <a:fillRef idx="0">
+              <a:schemeClr val="accent1"/>
+            </a:fillRef>
+            <a:effectRef idx="0">
+              <a:schemeClr val="accent1"/>
+            </a:effectRef>
+            <a:fontRef idx="minor">
+              <a:schemeClr val="tx1"/>
+            </a:fontRef>
+          </p:style>
+        </p:cxnSp>
+      </p:grpSp>
+      <p:sp>
+        <p:nvSpPr>
+          <p:cNvPr id="22" name="TextBox 21"/>
+          <p:cNvSpPr txBox="1"/>
+          <p:nvPr/>
+        </p:nvSpPr>
+        <p:spPr>
+          <a:xfrm>
+            <a:off x="4180234" y="6098799"/>
+            <a:ext cx="4672561" cy="369332"/>
+          </a:xfrm>
+          <a:prstGeom prst="rect">
+            <a:avLst/>
+          </a:prstGeom>
+          <a:noFill/>
+          <a:ln>
+            <a:solidFill>
+              <a:schemeClr val="tx1"/>
+            </a:solidFill>
+          </a:ln>
+        </p:spPr>
+        <p:txBody>
+          <a:bodyPr wrap="none" rtlCol="0">
+            <a:spAutoFit/>
+          </a:bodyPr>
+          <a:lstStyle/>
+          <a:p>
+            <a:r>
+              <a:rPr lang="en-US" dirty="0" smtClean="0"/>
+              <a:t>Note: alphabet is </a:t>
+            </a:r>
+            <a:r>
+              <a:rPr lang="en-US" dirty="0" err="1">
+                <a:latin typeface="Courier New" panose="02070309020205020404" pitchFamily="49" charset="0"/>
+                <a:cs typeface="Courier New" panose="02070309020205020404" pitchFamily="49" charset="0"/>
+              </a:rPr>
+              <a:t>ExtendedIUPACProtein</a:t>
+            </a:r>
+            <a:r>
+              <a:rPr lang="en-US" dirty="0" smtClean="0"/>
+              <a:t>!</a:t>
+            </a:r>
+            <a:endParaRPr lang="en-US" dirty="0"/>
+          </a:p>
+        </p:txBody>
+      </p:sp>
+      <p:sp>
+        <p:nvSpPr>
+          <p:cNvPr id="23" name="Slide Number Placeholder 22"/>
+          <p:cNvSpPr>
+            <a:spLocks noGrp="1"/>
+          </p:cNvSpPr>
+          <p:nvPr>
+            <p:ph type="sldNum" sz="quarter" idx="12"/>
+          </p:nvPr>
+        </p:nvSpPr>
+        <p:spPr/>
+        <p:txBody>
+          <a:bodyPr/>
+          <a:lstStyle/>
+          <a:p>
+            <a:fld id="{CA586AD6-E5F2-4F25-940D-C674496063E2}" type="slidenum">
+              <a:rPr lang="en-US" smtClean="0"/>
+              <a:t>7</a:t>
+            </a:fld>
+            <a:endParaRPr lang="en-US"/>
+          </a:p>
+        </p:txBody>
+      </p:sp>
+    </p:spTree>
+    <p:extLst>
+      <p:ext uri="{BB962C8B-B14F-4D97-AF65-F5344CB8AC3E}">
+        <p14:creationId xmlns:p14="http://schemas.microsoft.com/office/powerpoint/2010/main" val="944763746"/>
+      </p:ext>
+    </p:extLst>
+  </p:cSld>
+  <p:clrMapOvr>
+    <a:masterClrMapping/>
+  </p:clrMapOvr>
+  <p:timing>
+    <p:tnLst>
+      <p:par>
+        <p:cTn id="1" dur="indefinite" restart="never" nodeType="tmRoot">
+          <p:childTnLst>
+            <p:seq concurrent="1" nextAc="seek">
+              <p:cTn id="2" dur="indefinite" nodeType="mainSeq">
+                <p:childTnLst>
+                  <p:par>
+                    <p:cTn id="3" fill="hold">
+                      <p:stCondLst>
+                        <p:cond delay="indefinite"/>
+                        <p:cond evt="onBegin" delay="0">
+                          <p:tn val="2"/>
+                        </p:cond>
+                      </p:stCondLst>
+                      <p:childTnLst>
+                        <p:par>
+                          <p:cTn id="4" fill="hold">
+                            <p:stCondLst>
+                              <p:cond delay="0"/>
+                            </p:stCondLst>
+                            <p:childTnLst>
+                              <p:par>
+                                <p:cTn id="5" presetID="1" presetClass="entr" presetSubtype="0" fill="hold" grpId="0" nodeType="withEffect">
+                                  <p:stCondLst>
+                                    <p:cond delay="0"/>
+                                  </p:stCondLst>
+                                  <p:childTnLst>
+                                    <p:set>
+                                      <p:cBhvr>
+                                        <p:cTn id="6" dur="1" fill="hold">
+                                          <p:stCondLst>
+                                            <p:cond delay="0"/>
+                                          </p:stCondLst>
+                                        </p:cTn>
+                                        <p:tgtEl>
+                                          <p:spTgt spid="3">
+                                            <p:txEl>
+                                              <p:pRg st="0" end="0"/>
+                                            </p:txEl>
+                                          </p:spTgt>
+                                        </p:tgtEl>
+                                        <p:attrNameLst>
+                                          <p:attrName>style.visibility</p:attrName>
+                                        </p:attrNameLst>
+                                      </p:cBhvr>
+                                      <p:to>
+                                        <p:strVal val="visible"/>
+                                      </p:to>
+                                    </p:set>
+                                  </p:childTnLst>
+                                </p:cTn>
+                              </p:par>
+                              <p:par>
+                                <p:cTn id="7" presetID="1" presetClass="entr" presetSubtype="0" fill="hold" grpId="0" nodeType="withEffect">
+                                  <p:stCondLst>
+                                    <p:cond delay="0"/>
+                                  </p:stCondLst>
+                                  <p:childTnLst>
+                                    <p:set>
+                                      <p:cBhvr>
+                                        <p:cTn id="8" dur="1" fill="hold">
+                                          <p:stCondLst>
+                                            <p:cond delay="0"/>
+                                          </p:stCondLst>
+                                        </p:cTn>
+                                        <p:tgtEl>
+                                          <p:spTgt spid="4"/>
+                                        </p:tgtEl>
+                                        <p:attrNameLst>
+                                          <p:attrName>style.visibility</p:attrName>
+                                        </p:attrNameLst>
+                                      </p:cBhvr>
+                                      <p:to>
+                                        <p:strVal val="visible"/>
+                                      </p:to>
+                                    </p:set>
+                                  </p:childTnLst>
+                                </p:cTn>
+                              </p:par>
+                            </p:childTnLst>
+                          </p:cTn>
+                        </p:par>
+                      </p:childTnLst>
+                    </p:cTn>
+                  </p:par>
+                  <p:par>
+                    <p:cTn id="9" fill="hold">
+                      <p:stCondLst>
+                        <p:cond delay="indefinite"/>
+                      </p:stCondLst>
+                      <p:childTnLst>
+                        <p:par>
+                          <p:cTn id="10" fill="hold">
+                            <p:stCondLst>
+                              <p:cond delay="0"/>
+                            </p:stCondLst>
+                            <p:childTnLst>
+                              <p:par>
+                                <p:cTn id="11" presetID="1" presetClass="entr" presetSubtype="0" fill="hold" nodeType="clickEffect">
+                                  <p:stCondLst>
+                                    <p:cond delay="0"/>
+                                  </p:stCondLst>
+                                  <p:childTnLst>
+                                    <p:set>
+                                      <p:cBhvr>
+                                        <p:cTn id="12" dur="1" fill="hold">
+                                          <p:stCondLst>
+                                            <p:cond delay="0"/>
+                                          </p:stCondLst>
+                                        </p:cTn>
+                                        <p:tgtEl>
+                                          <p:spTgt spid="5"/>
+                                        </p:tgtEl>
+                                        <p:attrNameLst>
+                                          <p:attrName>style.visibility</p:attrName>
+                                        </p:attrNameLst>
+                                      </p:cBhvr>
+                                      <p:to>
+                                        <p:strVal val="visible"/>
+                                      </p:to>
+                                    </p:set>
+                                  </p:childTnLst>
+                                </p:cTn>
+                              </p:par>
+                              <p:par>
+                                <p:cTn id="13" presetID="1" presetClass="entr" presetSubtype="0" fill="hold" grpId="0" nodeType="withEffect">
+                                  <p:stCondLst>
+                                    <p:cond delay="0"/>
+                                  </p:stCondLst>
+                                  <p:childTnLst>
+                                    <p:set>
+                                      <p:cBhvr>
+                                        <p:cTn id="14" dur="1" fill="hold">
+                                          <p:stCondLst>
+                                            <p:cond delay="0"/>
+                                          </p:stCondLst>
+                                        </p:cTn>
+                                        <p:tgtEl>
+                                          <p:spTgt spid="8"/>
+                                        </p:tgtEl>
+                                        <p:attrNameLst>
+                                          <p:attrName>style.visibility</p:attrName>
+                                        </p:attrNameLst>
+                                      </p:cBhvr>
+                                      <p:to>
+                                        <p:strVal val="visible"/>
+                                      </p:to>
+                                    </p:set>
+                                  </p:childTnLst>
+                                </p:cTn>
+                              </p:par>
+                            </p:childTnLst>
+                          </p:cTn>
+                        </p:par>
+                      </p:childTnLst>
+                    </p:cTn>
+                  </p:par>
+                  <p:par>
+                    <p:cTn id="15" fill="hold">
+                      <p:stCondLst>
+                        <p:cond delay="indefinite"/>
+                      </p:stCondLst>
+                      <p:childTnLst>
+                        <p:par>
+                          <p:cTn id="16" fill="hold">
+                            <p:stCondLst>
+                              <p:cond delay="0"/>
+                            </p:stCondLst>
+                            <p:childTnLst>
+                              <p:par>
+                                <p:cTn id="17" presetID="1" presetClass="entr" presetSubtype="0" fill="hold" nodeType="clickEffect">
+                                  <p:stCondLst>
+                                    <p:cond delay="0"/>
+                                  </p:stCondLst>
+                                  <p:childTnLst>
+                                    <p:set>
+                                      <p:cBhvr>
+                                        <p:cTn id="18" dur="1" fill="hold">
+                                          <p:stCondLst>
+                                            <p:cond delay="0"/>
+                                          </p:stCondLst>
+                                        </p:cTn>
+                                        <p:tgtEl>
+                                          <p:spTgt spid="9"/>
+                                        </p:tgtEl>
+                                        <p:attrNameLst>
+                                          <p:attrName>style.visibility</p:attrName>
+                                        </p:attrNameLst>
+                                      </p:cBhvr>
+                                      <p:to>
+                                        <p:strVal val="visible"/>
+                                      </p:to>
+                                    </p:set>
+                                  </p:childTnLst>
+                                </p:cTn>
+                              </p:par>
+                            </p:childTnLst>
+                          </p:cTn>
+                        </p:par>
+                      </p:childTnLst>
+                    </p:cTn>
+                  </p:par>
+                  <p:par>
+                    <p:cTn id="19" fill="hold">
+                      <p:stCondLst>
+                        <p:cond delay="indefinite"/>
+                      </p:stCondLst>
+                      <p:childTnLst>
+                        <p:par>
+                          <p:cTn id="20" fill="hold">
+                            <p:stCondLst>
+                              <p:cond delay="0"/>
+                            </p:stCondLst>
+                            <p:childTnLst>
+                              <p:par>
+                                <p:cTn id="21" presetID="1" presetClass="entr" presetSubtype="0" fill="hold" grpId="0" nodeType="clickEffect">
+                                  <p:stCondLst>
+                                    <p:cond delay="0"/>
+                                  </p:stCondLst>
+                                  <p:childTnLst>
+                                    <p:set>
+                                      <p:cBhvr>
+                                        <p:cTn id="22" dur="1" fill="hold">
+                                          <p:stCondLst>
+                                            <p:cond delay="0"/>
+                                          </p:stCondLst>
+                                        </p:cTn>
+                                        <p:tgtEl>
+                                          <p:spTgt spid="3">
+                                            <p:txEl>
+                                              <p:pRg st="2" end="2"/>
+                                            </p:txEl>
+                                          </p:spTgt>
+                                        </p:tgtEl>
+                                        <p:attrNameLst>
+                                          <p:attrName>style.visibility</p:attrName>
+                                        </p:attrNameLst>
+                                      </p:cBhvr>
+                                      <p:to>
+                                        <p:strVal val="visible"/>
+                                      </p:to>
+                                    </p:set>
+                                  </p:childTnLst>
+                                </p:cTn>
+                              </p:par>
+                            </p:childTnLst>
+                          </p:cTn>
+                        </p:par>
+                      </p:childTnLst>
+                    </p:cTn>
+                  </p:par>
+                  <p:par>
+                    <p:cTn id="23" fill="hold">
+                      <p:stCondLst>
+                        <p:cond delay="indefinite"/>
+                      </p:stCondLst>
+                      <p:childTnLst>
+                        <p:par>
+                          <p:cTn id="24" fill="hold">
+                            <p:stCondLst>
+                              <p:cond delay="0"/>
+                            </p:stCondLst>
+                            <p:childTnLst>
+                              <p:par>
+                                <p:cTn id="25" presetID="1" presetClass="entr" presetSubtype="0" fill="hold" grpId="0" nodeType="clickEffect">
+                                  <p:stCondLst>
+                                    <p:cond delay="0"/>
+                                  </p:stCondLst>
+                                  <p:childTnLst>
+                                    <p:set>
+                                      <p:cBhvr>
+                                        <p:cTn id="26" dur="1" fill="hold">
+                                          <p:stCondLst>
+                                            <p:cond delay="0"/>
+                                          </p:stCondLst>
+                                        </p:cTn>
+                                        <p:tgtEl>
+                                          <p:spTgt spid="3">
+                                            <p:txEl>
+                                              <p:pRg st="4" end="4"/>
+                                            </p:txEl>
+                                          </p:spTgt>
+                                        </p:tgtEl>
+                                        <p:attrNameLst>
+                                          <p:attrName>style.visibility</p:attrName>
+                                        </p:attrNameLst>
+                                      </p:cBhvr>
+                                      <p:to>
+                                        <p:strVal val="visible"/>
+                                      </p:to>
+                                    </p:set>
+                                  </p:childTnLst>
+                                </p:cTn>
+                              </p:par>
+                              <p:par>
+                                <p:cTn id="27" presetID="1" presetClass="entr" presetSubtype="0" fill="hold" grpId="0" nodeType="withEffect">
+                                  <p:stCondLst>
+                                    <p:cond delay="0"/>
+                                  </p:stCondLst>
+                                  <p:childTnLst>
+                                    <p:set>
+                                      <p:cBhvr>
+                                        <p:cTn id="28" dur="1" fill="hold">
+                                          <p:stCondLst>
+                                            <p:cond delay="0"/>
+                                          </p:stCondLst>
+                                        </p:cTn>
+                                        <p:tgtEl>
+                                          <p:spTgt spid="12"/>
+                                        </p:tgtEl>
+                                        <p:attrNameLst>
+                                          <p:attrName>style.visibility</p:attrName>
+                                        </p:attrNameLst>
+                                      </p:cBhvr>
+                                      <p:to>
+                                        <p:strVal val="visible"/>
+                                      </p:to>
+                                    </p:set>
+                                  </p:childTnLst>
+                                </p:cTn>
+                              </p:par>
+                            </p:childTnLst>
+                          </p:cTn>
+                        </p:par>
+                      </p:childTnLst>
+                    </p:cTn>
+                  </p:par>
+                  <p:par>
+                    <p:cTn id="29" fill="hold">
+                      <p:stCondLst>
+                        <p:cond delay="indefinite"/>
+                      </p:stCondLst>
+                      <p:childTnLst>
+                        <p:par>
+                          <p:cTn id="30" fill="hold">
+                            <p:stCondLst>
+                              <p:cond delay="0"/>
+                            </p:stCondLst>
+                            <p:childTnLst>
+                              <p:par>
+                                <p:cTn id="31" presetID="1" presetClass="entr" presetSubtype="0" fill="hold" nodeType="clickEffect">
+                                  <p:stCondLst>
+                                    <p:cond delay="0"/>
+                                  </p:stCondLst>
+                                  <p:childTnLst>
+                                    <p:set>
+                                      <p:cBhvr>
+                                        <p:cTn id="32" dur="1" fill="hold">
+                                          <p:stCondLst>
+                                            <p:cond delay="0"/>
+                                          </p:stCondLst>
+                                        </p:cTn>
+                                        <p:tgtEl>
+                                          <p:spTgt spid="13"/>
+                                        </p:tgtEl>
+                                        <p:attrNameLst>
+                                          <p:attrName>style.visibility</p:attrName>
+                                        </p:attrNameLst>
+                                      </p:cBhvr>
+                                      <p:to>
+                                        <p:strVal val="visible"/>
+                                      </p:to>
+                                    </p:set>
+                                  </p:childTnLst>
+                                </p:cTn>
+                              </p:par>
+                            </p:childTnLst>
+                          </p:cTn>
+                        </p:par>
+                      </p:childTnLst>
+                    </p:cTn>
+                  </p:par>
+                  <p:par>
+                    <p:cTn id="33" fill="hold">
+                      <p:stCondLst>
+                        <p:cond delay="indefinite"/>
+                      </p:stCondLst>
+                      <p:childTnLst>
+                        <p:par>
+                          <p:cTn id="34" fill="hold">
+                            <p:stCondLst>
+                              <p:cond delay="0"/>
+                            </p:stCondLst>
+                            <p:childTnLst>
+                              <p:par>
+                                <p:cTn id="35" presetID="1" presetClass="entr" presetSubtype="0" fill="hold" grpId="0" nodeType="clickEffect">
+                                  <p:stCondLst>
+                                    <p:cond delay="0"/>
+                                  </p:stCondLst>
+                                  <p:childTnLst>
+                                    <p:set>
+                                      <p:cBhvr>
+                                        <p:cTn id="36" dur="1" fill="hold">
+                                          <p:stCondLst>
+                                            <p:cond delay="0"/>
+                                          </p:stCondLst>
+                                        </p:cTn>
+                                        <p:tgtEl>
+                                          <p:spTgt spid="16"/>
+                                        </p:tgtEl>
+                                        <p:attrNameLst>
+                                          <p:attrName>style.visibility</p:attrName>
+                                        </p:attrNameLst>
+                                      </p:cBhvr>
+                                      <p:to>
+                                        <p:strVal val="visible"/>
+                                      </p:to>
+                                    </p:set>
+                                  </p:childTnLst>
+                                </p:cTn>
+                              </p:par>
+                            </p:childTnLst>
+                          </p:cTn>
+                        </p:par>
+                      </p:childTnLst>
+                    </p:cTn>
+                  </p:par>
+                  <p:par>
+                    <p:cTn id="37" fill="hold">
+                      <p:stCondLst>
+                        <p:cond delay="indefinite"/>
+                      </p:stCondLst>
+                      <p:childTnLst>
+                        <p:par>
+                          <p:cTn id="38" fill="hold">
+                            <p:stCondLst>
+                              <p:cond delay="0"/>
+                            </p:stCondLst>
+                            <p:childTnLst>
+                              <p:par>
+                                <p:cTn id="39" presetID="1" presetClass="entr" presetSubtype="0" fill="hold" grpId="0" nodeType="clickEffect">
+                                  <p:stCondLst>
+                                    <p:cond delay="0"/>
+                                  </p:stCondLst>
+                                  <p:childTnLst>
+                                    <p:set>
+                                      <p:cBhvr>
+                                        <p:cTn id="40" dur="1" fill="hold">
+                                          <p:stCondLst>
+                                            <p:cond delay="0"/>
+                                          </p:stCondLst>
+                                        </p:cTn>
+                                        <p:tgtEl>
+                                          <p:spTgt spid="3">
+                                            <p:txEl>
+                                              <p:pRg st="6" end="6"/>
+                                            </p:txEl>
+                                          </p:spTgt>
+                                        </p:tgtEl>
+                                        <p:attrNameLst>
+                                          <p:attrName>style.visibility</p:attrName>
+                                        </p:attrNameLst>
+                                      </p:cBhvr>
+                                      <p:to>
+                                        <p:strVal val="visible"/>
+                                      </p:to>
+                                    </p:set>
+                                  </p:childTnLst>
+                                </p:cTn>
+                              </p:par>
+                              <p:par>
+                                <p:cTn id="41" presetID="1" presetClass="entr" presetSubtype="0" fill="hold" grpId="0" nodeType="withEffect">
+                                  <p:stCondLst>
+                                    <p:cond delay="0"/>
+                                  </p:stCondLst>
+                                  <p:childTnLst>
+                                    <p:set>
+                                      <p:cBhvr>
+                                        <p:cTn id="42" dur="1" fill="hold">
+                                          <p:stCondLst>
+                                            <p:cond delay="0"/>
+                                          </p:stCondLst>
+                                        </p:cTn>
+                                        <p:tgtEl>
+                                          <p:spTgt spid="17"/>
+                                        </p:tgtEl>
+                                        <p:attrNameLst>
+                                          <p:attrName>style.visibility</p:attrName>
+                                        </p:attrNameLst>
+                                      </p:cBhvr>
+                                      <p:to>
+                                        <p:strVal val="visible"/>
+                                      </p:to>
+                                    </p:set>
+                                  </p:childTnLst>
+                                </p:cTn>
+                              </p:par>
+                            </p:childTnLst>
+                          </p:cTn>
+                        </p:par>
+                      </p:childTnLst>
+                    </p:cTn>
+                  </p:par>
+                  <p:par>
+                    <p:cTn id="43" fill="hold">
+                      <p:stCondLst>
+                        <p:cond delay="indefinite"/>
+                      </p:stCondLst>
+                      <p:childTnLst>
+                        <p:par>
+                          <p:cTn id="44" fill="hold">
+                            <p:stCondLst>
+                              <p:cond delay="0"/>
+                            </p:stCondLst>
+                            <p:childTnLst>
+                              <p:par>
+                                <p:cTn id="45" presetID="1" presetClass="entr" presetSubtype="0" fill="hold" nodeType="clickEffect">
+                                  <p:stCondLst>
+                                    <p:cond delay="0"/>
+                                  </p:stCondLst>
+                                  <p:childTnLst>
+                                    <p:set>
+                                      <p:cBhvr>
+                                        <p:cTn id="46" dur="1" fill="hold">
+                                          <p:stCondLst>
+                                            <p:cond delay="0"/>
+                                          </p:stCondLst>
+                                        </p:cTn>
+                                        <p:tgtEl>
+                                          <p:spTgt spid="18"/>
+                                        </p:tgtEl>
+                                        <p:attrNameLst>
+                                          <p:attrName>style.visibility</p:attrName>
+                                        </p:attrNameLst>
+                                      </p:cBhvr>
+                                      <p:to>
+                                        <p:strVal val="visible"/>
+                                      </p:to>
+                                    </p:set>
+                                  </p:childTnLst>
+                                </p:cTn>
+                              </p:par>
+                            </p:childTnLst>
+                          </p:cTn>
+                        </p:par>
+                      </p:childTnLst>
+                    </p:cTn>
+                  </p:par>
+                  <p:par>
+                    <p:cTn id="47" fill="hold">
+                      <p:stCondLst>
+                        <p:cond delay="indefinite"/>
+                      </p:stCondLst>
+                      <p:childTnLst>
+                        <p:par>
+                          <p:cTn id="48" fill="hold">
+                            <p:stCondLst>
+                              <p:cond delay="0"/>
+                            </p:stCondLst>
+                            <p:childTnLst>
+                              <p:par>
+                                <p:cTn id="49" presetID="1" presetClass="entr" presetSubtype="0" fill="hold" grpId="0" nodeType="clickEffect">
+                                  <p:stCondLst>
+                                    <p:cond delay="0"/>
+                                  </p:stCondLst>
+                                  <p:childTnLst>
+                                    <p:set>
+                                      <p:cBhvr>
+                                        <p:cTn id="50" dur="1" fill="hold">
+                                          <p:stCondLst>
+                                            <p:cond delay="0"/>
+                                          </p:stCondLst>
+                                        </p:cTn>
+                                        <p:tgtEl>
+                                          <p:spTgt spid="22"/>
+                                        </p:tgtEl>
+                                        <p:attrNameLst>
+                                          <p:attrName>style.visibility</p:attrName>
+                                        </p:attrNameLst>
+                                      </p:cBhvr>
+                                      <p:to>
+                                        <p:strVal val="visible"/>
+                                      </p:to>
+                                    </p:set>
+                                  </p:childTnLst>
+                                </p:cTn>
+                              </p:par>
+                            </p:childTnLst>
+                          </p:cTn>
+                        </p:par>
+                      </p:childTnLst>
+                    </p:cTn>
+                  </p:par>
+                </p:childTnLst>
+              </p:cTn>
+              <p:prevCondLst>
+                <p:cond evt="onPrev" delay="0">
+                  <p:tgtEl>
+                    <p:sldTgt/>
+                  </p:tgtEl>
+                </p:cond>
+              </p:prevCondLst>
+              <p:nextCondLst>
+                <p:cond evt="onNext" delay="0">
+                  <p:tgtEl>
+                    <p:sldTgt/>
+                  </p:tgtEl>
+                </p:cond>
+              </p:nextCondLst>
+            </p:seq>
+          </p:childTnLst>
+        </p:cTn>
+      </p:par>
+    </p:tnLst>
+    <p:bldLst>
+      <p:bldP spid="3" grpId="0" uiExpand="1" build="p"/>
+      <p:bldP spid="4" grpId="0" animBg="1"/>
+      <p:bldP spid="8" grpId="0" animBg="1"/>
+      <p:bldP spid="12" grpId="0" animBg="1"/>
+      <p:bldP spid="16" grpId="0" animBg="1"/>
+      <p:bldP spid="17" grpId="0" animBg="1"/>
+      <p:bldP spid="22" grpId="0" animBg="1"/>
+    </p:bldLst>
+  </p:timing>
+</p:sld>
+</file>
+
+<file path=ppt/slides/slide8.xml><?xml version="1.0" encoding="utf-8"?>
+<p:sld xmlns:a="http://schemas.openxmlformats.org/drawingml/2006/main" xmlns:r="http://schemas.openxmlformats.org/officeDocument/2006/relationships" xmlns:p="http://schemas.openxmlformats.org/presentationml/2006/main">
+  <p:cSld>
+    <p:spTree>
+      <p:nvGrpSpPr>
+        <p:cNvPr id="1" name=""/>
+        <p:cNvGrpSpPr/>
+        <p:nvPr/>
+      </p:nvGrpSpPr>
+      <p:grpSpPr>
+        <a:xfrm>
+          <a:off x="0" y="0"/>
+          <a:ext cx="0" cy="0"/>
+          <a:chOff x="0" y="0"/>
+          <a:chExt cx="0" cy="0"/>
+        </a:xfrm>
+      </p:grpSpPr>
+      <p:sp>
+        <p:nvSpPr>
+          <p:cNvPr id="2" name="Title 1"/>
+          <p:cNvSpPr>
+            <a:spLocks noGrp="1"/>
+          </p:cNvSpPr>
+          <p:nvPr>
+            <p:ph type="title"/>
+          </p:nvPr>
+        </p:nvSpPr>
+        <p:spPr/>
+        <p:txBody>
+          <a:bodyPr/>
+          <a:lstStyle/>
+          <a:p>
+            <a:r>
+              <a:rPr lang="en-US" dirty="0" smtClean="0"/>
               <a:t>Sequence utilities</a:t>
             </a:r>
             <a:endParaRPr lang="en-US" dirty="0"/>
@@ -4145,6 +7663,96 @@
           <a:bodyPr/>
           <a:lstStyle/>
           <a:p>
+            <a:r>
+              <a:rPr lang="en-US" dirty="0" smtClean="0"/>
+              <a:t>Import </a:t>
+            </a:r>
+            <a:r>
+              <a:rPr lang="en-US" dirty="0" err="1" smtClean="0">
+                <a:latin typeface="Courier New" panose="02070309020205020404" pitchFamily="49" charset="0"/>
+                <a:cs typeface="Courier New" panose="02070309020205020404" pitchFamily="49" charset="0"/>
+              </a:rPr>
+              <a:t>SeqUtils</a:t>
+            </a:r>
+            <a:r>
+              <a:rPr lang="en-US" dirty="0" smtClean="0"/>
+              <a:t> module</a:t>
+            </a:r>
+            <a:endParaRPr lang="en-US" dirty="0"/>
+          </a:p>
+        </p:txBody>
+      </p:sp>
+      <p:sp>
+        <p:nvSpPr>
+          <p:cNvPr id="4" name="TextBox 3"/>
+          <p:cNvSpPr txBox="1"/>
+          <p:nvPr/>
+        </p:nvSpPr>
+        <p:spPr>
+          <a:xfrm>
+            <a:off x="987139" y="2265216"/>
+            <a:ext cx="3079689" cy="369332"/>
+          </a:xfrm>
+          <a:prstGeom prst="rect">
+            <a:avLst/>
+          </a:prstGeom>
+          <a:solidFill>
+            <a:schemeClr val="bg1">
+              <a:lumMod val="75000"/>
+            </a:schemeClr>
+          </a:solidFill>
+          <a:ln>
+            <a:solidFill>
+              <a:schemeClr val="tx1"/>
+            </a:solidFill>
+          </a:ln>
+        </p:spPr>
+        <p:txBody>
+          <a:bodyPr wrap="none" rtlCol="0">
+            <a:spAutoFit/>
+          </a:bodyPr>
+          <a:lstStyle/>
+          <a:p>
+            <a:r>
+              <a:rPr lang="en-US" dirty="0" smtClean="0">
+                <a:latin typeface="Courier New" panose="02070309020205020404" pitchFamily="49" charset="0"/>
+                <a:cs typeface="Courier New" panose="02070309020205020404" pitchFamily="49" charset="0"/>
+              </a:rPr>
+              <a:t>from Bio import </a:t>
+            </a:r>
+            <a:r>
+              <a:rPr lang="en-US" dirty="0" err="1" smtClean="0">
+                <a:latin typeface="Courier New" panose="02070309020205020404" pitchFamily="49" charset="0"/>
+                <a:cs typeface="Courier New" panose="02070309020205020404" pitchFamily="49" charset="0"/>
+              </a:rPr>
+              <a:t>SeqIO</a:t>
+            </a:r>
+            <a:endParaRPr lang="en-US" dirty="0" smtClean="0">
+              <a:latin typeface="Courier New" panose="02070309020205020404" pitchFamily="49" charset="0"/>
+              <a:cs typeface="Courier New" panose="02070309020205020404" pitchFamily="49" charset="0"/>
+            </a:endParaRPr>
+          </a:p>
+        </p:txBody>
+      </p:sp>
+      <p:sp>
+        <p:nvSpPr>
+          <p:cNvPr id="5" name="Slide Number Placeholder 4"/>
+          <p:cNvSpPr>
+            <a:spLocks noGrp="1"/>
+          </p:cNvSpPr>
+          <p:nvPr>
+            <p:ph type="sldNum" sz="quarter" idx="12"/>
+          </p:nvPr>
+        </p:nvSpPr>
+        <p:spPr/>
+        <p:txBody>
+          <a:bodyPr/>
+          <a:lstStyle/>
+          <a:p>
+            <a:fld id="{CA586AD6-E5F2-4F25-940D-C674496063E2}" type="slidenum">
+              <a:rPr lang="en-US" smtClean="0"/>
+              <a:t>8</a:t>
+            </a:fld>
             <a:endParaRPr lang="en-US"/>
           </a:p>
         </p:txBody>
@@ -4428,4 +8036,265 @@
     </a:ext>
   </a:extLst>
 </a:theme>
+</file>
+
+<file path=ppt/theme/theme2.xml><?xml version="1.0" encoding="utf-8"?>
+<a:theme xmlns:a="http://schemas.openxmlformats.org/drawingml/2006/main" name="Office Theme">
+  <a:themeElements>
+    <a:clrScheme name="Office">
+      <a:dk1>
+        <a:sysClr val="windowText" lastClr="000000"/>
+      </a:dk1>
+      <a:lt1>
+        <a:sysClr val="window" lastClr="FFFFFF"/>
+      </a:lt1>
+      <a:dk2>
+        <a:srgbClr val="44546A"/>
+      </a:dk2>
+      <a:lt2>
+        <a:srgbClr val="E7E6E6"/>
+      </a:lt2>
+      <a:accent1>
+        <a:srgbClr val="5B9BD5"/>
+      </a:accent1>
+      <a:accent2>
+        <a:srgbClr val="ED7D31"/>
+      </a:accent2>
+      <a:accent3>
+        <a:srgbClr val="A5A5A5"/>
+      </a:accent3>
+      <a:accent4>
+        <a:srgbClr val="FFC000"/>
+      </a:accent4>
+      <a:accent5>
+        <a:srgbClr val="4472C4"/>
+      </a:accent5>
+      <a:accent6>
+        <a:srgbClr val="70AD47"/>
+      </a:accent6>
+      <a:hlink>
+        <a:srgbClr val="0563C1"/>
+      </a:hlink>
+      <a:folHlink>
+        <a:srgbClr val="954F72"/>
+      </a:folHlink>
+    </a:clrScheme>
+    <a:fontScheme name="Office">
+      <a:majorFont>
+        <a:latin typeface="Calibri Light" panose="020F0302020204030204"/>
+        <a:ea typeface=""/>
+        <a:cs typeface=""/>
+        <a:font script="Jpan" typeface="ＭＳ Ｐゴシック"/>
+        <a:font script="Hang" typeface="맑은 고딕"/>
+        <a:font script="Hans" typeface="宋体"/>
+        <a:font script="Hant" typeface="新細明體"/>
+        <a:font script="Arab" typeface="Times New Roman"/>
+        <a:font script="Hebr" typeface="Times New Roman"/>
+        <a:font script="Thai" typeface="Angsana New"/>
+        <a:font script="Ethi" typeface="Nyala"/>
+        <a:font script="Beng" typeface="Vrinda"/>
+        <a:font script="Gujr" typeface="Shruti"/>
+        <a:font script="Khmr" typeface="MoolBoran"/>
+        <a:font script="Knda" typeface="Tunga"/>
+        <a:font script="Guru" typeface="Raavi"/>
+        <a:font script="Cans" typeface="Euphemia"/>
+        <a:font script="Cher" typeface="Plantagenet Cherokee"/>
+        <a:font script="Yiii" typeface="Microsoft Yi Baiti"/>
+        <a:font script="Tibt" typeface="Microsoft Himalaya"/>
+        <a:font script="Thaa" typeface="MV Boli"/>
+        <a:font script="Deva" typeface="Mangal"/>
+        <a:font script="Telu" typeface="Gautami"/>
+        <a:font script="Taml" typeface="Latha"/>
+        <a:font script="Syrc" typeface="Estrangelo Edessa"/>
+        <a:font script="Orya" typeface="Kalinga"/>
+        <a:font script="Mlym" typeface="Kartika"/>
+        <a:font script="Laoo" typeface="DokChampa"/>
+        <a:font script="Sinh" typeface="Iskoola Pota"/>
+        <a:font script="Mong" typeface="Mongolian Baiti"/>
+        <a:font script="Viet" typeface="Times New Roman"/>
+        <a:font script="Uigh" typeface="Microsoft Uighur"/>
+        <a:font script="Geor" typeface="Sylfaen"/>
+      </a:majorFont>
+      <a:minorFont>
+        <a:latin typeface="Calibri" panose="020F0502020204030204"/>
+        <a:ea typeface=""/>
+        <a:cs typeface=""/>
+        <a:font script="Jpan" typeface="ＭＳ Ｐゴシック"/>
+        <a:font script="Hang" typeface="맑은 고딕"/>
+        <a:font script="Hans" typeface="宋体"/>
+        <a:font script="Hant" typeface="新細明體"/>
+        <a:font script="Arab" typeface="Arial"/>
+        <a:font script="Hebr" typeface="Arial"/>
+        <a:font script="Thai" typeface="Cordia New"/>
+        <a:font script="Ethi" typeface="Nyala"/>
+        <a:font script="Beng" typeface="Vrinda"/>
+        <a:font script="Gujr" typeface="Shruti"/>
+        <a:font script="Khmr" typeface="DaunPenh"/>
+        <a:font script="Knda" typeface="Tunga"/>
+        <a:font script="Guru" typeface="Raavi"/>
+        <a:font script="Cans" typeface="Euphemia"/>
+        <a:font script="Cher" typeface="Plantagenet Cherokee"/>
+        <a:font script="Yiii" typeface="Microsoft Yi Baiti"/>
+        <a:font script="Tibt" typeface="Microsoft Himalaya"/>
+        <a:font script="Thaa" typeface="MV Boli"/>
+        <a:font script="Deva" typeface="Mangal"/>
+        <a:font script="Telu" typeface="Gautami"/>
+        <a:font script="Taml" typeface="Latha"/>
+        <a:font script="Syrc" typeface="Estrangelo Edessa"/>
+        <a:font script="Orya" typeface="Kalinga"/>
+        <a:font script="Mlym" typeface="Kartika"/>
+        <a:font script="Laoo" typeface="DokChampa"/>
+        <a:font script="Sinh" typeface="Iskoola Pota"/>
+        <a:font script="Mong" typeface="Mongolian Baiti"/>
+        <a:font script="Viet" typeface="Arial"/>
+        <a:font script="Uigh" typeface="Microsoft Uighur"/>
+        <a:font script="Geor" typeface="Sylfaen"/>
+      </a:minorFont>
+    </a:fontScheme>
+    <a:fmtScheme name="Office">
+      <a:fillStyleLst>
+        <a:solidFill>
+          <a:schemeClr val="phClr"/>
+        </a:solidFill>
+        <a:gradFill rotWithShape="1">
+          <a:gsLst>
+            <a:gs pos="0">
+              <a:schemeClr val="phClr">
+                <a:lumMod val="110000"/>
+                <a:satMod val="105000"/>
+                <a:tint val="67000"/>
+              </a:schemeClr>
+            </a:gs>
+            <a:gs pos="50000">
+              <a:schemeClr val="phClr">
+                <a:lumMod val="105000"/>
+                <a:satMod val="103000"/>
+                <a:tint val="73000"/>
+              </a:schemeClr>
+            </a:gs>
+            <a:gs pos="100000">
+              <a:schemeClr val="phClr">
+                <a:lumMod val="105000"/>
+                <a:satMod val="109000"/>
+                <a:tint val="81000"/>
+              </a:schemeClr>
+            </a:gs>
+          </a:gsLst>
+          <a:lin ang="5400000" scaled="0"/>
+        </a:gradFill>
+        <a:gradFill rotWithShape="1">
+          <a:gsLst>
+            <a:gs pos="0">
+              <a:schemeClr val="phClr">
+                <a:satMod val="103000"/>
+                <a:lumMod val="102000"/>
+                <a:tint val="94000"/>
+              </a:schemeClr>
+            </a:gs>
+            <a:gs pos="50000">
+              <a:schemeClr val="phClr">
+                <a:satMod val="110000"/>
+                <a:lumMod val="100000"/>
+                <a:shade val="100000"/>
+              </a:schemeClr>
+            </a:gs>
+            <a:gs pos="100000">
+              <a:schemeClr val="phClr">
+                <a:lumMod val="99000"/>
+                <a:satMod val="120000"/>
+                <a:shade val="78000"/>
+              </a:schemeClr>
+            </a:gs>
+          </a:gsLst>
+          <a:lin ang="5400000" scaled="0"/>
+        </a:gradFill>
+      </a:fillStyleLst>
+      <a:lnStyleLst>
+        <a:ln w="6350" cap="flat" cmpd="sng" algn="ctr">
+          <a:solidFill>
+            <a:schemeClr val="phClr"/>
+          </a:solidFill>
+          <a:prstDash val="solid"/>
+          <a:miter lim="800000"/>
+        </a:ln>
+        <a:ln w="12700" cap="flat" cmpd="sng" algn="ctr">
+          <a:solidFill>
+            <a:schemeClr val="phClr"/>
+          </a:solidFill>
+          <a:prstDash val="solid"/>
+          <a:miter lim="800000"/>
+        </a:ln>
+        <a:ln w="19050" cap="flat" cmpd="sng" algn="ctr">
+          <a:solidFill>
+            <a:schemeClr val="phClr"/>
+          </a:solidFill>
+          <a:prstDash val="solid"/>
+          <a:miter lim="800000"/>
+        </a:ln>
+      </a:lnStyleLst>
+      <a:effectStyleLst>
+        <a:effectStyle>
+          <a:effectLst/>
+        </a:effectStyle>
+        <a:effectStyle>
+          <a:effectLst/>
+        </a:effectStyle>
+        <a:effectStyle>
+          <a:effectLst>
+            <a:outerShdw blurRad="57150" dist="19050" dir="5400000" algn="ctr" rotWithShape="0">
+              <a:srgbClr val="000000">
+                <a:alpha val="63000"/>
+              </a:srgbClr>
+            </a:outerShdw>
+          </a:effectLst>
+        </a:effectStyle>
+      </a:effectStyleLst>
+      <a:bgFillStyleLst>
+        <a:solidFill>
+          <a:schemeClr val="phClr"/>
+        </a:solidFill>
+        <a:solidFill>
+          <a:schemeClr val="phClr">
+            <a:tint val="95000"/>
+            <a:satMod val="170000"/>
+          </a:schemeClr>
+        </a:solidFill>
+        <a:gradFill rotWithShape="1">
+          <a:gsLst>
+            <a:gs pos="0">
+              <a:schemeClr val="phClr">
+                <a:tint val="93000"/>
+                <a:satMod val="150000"/>
+                <a:shade val="98000"/>
+                <a:lumMod val="102000"/>
+              </a:schemeClr>
+            </a:gs>
+            <a:gs pos="50000">
+              <a:schemeClr val="phClr">
+                <a:tint val="98000"/>
+                <a:satMod val="130000"/>
+                <a:shade val="90000"/>
+                <a:lumMod val="103000"/>
+              </a:schemeClr>
+            </a:gs>
+            <a:gs pos="100000">
+              <a:schemeClr val="phClr">
+                <a:shade val="63000"/>
+                <a:satMod val="120000"/>
+              </a:schemeClr>
+            </a:gs>
+          </a:gsLst>
+          <a:lin ang="5400000" scaled="0"/>
+        </a:gradFill>
+      </a:bgFillStyleLst>
+    </a:fmtScheme>
+  </a:themeElements>
+  <a:objectDefaults/>
+  <a:extraClrSchemeLst/>
+  <a:extLst>
+    <a:ext uri="{05A4C25C-085E-4340-85A3-A5531E510DB2}">
+      <thm15:themeFamily xmlns:thm15="http://schemas.microsoft.com/office/thememl/2012/main" name="Office Theme" id="{62F939B6-93AF-4DB8-9C6B-D6C7DFDC589F}" vid="{4A3C46E8-61CC-4603-A589-7422A47A8E4A}"/>
+    </a:ext>
+  </a:extLst>
+</a:theme>
 </file>
</xml_diff>

<commit_message>
Changed alphabets from constructors to constants
</commit_message>
<xml_diff>
--- a/Python/biopython.pptx
+++ b/Python/biopython.pptx
@@ -4755,7 +4755,7 @@
                 <a:latin typeface="Courier New" panose="02070309020205020404" pitchFamily="49" charset="0"/>
                 <a:cs typeface="Courier New" panose="02070309020205020404" pitchFamily="49" charset="0"/>
               </a:rPr>
-              <a:t>DNAAlphabet</a:t>
+              <a:t>generic_dna</a:t>
             </a:r>
             <a:r>
               <a:rPr lang="en-US" dirty="0" smtClean="0"/>
@@ -4766,7 +4766,7 @@
                 <a:latin typeface="Courier New" panose="02070309020205020404" pitchFamily="49" charset="0"/>
                 <a:cs typeface="Courier New" panose="02070309020205020404" pitchFamily="49" charset="0"/>
               </a:rPr>
-              <a:t>RNAAlphabet</a:t>
+              <a:t>generic_rna</a:t>
             </a:r>
             <a:r>
               <a:rPr lang="en-US" dirty="0" smtClean="0"/>
@@ -4777,7 +4777,7 @@
                 <a:latin typeface="Courier New" panose="02070309020205020404" pitchFamily="49" charset="0"/>
                 <a:cs typeface="Courier New" panose="02070309020205020404" pitchFamily="49" charset="0"/>
               </a:rPr>
-              <a:t>ProteinAlphabet</a:t>
+              <a:t>generic_protein</a:t>
             </a:r>
             <a:r>
               <a:rPr lang="en-US" dirty="0" smtClean="0"/>
@@ -4980,21 +4980,28 @@
                 <a:latin typeface="Courier New" panose="02070309020205020404" pitchFamily="49" charset="0"/>
                 <a:cs typeface="Courier New" panose="02070309020205020404" pitchFamily="49" charset="0"/>
               </a:rPr>
-              <a:t>Bio.Seq.Alphabet</a:t>
+              <a:t>Bio.Alphabet</a:t>
             </a:r>
             <a:r>
               <a:rPr lang="en-US" dirty="0" smtClean="0">
                 <a:latin typeface="Courier New" panose="02070309020205020404" pitchFamily="49" charset="0"/>
                 <a:cs typeface="Courier New" panose="02070309020205020404" pitchFamily="49" charset="0"/>
               </a:rPr>
-              <a:t> import </a:t>
+              <a:t> </a:t>
+            </a:r>
+            <a:r>
+              <a:rPr lang="en-US" dirty="0" smtClean="0">
+                <a:latin typeface="Courier New" panose="02070309020205020404" pitchFamily="49" charset="0"/>
+                <a:cs typeface="Courier New" panose="02070309020205020404" pitchFamily="49" charset="0"/>
+              </a:rPr>
+              <a:t>import </a:t>
             </a:r>
             <a:r>
               <a:rPr lang="en-US" dirty="0" err="1" smtClean="0">
                 <a:latin typeface="Courier New" panose="02070309020205020404" pitchFamily="49" charset="0"/>
                 <a:cs typeface="Courier New" panose="02070309020205020404" pitchFamily="49" charset="0"/>
               </a:rPr>
-              <a:t>DNAAlphabet</a:t>
+              <a:t>generic_dna</a:t>
             </a:r>
             <a:endParaRPr lang="en-US" dirty="0" smtClean="0">
               <a:latin typeface="Courier New" panose="02070309020205020404" pitchFamily="49" charset="0"/>
@@ -5065,8 +5072,12 @@
                 <a:latin typeface="Courier New" panose="02070309020205020404" pitchFamily="49" charset="0"/>
                 <a:cs typeface="Courier New" panose="02070309020205020404" pitchFamily="49" charset="0"/>
               </a:rPr>
-              <a:t>'</a:t>
-            </a:r>
+              <a:t>',</a:t>
+            </a:r>
+            <a:endParaRPr lang="en-US" dirty="0" smtClean="0">
+              <a:latin typeface="Courier New" panose="02070309020205020404" pitchFamily="49" charset="0"/>
+              <a:cs typeface="Courier New" panose="02070309020205020404" pitchFamily="49" charset="0"/>
+            </a:endParaRPr>
           </a:p>
           <a:p>
             <a:r>
@@ -5095,14 +5106,14 @@
                 <a:latin typeface="Courier New" panose="02070309020205020404" pitchFamily="49" charset="0"/>
                 <a:cs typeface="Courier New" panose="02070309020205020404" pitchFamily="49" charset="0"/>
               </a:rPr>
-              <a:t>DNAAlphabet</a:t>
+              <a:t>generic_dna</a:t>
             </a:r>
             <a:r>
               <a:rPr lang="en-US" dirty="0" smtClean="0">
                 <a:latin typeface="Courier New" panose="02070309020205020404" pitchFamily="49" charset="0"/>
                 <a:cs typeface="Courier New" panose="02070309020205020404" pitchFamily="49" charset="0"/>
               </a:rPr>
-              <a:t>())</a:t>
+              <a:t>)</a:t>
             </a:r>
             <a:endParaRPr lang="en-US" dirty="0">
               <a:latin typeface="Courier New" panose="02070309020205020404" pitchFamily="49" charset="0"/>
@@ -5974,8 +5985,8 @@
         </p:nvSpPr>
         <p:spPr>
           <a:xfrm>
-            <a:off x="990600" y="3401280"/>
-            <a:ext cx="7353295" cy="1200329"/>
+            <a:off x="990599" y="3401280"/>
+            <a:ext cx="6833751" cy="1200329"/>
           </a:xfrm>
           <a:prstGeom prst="rect">
             <a:avLst/>
@@ -5992,7 +6003,7 @@
           </a:ln>
         </p:spPr>
         <p:txBody>
-          <a:bodyPr wrap="none" rtlCol="0">
+          <a:bodyPr wrap="square" rtlCol="0">
             <a:spAutoFit/>
           </a:bodyPr>
           <a:lstStyle/>
@@ -6036,6 +6047,33 @@
                 <a:latin typeface="Courier New" panose="02070309020205020404" pitchFamily="49" charset="0"/>
                 <a:cs typeface="Courier New" panose="02070309020205020404" pitchFamily="49" charset="0"/>
               </a:rPr>
+              <a:t>from </a:t>
+            </a:r>
+            <a:r>
+              <a:rPr lang="en-US" dirty="0" err="1" smtClean="0">
+                <a:latin typeface="Courier New" panose="02070309020205020404" pitchFamily="49" charset="0"/>
+                <a:cs typeface="Courier New" panose="02070309020205020404" pitchFamily="49" charset="0"/>
+              </a:rPr>
+              <a:t>Bio.Alphabet</a:t>
+            </a:r>
+            <a:r>
+              <a:rPr lang="en-US" dirty="0" smtClean="0">
+                <a:latin typeface="Courier New" panose="02070309020205020404" pitchFamily="49" charset="0"/>
+                <a:cs typeface="Courier New" panose="02070309020205020404" pitchFamily="49" charset="0"/>
+              </a:rPr>
+              <a:t> import IUPAC</a:t>
+            </a:r>
+            <a:endParaRPr lang="en-US" dirty="0" smtClean="0">
+              <a:latin typeface="Courier New" panose="02070309020205020404" pitchFamily="49" charset="0"/>
+              <a:cs typeface="Courier New" panose="02070309020205020404" pitchFamily="49" charset="0"/>
+            </a:endParaRPr>
+          </a:p>
+          <a:p>
+            <a:r>
+              <a:rPr lang="en-US" dirty="0" smtClean="0">
+                <a:latin typeface="Courier New" panose="02070309020205020404" pitchFamily="49" charset="0"/>
+                <a:cs typeface="Courier New" panose="02070309020205020404" pitchFamily="49" charset="0"/>
+              </a:rPr>
               <a:t>…</a:t>
             </a:r>
           </a:p>
@@ -6073,25 +6111,16 @@
                 <a:latin typeface="Courier New" panose="02070309020205020404" pitchFamily="49" charset="0"/>
                 <a:cs typeface="Courier New" panose="02070309020205020404" pitchFamily="49" charset="0"/>
               </a:rPr>
-              <a:t>Bio.Alphabet.DNAAlphabet</a:t>
+              <a:t>IUPAC.unambiguous_dna</a:t>
             </a:r>
             <a:r>
               <a:rPr lang="en-US" dirty="0" smtClean="0">
                 <a:latin typeface="Courier New" panose="02070309020205020404" pitchFamily="49" charset="0"/>
                 <a:cs typeface="Courier New" panose="02070309020205020404" pitchFamily="49" charset="0"/>
               </a:rPr>
-              <a:t>())</a:t>
-            </a:r>
-          </a:p>
-          <a:p>
-            <a:r>
-              <a:rPr lang="en-US" dirty="0" smtClean="0">
-                <a:latin typeface="Courier New" panose="02070309020205020404" pitchFamily="49" charset="0"/>
-                <a:cs typeface="Courier New" panose="02070309020205020404" pitchFamily="49" charset="0"/>
-              </a:rPr>
-              <a:t>…</a:t>
-            </a:r>
-            <a:endParaRPr lang="en-US" dirty="0">
+              <a:t>)</a:t>
+            </a:r>
+            <a:endParaRPr lang="en-US" dirty="0" smtClean="0">
               <a:latin typeface="Courier New" panose="02070309020205020404" pitchFamily="49" charset="0"/>
               <a:cs typeface="Courier New" panose="02070309020205020404" pitchFamily="49" charset="0"/>
             </a:endParaRPr>

</xml_diff>

<commit_message>
Added slide on Entrez
</commit_message>
<xml_diff>
--- a/Python/biopython.pptx
+++ b/Python/biopython.pptx
@@ -5,7 +5,7 @@
     <p:sldMasterId id="2147483660" r:id="rId1"/>
   </p:sldMasterIdLst>
   <p:notesMasterIdLst>
-    <p:notesMasterId r:id="rId12"/>
+    <p:notesMasterId r:id="rId14"/>
   </p:notesMasterIdLst>
   <p:sldIdLst>
     <p:sldId id="256" r:id="rId2"/>
@@ -18,6 +18,8 @@
     <p:sldId id="263" r:id="rId9"/>
     <p:sldId id="261" r:id="rId10"/>
     <p:sldId id="265" r:id="rId11"/>
+    <p:sldId id="266" r:id="rId12"/>
+    <p:sldId id="267" r:id="rId13"/>
   </p:sldIdLst>
   <p:sldSz cx="9144000" cy="6858000" type="screen4x3"/>
   <p:notesSz cx="6858000" cy="9144000"/>
@@ -206,7 +208,7 @@
           <a:p>
             <a:fld id="{E50739E9-DC4A-4901-8195-7CE430F840D8}" type="datetimeFigureOut">
               <a:rPr lang="en-US" smtClean="0"/>
-              <a:t>2016-06-28</a:t>
+              <a:t>2016-06-30</a:t>
             </a:fld>
             <a:endParaRPr lang="en-US"/>
           </a:p>
@@ -689,7 +691,7 @@
           <a:p>
             <a:fld id="{EBC2714F-B822-455B-B016-0228B6AA8BE9}" type="datetime1">
               <a:rPr lang="en-US" smtClean="0"/>
-              <a:t>2016-06-28</a:t>
+              <a:t>2016-06-30</a:t>
             </a:fld>
             <a:endParaRPr lang="en-US"/>
           </a:p>
@@ -859,7 +861,7 @@
           <a:p>
             <a:fld id="{F3822F19-B516-497C-9005-1997989AD109}" type="datetime1">
               <a:rPr lang="en-US" smtClean="0"/>
-              <a:t>2016-06-28</a:t>
+              <a:t>2016-06-30</a:t>
             </a:fld>
             <a:endParaRPr lang="en-US"/>
           </a:p>
@@ -1039,7 +1041,7 @@
           <a:p>
             <a:fld id="{DC6E6076-3AC8-4591-A5B3-5701E86BC391}" type="datetime1">
               <a:rPr lang="en-US" smtClean="0"/>
-              <a:t>2016-06-28</a:t>
+              <a:t>2016-06-30</a:t>
             </a:fld>
             <a:endParaRPr lang="en-US"/>
           </a:p>
@@ -1209,7 +1211,7 @@
           <a:p>
             <a:fld id="{10101B39-3B57-4A7B-8CB6-E6BDB118061D}" type="datetime1">
               <a:rPr lang="en-US" smtClean="0"/>
-              <a:t>2016-06-28</a:t>
+              <a:t>2016-06-30</a:t>
             </a:fld>
             <a:endParaRPr lang="en-US"/>
           </a:p>
@@ -1453,7 +1455,7 @@
           <a:p>
             <a:fld id="{C27B26EE-8ECF-4FF3-9A38-87EFFDA62A28}" type="datetime1">
               <a:rPr lang="en-US" smtClean="0"/>
-              <a:t>2016-06-28</a:t>
+              <a:t>2016-06-30</a:t>
             </a:fld>
             <a:endParaRPr lang="en-US"/>
           </a:p>
@@ -1685,7 +1687,7 @@
           <a:p>
             <a:fld id="{6742683C-23EC-4C0D-AC9A-17C98B40DAA7}" type="datetime1">
               <a:rPr lang="en-US" smtClean="0"/>
-              <a:t>2016-06-28</a:t>
+              <a:t>2016-06-30</a:t>
             </a:fld>
             <a:endParaRPr lang="en-US"/>
           </a:p>
@@ -2052,7 +2054,7 @@
           <a:p>
             <a:fld id="{61B639F5-7095-4C4C-8D13-AB3C116C2681}" type="datetime1">
               <a:rPr lang="en-US" smtClean="0"/>
-              <a:t>2016-06-28</a:t>
+              <a:t>2016-06-30</a:t>
             </a:fld>
             <a:endParaRPr lang="en-US"/>
           </a:p>
@@ -2170,7 +2172,7 @@
           <a:p>
             <a:fld id="{565C75B5-128F-4C63-85A2-EABB3B9088B2}" type="datetime1">
               <a:rPr lang="en-US" smtClean="0"/>
-              <a:t>2016-06-28</a:t>
+              <a:t>2016-06-30</a:t>
             </a:fld>
             <a:endParaRPr lang="en-US"/>
           </a:p>
@@ -2265,7 +2267,7 @@
           <a:p>
             <a:fld id="{EB500747-7144-41D3-89B7-0E40926A8757}" type="datetime1">
               <a:rPr lang="en-US" smtClean="0"/>
-              <a:t>2016-06-28</a:t>
+              <a:t>2016-06-30</a:t>
             </a:fld>
             <a:endParaRPr lang="en-US"/>
           </a:p>
@@ -2542,7 +2544,7 @@
           <a:p>
             <a:fld id="{09A9D774-0B51-4CD9-9147-A6BD4D353F07}" type="datetime1">
               <a:rPr lang="en-US" smtClean="0"/>
-              <a:t>2016-06-28</a:t>
+              <a:t>2016-06-30</a:t>
             </a:fld>
             <a:endParaRPr lang="en-US"/>
           </a:p>
@@ -2799,7 +2801,7 @@
           <a:p>
             <a:fld id="{2618F069-DB72-4F16-8512-37A179AE1774}" type="datetime1">
               <a:rPr lang="en-US" smtClean="0"/>
-              <a:t>2016-06-28</a:t>
+              <a:t>2016-06-30</a:t>
             </a:fld>
             <a:endParaRPr lang="en-US"/>
           </a:p>
@@ -3012,7 +3014,7 @@
           <a:p>
             <a:fld id="{7784AB71-9685-428C-BE48-FB64D9C8B81F}" type="datetime1">
               <a:rPr lang="en-US" smtClean="0"/>
-              <a:t>2016-06-28</a:t>
+              <a:t>2016-06-30</a:t>
             </a:fld>
             <a:endParaRPr lang="en-US"/>
           </a:p>
@@ -3956,6 +3958,71 @@
                 <a:latin typeface="Courier New" panose="02070309020205020404" pitchFamily="49" charset="0"/>
                 <a:cs typeface="Courier New" panose="02070309020205020404" pitchFamily="49" charset="0"/>
               </a:rPr>
+              <a:t>    </a:t>
+            </a:r>
+            <a:r>
+              <a:rPr lang="en-US" dirty="0" err="1" smtClean="0">
+                <a:latin typeface="Courier New" panose="02070309020205020404" pitchFamily="49" charset="0"/>
+                <a:cs typeface="Courier New" panose="02070309020205020404" pitchFamily="49" charset="0"/>
+              </a:rPr>
+              <a:t>SeqIO.write</a:t>
+            </a:r>
+            <a:r>
+              <a:rPr lang="en-US" dirty="0" smtClean="0">
+                <a:latin typeface="Courier New" panose="02070309020205020404" pitchFamily="49" charset="0"/>
+                <a:cs typeface="Courier New" panose="02070309020205020404" pitchFamily="49" charset="0"/>
+              </a:rPr>
+              <a:t>(</a:t>
+            </a:r>
+            <a:r>
+              <a:rPr lang="en-US" dirty="0" err="1" smtClean="0">
+                <a:latin typeface="Courier New" panose="02070309020205020404" pitchFamily="49" charset="0"/>
+                <a:cs typeface="Courier New" panose="02070309020205020404" pitchFamily="49" charset="0"/>
+              </a:rPr>
+              <a:t>seq_record</a:t>
+            </a:r>
+            <a:r>
+              <a:rPr lang="en-US" dirty="0" smtClean="0">
+                <a:latin typeface="Courier New" panose="02070309020205020404" pitchFamily="49" charset="0"/>
+                <a:cs typeface="Courier New" panose="02070309020205020404" pitchFamily="49" charset="0"/>
+              </a:rPr>
+              <a:t>, </a:t>
+            </a:r>
+            <a:r>
+              <a:rPr lang="en-US" dirty="0" err="1" smtClean="0">
+                <a:latin typeface="Courier New" panose="02070309020205020404" pitchFamily="49" charset="0"/>
+                <a:cs typeface="Courier New" panose="02070309020205020404" pitchFamily="49" charset="0"/>
+              </a:rPr>
+              <a:t>p_file</a:t>
+            </a:r>
+            <a:r>
+              <a:rPr lang="en-US" dirty="0" smtClean="0">
+                <a:latin typeface="Courier New" panose="02070309020205020404" pitchFamily="49" charset="0"/>
+                <a:cs typeface="Courier New" panose="02070309020205020404" pitchFamily="49" charset="0"/>
+              </a:rPr>
+              <a:t>, '</a:t>
+            </a:r>
+            <a:r>
+              <a:rPr lang="en-US" dirty="0" err="1" smtClean="0">
+                <a:latin typeface="Courier New" panose="02070309020205020404" pitchFamily="49" charset="0"/>
+                <a:cs typeface="Courier New" panose="02070309020205020404" pitchFamily="49" charset="0"/>
+              </a:rPr>
+              <a:t>fasta</a:t>
+            </a:r>
+            <a:r>
+              <a:rPr lang="en-US" dirty="0" smtClean="0">
+                <a:latin typeface="Courier New" panose="02070309020205020404" pitchFamily="49" charset="0"/>
+                <a:cs typeface="Courier New" panose="02070309020205020404" pitchFamily="49" charset="0"/>
+              </a:rPr>
+              <a:t>')</a:t>
+            </a:r>
+          </a:p>
+          <a:p>
+            <a:r>
+              <a:rPr lang="en-US" dirty="0">
+                <a:latin typeface="Courier New" panose="02070309020205020404" pitchFamily="49" charset="0"/>
+                <a:cs typeface="Courier New" panose="02070309020205020404" pitchFamily="49" charset="0"/>
+              </a:rPr>
               <a:t> </a:t>
             </a:r>
             <a:r>
@@ -3963,84 +4030,8 @@
                 <a:latin typeface="Courier New" panose="02070309020205020404" pitchFamily="49" charset="0"/>
                 <a:cs typeface="Courier New" panose="02070309020205020404" pitchFamily="49" charset="0"/>
               </a:rPr>
-              <a:t>   </a:t>
-            </a:r>
-            <a:r>
-              <a:rPr lang="en-US" dirty="0" err="1" smtClean="0">
-                <a:latin typeface="Courier New" panose="02070309020205020404" pitchFamily="49" charset="0"/>
-                <a:cs typeface="Courier New" panose="02070309020205020404" pitchFamily="49" charset="0"/>
-              </a:rPr>
-              <a:t>SeqIO.write</a:t>
-            </a:r>
-            <a:r>
-              <a:rPr lang="en-US" dirty="0" smtClean="0">
-                <a:latin typeface="Courier New" panose="02070309020205020404" pitchFamily="49" charset="0"/>
-                <a:cs typeface="Courier New" panose="02070309020205020404" pitchFamily="49" charset="0"/>
-              </a:rPr>
-              <a:t>(</a:t>
-            </a:r>
-            <a:r>
-              <a:rPr lang="en-US" dirty="0" err="1" smtClean="0">
-                <a:latin typeface="Courier New" panose="02070309020205020404" pitchFamily="49" charset="0"/>
-                <a:cs typeface="Courier New" panose="02070309020205020404" pitchFamily="49" charset="0"/>
-              </a:rPr>
-              <a:t>seq_record</a:t>
-            </a:r>
-            <a:r>
-              <a:rPr lang="en-US" dirty="0" smtClean="0">
-                <a:latin typeface="Courier New" panose="02070309020205020404" pitchFamily="49" charset="0"/>
-                <a:cs typeface="Courier New" panose="02070309020205020404" pitchFamily="49" charset="0"/>
-              </a:rPr>
-              <a:t>, </a:t>
-            </a:r>
-            <a:r>
-              <a:rPr lang="en-US" dirty="0" err="1" smtClean="0">
-                <a:latin typeface="Courier New" panose="02070309020205020404" pitchFamily="49" charset="0"/>
-                <a:cs typeface="Courier New" panose="02070309020205020404" pitchFamily="49" charset="0"/>
-              </a:rPr>
-              <a:t>p_file</a:t>
-            </a:r>
-            <a:r>
-              <a:rPr lang="en-US" dirty="0" smtClean="0">
-                <a:latin typeface="Courier New" panose="02070309020205020404" pitchFamily="49" charset="0"/>
-                <a:cs typeface="Courier New" panose="02070309020205020404" pitchFamily="49" charset="0"/>
-              </a:rPr>
-              <a:t>, '</a:t>
-            </a:r>
-            <a:r>
-              <a:rPr lang="en-US" dirty="0" err="1" smtClean="0">
-                <a:latin typeface="Courier New" panose="02070309020205020404" pitchFamily="49" charset="0"/>
-                <a:cs typeface="Courier New" panose="02070309020205020404" pitchFamily="49" charset="0"/>
-              </a:rPr>
-              <a:t>fasta</a:t>
-            </a:r>
-            <a:r>
-              <a:rPr lang="en-US" dirty="0" smtClean="0">
-                <a:latin typeface="Courier New" panose="02070309020205020404" pitchFamily="49" charset="0"/>
-                <a:cs typeface="Courier New" panose="02070309020205020404" pitchFamily="49" charset="0"/>
-              </a:rPr>
-              <a:t>')</a:t>
-            </a:r>
-          </a:p>
-          <a:p>
-            <a:r>
-              <a:rPr lang="en-US" dirty="0">
-                <a:latin typeface="Courier New" panose="02070309020205020404" pitchFamily="49" charset="0"/>
-                <a:cs typeface="Courier New" panose="02070309020205020404" pitchFamily="49" charset="0"/>
-              </a:rPr>
-              <a:t> </a:t>
-            </a:r>
-            <a:r>
-              <a:rPr lang="en-US" dirty="0" smtClean="0">
-                <a:latin typeface="Courier New" panose="02070309020205020404" pitchFamily="49" charset="0"/>
-                <a:cs typeface="Courier New" panose="02070309020205020404" pitchFamily="49" charset="0"/>
-              </a:rPr>
               <a:t>   …</a:t>
             </a:r>
-            <a:endParaRPr lang="en-US" dirty="0" smtClean="0">
-              <a:latin typeface="Courier New" panose="02070309020205020404" pitchFamily="49" charset="0"/>
-              <a:cs typeface="Courier New" panose="02070309020205020404" pitchFamily="49" charset="0"/>
-            </a:endParaRPr>
           </a:p>
         </p:txBody>
       </p:sp>
@@ -4103,10 +4094,6 @@
               </a:rPr>
               <a:t>)</a:t>
             </a:r>
-            <a:endParaRPr lang="en-US" dirty="0" smtClean="0">
-              <a:latin typeface="Courier New" panose="02070309020205020404" pitchFamily="49" charset="0"/>
-              <a:cs typeface="Courier New" panose="02070309020205020404" pitchFamily="49" charset="0"/>
-            </a:endParaRPr>
           </a:p>
         </p:txBody>
       </p:sp>
@@ -4292,6 +4279,303 @@
 </p:sld>
 </file>
 
+<file path=ppt/slides/slide11.xml><?xml version="1.0" encoding="utf-8"?>
+<p:sld xmlns:a="http://schemas.openxmlformats.org/drawingml/2006/main" xmlns:r="http://schemas.openxmlformats.org/officeDocument/2006/relationships" xmlns:p="http://schemas.openxmlformats.org/presentationml/2006/main">
+  <p:cSld>
+    <p:spTree>
+      <p:nvGrpSpPr>
+        <p:cNvPr id="1" name=""/>
+        <p:cNvGrpSpPr/>
+        <p:nvPr/>
+      </p:nvGrpSpPr>
+      <p:grpSpPr>
+        <a:xfrm>
+          <a:off x="0" y="0"/>
+          <a:ext cx="0" cy="0"/>
+          <a:chOff x="0" y="0"/>
+          <a:chExt cx="0" cy="0"/>
+        </a:xfrm>
+      </p:grpSpPr>
+      <p:sp>
+        <p:nvSpPr>
+          <p:cNvPr id="2" name="Title 1"/>
+          <p:cNvSpPr>
+            <a:spLocks noGrp="1"/>
+          </p:cNvSpPr>
+          <p:nvPr>
+            <p:ph type="title"/>
+          </p:nvPr>
+        </p:nvSpPr>
+        <p:spPr/>
+        <p:txBody>
+          <a:bodyPr/>
+          <a:lstStyle/>
+          <a:p>
+            <a:r>
+              <a:rPr lang="en-US" dirty="0" smtClean="0"/>
+              <a:t>Databases</a:t>
+            </a:r>
+            <a:endParaRPr lang="en-US" dirty="0"/>
+          </a:p>
+        </p:txBody>
+      </p:sp>
+      <p:sp>
+        <p:nvSpPr>
+          <p:cNvPr id="3" name="Text Placeholder 2"/>
+          <p:cNvSpPr>
+            <a:spLocks noGrp="1"/>
+          </p:cNvSpPr>
+          <p:nvPr>
+            <p:ph type="body" idx="1"/>
+          </p:nvPr>
+        </p:nvSpPr>
+        <p:spPr/>
+        <p:txBody>
+          <a:bodyPr/>
+          <a:lstStyle/>
+          <a:p>
+            <a:endParaRPr lang="en-US"/>
+          </a:p>
+        </p:txBody>
+      </p:sp>
+      <p:sp>
+        <p:nvSpPr>
+          <p:cNvPr id="4" name="Slide Number Placeholder 3"/>
+          <p:cNvSpPr>
+            <a:spLocks noGrp="1"/>
+          </p:cNvSpPr>
+          <p:nvPr>
+            <p:ph type="sldNum" sz="quarter" idx="12"/>
+          </p:nvPr>
+        </p:nvSpPr>
+        <p:spPr/>
+        <p:txBody>
+          <a:bodyPr/>
+          <a:lstStyle/>
+          <a:p>
+            <a:fld id="{CA586AD6-E5F2-4F25-940D-C674496063E2}" type="slidenum">
+              <a:rPr lang="en-US" smtClean="0"/>
+              <a:t>11</a:t>
+            </a:fld>
+            <a:endParaRPr lang="en-US"/>
+          </a:p>
+        </p:txBody>
+      </p:sp>
+    </p:spTree>
+    <p:extLst>
+      <p:ext uri="{BB962C8B-B14F-4D97-AF65-F5344CB8AC3E}">
+        <p14:creationId xmlns:p14="http://schemas.microsoft.com/office/powerpoint/2010/main" val="2474631419"/>
+      </p:ext>
+    </p:extLst>
+  </p:cSld>
+  <p:clrMapOvr>
+    <a:masterClrMapping/>
+  </p:clrMapOvr>
+  <p:timing>
+    <p:tnLst>
+      <p:par>
+        <p:cTn id="1" dur="indefinite" restart="never" nodeType="tmRoot"/>
+      </p:par>
+    </p:tnLst>
+  </p:timing>
+</p:sld>
+</file>
+
+<file path=ppt/slides/slide12.xml><?xml version="1.0" encoding="utf-8"?>
+<p:sld xmlns:a="http://schemas.openxmlformats.org/drawingml/2006/main" xmlns:r="http://schemas.openxmlformats.org/officeDocument/2006/relationships" xmlns:p="http://schemas.openxmlformats.org/presentationml/2006/main">
+  <p:cSld>
+    <p:spTree>
+      <p:nvGrpSpPr>
+        <p:cNvPr id="1" name=""/>
+        <p:cNvGrpSpPr/>
+        <p:nvPr/>
+      </p:nvGrpSpPr>
+      <p:grpSpPr>
+        <a:xfrm>
+          <a:off x="0" y="0"/>
+          <a:ext cx="0" cy="0"/>
+          <a:chOff x="0" y="0"/>
+          <a:chExt cx="0" cy="0"/>
+        </a:xfrm>
+      </p:grpSpPr>
+      <p:sp>
+        <p:nvSpPr>
+          <p:cNvPr id="5" name="Title 4"/>
+          <p:cNvSpPr>
+            <a:spLocks noGrp="1"/>
+          </p:cNvSpPr>
+          <p:nvPr>
+            <p:ph type="title"/>
+          </p:nvPr>
+        </p:nvSpPr>
+        <p:spPr/>
+        <p:txBody>
+          <a:bodyPr/>
+          <a:lstStyle/>
+          <a:p>
+            <a:r>
+              <a:rPr lang="en-US" dirty="0" err="1" smtClean="0"/>
+              <a:t>Entrez</a:t>
+            </a:r>
+            <a:endParaRPr lang="en-US" dirty="0"/>
+          </a:p>
+        </p:txBody>
+      </p:sp>
+      <p:sp>
+        <p:nvSpPr>
+          <p:cNvPr id="6" name="Content Placeholder 5"/>
+          <p:cNvSpPr>
+            <a:spLocks noGrp="1"/>
+          </p:cNvSpPr>
+          <p:nvPr>
+            <p:ph idx="1"/>
+          </p:nvPr>
+        </p:nvSpPr>
+        <p:spPr/>
+        <p:txBody>
+          <a:bodyPr/>
+          <a:lstStyle/>
+          <a:p>
+            <a:r>
+              <a:rPr lang="en-US" dirty="0" smtClean="0"/>
+              <a:t>NCBI databases</a:t>
+            </a:r>
+          </a:p>
+          <a:p>
+            <a:pPr lvl="1"/>
+            <a:r>
+              <a:rPr lang="en-US" dirty="0" err="1" smtClean="0"/>
+              <a:t>GenBank</a:t>
+            </a:r>
+            <a:r>
+              <a:rPr lang="en-US" dirty="0" smtClean="0"/>
+              <a:t>: sequences</a:t>
+            </a:r>
+          </a:p>
+          <a:p>
+            <a:pPr lvl="1"/>
+            <a:r>
+              <a:rPr lang="en-US" dirty="0" smtClean="0"/>
+              <a:t>PubMed: publications</a:t>
+            </a:r>
+          </a:p>
+          <a:p>
+            <a:pPr lvl="1"/>
+            <a:r>
+              <a:rPr lang="en-US" dirty="0" smtClean="0"/>
+              <a:t>GEO</a:t>
+            </a:r>
+          </a:p>
+          <a:p>
+            <a:r>
+              <a:rPr lang="en-US" dirty="0" smtClean="0"/>
+              <a:t>Guidelines</a:t>
+            </a:r>
+          </a:p>
+          <a:p>
+            <a:pPr lvl="1"/>
+            <a:r>
+              <a:rPr lang="en-US" dirty="0" smtClean="0"/>
+              <a:t>+100 requests: outside (US) peak hours</a:t>
+            </a:r>
+          </a:p>
+          <a:p>
+            <a:pPr lvl="1"/>
+            <a:r>
+              <a:rPr lang="en-US" dirty="0" smtClean="0"/>
+              <a:t>No more than 3 requests/second</a:t>
+            </a:r>
+          </a:p>
+          <a:p>
+            <a:pPr lvl="1"/>
+            <a:r>
+              <a:rPr lang="en-US" dirty="0" smtClean="0"/>
+              <a:t>Use email parameter</a:t>
+            </a:r>
+          </a:p>
+          <a:p>
+            <a:endParaRPr lang="en-US" dirty="0"/>
+          </a:p>
+        </p:txBody>
+      </p:sp>
+      <p:sp>
+        <p:nvSpPr>
+          <p:cNvPr id="4" name="Slide Number Placeholder 3"/>
+          <p:cNvSpPr>
+            <a:spLocks noGrp="1"/>
+          </p:cNvSpPr>
+          <p:nvPr>
+            <p:ph type="sldNum" sz="quarter" idx="12"/>
+          </p:nvPr>
+        </p:nvSpPr>
+        <p:spPr/>
+        <p:txBody>
+          <a:bodyPr/>
+          <a:lstStyle/>
+          <a:p>
+            <a:fld id="{CA586AD6-E5F2-4F25-940D-C674496063E2}" type="slidenum">
+              <a:rPr lang="en-US" smtClean="0"/>
+              <a:t>12</a:t>
+            </a:fld>
+            <a:endParaRPr lang="en-US"/>
+          </a:p>
+        </p:txBody>
+      </p:sp>
+      <p:sp>
+        <p:nvSpPr>
+          <p:cNvPr id="7" name="TextBox 6"/>
+          <p:cNvSpPr txBox="1"/>
+          <p:nvPr/>
+        </p:nvSpPr>
+        <p:spPr>
+          <a:xfrm>
+            <a:off x="1537857" y="5642263"/>
+            <a:ext cx="6009979" cy="584775"/>
+          </a:xfrm>
+          <a:prstGeom prst="rect">
+            <a:avLst/>
+          </a:prstGeom>
+          <a:noFill/>
+          <a:ln>
+            <a:solidFill>
+              <a:schemeClr val="tx1"/>
+            </a:solidFill>
+          </a:ln>
+        </p:spPr>
+        <p:txBody>
+          <a:bodyPr wrap="none" rtlCol="0">
+            <a:spAutoFit/>
+          </a:bodyPr>
+          <a:lstStyle/>
+          <a:p>
+            <a:r>
+              <a:rPr lang="en-US" sz="3200" dirty="0" smtClean="0"/>
+              <a:t>Be responsible: it's a research tool!</a:t>
+            </a:r>
+            <a:endParaRPr lang="en-US" sz="3200" dirty="0"/>
+          </a:p>
+        </p:txBody>
+      </p:sp>
+    </p:spTree>
+    <p:extLst>
+      <p:ext uri="{BB962C8B-B14F-4D97-AF65-F5344CB8AC3E}">
+        <p14:creationId xmlns:p14="http://schemas.microsoft.com/office/powerpoint/2010/main" val="2222741673"/>
+      </p:ext>
+    </p:extLst>
+  </p:cSld>
+  <p:clrMapOvr>
+    <a:masterClrMapping/>
+  </p:clrMapOvr>
+  <p:timing>
+    <p:tnLst>
+      <p:par>
+        <p:cTn id="1" dur="indefinite" restart="never" nodeType="tmRoot"/>
+      </p:par>
+    </p:tnLst>
+  </p:timing>
+</p:sld>
+</file>
+
 <file path=ppt/slides/slide2.xml><?xml version="1.0" encoding="utf-8"?>
 <p:sld xmlns:a="http://schemas.openxmlformats.org/drawingml/2006/main" xmlns:r="http://schemas.openxmlformats.org/officeDocument/2006/relationships" xmlns:p="http://schemas.openxmlformats.org/presentationml/2006/main">
   <p:cSld>
@@ -4353,11 +4637,7 @@
             </a:r>
             <a:r>
               <a:rPr lang="en-US" dirty="0" smtClean="0"/>
-              <a:t> </a:t>
-            </a:r>
-            <a:r>
-              <a:rPr lang="en-US" dirty="0" smtClean="0"/>
-              <a:t>provides</a:t>
+              <a:t> provides</a:t>
             </a:r>
           </a:p>
           <a:p>
@@ -4781,11 +5061,7 @@
             </a:r>
             <a:r>
               <a:rPr lang="en-US" dirty="0" smtClean="0"/>
-              <a:t>, </a:t>
-            </a:r>
-            <a:r>
-              <a:rPr lang="en-US" dirty="0" smtClean="0"/>
-              <a:t>…</a:t>
+              <a:t>, …</a:t>
             </a:r>
             <a:endParaRPr lang="en-US" dirty="0"/>
           </a:p>
@@ -4987,14 +5263,7 @@
                 <a:latin typeface="Courier New" panose="02070309020205020404" pitchFamily="49" charset="0"/>
                 <a:cs typeface="Courier New" panose="02070309020205020404" pitchFamily="49" charset="0"/>
               </a:rPr>
-              <a:t> </a:t>
-            </a:r>
-            <a:r>
-              <a:rPr lang="en-US" dirty="0" smtClean="0">
-                <a:latin typeface="Courier New" panose="02070309020205020404" pitchFamily="49" charset="0"/>
-                <a:cs typeface="Courier New" panose="02070309020205020404" pitchFamily="49" charset="0"/>
-              </a:rPr>
-              <a:t>import </a:t>
+              <a:t> import </a:t>
             </a:r>
             <a:r>
               <a:rPr lang="en-US" dirty="0" err="1" smtClean="0">
@@ -5074,10 +5343,6 @@
               </a:rPr>
               <a:t>',</a:t>
             </a:r>
-            <a:endParaRPr lang="en-US" dirty="0" smtClean="0">
-              <a:latin typeface="Courier New" panose="02070309020205020404" pitchFamily="49" charset="0"/>
-              <a:cs typeface="Courier New" panose="02070309020205020404" pitchFamily="49" charset="0"/>
-            </a:endParaRPr>
           </a:p>
           <a:p>
             <a:r>
@@ -5092,14 +5357,7 @@
                 <a:latin typeface="Courier New" panose="02070309020205020404" pitchFamily="49" charset="0"/>
                 <a:cs typeface="Courier New" panose="02070309020205020404" pitchFamily="49" charset="0"/>
               </a:rPr>
-              <a:t>                         </a:t>
-            </a:r>
-            <a:r>
-              <a:rPr lang="en-US" dirty="0" smtClean="0">
-                <a:latin typeface="Courier New" panose="02070309020205020404" pitchFamily="49" charset="0"/>
-                <a:cs typeface="Courier New" panose="02070309020205020404" pitchFamily="49" charset="0"/>
-              </a:rPr>
-              <a:t>alphabet=</a:t>
+              <a:t>                         alphabet=</a:t>
             </a:r>
             <a:r>
               <a:rPr lang="en-US" dirty="0" err="1" smtClean="0">
@@ -5934,11 +6192,7 @@
           <a:p>
             <a:r>
               <a:rPr lang="en-US" dirty="0" smtClean="0"/>
-              <a:t>Create new </a:t>
-            </a:r>
-            <a:r>
-              <a:rPr lang="en-US" dirty="0" smtClean="0"/>
-              <a:t>sequence</a:t>
+              <a:t>Create new sequence</a:t>
             </a:r>
           </a:p>
           <a:p>
@@ -5964,7 +6218,6 @@
               <a:rPr lang="en-US" dirty="0" smtClean="0"/>
               <a:t>Slicing to produce subsequence</a:t>
             </a:r>
-            <a:endParaRPr lang="en-US" dirty="0" smtClean="0"/>
           </a:p>
           <a:p>
             <a:endParaRPr lang="en-US" dirty="0"/>
@@ -6063,10 +6316,6 @@
               </a:rPr>
               <a:t> import IUPAC</a:t>
             </a:r>
-            <a:endParaRPr lang="en-US" dirty="0" smtClean="0">
-              <a:latin typeface="Courier New" panose="02070309020205020404" pitchFamily="49" charset="0"/>
-              <a:cs typeface="Courier New" panose="02070309020205020404" pitchFamily="49" charset="0"/>
-            </a:endParaRPr>
           </a:p>
           <a:p>
             <a:r>
@@ -6120,10 +6369,6 @@
               </a:rPr>
               <a:t>)</a:t>
             </a:r>
-            <a:endParaRPr lang="en-US" dirty="0" smtClean="0">
-              <a:latin typeface="Courier New" panose="02070309020205020404" pitchFamily="49" charset="0"/>
-              <a:cs typeface="Courier New" panose="02070309020205020404" pitchFamily="49" charset="0"/>
-            </a:endParaRPr>
           </a:p>
         </p:txBody>
       </p:sp>
@@ -7179,14 +7424,7 @@
                 <a:latin typeface="Courier New" panose="02070309020205020404" pitchFamily="49" charset="0"/>
                 <a:cs typeface="Courier New" panose="02070309020205020404" pitchFamily="49" charset="0"/>
               </a:rPr>
-              <a:t>'GCT</a:t>
-            </a:r>
-            <a:r>
-              <a:rPr lang="en-US" dirty="0" smtClean="0">
-                <a:latin typeface="Courier New" panose="02070309020205020404" pitchFamily="49" charset="0"/>
-                <a:cs typeface="Courier New" panose="02070309020205020404" pitchFamily="49" charset="0"/>
-              </a:rPr>
-              <a:t>' in </a:t>
+              <a:t>'GCT' in </a:t>
             </a:r>
             <a:r>
               <a:rPr lang="en-US" dirty="0" err="1" smtClean="0">
@@ -7245,14 +7483,7 @@
                 <a:latin typeface="Courier New" panose="02070309020205020404" pitchFamily="49" charset="0"/>
                 <a:cs typeface="Courier New" panose="02070309020205020404" pitchFamily="49" charset="0"/>
               </a:rPr>
-              <a:t>('AA</a:t>
-            </a:r>
-            <a:r>
-              <a:rPr lang="en-US" dirty="0" smtClean="0">
-                <a:latin typeface="Courier New" panose="02070309020205020404" pitchFamily="49" charset="0"/>
-                <a:cs typeface="Courier New" panose="02070309020205020404" pitchFamily="49" charset="0"/>
-              </a:rPr>
-              <a:t>')</a:t>
+              <a:t>('AA')</a:t>
             </a:r>
             <a:endParaRPr lang="en-US" dirty="0">
               <a:latin typeface="Courier New" panose="02070309020205020404" pitchFamily="49" charset="0"/>
@@ -7434,10 +7665,6 @@
               </a:rPr>
               <a:t>('CGT')</a:t>
             </a:r>
-            <a:endParaRPr lang="en-US" dirty="0" smtClean="0">
-              <a:latin typeface="Courier New" panose="02070309020205020404" pitchFamily="49" charset="0"/>
-              <a:cs typeface="Courier New" panose="02070309020205020404" pitchFamily="49" charset="0"/>
-            </a:endParaRPr>
           </a:p>
         </p:txBody>
       </p:sp>
@@ -7847,14 +8074,7 @@
                 <a:latin typeface="Courier New" panose="02070309020205020404" pitchFamily="49" charset="0"/>
                 <a:cs typeface="Courier New" panose="02070309020205020404" pitchFamily="49" charset="0"/>
               </a:rPr>
-              <a:t>('CCC</a:t>
-            </a:r>
-            <a:r>
-              <a:rPr lang="en-US" dirty="0" smtClean="0">
-                <a:latin typeface="Courier New" panose="02070309020205020404" pitchFamily="49" charset="0"/>
-                <a:cs typeface="Courier New" panose="02070309020205020404" pitchFamily="49" charset="0"/>
-              </a:rPr>
-              <a:t>')</a:t>
+              <a:t>('CCC')</a:t>
             </a:r>
             <a:endParaRPr lang="en-US" dirty="0">
               <a:latin typeface="Courier New" panose="02070309020205020404" pitchFamily="49" charset="0"/>
@@ -8466,11 +8686,7 @@
           <a:p>
             <a:r>
               <a:rPr lang="en-US" dirty="0" smtClean="0"/>
-              <a:t>Converting s</a:t>
-            </a:r>
-            <a:r>
-              <a:rPr lang="en-US" dirty="0" smtClean="0"/>
-              <a:t>equences</a:t>
+              <a:t>Converting sequences</a:t>
             </a:r>
             <a:endParaRPr lang="en-US" dirty="0"/>
           </a:p>
@@ -8504,7 +8720,6 @@
               <a:rPr lang="en-US" dirty="0" smtClean="0"/>
               <a:t>Reverse complement</a:t>
             </a:r>
-            <a:endParaRPr lang="en-US" dirty="0" smtClean="0"/>
           </a:p>
           <a:p>
             <a:endParaRPr lang="en-US" dirty="0"/>
@@ -9346,11 +9561,6 @@
                 </a:rPr>
                 <a:t>CTTTGAAGCTT</a:t>
               </a:r>
-              <a:endParaRPr lang="en-US" b="1" dirty="0">
-                <a:solidFill>
-                  <a:schemeClr val="bg1"/>
-                </a:solidFill>
-              </a:endParaRPr>
             </a:p>
           </p:txBody>
         </p:sp>
@@ -10233,11 +10443,7 @@
             </a:r>
             <a:r>
               <a:rPr lang="en-US" dirty="0" smtClean="0"/>
-              <a:t> </a:t>
-            </a:r>
-            <a:r>
-              <a:rPr lang="en-US" dirty="0" smtClean="0"/>
-              <a:t>module</a:t>
+              <a:t> module</a:t>
             </a:r>
           </a:p>
           <a:p>
@@ -10275,7 +10481,6 @@
               <a:rPr lang="en-US" dirty="0" smtClean="0"/>
               <a:t>1-symbol from/to 3-symbol protein sequences</a:t>
             </a:r>
-            <a:endParaRPr lang="en-US" dirty="0" smtClean="0"/>
           </a:p>
         </p:txBody>
       </p:sp>
@@ -10455,10 +10660,6 @@
               </a:rPr>
               <a:t>)</a:t>
             </a:r>
-            <a:endParaRPr lang="en-US" dirty="0" smtClean="0">
-              <a:latin typeface="Courier New" panose="02070309020205020404" pitchFamily="49" charset="0"/>
-              <a:cs typeface="Courier New" panose="02070309020205020404" pitchFamily="49" charset="0"/>
-            </a:endParaRPr>
           </a:p>
         </p:txBody>
       </p:sp>
@@ -10509,11 +10710,6 @@
                 </a:rPr>
                 <a:t>36.36363636363637</a:t>
               </a:r>
-              <a:endParaRPr lang="en-US" b="1" dirty="0">
-                <a:solidFill>
-                  <a:schemeClr val="bg1"/>
-                </a:solidFill>
-              </a:endParaRPr>
             </a:p>
           </p:txBody>
         </p:sp>
@@ -10613,10 +10809,6 @@
               </a:rPr>
               <a:t>, window=4)</a:t>
             </a:r>
-            <a:endParaRPr lang="en-US" dirty="0" smtClean="0">
-              <a:latin typeface="Courier New" panose="02070309020205020404" pitchFamily="49" charset="0"/>
-              <a:cs typeface="Courier New" panose="02070309020205020404" pitchFamily="49" charset="0"/>
-            </a:endParaRPr>
           </a:p>
         </p:txBody>
       </p:sp>
@@ -10771,10 +10963,6 @@
               </a:rPr>
               <a:t>)</a:t>
             </a:r>
-            <a:endParaRPr lang="en-US" dirty="0" smtClean="0">
-              <a:latin typeface="Courier New" panose="02070309020205020404" pitchFamily="49" charset="0"/>
-              <a:cs typeface="Courier New" panose="02070309020205020404" pitchFamily="49" charset="0"/>
-            </a:endParaRPr>
           </a:p>
         </p:txBody>
       </p:sp>
@@ -10908,10 +11096,6 @@
               </a:rPr>
               <a:t>SeqUtils.seq3('KLQ')</a:t>
             </a:r>
-            <a:endParaRPr lang="en-US" dirty="0" smtClean="0">
-              <a:latin typeface="Courier New" panose="02070309020205020404" pitchFamily="49" charset="0"/>
-              <a:cs typeface="Courier New" panose="02070309020205020404" pitchFamily="49" charset="0"/>
-            </a:endParaRPr>
           </a:p>
         </p:txBody>
       </p:sp>

</xml_diff>

<commit_message>
Added slide on nucleotide Entrez query
</commit_message>
<xml_diff>
--- a/Python/biopython.pptx
+++ b/Python/biopython.pptx
@@ -5,7 +5,7 @@
     <p:sldMasterId id="2147483660" r:id="rId1"/>
   </p:sldMasterIdLst>
   <p:notesMasterIdLst>
-    <p:notesMasterId r:id="rId14"/>
+    <p:notesMasterId r:id="rId15"/>
   </p:notesMasterIdLst>
   <p:sldIdLst>
     <p:sldId id="256" r:id="rId2"/>
@@ -20,6 +20,7 @@
     <p:sldId id="265" r:id="rId11"/>
     <p:sldId id="266" r:id="rId12"/>
     <p:sldId id="267" r:id="rId13"/>
+    <p:sldId id="268" r:id="rId14"/>
   </p:sldIdLst>
   <p:sldSz cx="9144000" cy="6858000" type="screen4x3"/>
   <p:notesSz cx="6858000" cy="9144000"/>
@@ -208,7 +209,7 @@
           <a:p>
             <a:fld id="{E50739E9-DC4A-4901-8195-7CE430F840D8}" type="datetimeFigureOut">
               <a:rPr lang="en-US" smtClean="0"/>
-              <a:t>2016-06-30</a:t>
+              <a:t>2016-07-01</a:t>
             </a:fld>
             <a:endParaRPr lang="en-US"/>
           </a:p>
@@ -691,7 +692,7 @@
           <a:p>
             <a:fld id="{EBC2714F-B822-455B-B016-0228B6AA8BE9}" type="datetime1">
               <a:rPr lang="en-US" smtClean="0"/>
-              <a:t>2016-06-30</a:t>
+              <a:t>2016-07-01</a:t>
             </a:fld>
             <a:endParaRPr lang="en-US"/>
           </a:p>
@@ -861,7 +862,7 @@
           <a:p>
             <a:fld id="{F3822F19-B516-497C-9005-1997989AD109}" type="datetime1">
               <a:rPr lang="en-US" smtClean="0"/>
-              <a:t>2016-06-30</a:t>
+              <a:t>2016-07-01</a:t>
             </a:fld>
             <a:endParaRPr lang="en-US"/>
           </a:p>
@@ -1041,7 +1042,7 @@
           <a:p>
             <a:fld id="{DC6E6076-3AC8-4591-A5B3-5701E86BC391}" type="datetime1">
               <a:rPr lang="en-US" smtClean="0"/>
-              <a:t>2016-06-30</a:t>
+              <a:t>2016-07-01</a:t>
             </a:fld>
             <a:endParaRPr lang="en-US"/>
           </a:p>
@@ -1211,7 +1212,7 @@
           <a:p>
             <a:fld id="{10101B39-3B57-4A7B-8CB6-E6BDB118061D}" type="datetime1">
               <a:rPr lang="en-US" smtClean="0"/>
-              <a:t>2016-06-30</a:t>
+              <a:t>2016-07-01</a:t>
             </a:fld>
             <a:endParaRPr lang="en-US"/>
           </a:p>
@@ -1455,7 +1456,7 @@
           <a:p>
             <a:fld id="{C27B26EE-8ECF-4FF3-9A38-87EFFDA62A28}" type="datetime1">
               <a:rPr lang="en-US" smtClean="0"/>
-              <a:t>2016-06-30</a:t>
+              <a:t>2016-07-01</a:t>
             </a:fld>
             <a:endParaRPr lang="en-US"/>
           </a:p>
@@ -1687,7 +1688,7 @@
           <a:p>
             <a:fld id="{6742683C-23EC-4C0D-AC9A-17C98B40DAA7}" type="datetime1">
               <a:rPr lang="en-US" smtClean="0"/>
-              <a:t>2016-06-30</a:t>
+              <a:t>2016-07-01</a:t>
             </a:fld>
             <a:endParaRPr lang="en-US"/>
           </a:p>
@@ -2054,7 +2055,7 @@
           <a:p>
             <a:fld id="{61B639F5-7095-4C4C-8D13-AB3C116C2681}" type="datetime1">
               <a:rPr lang="en-US" smtClean="0"/>
-              <a:t>2016-06-30</a:t>
+              <a:t>2016-07-01</a:t>
             </a:fld>
             <a:endParaRPr lang="en-US"/>
           </a:p>
@@ -2172,7 +2173,7 @@
           <a:p>
             <a:fld id="{565C75B5-128F-4C63-85A2-EABB3B9088B2}" type="datetime1">
               <a:rPr lang="en-US" smtClean="0"/>
-              <a:t>2016-06-30</a:t>
+              <a:t>2016-07-01</a:t>
             </a:fld>
             <a:endParaRPr lang="en-US"/>
           </a:p>
@@ -2267,7 +2268,7 @@
           <a:p>
             <a:fld id="{EB500747-7144-41D3-89B7-0E40926A8757}" type="datetime1">
               <a:rPr lang="en-US" smtClean="0"/>
-              <a:t>2016-06-30</a:t>
+              <a:t>2016-07-01</a:t>
             </a:fld>
             <a:endParaRPr lang="en-US"/>
           </a:p>
@@ -2544,7 +2545,7 @@
           <a:p>
             <a:fld id="{09A9D774-0B51-4CD9-9147-A6BD4D353F07}" type="datetime1">
               <a:rPr lang="en-US" smtClean="0"/>
-              <a:t>2016-06-30</a:t>
+              <a:t>2016-07-01</a:t>
             </a:fld>
             <a:endParaRPr lang="en-US"/>
           </a:p>
@@ -2801,7 +2802,7 @@
           <a:p>
             <a:fld id="{2618F069-DB72-4F16-8512-37A179AE1774}" type="datetime1">
               <a:rPr lang="en-US" smtClean="0"/>
-              <a:t>2016-06-30</a:t>
+              <a:t>2016-07-01</a:t>
             </a:fld>
             <a:endParaRPr lang="en-US"/>
           </a:p>
@@ -3014,7 +3015,7 @@
           <a:p>
             <a:fld id="{7784AB71-9685-428C-BE48-FB64D9C8B81F}" type="datetime1">
               <a:rPr lang="en-US" smtClean="0"/>
-              <a:t>2016-06-30</a:t>
+              <a:t>2016-07-01</a:t>
             </a:fld>
             <a:endParaRPr lang="en-US"/>
           </a:p>
@@ -4444,12 +4445,12 @@
           <a:p>
             <a:pPr lvl="1"/>
             <a:r>
-              <a:rPr lang="en-US" dirty="0" err="1" smtClean="0"/>
-              <a:t>GenBank</a:t>
-            </a:r>
-            <a:r>
               <a:rPr lang="en-US" dirty="0" smtClean="0"/>
-              <a:t>: sequences</a:t>
+              <a:t>Nucleotide, Protein: </a:t>
+            </a:r>
+            <a:r>
+              <a:rPr lang="en-US" dirty="0" smtClean="0"/>
+              <a:t>sequences</a:t>
             </a:r>
           </a:p>
           <a:p>
@@ -4463,8 +4464,16 @@
             <a:pPr lvl="1"/>
             <a:r>
               <a:rPr lang="en-US" dirty="0" smtClean="0"/>
-              <a:t>GEO</a:t>
-            </a:r>
+              <a:t>GEO: gene expression</a:t>
+            </a:r>
+          </a:p>
+          <a:p>
+            <a:pPr lvl="1"/>
+            <a:r>
+              <a:rPr lang="en-US" dirty="0" smtClean="0"/>
+              <a:t>…</a:t>
+            </a:r>
+            <a:endParaRPr lang="en-US" dirty="0" smtClean="0"/>
           </a:p>
           <a:p>
             <a:r>
@@ -4529,7 +4538,7 @@
         </p:nvSpPr>
         <p:spPr>
           <a:xfrm>
-            <a:off x="1537857" y="5642263"/>
+            <a:off x="1537857" y="5754404"/>
             <a:ext cx="6009979" cy="584775"/>
           </a:xfrm>
           <a:prstGeom prst="rect">
@@ -4556,10 +4565,521 @@
           </a:p>
         </p:txBody>
       </p:sp>
+      <p:sp>
+        <p:nvSpPr>
+          <p:cNvPr id="2" name="TextBox 1"/>
+          <p:cNvSpPr txBox="1"/>
+          <p:nvPr/>
+        </p:nvSpPr>
+        <p:spPr>
+          <a:xfrm>
+            <a:off x="4968814" y="3045123"/>
+            <a:ext cx="3796873" cy="369332"/>
+          </a:xfrm>
+          <a:prstGeom prst="rect">
+            <a:avLst/>
+          </a:prstGeom>
+          <a:solidFill>
+            <a:schemeClr val="accent5">
+              <a:lumMod val="20000"/>
+              <a:lumOff val="80000"/>
+            </a:schemeClr>
+          </a:solidFill>
+          <a:ln>
+            <a:solidFill>
+              <a:srgbClr val="0070C0"/>
+            </a:solidFill>
+          </a:ln>
+        </p:spPr>
+        <p:txBody>
+          <a:bodyPr wrap="none" rtlCol="0">
+            <a:spAutoFit/>
+          </a:bodyPr>
+          <a:lstStyle/>
+          <a:p>
+            <a:r>
+              <a:rPr lang="en-US" dirty="0">
+                <a:hlinkClick r:id="rId2"/>
+              </a:rPr>
+              <a:t>http://www.ncbi.nlm.nih.gov/gquery</a:t>
+            </a:r>
+            <a:r>
+              <a:rPr lang="en-US" dirty="0" smtClean="0">
+                <a:hlinkClick r:id="rId2"/>
+              </a:rPr>
+              <a:t>/</a:t>
+            </a:r>
+            <a:r>
+              <a:rPr lang="en-US" dirty="0" smtClean="0"/>
+              <a:t> </a:t>
+            </a:r>
+            <a:endParaRPr lang="en-US" dirty="0"/>
+          </a:p>
+        </p:txBody>
+      </p:sp>
     </p:spTree>
     <p:extLst>
       <p:ext uri="{BB962C8B-B14F-4D97-AF65-F5344CB8AC3E}">
         <p14:creationId xmlns:p14="http://schemas.microsoft.com/office/powerpoint/2010/main" val="2222741673"/>
+      </p:ext>
+    </p:extLst>
+  </p:cSld>
+  <p:clrMapOvr>
+    <a:masterClrMapping/>
+  </p:clrMapOvr>
+  <p:timing>
+    <p:tnLst>
+      <p:par>
+        <p:cTn id="1" dur="indefinite" restart="never" nodeType="tmRoot"/>
+      </p:par>
+    </p:tnLst>
+  </p:timing>
+</p:sld>
+</file>
+
+<file path=ppt/slides/slide13.xml><?xml version="1.0" encoding="utf-8"?>
+<p:sld xmlns:a="http://schemas.openxmlformats.org/drawingml/2006/main" xmlns:r="http://schemas.openxmlformats.org/officeDocument/2006/relationships" xmlns:p="http://schemas.openxmlformats.org/presentationml/2006/main">
+  <p:cSld>
+    <p:spTree>
+      <p:nvGrpSpPr>
+        <p:cNvPr id="1" name=""/>
+        <p:cNvGrpSpPr/>
+        <p:nvPr/>
+      </p:nvGrpSpPr>
+      <p:grpSpPr>
+        <a:xfrm>
+          <a:off x="0" y="0"/>
+          <a:ext cx="0" cy="0"/>
+          <a:chOff x="0" y="0"/>
+          <a:chExt cx="0" cy="0"/>
+        </a:xfrm>
+      </p:grpSpPr>
+      <p:sp>
+        <p:nvSpPr>
+          <p:cNvPr id="2" name="Title 1"/>
+          <p:cNvSpPr>
+            <a:spLocks noGrp="1"/>
+          </p:cNvSpPr>
+          <p:nvPr>
+            <p:ph type="title"/>
+          </p:nvPr>
+        </p:nvSpPr>
+        <p:spPr/>
+        <p:txBody>
+          <a:bodyPr/>
+          <a:lstStyle/>
+          <a:p>
+            <a:r>
+              <a:rPr lang="en-US" dirty="0" smtClean="0"/>
+              <a:t>Querying Nucleotides</a:t>
+            </a:r>
+            <a:endParaRPr lang="en-US" dirty="0"/>
+          </a:p>
+        </p:txBody>
+      </p:sp>
+      <p:sp>
+        <p:nvSpPr>
+          <p:cNvPr id="3" name="Content Placeholder 2"/>
+          <p:cNvSpPr>
+            <a:spLocks noGrp="1"/>
+          </p:cNvSpPr>
+          <p:nvPr>
+            <p:ph idx="1"/>
+          </p:nvPr>
+        </p:nvSpPr>
+        <p:spPr/>
+        <p:txBody>
+          <a:bodyPr>
+            <a:normAutofit lnSpcReduction="10000"/>
+          </a:bodyPr>
+          <a:lstStyle/>
+          <a:p>
+            <a:r>
+              <a:rPr lang="en-US" dirty="0" smtClean="0"/>
+              <a:t>Database: </a:t>
+            </a:r>
+            <a:r>
+              <a:rPr lang="en-US" dirty="0" smtClean="0">
+                <a:latin typeface="Courier New" panose="02070309020205020404" pitchFamily="49" charset="0"/>
+                <a:cs typeface="Courier New" panose="02070309020205020404" pitchFamily="49" charset="0"/>
+              </a:rPr>
+              <a:t>nucleotide</a:t>
+            </a:r>
+          </a:p>
+          <a:p>
+            <a:r>
+              <a:rPr lang="en-US" dirty="0" smtClean="0"/>
+              <a:t>Query (term):</a:t>
+            </a:r>
+            <a:br>
+              <a:rPr lang="en-US" dirty="0" smtClean="0"/>
+            </a:br>
+            <a:r>
+              <a:rPr lang="en-US" sz="2400" dirty="0" smtClean="0">
+                <a:latin typeface="Courier New" panose="02070309020205020404" pitchFamily="49" charset="0"/>
+                <a:cs typeface="Courier New" panose="02070309020205020404" pitchFamily="49" charset="0"/>
+              </a:rPr>
+              <a:t>"</a:t>
+            </a:r>
+            <a:r>
+              <a:rPr lang="en-US" sz="2400" dirty="0">
+                <a:latin typeface="Courier New" panose="02070309020205020404" pitchFamily="49" charset="0"/>
+                <a:cs typeface="Courier New" panose="02070309020205020404" pitchFamily="49" charset="0"/>
+              </a:rPr>
+              <a:t>homo sapiens"[ORGN] AND </a:t>
+            </a:r>
+            <a:r>
+              <a:rPr lang="en-US" sz="2400" dirty="0" smtClean="0">
+                <a:latin typeface="Courier New" panose="02070309020205020404" pitchFamily="49" charset="0"/>
+                <a:cs typeface="Courier New" panose="02070309020205020404" pitchFamily="49" charset="0"/>
+              </a:rPr>
+              <a:t>MLH1[Gene]</a:t>
+            </a:r>
+          </a:p>
+          <a:p>
+            <a:r>
+              <a:rPr lang="en-US" dirty="0" smtClean="0">
+                <a:cs typeface="Courier New" panose="02070309020205020404" pitchFamily="49" charset="0"/>
+              </a:rPr>
+              <a:t>Maximum results to retrieve</a:t>
+            </a:r>
+          </a:p>
+          <a:p>
+            <a:endParaRPr lang="en-US" dirty="0">
+              <a:cs typeface="Courier New" panose="02070309020205020404" pitchFamily="49" charset="0"/>
+            </a:endParaRPr>
+          </a:p>
+          <a:p>
+            <a:endParaRPr lang="en-US" dirty="0" smtClean="0">
+              <a:cs typeface="Courier New" panose="02070309020205020404" pitchFamily="49" charset="0"/>
+            </a:endParaRPr>
+          </a:p>
+          <a:p>
+            <a:endParaRPr lang="en-US" dirty="0">
+              <a:cs typeface="Courier New" panose="02070309020205020404" pitchFamily="49" charset="0"/>
+            </a:endParaRPr>
+          </a:p>
+          <a:p>
+            <a:endParaRPr lang="en-US" dirty="0" smtClean="0">
+              <a:cs typeface="Courier New" panose="02070309020205020404" pitchFamily="49" charset="0"/>
+            </a:endParaRPr>
+          </a:p>
+          <a:p>
+            <a:r>
+              <a:rPr lang="en-US" dirty="0" smtClean="0">
+                <a:cs typeface="Courier New" panose="02070309020205020404" pitchFamily="49" charset="0"/>
+              </a:rPr>
+              <a:t>Total number of results</a:t>
+            </a:r>
+          </a:p>
+          <a:p>
+            <a:endParaRPr lang="en-US" dirty="0"/>
+          </a:p>
+        </p:txBody>
+      </p:sp>
+      <p:sp>
+        <p:nvSpPr>
+          <p:cNvPr id="4" name="Slide Number Placeholder 3"/>
+          <p:cNvSpPr>
+            <a:spLocks noGrp="1"/>
+          </p:cNvSpPr>
+          <p:nvPr>
+            <p:ph type="sldNum" sz="quarter" idx="12"/>
+          </p:nvPr>
+        </p:nvSpPr>
+        <p:spPr/>
+        <p:txBody>
+          <a:bodyPr/>
+          <a:lstStyle/>
+          <a:p>
+            <a:fld id="{CA586AD6-E5F2-4F25-940D-C674496063E2}" type="slidenum">
+              <a:rPr lang="en-US" smtClean="0"/>
+              <a:t>13</a:t>
+            </a:fld>
+            <a:endParaRPr lang="en-US"/>
+          </a:p>
+        </p:txBody>
+      </p:sp>
+      <p:sp>
+        <p:nvSpPr>
+          <p:cNvPr id="5" name="TextBox 4"/>
+          <p:cNvSpPr txBox="1"/>
+          <p:nvPr/>
+        </p:nvSpPr>
+        <p:spPr>
+          <a:xfrm>
+            <a:off x="987137" y="3502523"/>
+            <a:ext cx="6371195" cy="1754326"/>
+          </a:xfrm>
+          <a:prstGeom prst="rect">
+            <a:avLst/>
+          </a:prstGeom>
+          <a:solidFill>
+            <a:schemeClr val="bg1">
+              <a:lumMod val="75000"/>
+            </a:schemeClr>
+          </a:solidFill>
+          <a:ln>
+            <a:solidFill>
+              <a:schemeClr val="tx1"/>
+            </a:solidFill>
+          </a:ln>
+        </p:spPr>
+        <p:txBody>
+          <a:bodyPr wrap="square" rtlCol="0">
+            <a:spAutoFit/>
+          </a:bodyPr>
+          <a:lstStyle/>
+          <a:p>
+            <a:r>
+              <a:rPr lang="en-US" dirty="0" smtClean="0">
+                <a:latin typeface="Courier New" panose="02070309020205020404" pitchFamily="49" charset="0"/>
+                <a:cs typeface="Courier New" panose="02070309020205020404" pitchFamily="49" charset="0"/>
+              </a:rPr>
+              <a:t>handle = </a:t>
+            </a:r>
+            <a:r>
+              <a:rPr lang="en-US" dirty="0" err="1" smtClean="0">
+                <a:latin typeface="Courier New" panose="02070309020205020404" pitchFamily="49" charset="0"/>
+                <a:cs typeface="Courier New" panose="02070309020205020404" pitchFamily="49" charset="0"/>
+              </a:rPr>
+              <a:t>Entrez.esearch</a:t>
+            </a:r>
+            <a:r>
+              <a:rPr lang="en-US" dirty="0" smtClean="0">
+                <a:latin typeface="Courier New" panose="02070309020205020404" pitchFamily="49" charset="0"/>
+                <a:cs typeface="Courier New" panose="02070309020205020404" pitchFamily="49" charset="0"/>
+              </a:rPr>
+              <a:t>(</a:t>
+            </a:r>
+          </a:p>
+          <a:p>
+            <a:r>
+              <a:rPr lang="en-US" dirty="0" smtClean="0">
+                <a:latin typeface="Courier New" panose="02070309020205020404" pitchFamily="49" charset="0"/>
+                <a:cs typeface="Courier New" panose="02070309020205020404" pitchFamily="49" charset="0"/>
+              </a:rPr>
+              <a:t>    </a:t>
+            </a:r>
+            <a:r>
+              <a:rPr lang="en-US" dirty="0" err="1" smtClean="0">
+                <a:latin typeface="Courier New" panose="02070309020205020404" pitchFamily="49" charset="0"/>
+                <a:cs typeface="Courier New" panose="02070309020205020404" pitchFamily="49" charset="0"/>
+              </a:rPr>
+              <a:t>db</a:t>
+            </a:r>
+            <a:r>
+              <a:rPr lang="en-US" dirty="0">
+                <a:latin typeface="Courier New" panose="02070309020205020404" pitchFamily="49" charset="0"/>
+                <a:cs typeface="Courier New" panose="02070309020205020404" pitchFamily="49" charset="0"/>
+              </a:rPr>
+              <a:t>='nucleotide</a:t>
+            </a:r>
+            <a:r>
+              <a:rPr lang="en-US" dirty="0" smtClean="0">
+                <a:latin typeface="Courier New" panose="02070309020205020404" pitchFamily="49" charset="0"/>
+                <a:cs typeface="Courier New" panose="02070309020205020404" pitchFamily="49" charset="0"/>
+              </a:rPr>
+              <a:t>',</a:t>
+            </a:r>
+          </a:p>
+          <a:p>
+            <a:r>
+              <a:rPr lang="en-US" dirty="0">
+                <a:latin typeface="Courier New" panose="02070309020205020404" pitchFamily="49" charset="0"/>
+                <a:cs typeface="Courier New" panose="02070309020205020404" pitchFamily="49" charset="0"/>
+              </a:rPr>
+              <a:t> </a:t>
+            </a:r>
+            <a:r>
+              <a:rPr lang="en-US" dirty="0" smtClean="0">
+                <a:latin typeface="Courier New" panose="02070309020205020404" pitchFamily="49" charset="0"/>
+                <a:cs typeface="Courier New" panose="02070309020205020404" pitchFamily="49" charset="0"/>
+              </a:rPr>
+              <a:t>   term="homo </a:t>
+            </a:r>
+            <a:r>
+              <a:rPr lang="en-US" dirty="0">
+                <a:latin typeface="Courier New" panose="02070309020205020404" pitchFamily="49" charset="0"/>
+                <a:cs typeface="Courier New" panose="02070309020205020404" pitchFamily="49" charset="0"/>
+              </a:rPr>
+              <a:t>sapiens"[ORGN] AND </a:t>
+            </a:r>
+            <a:r>
+              <a:rPr lang="en-US" dirty="0" smtClean="0">
+                <a:latin typeface="Courier New" panose="02070309020205020404" pitchFamily="49" charset="0"/>
+                <a:cs typeface="Courier New" panose="02070309020205020404" pitchFamily="49" charset="0"/>
+              </a:rPr>
+              <a:t>MLH1[Gene</a:t>
+            </a:r>
+            <a:r>
+              <a:rPr lang="en-US" dirty="0">
+                <a:latin typeface="Courier New" panose="02070309020205020404" pitchFamily="49" charset="0"/>
+                <a:cs typeface="Courier New" panose="02070309020205020404" pitchFamily="49" charset="0"/>
+              </a:rPr>
+              <a:t>]</a:t>
+            </a:r>
+            <a:r>
+              <a:rPr lang="en-US" dirty="0" smtClean="0">
+                <a:latin typeface="Courier New" panose="02070309020205020404" pitchFamily="49" charset="0"/>
+                <a:cs typeface="Courier New" panose="02070309020205020404" pitchFamily="49" charset="0"/>
+              </a:rPr>
+              <a:t>,</a:t>
+            </a:r>
+            <a:endParaRPr lang="en-US" dirty="0">
+              <a:latin typeface="Courier New" panose="02070309020205020404" pitchFamily="49" charset="0"/>
+              <a:cs typeface="Courier New" panose="02070309020205020404" pitchFamily="49" charset="0"/>
+            </a:endParaRPr>
+          </a:p>
+          <a:p>
+            <a:r>
+              <a:rPr lang="en-US" dirty="0">
+                <a:latin typeface="Courier New" panose="02070309020205020404" pitchFamily="49" charset="0"/>
+                <a:cs typeface="Courier New" panose="02070309020205020404" pitchFamily="49" charset="0"/>
+              </a:rPr>
+              <a:t>  </a:t>
+            </a:r>
+            <a:r>
+              <a:rPr lang="en-US" dirty="0" smtClean="0">
+                <a:latin typeface="Courier New" panose="02070309020205020404" pitchFamily="49" charset="0"/>
+                <a:cs typeface="Courier New" panose="02070309020205020404" pitchFamily="49" charset="0"/>
+              </a:rPr>
+              <a:t>  </a:t>
+            </a:r>
+            <a:r>
+              <a:rPr lang="en-US" dirty="0" err="1" smtClean="0">
+                <a:latin typeface="Courier New" panose="02070309020205020404" pitchFamily="49" charset="0"/>
+                <a:cs typeface="Courier New" panose="02070309020205020404" pitchFamily="49" charset="0"/>
+              </a:rPr>
+              <a:t>retmax</a:t>
+            </a:r>
+            <a:r>
+              <a:rPr lang="en-US" dirty="0" smtClean="0">
+                <a:latin typeface="Courier New" panose="02070309020205020404" pitchFamily="49" charset="0"/>
+                <a:cs typeface="Courier New" panose="02070309020205020404" pitchFamily="49" charset="0"/>
+              </a:rPr>
+              <a:t>=3</a:t>
+            </a:r>
+          </a:p>
+          <a:p>
+            <a:r>
+              <a:rPr lang="en-US" dirty="0" smtClean="0">
+                <a:latin typeface="Courier New" panose="02070309020205020404" pitchFamily="49" charset="0"/>
+                <a:cs typeface="Courier New" panose="02070309020205020404" pitchFamily="49" charset="0"/>
+              </a:rPr>
+              <a:t>)</a:t>
+            </a:r>
+            <a:endParaRPr lang="en-US" dirty="0">
+              <a:latin typeface="Courier New" panose="02070309020205020404" pitchFamily="49" charset="0"/>
+              <a:cs typeface="Courier New" panose="02070309020205020404" pitchFamily="49" charset="0"/>
+            </a:endParaRPr>
+          </a:p>
+          <a:p>
+            <a:r>
+              <a:rPr lang="en-US" dirty="0" smtClean="0">
+                <a:latin typeface="Courier New" panose="02070309020205020404" pitchFamily="49" charset="0"/>
+                <a:cs typeface="Courier New" panose="02070309020205020404" pitchFamily="49" charset="0"/>
+              </a:rPr>
+              <a:t>record </a:t>
+            </a:r>
+            <a:r>
+              <a:rPr lang="en-US" dirty="0">
+                <a:latin typeface="Courier New" panose="02070309020205020404" pitchFamily="49" charset="0"/>
+                <a:cs typeface="Courier New" panose="02070309020205020404" pitchFamily="49" charset="0"/>
+              </a:rPr>
+              <a:t>= </a:t>
+            </a:r>
+            <a:r>
+              <a:rPr lang="en-US" dirty="0" err="1">
+                <a:latin typeface="Courier New" panose="02070309020205020404" pitchFamily="49" charset="0"/>
+                <a:cs typeface="Courier New" panose="02070309020205020404" pitchFamily="49" charset="0"/>
+              </a:rPr>
+              <a:t>Entrez.read</a:t>
+            </a:r>
+            <a:r>
+              <a:rPr lang="en-US" dirty="0">
+                <a:latin typeface="Courier New" panose="02070309020205020404" pitchFamily="49" charset="0"/>
+                <a:cs typeface="Courier New" panose="02070309020205020404" pitchFamily="49" charset="0"/>
+              </a:rPr>
+              <a:t>(handle)</a:t>
+            </a:r>
+            <a:endParaRPr lang="en-US" dirty="0" smtClean="0">
+              <a:latin typeface="Courier New" panose="02070309020205020404" pitchFamily="49" charset="0"/>
+              <a:cs typeface="Courier New" panose="02070309020205020404" pitchFamily="49" charset="0"/>
+            </a:endParaRPr>
+          </a:p>
+        </p:txBody>
+      </p:sp>
+      <p:sp>
+        <p:nvSpPr>
+          <p:cNvPr id="6" name="TextBox 5"/>
+          <p:cNvSpPr txBox="1"/>
+          <p:nvPr/>
+        </p:nvSpPr>
+        <p:spPr>
+          <a:xfrm>
+            <a:off x="987136" y="5807631"/>
+            <a:ext cx="6371195" cy="369332"/>
+          </a:xfrm>
+          <a:prstGeom prst="rect">
+            <a:avLst/>
+          </a:prstGeom>
+          <a:solidFill>
+            <a:schemeClr val="bg1">
+              <a:lumMod val="75000"/>
+            </a:schemeClr>
+          </a:solidFill>
+          <a:ln>
+            <a:solidFill>
+              <a:schemeClr val="tx1"/>
+            </a:solidFill>
+          </a:ln>
+        </p:spPr>
+        <p:txBody>
+          <a:bodyPr wrap="square" rtlCol="0">
+            <a:spAutoFit/>
+          </a:bodyPr>
+          <a:lstStyle/>
+          <a:p>
+            <a:r>
+              <a:rPr lang="en-US" dirty="0" err="1" smtClean="0">
+                <a:latin typeface="Courier New" panose="02070309020205020404" pitchFamily="49" charset="0"/>
+                <a:cs typeface="Courier New" panose="02070309020205020404" pitchFamily="49" charset="0"/>
+              </a:rPr>
+              <a:t>nr_results</a:t>
+            </a:r>
+            <a:r>
+              <a:rPr lang="en-US" dirty="0" smtClean="0">
+                <a:latin typeface="Courier New" panose="02070309020205020404" pitchFamily="49" charset="0"/>
+                <a:cs typeface="Courier New" panose="02070309020205020404" pitchFamily="49" charset="0"/>
+              </a:rPr>
+              <a:t> = </a:t>
+            </a:r>
+            <a:r>
+              <a:rPr lang="en-US" dirty="0" err="1" smtClean="0">
+                <a:latin typeface="Courier New" panose="02070309020205020404" pitchFamily="49" charset="0"/>
+                <a:cs typeface="Courier New" panose="02070309020205020404" pitchFamily="49" charset="0"/>
+              </a:rPr>
+              <a:t>int</a:t>
+            </a:r>
+            <a:r>
+              <a:rPr lang="en-US" dirty="0" smtClean="0">
+                <a:latin typeface="Courier New" panose="02070309020205020404" pitchFamily="49" charset="0"/>
+                <a:cs typeface="Courier New" panose="02070309020205020404" pitchFamily="49" charset="0"/>
+              </a:rPr>
+              <a:t>(record['Count'])</a:t>
+            </a:r>
+            <a:endParaRPr lang="en-US" dirty="0" smtClean="0">
+              <a:latin typeface="Courier New" panose="02070309020205020404" pitchFamily="49" charset="0"/>
+              <a:cs typeface="Courier New" panose="02070309020205020404" pitchFamily="49" charset="0"/>
+            </a:endParaRPr>
+          </a:p>
+        </p:txBody>
+      </p:sp>
+    </p:spTree>
+    <p:extLst>
+      <p:ext uri="{BB962C8B-B14F-4D97-AF65-F5344CB8AC3E}">
+        <p14:creationId xmlns:p14="http://schemas.microsoft.com/office/powerpoint/2010/main" val="4054627788"/>
       </p:ext>
     </p:extLst>
   </p:cSld>
@@ -5879,7 +6399,21 @@
                 <a:latin typeface="Courier New" panose="02070309020205020404" pitchFamily="49" charset="0"/>
                 <a:cs typeface="Courier New" panose="02070309020205020404" pitchFamily="49" charset="0"/>
               </a:rPr>
-              <a:t>for record in records:</a:t>
+              <a:t>for record in </a:t>
+            </a:r>
+            <a:r>
+              <a:rPr lang="en-US" dirty="0" err="1" smtClean="0">
+                <a:latin typeface="Courier New" panose="02070309020205020404" pitchFamily="49" charset="0"/>
+                <a:cs typeface="Courier New" panose="02070309020205020404" pitchFamily="49" charset="0"/>
+              </a:rPr>
+              <a:t>seq_records</a:t>
+            </a:r>
+            <a:r>
+              <a:rPr lang="en-US" dirty="0" smtClean="0">
+                <a:latin typeface="Courier New" panose="02070309020205020404" pitchFamily="49" charset="0"/>
+                <a:cs typeface="Courier New" panose="02070309020205020404" pitchFamily="49" charset="0"/>
+              </a:rPr>
+              <a:t>:</a:t>
             </a:r>
           </a:p>
           <a:p>

</xml_diff>

<commit_message>
Added slides on sequence features
</commit_message>
<xml_diff>
--- a/Python/biopython.pptx
+++ b/Python/biopython.pptx
@@ -5,7 +5,7 @@
     <p:sldMasterId id="2147483660" r:id="rId1"/>
   </p:sldMasterIdLst>
   <p:notesMasterIdLst>
-    <p:notesMasterId r:id="rId15"/>
+    <p:notesMasterId r:id="rId18"/>
   </p:notesMasterIdLst>
   <p:sldIdLst>
     <p:sldId id="256" r:id="rId2"/>
@@ -17,10 +17,13 @@
     <p:sldId id="264" r:id="rId8"/>
     <p:sldId id="263" r:id="rId9"/>
     <p:sldId id="261" r:id="rId10"/>
-    <p:sldId id="265" r:id="rId11"/>
-    <p:sldId id="266" r:id="rId12"/>
-    <p:sldId id="267" r:id="rId13"/>
-    <p:sldId id="268" r:id="rId14"/>
+    <p:sldId id="269" r:id="rId11"/>
+    <p:sldId id="270" r:id="rId12"/>
+    <p:sldId id="271" r:id="rId13"/>
+    <p:sldId id="265" r:id="rId14"/>
+    <p:sldId id="266" r:id="rId15"/>
+    <p:sldId id="267" r:id="rId16"/>
+    <p:sldId id="268" r:id="rId17"/>
   </p:sldIdLst>
   <p:sldSz cx="9144000" cy="6858000" type="screen4x3"/>
   <p:notesSz cx="6858000" cy="9144000"/>
@@ -3613,7 +3616,7 @@
           <a:p>
             <a:r>
               <a:rPr lang="en-US" dirty="0" smtClean="0"/>
-              <a:t>Writing sequences</a:t>
+              <a:t>Sequence features</a:t>
             </a:r>
             <a:endParaRPr lang="en-US" dirty="0"/>
           </a:p>
@@ -3636,35 +3639,220 @@
           <a:p>
             <a:r>
               <a:rPr lang="en-US" dirty="0" smtClean="0"/>
-              <a:t>Create sequence record</a:t>
-            </a:r>
-          </a:p>
-          <a:p>
-            <a:endParaRPr lang="en-US" dirty="0"/>
-          </a:p>
-          <a:p>
-            <a:endParaRPr lang="en-US" dirty="0" smtClean="0"/>
-          </a:p>
-          <a:p>
-            <a:endParaRPr lang="en-US" dirty="0"/>
-          </a:p>
-          <a:p>
+              <a:t>Records can have many features = annotation</a:t>
+            </a:r>
+          </a:p>
+          <a:p>
+            <a:pPr lvl="1"/>
             <a:r>
               <a:rPr lang="en-US" dirty="0" smtClean="0"/>
-              <a:t>Write record(s) to file</a:t>
-            </a:r>
-          </a:p>
-          <a:p>
-            <a:endParaRPr lang="en-US" dirty="0"/>
-          </a:p>
-          <a:p>
-            <a:endParaRPr lang="en-US" dirty="0" smtClean="0"/>
-          </a:p>
-          <a:p>
+              <a:t>type, e.g., </a:t>
+            </a:r>
+            <a:r>
+              <a:rPr lang="en-US" dirty="0" smtClean="0">
+                <a:latin typeface="Courier New" panose="02070309020205020404" pitchFamily="49" charset="0"/>
+                <a:cs typeface="Courier New" panose="02070309020205020404" pitchFamily="49" charset="0"/>
+              </a:rPr>
+              <a:t>source</a:t>
+            </a:r>
             <a:r>
               <a:rPr lang="en-US" dirty="0" smtClean="0"/>
-              <a:t>Convert sequence to Python string</a:t>
-            </a:r>
+              <a:t>, </a:t>
+            </a:r>
+            <a:r>
+              <a:rPr lang="en-US" dirty="0" smtClean="0">
+                <a:latin typeface="Courier New" panose="02070309020205020404" pitchFamily="49" charset="0"/>
+                <a:cs typeface="Courier New" panose="02070309020205020404" pitchFamily="49" charset="0"/>
+              </a:rPr>
+              <a:t>CDS</a:t>
+            </a:r>
+            <a:r>
+              <a:rPr lang="en-US" dirty="0" smtClean="0"/>
+              <a:t>, </a:t>
+            </a:r>
+            <a:r>
+              <a:rPr lang="en-US" dirty="0" smtClean="0">
+                <a:latin typeface="Courier New" panose="02070309020205020404" pitchFamily="49" charset="0"/>
+                <a:cs typeface="Courier New" panose="02070309020205020404" pitchFamily="49" charset="0"/>
+              </a:rPr>
+              <a:t>STS</a:t>
+            </a:r>
+            <a:r>
+              <a:rPr lang="en-US" dirty="0" smtClean="0"/>
+              <a:t>, </a:t>
+            </a:r>
+            <a:r>
+              <a:rPr lang="en-US" dirty="0" smtClean="0">
+                <a:latin typeface="Courier New" panose="02070309020205020404" pitchFamily="49" charset="0"/>
+                <a:cs typeface="Courier New" panose="02070309020205020404" pitchFamily="49" charset="0"/>
+              </a:rPr>
+              <a:t>exon</a:t>
+            </a:r>
+            <a:r>
+              <a:rPr lang="en-US" dirty="0"/>
+              <a:t>, </a:t>
+            </a:r>
+            <a:r>
+              <a:rPr lang="en-US" dirty="0">
+                <a:latin typeface="Courier New" panose="02070309020205020404" pitchFamily="49" charset="0"/>
+                <a:cs typeface="Courier New" panose="02070309020205020404" pitchFamily="49" charset="0"/>
+              </a:rPr>
+              <a:t>regulatory</a:t>
+            </a:r>
+            <a:r>
+              <a:rPr lang="en-US" dirty="0"/>
+              <a:t>, </a:t>
+            </a:r>
+            <a:r>
+              <a:rPr lang="en-US" dirty="0" err="1" smtClean="0">
+                <a:latin typeface="Courier New" panose="02070309020205020404" pitchFamily="49" charset="0"/>
+                <a:cs typeface="Courier New" panose="02070309020205020404" pitchFamily="49" charset="0"/>
+              </a:rPr>
+              <a:t>polyA_site</a:t>
+            </a:r>
+            <a:endParaRPr lang="en-US" dirty="0" smtClean="0">
+              <a:latin typeface="Courier New" panose="02070309020205020404" pitchFamily="49" charset="0"/>
+              <a:cs typeface="Courier New" panose="02070309020205020404" pitchFamily="49" charset="0"/>
+            </a:endParaRPr>
+          </a:p>
+          <a:p>
+            <a:pPr lvl="1"/>
+            <a:r>
+              <a:rPr lang="en-US" dirty="0" smtClean="0"/>
+              <a:t>location</a:t>
+            </a:r>
+            <a:r>
+              <a:rPr lang="en-US" dirty="0"/>
+              <a:t>, e.g., </a:t>
+            </a:r>
+            <a:r>
+              <a:rPr lang="en-US" dirty="0">
+                <a:latin typeface="Courier New" panose="02070309020205020404" pitchFamily="49" charset="0"/>
+                <a:cs typeface="Courier New" panose="02070309020205020404" pitchFamily="49" charset="0"/>
+              </a:rPr>
+              <a:t>[0:2623</a:t>
+            </a:r>
+            <a:r>
+              <a:rPr lang="en-US" dirty="0" smtClean="0">
+                <a:latin typeface="Courier New" panose="02070309020205020404" pitchFamily="49" charset="0"/>
+                <a:cs typeface="Courier New" panose="02070309020205020404" pitchFamily="49" charset="0"/>
+              </a:rPr>
+              <a:t>](+)</a:t>
+            </a:r>
+            <a:r>
+              <a:rPr lang="en-US" dirty="0" smtClean="0"/>
+              <a:t>, </a:t>
+            </a:r>
+            <a:r>
+              <a:rPr lang="en-US" dirty="0" smtClean="0">
+                <a:latin typeface="Courier New" panose="02070309020205020404" pitchFamily="49" charset="0"/>
+                <a:cs typeface="Courier New" panose="02070309020205020404" pitchFamily="49" charset="0"/>
+              </a:rPr>
+              <a:t>[</a:t>
+            </a:r>
+            <a:r>
+              <a:rPr lang="en-US" dirty="0">
+                <a:latin typeface="Courier New" panose="02070309020205020404" pitchFamily="49" charset="0"/>
+                <a:cs typeface="Courier New" panose="02070309020205020404" pitchFamily="49" charset="0"/>
+              </a:rPr>
+              <a:t>933:1027</a:t>
+            </a:r>
+            <a:r>
+              <a:rPr lang="en-US" dirty="0" smtClean="0">
+                <a:latin typeface="Courier New" panose="02070309020205020404" pitchFamily="49" charset="0"/>
+                <a:cs typeface="Courier New" panose="02070309020205020404" pitchFamily="49" charset="0"/>
+              </a:rPr>
+              <a:t>](+)</a:t>
+            </a:r>
+          </a:p>
+          <a:p>
+            <a:pPr lvl="1"/>
+            <a:endParaRPr lang="en-US" dirty="0" smtClean="0">
+              <a:cs typeface="Courier New" panose="02070309020205020404" pitchFamily="49" charset="0"/>
+            </a:endParaRPr>
+          </a:p>
+          <a:p>
+            <a:pPr lvl="1"/>
+            <a:endParaRPr lang="en-US" dirty="0">
+              <a:cs typeface="Courier New" panose="02070309020205020404" pitchFamily="49" charset="0"/>
+            </a:endParaRPr>
+          </a:p>
+          <a:p>
+            <a:pPr lvl="1"/>
+            <a:r>
+              <a:rPr lang="en-US" dirty="0" smtClean="0">
+                <a:cs typeface="Courier New" panose="02070309020205020404" pitchFamily="49" charset="0"/>
+              </a:rPr>
+              <a:t>qualifiers, e.g., </a:t>
+            </a:r>
+            <a:r>
+              <a:rPr lang="en-US" dirty="0" smtClean="0">
+                <a:latin typeface="Courier New" panose="02070309020205020404" pitchFamily="49" charset="0"/>
+                <a:cs typeface="Courier New" panose="02070309020205020404" pitchFamily="49" charset="0"/>
+              </a:rPr>
+              <a:t>gene</a:t>
+            </a:r>
+            <a:r>
+              <a:rPr lang="en-US" dirty="0" smtClean="0">
+                <a:cs typeface="Courier New" panose="02070309020205020404" pitchFamily="49" charset="0"/>
+              </a:rPr>
+              <a:t>, </a:t>
+            </a:r>
+            <a:r>
+              <a:rPr lang="en-US" dirty="0" err="1" smtClean="0">
+                <a:latin typeface="Courier New" panose="02070309020205020404" pitchFamily="49" charset="0"/>
+                <a:cs typeface="Courier New" panose="02070309020205020404" pitchFamily="49" charset="0"/>
+              </a:rPr>
+              <a:t>gene_synomym</a:t>
+            </a:r>
+            <a:r>
+              <a:rPr lang="en-US" dirty="0" smtClean="0">
+                <a:cs typeface="Courier New" panose="02070309020205020404" pitchFamily="49" charset="0"/>
+              </a:rPr>
+              <a:t>, </a:t>
+            </a:r>
+            <a:r>
+              <a:rPr lang="en-US" dirty="0" smtClean="0">
+                <a:latin typeface="Courier New" panose="02070309020205020404" pitchFamily="49" charset="0"/>
+                <a:cs typeface="Courier New" panose="02070309020205020404" pitchFamily="49" charset="0"/>
+              </a:rPr>
+              <a:t>inference</a:t>
+            </a:r>
+            <a:r>
+              <a:rPr lang="en-US" dirty="0" smtClean="0">
+                <a:cs typeface="Courier New" panose="02070309020205020404" pitchFamily="49" charset="0"/>
+              </a:rPr>
+              <a:t>, </a:t>
+            </a:r>
+            <a:r>
+              <a:rPr lang="en-US" dirty="0" smtClean="0">
+                <a:latin typeface="Courier New" panose="02070309020205020404" pitchFamily="49" charset="0"/>
+                <a:cs typeface="Courier New" panose="02070309020205020404" pitchFamily="49" charset="0"/>
+              </a:rPr>
+              <a:t>note</a:t>
+            </a:r>
+            <a:r>
+              <a:rPr lang="en-US" dirty="0" smtClean="0">
+                <a:cs typeface="Courier New" panose="02070309020205020404" pitchFamily="49" charset="0"/>
+              </a:rPr>
+              <a:t>, </a:t>
+            </a:r>
+            <a:r>
+              <a:rPr lang="en-US" dirty="0" smtClean="0">
+                <a:latin typeface="Courier New" panose="02070309020205020404" pitchFamily="49" charset="0"/>
+                <a:cs typeface="Courier New" panose="02070309020205020404" pitchFamily="49" charset="0"/>
+              </a:rPr>
+              <a:t>translation</a:t>
+            </a:r>
+            <a:r>
+              <a:rPr lang="en-US" dirty="0" smtClean="0">
+                <a:cs typeface="Courier New" panose="02070309020205020404" pitchFamily="49" charset="0"/>
+              </a:rPr>
+              <a:t>,…</a:t>
+            </a:r>
+          </a:p>
+          <a:p>
+            <a:pPr lvl="1"/>
             <a:endParaRPr lang="en-US" dirty="0"/>
           </a:p>
         </p:txBody>
@@ -3687,6 +3875,1428 @@
             <a:fld id="{CA586AD6-E5F2-4F25-940D-C674496063E2}" type="slidenum">
               <a:rPr lang="en-US" smtClean="0"/>
               <a:t>10</a:t>
+            </a:fld>
+            <a:endParaRPr lang="en-US"/>
+          </a:p>
+        </p:txBody>
+      </p:sp>
+      <p:grpSp>
+        <p:nvGrpSpPr>
+          <p:cNvPr id="11" name="Group 10"/>
+          <p:cNvGrpSpPr/>
+          <p:nvPr/>
+        </p:nvGrpSpPr>
+        <p:grpSpPr>
+          <a:xfrm>
+            <a:off x="1444330" y="3054927"/>
+            <a:ext cx="2284023" cy="1003969"/>
+            <a:chOff x="1444330" y="3054927"/>
+            <a:chExt cx="2284023" cy="1003969"/>
+          </a:xfrm>
+        </p:grpSpPr>
+        <p:sp>
+          <p:nvSpPr>
+            <p:cNvPr id="6" name="Rounded Rectangle 5"/>
+            <p:cNvSpPr/>
+            <p:nvPr/>
+          </p:nvSpPr>
+          <p:spPr>
+            <a:xfrm>
+              <a:off x="3304309" y="3054927"/>
+              <a:ext cx="228600" cy="290946"/>
+            </a:xfrm>
+            <a:prstGeom prst="roundRect">
+              <a:avLst/>
+            </a:prstGeom>
+            <a:noFill/>
+            <a:ln w="25400">
+              <a:solidFill>
+                <a:srgbClr val="0070C0"/>
+              </a:solidFill>
+            </a:ln>
+          </p:spPr>
+          <p:style>
+            <a:lnRef idx="2">
+              <a:schemeClr val="accent1">
+                <a:shade val="50000"/>
+              </a:schemeClr>
+            </a:lnRef>
+            <a:fillRef idx="1">
+              <a:schemeClr val="accent1"/>
+            </a:fillRef>
+            <a:effectRef idx="0">
+              <a:schemeClr val="accent1"/>
+            </a:effectRef>
+            <a:fontRef idx="minor">
+              <a:schemeClr val="lt1"/>
+            </a:fontRef>
+          </p:style>
+          <p:txBody>
+            <a:bodyPr rtlCol="0" anchor="ctr"/>
+            <a:lstStyle/>
+            <a:p>
+              <a:pPr algn="ctr"/>
+              <a:endParaRPr lang="en-US"/>
+            </a:p>
+          </p:txBody>
+        </p:sp>
+        <p:cxnSp>
+          <p:nvCxnSpPr>
+            <p:cNvPr id="8" name="Straight Arrow Connector 7"/>
+            <p:cNvCxnSpPr>
+              <a:stCxn id="9" idx="0"/>
+              <a:endCxn id="6" idx="2"/>
+            </p:cNvCxnSpPr>
+            <p:nvPr/>
+          </p:nvCxnSpPr>
+          <p:spPr>
+            <a:xfrm flipV="1">
+              <a:off x="2586342" y="3345873"/>
+              <a:ext cx="832267" cy="343691"/>
+            </a:xfrm>
+            <a:prstGeom prst="straightConnector1">
+              <a:avLst/>
+            </a:prstGeom>
+            <a:ln w="25400">
+              <a:solidFill>
+                <a:srgbClr val="0070C0"/>
+              </a:solidFill>
+              <a:tailEnd type="stealth" w="lg" len="lg"/>
+            </a:ln>
+          </p:spPr>
+          <p:style>
+            <a:lnRef idx="1">
+              <a:schemeClr val="accent1"/>
+            </a:lnRef>
+            <a:fillRef idx="0">
+              <a:schemeClr val="accent1"/>
+            </a:fillRef>
+            <a:effectRef idx="0">
+              <a:schemeClr val="accent1"/>
+            </a:effectRef>
+            <a:fontRef idx="minor">
+              <a:schemeClr val="tx1"/>
+            </a:fontRef>
+          </p:style>
+        </p:cxnSp>
+        <p:sp>
+          <p:nvSpPr>
+            <p:cNvPr id="9" name="TextBox 8"/>
+            <p:cNvSpPr txBox="1"/>
+            <p:nvPr/>
+          </p:nvSpPr>
+          <p:spPr>
+            <a:xfrm>
+              <a:off x="1444330" y="3689564"/>
+              <a:ext cx="2284023" cy="369332"/>
+            </a:xfrm>
+            <a:prstGeom prst="rect">
+              <a:avLst/>
+            </a:prstGeom>
+            <a:noFill/>
+            <a:ln w="19050">
+              <a:solidFill>
+                <a:srgbClr val="0070C0"/>
+              </a:solidFill>
+            </a:ln>
+          </p:spPr>
+          <p:txBody>
+            <a:bodyPr wrap="none" rtlCol="0">
+              <a:spAutoFit/>
+            </a:bodyPr>
+            <a:lstStyle/>
+            <a:p>
+              <a:r>
+                <a:rPr lang="en-US" dirty="0" smtClean="0">
+                  <a:solidFill>
+                    <a:srgbClr val="0070C0"/>
+                  </a:solidFill>
+                </a:rPr>
+                <a:t>start position, 0-based</a:t>
+              </a:r>
+              <a:endParaRPr lang="en-US" dirty="0">
+                <a:solidFill>
+                  <a:srgbClr val="0070C0"/>
+                </a:solidFill>
+              </a:endParaRPr>
+            </a:p>
+          </p:txBody>
+        </p:sp>
+      </p:grpSp>
+      <p:grpSp>
+        <p:nvGrpSpPr>
+          <p:cNvPr id="12" name="Group 11"/>
+          <p:cNvGrpSpPr/>
+          <p:nvPr/>
+        </p:nvGrpSpPr>
+        <p:grpSpPr>
+          <a:xfrm>
+            <a:off x="3689079" y="3054927"/>
+            <a:ext cx="3354730" cy="1003969"/>
+            <a:chOff x="737441" y="3054927"/>
+            <a:chExt cx="3354730" cy="1003969"/>
+          </a:xfrm>
+        </p:grpSpPr>
+        <p:sp>
+          <p:nvSpPr>
+            <p:cNvPr id="13" name="Rounded Rectangle 12"/>
+            <p:cNvSpPr/>
+            <p:nvPr/>
+          </p:nvSpPr>
+          <p:spPr>
+            <a:xfrm>
+              <a:off x="737441" y="3054927"/>
+              <a:ext cx="727672" cy="290946"/>
+            </a:xfrm>
+            <a:prstGeom prst="roundRect">
+              <a:avLst/>
+            </a:prstGeom>
+            <a:noFill/>
+            <a:ln w="25400">
+              <a:solidFill>
+                <a:srgbClr val="C00000"/>
+              </a:solidFill>
+            </a:ln>
+          </p:spPr>
+          <p:style>
+            <a:lnRef idx="2">
+              <a:schemeClr val="accent1">
+                <a:shade val="50000"/>
+              </a:schemeClr>
+            </a:lnRef>
+            <a:fillRef idx="1">
+              <a:schemeClr val="accent1"/>
+            </a:fillRef>
+            <a:effectRef idx="0">
+              <a:schemeClr val="accent1"/>
+            </a:effectRef>
+            <a:fontRef idx="minor">
+              <a:schemeClr val="lt1"/>
+            </a:fontRef>
+          </p:style>
+          <p:txBody>
+            <a:bodyPr rtlCol="0" anchor="ctr"/>
+            <a:lstStyle/>
+            <a:p>
+              <a:pPr algn="ctr"/>
+              <a:endParaRPr lang="en-US"/>
+            </a:p>
+          </p:txBody>
+        </p:sp>
+        <p:cxnSp>
+          <p:nvCxnSpPr>
+            <p:cNvPr id="14" name="Straight Arrow Connector 13"/>
+            <p:cNvCxnSpPr>
+              <a:stCxn id="15" idx="0"/>
+              <a:endCxn id="13" idx="2"/>
+            </p:cNvCxnSpPr>
+            <p:nvPr/>
+          </p:nvCxnSpPr>
+          <p:spPr>
+            <a:xfrm flipH="1" flipV="1">
+              <a:off x="1101277" y="3345873"/>
+              <a:ext cx="1666974" cy="343691"/>
+            </a:xfrm>
+            <a:prstGeom prst="straightConnector1">
+              <a:avLst/>
+            </a:prstGeom>
+            <a:ln w="25400">
+              <a:solidFill>
+                <a:srgbClr val="C00000"/>
+              </a:solidFill>
+              <a:tailEnd type="stealth" w="lg" len="lg"/>
+            </a:ln>
+          </p:spPr>
+          <p:style>
+            <a:lnRef idx="1">
+              <a:schemeClr val="accent1"/>
+            </a:lnRef>
+            <a:fillRef idx="0">
+              <a:schemeClr val="accent1"/>
+            </a:fillRef>
+            <a:effectRef idx="0">
+              <a:schemeClr val="accent1"/>
+            </a:effectRef>
+            <a:fontRef idx="minor">
+              <a:schemeClr val="tx1"/>
+            </a:fontRef>
+          </p:style>
+        </p:cxnSp>
+        <p:sp>
+          <p:nvSpPr>
+            <p:cNvPr id="15" name="TextBox 14"/>
+            <p:cNvSpPr txBox="1"/>
+            <p:nvPr/>
+          </p:nvSpPr>
+          <p:spPr>
+            <a:xfrm>
+              <a:off x="1444330" y="3689564"/>
+              <a:ext cx="2647841" cy="369332"/>
+            </a:xfrm>
+            <a:prstGeom prst="rect">
+              <a:avLst/>
+            </a:prstGeom>
+            <a:noFill/>
+            <a:ln w="19050">
+              <a:solidFill>
+                <a:srgbClr val="C00000"/>
+              </a:solidFill>
+            </a:ln>
+          </p:spPr>
+          <p:txBody>
+            <a:bodyPr wrap="none" rtlCol="0">
+              <a:spAutoFit/>
+            </a:bodyPr>
+            <a:lstStyle/>
+            <a:p>
+              <a:r>
+                <a:rPr lang="en-US" dirty="0" smtClean="0">
+                  <a:solidFill>
+                    <a:srgbClr val="C00000"/>
+                  </a:solidFill>
+                </a:rPr>
+                <a:t>end position, not inclusive</a:t>
+              </a:r>
+              <a:endParaRPr lang="en-US" dirty="0">
+                <a:solidFill>
+                  <a:srgbClr val="C00000"/>
+                </a:solidFill>
+              </a:endParaRPr>
+            </a:p>
+          </p:txBody>
+        </p:sp>
+      </p:grpSp>
+    </p:spTree>
+    <p:extLst>
+      <p:ext uri="{BB962C8B-B14F-4D97-AF65-F5344CB8AC3E}">
+        <p14:creationId xmlns:p14="http://schemas.microsoft.com/office/powerpoint/2010/main" val="2750566560"/>
+      </p:ext>
+    </p:extLst>
+  </p:cSld>
+  <p:clrMapOvr>
+    <a:masterClrMapping/>
+  </p:clrMapOvr>
+  <p:timing>
+    <p:tnLst>
+      <p:par>
+        <p:cTn id="1" dur="indefinite" restart="never" nodeType="tmRoot"/>
+      </p:par>
+    </p:tnLst>
+  </p:timing>
+</p:sld>
+</file>
+
+<file path=ppt/slides/slide11.xml><?xml version="1.0" encoding="utf-8"?>
+<p:sld xmlns:a="http://schemas.openxmlformats.org/drawingml/2006/main" xmlns:r="http://schemas.openxmlformats.org/officeDocument/2006/relationships" xmlns:p="http://schemas.openxmlformats.org/presentationml/2006/main">
+  <p:cSld>
+    <p:spTree>
+      <p:nvGrpSpPr>
+        <p:cNvPr id="1" name=""/>
+        <p:cNvGrpSpPr/>
+        <p:nvPr/>
+      </p:nvGrpSpPr>
+      <p:grpSpPr>
+        <a:xfrm>
+          <a:off x="0" y="0"/>
+          <a:ext cx="0" cy="0"/>
+          <a:chOff x="0" y="0"/>
+          <a:chExt cx="0" cy="0"/>
+        </a:xfrm>
+      </p:grpSpPr>
+      <p:sp>
+        <p:nvSpPr>
+          <p:cNvPr id="2" name="Title 1"/>
+          <p:cNvSpPr>
+            <a:spLocks noGrp="1"/>
+          </p:cNvSpPr>
+          <p:nvPr>
+            <p:ph type="title"/>
+          </p:nvPr>
+        </p:nvSpPr>
+        <p:spPr/>
+        <p:txBody>
+          <a:bodyPr/>
+          <a:lstStyle/>
+          <a:p>
+            <a:r>
+              <a:rPr lang="en-US" dirty="0" smtClean="0"/>
+              <a:t>Accessing features</a:t>
+            </a:r>
+            <a:endParaRPr lang="en-US" dirty="0"/>
+          </a:p>
+        </p:txBody>
+      </p:sp>
+      <p:sp>
+        <p:nvSpPr>
+          <p:cNvPr id="4" name="Slide Number Placeholder 3"/>
+          <p:cNvSpPr>
+            <a:spLocks noGrp="1"/>
+          </p:cNvSpPr>
+          <p:nvPr>
+            <p:ph type="sldNum" sz="quarter" idx="12"/>
+          </p:nvPr>
+        </p:nvSpPr>
+        <p:spPr/>
+        <p:txBody>
+          <a:bodyPr/>
+          <a:lstStyle/>
+          <a:p>
+            <a:fld id="{CA586AD6-E5F2-4F25-940D-C674496063E2}" type="slidenum">
+              <a:rPr lang="en-US" smtClean="0"/>
+              <a:t>11</a:t>
+            </a:fld>
+            <a:endParaRPr lang="en-US"/>
+          </a:p>
+        </p:txBody>
+      </p:sp>
+      <p:sp>
+        <p:nvSpPr>
+          <p:cNvPr id="6" name="TextBox 5"/>
+          <p:cNvSpPr txBox="1"/>
+          <p:nvPr/>
+        </p:nvSpPr>
+        <p:spPr>
+          <a:xfrm>
+            <a:off x="831271" y="1701080"/>
+            <a:ext cx="7242465" cy="1754326"/>
+          </a:xfrm>
+          <a:prstGeom prst="rect">
+            <a:avLst/>
+          </a:prstGeom>
+          <a:solidFill>
+            <a:schemeClr val="bg1">
+              <a:lumMod val="75000"/>
+            </a:schemeClr>
+          </a:solidFill>
+          <a:ln>
+            <a:solidFill>
+              <a:schemeClr val="tx1"/>
+            </a:solidFill>
+          </a:ln>
+        </p:spPr>
+        <p:txBody>
+          <a:bodyPr wrap="square" rtlCol="0">
+            <a:spAutoFit/>
+          </a:bodyPr>
+          <a:lstStyle/>
+          <a:p>
+            <a:r>
+              <a:rPr lang="en-US" dirty="0" smtClean="0">
+                <a:latin typeface="Courier New" panose="02070309020205020404" pitchFamily="49" charset="0"/>
+                <a:cs typeface="Courier New" panose="02070309020205020404" pitchFamily="49" charset="0"/>
+              </a:rPr>
+              <a:t>for </a:t>
+            </a:r>
+            <a:r>
+              <a:rPr lang="en-US" dirty="0">
+                <a:latin typeface="Courier New" panose="02070309020205020404" pitchFamily="49" charset="0"/>
+                <a:cs typeface="Courier New" panose="02070309020205020404" pitchFamily="49" charset="0"/>
+              </a:rPr>
+              <a:t>feature in </a:t>
+            </a:r>
+            <a:r>
+              <a:rPr lang="en-US" dirty="0" err="1">
+                <a:latin typeface="Courier New" panose="02070309020205020404" pitchFamily="49" charset="0"/>
+                <a:cs typeface="Courier New" panose="02070309020205020404" pitchFamily="49" charset="0"/>
+              </a:rPr>
+              <a:t>seq_record.features</a:t>
+            </a:r>
+            <a:r>
+              <a:rPr lang="en-US" dirty="0">
+                <a:latin typeface="Courier New" panose="02070309020205020404" pitchFamily="49" charset="0"/>
+                <a:cs typeface="Courier New" panose="02070309020205020404" pitchFamily="49" charset="0"/>
+              </a:rPr>
+              <a:t>:</a:t>
+            </a:r>
+          </a:p>
+          <a:p>
+            <a:r>
+              <a:rPr lang="en-US" dirty="0" smtClean="0">
+                <a:latin typeface="Courier New" panose="02070309020205020404" pitchFamily="49" charset="0"/>
+                <a:cs typeface="Courier New" panose="02070309020205020404" pitchFamily="49" charset="0"/>
+              </a:rPr>
+              <a:t>    </a:t>
+            </a:r>
+            <a:r>
+              <a:rPr lang="en-US" dirty="0">
+                <a:latin typeface="Courier New" panose="02070309020205020404" pitchFamily="49" charset="0"/>
+                <a:cs typeface="Courier New" panose="02070309020205020404" pitchFamily="49" charset="0"/>
+              </a:rPr>
+              <a:t>print</a:t>
+            </a:r>
+            <a:r>
+              <a:rPr lang="en-US" dirty="0" smtClean="0">
+                <a:latin typeface="Courier New" panose="02070309020205020404" pitchFamily="49" charset="0"/>
+                <a:cs typeface="Courier New" panose="02070309020205020404" pitchFamily="49" charset="0"/>
+              </a:rPr>
+              <a:t>('Type</a:t>
+            </a:r>
+            <a:r>
+              <a:rPr lang="en-US" dirty="0">
+                <a:latin typeface="Courier New" panose="02070309020205020404" pitchFamily="49" charset="0"/>
+                <a:cs typeface="Courier New" panose="02070309020205020404" pitchFamily="49" charset="0"/>
+              </a:rPr>
+              <a:t>: </a:t>
+            </a:r>
+            <a:r>
+              <a:rPr lang="en-US" dirty="0" smtClean="0">
+                <a:latin typeface="Courier New" panose="02070309020205020404" pitchFamily="49" charset="0"/>
+                <a:cs typeface="Courier New" panose="02070309020205020404" pitchFamily="49" charset="0"/>
+              </a:rPr>
+              <a:t>{0}'.format(</a:t>
+            </a:r>
+            <a:r>
+              <a:rPr lang="en-US" dirty="0" err="1" smtClean="0">
+                <a:latin typeface="Courier New" panose="02070309020205020404" pitchFamily="49" charset="0"/>
+                <a:cs typeface="Courier New" panose="02070309020205020404" pitchFamily="49" charset="0"/>
+              </a:rPr>
+              <a:t>feature.type</a:t>
+            </a:r>
+            <a:r>
+              <a:rPr lang="en-US" dirty="0">
+                <a:latin typeface="Courier New" panose="02070309020205020404" pitchFamily="49" charset="0"/>
+                <a:cs typeface="Courier New" panose="02070309020205020404" pitchFamily="49" charset="0"/>
+              </a:rPr>
+              <a:t>))</a:t>
+            </a:r>
+          </a:p>
+          <a:p>
+            <a:r>
+              <a:rPr lang="en-US" dirty="0" smtClean="0">
+                <a:latin typeface="Courier New" panose="02070309020205020404" pitchFamily="49" charset="0"/>
+                <a:cs typeface="Courier New" panose="02070309020205020404" pitchFamily="49" charset="0"/>
+              </a:rPr>
+              <a:t>    print('Location</a:t>
+            </a:r>
+            <a:r>
+              <a:rPr lang="en-US" dirty="0">
+                <a:latin typeface="Courier New" panose="02070309020205020404" pitchFamily="49" charset="0"/>
+                <a:cs typeface="Courier New" panose="02070309020205020404" pitchFamily="49" charset="0"/>
+              </a:rPr>
+              <a:t>: </a:t>
+            </a:r>
+            <a:r>
+              <a:rPr lang="en-US" dirty="0" smtClean="0">
+                <a:latin typeface="Courier New" panose="02070309020205020404" pitchFamily="49" charset="0"/>
+                <a:cs typeface="Courier New" panose="02070309020205020404" pitchFamily="49" charset="0"/>
+              </a:rPr>
+              <a:t>{0}'.format(</a:t>
+            </a:r>
+            <a:r>
+              <a:rPr lang="en-US" dirty="0" err="1" smtClean="0">
+                <a:latin typeface="Courier New" panose="02070309020205020404" pitchFamily="49" charset="0"/>
+                <a:cs typeface="Courier New" panose="02070309020205020404" pitchFamily="49" charset="0"/>
+              </a:rPr>
+              <a:t>feature.location</a:t>
+            </a:r>
+            <a:r>
+              <a:rPr lang="en-US" dirty="0">
+                <a:latin typeface="Courier New" panose="02070309020205020404" pitchFamily="49" charset="0"/>
+                <a:cs typeface="Courier New" panose="02070309020205020404" pitchFamily="49" charset="0"/>
+              </a:rPr>
+              <a:t>))</a:t>
+            </a:r>
+          </a:p>
+          <a:p>
+            <a:r>
+              <a:rPr lang="en-US" dirty="0">
+                <a:latin typeface="Courier New" panose="02070309020205020404" pitchFamily="49" charset="0"/>
+                <a:cs typeface="Courier New" panose="02070309020205020404" pitchFamily="49" charset="0"/>
+              </a:rPr>
+              <a:t> </a:t>
+            </a:r>
+            <a:r>
+              <a:rPr lang="en-US" dirty="0" smtClean="0">
+                <a:latin typeface="Courier New" panose="02070309020205020404" pitchFamily="49" charset="0"/>
+                <a:cs typeface="Courier New" panose="02070309020205020404" pitchFamily="49" charset="0"/>
+              </a:rPr>
+              <a:t>   </a:t>
+            </a:r>
+            <a:r>
+              <a:rPr lang="en-US" dirty="0">
+                <a:latin typeface="Courier New" panose="02070309020205020404" pitchFamily="49" charset="0"/>
+                <a:cs typeface="Courier New" panose="02070309020205020404" pitchFamily="49" charset="0"/>
+              </a:rPr>
+              <a:t>for key, value in </a:t>
+            </a:r>
+            <a:r>
+              <a:rPr lang="en-US" dirty="0" err="1">
+                <a:latin typeface="Courier New" panose="02070309020205020404" pitchFamily="49" charset="0"/>
+                <a:cs typeface="Courier New" panose="02070309020205020404" pitchFamily="49" charset="0"/>
+              </a:rPr>
+              <a:t>feature.qualifiers.items</a:t>
+            </a:r>
+            <a:r>
+              <a:rPr lang="en-US" dirty="0">
+                <a:latin typeface="Courier New" panose="02070309020205020404" pitchFamily="49" charset="0"/>
+                <a:cs typeface="Courier New" panose="02070309020205020404" pitchFamily="49" charset="0"/>
+              </a:rPr>
+              <a:t>():</a:t>
+            </a:r>
+          </a:p>
+          <a:p>
+            <a:r>
+              <a:rPr lang="en-US" dirty="0" smtClean="0">
+                <a:latin typeface="Courier New" panose="02070309020205020404" pitchFamily="49" charset="0"/>
+                <a:cs typeface="Courier New" panose="02070309020205020404" pitchFamily="49" charset="0"/>
+              </a:rPr>
+              <a:t>        print('{0}: {1}'.format(key,</a:t>
+            </a:r>
+          </a:p>
+          <a:p>
+            <a:r>
+              <a:rPr lang="en-US" dirty="0">
+                <a:latin typeface="Courier New" panose="02070309020205020404" pitchFamily="49" charset="0"/>
+                <a:cs typeface="Courier New" panose="02070309020205020404" pitchFamily="49" charset="0"/>
+              </a:rPr>
+              <a:t> </a:t>
+            </a:r>
+            <a:r>
+              <a:rPr lang="en-US" dirty="0" smtClean="0">
+                <a:latin typeface="Courier New" panose="02070309020205020404" pitchFamily="49" charset="0"/>
+                <a:cs typeface="Courier New" panose="02070309020205020404" pitchFamily="49" charset="0"/>
+              </a:rPr>
+              <a:t>                               '; </a:t>
+            </a:r>
+            <a:r>
+              <a:rPr lang="en-US" dirty="0">
+                <a:latin typeface="Courier New" panose="02070309020205020404" pitchFamily="49" charset="0"/>
+                <a:cs typeface="Courier New" panose="02070309020205020404" pitchFamily="49" charset="0"/>
+              </a:rPr>
+              <a:t>'.join(value</a:t>
+            </a:r>
+            <a:r>
+              <a:rPr lang="en-US" dirty="0" smtClean="0">
+                <a:latin typeface="Courier New" panose="02070309020205020404" pitchFamily="49" charset="0"/>
+                <a:cs typeface="Courier New" panose="02070309020205020404" pitchFamily="49" charset="0"/>
+              </a:rPr>
+              <a:t>)))</a:t>
+            </a:r>
+            <a:endParaRPr lang="en-US" dirty="0">
+              <a:latin typeface="Courier New" panose="02070309020205020404" pitchFamily="49" charset="0"/>
+              <a:cs typeface="Courier New" panose="02070309020205020404" pitchFamily="49" charset="0"/>
+            </a:endParaRPr>
+          </a:p>
+        </p:txBody>
+      </p:sp>
+      <p:sp>
+        <p:nvSpPr>
+          <p:cNvPr id="7" name="TextBox 6"/>
+          <p:cNvSpPr txBox="1"/>
+          <p:nvPr/>
+        </p:nvSpPr>
+        <p:spPr>
+          <a:xfrm>
+            <a:off x="831270" y="3771899"/>
+            <a:ext cx="7242465" cy="2031325"/>
+          </a:xfrm>
+          <a:prstGeom prst="rect">
+            <a:avLst/>
+          </a:prstGeom>
+          <a:solidFill>
+            <a:schemeClr val="tx1"/>
+          </a:solidFill>
+        </p:spPr>
+        <p:txBody>
+          <a:bodyPr wrap="square" rtlCol="0">
+            <a:spAutoFit/>
+          </a:bodyPr>
+          <a:lstStyle/>
+          <a:p>
+            <a:r>
+              <a:rPr lang="en-US" b="1" dirty="0" smtClean="0">
+                <a:solidFill>
+                  <a:schemeClr val="bg1"/>
+                </a:solidFill>
+              </a:rPr>
+              <a:t>… </a:t>
+            </a:r>
+          </a:p>
+          <a:p>
+            <a:r>
+              <a:rPr lang="en-US" b="1" dirty="0" smtClean="0">
+                <a:solidFill>
+                  <a:schemeClr val="bg1"/>
+                </a:solidFill>
+              </a:rPr>
+              <a:t>Type</a:t>
+            </a:r>
+            <a:r>
+              <a:rPr lang="en-US" b="1" dirty="0">
+                <a:solidFill>
+                  <a:schemeClr val="bg1"/>
+                </a:solidFill>
+              </a:rPr>
+              <a:t>: exon</a:t>
+            </a:r>
+          </a:p>
+          <a:p>
+            <a:r>
+              <a:rPr lang="en-US" b="1" dirty="0" smtClean="0">
+                <a:solidFill>
+                  <a:schemeClr val="bg1"/>
+                </a:solidFill>
+              </a:rPr>
+              <a:t>Location</a:t>
+            </a:r>
+            <a:r>
+              <a:rPr lang="en-US" b="1" dirty="0">
+                <a:solidFill>
+                  <a:schemeClr val="bg1"/>
+                </a:solidFill>
+              </a:rPr>
+              <a:t>: [114:205](+)</a:t>
+            </a:r>
+          </a:p>
+          <a:p>
+            <a:r>
+              <a:rPr lang="en-US" b="1" dirty="0" smtClean="0">
+                <a:solidFill>
+                  <a:schemeClr val="bg1"/>
+                </a:solidFill>
+              </a:rPr>
+              <a:t>inference</a:t>
+            </a:r>
+            <a:r>
+              <a:rPr lang="en-US" b="1" dirty="0">
+                <a:solidFill>
+                  <a:schemeClr val="bg1"/>
+                </a:solidFill>
+              </a:rPr>
+              <a:t>: alignment:Splign:1.39.8</a:t>
+            </a:r>
+          </a:p>
+          <a:p>
+            <a:r>
+              <a:rPr lang="en-US" b="1" dirty="0" err="1" smtClean="0">
+                <a:solidFill>
+                  <a:schemeClr val="bg1"/>
+                </a:solidFill>
+              </a:rPr>
+              <a:t>gene_synonym</a:t>
+            </a:r>
+            <a:r>
+              <a:rPr lang="en-US" b="1" dirty="0">
+                <a:solidFill>
+                  <a:schemeClr val="bg1"/>
+                </a:solidFill>
+              </a:rPr>
+              <a:t>: COCA2; FCC2; hMLH1; HNPCC; HNPCC2</a:t>
+            </a:r>
+          </a:p>
+          <a:p>
+            <a:r>
+              <a:rPr lang="en-US" b="1" dirty="0" smtClean="0">
+                <a:solidFill>
+                  <a:schemeClr val="bg1"/>
+                </a:solidFill>
+              </a:rPr>
+              <a:t>gene</a:t>
+            </a:r>
+            <a:r>
+              <a:rPr lang="en-US" b="1" dirty="0">
+                <a:solidFill>
+                  <a:schemeClr val="bg1"/>
+                </a:solidFill>
+              </a:rPr>
+              <a:t>: </a:t>
+            </a:r>
+            <a:r>
+              <a:rPr lang="en-US" b="1" dirty="0" smtClean="0">
+                <a:solidFill>
+                  <a:schemeClr val="bg1"/>
+                </a:solidFill>
+              </a:rPr>
+              <a:t>MLH1</a:t>
+            </a:r>
+          </a:p>
+          <a:p>
+            <a:r>
+              <a:rPr lang="en-US" b="1" dirty="0" smtClean="0">
+                <a:solidFill>
+                  <a:schemeClr val="bg1"/>
+                </a:solidFill>
+              </a:rPr>
+              <a:t>…</a:t>
+            </a:r>
+            <a:endParaRPr lang="en-US" b="1" dirty="0">
+              <a:solidFill>
+                <a:schemeClr val="bg1"/>
+              </a:solidFill>
+            </a:endParaRPr>
+          </a:p>
+        </p:txBody>
+      </p:sp>
+    </p:spTree>
+    <p:extLst>
+      <p:ext uri="{BB962C8B-B14F-4D97-AF65-F5344CB8AC3E}">
+        <p14:creationId xmlns:p14="http://schemas.microsoft.com/office/powerpoint/2010/main" val="3357482936"/>
+      </p:ext>
+    </p:extLst>
+  </p:cSld>
+  <p:clrMapOvr>
+    <a:masterClrMapping/>
+  </p:clrMapOvr>
+  <p:timing>
+    <p:tnLst>
+      <p:par>
+        <p:cTn id="1" dur="indefinite" restart="never" nodeType="tmRoot"/>
+      </p:par>
+    </p:tnLst>
+  </p:timing>
+</p:sld>
+</file>
+
+<file path=ppt/slides/slide12.xml><?xml version="1.0" encoding="utf-8"?>
+<p:sld xmlns:a="http://schemas.openxmlformats.org/drawingml/2006/main" xmlns:r="http://schemas.openxmlformats.org/officeDocument/2006/relationships" xmlns:p="http://schemas.openxmlformats.org/presentationml/2006/main">
+  <p:cSld>
+    <p:spTree>
+      <p:nvGrpSpPr>
+        <p:cNvPr id="1" name=""/>
+        <p:cNvGrpSpPr/>
+        <p:nvPr/>
+      </p:nvGrpSpPr>
+      <p:grpSpPr>
+        <a:xfrm>
+          <a:off x="0" y="0"/>
+          <a:ext cx="0" cy="0"/>
+          <a:chOff x="0" y="0"/>
+          <a:chExt cx="0" cy="0"/>
+        </a:xfrm>
+      </p:grpSpPr>
+      <p:sp>
+        <p:nvSpPr>
+          <p:cNvPr id="2" name="Title 1"/>
+          <p:cNvSpPr>
+            <a:spLocks noGrp="1"/>
+          </p:cNvSpPr>
+          <p:nvPr>
+            <p:ph type="title"/>
+          </p:nvPr>
+        </p:nvSpPr>
+        <p:spPr/>
+        <p:txBody>
+          <a:bodyPr/>
+          <a:lstStyle/>
+          <a:p>
+            <a:r>
+              <a:rPr lang="en-US" dirty="0" smtClean="0"/>
+              <a:t>Slicing a record</a:t>
+            </a:r>
+            <a:endParaRPr lang="en-US" dirty="0"/>
+          </a:p>
+        </p:txBody>
+      </p:sp>
+      <p:sp>
+        <p:nvSpPr>
+          <p:cNvPr id="3" name="Content Placeholder 2"/>
+          <p:cNvSpPr>
+            <a:spLocks noGrp="1"/>
+          </p:cNvSpPr>
+          <p:nvPr>
+            <p:ph idx="1"/>
+          </p:nvPr>
+        </p:nvSpPr>
+        <p:spPr>
+          <a:xfrm>
+            <a:off x="628650" y="1908753"/>
+            <a:ext cx="7886700" cy="4351338"/>
+          </a:xfrm>
+        </p:spPr>
+        <p:txBody>
+          <a:bodyPr/>
+          <a:lstStyle/>
+          <a:p>
+            <a:r>
+              <a:rPr lang="en-US" dirty="0" smtClean="0"/>
+              <a:t>Extracting a subsequence using feature location</a:t>
+            </a:r>
+            <a:endParaRPr lang="en-US" dirty="0"/>
+          </a:p>
+        </p:txBody>
+      </p:sp>
+      <p:sp>
+        <p:nvSpPr>
+          <p:cNvPr id="4" name="Slide Number Placeholder 3"/>
+          <p:cNvSpPr>
+            <a:spLocks noGrp="1"/>
+          </p:cNvSpPr>
+          <p:nvPr>
+            <p:ph type="sldNum" sz="quarter" idx="12"/>
+          </p:nvPr>
+        </p:nvSpPr>
+        <p:spPr/>
+        <p:txBody>
+          <a:bodyPr/>
+          <a:lstStyle/>
+          <a:p>
+            <a:fld id="{CA586AD6-E5F2-4F25-940D-C674496063E2}" type="slidenum">
+              <a:rPr lang="en-US" smtClean="0"/>
+              <a:t>12</a:t>
+            </a:fld>
+            <a:endParaRPr lang="en-US"/>
+          </a:p>
+        </p:txBody>
+      </p:sp>
+      <p:sp>
+        <p:nvSpPr>
+          <p:cNvPr id="5" name="TextBox 4"/>
+          <p:cNvSpPr txBox="1"/>
+          <p:nvPr/>
+        </p:nvSpPr>
+        <p:spPr>
+          <a:xfrm>
+            <a:off x="831271" y="2334924"/>
+            <a:ext cx="7242465" cy="1754326"/>
+          </a:xfrm>
+          <a:prstGeom prst="rect">
+            <a:avLst/>
+          </a:prstGeom>
+          <a:solidFill>
+            <a:schemeClr val="bg1">
+              <a:lumMod val="75000"/>
+            </a:schemeClr>
+          </a:solidFill>
+          <a:ln>
+            <a:solidFill>
+              <a:schemeClr val="tx1"/>
+            </a:solidFill>
+          </a:ln>
+        </p:spPr>
+        <p:txBody>
+          <a:bodyPr wrap="square" rtlCol="0">
+            <a:spAutoFit/>
+          </a:bodyPr>
+          <a:lstStyle/>
+          <a:p>
+            <a:r>
+              <a:rPr lang="en-US" dirty="0" err="1" smtClean="0">
+                <a:latin typeface="Courier New" panose="02070309020205020404" pitchFamily="49" charset="0"/>
+                <a:cs typeface="Courier New" panose="02070309020205020404" pitchFamily="49" charset="0"/>
+              </a:rPr>
+              <a:t>exon_feature</a:t>
+            </a:r>
+            <a:r>
+              <a:rPr lang="en-US" dirty="0" smtClean="0">
+                <a:latin typeface="Courier New" panose="02070309020205020404" pitchFamily="49" charset="0"/>
+                <a:cs typeface="Courier New" panose="02070309020205020404" pitchFamily="49" charset="0"/>
+              </a:rPr>
+              <a:t> = </a:t>
+            </a:r>
+            <a:r>
+              <a:rPr lang="en-US" dirty="0" err="1" smtClean="0">
+                <a:latin typeface="Courier New" panose="02070309020205020404" pitchFamily="49" charset="0"/>
+                <a:cs typeface="Courier New" panose="02070309020205020404" pitchFamily="49" charset="0"/>
+              </a:rPr>
+              <a:t>seq_record.features</a:t>
+            </a:r>
+            <a:r>
+              <a:rPr lang="en-US" dirty="0" smtClean="0">
+                <a:latin typeface="Courier New" panose="02070309020205020404" pitchFamily="49" charset="0"/>
+                <a:cs typeface="Courier New" panose="02070309020205020404" pitchFamily="49" charset="0"/>
+              </a:rPr>
+              <a:t>[3]</a:t>
+            </a:r>
+          </a:p>
+          <a:p>
+            <a:r>
+              <a:rPr lang="en-US" dirty="0" err="1" smtClean="0">
+                <a:latin typeface="Courier New" panose="02070309020205020404" pitchFamily="49" charset="0"/>
+                <a:cs typeface="Courier New" panose="02070309020205020404" pitchFamily="49" charset="0"/>
+              </a:rPr>
+              <a:t>start_pos</a:t>
+            </a:r>
+            <a:r>
+              <a:rPr lang="en-US" dirty="0" smtClean="0">
+                <a:latin typeface="Courier New" panose="02070309020205020404" pitchFamily="49" charset="0"/>
+                <a:cs typeface="Courier New" panose="02070309020205020404" pitchFamily="49" charset="0"/>
+              </a:rPr>
+              <a:t> = </a:t>
+            </a:r>
+            <a:r>
+              <a:rPr lang="en-US" dirty="0" err="1" smtClean="0">
+                <a:latin typeface="Courier New" panose="02070309020205020404" pitchFamily="49" charset="0"/>
+                <a:cs typeface="Courier New" panose="02070309020205020404" pitchFamily="49" charset="0"/>
+              </a:rPr>
+              <a:t>int</a:t>
+            </a:r>
+            <a:r>
+              <a:rPr lang="en-US" dirty="0" smtClean="0">
+                <a:latin typeface="Courier New" panose="02070309020205020404" pitchFamily="49" charset="0"/>
+                <a:cs typeface="Courier New" panose="02070309020205020404" pitchFamily="49" charset="0"/>
+              </a:rPr>
+              <a:t>(</a:t>
+            </a:r>
+            <a:r>
+              <a:rPr lang="en-US" dirty="0" err="1" smtClean="0">
+                <a:latin typeface="Courier New" panose="02070309020205020404" pitchFamily="49" charset="0"/>
+                <a:cs typeface="Courier New" panose="02070309020205020404" pitchFamily="49" charset="0"/>
+              </a:rPr>
+              <a:t>exon_feature.location.start</a:t>
+            </a:r>
+            <a:r>
+              <a:rPr lang="en-US" dirty="0" smtClean="0">
+                <a:latin typeface="Courier New" panose="02070309020205020404" pitchFamily="49" charset="0"/>
+                <a:cs typeface="Courier New" panose="02070309020205020404" pitchFamily="49" charset="0"/>
+              </a:rPr>
+              <a:t>)</a:t>
+            </a:r>
+          </a:p>
+          <a:p>
+            <a:r>
+              <a:rPr lang="en-US" dirty="0" err="1" smtClean="0">
+                <a:latin typeface="Courier New" panose="02070309020205020404" pitchFamily="49" charset="0"/>
+                <a:cs typeface="Courier New" panose="02070309020205020404" pitchFamily="49" charset="0"/>
+              </a:rPr>
+              <a:t>end_pos</a:t>
+            </a:r>
+            <a:r>
+              <a:rPr lang="en-US" dirty="0" smtClean="0">
+                <a:latin typeface="Courier New" panose="02070309020205020404" pitchFamily="49" charset="0"/>
+                <a:cs typeface="Courier New" panose="02070309020205020404" pitchFamily="49" charset="0"/>
+              </a:rPr>
+              <a:t> = </a:t>
+            </a:r>
+            <a:r>
+              <a:rPr lang="en-US" dirty="0" err="1" smtClean="0">
+                <a:latin typeface="Courier New" panose="02070309020205020404" pitchFamily="49" charset="0"/>
+                <a:cs typeface="Courier New" panose="02070309020205020404" pitchFamily="49" charset="0"/>
+              </a:rPr>
+              <a:t>int</a:t>
+            </a:r>
+            <a:r>
+              <a:rPr lang="en-US" dirty="0" smtClean="0">
+                <a:latin typeface="Courier New" panose="02070309020205020404" pitchFamily="49" charset="0"/>
+                <a:cs typeface="Courier New" panose="02070309020205020404" pitchFamily="49" charset="0"/>
+              </a:rPr>
+              <a:t>(</a:t>
+            </a:r>
+            <a:r>
+              <a:rPr lang="en-US" dirty="0" err="1" smtClean="0">
+                <a:latin typeface="Courier New" panose="02070309020205020404" pitchFamily="49" charset="0"/>
+                <a:cs typeface="Courier New" panose="02070309020205020404" pitchFamily="49" charset="0"/>
+              </a:rPr>
+              <a:t>exon_feature.location.end</a:t>
+            </a:r>
+            <a:r>
+              <a:rPr lang="en-US" dirty="0" smtClean="0">
+                <a:latin typeface="Courier New" panose="02070309020205020404" pitchFamily="49" charset="0"/>
+                <a:cs typeface="Courier New" panose="02070309020205020404" pitchFamily="49" charset="0"/>
+              </a:rPr>
+              <a:t>)</a:t>
+            </a:r>
+          </a:p>
+          <a:p>
+            <a:r>
+              <a:rPr lang="en-US" dirty="0" err="1" smtClean="0">
+                <a:latin typeface="Courier New" panose="02070309020205020404" pitchFamily="49" charset="0"/>
+                <a:cs typeface="Courier New" panose="02070309020205020404" pitchFamily="49" charset="0"/>
+              </a:rPr>
+              <a:t>exon_record</a:t>
+            </a:r>
+            <a:r>
+              <a:rPr lang="en-US" dirty="0" smtClean="0">
+                <a:latin typeface="Courier New" panose="02070309020205020404" pitchFamily="49" charset="0"/>
+                <a:cs typeface="Courier New" panose="02070309020205020404" pitchFamily="49" charset="0"/>
+              </a:rPr>
+              <a:t> = </a:t>
+            </a:r>
+            <a:r>
+              <a:rPr lang="en-US" dirty="0" err="1" smtClean="0">
+                <a:latin typeface="Courier New" panose="02070309020205020404" pitchFamily="49" charset="0"/>
+                <a:cs typeface="Courier New" panose="02070309020205020404" pitchFamily="49" charset="0"/>
+              </a:rPr>
+              <a:t>seq_record</a:t>
+            </a:r>
+            <a:r>
+              <a:rPr lang="en-US" dirty="0" smtClean="0">
+                <a:latin typeface="Courier New" panose="02070309020205020404" pitchFamily="49" charset="0"/>
+                <a:cs typeface="Courier New" panose="02070309020205020404" pitchFamily="49" charset="0"/>
+              </a:rPr>
+              <a:t>[</a:t>
+            </a:r>
+            <a:r>
+              <a:rPr lang="en-US" dirty="0" err="1" smtClean="0">
+                <a:latin typeface="Courier New" panose="02070309020205020404" pitchFamily="49" charset="0"/>
+                <a:cs typeface="Courier New" panose="02070309020205020404" pitchFamily="49" charset="0"/>
+              </a:rPr>
+              <a:t>start_pos:end_pos</a:t>
+            </a:r>
+            <a:r>
+              <a:rPr lang="en-US" dirty="0" smtClean="0">
+                <a:latin typeface="Courier New" panose="02070309020205020404" pitchFamily="49" charset="0"/>
+                <a:cs typeface="Courier New" panose="02070309020205020404" pitchFamily="49" charset="0"/>
+              </a:rPr>
+              <a:t>]</a:t>
+            </a:r>
+          </a:p>
+          <a:p>
+            <a:r>
+              <a:rPr lang="en-US" dirty="0" smtClean="0">
+                <a:latin typeface="Courier New" panose="02070309020205020404" pitchFamily="49" charset="0"/>
+                <a:cs typeface="Courier New" panose="02070309020205020404" pitchFamily="49" charset="0"/>
+              </a:rPr>
+              <a:t>print(</a:t>
+            </a:r>
+            <a:r>
+              <a:rPr lang="en-US" dirty="0" err="1" smtClean="0">
+                <a:latin typeface="Courier New" panose="02070309020205020404" pitchFamily="49" charset="0"/>
+                <a:cs typeface="Courier New" panose="02070309020205020404" pitchFamily="49" charset="0"/>
+              </a:rPr>
+              <a:t>exon_record.seq</a:t>
+            </a:r>
+            <a:r>
+              <a:rPr lang="en-US" dirty="0" smtClean="0">
+                <a:latin typeface="Courier New" panose="02070309020205020404" pitchFamily="49" charset="0"/>
+                <a:cs typeface="Courier New" panose="02070309020205020404" pitchFamily="49" charset="0"/>
+              </a:rPr>
+              <a:t>)</a:t>
+            </a:r>
+          </a:p>
+          <a:p>
+            <a:r>
+              <a:rPr lang="en-US" dirty="0" smtClean="0">
+                <a:latin typeface="Courier New" panose="02070309020205020404" pitchFamily="49" charset="0"/>
+                <a:cs typeface="Courier New" panose="02070309020205020404" pitchFamily="49" charset="0"/>
+              </a:rPr>
+              <a:t>print(</a:t>
+            </a:r>
+            <a:r>
+              <a:rPr lang="en-US" dirty="0" err="1" smtClean="0">
+                <a:latin typeface="Courier New" panose="02070309020205020404" pitchFamily="49" charset="0"/>
+                <a:cs typeface="Courier New" panose="02070309020205020404" pitchFamily="49" charset="0"/>
+              </a:rPr>
+              <a:t>exon_records.features</a:t>
+            </a:r>
+            <a:r>
+              <a:rPr lang="en-US" dirty="0" smtClean="0">
+                <a:latin typeface="Courier New" panose="02070309020205020404" pitchFamily="49" charset="0"/>
+                <a:cs typeface="Courier New" panose="02070309020205020404" pitchFamily="49" charset="0"/>
+              </a:rPr>
+              <a:t>[0])</a:t>
+            </a:r>
+            <a:endParaRPr lang="en-US" dirty="0">
+              <a:latin typeface="Courier New" panose="02070309020205020404" pitchFamily="49" charset="0"/>
+              <a:cs typeface="Courier New" panose="02070309020205020404" pitchFamily="49" charset="0"/>
+            </a:endParaRPr>
+          </a:p>
+        </p:txBody>
+      </p:sp>
+      <p:sp>
+        <p:nvSpPr>
+          <p:cNvPr id="6" name="TextBox 5"/>
+          <p:cNvSpPr txBox="1"/>
+          <p:nvPr/>
+        </p:nvSpPr>
+        <p:spPr>
+          <a:xfrm>
+            <a:off x="831270" y="4249885"/>
+            <a:ext cx="7242465" cy="2308324"/>
+          </a:xfrm>
+          <a:prstGeom prst="rect">
+            <a:avLst/>
+          </a:prstGeom>
+          <a:solidFill>
+            <a:schemeClr val="tx1"/>
+          </a:solidFill>
+        </p:spPr>
+        <p:txBody>
+          <a:bodyPr wrap="square" rtlCol="0">
+            <a:spAutoFit/>
+          </a:bodyPr>
+          <a:lstStyle/>
+          <a:p>
+            <a:r>
+              <a:rPr lang="en-US" b="1" dirty="0" smtClean="0">
+                <a:solidFill>
+                  <a:schemeClr val="bg1"/>
+                </a:solidFill>
+              </a:rPr>
+              <a:t>TTTAGATGCAAAATCCACAAGTATTCAAGTGATTGTTAAAGAGGGA</a:t>
+            </a:r>
+          </a:p>
+          <a:p>
+            <a:r>
+              <a:rPr lang="en-US" b="1" dirty="0" smtClean="0">
+                <a:solidFill>
+                  <a:schemeClr val="bg1"/>
+                </a:solidFill>
+              </a:rPr>
+              <a:t>GGCCTGAAGTTGATTCAGATCCAAGACAATGGCACCGGGATCAGG</a:t>
+            </a:r>
+          </a:p>
+          <a:p>
+            <a:r>
+              <a:rPr lang="en-US" b="1" dirty="0">
+                <a:solidFill>
+                  <a:schemeClr val="bg1"/>
+                </a:solidFill>
+              </a:rPr>
+              <a:t>type: exon</a:t>
+            </a:r>
+          </a:p>
+          <a:p>
+            <a:r>
+              <a:rPr lang="en-US" b="1" dirty="0">
+                <a:solidFill>
+                  <a:schemeClr val="bg1"/>
+                </a:solidFill>
+              </a:rPr>
+              <a:t>location: [0:91](+)</a:t>
+            </a:r>
+          </a:p>
+          <a:p>
+            <a:r>
+              <a:rPr lang="en-US" b="1" dirty="0">
+                <a:solidFill>
+                  <a:schemeClr val="bg1"/>
+                </a:solidFill>
+              </a:rPr>
+              <a:t>qualifiers:</a:t>
+            </a:r>
+          </a:p>
+          <a:p>
+            <a:r>
+              <a:rPr lang="en-US" b="1" dirty="0">
+                <a:solidFill>
+                  <a:schemeClr val="bg1"/>
+                </a:solidFill>
+              </a:rPr>
+              <a:t>    Key: gene, Value: ['MLH1']</a:t>
+            </a:r>
+          </a:p>
+          <a:p>
+            <a:r>
+              <a:rPr lang="en-US" b="1" dirty="0">
+                <a:solidFill>
+                  <a:schemeClr val="bg1"/>
+                </a:solidFill>
+              </a:rPr>
+              <a:t>    Key: </a:t>
+            </a:r>
+            <a:r>
+              <a:rPr lang="en-US" b="1" dirty="0" err="1">
+                <a:solidFill>
+                  <a:schemeClr val="bg1"/>
+                </a:solidFill>
+              </a:rPr>
+              <a:t>gene_synonym</a:t>
+            </a:r>
+            <a:r>
+              <a:rPr lang="en-US" b="1" dirty="0">
+                <a:solidFill>
+                  <a:schemeClr val="bg1"/>
+                </a:solidFill>
+              </a:rPr>
+              <a:t>, Value: ['COCA2; FCC2; hMLH1; HNPCC; HNPCC2']</a:t>
+            </a:r>
+          </a:p>
+          <a:p>
+            <a:r>
+              <a:rPr lang="en-US" b="1" dirty="0">
+                <a:solidFill>
+                  <a:schemeClr val="bg1"/>
+                </a:solidFill>
+              </a:rPr>
+              <a:t>    Key: inference, Value: ['alignment:Splign:1.39.8</a:t>
+            </a:r>
+            <a:r>
+              <a:rPr lang="en-US" b="1" dirty="0" smtClean="0">
+                <a:solidFill>
+                  <a:schemeClr val="bg1"/>
+                </a:solidFill>
+              </a:rPr>
+              <a:t>']</a:t>
+            </a:r>
+            <a:endParaRPr lang="en-US" b="1" dirty="0">
+              <a:solidFill>
+                <a:schemeClr val="bg1"/>
+              </a:solidFill>
+            </a:endParaRPr>
+          </a:p>
+        </p:txBody>
+      </p:sp>
+      <p:sp>
+        <p:nvSpPr>
+          <p:cNvPr id="8" name="TextBox 7"/>
+          <p:cNvSpPr txBox="1"/>
+          <p:nvPr/>
+        </p:nvSpPr>
+        <p:spPr>
+          <a:xfrm>
+            <a:off x="6770082" y="4880648"/>
+            <a:ext cx="1984261" cy="923330"/>
+          </a:xfrm>
+          <a:prstGeom prst="rect">
+            <a:avLst/>
+          </a:prstGeom>
+          <a:solidFill>
+            <a:schemeClr val="bg1"/>
+          </a:solidFill>
+          <a:ln>
+            <a:solidFill>
+              <a:schemeClr val="tx1"/>
+            </a:solidFill>
+          </a:ln>
+        </p:spPr>
+        <p:txBody>
+          <a:bodyPr wrap="none" rtlCol="0">
+            <a:spAutoFit/>
+          </a:bodyPr>
+          <a:lstStyle/>
+          <a:p>
+            <a:r>
+              <a:rPr lang="en-US" b="1" dirty="0" smtClean="0"/>
+              <a:t>Note</a:t>
+            </a:r>
+            <a:r>
+              <a:rPr lang="en-US" dirty="0" smtClean="0"/>
+              <a:t>: only features</a:t>
+            </a:r>
+          </a:p>
+          <a:p>
+            <a:r>
+              <a:rPr lang="en-US" dirty="0" smtClean="0"/>
+              <a:t>pertaining to slice,</a:t>
+            </a:r>
+          </a:p>
+          <a:p>
+            <a:r>
+              <a:rPr lang="en-US" dirty="0" smtClean="0"/>
+              <a:t>repositioned</a:t>
+            </a:r>
+            <a:endParaRPr lang="en-US" dirty="0"/>
+          </a:p>
+        </p:txBody>
+      </p:sp>
+    </p:spTree>
+    <p:extLst>
+      <p:ext uri="{BB962C8B-B14F-4D97-AF65-F5344CB8AC3E}">
+        <p14:creationId xmlns:p14="http://schemas.microsoft.com/office/powerpoint/2010/main" val="1828656982"/>
+      </p:ext>
+    </p:extLst>
+  </p:cSld>
+  <p:clrMapOvr>
+    <a:masterClrMapping/>
+  </p:clrMapOvr>
+  <p:timing>
+    <p:tnLst>
+      <p:par>
+        <p:cTn id="1" dur="indefinite" restart="never" nodeType="tmRoot"/>
+      </p:par>
+    </p:tnLst>
+  </p:timing>
+</p:sld>
+</file>
+
+<file path=ppt/slides/slide13.xml><?xml version="1.0" encoding="utf-8"?>
+<p:sld xmlns:a="http://schemas.openxmlformats.org/drawingml/2006/main" xmlns:r="http://schemas.openxmlformats.org/officeDocument/2006/relationships" xmlns:p="http://schemas.openxmlformats.org/presentationml/2006/main">
+  <p:cSld>
+    <p:spTree>
+      <p:nvGrpSpPr>
+        <p:cNvPr id="1" name=""/>
+        <p:cNvGrpSpPr/>
+        <p:nvPr/>
+      </p:nvGrpSpPr>
+      <p:grpSpPr>
+        <a:xfrm>
+          <a:off x="0" y="0"/>
+          <a:ext cx="0" cy="0"/>
+          <a:chOff x="0" y="0"/>
+          <a:chExt cx="0" cy="0"/>
+        </a:xfrm>
+      </p:grpSpPr>
+      <p:sp>
+        <p:nvSpPr>
+          <p:cNvPr id="2" name="Title 1"/>
+          <p:cNvSpPr>
+            <a:spLocks noGrp="1"/>
+          </p:cNvSpPr>
+          <p:nvPr>
+            <p:ph type="title"/>
+          </p:nvPr>
+        </p:nvSpPr>
+        <p:spPr/>
+        <p:txBody>
+          <a:bodyPr/>
+          <a:lstStyle/>
+          <a:p>
+            <a:r>
+              <a:rPr lang="en-US" dirty="0" smtClean="0"/>
+              <a:t>Writing sequences</a:t>
+            </a:r>
+            <a:endParaRPr lang="en-US" dirty="0"/>
+          </a:p>
+        </p:txBody>
+      </p:sp>
+      <p:sp>
+        <p:nvSpPr>
+          <p:cNvPr id="3" name="Content Placeholder 2"/>
+          <p:cNvSpPr>
+            <a:spLocks noGrp="1"/>
+          </p:cNvSpPr>
+          <p:nvPr>
+            <p:ph idx="1"/>
+          </p:nvPr>
+        </p:nvSpPr>
+        <p:spPr/>
+        <p:txBody>
+          <a:bodyPr/>
+          <a:lstStyle/>
+          <a:p>
+            <a:r>
+              <a:rPr lang="en-US" dirty="0" smtClean="0"/>
+              <a:t>Create sequence record</a:t>
+            </a:r>
+          </a:p>
+          <a:p>
+            <a:endParaRPr lang="en-US" dirty="0"/>
+          </a:p>
+          <a:p>
+            <a:endParaRPr lang="en-US" dirty="0" smtClean="0"/>
+          </a:p>
+          <a:p>
+            <a:endParaRPr lang="en-US" dirty="0"/>
+          </a:p>
+          <a:p>
+            <a:r>
+              <a:rPr lang="en-US" dirty="0" smtClean="0"/>
+              <a:t>Write record(s) to file</a:t>
+            </a:r>
+          </a:p>
+          <a:p>
+            <a:endParaRPr lang="en-US" dirty="0"/>
+          </a:p>
+          <a:p>
+            <a:endParaRPr lang="en-US" dirty="0" smtClean="0"/>
+          </a:p>
+          <a:p>
+            <a:r>
+              <a:rPr lang="en-US" dirty="0" smtClean="0"/>
+              <a:t>Convert sequence to Python string</a:t>
+            </a:r>
+            <a:endParaRPr lang="en-US" dirty="0"/>
+          </a:p>
+        </p:txBody>
+      </p:sp>
+      <p:sp>
+        <p:nvSpPr>
+          <p:cNvPr id="4" name="Slide Number Placeholder 3"/>
+          <p:cNvSpPr>
+            <a:spLocks noGrp="1"/>
+          </p:cNvSpPr>
+          <p:nvPr>
+            <p:ph type="sldNum" sz="quarter" idx="12"/>
+          </p:nvPr>
+        </p:nvSpPr>
+        <p:spPr/>
+        <p:txBody>
+          <a:bodyPr/>
+          <a:lstStyle/>
+          <a:p>
+            <a:fld id="{CA586AD6-E5F2-4F25-940D-C674496063E2}" type="slidenum">
+              <a:rPr lang="en-US" smtClean="0"/>
+              <a:t>13</a:t>
             </a:fld>
             <a:endParaRPr lang="en-US"/>
           </a:p>
@@ -4280,7 +5890,7 @@
 </p:sld>
 </file>
 
-<file path=ppt/slides/slide11.xml><?xml version="1.0" encoding="utf-8"?>
+<file path=ppt/slides/slide14.xml><?xml version="1.0" encoding="utf-8"?>
 <p:sld xmlns:a="http://schemas.openxmlformats.org/drawingml/2006/main" xmlns:r="http://schemas.openxmlformats.org/officeDocument/2006/relationships" xmlns:p="http://schemas.openxmlformats.org/presentationml/2006/main">
   <p:cSld>
     <p:spTree>
@@ -4356,7 +5966,7 @@
           <a:p>
             <a:fld id="{CA586AD6-E5F2-4F25-940D-C674496063E2}" type="slidenum">
               <a:rPr lang="en-US" smtClean="0"/>
-              <a:t>11</a:t>
+              <a:t>14</a:t>
             </a:fld>
             <a:endParaRPr lang="en-US"/>
           </a:p>
@@ -4382,7 +5992,7 @@
 </p:sld>
 </file>
 
-<file path=ppt/slides/slide12.xml><?xml version="1.0" encoding="utf-8"?>
+<file path=ppt/slides/slide15.xml><?xml version="1.0" encoding="utf-8"?>
 <p:sld xmlns:a="http://schemas.openxmlformats.org/drawingml/2006/main" xmlns:r="http://schemas.openxmlformats.org/officeDocument/2006/relationships" xmlns:p="http://schemas.openxmlformats.org/presentationml/2006/main">
   <p:cSld>
     <p:spTree>
@@ -4524,7 +6134,7 @@
           <a:p>
             <a:fld id="{CA586AD6-E5F2-4F25-940D-C674496063E2}" type="slidenum">
               <a:rPr lang="en-US" smtClean="0"/>
-              <a:t>12</a:t>
+              <a:t>15</a:t>
             </a:fld>
             <a:endParaRPr lang="en-US"/>
           </a:p>
@@ -4637,7 +6247,7 @@
 </p:sld>
 </file>
 
-<file path=ppt/slides/slide13.xml><?xml version="1.0" encoding="utf-8"?>
+<file path=ppt/slides/slide16.xml><?xml version="1.0" encoding="utf-8"?>
 <p:sld xmlns:a="http://schemas.openxmlformats.org/drawingml/2006/main" xmlns:r="http://schemas.openxmlformats.org/officeDocument/2006/relationships" xmlns:p="http://schemas.openxmlformats.org/presentationml/2006/main">
   <p:cSld>
     <p:spTree>
@@ -4794,7 +6404,7 @@
           <a:p>
             <a:fld id="{CA586AD6-E5F2-4F25-940D-C674496063E2}" type="slidenum">
               <a:rPr lang="en-US" smtClean="0"/>
-              <a:t>13</a:t>
+              <a:t>16</a:t>
             </a:fld>
             <a:endParaRPr lang="en-US"/>
           </a:p>
@@ -6359,6 +7969,14 @@
             </a:r>
           </a:p>
           <a:p>
+            <a:pPr lvl="1"/>
+            <a:r>
+              <a:rPr lang="en-US" dirty="0" smtClean="0"/>
+              <a:t>features</a:t>
+            </a:r>
+            <a:endParaRPr lang="en-US" dirty="0" smtClean="0"/>
+          </a:p>
+          <a:p>
             <a:endParaRPr lang="en-US" dirty="0"/>
           </a:p>
         </p:txBody>
@@ -6371,7 +7989,7 @@
         </p:nvSpPr>
         <p:spPr>
           <a:xfrm>
-            <a:off x="990600" y="4128642"/>
+            <a:off x="990600" y="4450763"/>
             <a:ext cx="7491153" cy="1477328"/>
           </a:xfrm>
           <a:prstGeom prst="rect">

</xml_diff>

<commit_message>
Added slides on databases; added animation
</commit_message>
<xml_diff>
--- a/Python/biopython.pptx
+++ b/Python/biopython.pptx
@@ -5,7 +5,7 @@
     <p:sldMasterId id="2147483660" r:id="rId1"/>
   </p:sldMasterIdLst>
   <p:notesMasterIdLst>
-    <p:notesMasterId r:id="rId18"/>
+    <p:notesMasterId r:id="rId20"/>
   </p:notesMasterIdLst>
   <p:sldIdLst>
     <p:sldId id="256" r:id="rId2"/>
@@ -24,6 +24,8 @@
     <p:sldId id="266" r:id="rId15"/>
     <p:sldId id="267" r:id="rId16"/>
     <p:sldId id="268" r:id="rId17"/>
+    <p:sldId id="272" r:id="rId18"/>
+    <p:sldId id="273" r:id="rId19"/>
   </p:sldIdLst>
   <p:sldSz cx="9144000" cy="6858000" type="screen4x3"/>
   <p:notesSz cx="6858000" cy="9144000"/>
@@ -212,7 +214,7 @@
           <a:p>
             <a:fld id="{E50739E9-DC4A-4901-8195-7CE430F840D8}" type="datetimeFigureOut">
               <a:rPr lang="en-US" smtClean="0"/>
-              <a:t>2016-07-01</a:t>
+              <a:t>2016-07-06</a:t>
             </a:fld>
             <a:endParaRPr lang="en-US"/>
           </a:p>
@@ -695,7 +697,7 @@
           <a:p>
             <a:fld id="{EBC2714F-B822-455B-B016-0228B6AA8BE9}" type="datetime1">
               <a:rPr lang="en-US" smtClean="0"/>
-              <a:t>2016-07-01</a:t>
+              <a:t>2016-07-06</a:t>
             </a:fld>
             <a:endParaRPr lang="en-US"/>
           </a:p>
@@ -865,7 +867,7 @@
           <a:p>
             <a:fld id="{F3822F19-B516-497C-9005-1997989AD109}" type="datetime1">
               <a:rPr lang="en-US" smtClean="0"/>
-              <a:t>2016-07-01</a:t>
+              <a:t>2016-07-06</a:t>
             </a:fld>
             <a:endParaRPr lang="en-US"/>
           </a:p>
@@ -1045,7 +1047,7 @@
           <a:p>
             <a:fld id="{DC6E6076-3AC8-4591-A5B3-5701E86BC391}" type="datetime1">
               <a:rPr lang="en-US" smtClean="0"/>
-              <a:t>2016-07-01</a:t>
+              <a:t>2016-07-06</a:t>
             </a:fld>
             <a:endParaRPr lang="en-US"/>
           </a:p>
@@ -1215,7 +1217,7 @@
           <a:p>
             <a:fld id="{10101B39-3B57-4A7B-8CB6-E6BDB118061D}" type="datetime1">
               <a:rPr lang="en-US" smtClean="0"/>
-              <a:t>2016-07-01</a:t>
+              <a:t>2016-07-06</a:t>
             </a:fld>
             <a:endParaRPr lang="en-US"/>
           </a:p>
@@ -1459,7 +1461,7 @@
           <a:p>
             <a:fld id="{C27B26EE-8ECF-4FF3-9A38-87EFFDA62A28}" type="datetime1">
               <a:rPr lang="en-US" smtClean="0"/>
-              <a:t>2016-07-01</a:t>
+              <a:t>2016-07-06</a:t>
             </a:fld>
             <a:endParaRPr lang="en-US"/>
           </a:p>
@@ -1691,7 +1693,7 @@
           <a:p>
             <a:fld id="{6742683C-23EC-4C0D-AC9A-17C98B40DAA7}" type="datetime1">
               <a:rPr lang="en-US" smtClean="0"/>
-              <a:t>2016-07-01</a:t>
+              <a:t>2016-07-06</a:t>
             </a:fld>
             <a:endParaRPr lang="en-US"/>
           </a:p>
@@ -2058,7 +2060,7 @@
           <a:p>
             <a:fld id="{61B639F5-7095-4C4C-8D13-AB3C116C2681}" type="datetime1">
               <a:rPr lang="en-US" smtClean="0"/>
-              <a:t>2016-07-01</a:t>
+              <a:t>2016-07-06</a:t>
             </a:fld>
             <a:endParaRPr lang="en-US"/>
           </a:p>
@@ -2176,7 +2178,7 @@
           <a:p>
             <a:fld id="{565C75B5-128F-4C63-85A2-EABB3B9088B2}" type="datetime1">
               <a:rPr lang="en-US" smtClean="0"/>
-              <a:t>2016-07-01</a:t>
+              <a:t>2016-07-06</a:t>
             </a:fld>
             <a:endParaRPr lang="en-US"/>
           </a:p>
@@ -2271,7 +2273,7 @@
           <a:p>
             <a:fld id="{EB500747-7144-41D3-89B7-0E40926A8757}" type="datetime1">
               <a:rPr lang="en-US" smtClean="0"/>
-              <a:t>2016-07-01</a:t>
+              <a:t>2016-07-06</a:t>
             </a:fld>
             <a:endParaRPr lang="en-US"/>
           </a:p>
@@ -2548,7 +2550,7 @@
           <a:p>
             <a:fld id="{09A9D774-0B51-4CD9-9147-A6BD4D353F07}" type="datetime1">
               <a:rPr lang="en-US" smtClean="0"/>
-              <a:t>2016-07-01</a:t>
+              <a:t>2016-07-06</a:t>
             </a:fld>
             <a:endParaRPr lang="en-US"/>
           </a:p>
@@ -2805,7 +2807,7 @@
           <a:p>
             <a:fld id="{2618F069-DB72-4F16-8512-37A179AE1774}" type="datetime1">
               <a:rPr lang="en-US" smtClean="0"/>
-              <a:t>2016-07-01</a:t>
+              <a:t>2016-07-06</a:t>
             </a:fld>
             <a:endParaRPr lang="en-US"/>
           </a:p>
@@ -3018,7 +3020,7 @@
           <a:p>
             <a:fld id="{7784AB71-9685-428C-BE48-FB64D9C8B81F}" type="datetime1">
               <a:rPr lang="en-US" smtClean="0"/>
-              <a:t>2016-07-01</a:t>
+              <a:t>2016-07-06</a:t>
             </a:fld>
             <a:endParaRPr lang="en-US"/>
           </a:p>
@@ -4179,9 +4181,306 @@
   <p:timing>
     <p:tnLst>
       <p:par>
-        <p:cTn id="1" dur="indefinite" restart="never" nodeType="tmRoot"/>
+        <p:cTn id="1" dur="indefinite" restart="never" nodeType="tmRoot">
+          <p:childTnLst>
+            <p:seq concurrent="1" nextAc="seek">
+              <p:cTn id="2" dur="indefinite" nodeType="mainSeq">
+                <p:childTnLst>
+                  <p:par>
+                    <p:cTn id="3" fill="hold">
+                      <p:stCondLst>
+                        <p:cond delay="indefinite"/>
+                        <p:cond evt="onBegin" delay="0">
+                          <p:tn val="2"/>
+                        </p:cond>
+                      </p:stCondLst>
+                      <p:childTnLst>
+                        <p:par>
+                          <p:cTn id="4" fill="hold">
+                            <p:stCondLst>
+                              <p:cond delay="0"/>
+                            </p:stCondLst>
+                            <p:childTnLst>
+                              <p:par>
+                                <p:cTn id="5" presetID="1" presetClass="entr" presetSubtype="0" fill="hold" grpId="0" nodeType="withEffect">
+                                  <p:stCondLst>
+                                    <p:cond delay="0"/>
+                                  </p:stCondLst>
+                                  <p:childTnLst>
+                                    <p:set>
+                                      <p:cBhvr>
+                                        <p:cTn id="6" dur="1" fill="hold">
+                                          <p:stCondLst>
+                                            <p:cond delay="0"/>
+                                          </p:stCondLst>
+                                        </p:cTn>
+                                        <p:tgtEl>
+                                          <p:spTgt spid="3">
+                                            <p:txEl>
+                                              <p:pRg st="0" end="0"/>
+                                            </p:txEl>
+                                          </p:spTgt>
+                                        </p:tgtEl>
+                                        <p:attrNameLst>
+                                          <p:attrName>style.visibility</p:attrName>
+                                        </p:attrNameLst>
+                                      </p:cBhvr>
+                                      <p:to>
+                                        <p:strVal val="visible"/>
+                                      </p:to>
+                                    </p:set>
+                                  </p:childTnLst>
+                                </p:cTn>
+                              </p:par>
+                              <p:par>
+                                <p:cTn id="7" presetID="1" presetClass="entr" presetSubtype="0" fill="hold" grpId="0" nodeType="withEffect">
+                                  <p:stCondLst>
+                                    <p:cond delay="0"/>
+                                  </p:stCondLst>
+                                  <p:childTnLst>
+                                    <p:set>
+                                      <p:cBhvr>
+                                        <p:cTn id="8" dur="1" fill="hold">
+                                          <p:stCondLst>
+                                            <p:cond delay="0"/>
+                                          </p:stCondLst>
+                                        </p:cTn>
+                                        <p:tgtEl>
+                                          <p:spTgt spid="3">
+                                            <p:txEl>
+                                              <p:pRg st="1" end="1"/>
+                                            </p:txEl>
+                                          </p:spTgt>
+                                        </p:tgtEl>
+                                        <p:attrNameLst>
+                                          <p:attrName>style.visibility</p:attrName>
+                                        </p:attrNameLst>
+                                      </p:cBhvr>
+                                      <p:to>
+                                        <p:strVal val="visible"/>
+                                      </p:to>
+                                    </p:set>
+                                  </p:childTnLst>
+                                </p:cTn>
+                              </p:par>
+                            </p:childTnLst>
+                          </p:cTn>
+                        </p:par>
+                      </p:childTnLst>
+                    </p:cTn>
+                  </p:par>
+                  <p:par>
+                    <p:cTn id="9" fill="hold">
+                      <p:stCondLst>
+                        <p:cond delay="indefinite"/>
+                      </p:stCondLst>
+                      <p:childTnLst>
+                        <p:par>
+                          <p:cTn id="10" fill="hold">
+                            <p:stCondLst>
+                              <p:cond delay="0"/>
+                            </p:stCondLst>
+                            <p:childTnLst>
+                              <p:par>
+                                <p:cTn id="11" presetID="1" presetClass="entr" presetSubtype="0" fill="hold" grpId="0" nodeType="clickEffect">
+                                  <p:stCondLst>
+                                    <p:cond delay="0"/>
+                                  </p:stCondLst>
+                                  <p:childTnLst>
+                                    <p:set>
+                                      <p:cBhvr>
+                                        <p:cTn id="12" dur="1" fill="hold">
+                                          <p:stCondLst>
+                                            <p:cond delay="0"/>
+                                          </p:stCondLst>
+                                        </p:cTn>
+                                        <p:tgtEl>
+                                          <p:spTgt spid="3">
+                                            <p:txEl>
+                                              <p:pRg st="2" end="2"/>
+                                            </p:txEl>
+                                          </p:spTgt>
+                                        </p:tgtEl>
+                                        <p:attrNameLst>
+                                          <p:attrName>style.visibility</p:attrName>
+                                        </p:attrNameLst>
+                                      </p:cBhvr>
+                                      <p:to>
+                                        <p:strVal val="visible"/>
+                                      </p:to>
+                                    </p:set>
+                                  </p:childTnLst>
+                                </p:cTn>
+                              </p:par>
+                            </p:childTnLst>
+                          </p:cTn>
+                        </p:par>
+                      </p:childTnLst>
+                    </p:cTn>
+                  </p:par>
+                  <p:par>
+                    <p:cTn id="13" fill="hold">
+                      <p:stCondLst>
+                        <p:cond delay="indefinite"/>
+                      </p:stCondLst>
+                      <p:childTnLst>
+                        <p:par>
+                          <p:cTn id="14" fill="hold">
+                            <p:stCondLst>
+                              <p:cond delay="0"/>
+                            </p:stCondLst>
+                            <p:childTnLst>
+                              <p:par>
+                                <p:cTn id="15" presetID="1" presetClass="entr" presetSubtype="0" fill="hold" nodeType="clickEffect">
+                                  <p:stCondLst>
+                                    <p:cond delay="0"/>
+                                  </p:stCondLst>
+                                  <p:childTnLst>
+                                    <p:set>
+                                      <p:cBhvr>
+                                        <p:cTn id="16" dur="1" fill="hold">
+                                          <p:stCondLst>
+                                            <p:cond delay="0"/>
+                                          </p:stCondLst>
+                                        </p:cTn>
+                                        <p:tgtEl>
+                                          <p:spTgt spid="11"/>
+                                        </p:tgtEl>
+                                        <p:attrNameLst>
+                                          <p:attrName>style.visibility</p:attrName>
+                                        </p:attrNameLst>
+                                      </p:cBhvr>
+                                      <p:to>
+                                        <p:strVal val="visible"/>
+                                      </p:to>
+                                    </p:set>
+                                  </p:childTnLst>
+                                </p:cTn>
+                              </p:par>
+                            </p:childTnLst>
+                          </p:cTn>
+                        </p:par>
+                      </p:childTnLst>
+                    </p:cTn>
+                  </p:par>
+                  <p:par>
+                    <p:cTn id="17" fill="hold">
+                      <p:stCondLst>
+                        <p:cond delay="indefinite"/>
+                      </p:stCondLst>
+                      <p:childTnLst>
+                        <p:par>
+                          <p:cTn id="18" fill="hold">
+                            <p:stCondLst>
+                              <p:cond delay="0"/>
+                            </p:stCondLst>
+                            <p:childTnLst>
+                              <p:par>
+                                <p:cTn id="19" presetID="1" presetClass="entr" presetSubtype="0" fill="hold" nodeType="clickEffect">
+                                  <p:stCondLst>
+                                    <p:cond delay="0"/>
+                                  </p:stCondLst>
+                                  <p:childTnLst>
+                                    <p:set>
+                                      <p:cBhvr>
+                                        <p:cTn id="20" dur="1" fill="hold">
+                                          <p:stCondLst>
+                                            <p:cond delay="0"/>
+                                          </p:stCondLst>
+                                        </p:cTn>
+                                        <p:tgtEl>
+                                          <p:spTgt spid="12"/>
+                                        </p:tgtEl>
+                                        <p:attrNameLst>
+                                          <p:attrName>style.visibility</p:attrName>
+                                        </p:attrNameLst>
+                                      </p:cBhvr>
+                                      <p:to>
+                                        <p:strVal val="visible"/>
+                                      </p:to>
+                                    </p:set>
+                                  </p:childTnLst>
+                                </p:cTn>
+                              </p:par>
+                            </p:childTnLst>
+                          </p:cTn>
+                        </p:par>
+                      </p:childTnLst>
+                    </p:cTn>
+                  </p:par>
+                  <p:par>
+                    <p:cTn id="21" fill="hold">
+                      <p:stCondLst>
+                        <p:cond delay="indefinite"/>
+                      </p:stCondLst>
+                      <p:childTnLst>
+                        <p:par>
+                          <p:cTn id="22" fill="hold">
+                            <p:stCondLst>
+                              <p:cond delay="0"/>
+                            </p:stCondLst>
+                            <p:childTnLst>
+                              <p:par>
+                                <p:cTn id="23" presetID="1" presetClass="entr" presetSubtype="0" fill="hold" grpId="0" nodeType="clickEffect">
+                                  <p:stCondLst>
+                                    <p:cond delay="0"/>
+                                  </p:stCondLst>
+                                  <p:childTnLst>
+                                    <p:set>
+                                      <p:cBhvr>
+                                        <p:cTn id="24" dur="1" fill="hold">
+                                          <p:stCondLst>
+                                            <p:cond delay="0"/>
+                                          </p:stCondLst>
+                                        </p:cTn>
+                                        <p:tgtEl>
+                                          <p:spTgt spid="3">
+                                            <p:txEl>
+                                              <p:pRg st="5" end="5"/>
+                                            </p:txEl>
+                                          </p:spTgt>
+                                        </p:tgtEl>
+                                        <p:attrNameLst>
+                                          <p:attrName>style.visibility</p:attrName>
+                                        </p:attrNameLst>
+                                      </p:cBhvr>
+                                      <p:to>
+                                        <p:strVal val="visible"/>
+                                      </p:to>
+                                    </p:set>
+                                  </p:childTnLst>
+                                </p:cTn>
+                              </p:par>
+                            </p:childTnLst>
+                          </p:cTn>
+                        </p:par>
+                      </p:childTnLst>
+                    </p:cTn>
+                  </p:par>
+                </p:childTnLst>
+              </p:cTn>
+              <p:prevCondLst>
+                <p:cond evt="onPrev" delay="0">
+                  <p:tgtEl>
+                    <p:sldTgt/>
+                  </p:tgtEl>
+                </p:cond>
+              </p:prevCondLst>
+              <p:nextCondLst>
+                <p:cond evt="onNext" delay="0">
+                  <p:tgtEl>
+                    <p:sldTgt/>
+                  </p:tgtEl>
+                </p:cond>
+              </p:nextCondLst>
+            </p:seq>
+          </p:childTnLst>
+        </p:cTn>
       </p:par>
     </p:tnLst>
+    <p:bldLst>
+      <p:bldP spid="3" grpId="0" uiExpand="1" build="p" bldLvl="2"/>
+    </p:bldLst>
   </p:timing>
 </p:sld>
 </file>
@@ -5182,9 +5481,80 @@
   <p:timing>
     <p:tnLst>
       <p:par>
-        <p:cTn id="1" dur="indefinite" restart="never" nodeType="tmRoot"/>
+        <p:cTn id="1" dur="indefinite" restart="never" nodeType="tmRoot">
+          <p:childTnLst>
+            <p:seq concurrent="1" nextAc="seek">
+              <p:cTn id="2" dur="indefinite" nodeType="mainSeq">
+                <p:childTnLst>
+                  <p:par>
+                    <p:cTn id="3" fill="hold">
+                      <p:stCondLst>
+                        <p:cond delay="indefinite"/>
+                      </p:stCondLst>
+                      <p:childTnLst>
+                        <p:par>
+                          <p:cTn id="4" fill="hold">
+                            <p:stCondLst>
+                              <p:cond delay="0"/>
+                            </p:stCondLst>
+                            <p:childTnLst>
+                              <p:par>
+                                <p:cTn id="5" presetID="1" presetClass="entr" presetSubtype="0" fill="hold" grpId="0" nodeType="clickEffect">
+                                  <p:stCondLst>
+                                    <p:cond delay="0"/>
+                                  </p:stCondLst>
+                                  <p:childTnLst>
+                                    <p:set>
+                                      <p:cBhvr>
+                                        <p:cTn id="6" dur="1" fill="hold">
+                                          <p:stCondLst>
+                                            <p:cond delay="0"/>
+                                          </p:stCondLst>
+                                        </p:cTn>
+                                        <p:tgtEl>
+                                          <p:spTgt spid="8"/>
+                                        </p:tgtEl>
+                                        <p:attrNameLst>
+                                          <p:attrName>style.visibility</p:attrName>
+                                        </p:attrNameLst>
+                                      </p:cBhvr>
+                                      <p:to>
+                                        <p:strVal val="visible"/>
+                                      </p:to>
+                                    </p:set>
+                                  </p:childTnLst>
+                                </p:cTn>
+                              </p:par>
+                            </p:childTnLst>
+                          </p:cTn>
+                        </p:par>
+                      </p:childTnLst>
+                    </p:cTn>
+                  </p:par>
+                </p:childTnLst>
+              </p:cTn>
+              <p:prevCondLst>
+                <p:cond evt="onPrev" delay="0">
+                  <p:tgtEl>
+                    <p:sldTgt/>
+                  </p:tgtEl>
+                </p:cond>
+              </p:prevCondLst>
+              <p:nextCondLst>
+                <p:cond evt="onNext" delay="0">
+                  <p:tgtEl>
+                    <p:sldTgt/>
+                  </p:tgtEl>
+                </p:cond>
+              </p:nextCondLst>
+            </p:seq>
+          </p:childTnLst>
+        </p:cTn>
       </p:par>
     </p:tnLst>
+    <p:bldLst>
+      <p:bldP spid="8" grpId="0" animBg="1"/>
+    </p:bldLst>
   </p:timing>
 </p:sld>
 </file>
@@ -5824,6 +6194,9 @@
                     <p:cTn id="3" fill="hold">
                       <p:stCondLst>
                         <p:cond delay="indefinite"/>
+                        <p:cond evt="onBegin" delay="0">
+                          <p:tn val="2"/>
+                        </p:cond>
                       </p:stCondLst>
                       <p:childTnLst>
                         <p:par>
@@ -5833,7 +6206,7 @@
                             </p:stCondLst>
                             <p:childTnLst>
                               <p:par>
-                                <p:cTn id="5" presetID="1" presetClass="entr" presetSubtype="0" fill="hold" nodeType="clickEffect">
+                                <p:cTn id="5" presetID="1" presetClass="entr" presetSubtype="0" fill="hold" grpId="0" nodeType="withEffect">
                                   <p:stCondLst>
                                     <p:cond delay="0"/>
                                   </p:stCondLst>
@@ -5841,6 +6214,234 @@
                                     <p:set>
                                       <p:cBhvr>
                                         <p:cTn id="6" dur="1" fill="hold">
+                                          <p:stCondLst>
+                                            <p:cond delay="0"/>
+                                          </p:stCondLst>
+                                        </p:cTn>
+                                        <p:tgtEl>
+                                          <p:spTgt spid="3">
+                                            <p:txEl>
+                                              <p:pRg st="0" end="0"/>
+                                            </p:txEl>
+                                          </p:spTgt>
+                                        </p:tgtEl>
+                                        <p:attrNameLst>
+                                          <p:attrName>style.visibility</p:attrName>
+                                        </p:attrNameLst>
+                                      </p:cBhvr>
+                                      <p:to>
+                                        <p:strVal val="visible"/>
+                                      </p:to>
+                                    </p:set>
+                                  </p:childTnLst>
+                                </p:cTn>
+                              </p:par>
+                              <p:par>
+                                <p:cTn id="7" presetID="1" presetClass="entr" presetSubtype="0" fill="hold" grpId="0" nodeType="withEffect">
+                                  <p:stCondLst>
+                                    <p:cond delay="0"/>
+                                  </p:stCondLst>
+                                  <p:childTnLst>
+                                    <p:set>
+                                      <p:cBhvr>
+                                        <p:cTn id="8" dur="1" fill="hold">
+                                          <p:stCondLst>
+                                            <p:cond delay="0"/>
+                                          </p:stCondLst>
+                                        </p:cTn>
+                                        <p:tgtEl>
+                                          <p:spTgt spid="7"/>
+                                        </p:tgtEl>
+                                        <p:attrNameLst>
+                                          <p:attrName>style.visibility</p:attrName>
+                                        </p:attrNameLst>
+                                      </p:cBhvr>
+                                      <p:to>
+                                        <p:strVal val="visible"/>
+                                      </p:to>
+                                    </p:set>
+                                  </p:childTnLst>
+                                </p:cTn>
+                              </p:par>
+                            </p:childTnLst>
+                          </p:cTn>
+                        </p:par>
+                      </p:childTnLst>
+                    </p:cTn>
+                  </p:par>
+                  <p:par>
+                    <p:cTn id="9" fill="hold">
+                      <p:stCondLst>
+                        <p:cond delay="indefinite"/>
+                      </p:stCondLst>
+                      <p:childTnLst>
+                        <p:par>
+                          <p:cTn id="10" fill="hold">
+                            <p:stCondLst>
+                              <p:cond delay="0"/>
+                            </p:stCondLst>
+                            <p:childTnLst>
+                              <p:par>
+                                <p:cTn id="11" presetID="1" presetClass="entr" presetSubtype="0" fill="hold" grpId="0" nodeType="clickEffect">
+                                  <p:stCondLst>
+                                    <p:cond delay="0"/>
+                                  </p:stCondLst>
+                                  <p:childTnLst>
+                                    <p:set>
+                                      <p:cBhvr>
+                                        <p:cTn id="12" dur="1" fill="hold">
+                                          <p:stCondLst>
+                                            <p:cond delay="0"/>
+                                          </p:stCondLst>
+                                        </p:cTn>
+                                        <p:tgtEl>
+                                          <p:spTgt spid="3">
+                                            <p:txEl>
+                                              <p:pRg st="4" end="4"/>
+                                            </p:txEl>
+                                          </p:spTgt>
+                                        </p:tgtEl>
+                                        <p:attrNameLst>
+                                          <p:attrName>style.visibility</p:attrName>
+                                        </p:attrNameLst>
+                                      </p:cBhvr>
+                                      <p:to>
+                                        <p:strVal val="visible"/>
+                                      </p:to>
+                                    </p:set>
+                                  </p:childTnLst>
+                                </p:cTn>
+                              </p:par>
+                              <p:par>
+                                <p:cTn id="13" presetID="1" presetClass="entr" presetSubtype="0" fill="hold" grpId="0" nodeType="withEffect">
+                                  <p:stCondLst>
+                                    <p:cond delay="0"/>
+                                  </p:stCondLst>
+                                  <p:childTnLst>
+                                    <p:set>
+                                      <p:cBhvr>
+                                        <p:cTn id="14" dur="1" fill="hold">
+                                          <p:stCondLst>
+                                            <p:cond delay="0"/>
+                                          </p:stCondLst>
+                                        </p:cTn>
+                                        <p:tgtEl>
+                                          <p:spTgt spid="8"/>
+                                        </p:tgtEl>
+                                        <p:attrNameLst>
+                                          <p:attrName>style.visibility</p:attrName>
+                                        </p:attrNameLst>
+                                      </p:cBhvr>
+                                      <p:to>
+                                        <p:strVal val="visible"/>
+                                      </p:to>
+                                    </p:set>
+                                  </p:childTnLst>
+                                </p:cTn>
+                              </p:par>
+                            </p:childTnLst>
+                          </p:cTn>
+                        </p:par>
+                      </p:childTnLst>
+                    </p:cTn>
+                  </p:par>
+                  <p:par>
+                    <p:cTn id="15" fill="hold">
+                      <p:stCondLst>
+                        <p:cond delay="indefinite"/>
+                      </p:stCondLst>
+                      <p:childTnLst>
+                        <p:par>
+                          <p:cTn id="16" fill="hold">
+                            <p:stCondLst>
+                              <p:cond delay="0"/>
+                            </p:stCondLst>
+                            <p:childTnLst>
+                              <p:par>
+                                <p:cTn id="17" presetID="1" presetClass="entr" presetSubtype="0" fill="hold" grpId="0" nodeType="clickEffect">
+                                  <p:stCondLst>
+                                    <p:cond delay="0"/>
+                                  </p:stCondLst>
+                                  <p:childTnLst>
+                                    <p:set>
+                                      <p:cBhvr>
+                                        <p:cTn id="18" dur="1" fill="hold">
+                                          <p:stCondLst>
+                                            <p:cond delay="0"/>
+                                          </p:stCondLst>
+                                        </p:cTn>
+                                        <p:tgtEl>
+                                          <p:spTgt spid="3">
+                                            <p:txEl>
+                                              <p:pRg st="7" end="7"/>
+                                            </p:txEl>
+                                          </p:spTgt>
+                                        </p:tgtEl>
+                                        <p:attrNameLst>
+                                          <p:attrName>style.visibility</p:attrName>
+                                        </p:attrNameLst>
+                                      </p:cBhvr>
+                                      <p:to>
+                                        <p:strVal val="visible"/>
+                                      </p:to>
+                                    </p:set>
+                                  </p:childTnLst>
+                                </p:cTn>
+                              </p:par>
+                              <p:par>
+                                <p:cTn id="19" presetID="1" presetClass="entr" presetSubtype="0" fill="hold" grpId="0" nodeType="withEffect">
+                                  <p:stCondLst>
+                                    <p:cond delay="0"/>
+                                  </p:stCondLst>
+                                  <p:childTnLst>
+                                    <p:set>
+                                      <p:cBhvr>
+                                        <p:cTn id="20" dur="1" fill="hold">
+                                          <p:stCondLst>
+                                            <p:cond delay="0"/>
+                                          </p:stCondLst>
+                                        </p:cTn>
+                                        <p:tgtEl>
+                                          <p:spTgt spid="9"/>
+                                        </p:tgtEl>
+                                        <p:attrNameLst>
+                                          <p:attrName>style.visibility</p:attrName>
+                                        </p:attrNameLst>
+                                      </p:cBhvr>
+                                      <p:to>
+                                        <p:strVal val="visible"/>
+                                      </p:to>
+                                    </p:set>
+                                  </p:childTnLst>
+                                </p:cTn>
+                              </p:par>
+                            </p:childTnLst>
+                          </p:cTn>
+                        </p:par>
+                      </p:childTnLst>
+                    </p:cTn>
+                  </p:par>
+                  <p:par>
+                    <p:cTn id="21" fill="hold">
+                      <p:stCondLst>
+                        <p:cond delay="indefinite"/>
+                      </p:stCondLst>
+                      <p:childTnLst>
+                        <p:par>
+                          <p:cTn id="22" fill="hold">
+                            <p:stCondLst>
+                              <p:cond delay="0"/>
+                            </p:stCondLst>
+                            <p:childTnLst>
+                              <p:par>
+                                <p:cTn id="23" presetID="1" presetClass="entr" presetSubtype="0" fill="hold" nodeType="clickEffect">
+                                  <p:stCondLst>
+                                    <p:cond delay="0"/>
+                                  </p:stCondLst>
+                                  <p:childTnLst>
+                                    <p:set>
+                                      <p:cBhvr>
+                                        <p:cTn id="24" dur="1" fill="hold">
                                           <p:stCondLst>
                                             <p:cond delay="0"/>
                                           </p:stCondLst>
@@ -5886,6 +6487,12 @@
         </p:cTn>
       </p:par>
     </p:tnLst>
+    <p:bldLst>
+      <p:bldP spid="3" grpId="0" uiExpand="1" build="p"/>
+      <p:bldP spid="7" grpId="0" animBg="1"/>
+      <p:bldP spid="8" grpId="0" animBg="1"/>
+      <p:bldP spid="9" grpId="0" animBg="1"/>
+    </p:bldLst>
   </p:timing>
 </p:sld>
 </file>
@@ -6056,11 +6663,7 @@
             <a:pPr lvl="1"/>
             <a:r>
               <a:rPr lang="en-US" dirty="0" smtClean="0"/>
-              <a:t>Nucleotide, Protein: </a:t>
-            </a:r>
-            <a:r>
-              <a:rPr lang="en-US" dirty="0" smtClean="0"/>
-              <a:t>sequences</a:t>
+              <a:t>Nucleotide, Protein: sequences</a:t>
             </a:r>
           </a:p>
           <a:p>
@@ -6083,7 +6686,6 @@
               <a:rPr lang="en-US" dirty="0" smtClean="0"/>
               <a:t>…</a:t>
             </a:r>
-            <a:endParaRPr lang="en-US" dirty="0" smtClean="0"/>
           </a:p>
           <a:p>
             <a:r>
@@ -6240,9 +6842,399 @@
   <p:timing>
     <p:tnLst>
       <p:par>
-        <p:cTn id="1" dur="indefinite" restart="never" nodeType="tmRoot"/>
+        <p:cTn id="1" dur="indefinite" restart="never" nodeType="tmRoot">
+          <p:childTnLst>
+            <p:seq concurrent="1" nextAc="seek">
+              <p:cTn id="2" dur="indefinite" nodeType="mainSeq">
+                <p:childTnLst>
+                  <p:par>
+                    <p:cTn id="3" fill="hold">
+                      <p:stCondLst>
+                        <p:cond delay="indefinite"/>
+                        <p:cond evt="onBegin" delay="0">
+                          <p:tn val="2"/>
+                        </p:cond>
+                      </p:stCondLst>
+                      <p:childTnLst>
+                        <p:par>
+                          <p:cTn id="4" fill="hold">
+                            <p:stCondLst>
+                              <p:cond delay="0"/>
+                            </p:stCondLst>
+                            <p:childTnLst>
+                              <p:par>
+                                <p:cTn id="5" presetID="1" presetClass="entr" presetSubtype="0" fill="hold" grpId="0" nodeType="withEffect">
+                                  <p:stCondLst>
+                                    <p:cond delay="0"/>
+                                  </p:stCondLst>
+                                  <p:childTnLst>
+                                    <p:set>
+                                      <p:cBhvr>
+                                        <p:cTn id="6" dur="1" fill="hold">
+                                          <p:stCondLst>
+                                            <p:cond delay="0"/>
+                                          </p:stCondLst>
+                                        </p:cTn>
+                                        <p:tgtEl>
+                                          <p:spTgt spid="6">
+                                            <p:txEl>
+                                              <p:pRg st="0" end="0"/>
+                                            </p:txEl>
+                                          </p:spTgt>
+                                        </p:tgtEl>
+                                        <p:attrNameLst>
+                                          <p:attrName>style.visibility</p:attrName>
+                                        </p:attrNameLst>
+                                      </p:cBhvr>
+                                      <p:to>
+                                        <p:strVal val="visible"/>
+                                      </p:to>
+                                    </p:set>
+                                  </p:childTnLst>
+                                </p:cTn>
+                              </p:par>
+                              <p:par>
+                                <p:cTn id="7" presetID="1" presetClass="entr" presetSubtype="0" fill="hold" grpId="0" nodeType="withEffect">
+                                  <p:stCondLst>
+                                    <p:cond delay="0"/>
+                                  </p:stCondLst>
+                                  <p:childTnLst>
+                                    <p:set>
+                                      <p:cBhvr>
+                                        <p:cTn id="8" dur="1" fill="hold">
+                                          <p:stCondLst>
+                                            <p:cond delay="0"/>
+                                          </p:stCondLst>
+                                        </p:cTn>
+                                        <p:tgtEl>
+                                          <p:spTgt spid="6">
+                                            <p:txEl>
+                                              <p:pRg st="1" end="1"/>
+                                            </p:txEl>
+                                          </p:spTgt>
+                                        </p:tgtEl>
+                                        <p:attrNameLst>
+                                          <p:attrName>style.visibility</p:attrName>
+                                        </p:attrNameLst>
+                                      </p:cBhvr>
+                                      <p:to>
+                                        <p:strVal val="visible"/>
+                                      </p:to>
+                                    </p:set>
+                                  </p:childTnLst>
+                                </p:cTn>
+                              </p:par>
+                              <p:par>
+                                <p:cTn id="9" presetID="1" presetClass="entr" presetSubtype="0" fill="hold" grpId="0" nodeType="withEffect">
+                                  <p:stCondLst>
+                                    <p:cond delay="0"/>
+                                  </p:stCondLst>
+                                  <p:childTnLst>
+                                    <p:set>
+                                      <p:cBhvr>
+                                        <p:cTn id="10" dur="1" fill="hold">
+                                          <p:stCondLst>
+                                            <p:cond delay="0"/>
+                                          </p:stCondLst>
+                                        </p:cTn>
+                                        <p:tgtEl>
+                                          <p:spTgt spid="6">
+                                            <p:txEl>
+                                              <p:pRg st="2" end="2"/>
+                                            </p:txEl>
+                                          </p:spTgt>
+                                        </p:tgtEl>
+                                        <p:attrNameLst>
+                                          <p:attrName>style.visibility</p:attrName>
+                                        </p:attrNameLst>
+                                      </p:cBhvr>
+                                      <p:to>
+                                        <p:strVal val="visible"/>
+                                      </p:to>
+                                    </p:set>
+                                  </p:childTnLst>
+                                </p:cTn>
+                              </p:par>
+                              <p:par>
+                                <p:cTn id="11" presetID="1" presetClass="entr" presetSubtype="0" fill="hold" grpId="0" nodeType="withEffect">
+                                  <p:stCondLst>
+                                    <p:cond delay="0"/>
+                                  </p:stCondLst>
+                                  <p:childTnLst>
+                                    <p:set>
+                                      <p:cBhvr>
+                                        <p:cTn id="12" dur="1" fill="hold">
+                                          <p:stCondLst>
+                                            <p:cond delay="0"/>
+                                          </p:stCondLst>
+                                        </p:cTn>
+                                        <p:tgtEl>
+                                          <p:spTgt spid="6">
+                                            <p:txEl>
+                                              <p:pRg st="3" end="3"/>
+                                            </p:txEl>
+                                          </p:spTgt>
+                                        </p:tgtEl>
+                                        <p:attrNameLst>
+                                          <p:attrName>style.visibility</p:attrName>
+                                        </p:attrNameLst>
+                                      </p:cBhvr>
+                                      <p:to>
+                                        <p:strVal val="visible"/>
+                                      </p:to>
+                                    </p:set>
+                                  </p:childTnLst>
+                                </p:cTn>
+                              </p:par>
+                              <p:par>
+                                <p:cTn id="13" presetID="1" presetClass="entr" presetSubtype="0" fill="hold" grpId="0" nodeType="withEffect">
+                                  <p:stCondLst>
+                                    <p:cond delay="0"/>
+                                  </p:stCondLst>
+                                  <p:childTnLst>
+                                    <p:set>
+                                      <p:cBhvr>
+                                        <p:cTn id="14" dur="1" fill="hold">
+                                          <p:stCondLst>
+                                            <p:cond delay="0"/>
+                                          </p:stCondLst>
+                                        </p:cTn>
+                                        <p:tgtEl>
+                                          <p:spTgt spid="6">
+                                            <p:txEl>
+                                              <p:pRg st="4" end="4"/>
+                                            </p:txEl>
+                                          </p:spTgt>
+                                        </p:tgtEl>
+                                        <p:attrNameLst>
+                                          <p:attrName>style.visibility</p:attrName>
+                                        </p:attrNameLst>
+                                      </p:cBhvr>
+                                      <p:to>
+                                        <p:strVal val="visible"/>
+                                      </p:to>
+                                    </p:set>
+                                  </p:childTnLst>
+                                </p:cTn>
+                              </p:par>
+                            </p:childTnLst>
+                          </p:cTn>
+                        </p:par>
+                      </p:childTnLst>
+                    </p:cTn>
+                  </p:par>
+                  <p:par>
+                    <p:cTn id="15" fill="hold">
+                      <p:stCondLst>
+                        <p:cond delay="indefinite"/>
+                      </p:stCondLst>
+                      <p:childTnLst>
+                        <p:par>
+                          <p:cTn id="16" fill="hold">
+                            <p:stCondLst>
+                              <p:cond delay="0"/>
+                            </p:stCondLst>
+                            <p:childTnLst>
+                              <p:par>
+                                <p:cTn id="17" presetID="1" presetClass="entr" presetSubtype="0" fill="hold" grpId="0" nodeType="clickEffect">
+                                  <p:stCondLst>
+                                    <p:cond delay="0"/>
+                                  </p:stCondLst>
+                                  <p:childTnLst>
+                                    <p:set>
+                                      <p:cBhvr>
+                                        <p:cTn id="18" dur="1" fill="hold">
+                                          <p:stCondLst>
+                                            <p:cond delay="0"/>
+                                          </p:stCondLst>
+                                        </p:cTn>
+                                        <p:tgtEl>
+                                          <p:spTgt spid="6">
+                                            <p:txEl>
+                                              <p:pRg st="5" end="5"/>
+                                            </p:txEl>
+                                          </p:spTgt>
+                                        </p:tgtEl>
+                                        <p:attrNameLst>
+                                          <p:attrName>style.visibility</p:attrName>
+                                        </p:attrNameLst>
+                                      </p:cBhvr>
+                                      <p:to>
+                                        <p:strVal val="visible"/>
+                                      </p:to>
+                                    </p:set>
+                                  </p:childTnLst>
+                                </p:cTn>
+                              </p:par>
+                              <p:par>
+                                <p:cTn id="19" presetID="1" presetClass="entr" presetSubtype="0" fill="hold" grpId="0" nodeType="withEffect">
+                                  <p:stCondLst>
+                                    <p:cond delay="0"/>
+                                  </p:stCondLst>
+                                  <p:childTnLst>
+                                    <p:set>
+                                      <p:cBhvr>
+                                        <p:cTn id="20" dur="1" fill="hold">
+                                          <p:stCondLst>
+                                            <p:cond delay="0"/>
+                                          </p:stCondLst>
+                                        </p:cTn>
+                                        <p:tgtEl>
+                                          <p:spTgt spid="6">
+                                            <p:txEl>
+                                              <p:pRg st="6" end="6"/>
+                                            </p:txEl>
+                                          </p:spTgt>
+                                        </p:tgtEl>
+                                        <p:attrNameLst>
+                                          <p:attrName>style.visibility</p:attrName>
+                                        </p:attrNameLst>
+                                      </p:cBhvr>
+                                      <p:to>
+                                        <p:strVal val="visible"/>
+                                      </p:to>
+                                    </p:set>
+                                  </p:childTnLst>
+                                </p:cTn>
+                              </p:par>
+                              <p:par>
+                                <p:cTn id="21" presetID="1" presetClass="entr" presetSubtype="0" fill="hold" grpId="0" nodeType="withEffect">
+                                  <p:stCondLst>
+                                    <p:cond delay="0"/>
+                                  </p:stCondLst>
+                                  <p:childTnLst>
+                                    <p:set>
+                                      <p:cBhvr>
+                                        <p:cTn id="22" dur="1" fill="hold">
+                                          <p:stCondLst>
+                                            <p:cond delay="0"/>
+                                          </p:stCondLst>
+                                        </p:cTn>
+                                        <p:tgtEl>
+                                          <p:spTgt spid="6">
+                                            <p:txEl>
+                                              <p:pRg st="7" end="7"/>
+                                            </p:txEl>
+                                          </p:spTgt>
+                                        </p:tgtEl>
+                                        <p:attrNameLst>
+                                          <p:attrName>style.visibility</p:attrName>
+                                        </p:attrNameLst>
+                                      </p:cBhvr>
+                                      <p:to>
+                                        <p:strVal val="visible"/>
+                                      </p:to>
+                                    </p:set>
+                                  </p:childTnLst>
+                                </p:cTn>
+                              </p:par>
+                              <p:par>
+                                <p:cTn id="23" presetID="1" presetClass="entr" presetSubtype="0" fill="hold" grpId="0" nodeType="withEffect">
+                                  <p:stCondLst>
+                                    <p:cond delay="0"/>
+                                  </p:stCondLst>
+                                  <p:childTnLst>
+                                    <p:set>
+                                      <p:cBhvr>
+                                        <p:cTn id="24" dur="1" fill="hold">
+                                          <p:stCondLst>
+                                            <p:cond delay="0"/>
+                                          </p:stCondLst>
+                                        </p:cTn>
+                                        <p:tgtEl>
+                                          <p:spTgt spid="6">
+                                            <p:txEl>
+                                              <p:pRg st="8" end="8"/>
+                                            </p:txEl>
+                                          </p:spTgt>
+                                        </p:tgtEl>
+                                        <p:attrNameLst>
+                                          <p:attrName>style.visibility</p:attrName>
+                                        </p:attrNameLst>
+                                      </p:cBhvr>
+                                      <p:to>
+                                        <p:strVal val="visible"/>
+                                      </p:to>
+                                    </p:set>
+                                  </p:childTnLst>
+                                </p:cTn>
+                              </p:par>
+                            </p:childTnLst>
+                          </p:cTn>
+                        </p:par>
+                      </p:childTnLst>
+                    </p:cTn>
+                  </p:par>
+                  <p:par>
+                    <p:cTn id="25" fill="hold">
+                      <p:stCondLst>
+                        <p:cond delay="indefinite"/>
+                      </p:stCondLst>
+                      <p:childTnLst>
+                        <p:par>
+                          <p:cTn id="26" fill="hold">
+                            <p:stCondLst>
+                              <p:cond delay="0"/>
+                            </p:stCondLst>
+                            <p:childTnLst>
+                              <p:par>
+                                <p:cTn id="27" presetID="1" presetClass="entr" presetSubtype="0" fill="hold" grpId="0" nodeType="clickEffect">
+                                  <p:stCondLst>
+                                    <p:cond delay="0"/>
+                                  </p:stCondLst>
+                                  <p:childTnLst>
+                                    <p:set>
+                                      <p:cBhvr>
+                                        <p:cTn id="28" dur="1" fill="hold">
+                                          <p:stCondLst>
+                                            <p:cond delay="0"/>
+                                          </p:stCondLst>
+                                        </p:cTn>
+                                        <p:tgtEl>
+                                          <p:spTgt spid="7"/>
+                                        </p:tgtEl>
+                                        <p:attrNameLst>
+                                          <p:attrName>style.visibility</p:attrName>
+                                        </p:attrNameLst>
+                                      </p:cBhvr>
+                                      <p:to>
+                                        <p:strVal val="visible"/>
+                                      </p:to>
+                                    </p:set>
+                                  </p:childTnLst>
+                                </p:cTn>
+                              </p:par>
+                            </p:childTnLst>
+                          </p:cTn>
+                        </p:par>
+                      </p:childTnLst>
+                    </p:cTn>
+                  </p:par>
+                </p:childTnLst>
+              </p:cTn>
+              <p:prevCondLst>
+                <p:cond evt="onPrev" delay="0">
+                  <p:tgtEl>
+                    <p:sldTgt/>
+                  </p:tgtEl>
+                </p:cond>
+              </p:prevCondLst>
+              <p:nextCondLst>
+                <p:cond evt="onNext" delay="0">
+                  <p:tgtEl>
+                    <p:sldTgt/>
+                  </p:tgtEl>
+                </p:cond>
+              </p:nextCondLst>
+            </p:seq>
+          </p:childTnLst>
+        </p:cTn>
       </p:par>
     </p:tnLst>
+    <p:bldLst>
+      <p:bldP spid="6" grpId="0" uiExpand="1" build="p"/>
+      <p:bldP spid="7" grpId="0" animBg="1"/>
+    </p:bldLst>
   </p:timing>
 </p:sld>
 </file>
@@ -6586,11 +7578,18 @@
           </a:p>
           <a:p>
             <a:r>
+              <a:rPr lang="en-US" dirty="0" err="1" smtClean="0">
+                <a:latin typeface="Courier New" panose="02070309020205020404" pitchFamily="49" charset="0"/>
+                <a:cs typeface="Courier New" panose="02070309020205020404" pitchFamily="49" charset="0"/>
+              </a:rPr>
+              <a:t>search_record</a:t>
+            </a:r>
+            <a:r>
               <a:rPr lang="en-US" dirty="0" smtClean="0">
                 <a:latin typeface="Courier New" panose="02070309020205020404" pitchFamily="49" charset="0"/>
                 <a:cs typeface="Courier New" panose="02070309020205020404" pitchFamily="49" charset="0"/>
               </a:rPr>
-              <a:t>record </a:t>
+              <a:t> </a:t>
             </a:r>
             <a:r>
               <a:rPr lang="en-US" dirty="0">
@@ -6677,12 +7676,22 @@
                 <a:latin typeface="Courier New" panose="02070309020205020404" pitchFamily="49" charset="0"/>
                 <a:cs typeface="Courier New" panose="02070309020205020404" pitchFamily="49" charset="0"/>
               </a:rPr>
-              <a:t>(record['Count'])</a:t>
-            </a:r>
-            <a:endParaRPr lang="en-US" dirty="0" smtClean="0">
-              <a:latin typeface="Courier New" panose="02070309020205020404" pitchFamily="49" charset="0"/>
-              <a:cs typeface="Courier New" panose="02070309020205020404" pitchFamily="49" charset="0"/>
-            </a:endParaRPr>
+              <a:t>(</a:t>
+            </a:r>
+            <a:r>
+              <a:rPr lang="en-US" dirty="0" err="1" smtClean="0">
+                <a:latin typeface="Courier New" panose="02070309020205020404" pitchFamily="49" charset="0"/>
+                <a:cs typeface="Courier New" panose="02070309020205020404" pitchFamily="49" charset="0"/>
+              </a:rPr>
+              <a:t>search_record</a:t>
+            </a:r>
+            <a:r>
+              <a:rPr lang="en-US" dirty="0" smtClean="0">
+                <a:latin typeface="Courier New" panose="02070309020205020404" pitchFamily="49" charset="0"/>
+                <a:cs typeface="Courier New" panose="02070309020205020404" pitchFamily="49" charset="0"/>
+              </a:rPr>
+              <a:t>['Count'])</a:t>
+            </a:r>
           </a:p>
         </p:txBody>
       </p:sp>
@@ -6699,9 +7708,1791 @@
   <p:timing>
     <p:tnLst>
       <p:par>
-        <p:cTn id="1" dur="indefinite" restart="never" nodeType="tmRoot"/>
+        <p:cTn id="1" dur="indefinite" restart="never" nodeType="tmRoot">
+          <p:childTnLst>
+            <p:seq concurrent="1" nextAc="seek">
+              <p:cTn id="2" dur="indefinite" nodeType="mainSeq">
+                <p:childTnLst>
+                  <p:par>
+                    <p:cTn id="3" fill="hold">
+                      <p:stCondLst>
+                        <p:cond delay="indefinite"/>
+                        <p:cond evt="onBegin" delay="0">
+                          <p:tn val="2"/>
+                        </p:cond>
+                      </p:stCondLst>
+                      <p:childTnLst>
+                        <p:par>
+                          <p:cTn id="4" fill="hold">
+                            <p:stCondLst>
+                              <p:cond delay="0"/>
+                            </p:stCondLst>
+                            <p:childTnLst>
+                              <p:par>
+                                <p:cTn id="5" presetID="1" presetClass="entr" presetSubtype="0" fill="hold" grpId="0" nodeType="withEffect">
+                                  <p:stCondLst>
+                                    <p:cond delay="0"/>
+                                  </p:stCondLst>
+                                  <p:childTnLst>
+                                    <p:set>
+                                      <p:cBhvr>
+                                        <p:cTn id="6" dur="1" fill="hold">
+                                          <p:stCondLst>
+                                            <p:cond delay="0"/>
+                                          </p:stCondLst>
+                                        </p:cTn>
+                                        <p:tgtEl>
+                                          <p:spTgt spid="3">
+                                            <p:txEl>
+                                              <p:pRg st="0" end="0"/>
+                                            </p:txEl>
+                                          </p:spTgt>
+                                        </p:tgtEl>
+                                        <p:attrNameLst>
+                                          <p:attrName>style.visibility</p:attrName>
+                                        </p:attrNameLst>
+                                      </p:cBhvr>
+                                      <p:to>
+                                        <p:strVal val="visible"/>
+                                      </p:to>
+                                    </p:set>
+                                  </p:childTnLst>
+                                </p:cTn>
+                              </p:par>
+                            </p:childTnLst>
+                          </p:cTn>
+                        </p:par>
+                      </p:childTnLst>
+                    </p:cTn>
+                  </p:par>
+                  <p:par>
+                    <p:cTn id="7" fill="hold">
+                      <p:stCondLst>
+                        <p:cond delay="indefinite"/>
+                      </p:stCondLst>
+                      <p:childTnLst>
+                        <p:par>
+                          <p:cTn id="8" fill="hold">
+                            <p:stCondLst>
+                              <p:cond delay="0"/>
+                            </p:stCondLst>
+                            <p:childTnLst>
+                              <p:par>
+                                <p:cTn id="9" presetID="1" presetClass="entr" presetSubtype="0" fill="hold" grpId="0" nodeType="clickEffect">
+                                  <p:stCondLst>
+                                    <p:cond delay="0"/>
+                                  </p:stCondLst>
+                                  <p:childTnLst>
+                                    <p:set>
+                                      <p:cBhvr>
+                                        <p:cTn id="10" dur="1" fill="hold">
+                                          <p:stCondLst>
+                                            <p:cond delay="0"/>
+                                          </p:stCondLst>
+                                        </p:cTn>
+                                        <p:tgtEl>
+                                          <p:spTgt spid="3">
+                                            <p:txEl>
+                                              <p:pRg st="1" end="1"/>
+                                            </p:txEl>
+                                          </p:spTgt>
+                                        </p:tgtEl>
+                                        <p:attrNameLst>
+                                          <p:attrName>style.visibility</p:attrName>
+                                        </p:attrNameLst>
+                                      </p:cBhvr>
+                                      <p:to>
+                                        <p:strVal val="visible"/>
+                                      </p:to>
+                                    </p:set>
+                                  </p:childTnLst>
+                                </p:cTn>
+                              </p:par>
+                            </p:childTnLst>
+                          </p:cTn>
+                        </p:par>
+                      </p:childTnLst>
+                    </p:cTn>
+                  </p:par>
+                  <p:par>
+                    <p:cTn id="11" fill="hold">
+                      <p:stCondLst>
+                        <p:cond delay="indefinite"/>
+                      </p:stCondLst>
+                      <p:childTnLst>
+                        <p:par>
+                          <p:cTn id="12" fill="hold">
+                            <p:stCondLst>
+                              <p:cond delay="0"/>
+                            </p:stCondLst>
+                            <p:childTnLst>
+                              <p:par>
+                                <p:cTn id="13" presetID="1" presetClass="entr" presetSubtype="0" fill="hold" grpId="0" nodeType="clickEffect">
+                                  <p:stCondLst>
+                                    <p:cond delay="0"/>
+                                  </p:stCondLst>
+                                  <p:childTnLst>
+                                    <p:set>
+                                      <p:cBhvr>
+                                        <p:cTn id="14" dur="1" fill="hold">
+                                          <p:stCondLst>
+                                            <p:cond delay="0"/>
+                                          </p:stCondLst>
+                                        </p:cTn>
+                                        <p:tgtEl>
+                                          <p:spTgt spid="3">
+                                            <p:txEl>
+                                              <p:pRg st="2" end="2"/>
+                                            </p:txEl>
+                                          </p:spTgt>
+                                        </p:tgtEl>
+                                        <p:attrNameLst>
+                                          <p:attrName>style.visibility</p:attrName>
+                                        </p:attrNameLst>
+                                      </p:cBhvr>
+                                      <p:to>
+                                        <p:strVal val="visible"/>
+                                      </p:to>
+                                    </p:set>
+                                  </p:childTnLst>
+                                </p:cTn>
+                              </p:par>
+                              <p:par>
+                                <p:cTn id="15" presetID="1" presetClass="entr" presetSubtype="0" fill="hold" grpId="0" nodeType="withEffect">
+                                  <p:stCondLst>
+                                    <p:cond delay="0"/>
+                                  </p:stCondLst>
+                                  <p:childTnLst>
+                                    <p:set>
+                                      <p:cBhvr>
+                                        <p:cTn id="16" dur="1" fill="hold">
+                                          <p:stCondLst>
+                                            <p:cond delay="0"/>
+                                          </p:stCondLst>
+                                        </p:cTn>
+                                        <p:tgtEl>
+                                          <p:spTgt spid="5"/>
+                                        </p:tgtEl>
+                                        <p:attrNameLst>
+                                          <p:attrName>style.visibility</p:attrName>
+                                        </p:attrNameLst>
+                                      </p:cBhvr>
+                                      <p:to>
+                                        <p:strVal val="visible"/>
+                                      </p:to>
+                                    </p:set>
+                                  </p:childTnLst>
+                                </p:cTn>
+                              </p:par>
+                            </p:childTnLst>
+                          </p:cTn>
+                        </p:par>
+                      </p:childTnLst>
+                    </p:cTn>
+                  </p:par>
+                  <p:par>
+                    <p:cTn id="17" fill="hold">
+                      <p:stCondLst>
+                        <p:cond delay="indefinite"/>
+                      </p:stCondLst>
+                      <p:childTnLst>
+                        <p:par>
+                          <p:cTn id="18" fill="hold">
+                            <p:stCondLst>
+                              <p:cond delay="0"/>
+                            </p:stCondLst>
+                            <p:childTnLst>
+                              <p:par>
+                                <p:cTn id="19" presetID="1" presetClass="entr" presetSubtype="0" fill="hold" grpId="0" nodeType="clickEffect">
+                                  <p:stCondLst>
+                                    <p:cond delay="0"/>
+                                  </p:stCondLst>
+                                  <p:childTnLst>
+                                    <p:set>
+                                      <p:cBhvr>
+                                        <p:cTn id="20" dur="1" fill="hold">
+                                          <p:stCondLst>
+                                            <p:cond delay="0"/>
+                                          </p:stCondLst>
+                                        </p:cTn>
+                                        <p:tgtEl>
+                                          <p:spTgt spid="3">
+                                            <p:txEl>
+                                              <p:pRg st="7" end="7"/>
+                                            </p:txEl>
+                                          </p:spTgt>
+                                        </p:tgtEl>
+                                        <p:attrNameLst>
+                                          <p:attrName>style.visibility</p:attrName>
+                                        </p:attrNameLst>
+                                      </p:cBhvr>
+                                      <p:to>
+                                        <p:strVal val="visible"/>
+                                      </p:to>
+                                    </p:set>
+                                  </p:childTnLst>
+                                </p:cTn>
+                              </p:par>
+                              <p:par>
+                                <p:cTn id="21" presetID="1" presetClass="entr" presetSubtype="0" fill="hold" grpId="0" nodeType="withEffect">
+                                  <p:stCondLst>
+                                    <p:cond delay="0"/>
+                                  </p:stCondLst>
+                                  <p:childTnLst>
+                                    <p:set>
+                                      <p:cBhvr>
+                                        <p:cTn id="22" dur="1" fill="hold">
+                                          <p:stCondLst>
+                                            <p:cond delay="0"/>
+                                          </p:stCondLst>
+                                        </p:cTn>
+                                        <p:tgtEl>
+                                          <p:spTgt spid="6"/>
+                                        </p:tgtEl>
+                                        <p:attrNameLst>
+                                          <p:attrName>style.visibility</p:attrName>
+                                        </p:attrNameLst>
+                                      </p:cBhvr>
+                                      <p:to>
+                                        <p:strVal val="visible"/>
+                                      </p:to>
+                                    </p:set>
+                                  </p:childTnLst>
+                                </p:cTn>
+                              </p:par>
+                            </p:childTnLst>
+                          </p:cTn>
+                        </p:par>
+                      </p:childTnLst>
+                    </p:cTn>
+                  </p:par>
+                </p:childTnLst>
+              </p:cTn>
+              <p:prevCondLst>
+                <p:cond evt="onPrev" delay="0">
+                  <p:tgtEl>
+                    <p:sldTgt/>
+                  </p:tgtEl>
+                </p:cond>
+              </p:prevCondLst>
+              <p:nextCondLst>
+                <p:cond evt="onNext" delay="0">
+                  <p:tgtEl>
+                    <p:sldTgt/>
+                  </p:tgtEl>
+                </p:cond>
+              </p:nextCondLst>
+            </p:seq>
+          </p:childTnLst>
+        </p:cTn>
       </p:par>
     </p:tnLst>
+    <p:bldLst>
+      <p:bldP spid="3" grpId="0" uiExpand="1" build="p"/>
+      <p:bldP spid="5" grpId="0" animBg="1"/>
+      <p:bldP spid="6" grpId="0" animBg="1"/>
+    </p:bldLst>
+  </p:timing>
+</p:sld>
+</file>
+
+<file path=ppt/slides/slide17.xml><?xml version="1.0" encoding="utf-8"?>
+<p:sld xmlns:a="http://schemas.openxmlformats.org/drawingml/2006/main" xmlns:r="http://schemas.openxmlformats.org/officeDocument/2006/relationships" xmlns:p="http://schemas.openxmlformats.org/presentationml/2006/main">
+  <p:cSld>
+    <p:spTree>
+      <p:nvGrpSpPr>
+        <p:cNvPr id="1" name=""/>
+        <p:cNvGrpSpPr/>
+        <p:nvPr/>
+      </p:nvGrpSpPr>
+      <p:grpSpPr>
+        <a:xfrm>
+          <a:off x="0" y="0"/>
+          <a:ext cx="0" cy="0"/>
+          <a:chOff x="0" y="0"/>
+          <a:chExt cx="0" cy="0"/>
+        </a:xfrm>
+      </p:grpSpPr>
+      <p:sp>
+        <p:nvSpPr>
+          <p:cNvPr id="2" name="Title 1"/>
+          <p:cNvSpPr>
+            <a:spLocks noGrp="1"/>
+          </p:cNvSpPr>
+          <p:nvPr>
+            <p:ph type="title"/>
+          </p:nvPr>
+        </p:nvSpPr>
+        <p:spPr/>
+        <p:txBody>
+          <a:bodyPr/>
+          <a:lstStyle/>
+          <a:p>
+            <a:r>
+              <a:rPr lang="en-US" dirty="0" smtClean="0"/>
+              <a:t>Retrieving results</a:t>
+            </a:r>
+            <a:endParaRPr lang="en-US" dirty="0"/>
+          </a:p>
+        </p:txBody>
+      </p:sp>
+      <p:sp>
+        <p:nvSpPr>
+          <p:cNvPr id="3" name="Content Placeholder 2"/>
+          <p:cNvSpPr>
+            <a:spLocks noGrp="1"/>
+          </p:cNvSpPr>
+          <p:nvPr>
+            <p:ph idx="1"/>
+          </p:nvPr>
+        </p:nvSpPr>
+        <p:spPr/>
+        <p:txBody>
+          <a:bodyPr/>
+          <a:lstStyle/>
+          <a:p>
+            <a:r>
+              <a:rPr lang="en-US" dirty="0" smtClean="0"/>
+              <a:t>List of IDs returned in search</a:t>
+            </a:r>
+          </a:p>
+          <a:p>
+            <a:endParaRPr lang="en-US" dirty="0"/>
+          </a:p>
+          <a:p>
+            <a:endParaRPr lang="en-US" dirty="0" smtClean="0"/>
+          </a:p>
+          <a:p>
+            <a:r>
+              <a:rPr lang="en-US" dirty="0" smtClean="0"/>
+              <a:t>Retrieving a search result</a:t>
+            </a:r>
+            <a:endParaRPr lang="en-US" dirty="0"/>
+          </a:p>
+        </p:txBody>
+      </p:sp>
+      <p:sp>
+        <p:nvSpPr>
+          <p:cNvPr id="4" name="Slide Number Placeholder 3"/>
+          <p:cNvSpPr>
+            <a:spLocks noGrp="1"/>
+          </p:cNvSpPr>
+          <p:nvPr>
+            <p:ph type="sldNum" sz="quarter" idx="12"/>
+          </p:nvPr>
+        </p:nvSpPr>
+        <p:spPr/>
+        <p:txBody>
+          <a:bodyPr/>
+          <a:lstStyle/>
+          <a:p>
+            <a:fld id="{CA586AD6-E5F2-4F25-940D-C674496063E2}" type="slidenum">
+              <a:rPr lang="en-US" smtClean="0"/>
+              <a:t>17</a:t>
+            </a:fld>
+            <a:endParaRPr lang="en-US"/>
+          </a:p>
+        </p:txBody>
+      </p:sp>
+      <p:sp>
+        <p:nvSpPr>
+          <p:cNvPr id="5" name="TextBox 4"/>
+          <p:cNvSpPr txBox="1"/>
+          <p:nvPr/>
+        </p:nvSpPr>
+        <p:spPr>
+          <a:xfrm>
+            <a:off x="987136" y="2337068"/>
+            <a:ext cx="6371195" cy="369332"/>
+          </a:xfrm>
+          <a:prstGeom prst="rect">
+            <a:avLst/>
+          </a:prstGeom>
+          <a:solidFill>
+            <a:schemeClr val="bg1">
+              <a:lumMod val="75000"/>
+            </a:schemeClr>
+          </a:solidFill>
+          <a:ln>
+            <a:solidFill>
+              <a:schemeClr val="tx1"/>
+            </a:solidFill>
+          </a:ln>
+        </p:spPr>
+        <p:txBody>
+          <a:bodyPr wrap="square" rtlCol="0">
+            <a:spAutoFit/>
+          </a:bodyPr>
+          <a:lstStyle/>
+          <a:p>
+            <a:r>
+              <a:rPr lang="en-US" dirty="0" smtClean="0">
+                <a:latin typeface="Courier New" panose="02070309020205020404" pitchFamily="49" charset="0"/>
+                <a:cs typeface="Courier New" panose="02070309020205020404" pitchFamily="49" charset="0"/>
+              </a:rPr>
+              <a:t>print(', '.join(</a:t>
+            </a:r>
+            <a:r>
+              <a:rPr lang="en-US" dirty="0" err="1" smtClean="0">
+                <a:latin typeface="Courier New" panose="02070309020205020404" pitchFamily="49" charset="0"/>
+                <a:cs typeface="Courier New" panose="02070309020205020404" pitchFamily="49" charset="0"/>
+              </a:rPr>
+              <a:t>search_record</a:t>
+            </a:r>
+            <a:r>
+              <a:rPr lang="en-US" dirty="0" smtClean="0">
+                <a:latin typeface="Courier New" panose="02070309020205020404" pitchFamily="49" charset="0"/>
+                <a:cs typeface="Courier New" panose="02070309020205020404" pitchFamily="49" charset="0"/>
+              </a:rPr>
+              <a:t>['</a:t>
+            </a:r>
+            <a:r>
+              <a:rPr lang="en-US" dirty="0" err="1" smtClean="0">
+                <a:latin typeface="Courier New" panose="02070309020205020404" pitchFamily="49" charset="0"/>
+                <a:cs typeface="Courier New" panose="02070309020205020404" pitchFamily="49" charset="0"/>
+              </a:rPr>
+              <a:t>IdList</a:t>
+            </a:r>
+            <a:r>
+              <a:rPr lang="en-US" dirty="0" smtClean="0">
+                <a:latin typeface="Courier New" panose="02070309020205020404" pitchFamily="49" charset="0"/>
+                <a:cs typeface="Courier New" panose="02070309020205020404" pitchFamily="49" charset="0"/>
+              </a:rPr>
+              <a:t>']))</a:t>
+            </a:r>
+          </a:p>
+        </p:txBody>
+      </p:sp>
+      <p:sp>
+        <p:nvSpPr>
+          <p:cNvPr id="6" name="TextBox 5"/>
+          <p:cNvSpPr txBox="1"/>
+          <p:nvPr/>
+        </p:nvSpPr>
+        <p:spPr>
+          <a:xfrm>
+            <a:off x="987136" y="2841336"/>
+            <a:ext cx="6371195" cy="369332"/>
+          </a:xfrm>
+          <a:prstGeom prst="rect">
+            <a:avLst/>
+          </a:prstGeom>
+          <a:solidFill>
+            <a:schemeClr val="tx1"/>
+          </a:solidFill>
+        </p:spPr>
+        <p:txBody>
+          <a:bodyPr wrap="square" rtlCol="0">
+            <a:spAutoFit/>
+          </a:bodyPr>
+          <a:lstStyle/>
+          <a:p>
+            <a:r>
+              <a:rPr lang="en-US" b="1" dirty="0" smtClean="0">
+                <a:solidFill>
+                  <a:schemeClr val="bg1"/>
+                </a:solidFill>
+              </a:rPr>
+              <a:t>1034633426,  382544572,  </a:t>
+            </a:r>
+            <a:r>
+              <a:rPr lang="en-US" b="1" dirty="0">
+                <a:solidFill>
+                  <a:schemeClr val="bg1"/>
+                </a:solidFill>
+              </a:rPr>
+              <a:t>384871682</a:t>
+            </a:r>
+          </a:p>
+        </p:txBody>
+      </p:sp>
+      <p:sp>
+        <p:nvSpPr>
+          <p:cNvPr id="7" name="TextBox 6"/>
+          <p:cNvSpPr txBox="1"/>
+          <p:nvPr/>
+        </p:nvSpPr>
+        <p:spPr>
+          <a:xfrm>
+            <a:off x="994062" y="3777938"/>
+            <a:ext cx="6371195" cy="1200329"/>
+          </a:xfrm>
+          <a:prstGeom prst="rect">
+            <a:avLst/>
+          </a:prstGeom>
+          <a:solidFill>
+            <a:schemeClr val="bg1">
+              <a:lumMod val="75000"/>
+            </a:schemeClr>
+          </a:solidFill>
+          <a:ln>
+            <a:solidFill>
+              <a:schemeClr val="tx1"/>
+            </a:solidFill>
+          </a:ln>
+        </p:spPr>
+        <p:txBody>
+          <a:bodyPr wrap="square" rtlCol="0">
+            <a:spAutoFit/>
+          </a:bodyPr>
+          <a:lstStyle/>
+          <a:p>
+            <a:r>
+              <a:rPr lang="en-US" dirty="0">
+                <a:latin typeface="Courier New" panose="02070309020205020404" pitchFamily="49" charset="0"/>
+                <a:cs typeface="Courier New" panose="02070309020205020404" pitchFamily="49" charset="0"/>
+              </a:rPr>
+              <a:t>handle = </a:t>
+            </a:r>
+            <a:r>
+              <a:rPr lang="en-US" dirty="0" err="1">
+                <a:latin typeface="Courier New" panose="02070309020205020404" pitchFamily="49" charset="0"/>
+                <a:cs typeface="Courier New" panose="02070309020205020404" pitchFamily="49" charset="0"/>
+              </a:rPr>
+              <a:t>Entrez.efetch</a:t>
+            </a:r>
+            <a:r>
+              <a:rPr lang="en-US" dirty="0" smtClean="0">
+                <a:latin typeface="Courier New" panose="02070309020205020404" pitchFamily="49" charset="0"/>
+                <a:cs typeface="Courier New" panose="02070309020205020404" pitchFamily="49" charset="0"/>
+              </a:rPr>
+              <a:t>(</a:t>
+            </a:r>
+          </a:p>
+          <a:p>
+            <a:r>
+              <a:rPr lang="en-US" dirty="0">
+                <a:latin typeface="Courier New" panose="02070309020205020404" pitchFamily="49" charset="0"/>
+                <a:cs typeface="Courier New" panose="02070309020205020404" pitchFamily="49" charset="0"/>
+              </a:rPr>
+              <a:t> </a:t>
+            </a:r>
+            <a:r>
+              <a:rPr lang="en-US" dirty="0" smtClean="0">
+                <a:latin typeface="Courier New" panose="02070309020205020404" pitchFamily="49" charset="0"/>
+                <a:cs typeface="Courier New" panose="02070309020205020404" pitchFamily="49" charset="0"/>
+              </a:rPr>
+              <a:t>   </a:t>
+            </a:r>
+            <a:r>
+              <a:rPr lang="en-US" dirty="0" err="1" smtClean="0">
+                <a:latin typeface="Courier New" panose="02070309020205020404" pitchFamily="49" charset="0"/>
+                <a:cs typeface="Courier New" panose="02070309020205020404" pitchFamily="49" charset="0"/>
+              </a:rPr>
+              <a:t>db</a:t>
+            </a:r>
+            <a:r>
+              <a:rPr lang="en-US" dirty="0">
+                <a:latin typeface="Courier New" panose="02070309020205020404" pitchFamily="49" charset="0"/>
+                <a:cs typeface="Courier New" panose="02070309020205020404" pitchFamily="49" charset="0"/>
+              </a:rPr>
+              <a:t>='nucleotide</a:t>
+            </a:r>
+            <a:r>
+              <a:rPr lang="en-US" dirty="0" smtClean="0">
+                <a:latin typeface="Courier New" panose="02070309020205020404" pitchFamily="49" charset="0"/>
+                <a:cs typeface="Courier New" panose="02070309020205020404" pitchFamily="49" charset="0"/>
+              </a:rPr>
+              <a:t>', id='384871682</a:t>
+            </a:r>
+            <a:r>
+              <a:rPr lang="en-US" dirty="0" smtClean="0"/>
+              <a:t>'</a:t>
+            </a:r>
+            <a:r>
+              <a:rPr lang="en-US" dirty="0" smtClean="0">
+                <a:latin typeface="Courier New" panose="02070309020205020404" pitchFamily="49" charset="0"/>
+                <a:cs typeface="Courier New" panose="02070309020205020404" pitchFamily="49" charset="0"/>
+              </a:rPr>
+              <a:t>,</a:t>
+            </a:r>
+            <a:endParaRPr lang="en-US" dirty="0">
+              <a:latin typeface="Courier New" panose="02070309020205020404" pitchFamily="49" charset="0"/>
+              <a:cs typeface="Courier New" panose="02070309020205020404" pitchFamily="49" charset="0"/>
+            </a:endParaRPr>
+          </a:p>
+          <a:p>
+            <a:r>
+              <a:rPr lang="en-US" dirty="0">
+                <a:latin typeface="Courier New" panose="02070309020205020404" pitchFamily="49" charset="0"/>
+                <a:cs typeface="Courier New" panose="02070309020205020404" pitchFamily="49" charset="0"/>
+              </a:rPr>
+              <a:t> </a:t>
+            </a:r>
+            <a:r>
+              <a:rPr lang="en-US" dirty="0" smtClean="0">
+                <a:latin typeface="Courier New" panose="02070309020205020404" pitchFamily="49" charset="0"/>
+                <a:cs typeface="Courier New" panose="02070309020205020404" pitchFamily="49" charset="0"/>
+              </a:rPr>
+              <a:t>   </a:t>
+            </a:r>
+            <a:r>
+              <a:rPr lang="en-US" dirty="0" err="1" smtClean="0">
+                <a:latin typeface="Courier New" panose="02070309020205020404" pitchFamily="49" charset="0"/>
+                <a:cs typeface="Courier New" panose="02070309020205020404" pitchFamily="49" charset="0"/>
+              </a:rPr>
+              <a:t>rettype</a:t>
+            </a:r>
+            <a:r>
+              <a:rPr lang="en-US" dirty="0">
+                <a:latin typeface="Courier New" panose="02070309020205020404" pitchFamily="49" charset="0"/>
+                <a:cs typeface="Courier New" panose="02070309020205020404" pitchFamily="49" charset="0"/>
+              </a:rPr>
+              <a:t>='</a:t>
+            </a:r>
+            <a:r>
+              <a:rPr lang="en-US" dirty="0" err="1">
+                <a:latin typeface="Courier New" panose="02070309020205020404" pitchFamily="49" charset="0"/>
+                <a:cs typeface="Courier New" panose="02070309020205020404" pitchFamily="49" charset="0"/>
+              </a:rPr>
+              <a:t>gb</a:t>
+            </a:r>
+            <a:r>
+              <a:rPr lang="en-US" dirty="0" smtClean="0">
+                <a:latin typeface="Courier New" panose="02070309020205020404" pitchFamily="49" charset="0"/>
+                <a:cs typeface="Courier New" panose="02070309020205020404" pitchFamily="49" charset="0"/>
+              </a:rPr>
+              <a:t>',</a:t>
+            </a:r>
+            <a:r>
+              <a:rPr lang="en-US" dirty="0">
+                <a:latin typeface="Courier New" panose="02070309020205020404" pitchFamily="49" charset="0"/>
+                <a:cs typeface="Courier New" panose="02070309020205020404" pitchFamily="49" charset="0"/>
+              </a:rPr>
+              <a:t> </a:t>
+            </a:r>
+            <a:r>
+              <a:rPr lang="en-US" dirty="0" err="1" smtClean="0">
+                <a:latin typeface="Courier New" panose="02070309020205020404" pitchFamily="49" charset="0"/>
+                <a:cs typeface="Courier New" panose="02070309020205020404" pitchFamily="49" charset="0"/>
+              </a:rPr>
+              <a:t>retmode</a:t>
+            </a:r>
+            <a:r>
+              <a:rPr lang="en-US" dirty="0">
+                <a:latin typeface="Courier New" panose="02070309020205020404" pitchFamily="49" charset="0"/>
+                <a:cs typeface="Courier New" panose="02070309020205020404" pitchFamily="49" charset="0"/>
+              </a:rPr>
+              <a:t>='text</a:t>
+            </a:r>
+            <a:r>
+              <a:rPr lang="en-US" dirty="0" smtClean="0">
+                <a:latin typeface="Courier New" panose="02070309020205020404" pitchFamily="49" charset="0"/>
+                <a:cs typeface="Courier New" panose="02070309020205020404" pitchFamily="49" charset="0"/>
+              </a:rPr>
+              <a:t>')</a:t>
+            </a:r>
+          </a:p>
+          <a:p>
+            <a:r>
+              <a:rPr lang="en-US" dirty="0" err="1" smtClean="0">
+                <a:latin typeface="Courier New" panose="02070309020205020404" pitchFamily="49" charset="0"/>
+                <a:cs typeface="Courier New" panose="02070309020205020404" pitchFamily="49" charset="0"/>
+              </a:rPr>
+              <a:t>genbank_str</a:t>
+            </a:r>
+            <a:r>
+              <a:rPr lang="en-US" dirty="0" smtClean="0">
+                <a:latin typeface="Courier New" panose="02070309020205020404" pitchFamily="49" charset="0"/>
+                <a:cs typeface="Courier New" panose="02070309020205020404" pitchFamily="49" charset="0"/>
+              </a:rPr>
+              <a:t> = </a:t>
+            </a:r>
+            <a:r>
+              <a:rPr lang="en-US" dirty="0" err="1" smtClean="0">
+                <a:latin typeface="Courier New" panose="02070309020205020404" pitchFamily="49" charset="0"/>
+                <a:cs typeface="Courier New" panose="02070309020205020404" pitchFamily="49" charset="0"/>
+              </a:rPr>
+              <a:t>handle.read</a:t>
+            </a:r>
+            <a:r>
+              <a:rPr lang="en-US" dirty="0" smtClean="0">
+                <a:latin typeface="Courier New" panose="02070309020205020404" pitchFamily="49" charset="0"/>
+                <a:cs typeface="Courier New" panose="02070309020205020404" pitchFamily="49" charset="0"/>
+              </a:rPr>
+              <a:t>()</a:t>
+            </a:r>
+          </a:p>
+        </p:txBody>
+      </p:sp>
+      <p:sp>
+        <p:nvSpPr>
+          <p:cNvPr id="8" name="TextBox 7"/>
+          <p:cNvSpPr txBox="1"/>
+          <p:nvPr/>
+        </p:nvSpPr>
+        <p:spPr>
+          <a:xfrm>
+            <a:off x="987135" y="5091751"/>
+            <a:ext cx="6371195" cy="1600438"/>
+          </a:xfrm>
+          <a:prstGeom prst="rect">
+            <a:avLst/>
+          </a:prstGeom>
+          <a:solidFill>
+            <a:schemeClr val="tx1"/>
+          </a:solidFill>
+        </p:spPr>
+        <p:txBody>
+          <a:bodyPr wrap="square" rtlCol="0">
+            <a:spAutoFit/>
+          </a:bodyPr>
+          <a:lstStyle/>
+          <a:p>
+            <a:r>
+              <a:rPr lang="en-US" sz="1400" b="1" dirty="0">
+                <a:solidFill>
+                  <a:schemeClr val="bg1"/>
+                </a:solidFill>
+              </a:rPr>
+              <a:t>LOCUS       NM_001258274            2623 </a:t>
+            </a:r>
+            <a:r>
+              <a:rPr lang="en-US" sz="1400" b="1" dirty="0" err="1">
+                <a:solidFill>
+                  <a:schemeClr val="bg1"/>
+                </a:solidFill>
+              </a:rPr>
+              <a:t>bp</a:t>
+            </a:r>
+            <a:r>
+              <a:rPr lang="en-US" sz="1400" b="1" dirty="0">
+                <a:solidFill>
+                  <a:schemeClr val="bg1"/>
+                </a:solidFill>
+              </a:rPr>
+              <a:t>    mRNA    linear   PRI 12-JUN-2016</a:t>
+            </a:r>
+          </a:p>
+          <a:p>
+            <a:r>
+              <a:rPr lang="en-US" sz="1400" b="1" dirty="0">
+                <a:solidFill>
+                  <a:schemeClr val="bg1"/>
+                </a:solidFill>
+              </a:rPr>
+              <a:t>DEFINITION  Homo sapiens </a:t>
+            </a:r>
+            <a:r>
+              <a:rPr lang="en-US" sz="1400" b="1" dirty="0" err="1">
+                <a:solidFill>
+                  <a:schemeClr val="bg1"/>
+                </a:solidFill>
+              </a:rPr>
+              <a:t>mutL</a:t>
+            </a:r>
+            <a:r>
+              <a:rPr lang="en-US" sz="1400" b="1" dirty="0">
+                <a:solidFill>
+                  <a:schemeClr val="bg1"/>
+                </a:solidFill>
+              </a:rPr>
+              <a:t> homolog 1 (MLH1), transcript variant 7, mRNA.</a:t>
+            </a:r>
+          </a:p>
+          <a:p>
+            <a:r>
+              <a:rPr lang="en-US" sz="1400" b="1" dirty="0">
+                <a:solidFill>
+                  <a:schemeClr val="bg1"/>
+                </a:solidFill>
+              </a:rPr>
+              <a:t>ACCESSION   NM_001258274</a:t>
+            </a:r>
+          </a:p>
+          <a:p>
+            <a:r>
+              <a:rPr lang="en-US" sz="1400" b="1" dirty="0">
+                <a:solidFill>
+                  <a:schemeClr val="bg1"/>
+                </a:solidFill>
+              </a:rPr>
+              <a:t>VERSION     NM_001258274.1  GI:384871682</a:t>
+            </a:r>
+          </a:p>
+          <a:p>
+            <a:r>
+              <a:rPr lang="en-US" sz="1400" b="1" dirty="0">
+                <a:solidFill>
+                  <a:schemeClr val="bg1"/>
+                </a:solidFill>
+              </a:rPr>
+              <a:t>KEYWORDS    </a:t>
+            </a:r>
+            <a:r>
+              <a:rPr lang="en-US" sz="1400" b="1" dirty="0" err="1">
+                <a:solidFill>
+                  <a:schemeClr val="bg1"/>
+                </a:solidFill>
+              </a:rPr>
+              <a:t>RefSeq</a:t>
+            </a:r>
+            <a:r>
+              <a:rPr lang="en-US" sz="1400" b="1" dirty="0">
+                <a:solidFill>
+                  <a:schemeClr val="bg1"/>
+                </a:solidFill>
+              </a:rPr>
+              <a:t>.</a:t>
+            </a:r>
+          </a:p>
+          <a:p>
+            <a:r>
+              <a:rPr lang="en-US" sz="1400" b="1" dirty="0">
+                <a:solidFill>
+                  <a:schemeClr val="bg1"/>
+                </a:solidFill>
+              </a:rPr>
+              <a:t>SOURCE      Homo sapiens (human</a:t>
+            </a:r>
+            <a:r>
+              <a:rPr lang="en-US" sz="1400" b="1" dirty="0" smtClean="0">
+                <a:solidFill>
+                  <a:schemeClr val="bg1"/>
+                </a:solidFill>
+              </a:rPr>
+              <a:t>)</a:t>
+            </a:r>
+          </a:p>
+          <a:p>
+            <a:r>
+              <a:rPr lang="en-US" sz="1400" b="1" dirty="0" smtClean="0">
+                <a:solidFill>
+                  <a:schemeClr val="bg1"/>
+                </a:solidFill>
+              </a:rPr>
+              <a:t>…</a:t>
+            </a:r>
+            <a:endParaRPr lang="en-US" sz="1400" b="1" dirty="0">
+              <a:solidFill>
+                <a:schemeClr val="bg1"/>
+              </a:solidFill>
+            </a:endParaRPr>
+          </a:p>
+        </p:txBody>
+      </p:sp>
+    </p:spTree>
+    <p:extLst>
+      <p:ext uri="{BB962C8B-B14F-4D97-AF65-F5344CB8AC3E}">
+        <p14:creationId xmlns:p14="http://schemas.microsoft.com/office/powerpoint/2010/main" val="1844736712"/>
+      </p:ext>
+    </p:extLst>
+  </p:cSld>
+  <p:clrMapOvr>
+    <a:masterClrMapping/>
+  </p:clrMapOvr>
+  <p:timing>
+    <p:tnLst>
+      <p:par>
+        <p:cTn id="1" dur="indefinite" restart="never" nodeType="tmRoot">
+          <p:childTnLst>
+            <p:seq concurrent="1" nextAc="seek">
+              <p:cTn id="2" dur="indefinite" nodeType="mainSeq">
+                <p:childTnLst>
+                  <p:par>
+                    <p:cTn id="3" fill="hold">
+                      <p:stCondLst>
+                        <p:cond delay="indefinite"/>
+                        <p:cond evt="onBegin" delay="0">
+                          <p:tn val="2"/>
+                        </p:cond>
+                      </p:stCondLst>
+                      <p:childTnLst>
+                        <p:par>
+                          <p:cTn id="4" fill="hold">
+                            <p:stCondLst>
+                              <p:cond delay="0"/>
+                            </p:stCondLst>
+                            <p:childTnLst>
+                              <p:par>
+                                <p:cTn id="5" presetID="1" presetClass="entr" presetSubtype="0" fill="hold" grpId="0" nodeType="withEffect">
+                                  <p:stCondLst>
+                                    <p:cond delay="0"/>
+                                  </p:stCondLst>
+                                  <p:childTnLst>
+                                    <p:set>
+                                      <p:cBhvr>
+                                        <p:cTn id="6" dur="1" fill="hold">
+                                          <p:stCondLst>
+                                            <p:cond delay="0"/>
+                                          </p:stCondLst>
+                                        </p:cTn>
+                                        <p:tgtEl>
+                                          <p:spTgt spid="3">
+                                            <p:txEl>
+                                              <p:pRg st="0" end="0"/>
+                                            </p:txEl>
+                                          </p:spTgt>
+                                        </p:tgtEl>
+                                        <p:attrNameLst>
+                                          <p:attrName>style.visibility</p:attrName>
+                                        </p:attrNameLst>
+                                      </p:cBhvr>
+                                      <p:to>
+                                        <p:strVal val="visible"/>
+                                      </p:to>
+                                    </p:set>
+                                  </p:childTnLst>
+                                </p:cTn>
+                              </p:par>
+                              <p:par>
+                                <p:cTn id="7" presetID="1" presetClass="entr" presetSubtype="0" fill="hold" grpId="0" nodeType="withEffect">
+                                  <p:stCondLst>
+                                    <p:cond delay="0"/>
+                                  </p:stCondLst>
+                                  <p:childTnLst>
+                                    <p:set>
+                                      <p:cBhvr>
+                                        <p:cTn id="8" dur="1" fill="hold">
+                                          <p:stCondLst>
+                                            <p:cond delay="0"/>
+                                          </p:stCondLst>
+                                        </p:cTn>
+                                        <p:tgtEl>
+                                          <p:spTgt spid="5"/>
+                                        </p:tgtEl>
+                                        <p:attrNameLst>
+                                          <p:attrName>style.visibility</p:attrName>
+                                        </p:attrNameLst>
+                                      </p:cBhvr>
+                                      <p:to>
+                                        <p:strVal val="visible"/>
+                                      </p:to>
+                                    </p:set>
+                                  </p:childTnLst>
+                                </p:cTn>
+                              </p:par>
+                              <p:par>
+                                <p:cTn id="9" presetID="1" presetClass="entr" presetSubtype="0" fill="hold" grpId="0" nodeType="withEffect">
+                                  <p:stCondLst>
+                                    <p:cond delay="0"/>
+                                  </p:stCondLst>
+                                  <p:childTnLst>
+                                    <p:set>
+                                      <p:cBhvr>
+                                        <p:cTn id="10" dur="1" fill="hold">
+                                          <p:stCondLst>
+                                            <p:cond delay="0"/>
+                                          </p:stCondLst>
+                                        </p:cTn>
+                                        <p:tgtEl>
+                                          <p:spTgt spid="6"/>
+                                        </p:tgtEl>
+                                        <p:attrNameLst>
+                                          <p:attrName>style.visibility</p:attrName>
+                                        </p:attrNameLst>
+                                      </p:cBhvr>
+                                      <p:to>
+                                        <p:strVal val="visible"/>
+                                      </p:to>
+                                    </p:set>
+                                  </p:childTnLst>
+                                </p:cTn>
+                              </p:par>
+                            </p:childTnLst>
+                          </p:cTn>
+                        </p:par>
+                      </p:childTnLst>
+                    </p:cTn>
+                  </p:par>
+                  <p:par>
+                    <p:cTn id="11" fill="hold">
+                      <p:stCondLst>
+                        <p:cond delay="indefinite"/>
+                      </p:stCondLst>
+                      <p:childTnLst>
+                        <p:par>
+                          <p:cTn id="12" fill="hold">
+                            <p:stCondLst>
+                              <p:cond delay="0"/>
+                            </p:stCondLst>
+                            <p:childTnLst>
+                              <p:par>
+                                <p:cTn id="13" presetID="1" presetClass="entr" presetSubtype="0" fill="hold" grpId="0" nodeType="clickEffect">
+                                  <p:stCondLst>
+                                    <p:cond delay="0"/>
+                                  </p:stCondLst>
+                                  <p:childTnLst>
+                                    <p:set>
+                                      <p:cBhvr>
+                                        <p:cTn id="14" dur="1" fill="hold">
+                                          <p:stCondLst>
+                                            <p:cond delay="0"/>
+                                          </p:stCondLst>
+                                        </p:cTn>
+                                        <p:tgtEl>
+                                          <p:spTgt spid="3">
+                                            <p:txEl>
+                                              <p:pRg st="3" end="3"/>
+                                            </p:txEl>
+                                          </p:spTgt>
+                                        </p:tgtEl>
+                                        <p:attrNameLst>
+                                          <p:attrName>style.visibility</p:attrName>
+                                        </p:attrNameLst>
+                                      </p:cBhvr>
+                                      <p:to>
+                                        <p:strVal val="visible"/>
+                                      </p:to>
+                                    </p:set>
+                                  </p:childTnLst>
+                                </p:cTn>
+                              </p:par>
+                              <p:par>
+                                <p:cTn id="15" presetID="1" presetClass="entr" presetSubtype="0" fill="hold" grpId="0" nodeType="withEffect">
+                                  <p:stCondLst>
+                                    <p:cond delay="0"/>
+                                  </p:stCondLst>
+                                  <p:childTnLst>
+                                    <p:set>
+                                      <p:cBhvr>
+                                        <p:cTn id="16" dur="1" fill="hold">
+                                          <p:stCondLst>
+                                            <p:cond delay="0"/>
+                                          </p:stCondLst>
+                                        </p:cTn>
+                                        <p:tgtEl>
+                                          <p:spTgt spid="7"/>
+                                        </p:tgtEl>
+                                        <p:attrNameLst>
+                                          <p:attrName>style.visibility</p:attrName>
+                                        </p:attrNameLst>
+                                      </p:cBhvr>
+                                      <p:to>
+                                        <p:strVal val="visible"/>
+                                      </p:to>
+                                    </p:set>
+                                  </p:childTnLst>
+                                </p:cTn>
+                              </p:par>
+                              <p:par>
+                                <p:cTn id="17" presetID="1" presetClass="entr" presetSubtype="0" fill="hold" grpId="0" nodeType="withEffect">
+                                  <p:stCondLst>
+                                    <p:cond delay="0"/>
+                                  </p:stCondLst>
+                                  <p:childTnLst>
+                                    <p:set>
+                                      <p:cBhvr>
+                                        <p:cTn id="18" dur="1" fill="hold">
+                                          <p:stCondLst>
+                                            <p:cond delay="0"/>
+                                          </p:stCondLst>
+                                        </p:cTn>
+                                        <p:tgtEl>
+                                          <p:spTgt spid="8"/>
+                                        </p:tgtEl>
+                                        <p:attrNameLst>
+                                          <p:attrName>style.visibility</p:attrName>
+                                        </p:attrNameLst>
+                                      </p:cBhvr>
+                                      <p:to>
+                                        <p:strVal val="visible"/>
+                                      </p:to>
+                                    </p:set>
+                                  </p:childTnLst>
+                                </p:cTn>
+                              </p:par>
+                            </p:childTnLst>
+                          </p:cTn>
+                        </p:par>
+                      </p:childTnLst>
+                    </p:cTn>
+                  </p:par>
+                </p:childTnLst>
+              </p:cTn>
+              <p:prevCondLst>
+                <p:cond evt="onPrev" delay="0">
+                  <p:tgtEl>
+                    <p:sldTgt/>
+                  </p:tgtEl>
+                </p:cond>
+              </p:prevCondLst>
+              <p:nextCondLst>
+                <p:cond evt="onNext" delay="0">
+                  <p:tgtEl>
+                    <p:sldTgt/>
+                  </p:tgtEl>
+                </p:cond>
+              </p:nextCondLst>
+            </p:seq>
+          </p:childTnLst>
+        </p:cTn>
+      </p:par>
+    </p:tnLst>
+    <p:bldLst>
+      <p:bldP spid="3" grpId="0" uiExpand="1" build="p"/>
+      <p:bldP spid="5" grpId="0" animBg="1"/>
+      <p:bldP spid="6" grpId="0" animBg="1"/>
+      <p:bldP spid="7" grpId="0" animBg="1"/>
+      <p:bldP spid="8" grpId="0" animBg="1"/>
+    </p:bldLst>
+  </p:timing>
+</p:sld>
+</file>
+
+<file path=ppt/slides/slide18.xml><?xml version="1.0" encoding="utf-8"?>
+<p:sld xmlns:a="http://schemas.openxmlformats.org/drawingml/2006/main" xmlns:r="http://schemas.openxmlformats.org/officeDocument/2006/relationships" xmlns:p="http://schemas.openxmlformats.org/presentationml/2006/main">
+  <p:cSld>
+    <p:spTree>
+      <p:nvGrpSpPr>
+        <p:cNvPr id="1" name=""/>
+        <p:cNvGrpSpPr/>
+        <p:nvPr/>
+      </p:nvGrpSpPr>
+      <p:grpSpPr>
+        <a:xfrm>
+          <a:off x="0" y="0"/>
+          <a:ext cx="0" cy="0"/>
+          <a:chOff x="0" y="0"/>
+          <a:chExt cx="0" cy="0"/>
+        </a:xfrm>
+      </p:grpSpPr>
+      <p:sp>
+        <p:nvSpPr>
+          <p:cNvPr id="2" name="Title 1"/>
+          <p:cNvSpPr>
+            <a:spLocks noGrp="1"/>
+          </p:cNvSpPr>
+          <p:nvPr>
+            <p:ph type="title"/>
+          </p:nvPr>
+        </p:nvSpPr>
+        <p:spPr/>
+        <p:txBody>
+          <a:bodyPr/>
+          <a:lstStyle/>
+          <a:p>
+            <a:r>
+              <a:rPr lang="en-US" dirty="0" smtClean="0"/>
+              <a:t>Large result lists</a:t>
+            </a:r>
+            <a:endParaRPr lang="en-US" dirty="0"/>
+          </a:p>
+        </p:txBody>
+      </p:sp>
+      <p:sp>
+        <p:nvSpPr>
+          <p:cNvPr id="3" name="Content Placeholder 2"/>
+          <p:cNvSpPr>
+            <a:spLocks noGrp="1"/>
+          </p:cNvSpPr>
+          <p:nvPr>
+            <p:ph idx="1"/>
+          </p:nvPr>
+        </p:nvSpPr>
+        <p:spPr/>
+        <p:txBody>
+          <a:bodyPr/>
+          <a:lstStyle/>
+          <a:p>
+            <a:r>
+              <a:rPr lang="en-US" dirty="0" smtClean="0"/>
+              <a:t>Check results based on summary</a:t>
+            </a:r>
+          </a:p>
+          <a:p>
+            <a:endParaRPr lang="en-US" dirty="0"/>
+          </a:p>
+          <a:p>
+            <a:endParaRPr lang="en-US" dirty="0" smtClean="0"/>
+          </a:p>
+          <a:p>
+            <a:endParaRPr lang="en-US" dirty="0"/>
+          </a:p>
+          <a:p>
+            <a:r>
+              <a:rPr lang="en-US" dirty="0" smtClean="0"/>
+              <a:t>Use </a:t>
+            </a:r>
+            <a:r>
+              <a:rPr lang="en-US" dirty="0" err="1" smtClean="0">
+                <a:latin typeface="Courier New" panose="02070309020205020404" pitchFamily="49" charset="0"/>
+                <a:cs typeface="Courier New" panose="02070309020205020404" pitchFamily="49" charset="0"/>
+              </a:rPr>
+              <a:t>epost</a:t>
+            </a:r>
+            <a:r>
+              <a:rPr lang="en-US" dirty="0" smtClean="0">
+                <a:latin typeface="Courier New" panose="02070309020205020404" pitchFamily="49" charset="0"/>
+                <a:cs typeface="Courier New" panose="02070309020205020404" pitchFamily="49" charset="0"/>
+              </a:rPr>
+              <a:t>(…)</a:t>
+            </a:r>
+            <a:r>
+              <a:rPr lang="en-US" dirty="0" smtClean="0"/>
+              <a:t> to upload set of identifiers for future operations</a:t>
+            </a:r>
+          </a:p>
+          <a:p>
+            <a:r>
+              <a:rPr lang="en-US" dirty="0" smtClean="0"/>
+              <a:t>Use </a:t>
+            </a:r>
+            <a:r>
+              <a:rPr lang="en-US" dirty="0" err="1" smtClean="0">
+                <a:latin typeface="Courier New" panose="02070309020205020404" pitchFamily="49" charset="0"/>
+                <a:cs typeface="Courier New" panose="02070309020205020404" pitchFamily="49" charset="0"/>
+              </a:rPr>
+              <a:t>egquery</a:t>
+            </a:r>
+            <a:r>
+              <a:rPr lang="en-US" dirty="0" smtClean="0">
+                <a:latin typeface="Courier New" panose="02070309020205020404" pitchFamily="49" charset="0"/>
+                <a:cs typeface="Courier New" panose="02070309020205020404" pitchFamily="49" charset="0"/>
+              </a:rPr>
+              <a:t>(…)</a:t>
+            </a:r>
+            <a:r>
+              <a:rPr lang="en-US" dirty="0" smtClean="0"/>
+              <a:t> to get result counts on all databases</a:t>
+            </a:r>
+          </a:p>
+          <a:p>
+            <a:r>
+              <a:rPr lang="en-US" dirty="0"/>
+              <a:t>Use </a:t>
+            </a:r>
+            <a:r>
+              <a:rPr lang="en-US" dirty="0" err="1">
+                <a:latin typeface="Courier New" panose="02070309020205020404" pitchFamily="49" charset="0"/>
+                <a:cs typeface="Courier New" panose="02070309020205020404" pitchFamily="49" charset="0"/>
+              </a:rPr>
+              <a:t>WebEnv</a:t>
+            </a:r>
+            <a:r>
+              <a:rPr lang="en-US" dirty="0"/>
+              <a:t> </a:t>
+            </a:r>
+            <a:r>
+              <a:rPr lang="en-US" dirty="0" smtClean="0"/>
+              <a:t>history</a:t>
+            </a:r>
+            <a:endParaRPr lang="en-US" dirty="0"/>
+          </a:p>
+        </p:txBody>
+      </p:sp>
+      <p:sp>
+        <p:nvSpPr>
+          <p:cNvPr id="4" name="Slide Number Placeholder 3"/>
+          <p:cNvSpPr>
+            <a:spLocks noGrp="1"/>
+          </p:cNvSpPr>
+          <p:nvPr>
+            <p:ph type="sldNum" sz="quarter" idx="12"/>
+          </p:nvPr>
+        </p:nvSpPr>
+        <p:spPr/>
+        <p:txBody>
+          <a:bodyPr/>
+          <a:lstStyle/>
+          <a:p>
+            <a:fld id="{CA586AD6-E5F2-4F25-940D-C674496063E2}" type="slidenum">
+              <a:rPr lang="en-US" smtClean="0"/>
+              <a:t>18</a:t>
+            </a:fld>
+            <a:endParaRPr lang="en-US"/>
+          </a:p>
+        </p:txBody>
+      </p:sp>
+      <p:sp>
+        <p:nvSpPr>
+          <p:cNvPr id="5" name="TextBox 4"/>
+          <p:cNvSpPr txBox="1"/>
+          <p:nvPr/>
+        </p:nvSpPr>
+        <p:spPr>
+          <a:xfrm>
+            <a:off x="994062" y="2312821"/>
+            <a:ext cx="7879774" cy="1200329"/>
+          </a:xfrm>
+          <a:prstGeom prst="rect">
+            <a:avLst/>
+          </a:prstGeom>
+          <a:solidFill>
+            <a:schemeClr val="bg1">
+              <a:lumMod val="75000"/>
+            </a:schemeClr>
+          </a:solidFill>
+          <a:ln>
+            <a:solidFill>
+              <a:schemeClr val="tx1"/>
+            </a:solidFill>
+          </a:ln>
+        </p:spPr>
+        <p:txBody>
+          <a:bodyPr wrap="square" rtlCol="0">
+            <a:spAutoFit/>
+          </a:bodyPr>
+          <a:lstStyle/>
+          <a:p>
+            <a:r>
+              <a:rPr lang="en-US" dirty="0" smtClean="0">
+                <a:latin typeface="Courier New" panose="02070309020205020404" pitchFamily="49" charset="0"/>
+                <a:cs typeface="Courier New" panose="02070309020205020404" pitchFamily="49" charset="0"/>
+              </a:rPr>
+              <a:t>for id in </a:t>
+            </a:r>
+            <a:r>
+              <a:rPr lang="en-US" dirty="0" err="1" smtClean="0">
+                <a:latin typeface="Courier New" panose="02070309020205020404" pitchFamily="49" charset="0"/>
+                <a:cs typeface="Courier New" panose="02070309020205020404" pitchFamily="49" charset="0"/>
+              </a:rPr>
+              <a:t>search_record</a:t>
+            </a:r>
+            <a:r>
+              <a:rPr lang="en-US" dirty="0" smtClean="0">
+                <a:latin typeface="Courier New" panose="02070309020205020404" pitchFamily="49" charset="0"/>
+                <a:cs typeface="Courier New" panose="02070309020205020404" pitchFamily="49" charset="0"/>
+              </a:rPr>
+              <a:t>['</a:t>
+            </a:r>
+            <a:r>
+              <a:rPr lang="en-US" dirty="0" err="1" smtClean="0">
+                <a:latin typeface="Courier New" panose="02070309020205020404" pitchFamily="49" charset="0"/>
+                <a:cs typeface="Courier New" panose="02070309020205020404" pitchFamily="49" charset="0"/>
+              </a:rPr>
+              <a:t>IdList</a:t>
+            </a:r>
+            <a:r>
+              <a:rPr lang="en-US" dirty="0" smtClean="0">
+                <a:latin typeface="Courier New" panose="02070309020205020404" pitchFamily="49" charset="0"/>
+                <a:cs typeface="Courier New" panose="02070309020205020404" pitchFamily="49" charset="0"/>
+              </a:rPr>
+              <a:t>']:</a:t>
+            </a:r>
+          </a:p>
+          <a:p>
+            <a:r>
+              <a:rPr lang="en-US" dirty="0">
+                <a:latin typeface="Courier New" panose="02070309020205020404" pitchFamily="49" charset="0"/>
+                <a:cs typeface="Courier New" panose="02070309020205020404" pitchFamily="49" charset="0"/>
+              </a:rPr>
+              <a:t> </a:t>
+            </a:r>
+            <a:r>
+              <a:rPr lang="en-US" dirty="0" smtClean="0">
+                <a:latin typeface="Courier New" panose="02070309020205020404" pitchFamily="49" charset="0"/>
+                <a:cs typeface="Courier New" panose="02070309020205020404" pitchFamily="49" charset="0"/>
+              </a:rPr>
+              <a:t>   </a:t>
+            </a:r>
+            <a:r>
+              <a:rPr lang="en-US" dirty="0" smtClean="0">
+                <a:latin typeface="Courier New" panose="02070309020205020404" pitchFamily="49" charset="0"/>
+                <a:cs typeface="Courier New" panose="02070309020205020404" pitchFamily="49" charset="0"/>
+              </a:rPr>
+              <a:t>handle </a:t>
+            </a:r>
+            <a:r>
+              <a:rPr lang="en-US" dirty="0">
+                <a:latin typeface="Courier New" panose="02070309020205020404" pitchFamily="49" charset="0"/>
+                <a:cs typeface="Courier New" panose="02070309020205020404" pitchFamily="49" charset="0"/>
+              </a:rPr>
+              <a:t>= </a:t>
+            </a:r>
+            <a:r>
+              <a:rPr lang="en-US" dirty="0" err="1" smtClean="0">
+                <a:latin typeface="Courier New" panose="02070309020205020404" pitchFamily="49" charset="0"/>
+                <a:cs typeface="Courier New" panose="02070309020205020404" pitchFamily="49" charset="0"/>
+              </a:rPr>
+              <a:t>Entrez.esummary</a:t>
+            </a:r>
+            <a:r>
+              <a:rPr lang="en-US" dirty="0" smtClean="0">
+                <a:latin typeface="Courier New" panose="02070309020205020404" pitchFamily="49" charset="0"/>
+                <a:cs typeface="Courier New" panose="02070309020205020404" pitchFamily="49" charset="0"/>
+              </a:rPr>
+              <a:t>(</a:t>
+            </a:r>
+            <a:r>
+              <a:rPr lang="en-US" dirty="0" err="1" smtClean="0">
+                <a:latin typeface="Courier New" panose="02070309020205020404" pitchFamily="49" charset="0"/>
+                <a:cs typeface="Courier New" panose="02070309020205020404" pitchFamily="49" charset="0"/>
+              </a:rPr>
+              <a:t>db</a:t>
+            </a:r>
+            <a:r>
+              <a:rPr lang="en-US" dirty="0">
+                <a:latin typeface="Courier New" panose="02070309020205020404" pitchFamily="49" charset="0"/>
+                <a:cs typeface="Courier New" panose="02070309020205020404" pitchFamily="49" charset="0"/>
+              </a:rPr>
+              <a:t>='nucleotide</a:t>
+            </a:r>
+            <a:r>
+              <a:rPr lang="en-US" dirty="0" smtClean="0">
+                <a:latin typeface="Courier New" panose="02070309020205020404" pitchFamily="49" charset="0"/>
+                <a:cs typeface="Courier New" panose="02070309020205020404" pitchFamily="49" charset="0"/>
+              </a:rPr>
+              <a:t>', </a:t>
+            </a:r>
+            <a:r>
+              <a:rPr lang="en-US" dirty="0" smtClean="0">
+                <a:latin typeface="Courier New" panose="02070309020205020404" pitchFamily="49" charset="0"/>
+                <a:cs typeface="Courier New" panose="02070309020205020404" pitchFamily="49" charset="0"/>
+              </a:rPr>
+              <a:t>id=id)</a:t>
+            </a:r>
+            <a:endParaRPr lang="en-US" dirty="0">
+              <a:latin typeface="Courier New" panose="02070309020205020404" pitchFamily="49" charset="0"/>
+              <a:cs typeface="Courier New" panose="02070309020205020404" pitchFamily="49" charset="0"/>
+            </a:endParaRPr>
+          </a:p>
+          <a:p>
+            <a:r>
+              <a:rPr lang="en-US" dirty="0">
+                <a:latin typeface="Courier New" panose="02070309020205020404" pitchFamily="49" charset="0"/>
+                <a:cs typeface="Courier New" panose="02070309020205020404" pitchFamily="49" charset="0"/>
+              </a:rPr>
+              <a:t> </a:t>
+            </a:r>
+            <a:r>
+              <a:rPr lang="en-US" dirty="0" smtClean="0">
+                <a:latin typeface="Courier New" panose="02070309020205020404" pitchFamily="49" charset="0"/>
+                <a:cs typeface="Courier New" panose="02070309020205020404" pitchFamily="49" charset="0"/>
+              </a:rPr>
+              <a:t>   </a:t>
+            </a:r>
+            <a:r>
+              <a:rPr lang="en-US" dirty="0" err="1" smtClean="0">
+                <a:latin typeface="Courier New" panose="02070309020205020404" pitchFamily="49" charset="0"/>
+                <a:cs typeface="Courier New" panose="02070309020205020404" pitchFamily="49" charset="0"/>
+              </a:rPr>
+              <a:t>sum_record</a:t>
+            </a:r>
+            <a:r>
+              <a:rPr lang="en-US" dirty="0" smtClean="0">
+                <a:latin typeface="Courier New" panose="02070309020205020404" pitchFamily="49" charset="0"/>
+                <a:cs typeface="Courier New" panose="02070309020205020404" pitchFamily="49" charset="0"/>
+              </a:rPr>
+              <a:t> = </a:t>
+            </a:r>
+            <a:r>
+              <a:rPr lang="en-US" dirty="0" err="1" smtClean="0">
+                <a:latin typeface="Courier New" panose="02070309020205020404" pitchFamily="49" charset="0"/>
+                <a:cs typeface="Courier New" panose="02070309020205020404" pitchFamily="49" charset="0"/>
+              </a:rPr>
+              <a:t>Entrez.read</a:t>
+            </a:r>
+            <a:r>
+              <a:rPr lang="en-US" dirty="0" smtClean="0">
+                <a:latin typeface="Courier New" panose="02070309020205020404" pitchFamily="49" charset="0"/>
+                <a:cs typeface="Courier New" panose="02070309020205020404" pitchFamily="49" charset="0"/>
+              </a:rPr>
+              <a:t>(</a:t>
+            </a:r>
+            <a:r>
+              <a:rPr lang="en-US" dirty="0" smtClean="0">
+                <a:latin typeface="Courier New" panose="02070309020205020404" pitchFamily="49" charset="0"/>
+                <a:cs typeface="Courier New" panose="02070309020205020404" pitchFamily="49" charset="0"/>
+              </a:rPr>
+              <a:t>handle)</a:t>
+            </a:r>
+          </a:p>
+          <a:p>
+            <a:r>
+              <a:rPr lang="en-US" dirty="0">
+                <a:latin typeface="Courier New" panose="02070309020205020404" pitchFamily="49" charset="0"/>
+                <a:cs typeface="Courier New" panose="02070309020205020404" pitchFamily="49" charset="0"/>
+              </a:rPr>
+              <a:t> </a:t>
+            </a:r>
+            <a:r>
+              <a:rPr lang="en-US" dirty="0" smtClean="0">
+                <a:latin typeface="Courier New" panose="02070309020205020404" pitchFamily="49" charset="0"/>
+                <a:cs typeface="Courier New" panose="02070309020205020404" pitchFamily="49" charset="0"/>
+              </a:rPr>
+              <a:t>   print('{0}: {1}'.format(id, </a:t>
+            </a:r>
+            <a:r>
+              <a:rPr lang="en-US" dirty="0" err="1" smtClean="0">
+                <a:latin typeface="Courier New" panose="02070309020205020404" pitchFamily="49" charset="0"/>
+                <a:cs typeface="Courier New" panose="02070309020205020404" pitchFamily="49" charset="0"/>
+              </a:rPr>
+              <a:t>sum_record</a:t>
+            </a:r>
+            <a:r>
+              <a:rPr lang="en-US" dirty="0" smtClean="0">
+                <a:latin typeface="Courier New" panose="02070309020205020404" pitchFamily="49" charset="0"/>
+                <a:cs typeface="Courier New" panose="02070309020205020404" pitchFamily="49" charset="0"/>
+              </a:rPr>
+              <a:t>[0]['Title']))</a:t>
+            </a:r>
+            <a:endParaRPr lang="en-US" dirty="0" smtClean="0">
+              <a:latin typeface="Courier New" panose="02070309020205020404" pitchFamily="49" charset="0"/>
+              <a:cs typeface="Courier New" panose="02070309020205020404" pitchFamily="49" charset="0"/>
+            </a:endParaRPr>
+          </a:p>
+        </p:txBody>
+      </p:sp>
+    </p:spTree>
+    <p:extLst>
+      <p:ext uri="{BB962C8B-B14F-4D97-AF65-F5344CB8AC3E}">
+        <p14:creationId xmlns:p14="http://schemas.microsoft.com/office/powerpoint/2010/main" val="455583433"/>
+      </p:ext>
+    </p:extLst>
+  </p:cSld>
+  <p:clrMapOvr>
+    <a:masterClrMapping/>
+  </p:clrMapOvr>
+  <p:timing>
+    <p:tnLst>
+      <p:par>
+        <p:cTn id="1" dur="indefinite" restart="never" nodeType="tmRoot">
+          <p:childTnLst>
+            <p:seq concurrent="1" nextAc="seek">
+              <p:cTn id="2" dur="indefinite" nodeType="mainSeq">
+                <p:childTnLst>
+                  <p:par>
+                    <p:cTn id="3" fill="hold">
+                      <p:stCondLst>
+                        <p:cond delay="indefinite"/>
+                        <p:cond evt="onBegin" delay="0">
+                          <p:tn val="2"/>
+                        </p:cond>
+                      </p:stCondLst>
+                      <p:childTnLst>
+                        <p:par>
+                          <p:cTn id="4" fill="hold">
+                            <p:stCondLst>
+                              <p:cond delay="0"/>
+                            </p:stCondLst>
+                            <p:childTnLst>
+                              <p:par>
+                                <p:cTn id="5" presetID="1" presetClass="entr" presetSubtype="0" fill="hold" grpId="0" nodeType="withEffect">
+                                  <p:stCondLst>
+                                    <p:cond delay="0"/>
+                                  </p:stCondLst>
+                                  <p:childTnLst>
+                                    <p:set>
+                                      <p:cBhvr>
+                                        <p:cTn id="6" dur="1" fill="hold">
+                                          <p:stCondLst>
+                                            <p:cond delay="0"/>
+                                          </p:stCondLst>
+                                        </p:cTn>
+                                        <p:tgtEl>
+                                          <p:spTgt spid="3">
+                                            <p:txEl>
+                                              <p:pRg st="0" end="0"/>
+                                            </p:txEl>
+                                          </p:spTgt>
+                                        </p:tgtEl>
+                                        <p:attrNameLst>
+                                          <p:attrName>style.visibility</p:attrName>
+                                        </p:attrNameLst>
+                                      </p:cBhvr>
+                                      <p:to>
+                                        <p:strVal val="visible"/>
+                                      </p:to>
+                                    </p:set>
+                                  </p:childTnLst>
+                                </p:cTn>
+                              </p:par>
+                              <p:par>
+                                <p:cTn id="7" presetID="1" presetClass="entr" presetSubtype="0" fill="hold" grpId="0" nodeType="withEffect">
+                                  <p:stCondLst>
+                                    <p:cond delay="0"/>
+                                  </p:stCondLst>
+                                  <p:childTnLst>
+                                    <p:set>
+                                      <p:cBhvr>
+                                        <p:cTn id="8" dur="1" fill="hold">
+                                          <p:stCondLst>
+                                            <p:cond delay="0"/>
+                                          </p:stCondLst>
+                                        </p:cTn>
+                                        <p:tgtEl>
+                                          <p:spTgt spid="5"/>
+                                        </p:tgtEl>
+                                        <p:attrNameLst>
+                                          <p:attrName>style.visibility</p:attrName>
+                                        </p:attrNameLst>
+                                      </p:cBhvr>
+                                      <p:to>
+                                        <p:strVal val="visible"/>
+                                      </p:to>
+                                    </p:set>
+                                  </p:childTnLst>
+                                </p:cTn>
+                              </p:par>
+                            </p:childTnLst>
+                          </p:cTn>
+                        </p:par>
+                      </p:childTnLst>
+                    </p:cTn>
+                  </p:par>
+                  <p:par>
+                    <p:cTn id="9" fill="hold">
+                      <p:stCondLst>
+                        <p:cond delay="indefinite"/>
+                      </p:stCondLst>
+                      <p:childTnLst>
+                        <p:par>
+                          <p:cTn id="10" fill="hold">
+                            <p:stCondLst>
+                              <p:cond delay="0"/>
+                            </p:stCondLst>
+                            <p:childTnLst>
+                              <p:par>
+                                <p:cTn id="11" presetID="1" presetClass="entr" presetSubtype="0" fill="hold" grpId="0" nodeType="clickEffect">
+                                  <p:stCondLst>
+                                    <p:cond delay="0"/>
+                                  </p:stCondLst>
+                                  <p:childTnLst>
+                                    <p:set>
+                                      <p:cBhvr>
+                                        <p:cTn id="12" dur="1" fill="hold">
+                                          <p:stCondLst>
+                                            <p:cond delay="0"/>
+                                          </p:stCondLst>
+                                        </p:cTn>
+                                        <p:tgtEl>
+                                          <p:spTgt spid="3">
+                                            <p:txEl>
+                                              <p:pRg st="4" end="4"/>
+                                            </p:txEl>
+                                          </p:spTgt>
+                                        </p:tgtEl>
+                                        <p:attrNameLst>
+                                          <p:attrName>style.visibility</p:attrName>
+                                        </p:attrNameLst>
+                                      </p:cBhvr>
+                                      <p:to>
+                                        <p:strVal val="visible"/>
+                                      </p:to>
+                                    </p:set>
+                                  </p:childTnLst>
+                                </p:cTn>
+                              </p:par>
+                            </p:childTnLst>
+                          </p:cTn>
+                        </p:par>
+                      </p:childTnLst>
+                    </p:cTn>
+                  </p:par>
+                  <p:par>
+                    <p:cTn id="13" fill="hold">
+                      <p:stCondLst>
+                        <p:cond delay="indefinite"/>
+                      </p:stCondLst>
+                      <p:childTnLst>
+                        <p:par>
+                          <p:cTn id="14" fill="hold">
+                            <p:stCondLst>
+                              <p:cond delay="0"/>
+                            </p:stCondLst>
+                            <p:childTnLst>
+                              <p:par>
+                                <p:cTn id="15" presetID="1" presetClass="entr" presetSubtype="0" fill="hold" grpId="0" nodeType="clickEffect">
+                                  <p:stCondLst>
+                                    <p:cond delay="0"/>
+                                  </p:stCondLst>
+                                  <p:childTnLst>
+                                    <p:set>
+                                      <p:cBhvr>
+                                        <p:cTn id="16" dur="1" fill="hold">
+                                          <p:stCondLst>
+                                            <p:cond delay="0"/>
+                                          </p:stCondLst>
+                                        </p:cTn>
+                                        <p:tgtEl>
+                                          <p:spTgt spid="3">
+                                            <p:txEl>
+                                              <p:pRg st="5" end="5"/>
+                                            </p:txEl>
+                                          </p:spTgt>
+                                        </p:tgtEl>
+                                        <p:attrNameLst>
+                                          <p:attrName>style.visibility</p:attrName>
+                                        </p:attrNameLst>
+                                      </p:cBhvr>
+                                      <p:to>
+                                        <p:strVal val="visible"/>
+                                      </p:to>
+                                    </p:set>
+                                  </p:childTnLst>
+                                </p:cTn>
+                              </p:par>
+                            </p:childTnLst>
+                          </p:cTn>
+                        </p:par>
+                      </p:childTnLst>
+                    </p:cTn>
+                  </p:par>
+                  <p:par>
+                    <p:cTn id="17" fill="hold">
+                      <p:stCondLst>
+                        <p:cond delay="indefinite"/>
+                      </p:stCondLst>
+                      <p:childTnLst>
+                        <p:par>
+                          <p:cTn id="18" fill="hold">
+                            <p:stCondLst>
+                              <p:cond delay="0"/>
+                            </p:stCondLst>
+                            <p:childTnLst>
+                              <p:par>
+                                <p:cTn id="19" presetID="1" presetClass="entr" presetSubtype="0" fill="hold" grpId="0" nodeType="clickEffect">
+                                  <p:stCondLst>
+                                    <p:cond delay="0"/>
+                                  </p:stCondLst>
+                                  <p:childTnLst>
+                                    <p:set>
+                                      <p:cBhvr>
+                                        <p:cTn id="20" dur="1" fill="hold">
+                                          <p:stCondLst>
+                                            <p:cond delay="0"/>
+                                          </p:stCondLst>
+                                        </p:cTn>
+                                        <p:tgtEl>
+                                          <p:spTgt spid="3">
+                                            <p:txEl>
+                                              <p:pRg st="6" end="6"/>
+                                            </p:txEl>
+                                          </p:spTgt>
+                                        </p:tgtEl>
+                                        <p:attrNameLst>
+                                          <p:attrName>style.visibility</p:attrName>
+                                        </p:attrNameLst>
+                                      </p:cBhvr>
+                                      <p:to>
+                                        <p:strVal val="visible"/>
+                                      </p:to>
+                                    </p:set>
+                                  </p:childTnLst>
+                                </p:cTn>
+                              </p:par>
+                            </p:childTnLst>
+                          </p:cTn>
+                        </p:par>
+                      </p:childTnLst>
+                    </p:cTn>
+                  </p:par>
+                </p:childTnLst>
+              </p:cTn>
+              <p:prevCondLst>
+                <p:cond evt="onPrev" delay="0">
+                  <p:tgtEl>
+                    <p:sldTgt/>
+                  </p:tgtEl>
+                </p:cond>
+              </p:prevCondLst>
+              <p:nextCondLst>
+                <p:cond evt="onNext" delay="0">
+                  <p:tgtEl>
+                    <p:sldTgt/>
+                  </p:tgtEl>
+                </p:cond>
+              </p:nextCondLst>
+            </p:seq>
+          </p:childTnLst>
+        </p:cTn>
+      </p:par>
+    </p:tnLst>
+    <p:bldLst>
+      <p:bldP spid="3" grpId="0" uiExpand="1" build="p"/>
+      <p:bldP spid="5" grpId="0" animBg="1"/>
+    </p:bldLst>
   </p:timing>
 </p:sld>
 </file>
@@ -7597,33 +10388,15 @@
                                   </p:childTnLst>
                                 </p:cTn>
                               </p:par>
-                            </p:childTnLst>
-                          </p:cTn>
-                        </p:par>
-                      </p:childTnLst>
-                    </p:cTn>
-                  </p:par>
-                  <p:par>
-                    <p:cTn id="7" fill="hold">
-                      <p:stCondLst>
-                        <p:cond delay="indefinite"/>
-                      </p:stCondLst>
-                      <p:childTnLst>
-                        <p:par>
-                          <p:cTn id="8" fill="hold">
-                            <p:stCondLst>
-                              <p:cond delay="0"/>
-                            </p:stCondLst>
-                            <p:childTnLst>
                               <p:par>
-                                <p:cTn id="9" presetID="1" presetClass="entr" presetSubtype="0" fill="hold" grpId="0" nodeType="clickEffect">
+                                <p:cTn id="7" presetID="1" presetClass="entr" presetSubtype="0" fill="hold" grpId="0" nodeType="withEffect">
                                   <p:stCondLst>
                                     <p:cond delay="0"/>
                                   </p:stCondLst>
                                   <p:childTnLst>
                                     <p:set>
                                       <p:cBhvr>
-                                        <p:cTn id="10" dur="1" fill="hold">
+                                        <p:cTn id="8" dur="1" fill="hold">
                                           <p:stCondLst>
                                             <p:cond delay="0"/>
                                           </p:stCondLst>
@@ -7649,26 +10422,26 @@
                     </p:cTn>
                   </p:par>
                   <p:par>
-                    <p:cTn id="11" fill="hold">
+                    <p:cTn id="9" fill="hold">
                       <p:stCondLst>
                         <p:cond delay="indefinite"/>
                       </p:stCondLst>
                       <p:childTnLst>
                         <p:par>
-                          <p:cTn id="12" fill="hold">
+                          <p:cTn id="10" fill="hold">
                             <p:stCondLst>
                               <p:cond delay="0"/>
                             </p:stCondLst>
                             <p:childTnLst>
                               <p:par>
-                                <p:cTn id="13" presetID="1" presetClass="entr" presetSubtype="0" fill="hold" grpId="0" nodeType="clickEffect">
+                                <p:cTn id="11" presetID="1" presetClass="entr" presetSubtype="0" fill="hold" grpId="0" nodeType="clickEffect">
                                   <p:stCondLst>
                                     <p:cond delay="0"/>
                                   </p:stCondLst>
                                   <p:childTnLst>
                                     <p:set>
                                       <p:cBhvr>
-                                        <p:cTn id="14" dur="1" fill="hold">
+                                        <p:cTn id="12" dur="1" fill="hold">
                                           <p:stCondLst>
                                             <p:cond delay="0"/>
                                           </p:stCondLst>
@@ -7692,14 +10465,14 @@
                                 </p:cTn>
                               </p:par>
                               <p:par>
-                                <p:cTn id="15" presetID="1" presetClass="entr" presetSubtype="0" fill="hold" grpId="0" nodeType="withEffect">
+                                <p:cTn id="13" presetID="1" presetClass="entr" presetSubtype="0" fill="hold" grpId="0" nodeType="withEffect">
                                   <p:stCondLst>
                                     <p:cond delay="0"/>
                                   </p:stCondLst>
                                   <p:childTnLst>
                                     <p:set>
                                       <p:cBhvr>
-                                        <p:cTn id="16" dur="1" fill="hold">
+                                        <p:cTn id="14" dur="1" fill="hold">
                                           <p:stCondLst>
                                             <p:cond delay="0"/>
                                           </p:stCondLst>
@@ -7725,26 +10498,26 @@
                     </p:cTn>
                   </p:par>
                   <p:par>
-                    <p:cTn id="17" fill="hold">
+                    <p:cTn id="15" fill="hold">
                       <p:stCondLst>
                         <p:cond delay="indefinite"/>
                       </p:stCondLst>
                       <p:childTnLst>
                         <p:par>
-                          <p:cTn id="18" fill="hold">
+                          <p:cTn id="16" fill="hold">
                             <p:stCondLst>
                               <p:cond delay="0"/>
                             </p:stCondLst>
                             <p:childTnLst>
                               <p:par>
-                                <p:cTn id="19" presetID="1" presetClass="entr" presetSubtype="0" fill="hold" grpId="0" nodeType="clickEffect">
+                                <p:cTn id="17" presetID="1" presetClass="entr" presetSubtype="0" fill="hold" grpId="0" nodeType="clickEffect">
                                   <p:stCondLst>
                                     <p:cond delay="0"/>
                                   </p:stCondLst>
                                   <p:childTnLst>
                                     <p:set>
                                       <p:cBhvr>
-                                        <p:cTn id="20" dur="1" fill="hold">
+                                        <p:cTn id="18" dur="1" fill="hold">
                                           <p:stCondLst>
                                             <p:cond delay="0"/>
                                           </p:stCondLst>
@@ -7768,14 +10541,14 @@
                                 </p:cTn>
                               </p:par>
                               <p:par>
-                                <p:cTn id="21" presetID="1" presetClass="entr" presetSubtype="0" fill="hold" grpId="0" nodeType="withEffect">
+                                <p:cTn id="19" presetID="1" presetClass="entr" presetSubtype="0" fill="hold" grpId="0" nodeType="withEffect">
                                   <p:stCondLst>
                                     <p:cond delay="0"/>
                                   </p:stCondLst>
                                   <p:childTnLst>
                                     <p:set>
                                       <p:cBhvr>
-                                        <p:cTn id="22" dur="1" fill="hold">
+                                        <p:cTn id="20" dur="1" fill="hold">
                                           <p:stCondLst>
                                             <p:cond delay="0"/>
                                           </p:stCondLst>
@@ -7801,26 +10574,26 @@
                     </p:cTn>
                   </p:par>
                   <p:par>
-                    <p:cTn id="23" fill="hold">
+                    <p:cTn id="21" fill="hold">
                       <p:stCondLst>
                         <p:cond delay="indefinite"/>
                       </p:stCondLst>
                       <p:childTnLst>
                         <p:par>
-                          <p:cTn id="24" fill="hold">
+                          <p:cTn id="22" fill="hold">
                             <p:stCondLst>
                               <p:cond delay="0"/>
                             </p:stCondLst>
                             <p:childTnLst>
                               <p:par>
-                                <p:cTn id="25" presetID="1" presetClass="entr" presetSubtype="0" fill="hold" grpId="0" nodeType="clickEffect">
+                                <p:cTn id="23" presetID="1" presetClass="entr" presetSubtype="0" fill="hold" grpId="0" nodeType="clickEffect">
                                   <p:stCondLst>
                                     <p:cond delay="0"/>
                                   </p:stCondLst>
                                   <p:childTnLst>
                                     <p:set>
                                       <p:cBhvr>
-                                        <p:cTn id="26" dur="1" fill="hold">
+                                        <p:cTn id="24" dur="1" fill="hold">
                                           <p:stCondLst>
                                             <p:cond delay="0"/>
                                           </p:stCondLst>
@@ -7974,7 +10747,6 @@
               <a:rPr lang="en-US" dirty="0" smtClean="0"/>
               <a:t>features</a:t>
             </a:r>
-            <a:endParaRPr lang="en-US" dirty="0" smtClean="0"/>
           </a:p>
           <a:p>
             <a:endParaRPr lang="en-US" dirty="0"/>
@@ -9102,6 +11874,33 @@
                                   </p:childTnLst>
                                 </p:cTn>
                               </p:par>
+                              <p:par>
+                                <p:cTn id="15" presetID="1" presetClass="entr" presetSubtype="0" fill="hold" grpId="0" nodeType="withEffect">
+                                  <p:stCondLst>
+                                    <p:cond delay="0"/>
+                                  </p:stCondLst>
+                                  <p:childTnLst>
+                                    <p:set>
+                                      <p:cBhvr>
+                                        <p:cTn id="16" dur="1" fill="hold">
+                                          <p:stCondLst>
+                                            <p:cond delay="0"/>
+                                          </p:stCondLst>
+                                        </p:cTn>
+                                        <p:tgtEl>
+                                          <p:spTgt spid="4"/>
+                                        </p:tgtEl>
+                                        <p:attrNameLst>
+                                          <p:attrName>style.visibility</p:attrName>
+                                        </p:attrNameLst>
+                                      </p:cBhvr>
+                                      <p:to>
+                                        <p:strVal val="visible"/>
+                                      </p:to>
+                                    </p:set>
+                                  </p:childTnLst>
+                                </p:cTn>
+                              </p:par>
                             </p:childTnLst>
                           </p:cTn>
                         </p:par>
@@ -9109,26 +11908,26 @@
                     </p:cTn>
                   </p:par>
                   <p:par>
-                    <p:cTn id="15" fill="hold">
+                    <p:cTn id="17" fill="hold">
                       <p:stCondLst>
                         <p:cond delay="indefinite"/>
                       </p:stCondLst>
                       <p:childTnLst>
                         <p:par>
-                          <p:cTn id="16" fill="hold">
+                          <p:cTn id="18" fill="hold">
                             <p:stCondLst>
                               <p:cond delay="0"/>
                             </p:stCondLst>
                             <p:childTnLst>
                               <p:par>
-                                <p:cTn id="17" presetID="1" presetClass="entr" presetSubtype="0" fill="hold" grpId="0" nodeType="clickEffect">
+                                <p:cTn id="19" presetID="1" presetClass="entr" presetSubtype="0" fill="hold" grpId="0" nodeType="clickEffect">
                                   <p:stCondLst>
                                     <p:cond delay="0"/>
                                   </p:stCondLst>
                                   <p:childTnLst>
                                     <p:set>
                                       <p:cBhvr>
-                                        <p:cTn id="18" dur="1" fill="hold">
+                                        <p:cTn id="20" dur="1" fill="hold">
                                           <p:stCondLst>
                                             <p:cond delay="0"/>
                                           </p:stCondLst>
@@ -9151,26 +11950,8 @@
                                   </p:childTnLst>
                                 </p:cTn>
                               </p:par>
-                            </p:childTnLst>
-                          </p:cTn>
-                        </p:par>
-                      </p:childTnLst>
-                    </p:cTn>
-                  </p:par>
-                  <p:par>
-                    <p:cTn id="19" fill="hold">
-                      <p:stCondLst>
-                        <p:cond delay="indefinite"/>
-                      </p:stCondLst>
-                      <p:childTnLst>
-                        <p:par>
-                          <p:cTn id="20" fill="hold">
-                            <p:stCondLst>
-                              <p:cond delay="0"/>
-                            </p:stCondLst>
-                            <p:childTnLst>
                               <p:par>
-                                <p:cTn id="21" presetID="1" presetClass="entr" presetSubtype="0" fill="hold" grpId="0" nodeType="clickEffect">
+                                <p:cTn id="21" presetID="1" presetClass="entr" presetSubtype="0" fill="hold" grpId="0" nodeType="withEffect">
                                   <p:stCondLst>
                                     <p:cond delay="0"/>
                                   </p:stCondLst>
@@ -9183,11 +11964,7 @@
                                           </p:stCondLst>
                                         </p:cTn>
                                         <p:tgtEl>
-                                          <p:spTgt spid="3">
-                                            <p:txEl>
-                                              <p:pRg st="9" end="9"/>
-                                            </p:txEl>
-                                          </p:spTgt>
+                                          <p:spTgt spid="15"/>
                                         </p:tgtEl>
                                         <p:attrNameLst>
                                           <p:attrName>style.visibility</p:attrName>
@@ -9200,35 +11977,26 @@
                                   </p:childTnLst>
                                 </p:cTn>
                               </p:par>
+                            </p:childTnLst>
+                          </p:cTn>
+                        </p:par>
+                      </p:childTnLst>
+                    </p:cTn>
+                  </p:par>
+                  <p:par>
+                    <p:cTn id="23" fill="hold">
+                      <p:stCondLst>
+                        <p:cond delay="indefinite"/>
+                      </p:stCondLst>
+                      <p:childTnLst>
+                        <p:par>
+                          <p:cTn id="24" fill="hold">
+                            <p:stCondLst>
+                              <p:cond delay="0"/>
+                            </p:stCondLst>
+                            <p:childTnLst>
                               <p:par>
-                                <p:cTn id="23" presetID="1" presetClass="entr" presetSubtype="0" fill="hold" grpId="0" nodeType="withEffect">
-                                  <p:stCondLst>
-                                    <p:cond delay="0"/>
-                                  </p:stCondLst>
-                                  <p:childTnLst>
-                                    <p:set>
-                                      <p:cBhvr>
-                                        <p:cTn id="24" dur="1" fill="hold">
-                                          <p:stCondLst>
-                                            <p:cond delay="0"/>
-                                          </p:stCondLst>
-                                        </p:cTn>
-                                        <p:tgtEl>
-                                          <p:spTgt spid="4"/>
-                                        </p:tgtEl>
-                                        <p:attrNameLst>
-                                          <p:attrName>style.visibility</p:attrName>
-                                        </p:attrNameLst>
-                                      </p:cBhvr>
-                                      <p:to>
-                                        <p:strVal val="visible"/>
-                                      </p:to>
-                                    </p:set>
-                                  </p:childTnLst>
-                                </p:cTn>
-                              </p:par>
-                              <p:par>
-                                <p:cTn id="25" presetID="1" presetClass="entr" presetSubtype="0" fill="hold" grpId="0" nodeType="withEffect">
+                                <p:cTn id="25" presetID="1" presetClass="entr" presetSubtype="0" fill="hold" nodeType="clickEffect">
                                   <p:stCondLst>
                                     <p:cond delay="0"/>
                                   </p:stCondLst>
@@ -9241,7 +12009,7 @@
                                           </p:stCondLst>
                                         </p:cTn>
                                         <p:tgtEl>
-                                          <p:spTgt spid="15"/>
+                                          <p:spTgt spid="16"/>
                                         </p:tgtEl>
                                         <p:attrNameLst>
                                           <p:attrName>style.visibility</p:attrName>
@@ -9273,7 +12041,7 @@
                             </p:stCondLst>
                             <p:childTnLst>
                               <p:par>
-                                <p:cTn id="29" presetID="1" presetClass="entr" presetSubtype="0" fill="hold" nodeType="clickEffect">
+                                <p:cTn id="29" presetID="1" presetClass="entr" presetSubtype="0" fill="hold" grpId="0" nodeType="clickEffect">
                                   <p:stCondLst>
                                     <p:cond delay="0"/>
                                   </p:stCondLst>
@@ -9286,7 +12054,11 @@
                                           </p:stCondLst>
                                         </p:cTn>
                                         <p:tgtEl>
-                                          <p:spTgt spid="16"/>
+                                          <p:spTgt spid="3">
+                                            <p:txEl>
+                                              <p:pRg st="9" end="9"/>
+                                            </p:txEl>
+                                          </p:spTgt>
                                         </p:tgtEl>
                                         <p:attrNameLst>
                                           <p:attrName>style.visibility</p:attrName>
@@ -10374,7 +13146,11 @@
                                           </p:stCondLst>
                                         </p:cTn>
                                         <p:tgtEl>
-                                          <p:spTgt spid="5"/>
+                                          <p:spTgt spid="3">
+                                            <p:txEl>
+                                              <p:pRg st="0" end="0"/>
+                                            </p:txEl>
+                                          </p:spTgt>
                                         </p:tgtEl>
                                         <p:attrNameLst>
                                           <p:attrName>style.visibility</p:attrName>
@@ -10401,7 +13177,7 @@
                                           </p:stCondLst>
                                         </p:cTn>
                                         <p:tgtEl>
-                                          <p:spTgt spid="6"/>
+                                          <p:spTgt spid="12"/>
                                         </p:tgtEl>
                                         <p:attrNameLst>
                                           <p:attrName>style.visibility</p:attrName>
@@ -10446,7 +13222,7 @@
                                           </p:stCondLst>
                                         </p:cTn>
                                         <p:tgtEl>
-                                          <p:spTgt spid="7"/>
+                                          <p:spTgt spid="15"/>
                                         </p:tgtEl>
                                         <p:attrNameLst>
                                           <p:attrName>style.visibility</p:attrName>
@@ -10491,7 +13267,11 @@
                                           </p:stCondLst>
                                         </p:cTn>
                                         <p:tgtEl>
-                                          <p:spTgt spid="10"/>
+                                          <p:spTgt spid="3">
+                                            <p:txEl>
+                                              <p:pRg st="2" end="2"/>
+                                            </p:txEl>
+                                          </p:spTgt>
                                         </p:tgtEl>
                                         <p:attrNameLst>
                                           <p:attrName>style.visibility</p:attrName>
@@ -10518,34 +13298,7 @@
                                           </p:stCondLst>
                                         </p:cTn>
                                         <p:tgtEl>
-                                          <p:spTgt spid="12"/>
-                                        </p:tgtEl>
-                                        <p:attrNameLst>
-                                          <p:attrName>style.visibility</p:attrName>
-                                        </p:attrNameLst>
-                                      </p:cBhvr>
-                                      <p:to>
-                                        <p:strVal val="visible"/>
-                                      </p:to>
-                                    </p:set>
-                                  </p:childTnLst>
-                                </p:cTn>
-                              </p:par>
-                              <p:par>
-                                <p:cTn id="19" presetID="1" presetClass="entr" presetSubtype="0" fill="hold" grpId="0" nodeType="withEffect">
-                                  <p:stCondLst>
-                                    <p:cond delay="0"/>
-                                  </p:stCondLst>
-                                  <p:childTnLst>
-                                    <p:set>
-                                      <p:cBhvr>
-                                        <p:cTn id="20" dur="1" fill="hold">
-                                          <p:stCondLst>
-                                            <p:cond delay="0"/>
-                                          </p:stCondLst>
-                                        </p:cTn>
-                                        <p:tgtEl>
-                                          <p:spTgt spid="13"/>
+                                          <p:spTgt spid="5"/>
                                         </p:tgtEl>
                                         <p:attrNameLst>
                                           <p:attrName>style.visibility</p:attrName>
@@ -10565,32 +13318,32 @@
                     </p:cTn>
                   </p:par>
                   <p:par>
-                    <p:cTn id="21" fill="hold">
+                    <p:cTn id="19" fill="hold">
                       <p:stCondLst>
                         <p:cond delay="indefinite"/>
                       </p:stCondLst>
                       <p:childTnLst>
                         <p:par>
-                          <p:cTn id="22" fill="hold">
+                          <p:cTn id="20" fill="hold">
                             <p:stCondLst>
                               <p:cond delay="0"/>
                             </p:stCondLst>
                             <p:childTnLst>
                               <p:par>
-                                <p:cTn id="23" presetID="1" presetClass="entr" presetSubtype="0" fill="hold" nodeType="clickEffect">
+                                <p:cTn id="21" presetID="1" presetClass="entr" presetSubtype="0" fill="hold" nodeType="clickEffect">
                                   <p:stCondLst>
                                     <p:cond delay="0"/>
                                   </p:stCondLst>
                                   <p:childTnLst>
                                     <p:set>
                                       <p:cBhvr>
-                                        <p:cTn id="24" dur="1" fill="hold">
+                                        <p:cTn id="22" dur="1" fill="hold">
                                           <p:stCondLst>
                                             <p:cond delay="0"/>
                                           </p:stCondLst>
                                         </p:cTn>
                                         <p:tgtEl>
-                                          <p:spTgt spid="15"/>
+                                          <p:spTgt spid="18"/>
                                         </p:tgtEl>
                                         <p:attrNameLst>
                                           <p:attrName>style.visibility</p:attrName>
@@ -10610,19 +13363,50 @@
                     </p:cTn>
                   </p:par>
                   <p:par>
-                    <p:cTn id="25" fill="hold">
+                    <p:cTn id="23" fill="hold">
                       <p:stCondLst>
                         <p:cond delay="indefinite"/>
                       </p:stCondLst>
                       <p:childTnLst>
                         <p:par>
-                          <p:cTn id="26" fill="hold">
+                          <p:cTn id="24" fill="hold">
                             <p:stCondLst>
                               <p:cond delay="0"/>
                             </p:stCondLst>
                             <p:childTnLst>
                               <p:par>
-                                <p:cTn id="27" presetID="1" presetClass="entr" presetSubtype="0" fill="hold" nodeType="clickEffect">
+                                <p:cTn id="25" presetID="1" presetClass="entr" presetSubtype="0" fill="hold" grpId="0" nodeType="clickEffect">
+                                  <p:stCondLst>
+                                    <p:cond delay="0"/>
+                                  </p:stCondLst>
+                                  <p:childTnLst>
+                                    <p:set>
+                                      <p:cBhvr>
+                                        <p:cTn id="26" dur="1" fill="hold">
+                                          <p:stCondLst>
+                                            <p:cond delay="0"/>
+                                          </p:stCondLst>
+                                        </p:cTn>
+                                        <p:tgtEl>
+                                          <p:spTgt spid="3">
+                                            <p:txEl>
+                                              <p:pRg st="4" end="4"/>
+                                            </p:txEl>
+                                          </p:spTgt>
+                                        </p:tgtEl>
+                                        <p:attrNameLst>
+                                          <p:attrName>style.visibility</p:attrName>
+                                        </p:attrNameLst>
+                                      </p:cBhvr>
+                                      <p:to>
+                                        <p:strVal val="visible"/>
+                                      </p:to>
+                                    </p:set>
+                                  </p:childTnLst>
+                                </p:cTn>
+                              </p:par>
+                              <p:par>
+                                <p:cTn id="27" presetID="1" presetClass="entr" presetSubtype="0" fill="hold" grpId="0" nodeType="withEffect">
                                   <p:stCondLst>
                                     <p:cond delay="0"/>
                                   </p:stCondLst>
@@ -10635,7 +13419,7 @@
                                           </p:stCondLst>
                                         </p:cTn>
                                         <p:tgtEl>
-                                          <p:spTgt spid="18"/>
+                                          <p:spTgt spid="6"/>
                                         </p:tgtEl>
                                         <p:attrNameLst>
                                           <p:attrName>style.visibility</p:attrName>
@@ -10680,6 +13464,172 @@
                                           </p:stCondLst>
                                         </p:cTn>
                                         <p:tgtEl>
+                                          <p:spTgt spid="7"/>
+                                        </p:tgtEl>
+                                        <p:attrNameLst>
+                                          <p:attrName>style.visibility</p:attrName>
+                                        </p:attrNameLst>
+                                      </p:cBhvr>
+                                      <p:to>
+                                        <p:strVal val="visible"/>
+                                      </p:to>
+                                    </p:set>
+                                  </p:childTnLst>
+                                </p:cTn>
+                              </p:par>
+                            </p:childTnLst>
+                          </p:cTn>
+                        </p:par>
+                      </p:childTnLst>
+                    </p:cTn>
+                  </p:par>
+                  <p:par>
+                    <p:cTn id="33" fill="hold">
+                      <p:stCondLst>
+                        <p:cond delay="indefinite"/>
+                      </p:stCondLst>
+                      <p:childTnLst>
+                        <p:par>
+                          <p:cTn id="34" fill="hold">
+                            <p:stCondLst>
+                              <p:cond delay="0"/>
+                            </p:stCondLst>
+                            <p:childTnLst>
+                              <p:par>
+                                <p:cTn id="35" presetID="1" presetClass="entr" presetSubtype="0" fill="hold" grpId="0" nodeType="clickEffect">
+                                  <p:stCondLst>
+                                    <p:cond delay="0"/>
+                                  </p:stCondLst>
+                                  <p:childTnLst>
+                                    <p:set>
+                                      <p:cBhvr>
+                                        <p:cTn id="36" dur="1" fill="hold">
+                                          <p:stCondLst>
+                                            <p:cond delay="0"/>
+                                          </p:stCondLst>
+                                        </p:cTn>
+                                        <p:tgtEl>
+                                          <p:spTgt spid="10"/>
+                                        </p:tgtEl>
+                                        <p:attrNameLst>
+                                          <p:attrName>style.visibility</p:attrName>
+                                        </p:attrNameLst>
+                                      </p:cBhvr>
+                                      <p:to>
+                                        <p:strVal val="visible"/>
+                                      </p:to>
+                                    </p:set>
+                                  </p:childTnLst>
+                                </p:cTn>
+                              </p:par>
+                            </p:childTnLst>
+                          </p:cTn>
+                        </p:par>
+                      </p:childTnLst>
+                    </p:cTn>
+                  </p:par>
+                  <p:par>
+                    <p:cTn id="37" fill="hold">
+                      <p:stCondLst>
+                        <p:cond delay="indefinite"/>
+                      </p:stCondLst>
+                      <p:childTnLst>
+                        <p:par>
+                          <p:cTn id="38" fill="hold">
+                            <p:stCondLst>
+                              <p:cond delay="0"/>
+                            </p:stCondLst>
+                            <p:childTnLst>
+                              <p:par>
+                                <p:cTn id="39" presetID="1" presetClass="entr" presetSubtype="0" fill="hold" grpId="0" nodeType="clickEffect">
+                                  <p:stCondLst>
+                                    <p:cond delay="0"/>
+                                  </p:stCondLst>
+                                  <p:childTnLst>
+                                    <p:set>
+                                      <p:cBhvr>
+                                        <p:cTn id="40" dur="1" fill="hold">
+                                          <p:stCondLst>
+                                            <p:cond delay="0"/>
+                                          </p:stCondLst>
+                                        </p:cTn>
+                                        <p:tgtEl>
+                                          <p:spTgt spid="3">
+                                            <p:txEl>
+                                              <p:pRg st="6" end="6"/>
+                                            </p:txEl>
+                                          </p:spTgt>
+                                        </p:tgtEl>
+                                        <p:attrNameLst>
+                                          <p:attrName>style.visibility</p:attrName>
+                                        </p:attrNameLst>
+                                      </p:cBhvr>
+                                      <p:to>
+                                        <p:strVal val="visible"/>
+                                      </p:to>
+                                    </p:set>
+                                  </p:childTnLst>
+                                </p:cTn>
+                              </p:par>
+                              <p:par>
+                                <p:cTn id="41" presetID="1" presetClass="entr" presetSubtype="0" fill="hold" grpId="0" nodeType="withEffect">
+                                  <p:stCondLst>
+                                    <p:cond delay="0"/>
+                                  </p:stCondLst>
+                                  <p:childTnLst>
+                                    <p:set>
+                                      <p:cBhvr>
+                                        <p:cTn id="42" dur="1" fill="hold">
+                                          <p:stCondLst>
+                                            <p:cond delay="0"/>
+                                          </p:stCondLst>
+                                        </p:cTn>
+                                        <p:tgtEl>
+                                          <p:spTgt spid="13"/>
+                                        </p:tgtEl>
+                                        <p:attrNameLst>
+                                          <p:attrName>style.visibility</p:attrName>
+                                        </p:attrNameLst>
+                                      </p:cBhvr>
+                                      <p:to>
+                                        <p:strVal val="visible"/>
+                                      </p:to>
+                                    </p:set>
+                                  </p:childTnLst>
+                                </p:cTn>
+                              </p:par>
+                            </p:childTnLst>
+                          </p:cTn>
+                        </p:par>
+                      </p:childTnLst>
+                    </p:cTn>
+                  </p:par>
+                  <p:par>
+                    <p:cTn id="43" fill="hold">
+                      <p:stCondLst>
+                        <p:cond delay="indefinite"/>
+                      </p:stCondLst>
+                      <p:childTnLst>
+                        <p:par>
+                          <p:cTn id="44" fill="hold">
+                            <p:stCondLst>
+                              <p:cond delay="0"/>
+                            </p:stCondLst>
+                            <p:childTnLst>
+                              <p:par>
+                                <p:cTn id="45" presetID="1" presetClass="entr" presetSubtype="0" fill="hold" nodeType="clickEffect">
+                                  <p:stCondLst>
+                                    <p:cond delay="0"/>
+                                  </p:stCondLst>
+                                  <p:childTnLst>
+                                    <p:set>
+                                      <p:cBhvr>
+                                        <p:cTn id="46" dur="1" fill="hold">
+                                          <p:stCondLst>
+                                            <p:cond delay="0"/>
+                                          </p:stCondLst>
+                                        </p:cTn>
+                                        <p:tgtEl>
                                           <p:spTgt spid="21"/>
                                         </p:tgtEl>
                                         <p:attrNameLst>
@@ -10693,15 +13643,33 @@
                                   </p:childTnLst>
                                 </p:cTn>
                               </p:par>
+                            </p:childTnLst>
+                          </p:cTn>
+                        </p:par>
+                      </p:childTnLst>
+                    </p:cTn>
+                  </p:par>
+                  <p:par>
+                    <p:cTn id="47" fill="hold">
+                      <p:stCondLst>
+                        <p:cond delay="indefinite"/>
+                      </p:stCondLst>
+                      <p:childTnLst>
+                        <p:par>
+                          <p:cTn id="48" fill="hold">
+                            <p:stCondLst>
+                              <p:cond delay="0"/>
+                            </p:stCondLst>
+                            <p:childTnLst>
                               <p:par>
-                                <p:cTn id="33" presetID="1" presetClass="entr" presetSubtype="0" fill="hold" grpId="0" nodeType="withEffect">
+                                <p:cTn id="49" presetID="1" presetClass="entr" presetSubtype="0" fill="hold" grpId="0" nodeType="clickEffect">
                                   <p:stCondLst>
                                     <p:cond delay="0"/>
                                   </p:stCondLst>
                                   <p:childTnLst>
                                     <p:set>
                                       <p:cBhvr>
-                                        <p:cTn id="34" dur="1" fill="hold">
+                                        <p:cTn id="50" dur="1" fill="hold">
                                           <p:stCondLst>
                                             <p:cond delay="0"/>
                                           </p:stCondLst>
@@ -10727,26 +13695,26 @@
                     </p:cTn>
                   </p:par>
                   <p:par>
-                    <p:cTn id="35" fill="hold">
+                    <p:cTn id="51" fill="hold">
                       <p:stCondLst>
                         <p:cond delay="indefinite"/>
                       </p:stCondLst>
                       <p:childTnLst>
                         <p:par>
-                          <p:cTn id="36" fill="hold">
+                          <p:cTn id="52" fill="hold">
                             <p:stCondLst>
                               <p:cond delay="0"/>
                             </p:stCondLst>
                             <p:childTnLst>
                               <p:par>
-                                <p:cTn id="37" presetID="1" presetClass="entr" presetSubtype="0" fill="hold" nodeType="clickEffect">
+                                <p:cTn id="53" presetID="1" presetClass="entr" presetSubtype="0" fill="hold" nodeType="clickEffect">
                                   <p:stCondLst>
                                     <p:cond delay="0"/>
                                   </p:stCondLst>
                                   <p:childTnLst>
                                     <p:set>
                                       <p:cBhvr>
-                                        <p:cTn id="38" dur="1" fill="hold">
+                                        <p:cTn id="54" dur="1" fill="hold">
                                           <p:stCondLst>
                                             <p:cond delay="0"/>
                                           </p:stCondLst>
@@ -10793,6 +13761,7 @@
       </p:par>
     </p:tnLst>
     <p:bldLst>
+      <p:bldP spid="3" grpId="0" uiExpand="1" build="p"/>
       <p:bldP spid="5" grpId="0" animBg="1"/>
       <p:bldP spid="6" grpId="0" animBg="1"/>
       <p:bldP spid="10" grpId="0" animBg="1"/>
@@ -12081,43 +15050,21 @@
                                   </p:childTnLst>
                                 </p:cTn>
                               </p:par>
-                            </p:childTnLst>
-                          </p:cTn>
-                        </p:par>
-                      </p:childTnLst>
-                    </p:cTn>
-                  </p:par>
-                  <p:par>
-                    <p:cTn id="17" fill="hold">
-                      <p:stCondLst>
-                        <p:cond delay="indefinite"/>
-                      </p:stCondLst>
-                      <p:childTnLst>
-                        <p:par>
-                          <p:cTn id="18" fill="hold">
-                            <p:stCondLst>
-                              <p:cond delay="0"/>
-                            </p:stCondLst>
-                            <p:childTnLst>
                               <p:par>
-                                <p:cTn id="19" presetID="1" presetClass="entr" presetSubtype="0" fill="hold" grpId="0" nodeType="clickEffect">
+                                <p:cTn id="17" presetID="1" presetClass="entr" presetSubtype="0" fill="hold" grpId="0" nodeType="withEffect">
                                   <p:stCondLst>
                                     <p:cond delay="0"/>
                                   </p:stCondLst>
                                   <p:childTnLst>
                                     <p:set>
                                       <p:cBhvr>
-                                        <p:cTn id="20" dur="1" fill="hold">
+                                        <p:cTn id="18" dur="1" fill="hold">
                                           <p:stCondLst>
                                             <p:cond delay="0"/>
                                           </p:stCondLst>
                                         </p:cTn>
                                         <p:tgtEl>
-                                          <p:spTgt spid="3">
-                                            <p:txEl>
-                                              <p:pRg st="4" end="4"/>
-                                            </p:txEl>
-                                          </p:spTgt>
+                                          <p:spTgt spid="25"/>
                                         </p:tgtEl>
                                         <p:attrNameLst>
                                           <p:attrName>style.visibility</p:attrName>
@@ -12130,8 +15077,26 @@
                                   </p:childTnLst>
                                 </p:cTn>
                               </p:par>
+                            </p:childTnLst>
+                          </p:cTn>
+                        </p:par>
+                      </p:childTnLst>
+                    </p:cTn>
+                  </p:par>
+                  <p:par>
+                    <p:cTn id="19" fill="hold">
+                      <p:stCondLst>
+                        <p:cond delay="indefinite"/>
+                      </p:stCondLst>
+                      <p:childTnLst>
+                        <p:par>
+                          <p:cTn id="20" fill="hold">
+                            <p:stCondLst>
+                              <p:cond delay="0"/>
+                            </p:stCondLst>
+                            <p:childTnLst>
                               <p:par>
-                                <p:cTn id="21" presetID="1" presetClass="entr" presetSubtype="0" fill="hold" grpId="0" nodeType="withEffect">
+                                <p:cTn id="21" presetID="1" presetClass="entr" presetSubtype="0" fill="hold" nodeType="clickEffect">
                                   <p:stCondLst>
                                     <p:cond delay="0"/>
                                   </p:stCondLst>
@@ -12144,7 +15109,7 @@
                                           </p:stCondLst>
                                         </p:cTn>
                                         <p:tgtEl>
-                                          <p:spTgt spid="12"/>
+                                          <p:spTgt spid="26"/>
                                         </p:tgtEl>
                                         <p:attrNameLst>
                                           <p:attrName>style.visibility</p:attrName>
@@ -12176,7 +15141,7 @@
                             </p:stCondLst>
                             <p:childTnLst>
                               <p:par>
-                                <p:cTn id="25" presetID="1" presetClass="entr" presetSubtype="0" fill="hold" nodeType="clickEffect">
+                                <p:cTn id="25" presetID="1" presetClass="entr" presetSubtype="0" fill="hold" grpId="0" nodeType="clickEffect">
                                   <p:stCondLst>
                                     <p:cond delay="0"/>
                                   </p:stCondLst>
@@ -12184,6 +15149,82 @@
                                     <p:set>
                                       <p:cBhvr>
                                         <p:cTn id="26" dur="1" fill="hold">
+                                          <p:stCondLst>
+                                            <p:cond delay="0"/>
+                                          </p:stCondLst>
+                                        </p:cTn>
+                                        <p:tgtEl>
+                                          <p:spTgt spid="3">
+                                            <p:txEl>
+                                              <p:pRg st="4" end="4"/>
+                                            </p:txEl>
+                                          </p:spTgt>
+                                        </p:tgtEl>
+                                        <p:attrNameLst>
+                                          <p:attrName>style.visibility</p:attrName>
+                                        </p:attrNameLst>
+                                      </p:cBhvr>
+                                      <p:to>
+                                        <p:strVal val="visible"/>
+                                      </p:to>
+                                    </p:set>
+                                  </p:childTnLst>
+                                </p:cTn>
+                              </p:par>
+                              <p:par>
+                                <p:cTn id="27" presetID="1" presetClass="entr" presetSubtype="0" fill="hold" grpId="0" nodeType="withEffect">
+                                  <p:stCondLst>
+                                    <p:cond delay="0"/>
+                                  </p:stCondLst>
+                                  <p:childTnLst>
+                                    <p:set>
+                                      <p:cBhvr>
+                                        <p:cTn id="28" dur="1" fill="hold">
+                                          <p:stCondLst>
+                                            <p:cond delay="0"/>
+                                          </p:stCondLst>
+                                        </p:cTn>
+                                        <p:tgtEl>
+                                          <p:spTgt spid="12"/>
+                                        </p:tgtEl>
+                                        <p:attrNameLst>
+                                          <p:attrName>style.visibility</p:attrName>
+                                        </p:attrNameLst>
+                                      </p:cBhvr>
+                                      <p:to>
+                                        <p:strVal val="visible"/>
+                                      </p:to>
+                                    </p:set>
+                                  </p:childTnLst>
+                                </p:cTn>
+                              </p:par>
+                            </p:childTnLst>
+                          </p:cTn>
+                        </p:par>
+                      </p:childTnLst>
+                    </p:cTn>
+                  </p:par>
+                  <p:par>
+                    <p:cTn id="29" fill="hold">
+                      <p:stCondLst>
+                        <p:cond delay="indefinite"/>
+                      </p:stCondLst>
+                      <p:childTnLst>
+                        <p:par>
+                          <p:cTn id="30" fill="hold">
+                            <p:stCondLst>
+                              <p:cond delay="0"/>
+                            </p:stCondLst>
+                            <p:childTnLst>
+                              <p:par>
+                                <p:cTn id="31" presetID="1" presetClass="entr" presetSubtype="0" fill="hold" nodeType="clickEffect">
+                                  <p:stCondLst>
+                                    <p:cond delay="0"/>
+                                  </p:stCondLst>
+                                  <p:childTnLst>
+                                    <p:set>
+                                      <p:cBhvr>
+                                        <p:cTn id="32" dur="1" fill="hold">
                                           <p:stCondLst>
                                             <p:cond delay="0"/>
                                           </p:stCondLst>
@@ -12209,95 +15250,19 @@
                     </p:cTn>
                   </p:par>
                   <p:par>
-                    <p:cTn id="27" fill="hold">
+                    <p:cTn id="33" fill="hold">
                       <p:stCondLst>
                         <p:cond delay="indefinite"/>
                       </p:stCondLst>
                       <p:childTnLst>
                         <p:par>
-                          <p:cTn id="28" fill="hold">
+                          <p:cTn id="34" fill="hold">
                             <p:stCondLst>
                               <p:cond delay="0"/>
                             </p:stCondLst>
                             <p:childTnLst>
                               <p:par>
-                                <p:cTn id="29" presetID="1" presetClass="entr" presetSubtype="0" fill="hold" grpId="0" nodeType="clickEffect">
-                                  <p:stCondLst>
-                                    <p:cond delay="0"/>
-                                  </p:stCondLst>
-                                  <p:childTnLst>
-                                    <p:set>
-                                      <p:cBhvr>
-                                        <p:cTn id="30" dur="1" fill="hold">
-                                          <p:stCondLst>
-                                            <p:cond delay="0"/>
-                                          </p:stCondLst>
-                                        </p:cTn>
-                                        <p:tgtEl>
-                                          <p:spTgt spid="16"/>
-                                        </p:tgtEl>
-                                        <p:attrNameLst>
-                                          <p:attrName>style.visibility</p:attrName>
-                                        </p:attrNameLst>
-                                      </p:cBhvr>
-                                      <p:to>
-                                        <p:strVal val="visible"/>
-                                      </p:to>
-                                    </p:set>
-                                  </p:childTnLst>
-                                </p:cTn>
-                              </p:par>
-                            </p:childTnLst>
-                          </p:cTn>
-                        </p:par>
-                      </p:childTnLst>
-                    </p:cTn>
-                  </p:par>
-                  <p:par>
-                    <p:cTn id="31" fill="hold">
-                      <p:stCondLst>
-                        <p:cond delay="indefinite"/>
-                      </p:stCondLst>
-                      <p:childTnLst>
-                        <p:par>
-                          <p:cTn id="32" fill="hold">
-                            <p:stCondLst>
-                              <p:cond delay="0"/>
-                            </p:stCondLst>
-                            <p:childTnLst>
-                              <p:par>
-                                <p:cTn id="33" presetID="1" presetClass="entr" presetSubtype="0" fill="hold" grpId="0" nodeType="clickEffect">
-                                  <p:stCondLst>
-                                    <p:cond delay="0"/>
-                                  </p:stCondLst>
-                                  <p:childTnLst>
-                                    <p:set>
-                                      <p:cBhvr>
-                                        <p:cTn id="34" dur="1" fill="hold">
-                                          <p:stCondLst>
-                                            <p:cond delay="0"/>
-                                          </p:stCondLst>
-                                        </p:cTn>
-                                        <p:tgtEl>
-                                          <p:spTgt spid="3">
-                                            <p:txEl>
-                                              <p:pRg st="6" end="6"/>
-                                            </p:txEl>
-                                          </p:spTgt>
-                                        </p:tgtEl>
-                                        <p:attrNameLst>
-                                          <p:attrName>style.visibility</p:attrName>
-                                        </p:attrNameLst>
-                                      </p:cBhvr>
-                                      <p:to>
-                                        <p:strVal val="visible"/>
-                                      </p:to>
-                                    </p:set>
-                                  </p:childTnLst>
-                                </p:cTn>
-                              </p:par>
-                              <p:par>
-                                <p:cTn id="35" presetID="1" presetClass="entr" presetSubtype="0" fill="hold" grpId="0" nodeType="withEffect">
+                                <p:cTn id="35" presetID="1" presetClass="entr" presetSubtype="0" fill="hold" grpId="0" nodeType="clickEffect">
                                   <p:stCondLst>
                                     <p:cond delay="0"/>
                                   </p:stCondLst>
@@ -12310,7 +15275,7 @@
                                           </p:stCondLst>
                                         </p:cTn>
                                         <p:tgtEl>
-                                          <p:spTgt spid="17"/>
+                                          <p:spTgt spid="16"/>
                                         </p:tgtEl>
                                         <p:attrNameLst>
                                           <p:attrName>style.visibility</p:attrName>
@@ -12342,7 +15307,7 @@
                             </p:stCondLst>
                             <p:childTnLst>
                               <p:par>
-                                <p:cTn id="39" presetID="1" presetClass="entr" presetSubtype="0" fill="hold" nodeType="clickEffect">
+                                <p:cTn id="39" presetID="1" presetClass="entr" presetSubtype="0" fill="hold" grpId="0" nodeType="clickEffect">
                                   <p:stCondLst>
                                     <p:cond delay="0"/>
                                   </p:stCondLst>
@@ -12355,7 +15320,38 @@
                                           </p:stCondLst>
                                         </p:cTn>
                                         <p:tgtEl>
-                                          <p:spTgt spid="18"/>
+                                          <p:spTgt spid="3">
+                                            <p:txEl>
+                                              <p:pRg st="6" end="6"/>
+                                            </p:txEl>
+                                          </p:spTgt>
+                                        </p:tgtEl>
+                                        <p:attrNameLst>
+                                          <p:attrName>style.visibility</p:attrName>
+                                        </p:attrNameLst>
+                                      </p:cBhvr>
+                                      <p:to>
+                                        <p:strVal val="visible"/>
+                                      </p:to>
+                                    </p:set>
+                                  </p:childTnLst>
+                                </p:cTn>
+                              </p:par>
+                              <p:par>
+                                <p:cTn id="41" presetID="1" presetClass="entr" presetSubtype="0" fill="hold" grpId="0" nodeType="withEffect">
+                                  <p:stCondLst>
+                                    <p:cond delay="0"/>
+                                  </p:stCondLst>
+                                  <p:childTnLst>
+                                    <p:set>
+                                      <p:cBhvr>
+                                        <p:cTn id="42" dur="1" fill="hold">
+                                          <p:stCondLst>
+                                            <p:cond delay="0"/>
+                                          </p:stCondLst>
+                                        </p:cTn>
+                                        <p:tgtEl>
+                                          <p:spTgt spid="17"/>
                                         </p:tgtEl>
                                         <p:attrNameLst>
                                           <p:attrName>style.visibility</p:attrName>
@@ -12375,46 +15371,19 @@
                     </p:cTn>
                   </p:par>
                   <p:par>
-                    <p:cTn id="41" fill="hold">
+                    <p:cTn id="43" fill="hold">
                       <p:stCondLst>
                         <p:cond delay="indefinite"/>
                       </p:stCondLst>
                       <p:childTnLst>
                         <p:par>
-                          <p:cTn id="42" fill="hold">
+                          <p:cTn id="44" fill="hold">
                             <p:stCondLst>
                               <p:cond delay="0"/>
                             </p:stCondLst>
                             <p:childTnLst>
                               <p:par>
-                                <p:cTn id="43" presetID="1" presetClass="entr" presetSubtype="0" fill="hold" grpId="0" nodeType="clickEffect">
-                                  <p:stCondLst>
-                                    <p:cond delay="0"/>
-                                  </p:stCondLst>
-                                  <p:childTnLst>
-                                    <p:set>
-                                      <p:cBhvr>
-                                        <p:cTn id="44" dur="1" fill="hold">
-                                          <p:stCondLst>
-                                            <p:cond delay="0"/>
-                                          </p:stCondLst>
-                                        </p:cTn>
-                                        <p:tgtEl>
-                                          <p:spTgt spid="22"/>
-                                        </p:tgtEl>
-                                        <p:attrNameLst>
-                                          <p:attrName>style.visibility</p:attrName>
-                                        </p:attrNameLst>
-                                      </p:cBhvr>
-                                      <p:to>
-                                        <p:strVal val="visible"/>
-                                      </p:to>
-                                    </p:set>
-                                  </p:childTnLst>
-                                </p:cTn>
-                              </p:par>
-                              <p:par>
-                                <p:cTn id="45" presetID="1" presetClass="entr" presetSubtype="0" fill="hold" grpId="0" nodeType="withEffect">
+                                <p:cTn id="45" presetID="1" presetClass="entr" presetSubtype="0" fill="hold" nodeType="clickEffect">
                                   <p:stCondLst>
                                     <p:cond delay="0"/>
                                   </p:stCondLst>
@@ -12427,7 +15396,7 @@
                                           </p:stCondLst>
                                         </p:cTn>
                                         <p:tgtEl>
-                                          <p:spTgt spid="25"/>
+                                          <p:spTgt spid="36"/>
                                         </p:tgtEl>
                                         <p:attrNameLst>
                                           <p:attrName>style.visibility</p:attrName>
@@ -12472,7 +15441,52 @@
                                           </p:stCondLst>
                                         </p:cTn>
                                         <p:tgtEl>
-                                          <p:spTgt spid="26"/>
+                                          <p:spTgt spid="18"/>
+                                        </p:tgtEl>
+                                        <p:attrNameLst>
+                                          <p:attrName>style.visibility</p:attrName>
+                                        </p:attrNameLst>
+                                      </p:cBhvr>
+                                      <p:to>
+                                        <p:strVal val="visible"/>
+                                      </p:to>
+                                    </p:set>
+                                  </p:childTnLst>
+                                </p:cTn>
+                              </p:par>
+                            </p:childTnLst>
+                          </p:cTn>
+                        </p:par>
+                      </p:childTnLst>
+                    </p:cTn>
+                  </p:par>
+                  <p:par>
+                    <p:cTn id="51" fill="hold">
+                      <p:stCondLst>
+                        <p:cond delay="indefinite"/>
+                      </p:stCondLst>
+                      <p:childTnLst>
+                        <p:par>
+                          <p:cTn id="52" fill="hold">
+                            <p:stCondLst>
+                              <p:cond delay="0"/>
+                            </p:stCondLst>
+                            <p:childTnLst>
+                              <p:par>
+                                <p:cTn id="53" presetID="1" presetClass="entr" presetSubtype="0" fill="hold" grpId="0" nodeType="clickEffect">
+                                  <p:stCondLst>
+                                    <p:cond delay="0"/>
+                                  </p:stCondLst>
+                                  <p:childTnLst>
+                                    <p:set>
+                                      <p:cBhvr>
+                                        <p:cTn id="54" dur="1" fill="hold">
+                                          <p:stCondLst>
+                                            <p:cond delay="0"/>
+                                          </p:stCondLst>
+                                        </p:cTn>
+                                        <p:tgtEl>
+                                          <p:spTgt spid="22"/>
                                         </p:tgtEl>
                                         <p:attrNameLst>
                                           <p:attrName>style.visibility</p:attrName>
@@ -13365,6 +16379,9 @@
                     <p:cTn id="3" fill="hold">
                       <p:stCondLst>
                         <p:cond delay="indefinite"/>
+                        <p:cond evt="onBegin" delay="0">
+                          <p:tn val="2"/>
+                        </p:cond>
                       </p:stCondLst>
                       <p:childTnLst>
                         <p:par>
@@ -13374,7 +16391,7 @@
                             </p:stCondLst>
                             <p:childTnLst>
                               <p:par>
-                                <p:cTn id="5" presetID="1" presetClass="entr" presetSubtype="0" fill="hold" nodeType="clickEffect">
+                                <p:cTn id="5" presetID="1" presetClass="entr" presetSubtype="0" fill="hold" grpId="0" nodeType="withEffect">
                                   <p:stCondLst>
                                     <p:cond delay="0"/>
                                   </p:stCondLst>
@@ -13387,7 +16404,11 @@
                                           </p:stCondLst>
                                         </p:cTn>
                                         <p:tgtEl>
-                                          <p:spTgt spid="8"/>
+                                          <p:spTgt spid="3">
+                                            <p:txEl>
+                                              <p:pRg st="0" end="0"/>
+                                            </p:txEl>
+                                          </p:spTgt>
                                         </p:tgtEl>
                                         <p:attrNameLst>
                                           <p:attrName>style.visibility</p:attrName>
@@ -13419,7 +16440,7 @@
                             </p:stCondLst>
                             <p:childTnLst>
                               <p:par>
-                                <p:cTn id="9" presetID="1" presetClass="entr" presetSubtype="0" fill="hold" nodeType="clickEffect">
+                                <p:cTn id="9" presetID="1" presetClass="entr" presetSubtype="0" fill="hold" grpId="0" nodeType="clickEffect">
                                   <p:stCondLst>
                                     <p:cond delay="0"/>
                                   </p:stCondLst>
@@ -13427,6 +16448,203 @@
                                     <p:set>
                                       <p:cBhvr>
                                         <p:cTn id="10" dur="1" fill="hold">
+                                          <p:stCondLst>
+                                            <p:cond delay="0"/>
+                                          </p:stCondLst>
+                                        </p:cTn>
+                                        <p:tgtEl>
+                                          <p:spTgt spid="3">
+                                            <p:txEl>
+                                              <p:pRg st="2" end="2"/>
+                                            </p:txEl>
+                                          </p:spTgt>
+                                        </p:tgtEl>
+                                        <p:attrNameLst>
+                                          <p:attrName>style.visibility</p:attrName>
+                                        </p:attrNameLst>
+                                      </p:cBhvr>
+                                      <p:to>
+                                        <p:strVal val="visible"/>
+                                      </p:to>
+                                    </p:set>
+                                  </p:childTnLst>
+                                </p:cTn>
+                              </p:par>
+                              <p:par>
+                                <p:cTn id="11" presetID="1" presetClass="entr" presetSubtype="0" fill="hold" grpId="0" nodeType="withEffect">
+                                  <p:stCondLst>
+                                    <p:cond delay="0"/>
+                                  </p:stCondLst>
+                                  <p:childTnLst>
+                                    <p:set>
+                                      <p:cBhvr>
+                                        <p:cTn id="12" dur="1" fill="hold">
+                                          <p:stCondLst>
+                                            <p:cond delay="0"/>
+                                          </p:stCondLst>
+                                        </p:cTn>
+                                        <p:tgtEl>
+                                          <p:spTgt spid="7"/>
+                                        </p:tgtEl>
+                                        <p:attrNameLst>
+                                          <p:attrName>style.visibility</p:attrName>
+                                        </p:attrNameLst>
+                                      </p:cBhvr>
+                                      <p:to>
+                                        <p:strVal val="visible"/>
+                                      </p:to>
+                                    </p:set>
+                                  </p:childTnLst>
+                                </p:cTn>
+                              </p:par>
+                            </p:childTnLst>
+                          </p:cTn>
+                        </p:par>
+                      </p:childTnLst>
+                    </p:cTn>
+                  </p:par>
+                  <p:par>
+                    <p:cTn id="13" fill="hold">
+                      <p:stCondLst>
+                        <p:cond delay="indefinite"/>
+                      </p:stCondLst>
+                      <p:childTnLst>
+                        <p:par>
+                          <p:cTn id="14" fill="hold">
+                            <p:stCondLst>
+                              <p:cond delay="0"/>
+                            </p:stCondLst>
+                            <p:childTnLst>
+                              <p:par>
+                                <p:cTn id="15" presetID="1" presetClass="entr" presetSubtype="0" fill="hold" nodeType="clickEffect">
+                                  <p:stCondLst>
+                                    <p:cond delay="0"/>
+                                  </p:stCondLst>
+                                  <p:childTnLst>
+                                    <p:set>
+                                      <p:cBhvr>
+                                        <p:cTn id="16" dur="1" fill="hold">
+                                          <p:stCondLst>
+                                            <p:cond delay="0"/>
+                                          </p:stCondLst>
+                                        </p:cTn>
+                                        <p:tgtEl>
+                                          <p:spTgt spid="8"/>
+                                        </p:tgtEl>
+                                        <p:attrNameLst>
+                                          <p:attrName>style.visibility</p:attrName>
+                                        </p:attrNameLst>
+                                      </p:cBhvr>
+                                      <p:to>
+                                        <p:strVal val="visible"/>
+                                      </p:to>
+                                    </p:set>
+                                  </p:childTnLst>
+                                </p:cTn>
+                              </p:par>
+                            </p:childTnLst>
+                          </p:cTn>
+                        </p:par>
+                      </p:childTnLst>
+                    </p:cTn>
+                  </p:par>
+                  <p:par>
+                    <p:cTn id="17" fill="hold">
+                      <p:stCondLst>
+                        <p:cond delay="indefinite"/>
+                      </p:stCondLst>
+                      <p:childTnLst>
+                        <p:par>
+                          <p:cTn id="18" fill="hold">
+                            <p:stCondLst>
+                              <p:cond delay="0"/>
+                            </p:stCondLst>
+                            <p:childTnLst>
+                              <p:par>
+                                <p:cTn id="19" presetID="1" presetClass="entr" presetSubtype="0" fill="hold" grpId="0" nodeType="clickEffect">
+                                  <p:stCondLst>
+                                    <p:cond delay="0"/>
+                                  </p:stCondLst>
+                                  <p:childTnLst>
+                                    <p:set>
+                                      <p:cBhvr>
+                                        <p:cTn id="20" dur="1" fill="hold">
+                                          <p:stCondLst>
+                                            <p:cond delay="0"/>
+                                          </p:stCondLst>
+                                        </p:cTn>
+                                        <p:tgtEl>
+                                          <p:spTgt spid="3">
+                                            <p:txEl>
+                                              <p:pRg st="4" end="4"/>
+                                            </p:txEl>
+                                          </p:spTgt>
+                                        </p:tgtEl>
+                                        <p:attrNameLst>
+                                          <p:attrName>style.visibility</p:attrName>
+                                        </p:attrNameLst>
+                                      </p:cBhvr>
+                                      <p:to>
+                                        <p:strVal val="visible"/>
+                                      </p:to>
+                                    </p:set>
+                                  </p:childTnLst>
+                                </p:cTn>
+                              </p:par>
+                              <p:par>
+                                <p:cTn id="21" presetID="1" presetClass="entr" presetSubtype="0" fill="hold" grpId="0" nodeType="withEffect">
+                                  <p:stCondLst>
+                                    <p:cond delay="0"/>
+                                  </p:stCondLst>
+                                  <p:childTnLst>
+                                    <p:set>
+                                      <p:cBhvr>
+                                        <p:cTn id="22" dur="1" fill="hold">
+                                          <p:stCondLst>
+                                            <p:cond delay="0"/>
+                                          </p:stCondLst>
+                                        </p:cTn>
+                                        <p:tgtEl>
+                                          <p:spTgt spid="11"/>
+                                        </p:tgtEl>
+                                        <p:attrNameLst>
+                                          <p:attrName>style.visibility</p:attrName>
+                                        </p:attrNameLst>
+                                      </p:cBhvr>
+                                      <p:to>
+                                        <p:strVal val="visible"/>
+                                      </p:to>
+                                    </p:set>
+                                  </p:childTnLst>
+                                </p:cTn>
+                              </p:par>
+                            </p:childTnLst>
+                          </p:cTn>
+                        </p:par>
+                      </p:childTnLst>
+                    </p:cTn>
+                  </p:par>
+                  <p:par>
+                    <p:cTn id="23" fill="hold">
+                      <p:stCondLst>
+                        <p:cond delay="indefinite"/>
+                      </p:stCondLst>
+                      <p:childTnLst>
+                        <p:par>
+                          <p:cTn id="24" fill="hold">
+                            <p:stCondLst>
+                              <p:cond delay="0"/>
+                            </p:stCondLst>
+                            <p:childTnLst>
+                              <p:par>
+                                <p:cTn id="25" presetID="1" presetClass="entr" presetSubtype="0" fill="hold" nodeType="clickEffect">
+                                  <p:stCondLst>
+                                    <p:cond delay="0"/>
+                                  </p:stCondLst>
+                                  <p:childTnLst>
+                                    <p:set>
+                                      <p:cBhvr>
+                                        <p:cTn id="26" dur="1" fill="hold">
                                           <p:stCondLst>
                                             <p:cond delay="0"/>
                                           </p:stCondLst>
@@ -13452,26 +16670,102 @@
                     </p:cTn>
                   </p:par>
                   <p:par>
-                    <p:cTn id="11" fill="hold">
+                    <p:cTn id="27" fill="hold">
                       <p:stCondLst>
                         <p:cond delay="indefinite"/>
                       </p:stCondLst>
                       <p:childTnLst>
                         <p:par>
-                          <p:cTn id="12" fill="hold">
+                          <p:cTn id="28" fill="hold">
                             <p:stCondLst>
                               <p:cond delay="0"/>
                             </p:stCondLst>
                             <p:childTnLst>
                               <p:par>
-                                <p:cTn id="13" presetID="1" presetClass="entr" presetSubtype="0" fill="hold" nodeType="clickEffect">
+                                <p:cTn id="29" presetID="1" presetClass="entr" presetSubtype="0" fill="hold" grpId="0" nodeType="clickEffect">
                                   <p:stCondLst>
                                     <p:cond delay="0"/>
                                   </p:stCondLst>
                                   <p:childTnLst>
                                     <p:set>
                                       <p:cBhvr>
-                                        <p:cTn id="14" dur="1" fill="hold">
+                                        <p:cTn id="30" dur="1" fill="hold">
+                                          <p:stCondLst>
+                                            <p:cond delay="0"/>
+                                          </p:stCondLst>
+                                        </p:cTn>
+                                        <p:tgtEl>
+                                          <p:spTgt spid="3">
+                                            <p:txEl>
+                                              <p:pRg st="6" end="6"/>
+                                            </p:txEl>
+                                          </p:spTgt>
+                                        </p:tgtEl>
+                                        <p:attrNameLst>
+                                          <p:attrName>style.visibility</p:attrName>
+                                        </p:attrNameLst>
+                                      </p:cBhvr>
+                                      <p:to>
+                                        <p:strVal val="visible"/>
+                                      </p:to>
+                                    </p:set>
+                                  </p:childTnLst>
+                                </p:cTn>
+                              </p:par>
+                              <p:par>
+                                <p:cTn id="31" presetID="1" presetClass="entr" presetSubtype="0" fill="hold" grpId="0" nodeType="withEffect">
+                                  <p:stCondLst>
+                                    <p:cond delay="0"/>
+                                  </p:stCondLst>
+                                  <p:childTnLst>
+                                    <p:set>
+                                      <p:cBhvr>
+                                        <p:cTn id="32" dur="1" fill="hold">
+                                          <p:stCondLst>
+                                            <p:cond delay="0"/>
+                                          </p:stCondLst>
+                                        </p:cTn>
+                                        <p:tgtEl>
+                                          <p:spTgt spid="15"/>
+                                        </p:tgtEl>
+                                        <p:attrNameLst>
+                                          <p:attrName>style.visibility</p:attrName>
+                                        </p:attrNameLst>
+                                      </p:cBhvr>
+                                      <p:to>
+                                        <p:strVal val="visible"/>
+                                      </p:to>
+                                    </p:set>
+                                  </p:childTnLst>
+                                </p:cTn>
+                              </p:par>
+                            </p:childTnLst>
+                          </p:cTn>
+                        </p:par>
+                      </p:childTnLst>
+                    </p:cTn>
+                  </p:par>
+                  <p:par>
+                    <p:cTn id="33" fill="hold">
+                      <p:stCondLst>
+                        <p:cond delay="indefinite"/>
+                      </p:stCondLst>
+                      <p:childTnLst>
+                        <p:par>
+                          <p:cTn id="34" fill="hold">
+                            <p:stCondLst>
+                              <p:cond delay="0"/>
+                            </p:stCondLst>
+                            <p:childTnLst>
+                              <p:par>
+                                <p:cTn id="35" presetID="1" presetClass="entr" presetSubtype="0" fill="hold" nodeType="clickEffect">
+                                  <p:stCondLst>
+                                    <p:cond delay="0"/>
+                                  </p:stCondLst>
+                                  <p:childTnLst>
+                                    <p:set>
+                                      <p:cBhvr>
+                                        <p:cTn id="36" dur="1" fill="hold">
                                           <p:stCondLst>
                                             <p:cond delay="0"/>
                                           </p:stCondLst>
@@ -13497,26 +16791,102 @@
                     </p:cTn>
                   </p:par>
                   <p:par>
-                    <p:cTn id="15" fill="hold">
+                    <p:cTn id="37" fill="hold">
                       <p:stCondLst>
                         <p:cond delay="indefinite"/>
                       </p:stCondLst>
                       <p:childTnLst>
                         <p:par>
-                          <p:cTn id="16" fill="hold">
+                          <p:cTn id="38" fill="hold">
                             <p:stCondLst>
                               <p:cond delay="0"/>
                             </p:stCondLst>
                             <p:childTnLst>
                               <p:par>
-                                <p:cTn id="17" presetID="1" presetClass="entr" presetSubtype="0" fill="hold" nodeType="clickEffect">
+                                <p:cTn id="39" presetID="1" presetClass="entr" presetSubtype="0" fill="hold" grpId="0" nodeType="clickEffect">
                                   <p:stCondLst>
                                     <p:cond delay="0"/>
                                   </p:stCondLst>
                                   <p:childTnLst>
                                     <p:set>
                                       <p:cBhvr>
-                                        <p:cTn id="18" dur="1" fill="hold">
+                                        <p:cTn id="40" dur="1" fill="hold">
+                                          <p:stCondLst>
+                                            <p:cond delay="0"/>
+                                          </p:stCondLst>
+                                        </p:cTn>
+                                        <p:tgtEl>
+                                          <p:spTgt spid="3">
+                                            <p:txEl>
+                                              <p:pRg st="8" end="8"/>
+                                            </p:txEl>
+                                          </p:spTgt>
+                                        </p:tgtEl>
+                                        <p:attrNameLst>
+                                          <p:attrName>style.visibility</p:attrName>
+                                        </p:attrNameLst>
+                                      </p:cBhvr>
+                                      <p:to>
+                                        <p:strVal val="visible"/>
+                                      </p:to>
+                                    </p:set>
+                                  </p:childTnLst>
+                                </p:cTn>
+                              </p:par>
+                              <p:par>
+                                <p:cTn id="41" presetID="1" presetClass="entr" presetSubtype="0" fill="hold" grpId="0" nodeType="withEffect">
+                                  <p:stCondLst>
+                                    <p:cond delay="0"/>
+                                  </p:stCondLst>
+                                  <p:childTnLst>
+                                    <p:set>
+                                      <p:cBhvr>
+                                        <p:cTn id="42" dur="1" fill="hold">
+                                          <p:stCondLst>
+                                            <p:cond delay="0"/>
+                                          </p:stCondLst>
+                                        </p:cTn>
+                                        <p:tgtEl>
+                                          <p:spTgt spid="19"/>
+                                        </p:tgtEl>
+                                        <p:attrNameLst>
+                                          <p:attrName>style.visibility</p:attrName>
+                                        </p:attrNameLst>
+                                      </p:cBhvr>
+                                      <p:to>
+                                        <p:strVal val="visible"/>
+                                      </p:to>
+                                    </p:set>
+                                  </p:childTnLst>
+                                </p:cTn>
+                              </p:par>
+                            </p:childTnLst>
+                          </p:cTn>
+                        </p:par>
+                      </p:childTnLst>
+                    </p:cTn>
+                  </p:par>
+                  <p:par>
+                    <p:cTn id="43" fill="hold">
+                      <p:stCondLst>
+                        <p:cond delay="indefinite"/>
+                      </p:stCondLst>
+                      <p:childTnLst>
+                        <p:par>
+                          <p:cTn id="44" fill="hold">
+                            <p:stCondLst>
+                              <p:cond delay="0"/>
+                            </p:stCondLst>
+                            <p:childTnLst>
+                              <p:par>
+                                <p:cTn id="45" presetID="1" presetClass="entr" presetSubtype="0" fill="hold" nodeType="clickEffect">
+                                  <p:stCondLst>
+                                    <p:cond delay="0"/>
+                                  </p:stCondLst>
+                                  <p:childTnLst>
+                                    <p:set>
+                                      <p:cBhvr>
+                                        <p:cTn id="46" dur="1" fill="hold">
                                           <p:stCondLst>
                                             <p:cond delay="0"/>
                                           </p:stCondLst>
@@ -13562,6 +16932,13 @@
         </p:cTn>
       </p:par>
     </p:tnLst>
+    <p:bldLst>
+      <p:bldP spid="3" grpId="0" uiExpand="1" build="p"/>
+      <p:bldP spid="7" grpId="0" animBg="1"/>
+      <p:bldP spid="11" grpId="0" animBg="1"/>
+      <p:bldP spid="15" grpId="0" animBg="1"/>
+      <p:bldP spid="19" grpId="0" animBg="1"/>
+    </p:bldLst>
   </p:timing>
 </p:sld>
 </file>

</xml_diff>

<commit_message>
Started slide on WebEnv
</commit_message>
<xml_diff>
--- a/Python/biopython.pptx
+++ b/Python/biopython.pptx
@@ -5,7 +5,7 @@
     <p:sldMasterId id="2147483660" r:id="rId1"/>
   </p:sldMasterIdLst>
   <p:notesMasterIdLst>
-    <p:notesMasterId r:id="rId20"/>
+    <p:notesMasterId r:id="rId21"/>
   </p:notesMasterIdLst>
   <p:sldIdLst>
     <p:sldId id="256" r:id="rId2"/>
@@ -26,6 +26,7 @@
     <p:sldId id="268" r:id="rId17"/>
     <p:sldId id="272" r:id="rId18"/>
     <p:sldId id="273" r:id="rId19"/>
+    <p:sldId id="274" r:id="rId20"/>
   </p:sldIdLst>
   <p:sldSz cx="9144000" cy="6858000" type="screen4x3"/>
   <p:notesSz cx="6858000" cy="9144000"/>
@@ -9493,6 +9494,108 @@
       <p:bldP spid="3" grpId="0" uiExpand="1" build="p"/>
       <p:bldP spid="5" grpId="0" animBg="1"/>
     </p:bldLst>
+  </p:timing>
+</p:sld>
+</file>
+
+<file path=ppt/slides/slide19.xml><?xml version="1.0" encoding="utf-8"?>
+<p:sld xmlns:a="http://schemas.openxmlformats.org/drawingml/2006/main" xmlns:r="http://schemas.openxmlformats.org/officeDocument/2006/relationships" xmlns:p="http://schemas.openxmlformats.org/presentationml/2006/main">
+  <p:cSld>
+    <p:spTree>
+      <p:nvGrpSpPr>
+        <p:cNvPr id="1" name=""/>
+        <p:cNvGrpSpPr/>
+        <p:nvPr/>
+      </p:nvGrpSpPr>
+      <p:grpSpPr>
+        <a:xfrm>
+          <a:off x="0" y="0"/>
+          <a:ext cx="0" cy="0"/>
+          <a:chOff x="0" y="0"/>
+          <a:chExt cx="0" cy="0"/>
+        </a:xfrm>
+      </p:grpSpPr>
+      <p:sp>
+        <p:nvSpPr>
+          <p:cNvPr id="2" name="Title 1"/>
+          <p:cNvSpPr>
+            <a:spLocks noGrp="1"/>
+          </p:cNvSpPr>
+          <p:nvPr>
+            <p:ph type="title"/>
+          </p:nvPr>
+        </p:nvSpPr>
+        <p:spPr/>
+        <p:txBody>
+          <a:bodyPr/>
+          <a:lstStyle/>
+          <a:p>
+            <a:r>
+              <a:rPr lang="en-US" dirty="0" err="1" smtClean="0"/>
+              <a:t>WebEnv</a:t>
+            </a:r>
+            <a:endParaRPr lang="en-US" dirty="0"/>
+          </a:p>
+        </p:txBody>
+      </p:sp>
+      <p:sp>
+        <p:nvSpPr>
+          <p:cNvPr id="3" name="Content Placeholder 2"/>
+          <p:cNvSpPr>
+            <a:spLocks noGrp="1"/>
+          </p:cNvSpPr>
+          <p:nvPr>
+            <p:ph idx="1"/>
+          </p:nvPr>
+        </p:nvSpPr>
+        <p:spPr/>
+        <p:txBody>
+          <a:bodyPr/>
+          <a:lstStyle/>
+          <a:p>
+            <a:endParaRPr lang="en-US"/>
+          </a:p>
+        </p:txBody>
+      </p:sp>
+      <p:sp>
+        <p:nvSpPr>
+          <p:cNvPr id="4" name="Slide Number Placeholder 3"/>
+          <p:cNvSpPr>
+            <a:spLocks noGrp="1"/>
+          </p:cNvSpPr>
+          <p:nvPr>
+            <p:ph type="sldNum" sz="quarter" idx="12"/>
+          </p:nvPr>
+        </p:nvSpPr>
+        <p:spPr/>
+        <p:txBody>
+          <a:bodyPr/>
+          <a:lstStyle/>
+          <a:p>
+            <a:fld id="{CA586AD6-E5F2-4F25-940D-C674496063E2}" type="slidenum">
+              <a:rPr lang="en-US" smtClean="0"/>
+              <a:t>19</a:t>
+            </a:fld>
+            <a:endParaRPr lang="en-US"/>
+          </a:p>
+        </p:txBody>
+      </p:sp>
+    </p:spTree>
+    <p:extLst>
+      <p:ext uri="{BB962C8B-B14F-4D97-AF65-F5344CB8AC3E}">
+        <p14:creationId xmlns:p14="http://schemas.microsoft.com/office/powerpoint/2010/main" val="1665791484"/>
+      </p:ext>
+    </p:extLst>
+  </p:cSld>
+  <p:clrMapOvr>
+    <a:masterClrMapping/>
+  </p:clrMapOvr>
+  <p:timing>
+    <p:tnLst>
+      <p:par>
+        <p:cTn id="1" dur="indefinite" restart="never" nodeType="tmRoot"/>
+      </p:par>
+    </p:tnLst>
   </p:timing>
 </p:sld>
 </file>

</xml_diff>

<commit_message>
Added slides on Bio.Phylo
</commit_message>
<xml_diff>
--- a/Python/biopython.pptx
+++ b/Python/biopython.pptx
@@ -5,7 +5,7 @@
     <p:sldMasterId id="2147483660" r:id="rId1"/>
   </p:sldMasterIdLst>
   <p:notesMasterIdLst>
-    <p:notesMasterId r:id="rId22"/>
+    <p:notesMasterId r:id="rId26"/>
   </p:notesMasterIdLst>
   <p:sldIdLst>
     <p:sldId id="256" r:id="rId2"/>
@@ -28,6 +28,10 @@
     <p:sldId id="273" r:id="rId19"/>
     <p:sldId id="274" r:id="rId20"/>
     <p:sldId id="275" r:id="rId21"/>
+    <p:sldId id="276" r:id="rId22"/>
+    <p:sldId id="277" r:id="rId23"/>
+    <p:sldId id="278" r:id="rId24"/>
+    <p:sldId id="279" r:id="rId25"/>
   </p:sldIdLst>
   <p:sldSz cx="9144000" cy="6858000" type="screen4x3"/>
   <p:notesSz cx="6858000" cy="9144000"/>
@@ -216,7 +220,7 @@
           <a:p>
             <a:fld id="{E50739E9-DC4A-4901-8195-7CE430F840D8}" type="datetimeFigureOut">
               <a:rPr lang="en-US" smtClean="0"/>
-              <a:t>2016-07-14</a:t>
+              <a:t>2016-08-03</a:t>
             </a:fld>
             <a:endParaRPr lang="en-US"/>
           </a:p>
@@ -699,7 +703,7 @@
           <a:p>
             <a:fld id="{EBC2714F-B822-455B-B016-0228B6AA8BE9}" type="datetime1">
               <a:rPr lang="en-US" smtClean="0"/>
-              <a:t>2016-07-14</a:t>
+              <a:t>2016-08-03</a:t>
             </a:fld>
             <a:endParaRPr lang="en-US"/>
           </a:p>
@@ -869,7 +873,7 @@
           <a:p>
             <a:fld id="{F3822F19-B516-497C-9005-1997989AD109}" type="datetime1">
               <a:rPr lang="en-US" smtClean="0"/>
-              <a:t>2016-07-14</a:t>
+              <a:t>2016-08-03</a:t>
             </a:fld>
             <a:endParaRPr lang="en-US"/>
           </a:p>
@@ -1049,7 +1053,7 @@
           <a:p>
             <a:fld id="{DC6E6076-3AC8-4591-A5B3-5701E86BC391}" type="datetime1">
               <a:rPr lang="en-US" smtClean="0"/>
-              <a:t>2016-07-14</a:t>
+              <a:t>2016-08-03</a:t>
             </a:fld>
             <a:endParaRPr lang="en-US"/>
           </a:p>
@@ -1219,7 +1223,7 @@
           <a:p>
             <a:fld id="{10101B39-3B57-4A7B-8CB6-E6BDB118061D}" type="datetime1">
               <a:rPr lang="en-US" smtClean="0"/>
-              <a:t>2016-07-14</a:t>
+              <a:t>2016-08-03</a:t>
             </a:fld>
             <a:endParaRPr lang="en-US"/>
           </a:p>
@@ -1463,7 +1467,7 @@
           <a:p>
             <a:fld id="{C27B26EE-8ECF-4FF3-9A38-87EFFDA62A28}" type="datetime1">
               <a:rPr lang="en-US" smtClean="0"/>
-              <a:t>2016-07-14</a:t>
+              <a:t>2016-08-03</a:t>
             </a:fld>
             <a:endParaRPr lang="en-US"/>
           </a:p>
@@ -1695,7 +1699,7 @@
           <a:p>
             <a:fld id="{6742683C-23EC-4C0D-AC9A-17C98B40DAA7}" type="datetime1">
               <a:rPr lang="en-US" smtClean="0"/>
-              <a:t>2016-07-14</a:t>
+              <a:t>2016-08-03</a:t>
             </a:fld>
             <a:endParaRPr lang="en-US"/>
           </a:p>
@@ -2062,7 +2066,7 @@
           <a:p>
             <a:fld id="{61B639F5-7095-4C4C-8D13-AB3C116C2681}" type="datetime1">
               <a:rPr lang="en-US" smtClean="0"/>
-              <a:t>2016-07-14</a:t>
+              <a:t>2016-08-03</a:t>
             </a:fld>
             <a:endParaRPr lang="en-US"/>
           </a:p>
@@ -2180,7 +2184,7 @@
           <a:p>
             <a:fld id="{565C75B5-128F-4C63-85A2-EABB3B9088B2}" type="datetime1">
               <a:rPr lang="en-US" smtClean="0"/>
-              <a:t>2016-07-14</a:t>
+              <a:t>2016-08-03</a:t>
             </a:fld>
             <a:endParaRPr lang="en-US"/>
           </a:p>
@@ -2275,7 +2279,7 @@
           <a:p>
             <a:fld id="{EB500747-7144-41D3-89B7-0E40926A8757}" type="datetime1">
               <a:rPr lang="en-US" smtClean="0"/>
-              <a:t>2016-07-14</a:t>
+              <a:t>2016-08-03</a:t>
             </a:fld>
             <a:endParaRPr lang="en-US"/>
           </a:p>
@@ -2552,7 +2556,7 @@
           <a:p>
             <a:fld id="{09A9D774-0B51-4CD9-9147-A6BD4D353F07}" type="datetime1">
               <a:rPr lang="en-US" smtClean="0"/>
-              <a:t>2016-07-14</a:t>
+              <a:t>2016-08-03</a:t>
             </a:fld>
             <a:endParaRPr lang="en-US"/>
           </a:p>
@@ -2809,7 +2813,7 @@
           <a:p>
             <a:fld id="{2618F069-DB72-4F16-8512-37A179AE1774}" type="datetime1">
               <a:rPr lang="en-US" smtClean="0"/>
-              <a:t>2016-07-14</a:t>
+              <a:t>2016-08-03</a:t>
             </a:fld>
             <a:endParaRPr lang="en-US"/>
           </a:p>
@@ -3022,7 +3026,7 @@
           <a:p>
             <a:fld id="{7784AB71-9685-428C-BE48-FB64D9C8B81F}" type="datetime1">
               <a:rPr lang="en-US" smtClean="0"/>
-              <a:t>2016-07-14</a:t>
+              <a:t>2016-08-03</a:t>
             </a:fld>
             <a:endParaRPr lang="en-US"/>
           </a:p>
@@ -9922,6 +9926,2450 @@
         <p:cTn id="1" dur="indefinite" restart="never" nodeType="tmRoot"/>
       </p:par>
     </p:tnLst>
+  </p:timing>
+</p:sld>
+</file>
+
+<file path=ppt/slides/slide21.xml><?xml version="1.0" encoding="utf-8"?>
+<p:sld xmlns:a="http://schemas.openxmlformats.org/drawingml/2006/main" xmlns:r="http://schemas.openxmlformats.org/officeDocument/2006/relationships" xmlns:p="http://schemas.openxmlformats.org/presentationml/2006/main">
+  <p:cSld>
+    <p:spTree>
+      <p:nvGrpSpPr>
+        <p:cNvPr id="1" name=""/>
+        <p:cNvGrpSpPr/>
+        <p:nvPr/>
+      </p:nvGrpSpPr>
+      <p:grpSpPr>
+        <a:xfrm>
+          <a:off x="0" y="0"/>
+          <a:ext cx="0" cy="0"/>
+          <a:chOff x="0" y="0"/>
+          <a:chExt cx="0" cy="0"/>
+        </a:xfrm>
+      </p:grpSpPr>
+      <p:sp>
+        <p:nvSpPr>
+          <p:cNvPr id="2" name="Title 1"/>
+          <p:cNvSpPr>
+            <a:spLocks noGrp="1"/>
+          </p:cNvSpPr>
+          <p:nvPr>
+            <p:ph type="title"/>
+          </p:nvPr>
+        </p:nvSpPr>
+        <p:spPr/>
+        <p:txBody>
+          <a:bodyPr/>
+          <a:lstStyle/>
+          <a:p>
+            <a:r>
+              <a:rPr lang="en-US" dirty="0" smtClean="0"/>
+              <a:t>Tree representation</a:t>
+            </a:r>
+            <a:endParaRPr lang="en-US" dirty="0"/>
+          </a:p>
+        </p:txBody>
+      </p:sp>
+      <p:sp>
+        <p:nvSpPr>
+          <p:cNvPr id="3" name="Content Placeholder 2"/>
+          <p:cNvSpPr>
+            <a:spLocks noGrp="1"/>
+          </p:cNvSpPr>
+          <p:nvPr>
+            <p:ph idx="1"/>
+          </p:nvPr>
+        </p:nvSpPr>
+        <p:spPr/>
+        <p:txBody>
+          <a:bodyPr/>
+          <a:lstStyle/>
+          <a:p>
+            <a:r>
+              <a:rPr lang="en-US" dirty="0" smtClean="0"/>
+              <a:t>E.g., </a:t>
+            </a:r>
+            <a:r>
+              <a:rPr lang="en-US" dirty="0" err="1" smtClean="0"/>
+              <a:t>Newick</a:t>
+            </a:r>
+            <a:r>
+              <a:rPr lang="en-US" dirty="0" smtClean="0"/>
+              <a:t> format</a:t>
+            </a:r>
+            <a:endParaRPr lang="en-US" dirty="0"/>
+          </a:p>
+        </p:txBody>
+      </p:sp>
+      <p:sp>
+        <p:nvSpPr>
+          <p:cNvPr id="4" name="Slide Number Placeholder 3"/>
+          <p:cNvSpPr>
+            <a:spLocks noGrp="1"/>
+          </p:cNvSpPr>
+          <p:nvPr>
+            <p:ph type="sldNum" sz="quarter" idx="12"/>
+          </p:nvPr>
+        </p:nvSpPr>
+        <p:spPr/>
+        <p:txBody>
+          <a:bodyPr/>
+          <a:lstStyle/>
+          <a:p>
+            <a:fld id="{CA586AD6-E5F2-4F25-940D-C674496063E2}" type="slidenum">
+              <a:rPr lang="en-US" smtClean="0"/>
+              <a:t>21</a:t>
+            </a:fld>
+            <a:endParaRPr lang="en-US"/>
+          </a:p>
+        </p:txBody>
+      </p:sp>
+      <p:sp>
+        <p:nvSpPr>
+          <p:cNvPr id="5" name="TextBox 4"/>
+          <p:cNvSpPr txBox="1"/>
+          <p:nvPr/>
+        </p:nvSpPr>
+        <p:spPr>
+          <a:xfrm>
+            <a:off x="740423" y="4307912"/>
+            <a:ext cx="5717527" cy="2308324"/>
+          </a:xfrm>
+          <a:prstGeom prst="rect">
+            <a:avLst/>
+          </a:prstGeom>
+          <a:solidFill>
+            <a:schemeClr val="bg1">
+              <a:lumMod val="95000"/>
+            </a:schemeClr>
+          </a:solidFill>
+          <a:ln>
+            <a:solidFill>
+              <a:schemeClr val="tx1"/>
+            </a:solidFill>
+          </a:ln>
+        </p:spPr>
+        <p:txBody>
+          <a:bodyPr wrap="none" rtlCol="0">
+            <a:spAutoFit/>
+          </a:bodyPr>
+          <a:lstStyle/>
+          <a:p>
+            <a:r>
+              <a:rPr lang="en-US" dirty="0"/>
+              <a:t>((((((2070OziPo:0.021138</a:t>
+            </a:r>
+            <a:r>
+              <a:rPr lang="en-US" dirty="0" smtClean="0"/>
+              <a:t>,</a:t>
+            </a:r>
+          </a:p>
+          <a:p>
+            <a:r>
+              <a:rPr lang="en-US" dirty="0"/>
+              <a:t> </a:t>
+            </a:r>
+            <a:r>
+              <a:rPr lang="en-US" dirty="0" smtClean="0"/>
+              <a:t>       2006OziSt:0.016604</a:t>
+            </a:r>
+            <a:r>
+              <a:rPr lang="en-US" dirty="0"/>
+              <a:t>):0.018156</a:t>
+            </a:r>
+            <a:r>
+              <a:rPr lang="en-US" dirty="0" smtClean="0"/>
+              <a:t>,</a:t>
+            </a:r>
+          </a:p>
+          <a:p>
+            <a:r>
+              <a:rPr lang="en-US" dirty="0"/>
+              <a:t> </a:t>
+            </a:r>
+            <a:r>
+              <a:rPr lang="en-US" dirty="0" smtClean="0"/>
+              <a:t>     (</a:t>
+            </a:r>
+            <a:r>
+              <a:rPr lang="en-US" dirty="0"/>
+              <a:t>2143OziN:0.008536</a:t>
+            </a:r>
+            <a:r>
+              <a:rPr lang="en-US" dirty="0" smtClean="0"/>
+              <a:t>,</a:t>
+            </a:r>
+          </a:p>
+          <a:p>
+            <a:r>
+              <a:rPr lang="en-US" dirty="0"/>
+              <a:t> </a:t>
+            </a:r>
+            <a:r>
+              <a:rPr lang="en-US" dirty="0" smtClean="0"/>
+              <a:t>      2012OziN:0.012895</a:t>
+            </a:r>
+            <a:r>
+              <a:rPr lang="en-US" dirty="0"/>
+              <a:t>):0.008165):0.019266</a:t>
+            </a:r>
+            <a:r>
+              <a:rPr lang="en-US" dirty="0" smtClean="0"/>
+              <a:t>,</a:t>
+            </a:r>
+          </a:p>
+          <a:p>
+            <a:r>
+              <a:rPr lang="en-US" dirty="0"/>
+              <a:t> </a:t>
+            </a:r>
+            <a:r>
+              <a:rPr lang="en-US" dirty="0" smtClean="0"/>
+              <a:t>    (</a:t>
+            </a:r>
+            <a:r>
+              <a:rPr lang="en-US" dirty="0"/>
+              <a:t>2128OziGa:0.002065</a:t>
+            </a:r>
+            <a:r>
+              <a:rPr lang="en-US" dirty="0" smtClean="0"/>
+              <a:t>,</a:t>
+            </a:r>
+          </a:p>
+          <a:p>
+            <a:r>
+              <a:rPr lang="en-US" dirty="0"/>
+              <a:t> </a:t>
+            </a:r>
+            <a:r>
+              <a:rPr lang="en-US" dirty="0" smtClean="0"/>
+              <a:t>     2214OziGa:0.000623</a:t>
+            </a:r>
+            <a:r>
+              <a:rPr lang="en-US" dirty="0"/>
+              <a:t>):0.038842):0.037123</a:t>
+            </a:r>
+            <a:r>
+              <a:rPr lang="en-US" dirty="0" smtClean="0"/>
+              <a:t>,</a:t>
+            </a:r>
+          </a:p>
+          <a:p>
+            <a:r>
+              <a:rPr lang="en-US" dirty="0"/>
+              <a:t> </a:t>
+            </a:r>
+            <a:r>
+              <a:rPr lang="en-US" dirty="0" smtClean="0"/>
+              <a:t>    (((</a:t>
+            </a:r>
+            <a:r>
+              <a:rPr lang="en-US" dirty="0"/>
+              <a:t>2190OziAu:0.018009,2073OziNn:0.007793):</a:t>
+            </a:r>
+            <a:r>
+              <a:rPr lang="en-US" dirty="0" smtClean="0"/>
+              <a:t>0.034997,</a:t>
+            </a:r>
+          </a:p>
+          <a:p>
+            <a:r>
+              <a:rPr lang="en-US" dirty="0" smtClean="0"/>
+              <a:t>…</a:t>
+            </a:r>
+            <a:endParaRPr lang="en-US" dirty="0"/>
+          </a:p>
+        </p:txBody>
+      </p:sp>
+      <p:grpSp>
+        <p:nvGrpSpPr>
+          <p:cNvPr id="32" name="Group 31"/>
+          <p:cNvGrpSpPr/>
+          <p:nvPr/>
+        </p:nvGrpSpPr>
+        <p:grpSpPr>
+          <a:xfrm>
+            <a:off x="2079020" y="2306780"/>
+            <a:ext cx="2835961" cy="1742255"/>
+            <a:chOff x="354129" y="4759036"/>
+            <a:chExt cx="2835961" cy="1742255"/>
+          </a:xfrm>
+        </p:grpSpPr>
+        <p:sp>
+          <p:nvSpPr>
+            <p:cNvPr id="7" name="Oval 6"/>
+            <p:cNvSpPr/>
+            <p:nvPr/>
+          </p:nvSpPr>
+          <p:spPr>
+            <a:xfrm>
+              <a:off x="1007918" y="4759036"/>
+              <a:ext cx="426027" cy="378784"/>
+            </a:xfrm>
+            <a:prstGeom prst="ellipse">
+              <a:avLst/>
+            </a:prstGeom>
+            <a:noFill/>
+            <a:ln>
+              <a:solidFill>
+                <a:schemeClr val="tx1"/>
+              </a:solidFill>
+            </a:ln>
+          </p:spPr>
+          <p:style>
+            <a:lnRef idx="2">
+              <a:schemeClr val="accent1">
+                <a:shade val="50000"/>
+              </a:schemeClr>
+            </a:lnRef>
+            <a:fillRef idx="1">
+              <a:schemeClr val="accent1"/>
+            </a:fillRef>
+            <a:effectRef idx="0">
+              <a:schemeClr val="accent1"/>
+            </a:effectRef>
+            <a:fontRef idx="minor">
+              <a:schemeClr val="lt1"/>
+            </a:fontRef>
+          </p:style>
+          <p:txBody>
+            <a:bodyPr rtlCol="0" anchor="ctr"/>
+            <a:lstStyle/>
+            <a:p>
+              <a:pPr algn="ctr"/>
+              <a:endParaRPr lang="en-US"/>
+            </a:p>
+          </p:txBody>
+        </p:sp>
+        <p:sp>
+          <p:nvSpPr>
+            <p:cNvPr id="9" name="Oval 8"/>
+            <p:cNvSpPr/>
+            <p:nvPr/>
+          </p:nvSpPr>
+          <p:spPr>
+            <a:xfrm>
+              <a:off x="354129" y="6122507"/>
+              <a:ext cx="426027" cy="378784"/>
+            </a:xfrm>
+            <a:prstGeom prst="ellipse">
+              <a:avLst/>
+            </a:prstGeom>
+            <a:noFill/>
+            <a:ln>
+              <a:solidFill>
+                <a:schemeClr val="tx1"/>
+              </a:solidFill>
+            </a:ln>
+          </p:spPr>
+          <p:style>
+            <a:lnRef idx="2">
+              <a:schemeClr val="accent1">
+                <a:shade val="50000"/>
+              </a:schemeClr>
+            </a:lnRef>
+            <a:fillRef idx="1">
+              <a:schemeClr val="accent1"/>
+            </a:fillRef>
+            <a:effectRef idx="0">
+              <a:schemeClr val="accent1"/>
+            </a:effectRef>
+            <a:fontRef idx="minor">
+              <a:schemeClr val="lt1"/>
+            </a:fontRef>
+          </p:style>
+          <p:txBody>
+            <a:bodyPr rtlCol="0" anchor="ctr"/>
+            <a:lstStyle/>
+            <a:p>
+              <a:pPr algn="ctr"/>
+              <a:endParaRPr lang="en-US"/>
+            </a:p>
+          </p:txBody>
+        </p:sp>
+        <p:sp>
+          <p:nvSpPr>
+            <p:cNvPr id="10" name="Oval 9"/>
+            <p:cNvSpPr/>
+            <p:nvPr/>
+          </p:nvSpPr>
+          <p:spPr>
+            <a:xfrm>
+              <a:off x="1842650" y="5458693"/>
+              <a:ext cx="426027" cy="378784"/>
+            </a:xfrm>
+            <a:prstGeom prst="ellipse">
+              <a:avLst/>
+            </a:prstGeom>
+            <a:noFill/>
+            <a:ln>
+              <a:solidFill>
+                <a:schemeClr val="tx1"/>
+              </a:solidFill>
+            </a:ln>
+          </p:spPr>
+          <p:style>
+            <a:lnRef idx="2">
+              <a:schemeClr val="accent1">
+                <a:shade val="50000"/>
+              </a:schemeClr>
+            </a:lnRef>
+            <a:fillRef idx="1">
+              <a:schemeClr val="accent1"/>
+            </a:fillRef>
+            <a:effectRef idx="0">
+              <a:schemeClr val="accent1"/>
+            </a:effectRef>
+            <a:fontRef idx="minor">
+              <a:schemeClr val="lt1"/>
+            </a:fontRef>
+          </p:style>
+          <p:txBody>
+            <a:bodyPr rtlCol="0" anchor="ctr"/>
+            <a:lstStyle/>
+            <a:p>
+              <a:pPr algn="ctr"/>
+              <a:endParaRPr lang="en-US"/>
+            </a:p>
+          </p:txBody>
+        </p:sp>
+        <p:sp>
+          <p:nvSpPr>
+            <p:cNvPr id="11" name="Oval 10"/>
+            <p:cNvSpPr/>
+            <p:nvPr/>
+          </p:nvSpPr>
+          <p:spPr>
+            <a:xfrm>
+              <a:off x="1271152" y="6113326"/>
+              <a:ext cx="426027" cy="378784"/>
+            </a:xfrm>
+            <a:prstGeom prst="ellipse">
+              <a:avLst/>
+            </a:prstGeom>
+            <a:noFill/>
+            <a:ln>
+              <a:solidFill>
+                <a:schemeClr val="tx1"/>
+              </a:solidFill>
+            </a:ln>
+          </p:spPr>
+          <p:style>
+            <a:lnRef idx="2">
+              <a:schemeClr val="accent1">
+                <a:shade val="50000"/>
+              </a:schemeClr>
+            </a:lnRef>
+            <a:fillRef idx="1">
+              <a:schemeClr val="accent1"/>
+            </a:fillRef>
+            <a:effectRef idx="0">
+              <a:schemeClr val="accent1"/>
+            </a:effectRef>
+            <a:fontRef idx="minor">
+              <a:schemeClr val="lt1"/>
+            </a:fontRef>
+          </p:style>
+          <p:txBody>
+            <a:bodyPr rtlCol="0" anchor="ctr"/>
+            <a:lstStyle/>
+            <a:p>
+              <a:pPr algn="ctr"/>
+              <a:endParaRPr lang="en-US"/>
+            </a:p>
+          </p:txBody>
+        </p:sp>
+        <p:sp>
+          <p:nvSpPr>
+            <p:cNvPr id="12" name="Oval 11"/>
+            <p:cNvSpPr/>
+            <p:nvPr/>
+          </p:nvSpPr>
+          <p:spPr>
+            <a:xfrm>
+              <a:off x="2466146" y="6122507"/>
+              <a:ext cx="426027" cy="378784"/>
+            </a:xfrm>
+            <a:prstGeom prst="ellipse">
+              <a:avLst/>
+            </a:prstGeom>
+            <a:noFill/>
+            <a:ln>
+              <a:solidFill>
+                <a:schemeClr val="tx1"/>
+              </a:solidFill>
+            </a:ln>
+          </p:spPr>
+          <p:style>
+            <a:lnRef idx="2">
+              <a:schemeClr val="accent1">
+                <a:shade val="50000"/>
+              </a:schemeClr>
+            </a:lnRef>
+            <a:fillRef idx="1">
+              <a:schemeClr val="accent1"/>
+            </a:fillRef>
+            <a:effectRef idx="0">
+              <a:schemeClr val="accent1"/>
+            </a:effectRef>
+            <a:fontRef idx="minor">
+              <a:schemeClr val="lt1"/>
+            </a:fontRef>
+          </p:style>
+          <p:txBody>
+            <a:bodyPr rtlCol="0" anchor="ctr"/>
+            <a:lstStyle/>
+            <a:p>
+              <a:pPr algn="ctr"/>
+              <a:endParaRPr lang="en-US"/>
+            </a:p>
+          </p:txBody>
+        </p:sp>
+        <p:cxnSp>
+          <p:nvCxnSpPr>
+            <p:cNvPr id="14" name="Straight Connector 13"/>
+            <p:cNvCxnSpPr>
+              <a:stCxn id="7" idx="3"/>
+              <a:endCxn id="9" idx="7"/>
+            </p:cNvCxnSpPr>
+            <p:nvPr/>
+          </p:nvCxnSpPr>
+          <p:spPr>
+            <a:xfrm flipH="1">
+              <a:off x="717766" y="5082348"/>
+              <a:ext cx="352542" cy="1095631"/>
+            </a:xfrm>
+            <a:prstGeom prst="line">
+              <a:avLst/>
+            </a:prstGeom>
+            <a:ln>
+              <a:solidFill>
+                <a:schemeClr val="tx1"/>
+              </a:solidFill>
+            </a:ln>
+          </p:spPr>
+          <p:style>
+            <a:lnRef idx="1">
+              <a:schemeClr val="accent1"/>
+            </a:lnRef>
+            <a:fillRef idx="0">
+              <a:schemeClr val="accent1"/>
+            </a:fillRef>
+            <a:effectRef idx="0">
+              <a:schemeClr val="accent1"/>
+            </a:effectRef>
+            <a:fontRef idx="minor">
+              <a:schemeClr val="tx1"/>
+            </a:fontRef>
+          </p:style>
+        </p:cxnSp>
+        <p:cxnSp>
+          <p:nvCxnSpPr>
+            <p:cNvPr id="16" name="Straight Connector 15"/>
+            <p:cNvCxnSpPr>
+              <a:stCxn id="7" idx="5"/>
+              <a:endCxn id="10" idx="1"/>
+            </p:cNvCxnSpPr>
+            <p:nvPr/>
+          </p:nvCxnSpPr>
+          <p:spPr>
+            <a:xfrm>
+              <a:off x="1371555" y="5082348"/>
+              <a:ext cx="533485" cy="431817"/>
+            </a:xfrm>
+            <a:prstGeom prst="line">
+              <a:avLst/>
+            </a:prstGeom>
+            <a:ln>
+              <a:solidFill>
+                <a:schemeClr val="tx1"/>
+              </a:solidFill>
+            </a:ln>
+          </p:spPr>
+          <p:style>
+            <a:lnRef idx="1">
+              <a:schemeClr val="accent1"/>
+            </a:lnRef>
+            <a:fillRef idx="0">
+              <a:schemeClr val="accent1"/>
+            </a:fillRef>
+            <a:effectRef idx="0">
+              <a:schemeClr val="accent1"/>
+            </a:effectRef>
+            <a:fontRef idx="minor">
+              <a:schemeClr val="tx1"/>
+            </a:fontRef>
+          </p:style>
+        </p:cxnSp>
+        <p:cxnSp>
+          <p:nvCxnSpPr>
+            <p:cNvPr id="18" name="Straight Connector 17"/>
+            <p:cNvCxnSpPr>
+              <a:stCxn id="11" idx="7"/>
+              <a:endCxn id="10" idx="3"/>
+            </p:cNvCxnSpPr>
+            <p:nvPr/>
+          </p:nvCxnSpPr>
+          <p:spPr>
+            <a:xfrm flipV="1">
+              <a:off x="1634789" y="5782005"/>
+              <a:ext cx="270251" cy="386793"/>
+            </a:xfrm>
+            <a:prstGeom prst="line">
+              <a:avLst/>
+            </a:prstGeom>
+            <a:ln>
+              <a:solidFill>
+                <a:schemeClr val="tx1"/>
+              </a:solidFill>
+            </a:ln>
+          </p:spPr>
+          <p:style>
+            <a:lnRef idx="1">
+              <a:schemeClr val="accent1"/>
+            </a:lnRef>
+            <a:fillRef idx="0">
+              <a:schemeClr val="accent1"/>
+            </a:fillRef>
+            <a:effectRef idx="0">
+              <a:schemeClr val="accent1"/>
+            </a:effectRef>
+            <a:fontRef idx="minor">
+              <a:schemeClr val="tx1"/>
+            </a:fontRef>
+          </p:style>
+        </p:cxnSp>
+        <p:cxnSp>
+          <p:nvCxnSpPr>
+            <p:cNvPr id="20" name="Straight Connector 19"/>
+            <p:cNvCxnSpPr>
+              <a:stCxn id="10" idx="5"/>
+              <a:endCxn id="12" idx="1"/>
+            </p:cNvCxnSpPr>
+            <p:nvPr/>
+          </p:nvCxnSpPr>
+          <p:spPr>
+            <a:xfrm>
+              <a:off x="2206287" y="5782005"/>
+              <a:ext cx="322249" cy="395974"/>
+            </a:xfrm>
+            <a:prstGeom prst="line">
+              <a:avLst/>
+            </a:prstGeom>
+            <a:ln>
+              <a:solidFill>
+                <a:schemeClr val="tx1"/>
+              </a:solidFill>
+            </a:ln>
+          </p:spPr>
+          <p:style>
+            <a:lnRef idx="1">
+              <a:schemeClr val="accent1"/>
+            </a:lnRef>
+            <a:fillRef idx="0">
+              <a:schemeClr val="accent1"/>
+            </a:fillRef>
+            <a:effectRef idx="0">
+              <a:schemeClr val="accent1"/>
+            </a:effectRef>
+            <a:fontRef idx="minor">
+              <a:schemeClr val="tx1"/>
+            </a:fontRef>
+          </p:style>
+        </p:cxnSp>
+        <p:sp>
+          <p:nvSpPr>
+            <p:cNvPr id="24" name="TextBox 23"/>
+            <p:cNvSpPr txBox="1"/>
+            <p:nvPr/>
+          </p:nvSpPr>
+          <p:spPr>
+            <a:xfrm>
+              <a:off x="435149" y="6110680"/>
+              <a:ext cx="472366" cy="369332"/>
+            </a:xfrm>
+            <a:prstGeom prst="rect">
+              <a:avLst/>
+            </a:prstGeom>
+            <a:noFill/>
+          </p:spPr>
+          <p:txBody>
+            <a:bodyPr wrap="square" rtlCol="0">
+              <a:spAutoFit/>
+            </a:bodyPr>
+            <a:lstStyle/>
+            <a:p>
+              <a:r>
+                <a:rPr lang="en-US" dirty="0" smtClean="0"/>
+                <a:t>a</a:t>
+              </a:r>
+              <a:endParaRPr lang="en-US" dirty="0"/>
+            </a:p>
+          </p:txBody>
+        </p:sp>
+        <p:sp>
+          <p:nvSpPr>
+            <p:cNvPr id="25" name="TextBox 24"/>
+            <p:cNvSpPr txBox="1"/>
+            <p:nvPr/>
+          </p:nvSpPr>
+          <p:spPr>
+            <a:xfrm>
+              <a:off x="1334858" y="6110680"/>
+              <a:ext cx="717871" cy="369332"/>
+            </a:xfrm>
+            <a:prstGeom prst="rect">
+              <a:avLst/>
+            </a:prstGeom>
+            <a:noFill/>
+          </p:spPr>
+          <p:txBody>
+            <a:bodyPr wrap="square" rtlCol="0">
+              <a:spAutoFit/>
+            </a:bodyPr>
+            <a:lstStyle/>
+            <a:p>
+              <a:r>
+                <a:rPr lang="en-US" dirty="0" smtClean="0"/>
+                <a:t>b</a:t>
+              </a:r>
+              <a:endParaRPr lang="en-US" dirty="0"/>
+            </a:p>
+          </p:txBody>
+        </p:sp>
+        <p:sp>
+          <p:nvSpPr>
+            <p:cNvPr id="26" name="TextBox 25"/>
+            <p:cNvSpPr txBox="1"/>
+            <p:nvPr/>
+          </p:nvSpPr>
+          <p:spPr>
+            <a:xfrm>
+              <a:off x="2528535" y="6110680"/>
+              <a:ext cx="661555" cy="369332"/>
+            </a:xfrm>
+            <a:prstGeom prst="rect">
+              <a:avLst/>
+            </a:prstGeom>
+            <a:noFill/>
+          </p:spPr>
+          <p:txBody>
+            <a:bodyPr wrap="square" rtlCol="0">
+              <a:spAutoFit/>
+            </a:bodyPr>
+            <a:lstStyle/>
+            <a:p>
+              <a:r>
+                <a:rPr lang="en-US" dirty="0" smtClean="0"/>
+                <a:t>c</a:t>
+              </a:r>
+              <a:endParaRPr lang="en-US" dirty="0"/>
+            </a:p>
+          </p:txBody>
+        </p:sp>
+        <p:sp>
+          <p:nvSpPr>
+            <p:cNvPr id="27" name="TextBox 26"/>
+            <p:cNvSpPr txBox="1"/>
+            <p:nvPr/>
+          </p:nvSpPr>
+          <p:spPr>
+            <a:xfrm>
+              <a:off x="561995" y="5298256"/>
+              <a:ext cx="385042" cy="369332"/>
+            </a:xfrm>
+            <a:prstGeom prst="rect">
+              <a:avLst/>
+            </a:prstGeom>
+            <a:noFill/>
+          </p:spPr>
+          <p:txBody>
+            <a:bodyPr wrap="none" rtlCol="0">
+              <a:spAutoFit/>
+            </a:bodyPr>
+            <a:lstStyle/>
+            <a:p>
+              <a:r>
+                <a:rPr lang="en-US" i="1" dirty="0" smtClean="0"/>
+                <a:t>d</a:t>
+              </a:r>
+              <a:r>
+                <a:rPr lang="en-US" baseline="-25000" dirty="0" smtClean="0"/>
+                <a:t>1</a:t>
+              </a:r>
+              <a:endParaRPr lang="en-US" baseline="-25000" dirty="0"/>
+            </a:p>
+          </p:txBody>
+        </p:sp>
+        <p:sp>
+          <p:nvSpPr>
+            <p:cNvPr id="28" name="TextBox 27"/>
+            <p:cNvSpPr txBox="1"/>
+            <p:nvPr/>
+          </p:nvSpPr>
+          <p:spPr>
+            <a:xfrm>
+              <a:off x="1578996" y="5006187"/>
+              <a:ext cx="381836" cy="369332"/>
+            </a:xfrm>
+            <a:prstGeom prst="rect">
+              <a:avLst/>
+            </a:prstGeom>
+            <a:noFill/>
+          </p:spPr>
+          <p:txBody>
+            <a:bodyPr wrap="none" rtlCol="0">
+              <a:spAutoFit/>
+            </a:bodyPr>
+            <a:lstStyle/>
+            <a:p>
+              <a:r>
+                <a:rPr lang="en-US" i="1" dirty="0" smtClean="0"/>
+                <a:t>d</a:t>
+              </a:r>
+              <a:r>
+                <a:rPr lang="en-US" baseline="-25000" dirty="0" smtClean="0"/>
+                <a:t>2</a:t>
+              </a:r>
+              <a:endParaRPr lang="en-US" baseline="-25000" dirty="0"/>
+            </a:p>
+          </p:txBody>
+        </p:sp>
+        <p:sp>
+          <p:nvSpPr>
+            <p:cNvPr id="29" name="TextBox 28"/>
+            <p:cNvSpPr txBox="1"/>
+            <p:nvPr/>
+          </p:nvSpPr>
+          <p:spPr>
+            <a:xfrm>
+              <a:off x="1355636" y="5721304"/>
+              <a:ext cx="381836" cy="369332"/>
+            </a:xfrm>
+            <a:prstGeom prst="rect">
+              <a:avLst/>
+            </a:prstGeom>
+            <a:noFill/>
+          </p:spPr>
+          <p:txBody>
+            <a:bodyPr wrap="none" rtlCol="0">
+              <a:spAutoFit/>
+            </a:bodyPr>
+            <a:lstStyle/>
+            <a:p>
+              <a:r>
+                <a:rPr lang="en-US" i="1" dirty="0" smtClean="0"/>
+                <a:t>d</a:t>
+              </a:r>
+              <a:r>
+                <a:rPr lang="en-US" baseline="-25000" dirty="0" smtClean="0"/>
+                <a:t>3</a:t>
+              </a:r>
+              <a:endParaRPr lang="en-US" baseline="-25000" dirty="0"/>
+            </a:p>
+          </p:txBody>
+        </p:sp>
+        <p:sp>
+          <p:nvSpPr>
+            <p:cNvPr id="30" name="TextBox 29"/>
+            <p:cNvSpPr txBox="1"/>
+            <p:nvPr/>
+          </p:nvSpPr>
+          <p:spPr>
+            <a:xfrm>
+              <a:off x="2347398" y="5712199"/>
+              <a:ext cx="381836" cy="369332"/>
+            </a:xfrm>
+            <a:prstGeom prst="rect">
+              <a:avLst/>
+            </a:prstGeom>
+            <a:noFill/>
+          </p:spPr>
+          <p:txBody>
+            <a:bodyPr wrap="none" rtlCol="0">
+              <a:spAutoFit/>
+            </a:bodyPr>
+            <a:lstStyle/>
+            <a:p>
+              <a:r>
+                <a:rPr lang="en-US" i="1" dirty="0" smtClean="0"/>
+                <a:t>d</a:t>
+              </a:r>
+              <a:r>
+                <a:rPr lang="en-US" baseline="-25000" dirty="0" smtClean="0"/>
+                <a:t>4</a:t>
+              </a:r>
+              <a:endParaRPr lang="en-US" baseline="-25000" dirty="0"/>
+            </a:p>
+          </p:txBody>
+        </p:sp>
+      </p:grpSp>
+      <p:sp>
+        <p:nvSpPr>
+          <p:cNvPr id="31" name="TextBox 30"/>
+          <p:cNvSpPr txBox="1"/>
+          <p:nvPr/>
+        </p:nvSpPr>
+        <p:spPr>
+          <a:xfrm>
+            <a:off x="4554916" y="2821771"/>
+            <a:ext cx="2254143" cy="369332"/>
+          </a:xfrm>
+          <a:prstGeom prst="rect">
+            <a:avLst/>
+          </a:prstGeom>
+          <a:noFill/>
+        </p:spPr>
+        <p:txBody>
+          <a:bodyPr wrap="none" rtlCol="0">
+            <a:spAutoFit/>
+          </a:bodyPr>
+          <a:lstStyle/>
+          <a:p>
+            <a:r>
+              <a:rPr lang="en-US" dirty="0" smtClean="0"/>
+              <a:t>(a: </a:t>
+            </a:r>
+            <a:r>
+              <a:rPr lang="en-US" i="1" dirty="0" smtClean="0"/>
+              <a:t>d</a:t>
+            </a:r>
+            <a:r>
+              <a:rPr lang="en-US" baseline="-25000" dirty="0" smtClean="0"/>
+              <a:t>1</a:t>
+            </a:r>
+            <a:r>
+              <a:rPr lang="en-US" dirty="0" smtClean="0"/>
+              <a:t>, (b: </a:t>
+            </a:r>
+            <a:r>
+              <a:rPr lang="en-US" i="1" dirty="0" smtClean="0"/>
+              <a:t>d</a:t>
+            </a:r>
+            <a:r>
+              <a:rPr lang="en-US" baseline="-25000" dirty="0" smtClean="0"/>
+              <a:t>3</a:t>
+            </a:r>
+            <a:r>
+              <a:rPr lang="en-US" dirty="0" smtClean="0"/>
+              <a:t>, c:</a:t>
+            </a:r>
+            <a:r>
+              <a:rPr lang="en-US" i="1" dirty="0" smtClean="0"/>
+              <a:t>d</a:t>
+            </a:r>
+            <a:r>
+              <a:rPr lang="en-US" baseline="-25000" dirty="0" smtClean="0"/>
+              <a:t>4</a:t>
+            </a:r>
+            <a:r>
+              <a:rPr lang="en-US" dirty="0" smtClean="0"/>
+              <a:t>): </a:t>
+            </a:r>
+            <a:r>
+              <a:rPr lang="en-US" i="1" dirty="0" smtClean="0"/>
+              <a:t>d</a:t>
+            </a:r>
+            <a:r>
+              <a:rPr lang="en-US" baseline="-25000" dirty="0" smtClean="0"/>
+              <a:t>2</a:t>
+            </a:r>
+            <a:r>
+              <a:rPr lang="en-US" dirty="0" smtClean="0"/>
+              <a:t>)</a:t>
+            </a:r>
+            <a:endParaRPr lang="en-US" dirty="0"/>
+          </a:p>
+        </p:txBody>
+      </p:sp>
+      <p:sp>
+        <p:nvSpPr>
+          <p:cNvPr id="33" name="TextBox 32"/>
+          <p:cNvSpPr txBox="1"/>
+          <p:nvPr/>
+        </p:nvSpPr>
+        <p:spPr>
+          <a:xfrm>
+            <a:off x="5297630" y="3658424"/>
+            <a:ext cx="3217720" cy="369332"/>
+          </a:xfrm>
+          <a:prstGeom prst="rect">
+            <a:avLst/>
+          </a:prstGeom>
+          <a:solidFill>
+            <a:schemeClr val="bg1">
+              <a:lumMod val="75000"/>
+            </a:schemeClr>
+          </a:solidFill>
+          <a:ln>
+            <a:solidFill>
+              <a:schemeClr val="tx1"/>
+            </a:solidFill>
+          </a:ln>
+        </p:spPr>
+        <p:txBody>
+          <a:bodyPr wrap="square" rtlCol="0">
+            <a:spAutoFit/>
+          </a:bodyPr>
+          <a:lstStyle/>
+          <a:p>
+            <a:r>
+              <a:rPr lang="en-US" dirty="0" smtClean="0">
+                <a:latin typeface="Courier New" panose="02070309020205020404" pitchFamily="49" charset="0"/>
+                <a:cs typeface="Courier New" panose="02070309020205020404" pitchFamily="49" charset="0"/>
+              </a:rPr>
+              <a:t>from Bio import </a:t>
+            </a:r>
+            <a:r>
+              <a:rPr lang="en-US" dirty="0" err="1" smtClean="0">
+                <a:latin typeface="Courier New" panose="02070309020205020404" pitchFamily="49" charset="0"/>
+                <a:cs typeface="Courier New" panose="02070309020205020404" pitchFamily="49" charset="0"/>
+              </a:rPr>
+              <a:t>Phylo</a:t>
+            </a:r>
+            <a:endParaRPr lang="en-US" dirty="0" smtClean="0">
+              <a:latin typeface="Courier New" panose="02070309020205020404" pitchFamily="49" charset="0"/>
+              <a:cs typeface="Courier New" panose="02070309020205020404" pitchFamily="49" charset="0"/>
+            </a:endParaRPr>
+          </a:p>
+        </p:txBody>
+      </p:sp>
+    </p:spTree>
+    <p:extLst>
+      <p:ext uri="{BB962C8B-B14F-4D97-AF65-F5344CB8AC3E}">
+        <p14:creationId xmlns:p14="http://schemas.microsoft.com/office/powerpoint/2010/main" val="1710456597"/>
+      </p:ext>
+    </p:extLst>
+  </p:cSld>
+  <p:clrMapOvr>
+    <a:masterClrMapping/>
+  </p:clrMapOvr>
+  <p:timing>
+    <p:tnLst>
+      <p:par>
+        <p:cTn id="1" dur="indefinite" restart="never" nodeType="tmRoot">
+          <p:childTnLst>
+            <p:seq concurrent="1" nextAc="seek">
+              <p:cTn id="2" dur="indefinite" nodeType="mainSeq">
+                <p:childTnLst>
+                  <p:par>
+                    <p:cTn id="3" fill="hold">
+                      <p:stCondLst>
+                        <p:cond delay="indefinite"/>
+                        <p:cond evt="onBegin" delay="0">
+                          <p:tn val="2"/>
+                        </p:cond>
+                      </p:stCondLst>
+                      <p:childTnLst>
+                        <p:par>
+                          <p:cTn id="4" fill="hold">
+                            <p:stCondLst>
+                              <p:cond delay="0"/>
+                            </p:stCondLst>
+                            <p:childTnLst>
+                              <p:par>
+                                <p:cTn id="5" presetID="1" presetClass="entr" presetSubtype="0" fill="hold" grpId="0" nodeType="withEffect">
+                                  <p:stCondLst>
+                                    <p:cond delay="0"/>
+                                  </p:stCondLst>
+                                  <p:childTnLst>
+                                    <p:set>
+                                      <p:cBhvr>
+                                        <p:cTn id="6" dur="1" fill="hold">
+                                          <p:stCondLst>
+                                            <p:cond delay="0"/>
+                                          </p:stCondLst>
+                                        </p:cTn>
+                                        <p:tgtEl>
+                                          <p:spTgt spid="33"/>
+                                        </p:tgtEl>
+                                        <p:attrNameLst>
+                                          <p:attrName>style.visibility</p:attrName>
+                                        </p:attrNameLst>
+                                      </p:cBhvr>
+                                      <p:to>
+                                        <p:strVal val="visible"/>
+                                      </p:to>
+                                    </p:set>
+                                  </p:childTnLst>
+                                </p:cTn>
+                              </p:par>
+                            </p:childTnLst>
+                          </p:cTn>
+                        </p:par>
+                      </p:childTnLst>
+                    </p:cTn>
+                  </p:par>
+                </p:childTnLst>
+              </p:cTn>
+              <p:prevCondLst>
+                <p:cond evt="onPrev" delay="0">
+                  <p:tgtEl>
+                    <p:sldTgt/>
+                  </p:tgtEl>
+                </p:cond>
+              </p:prevCondLst>
+              <p:nextCondLst>
+                <p:cond evt="onNext" delay="0">
+                  <p:tgtEl>
+                    <p:sldTgt/>
+                  </p:tgtEl>
+                </p:cond>
+              </p:nextCondLst>
+            </p:seq>
+          </p:childTnLst>
+        </p:cTn>
+      </p:par>
+    </p:tnLst>
+    <p:bldLst>
+      <p:bldP spid="33" grpId="0" animBg="1"/>
+    </p:bldLst>
+  </p:timing>
+</p:sld>
+</file>
+
+<file path=ppt/slides/slide22.xml><?xml version="1.0" encoding="utf-8"?>
+<p:sld xmlns:a="http://schemas.openxmlformats.org/drawingml/2006/main" xmlns:r="http://schemas.openxmlformats.org/officeDocument/2006/relationships" xmlns:p="http://schemas.openxmlformats.org/presentationml/2006/main">
+  <p:cSld>
+    <p:spTree>
+      <p:nvGrpSpPr>
+        <p:cNvPr id="1" name=""/>
+        <p:cNvGrpSpPr/>
+        <p:nvPr/>
+      </p:nvGrpSpPr>
+      <p:grpSpPr>
+        <a:xfrm>
+          <a:off x="0" y="0"/>
+          <a:ext cx="0" cy="0"/>
+          <a:chOff x="0" y="0"/>
+          <a:chExt cx="0" cy="0"/>
+        </a:xfrm>
+      </p:grpSpPr>
+      <p:pic>
+        <p:nvPicPr>
+          <p:cNvPr id="9" name="Picture 8"/>
+          <p:cNvPicPr>
+            <a:picLocks noChangeAspect="1"/>
+          </p:cNvPicPr>
+          <p:nvPr/>
+        </p:nvPicPr>
+        <p:blipFill>
+          <a:blip r:embed="rId2">
+            <a:extLst>
+              <a:ext uri="{28A0092B-C50C-407E-A947-70E740481C1C}">
+                <a14:useLocalDpi xmlns:a14="http://schemas.microsoft.com/office/drawing/2010/main" val="0"/>
+              </a:ext>
+            </a:extLst>
+          </a:blip>
+          <a:stretch>
+            <a:fillRect/>
+          </a:stretch>
+        </p:blipFill>
+        <p:spPr>
+          <a:xfrm>
+            <a:off x="3176760" y="3317100"/>
+            <a:ext cx="4827100" cy="3404376"/>
+          </a:xfrm>
+          <a:prstGeom prst="rect">
+            <a:avLst/>
+          </a:prstGeom>
+        </p:spPr>
+      </p:pic>
+      <p:sp>
+        <p:nvSpPr>
+          <p:cNvPr id="2" name="Title 1"/>
+          <p:cNvSpPr>
+            <a:spLocks noGrp="1"/>
+          </p:cNvSpPr>
+          <p:nvPr>
+            <p:ph type="title"/>
+          </p:nvPr>
+        </p:nvSpPr>
+        <p:spPr>
+          <a:xfrm>
+            <a:off x="618259" y="365126"/>
+            <a:ext cx="7886700" cy="1325563"/>
+          </a:xfrm>
+        </p:spPr>
+        <p:txBody>
+          <a:bodyPr/>
+          <a:lstStyle/>
+          <a:p>
+            <a:r>
+              <a:rPr lang="en-US" dirty="0" smtClean="0"/>
+              <a:t>Reading and displaying</a:t>
+            </a:r>
+            <a:endParaRPr lang="en-US" dirty="0"/>
+          </a:p>
+        </p:txBody>
+      </p:sp>
+      <p:sp>
+        <p:nvSpPr>
+          <p:cNvPr id="3" name="Content Placeholder 2"/>
+          <p:cNvSpPr>
+            <a:spLocks noGrp="1"/>
+          </p:cNvSpPr>
+          <p:nvPr>
+            <p:ph idx="1"/>
+          </p:nvPr>
+        </p:nvSpPr>
+        <p:spPr/>
+        <p:txBody>
+          <a:bodyPr/>
+          <a:lstStyle/>
+          <a:p>
+            <a:r>
+              <a:rPr lang="en-US" dirty="0" smtClean="0"/>
+              <a:t>Reading </a:t>
+            </a:r>
+            <a:r>
+              <a:rPr lang="en-US" dirty="0" err="1" smtClean="0"/>
+              <a:t>Newick</a:t>
+            </a:r>
+            <a:r>
+              <a:rPr lang="en-US" dirty="0" smtClean="0"/>
+              <a:t> file</a:t>
+            </a:r>
+          </a:p>
+          <a:p>
+            <a:endParaRPr lang="en-US" dirty="0"/>
+          </a:p>
+          <a:p>
+            <a:endParaRPr lang="en-US" dirty="0" smtClean="0"/>
+          </a:p>
+          <a:p>
+            <a:r>
+              <a:rPr lang="en-US" dirty="0" smtClean="0"/>
+              <a:t>Displaying tree</a:t>
+            </a:r>
+            <a:endParaRPr lang="en-US" dirty="0"/>
+          </a:p>
+        </p:txBody>
+      </p:sp>
+      <p:sp>
+        <p:nvSpPr>
+          <p:cNvPr id="4" name="Slide Number Placeholder 3"/>
+          <p:cNvSpPr>
+            <a:spLocks noGrp="1"/>
+          </p:cNvSpPr>
+          <p:nvPr>
+            <p:ph type="sldNum" sz="quarter" idx="12"/>
+          </p:nvPr>
+        </p:nvSpPr>
+        <p:spPr/>
+        <p:txBody>
+          <a:bodyPr/>
+          <a:lstStyle/>
+          <a:p>
+            <a:fld id="{CA586AD6-E5F2-4F25-940D-C674496063E2}" type="slidenum">
+              <a:rPr lang="en-US" smtClean="0"/>
+              <a:t>22</a:t>
+            </a:fld>
+            <a:endParaRPr lang="en-US"/>
+          </a:p>
+        </p:txBody>
+      </p:sp>
+      <p:sp>
+        <p:nvSpPr>
+          <p:cNvPr id="5" name="TextBox 4"/>
+          <p:cNvSpPr txBox="1"/>
+          <p:nvPr/>
+        </p:nvSpPr>
+        <p:spPr>
+          <a:xfrm>
+            <a:off x="807026" y="2421005"/>
+            <a:ext cx="5978238" cy="369332"/>
+          </a:xfrm>
+          <a:prstGeom prst="rect">
+            <a:avLst/>
+          </a:prstGeom>
+          <a:solidFill>
+            <a:schemeClr val="bg1">
+              <a:lumMod val="75000"/>
+            </a:schemeClr>
+          </a:solidFill>
+          <a:ln>
+            <a:solidFill>
+              <a:schemeClr val="tx1"/>
+            </a:solidFill>
+          </a:ln>
+        </p:spPr>
+        <p:txBody>
+          <a:bodyPr wrap="square" rtlCol="0">
+            <a:spAutoFit/>
+          </a:bodyPr>
+          <a:lstStyle/>
+          <a:p>
+            <a:r>
+              <a:rPr lang="en-US" dirty="0">
+                <a:latin typeface="Courier New" panose="02070309020205020404" pitchFamily="49" charset="0"/>
+                <a:cs typeface="Courier New" panose="02070309020205020404" pitchFamily="49" charset="0"/>
+              </a:rPr>
+              <a:t>tree = </a:t>
+            </a:r>
+            <a:r>
+              <a:rPr lang="en-US" dirty="0" err="1">
+                <a:latin typeface="Courier New" panose="02070309020205020404" pitchFamily="49" charset="0"/>
+                <a:cs typeface="Courier New" panose="02070309020205020404" pitchFamily="49" charset="0"/>
+              </a:rPr>
+              <a:t>Phylo.read</a:t>
+            </a:r>
+            <a:r>
+              <a:rPr lang="en-US" dirty="0">
+                <a:latin typeface="Courier New" panose="02070309020205020404" pitchFamily="49" charset="0"/>
+                <a:cs typeface="Courier New" panose="02070309020205020404" pitchFamily="49" charset="0"/>
+              </a:rPr>
+              <a:t>(</a:t>
+            </a:r>
+            <a:r>
+              <a:rPr lang="en-US" dirty="0" smtClean="0">
+                <a:latin typeface="Courier New" panose="02070309020205020404" pitchFamily="49" charset="0"/>
+                <a:cs typeface="Courier New" panose="02070309020205020404" pitchFamily="49" charset="0"/>
+              </a:rPr>
+              <a:t>'</a:t>
+            </a:r>
+            <a:r>
+              <a:rPr lang="en-US" dirty="0" err="1" smtClean="0">
+                <a:latin typeface="Courier New" panose="02070309020205020404" pitchFamily="49" charset="0"/>
+                <a:cs typeface="Courier New" panose="02070309020205020404" pitchFamily="49" charset="0"/>
+              </a:rPr>
+              <a:t>crab.tree</a:t>
+            </a:r>
+            <a:r>
+              <a:rPr lang="en-US" dirty="0">
+                <a:latin typeface="Courier New" panose="02070309020205020404" pitchFamily="49" charset="0"/>
+                <a:cs typeface="Courier New" panose="02070309020205020404" pitchFamily="49" charset="0"/>
+              </a:rPr>
+              <a:t>', '</a:t>
+            </a:r>
+            <a:r>
+              <a:rPr lang="en-US" dirty="0" err="1">
+                <a:latin typeface="Courier New" panose="02070309020205020404" pitchFamily="49" charset="0"/>
+                <a:cs typeface="Courier New" panose="02070309020205020404" pitchFamily="49" charset="0"/>
+              </a:rPr>
+              <a:t>newick</a:t>
+            </a:r>
+            <a:r>
+              <a:rPr lang="en-US" dirty="0">
+                <a:latin typeface="Courier New" panose="02070309020205020404" pitchFamily="49" charset="0"/>
+                <a:cs typeface="Courier New" panose="02070309020205020404" pitchFamily="49" charset="0"/>
+              </a:rPr>
+              <a:t>')</a:t>
+            </a:r>
+            <a:endParaRPr lang="en-US" dirty="0" smtClean="0">
+              <a:latin typeface="Courier New" panose="02070309020205020404" pitchFamily="49" charset="0"/>
+              <a:cs typeface="Courier New" panose="02070309020205020404" pitchFamily="49" charset="0"/>
+            </a:endParaRPr>
+          </a:p>
+        </p:txBody>
+      </p:sp>
+      <p:sp>
+        <p:nvSpPr>
+          <p:cNvPr id="8" name="TextBox 7"/>
+          <p:cNvSpPr txBox="1"/>
+          <p:nvPr/>
+        </p:nvSpPr>
+        <p:spPr>
+          <a:xfrm>
+            <a:off x="807026" y="3981306"/>
+            <a:ext cx="2369734" cy="369332"/>
+          </a:xfrm>
+          <a:prstGeom prst="rect">
+            <a:avLst/>
+          </a:prstGeom>
+          <a:solidFill>
+            <a:schemeClr val="bg1">
+              <a:lumMod val="75000"/>
+            </a:schemeClr>
+          </a:solidFill>
+          <a:ln>
+            <a:solidFill>
+              <a:schemeClr val="tx1"/>
+            </a:solidFill>
+          </a:ln>
+        </p:spPr>
+        <p:txBody>
+          <a:bodyPr wrap="square" rtlCol="0">
+            <a:spAutoFit/>
+          </a:bodyPr>
+          <a:lstStyle/>
+          <a:p>
+            <a:r>
+              <a:rPr lang="en-US" dirty="0" err="1" smtClean="0">
+                <a:latin typeface="Courier New" panose="02070309020205020404" pitchFamily="49" charset="0"/>
+                <a:cs typeface="Courier New" panose="02070309020205020404" pitchFamily="49" charset="0"/>
+              </a:rPr>
+              <a:t>Phylo.draw</a:t>
+            </a:r>
+            <a:r>
+              <a:rPr lang="en-US" dirty="0" smtClean="0">
+                <a:latin typeface="Courier New" panose="02070309020205020404" pitchFamily="49" charset="0"/>
+                <a:cs typeface="Courier New" panose="02070309020205020404" pitchFamily="49" charset="0"/>
+              </a:rPr>
+              <a:t>(tree)</a:t>
+            </a:r>
+            <a:endParaRPr lang="en-US" dirty="0" smtClean="0">
+              <a:latin typeface="Courier New" panose="02070309020205020404" pitchFamily="49" charset="0"/>
+              <a:cs typeface="Courier New" panose="02070309020205020404" pitchFamily="49" charset="0"/>
+            </a:endParaRPr>
+          </a:p>
+        </p:txBody>
+      </p:sp>
+    </p:spTree>
+    <p:extLst>
+      <p:ext uri="{BB962C8B-B14F-4D97-AF65-F5344CB8AC3E}">
+        <p14:creationId xmlns:p14="http://schemas.microsoft.com/office/powerpoint/2010/main" val="3299977447"/>
+      </p:ext>
+    </p:extLst>
+  </p:cSld>
+  <p:clrMapOvr>
+    <a:masterClrMapping/>
+  </p:clrMapOvr>
+  <p:timing>
+    <p:tnLst>
+      <p:par>
+        <p:cTn id="1" dur="indefinite" restart="never" nodeType="tmRoot">
+          <p:childTnLst>
+            <p:seq concurrent="1" nextAc="seek">
+              <p:cTn id="2" dur="indefinite" nodeType="mainSeq">
+                <p:childTnLst>
+                  <p:par>
+                    <p:cTn id="3" fill="hold">
+                      <p:stCondLst>
+                        <p:cond delay="indefinite"/>
+                        <p:cond evt="onBegin" delay="0">
+                          <p:tn val="2"/>
+                        </p:cond>
+                      </p:stCondLst>
+                      <p:childTnLst>
+                        <p:par>
+                          <p:cTn id="4" fill="hold">
+                            <p:stCondLst>
+                              <p:cond delay="0"/>
+                            </p:stCondLst>
+                            <p:childTnLst>
+                              <p:par>
+                                <p:cTn id="5" presetID="1" presetClass="entr" presetSubtype="0" fill="hold" grpId="0" nodeType="withEffect">
+                                  <p:stCondLst>
+                                    <p:cond delay="0"/>
+                                  </p:stCondLst>
+                                  <p:childTnLst>
+                                    <p:set>
+                                      <p:cBhvr>
+                                        <p:cTn id="6" dur="1" fill="hold">
+                                          <p:stCondLst>
+                                            <p:cond delay="0"/>
+                                          </p:stCondLst>
+                                        </p:cTn>
+                                        <p:tgtEl>
+                                          <p:spTgt spid="5"/>
+                                        </p:tgtEl>
+                                        <p:attrNameLst>
+                                          <p:attrName>style.visibility</p:attrName>
+                                        </p:attrNameLst>
+                                      </p:cBhvr>
+                                      <p:to>
+                                        <p:strVal val="visible"/>
+                                      </p:to>
+                                    </p:set>
+                                  </p:childTnLst>
+                                </p:cTn>
+                              </p:par>
+                              <p:par>
+                                <p:cTn id="7" presetID="1" presetClass="entr" presetSubtype="0" fill="hold" grpId="0" nodeType="withEffect">
+                                  <p:stCondLst>
+                                    <p:cond delay="0"/>
+                                  </p:stCondLst>
+                                  <p:childTnLst>
+                                    <p:set>
+                                      <p:cBhvr>
+                                        <p:cTn id="8" dur="1" fill="hold">
+                                          <p:stCondLst>
+                                            <p:cond delay="0"/>
+                                          </p:stCondLst>
+                                        </p:cTn>
+                                        <p:tgtEl>
+                                          <p:spTgt spid="8"/>
+                                        </p:tgtEl>
+                                        <p:attrNameLst>
+                                          <p:attrName>style.visibility</p:attrName>
+                                        </p:attrNameLst>
+                                      </p:cBhvr>
+                                      <p:to>
+                                        <p:strVal val="visible"/>
+                                      </p:to>
+                                    </p:set>
+                                  </p:childTnLst>
+                                </p:cTn>
+                              </p:par>
+                            </p:childTnLst>
+                          </p:cTn>
+                        </p:par>
+                      </p:childTnLst>
+                    </p:cTn>
+                  </p:par>
+                </p:childTnLst>
+              </p:cTn>
+              <p:prevCondLst>
+                <p:cond evt="onPrev" delay="0">
+                  <p:tgtEl>
+                    <p:sldTgt/>
+                  </p:tgtEl>
+                </p:cond>
+              </p:prevCondLst>
+              <p:nextCondLst>
+                <p:cond evt="onNext" delay="0">
+                  <p:tgtEl>
+                    <p:sldTgt/>
+                  </p:tgtEl>
+                </p:cond>
+              </p:nextCondLst>
+            </p:seq>
+          </p:childTnLst>
+        </p:cTn>
+      </p:par>
+    </p:tnLst>
+    <p:bldLst>
+      <p:bldP spid="5" grpId="0" animBg="1"/>
+      <p:bldP spid="8" grpId="0" animBg="1"/>
+    </p:bldLst>
+  </p:timing>
+</p:sld>
+</file>
+
+<file path=ppt/slides/slide23.xml><?xml version="1.0" encoding="utf-8"?>
+<p:sld xmlns:a="http://schemas.openxmlformats.org/drawingml/2006/main" xmlns:r="http://schemas.openxmlformats.org/officeDocument/2006/relationships" xmlns:p="http://schemas.openxmlformats.org/presentationml/2006/main">
+  <p:cSld>
+    <p:spTree>
+      <p:nvGrpSpPr>
+        <p:cNvPr id="1" name=""/>
+        <p:cNvGrpSpPr/>
+        <p:nvPr/>
+      </p:nvGrpSpPr>
+      <p:grpSpPr>
+        <a:xfrm>
+          <a:off x="0" y="0"/>
+          <a:ext cx="0" cy="0"/>
+          <a:chOff x="0" y="0"/>
+          <a:chExt cx="0" cy="0"/>
+        </a:xfrm>
+      </p:grpSpPr>
+      <p:sp>
+        <p:nvSpPr>
+          <p:cNvPr id="2" name="Title 1"/>
+          <p:cNvSpPr>
+            <a:spLocks noGrp="1"/>
+          </p:cNvSpPr>
+          <p:nvPr>
+            <p:ph type="title"/>
+          </p:nvPr>
+        </p:nvSpPr>
+        <p:spPr/>
+        <p:txBody>
+          <a:bodyPr/>
+          <a:lstStyle/>
+          <a:p>
+            <a:r>
+              <a:rPr lang="en-US" dirty="0" smtClean="0"/>
+              <a:t>Tree properties</a:t>
+            </a:r>
+            <a:endParaRPr lang="en-US" dirty="0"/>
+          </a:p>
+        </p:txBody>
+      </p:sp>
+      <p:sp>
+        <p:nvSpPr>
+          <p:cNvPr id="3" name="Content Placeholder 2"/>
+          <p:cNvSpPr>
+            <a:spLocks noGrp="1"/>
+          </p:cNvSpPr>
+          <p:nvPr>
+            <p:ph idx="1"/>
+          </p:nvPr>
+        </p:nvSpPr>
+        <p:spPr/>
+        <p:txBody>
+          <a:bodyPr/>
+          <a:lstStyle/>
+          <a:p>
+            <a:r>
+              <a:rPr lang="en-US" dirty="0" smtClean="0"/>
+              <a:t>Number of terminals</a:t>
+            </a:r>
+          </a:p>
+          <a:p>
+            <a:endParaRPr lang="en-US" dirty="0" smtClean="0"/>
+          </a:p>
+          <a:p>
+            <a:r>
+              <a:rPr lang="en-US" dirty="0" smtClean="0"/>
+              <a:t>Tree root</a:t>
+            </a:r>
+            <a:endParaRPr lang="en-US" dirty="0"/>
+          </a:p>
+          <a:p>
+            <a:pPr marL="0" indent="0">
+              <a:buNone/>
+            </a:pPr>
+            <a:endParaRPr lang="en-US" dirty="0" smtClean="0"/>
+          </a:p>
+          <a:p>
+            <a:r>
+              <a:rPr lang="en-US" dirty="0" smtClean="0"/>
+              <a:t>List of terminals</a:t>
+            </a:r>
+          </a:p>
+          <a:p>
+            <a:endParaRPr lang="en-US" dirty="0"/>
+          </a:p>
+          <a:p>
+            <a:r>
+              <a:rPr lang="en-US" dirty="0" smtClean="0"/>
+              <a:t>Depths of clades</a:t>
+            </a:r>
+            <a:endParaRPr lang="en-US" dirty="0"/>
+          </a:p>
+        </p:txBody>
+      </p:sp>
+      <p:sp>
+        <p:nvSpPr>
+          <p:cNvPr id="4" name="Slide Number Placeholder 3"/>
+          <p:cNvSpPr>
+            <a:spLocks noGrp="1"/>
+          </p:cNvSpPr>
+          <p:nvPr>
+            <p:ph type="sldNum" sz="quarter" idx="12"/>
+          </p:nvPr>
+        </p:nvSpPr>
+        <p:spPr/>
+        <p:txBody>
+          <a:bodyPr/>
+          <a:lstStyle/>
+          <a:p>
+            <a:fld id="{CA586AD6-E5F2-4F25-940D-C674496063E2}" type="slidenum">
+              <a:rPr lang="en-US" smtClean="0"/>
+              <a:t>23</a:t>
+            </a:fld>
+            <a:endParaRPr lang="en-US"/>
+          </a:p>
+        </p:txBody>
+      </p:sp>
+      <p:sp>
+        <p:nvSpPr>
+          <p:cNvPr id="5" name="TextBox 4"/>
+          <p:cNvSpPr txBox="1"/>
+          <p:nvPr/>
+        </p:nvSpPr>
+        <p:spPr>
+          <a:xfrm>
+            <a:off x="807026" y="2348268"/>
+            <a:ext cx="5978238" cy="369332"/>
+          </a:xfrm>
+          <a:prstGeom prst="rect">
+            <a:avLst/>
+          </a:prstGeom>
+          <a:solidFill>
+            <a:schemeClr val="bg1">
+              <a:lumMod val="75000"/>
+            </a:schemeClr>
+          </a:solidFill>
+          <a:ln>
+            <a:solidFill>
+              <a:schemeClr val="tx1"/>
+            </a:solidFill>
+          </a:ln>
+        </p:spPr>
+        <p:txBody>
+          <a:bodyPr wrap="square" rtlCol="0">
+            <a:spAutoFit/>
+          </a:bodyPr>
+          <a:lstStyle/>
+          <a:p>
+            <a:r>
+              <a:rPr lang="en-US" dirty="0" err="1" smtClean="0">
+                <a:latin typeface="Courier New" panose="02070309020205020404" pitchFamily="49" charset="0"/>
+                <a:cs typeface="Courier New" panose="02070309020205020404" pitchFamily="49" charset="0"/>
+              </a:rPr>
+              <a:t>nr_terminals</a:t>
+            </a:r>
+            <a:r>
+              <a:rPr lang="en-US" dirty="0" smtClean="0">
+                <a:latin typeface="Courier New" panose="02070309020205020404" pitchFamily="49" charset="0"/>
+                <a:cs typeface="Courier New" panose="02070309020205020404" pitchFamily="49" charset="0"/>
+              </a:rPr>
+              <a:t> = </a:t>
+            </a:r>
+            <a:r>
+              <a:rPr lang="en-US" dirty="0" err="1" smtClean="0">
+                <a:latin typeface="Courier New" panose="02070309020205020404" pitchFamily="49" charset="0"/>
+                <a:cs typeface="Courier New" panose="02070309020205020404" pitchFamily="49" charset="0"/>
+              </a:rPr>
+              <a:t>tree.count_terminals</a:t>
+            </a:r>
+            <a:r>
+              <a:rPr lang="en-US" dirty="0" smtClean="0">
+                <a:latin typeface="Courier New" panose="02070309020205020404" pitchFamily="49" charset="0"/>
+                <a:cs typeface="Courier New" panose="02070309020205020404" pitchFamily="49" charset="0"/>
+              </a:rPr>
+              <a:t>()</a:t>
+            </a:r>
+            <a:endParaRPr lang="en-US" dirty="0" smtClean="0">
+              <a:latin typeface="Courier New" panose="02070309020205020404" pitchFamily="49" charset="0"/>
+              <a:cs typeface="Courier New" panose="02070309020205020404" pitchFamily="49" charset="0"/>
+            </a:endParaRPr>
+          </a:p>
+        </p:txBody>
+      </p:sp>
+      <p:sp>
+        <p:nvSpPr>
+          <p:cNvPr id="6" name="TextBox 5"/>
+          <p:cNvSpPr txBox="1"/>
+          <p:nvPr/>
+        </p:nvSpPr>
+        <p:spPr>
+          <a:xfrm>
+            <a:off x="807026" y="4381236"/>
+            <a:ext cx="5978238" cy="369332"/>
+          </a:xfrm>
+          <a:prstGeom prst="rect">
+            <a:avLst/>
+          </a:prstGeom>
+          <a:solidFill>
+            <a:schemeClr val="bg1">
+              <a:lumMod val="75000"/>
+            </a:schemeClr>
+          </a:solidFill>
+          <a:ln>
+            <a:solidFill>
+              <a:schemeClr val="tx1"/>
+            </a:solidFill>
+          </a:ln>
+        </p:spPr>
+        <p:txBody>
+          <a:bodyPr wrap="square" rtlCol="0">
+            <a:spAutoFit/>
+          </a:bodyPr>
+          <a:lstStyle/>
+          <a:p>
+            <a:r>
+              <a:rPr lang="en-US" dirty="0" err="1" smtClean="0">
+                <a:latin typeface="Courier New" panose="02070309020205020404" pitchFamily="49" charset="0"/>
+                <a:cs typeface="Courier New" panose="02070309020205020404" pitchFamily="49" charset="0"/>
+              </a:rPr>
+              <a:t>terminal_clades</a:t>
+            </a:r>
+            <a:r>
+              <a:rPr lang="en-US" dirty="0" smtClean="0">
+                <a:latin typeface="Courier New" panose="02070309020205020404" pitchFamily="49" charset="0"/>
+                <a:cs typeface="Courier New" panose="02070309020205020404" pitchFamily="49" charset="0"/>
+              </a:rPr>
+              <a:t> = </a:t>
+            </a:r>
+            <a:r>
+              <a:rPr lang="en-US" dirty="0" err="1" smtClean="0">
+                <a:latin typeface="Courier New" panose="02070309020205020404" pitchFamily="49" charset="0"/>
+                <a:cs typeface="Courier New" panose="02070309020205020404" pitchFamily="49" charset="0"/>
+              </a:rPr>
+              <a:t>tree.get_terminals</a:t>
+            </a:r>
+            <a:r>
+              <a:rPr lang="en-US" dirty="0" smtClean="0">
+                <a:latin typeface="Courier New" panose="02070309020205020404" pitchFamily="49" charset="0"/>
+                <a:cs typeface="Courier New" panose="02070309020205020404" pitchFamily="49" charset="0"/>
+              </a:rPr>
+              <a:t>()</a:t>
+            </a:r>
+            <a:endParaRPr lang="en-US" dirty="0" smtClean="0">
+              <a:latin typeface="Courier New" panose="02070309020205020404" pitchFamily="49" charset="0"/>
+              <a:cs typeface="Courier New" panose="02070309020205020404" pitchFamily="49" charset="0"/>
+            </a:endParaRPr>
+          </a:p>
+        </p:txBody>
+      </p:sp>
+      <p:sp>
+        <p:nvSpPr>
+          <p:cNvPr id="7" name="TextBox 6"/>
+          <p:cNvSpPr txBox="1"/>
+          <p:nvPr/>
+        </p:nvSpPr>
+        <p:spPr>
+          <a:xfrm>
+            <a:off x="807026" y="3324173"/>
+            <a:ext cx="5978238" cy="369332"/>
+          </a:xfrm>
+          <a:prstGeom prst="rect">
+            <a:avLst/>
+          </a:prstGeom>
+          <a:solidFill>
+            <a:schemeClr val="bg1">
+              <a:lumMod val="75000"/>
+            </a:schemeClr>
+          </a:solidFill>
+          <a:ln>
+            <a:solidFill>
+              <a:schemeClr val="tx1"/>
+            </a:solidFill>
+          </a:ln>
+        </p:spPr>
+        <p:txBody>
+          <a:bodyPr wrap="square" rtlCol="0">
+            <a:spAutoFit/>
+          </a:bodyPr>
+          <a:lstStyle/>
+          <a:p>
+            <a:r>
+              <a:rPr lang="en-US" dirty="0" err="1" smtClean="0">
+                <a:latin typeface="Courier New" panose="02070309020205020404" pitchFamily="49" charset="0"/>
+                <a:cs typeface="Courier New" panose="02070309020205020404" pitchFamily="49" charset="0"/>
+              </a:rPr>
+              <a:t>root_clade</a:t>
+            </a:r>
+            <a:r>
+              <a:rPr lang="en-US" dirty="0" smtClean="0">
+                <a:latin typeface="Courier New" panose="02070309020205020404" pitchFamily="49" charset="0"/>
+                <a:cs typeface="Courier New" panose="02070309020205020404" pitchFamily="49" charset="0"/>
+              </a:rPr>
+              <a:t> = </a:t>
+            </a:r>
+            <a:r>
+              <a:rPr lang="en-US" dirty="0" err="1" smtClean="0">
+                <a:latin typeface="Courier New" panose="02070309020205020404" pitchFamily="49" charset="0"/>
+                <a:cs typeface="Courier New" panose="02070309020205020404" pitchFamily="49" charset="0"/>
+              </a:rPr>
+              <a:t>tree.count_terminals</a:t>
+            </a:r>
+            <a:r>
+              <a:rPr lang="en-US" dirty="0" smtClean="0">
+                <a:latin typeface="Courier New" panose="02070309020205020404" pitchFamily="49" charset="0"/>
+                <a:cs typeface="Courier New" panose="02070309020205020404" pitchFamily="49" charset="0"/>
+              </a:rPr>
+              <a:t>()</a:t>
+            </a:r>
+            <a:endParaRPr lang="en-US" dirty="0" smtClean="0">
+              <a:latin typeface="Courier New" panose="02070309020205020404" pitchFamily="49" charset="0"/>
+              <a:cs typeface="Courier New" panose="02070309020205020404" pitchFamily="49" charset="0"/>
+            </a:endParaRPr>
+          </a:p>
+        </p:txBody>
+      </p:sp>
+      <p:sp>
+        <p:nvSpPr>
+          <p:cNvPr id="8" name="TextBox 7"/>
+          <p:cNvSpPr txBox="1"/>
+          <p:nvPr/>
+        </p:nvSpPr>
+        <p:spPr>
+          <a:xfrm>
+            <a:off x="807026" y="5438299"/>
+            <a:ext cx="5978238" cy="369332"/>
+          </a:xfrm>
+          <a:prstGeom prst="rect">
+            <a:avLst/>
+          </a:prstGeom>
+          <a:solidFill>
+            <a:schemeClr val="bg1">
+              <a:lumMod val="75000"/>
+            </a:schemeClr>
+          </a:solidFill>
+          <a:ln>
+            <a:solidFill>
+              <a:schemeClr val="tx1"/>
+            </a:solidFill>
+          </a:ln>
+        </p:spPr>
+        <p:txBody>
+          <a:bodyPr wrap="square" rtlCol="0">
+            <a:spAutoFit/>
+          </a:bodyPr>
+          <a:lstStyle/>
+          <a:p>
+            <a:r>
+              <a:rPr lang="en-US" dirty="0" err="1" smtClean="0">
+                <a:latin typeface="Courier New" panose="02070309020205020404" pitchFamily="49" charset="0"/>
+                <a:cs typeface="Courier New" panose="02070309020205020404" pitchFamily="49" charset="0"/>
+              </a:rPr>
+              <a:t>clade_depths</a:t>
+            </a:r>
+            <a:r>
+              <a:rPr lang="en-US" dirty="0" smtClean="0">
+                <a:latin typeface="Courier New" panose="02070309020205020404" pitchFamily="49" charset="0"/>
+                <a:cs typeface="Courier New" panose="02070309020205020404" pitchFamily="49" charset="0"/>
+              </a:rPr>
+              <a:t> = </a:t>
+            </a:r>
+            <a:r>
+              <a:rPr lang="en-US" dirty="0" err="1" smtClean="0">
+                <a:latin typeface="Courier New" panose="02070309020205020404" pitchFamily="49" charset="0"/>
+                <a:cs typeface="Courier New" panose="02070309020205020404" pitchFamily="49" charset="0"/>
+              </a:rPr>
+              <a:t>tree.depths</a:t>
+            </a:r>
+            <a:r>
+              <a:rPr lang="en-US" dirty="0" smtClean="0">
+                <a:latin typeface="Courier New" panose="02070309020205020404" pitchFamily="49" charset="0"/>
+                <a:cs typeface="Courier New" panose="02070309020205020404" pitchFamily="49" charset="0"/>
+              </a:rPr>
+              <a:t>()</a:t>
+            </a:r>
+            <a:endParaRPr lang="en-US" dirty="0" smtClean="0">
+              <a:latin typeface="Courier New" panose="02070309020205020404" pitchFamily="49" charset="0"/>
+              <a:cs typeface="Courier New" panose="02070309020205020404" pitchFamily="49" charset="0"/>
+            </a:endParaRPr>
+          </a:p>
+        </p:txBody>
+      </p:sp>
+      <p:sp>
+        <p:nvSpPr>
+          <p:cNvPr id="9" name="TextBox 8"/>
+          <p:cNvSpPr txBox="1"/>
+          <p:nvPr/>
+        </p:nvSpPr>
+        <p:spPr>
+          <a:xfrm>
+            <a:off x="2389909" y="6030036"/>
+            <a:ext cx="4761496" cy="461665"/>
+          </a:xfrm>
+          <a:prstGeom prst="rect">
+            <a:avLst/>
+          </a:prstGeom>
+          <a:noFill/>
+        </p:spPr>
+        <p:txBody>
+          <a:bodyPr wrap="none" rtlCol="0">
+            <a:spAutoFit/>
+          </a:bodyPr>
+          <a:lstStyle/>
+          <a:p>
+            <a:r>
+              <a:rPr lang="en-US" sz="2400" dirty="0" err="1" smtClean="0"/>
+              <a:t>dict</a:t>
+            </a:r>
+            <a:r>
+              <a:rPr lang="en-US" sz="2400" dirty="0" smtClean="0"/>
+              <a:t> with keys: clades, values: depths</a:t>
+            </a:r>
+            <a:endParaRPr lang="en-US" dirty="0"/>
+          </a:p>
+        </p:txBody>
+      </p:sp>
+    </p:spTree>
+    <p:extLst>
+      <p:ext uri="{BB962C8B-B14F-4D97-AF65-F5344CB8AC3E}">
+        <p14:creationId xmlns:p14="http://schemas.microsoft.com/office/powerpoint/2010/main" val="3638601405"/>
+      </p:ext>
+    </p:extLst>
+  </p:cSld>
+  <p:clrMapOvr>
+    <a:masterClrMapping/>
+  </p:clrMapOvr>
+  <p:timing>
+    <p:tnLst>
+      <p:par>
+        <p:cTn id="1" dur="indefinite" restart="never" nodeType="tmRoot">
+          <p:childTnLst>
+            <p:seq concurrent="1" nextAc="seek">
+              <p:cTn id="2" dur="indefinite" nodeType="mainSeq">
+                <p:childTnLst>
+                  <p:par>
+                    <p:cTn id="3" fill="hold">
+                      <p:stCondLst>
+                        <p:cond delay="indefinite"/>
+                        <p:cond evt="onBegin" delay="0">
+                          <p:tn val="2"/>
+                        </p:cond>
+                      </p:stCondLst>
+                      <p:childTnLst>
+                        <p:par>
+                          <p:cTn id="4" fill="hold">
+                            <p:stCondLst>
+                              <p:cond delay="0"/>
+                            </p:stCondLst>
+                            <p:childTnLst>
+                              <p:par>
+                                <p:cTn id="5" presetID="1" presetClass="entr" presetSubtype="0" fill="hold" grpId="0" nodeType="withEffect">
+                                  <p:stCondLst>
+                                    <p:cond delay="0"/>
+                                  </p:stCondLst>
+                                  <p:childTnLst>
+                                    <p:set>
+                                      <p:cBhvr>
+                                        <p:cTn id="6" dur="1" fill="hold">
+                                          <p:stCondLst>
+                                            <p:cond delay="0"/>
+                                          </p:stCondLst>
+                                        </p:cTn>
+                                        <p:tgtEl>
+                                          <p:spTgt spid="5"/>
+                                        </p:tgtEl>
+                                        <p:attrNameLst>
+                                          <p:attrName>style.visibility</p:attrName>
+                                        </p:attrNameLst>
+                                      </p:cBhvr>
+                                      <p:to>
+                                        <p:strVal val="visible"/>
+                                      </p:to>
+                                    </p:set>
+                                  </p:childTnLst>
+                                </p:cTn>
+                              </p:par>
+                              <p:par>
+                                <p:cTn id="7" presetID="1" presetClass="entr" presetSubtype="0" fill="hold" grpId="0" nodeType="withEffect">
+                                  <p:stCondLst>
+                                    <p:cond delay="0"/>
+                                  </p:stCondLst>
+                                  <p:childTnLst>
+                                    <p:set>
+                                      <p:cBhvr>
+                                        <p:cTn id="8" dur="1" fill="hold">
+                                          <p:stCondLst>
+                                            <p:cond delay="0"/>
+                                          </p:stCondLst>
+                                        </p:cTn>
+                                        <p:tgtEl>
+                                          <p:spTgt spid="6"/>
+                                        </p:tgtEl>
+                                        <p:attrNameLst>
+                                          <p:attrName>style.visibility</p:attrName>
+                                        </p:attrNameLst>
+                                      </p:cBhvr>
+                                      <p:to>
+                                        <p:strVal val="visible"/>
+                                      </p:to>
+                                    </p:set>
+                                  </p:childTnLst>
+                                </p:cTn>
+                              </p:par>
+                              <p:par>
+                                <p:cTn id="9" presetID="1" presetClass="entr" presetSubtype="0" fill="hold" grpId="0" nodeType="withEffect">
+                                  <p:stCondLst>
+                                    <p:cond delay="0"/>
+                                  </p:stCondLst>
+                                  <p:childTnLst>
+                                    <p:set>
+                                      <p:cBhvr>
+                                        <p:cTn id="10" dur="1" fill="hold">
+                                          <p:stCondLst>
+                                            <p:cond delay="0"/>
+                                          </p:stCondLst>
+                                        </p:cTn>
+                                        <p:tgtEl>
+                                          <p:spTgt spid="7"/>
+                                        </p:tgtEl>
+                                        <p:attrNameLst>
+                                          <p:attrName>style.visibility</p:attrName>
+                                        </p:attrNameLst>
+                                      </p:cBhvr>
+                                      <p:to>
+                                        <p:strVal val="visible"/>
+                                      </p:to>
+                                    </p:set>
+                                  </p:childTnLst>
+                                </p:cTn>
+                              </p:par>
+                              <p:par>
+                                <p:cTn id="11" presetID="1" presetClass="entr" presetSubtype="0" fill="hold" grpId="0" nodeType="withEffect">
+                                  <p:stCondLst>
+                                    <p:cond delay="0"/>
+                                  </p:stCondLst>
+                                  <p:childTnLst>
+                                    <p:set>
+                                      <p:cBhvr>
+                                        <p:cTn id="12" dur="1" fill="hold">
+                                          <p:stCondLst>
+                                            <p:cond delay="0"/>
+                                          </p:stCondLst>
+                                        </p:cTn>
+                                        <p:tgtEl>
+                                          <p:spTgt spid="8"/>
+                                        </p:tgtEl>
+                                        <p:attrNameLst>
+                                          <p:attrName>style.visibility</p:attrName>
+                                        </p:attrNameLst>
+                                      </p:cBhvr>
+                                      <p:to>
+                                        <p:strVal val="visible"/>
+                                      </p:to>
+                                    </p:set>
+                                  </p:childTnLst>
+                                </p:cTn>
+                              </p:par>
+                            </p:childTnLst>
+                          </p:cTn>
+                        </p:par>
+                      </p:childTnLst>
+                    </p:cTn>
+                  </p:par>
+                </p:childTnLst>
+              </p:cTn>
+              <p:prevCondLst>
+                <p:cond evt="onPrev" delay="0">
+                  <p:tgtEl>
+                    <p:sldTgt/>
+                  </p:tgtEl>
+                </p:cond>
+              </p:prevCondLst>
+              <p:nextCondLst>
+                <p:cond evt="onNext" delay="0">
+                  <p:tgtEl>
+                    <p:sldTgt/>
+                  </p:tgtEl>
+                </p:cond>
+              </p:nextCondLst>
+            </p:seq>
+          </p:childTnLst>
+        </p:cTn>
+      </p:par>
+    </p:tnLst>
+    <p:bldLst>
+      <p:bldP spid="5" grpId="0" animBg="1"/>
+      <p:bldP spid="6" grpId="0" animBg="1"/>
+      <p:bldP spid="7" grpId="0" animBg="1"/>
+      <p:bldP spid="8" grpId="0" animBg="1"/>
+    </p:bldLst>
+  </p:timing>
+</p:sld>
+</file>
+
+<file path=ppt/slides/slide24.xml><?xml version="1.0" encoding="utf-8"?>
+<p:sld xmlns:a="http://schemas.openxmlformats.org/drawingml/2006/main" xmlns:r="http://schemas.openxmlformats.org/officeDocument/2006/relationships" xmlns:p="http://schemas.openxmlformats.org/presentationml/2006/main">
+  <p:cSld>
+    <p:spTree>
+      <p:nvGrpSpPr>
+        <p:cNvPr id="1" name=""/>
+        <p:cNvGrpSpPr/>
+        <p:nvPr/>
+      </p:nvGrpSpPr>
+      <p:grpSpPr>
+        <a:xfrm>
+          <a:off x="0" y="0"/>
+          <a:ext cx="0" cy="0"/>
+          <a:chOff x="0" y="0"/>
+          <a:chExt cx="0" cy="0"/>
+        </a:xfrm>
+      </p:grpSpPr>
+      <p:sp>
+        <p:nvSpPr>
+          <p:cNvPr id="2" name="Title 1"/>
+          <p:cNvSpPr>
+            <a:spLocks noGrp="1"/>
+          </p:cNvSpPr>
+          <p:nvPr>
+            <p:ph type="title"/>
+          </p:nvPr>
+        </p:nvSpPr>
+        <p:spPr/>
+        <p:txBody>
+          <a:bodyPr/>
+          <a:lstStyle/>
+          <a:p>
+            <a:r>
+              <a:rPr lang="en-US" dirty="0" smtClean="0"/>
+              <a:t>Clade properties</a:t>
+            </a:r>
+            <a:endParaRPr lang="en-US" dirty="0"/>
+          </a:p>
+        </p:txBody>
+      </p:sp>
+      <p:sp>
+        <p:nvSpPr>
+          <p:cNvPr id="3" name="Content Placeholder 2"/>
+          <p:cNvSpPr>
+            <a:spLocks noGrp="1"/>
+          </p:cNvSpPr>
+          <p:nvPr>
+            <p:ph idx="1"/>
+          </p:nvPr>
+        </p:nvSpPr>
+        <p:spPr/>
+        <p:txBody>
+          <a:bodyPr/>
+          <a:lstStyle/>
+          <a:p>
+            <a:r>
+              <a:rPr lang="en-US" dirty="0" smtClean="0"/>
+              <a:t>Name (if any)</a:t>
+            </a:r>
+          </a:p>
+          <a:p>
+            <a:endParaRPr lang="en-US" dirty="0"/>
+          </a:p>
+          <a:p>
+            <a:r>
+              <a:rPr lang="en-US" dirty="0" smtClean="0"/>
+              <a:t>Branch length</a:t>
+            </a:r>
+          </a:p>
+          <a:p>
+            <a:endParaRPr lang="en-US" dirty="0"/>
+          </a:p>
+          <a:p>
+            <a:r>
+              <a:rPr lang="en-US" dirty="0" smtClean="0"/>
+              <a:t>Other properties</a:t>
+            </a:r>
+          </a:p>
+          <a:p>
+            <a:pPr lvl="1"/>
+            <a:r>
+              <a:rPr lang="en-US" dirty="0" smtClean="0"/>
+              <a:t>color</a:t>
+            </a:r>
+          </a:p>
+          <a:p>
+            <a:pPr lvl="1"/>
+            <a:r>
+              <a:rPr lang="en-US" dirty="0" smtClean="0"/>
+              <a:t>comment</a:t>
+            </a:r>
+            <a:endParaRPr lang="en-US" dirty="0"/>
+          </a:p>
+        </p:txBody>
+      </p:sp>
+      <p:sp>
+        <p:nvSpPr>
+          <p:cNvPr id="4" name="Slide Number Placeholder 3"/>
+          <p:cNvSpPr>
+            <a:spLocks noGrp="1"/>
+          </p:cNvSpPr>
+          <p:nvPr>
+            <p:ph type="sldNum" sz="quarter" idx="12"/>
+          </p:nvPr>
+        </p:nvSpPr>
+        <p:spPr/>
+        <p:txBody>
+          <a:bodyPr/>
+          <a:lstStyle/>
+          <a:p>
+            <a:fld id="{CA586AD6-E5F2-4F25-940D-C674496063E2}" type="slidenum">
+              <a:rPr lang="en-US" smtClean="0"/>
+              <a:t>24</a:t>
+            </a:fld>
+            <a:endParaRPr lang="en-US"/>
+          </a:p>
+        </p:txBody>
+      </p:sp>
+      <p:sp>
+        <p:nvSpPr>
+          <p:cNvPr id="5" name="TextBox 4"/>
+          <p:cNvSpPr txBox="1"/>
+          <p:nvPr/>
+        </p:nvSpPr>
+        <p:spPr>
+          <a:xfrm>
+            <a:off x="807026" y="2337877"/>
+            <a:ext cx="5978238" cy="369332"/>
+          </a:xfrm>
+          <a:prstGeom prst="rect">
+            <a:avLst/>
+          </a:prstGeom>
+          <a:solidFill>
+            <a:schemeClr val="bg1">
+              <a:lumMod val="75000"/>
+            </a:schemeClr>
+          </a:solidFill>
+          <a:ln>
+            <a:solidFill>
+              <a:schemeClr val="tx1"/>
+            </a:solidFill>
+          </a:ln>
+        </p:spPr>
+        <p:txBody>
+          <a:bodyPr wrap="square" rtlCol="0">
+            <a:spAutoFit/>
+          </a:bodyPr>
+          <a:lstStyle/>
+          <a:p>
+            <a:r>
+              <a:rPr lang="en-US" dirty="0" smtClean="0">
+                <a:latin typeface="Courier New" panose="02070309020205020404" pitchFamily="49" charset="0"/>
+                <a:cs typeface="Courier New" panose="02070309020205020404" pitchFamily="49" charset="0"/>
+              </a:rPr>
+              <a:t>print(clade.name)</a:t>
+            </a:r>
+            <a:endParaRPr lang="en-US" dirty="0" smtClean="0">
+              <a:latin typeface="Courier New" panose="02070309020205020404" pitchFamily="49" charset="0"/>
+              <a:cs typeface="Courier New" panose="02070309020205020404" pitchFamily="49" charset="0"/>
+            </a:endParaRPr>
+          </a:p>
+        </p:txBody>
+      </p:sp>
+      <p:sp>
+        <p:nvSpPr>
+          <p:cNvPr id="6" name="TextBox 5"/>
+          <p:cNvSpPr txBox="1"/>
+          <p:nvPr/>
+        </p:nvSpPr>
+        <p:spPr>
+          <a:xfrm>
+            <a:off x="807026" y="3331941"/>
+            <a:ext cx="5978238" cy="369332"/>
+          </a:xfrm>
+          <a:prstGeom prst="rect">
+            <a:avLst/>
+          </a:prstGeom>
+          <a:solidFill>
+            <a:schemeClr val="bg1">
+              <a:lumMod val="75000"/>
+            </a:schemeClr>
+          </a:solidFill>
+          <a:ln>
+            <a:solidFill>
+              <a:schemeClr val="tx1"/>
+            </a:solidFill>
+          </a:ln>
+        </p:spPr>
+        <p:txBody>
+          <a:bodyPr wrap="square" rtlCol="0">
+            <a:spAutoFit/>
+          </a:bodyPr>
+          <a:lstStyle/>
+          <a:p>
+            <a:r>
+              <a:rPr lang="en-US" dirty="0" smtClean="0">
+                <a:latin typeface="Courier New" panose="02070309020205020404" pitchFamily="49" charset="0"/>
+                <a:cs typeface="Courier New" panose="02070309020205020404" pitchFamily="49" charset="0"/>
+              </a:rPr>
+              <a:t>print(</a:t>
+            </a:r>
+            <a:r>
+              <a:rPr lang="en-US" dirty="0" err="1" smtClean="0">
+                <a:latin typeface="Courier New" panose="02070309020205020404" pitchFamily="49" charset="0"/>
+                <a:cs typeface="Courier New" panose="02070309020205020404" pitchFamily="49" charset="0"/>
+              </a:rPr>
+              <a:t>clade.branch_length</a:t>
+            </a:r>
+            <a:r>
+              <a:rPr lang="en-US" dirty="0" smtClean="0">
+                <a:latin typeface="Courier New" panose="02070309020205020404" pitchFamily="49" charset="0"/>
+                <a:cs typeface="Courier New" panose="02070309020205020404" pitchFamily="49" charset="0"/>
+              </a:rPr>
+              <a:t>)</a:t>
+            </a:r>
+            <a:endParaRPr lang="en-US" dirty="0" smtClean="0">
+              <a:latin typeface="Courier New" panose="02070309020205020404" pitchFamily="49" charset="0"/>
+              <a:cs typeface="Courier New" panose="02070309020205020404" pitchFamily="49" charset="0"/>
+            </a:endParaRPr>
+          </a:p>
+        </p:txBody>
+      </p:sp>
+    </p:spTree>
+    <p:extLst>
+      <p:ext uri="{BB962C8B-B14F-4D97-AF65-F5344CB8AC3E}">
+        <p14:creationId xmlns:p14="http://schemas.microsoft.com/office/powerpoint/2010/main" val="2593089900"/>
+      </p:ext>
+    </p:extLst>
+  </p:cSld>
+  <p:clrMapOvr>
+    <a:masterClrMapping/>
+  </p:clrMapOvr>
+  <p:timing>
+    <p:tnLst>
+      <p:par>
+        <p:cTn id="1" dur="indefinite" restart="never" nodeType="tmRoot">
+          <p:childTnLst>
+            <p:seq concurrent="1" nextAc="seek">
+              <p:cTn id="2" dur="indefinite" nodeType="mainSeq">
+                <p:childTnLst>
+                  <p:par>
+                    <p:cTn id="3" fill="hold">
+                      <p:stCondLst>
+                        <p:cond delay="indefinite"/>
+                        <p:cond evt="onBegin" delay="0">
+                          <p:tn val="2"/>
+                        </p:cond>
+                      </p:stCondLst>
+                      <p:childTnLst>
+                        <p:par>
+                          <p:cTn id="4" fill="hold">
+                            <p:stCondLst>
+                              <p:cond delay="0"/>
+                            </p:stCondLst>
+                            <p:childTnLst>
+                              <p:par>
+                                <p:cTn id="5" presetID="1" presetClass="entr" presetSubtype="0" fill="hold" grpId="0" nodeType="withEffect">
+                                  <p:stCondLst>
+                                    <p:cond delay="0"/>
+                                  </p:stCondLst>
+                                  <p:childTnLst>
+                                    <p:set>
+                                      <p:cBhvr>
+                                        <p:cTn id="6" dur="1" fill="hold">
+                                          <p:stCondLst>
+                                            <p:cond delay="0"/>
+                                          </p:stCondLst>
+                                        </p:cTn>
+                                        <p:tgtEl>
+                                          <p:spTgt spid="5"/>
+                                        </p:tgtEl>
+                                        <p:attrNameLst>
+                                          <p:attrName>style.visibility</p:attrName>
+                                        </p:attrNameLst>
+                                      </p:cBhvr>
+                                      <p:to>
+                                        <p:strVal val="visible"/>
+                                      </p:to>
+                                    </p:set>
+                                  </p:childTnLst>
+                                </p:cTn>
+                              </p:par>
+                              <p:par>
+                                <p:cTn id="7" presetID="1" presetClass="entr" presetSubtype="0" fill="hold" grpId="0" nodeType="withEffect">
+                                  <p:stCondLst>
+                                    <p:cond delay="0"/>
+                                  </p:stCondLst>
+                                  <p:childTnLst>
+                                    <p:set>
+                                      <p:cBhvr>
+                                        <p:cTn id="8" dur="1" fill="hold">
+                                          <p:stCondLst>
+                                            <p:cond delay="0"/>
+                                          </p:stCondLst>
+                                        </p:cTn>
+                                        <p:tgtEl>
+                                          <p:spTgt spid="6"/>
+                                        </p:tgtEl>
+                                        <p:attrNameLst>
+                                          <p:attrName>style.visibility</p:attrName>
+                                        </p:attrNameLst>
+                                      </p:cBhvr>
+                                      <p:to>
+                                        <p:strVal val="visible"/>
+                                      </p:to>
+                                    </p:set>
+                                  </p:childTnLst>
+                                </p:cTn>
+                              </p:par>
+                            </p:childTnLst>
+                          </p:cTn>
+                        </p:par>
+                      </p:childTnLst>
+                    </p:cTn>
+                  </p:par>
+                </p:childTnLst>
+              </p:cTn>
+              <p:prevCondLst>
+                <p:cond evt="onPrev" delay="0">
+                  <p:tgtEl>
+                    <p:sldTgt/>
+                  </p:tgtEl>
+                </p:cond>
+              </p:prevCondLst>
+              <p:nextCondLst>
+                <p:cond evt="onNext" delay="0">
+                  <p:tgtEl>
+                    <p:sldTgt/>
+                  </p:tgtEl>
+                </p:cond>
+              </p:nextCondLst>
+            </p:seq>
+          </p:childTnLst>
+        </p:cTn>
+      </p:par>
+    </p:tnLst>
+    <p:bldLst>
+      <p:bldP spid="5" grpId="0" animBg="1"/>
+      <p:bldP spid="6" grpId="0" animBg="1"/>
+    </p:bldLst>
   </p:timing>
 </p:sld>
 </file>

</xml_diff>

<commit_message>
Added slides on paths, clades
</commit_message>
<xml_diff>
--- a/Python/biopython.pptx
+++ b/Python/biopython.pptx
@@ -5,7 +5,7 @@
     <p:sldMasterId id="2147483660" r:id="rId1"/>
   </p:sldMasterIdLst>
   <p:notesMasterIdLst>
-    <p:notesMasterId r:id="rId26"/>
+    <p:notesMasterId r:id="rId28"/>
   </p:notesMasterIdLst>
   <p:sldIdLst>
     <p:sldId id="256" r:id="rId2"/>
@@ -32,6 +32,8 @@
     <p:sldId id="277" r:id="rId23"/>
     <p:sldId id="278" r:id="rId24"/>
     <p:sldId id="279" r:id="rId25"/>
+    <p:sldId id="280" r:id="rId26"/>
+    <p:sldId id="281" r:id="rId27"/>
   </p:sldIdLst>
   <p:sldSz cx="9144000" cy="6858000" type="screen4x3"/>
   <p:notesSz cx="6858000" cy="9144000"/>
@@ -220,7 +222,7 @@
           <a:p>
             <a:fld id="{E50739E9-DC4A-4901-8195-7CE430F840D8}" type="datetimeFigureOut">
               <a:rPr lang="en-US" smtClean="0"/>
-              <a:t>2016-08-03</a:t>
+              <a:t>2016-08-04</a:t>
             </a:fld>
             <a:endParaRPr lang="en-US"/>
           </a:p>
@@ -703,7 +705,7 @@
           <a:p>
             <a:fld id="{EBC2714F-B822-455B-B016-0228B6AA8BE9}" type="datetime1">
               <a:rPr lang="en-US" smtClean="0"/>
-              <a:t>2016-08-03</a:t>
+              <a:t>2016-08-04</a:t>
             </a:fld>
             <a:endParaRPr lang="en-US"/>
           </a:p>
@@ -873,7 +875,7 @@
           <a:p>
             <a:fld id="{F3822F19-B516-497C-9005-1997989AD109}" type="datetime1">
               <a:rPr lang="en-US" smtClean="0"/>
-              <a:t>2016-08-03</a:t>
+              <a:t>2016-08-04</a:t>
             </a:fld>
             <a:endParaRPr lang="en-US"/>
           </a:p>
@@ -1053,7 +1055,7 @@
           <a:p>
             <a:fld id="{DC6E6076-3AC8-4591-A5B3-5701E86BC391}" type="datetime1">
               <a:rPr lang="en-US" smtClean="0"/>
-              <a:t>2016-08-03</a:t>
+              <a:t>2016-08-04</a:t>
             </a:fld>
             <a:endParaRPr lang="en-US"/>
           </a:p>
@@ -1223,7 +1225,7 @@
           <a:p>
             <a:fld id="{10101B39-3B57-4A7B-8CB6-E6BDB118061D}" type="datetime1">
               <a:rPr lang="en-US" smtClean="0"/>
-              <a:t>2016-08-03</a:t>
+              <a:t>2016-08-04</a:t>
             </a:fld>
             <a:endParaRPr lang="en-US"/>
           </a:p>
@@ -1467,7 +1469,7 @@
           <a:p>
             <a:fld id="{C27B26EE-8ECF-4FF3-9A38-87EFFDA62A28}" type="datetime1">
               <a:rPr lang="en-US" smtClean="0"/>
-              <a:t>2016-08-03</a:t>
+              <a:t>2016-08-04</a:t>
             </a:fld>
             <a:endParaRPr lang="en-US"/>
           </a:p>
@@ -1699,7 +1701,7 @@
           <a:p>
             <a:fld id="{6742683C-23EC-4C0D-AC9A-17C98B40DAA7}" type="datetime1">
               <a:rPr lang="en-US" smtClean="0"/>
-              <a:t>2016-08-03</a:t>
+              <a:t>2016-08-04</a:t>
             </a:fld>
             <a:endParaRPr lang="en-US"/>
           </a:p>
@@ -2066,7 +2068,7 @@
           <a:p>
             <a:fld id="{61B639F5-7095-4C4C-8D13-AB3C116C2681}" type="datetime1">
               <a:rPr lang="en-US" smtClean="0"/>
-              <a:t>2016-08-03</a:t>
+              <a:t>2016-08-04</a:t>
             </a:fld>
             <a:endParaRPr lang="en-US"/>
           </a:p>
@@ -2184,7 +2186,7 @@
           <a:p>
             <a:fld id="{565C75B5-128F-4C63-85A2-EABB3B9088B2}" type="datetime1">
               <a:rPr lang="en-US" smtClean="0"/>
-              <a:t>2016-08-03</a:t>
+              <a:t>2016-08-04</a:t>
             </a:fld>
             <a:endParaRPr lang="en-US"/>
           </a:p>
@@ -2279,7 +2281,7 @@
           <a:p>
             <a:fld id="{EB500747-7144-41D3-89B7-0E40926A8757}" type="datetime1">
               <a:rPr lang="en-US" smtClean="0"/>
-              <a:t>2016-08-03</a:t>
+              <a:t>2016-08-04</a:t>
             </a:fld>
             <a:endParaRPr lang="en-US"/>
           </a:p>
@@ -2556,7 +2558,7 @@
           <a:p>
             <a:fld id="{09A9D774-0B51-4CD9-9147-A6BD4D353F07}" type="datetime1">
               <a:rPr lang="en-US" smtClean="0"/>
-              <a:t>2016-08-03</a:t>
+              <a:t>2016-08-04</a:t>
             </a:fld>
             <a:endParaRPr lang="en-US"/>
           </a:p>
@@ -2813,7 +2815,7 @@
           <a:p>
             <a:fld id="{2618F069-DB72-4F16-8512-37A179AE1774}" type="datetime1">
               <a:rPr lang="en-US" smtClean="0"/>
-              <a:t>2016-08-03</a:t>
+              <a:t>2016-08-04</a:t>
             </a:fld>
             <a:endParaRPr lang="en-US"/>
           </a:p>
@@ -3026,7 +3028,7 @@
           <a:p>
             <a:fld id="{7784AB71-9685-428C-BE48-FB64D9C8B81F}" type="datetime1">
               <a:rPr lang="en-US" smtClean="0"/>
-              <a:t>2016-08-03</a:t>
+              <a:t>2016-08-04</a:t>
             </a:fld>
             <a:endParaRPr lang="en-US"/>
           </a:p>
@@ -11308,10 +11310,6 @@
               </a:rPr>
               <a:t>(tree)</a:t>
             </a:r>
-            <a:endParaRPr lang="en-US" dirty="0" smtClean="0">
-              <a:latin typeface="Courier New" panose="02070309020205020404" pitchFamily="49" charset="0"/>
-              <a:cs typeface="Courier New" panose="02070309020205020404" pitchFamily="49" charset="0"/>
-            </a:endParaRPr>
           </a:p>
         </p:txBody>
       </p:sp>
@@ -11525,7 +11523,7 @@
           <a:p>
             <a:r>
               <a:rPr lang="en-US" dirty="0" smtClean="0"/>
-              <a:t>Depths of clades</a:t>
+              <a:t>Total branch length</a:t>
             </a:r>
             <a:endParaRPr lang="en-US" dirty="0"/>
           </a:p>
@@ -11613,10 +11611,6 @@
               </a:rPr>
               <a:t>()</a:t>
             </a:r>
-            <a:endParaRPr lang="en-US" dirty="0" smtClean="0">
-              <a:latin typeface="Courier New" panose="02070309020205020404" pitchFamily="49" charset="0"/>
-              <a:cs typeface="Courier New" panose="02070309020205020404" pitchFamily="49" charset="0"/>
-            </a:endParaRPr>
           </a:p>
         </p:txBody>
       </p:sp>
@@ -11679,10 +11673,6 @@
               </a:rPr>
               <a:t>()</a:t>
             </a:r>
-            <a:endParaRPr lang="en-US" dirty="0" smtClean="0">
-              <a:latin typeface="Courier New" panose="02070309020205020404" pitchFamily="49" charset="0"/>
-              <a:cs typeface="Courier New" panose="02070309020205020404" pitchFamily="49" charset="0"/>
-            </a:endParaRPr>
           </a:p>
         </p:txBody>
       </p:sp>
@@ -11745,16 +11735,12 @@
               </a:rPr>
               <a:t>()</a:t>
             </a:r>
-            <a:endParaRPr lang="en-US" dirty="0" smtClean="0">
-              <a:latin typeface="Courier New" panose="02070309020205020404" pitchFamily="49" charset="0"/>
-              <a:cs typeface="Courier New" panose="02070309020205020404" pitchFamily="49" charset="0"/>
-            </a:endParaRPr>
           </a:p>
         </p:txBody>
       </p:sp>
       <p:sp>
         <p:nvSpPr>
-          <p:cNvPr id="8" name="TextBox 7"/>
+          <p:cNvPr id="10" name="TextBox 9"/>
           <p:cNvSpPr txBox="1"/>
           <p:nvPr/>
         </p:nvSpPr>
@@ -11784,71 +11770,30 @@
           <a:lstStyle/>
           <a:p>
             <a:r>
+              <a:rPr lang="en-US" dirty="0" smtClean="0">
+                <a:latin typeface="Courier New" panose="02070309020205020404" pitchFamily="49" charset="0"/>
+                <a:cs typeface="Courier New" panose="02070309020205020404" pitchFamily="49" charset="0"/>
+              </a:rPr>
+              <a:t>print(</a:t>
+            </a:r>
+            <a:r>
               <a:rPr lang="en-US" dirty="0" err="1" smtClean="0">
                 <a:latin typeface="Courier New" panose="02070309020205020404" pitchFamily="49" charset="0"/>
                 <a:cs typeface="Courier New" panose="02070309020205020404" pitchFamily="49" charset="0"/>
               </a:rPr>
-              <a:t>clade_depths</a:t>
+              <a:t>tree.total_branch_length</a:t>
             </a:r>
             <a:r>
               <a:rPr lang="en-US" dirty="0" smtClean="0">
                 <a:latin typeface="Courier New" panose="02070309020205020404" pitchFamily="49" charset="0"/>
                 <a:cs typeface="Courier New" panose="02070309020205020404" pitchFamily="49" charset="0"/>
               </a:rPr>
-              <a:t> = </a:t>
-            </a:r>
-            <a:r>
-              <a:rPr lang="en-US" dirty="0" err="1" smtClean="0">
-                <a:latin typeface="Courier New" panose="02070309020205020404" pitchFamily="49" charset="0"/>
-                <a:cs typeface="Courier New" panose="02070309020205020404" pitchFamily="49" charset="0"/>
-              </a:rPr>
-              <a:t>tree.depths</a:t>
-            </a:r>
-            <a:r>
-              <a:rPr lang="en-US" dirty="0" smtClean="0">
-                <a:latin typeface="Courier New" panose="02070309020205020404" pitchFamily="49" charset="0"/>
-                <a:cs typeface="Courier New" panose="02070309020205020404" pitchFamily="49" charset="0"/>
-              </a:rPr>
-              <a:t>()</a:t>
+              <a:t>())</a:t>
             </a:r>
             <a:endParaRPr lang="en-US" dirty="0" smtClean="0">
               <a:latin typeface="Courier New" panose="02070309020205020404" pitchFamily="49" charset="0"/>
               <a:cs typeface="Courier New" panose="02070309020205020404" pitchFamily="49" charset="0"/>
             </a:endParaRPr>
-          </a:p>
-        </p:txBody>
-      </p:sp>
-      <p:sp>
-        <p:nvSpPr>
-          <p:cNvPr id="9" name="TextBox 8"/>
-          <p:cNvSpPr txBox="1"/>
-          <p:nvPr/>
-        </p:nvSpPr>
-        <p:spPr>
-          <a:xfrm>
-            <a:off x="2389909" y="6030036"/>
-            <a:ext cx="4761496" cy="461665"/>
-          </a:xfrm>
-          <a:prstGeom prst="rect">
-            <a:avLst/>
-          </a:prstGeom>
-          <a:noFill/>
-        </p:spPr>
-        <p:txBody>
-          <a:bodyPr wrap="none" rtlCol="0">
-            <a:spAutoFit/>
-          </a:bodyPr>
-          <a:lstStyle/>
-          <a:p>
-            <a:r>
-              <a:rPr lang="en-US" sz="2400" dirty="0" err="1" smtClean="0"/>
-              <a:t>dict</a:t>
-            </a:r>
-            <a:r>
-              <a:rPr lang="en-US" sz="2400" dirty="0" smtClean="0"/>
-              <a:t> with keys: clades, values: depths</a:t>
-            </a:r>
-            <a:endParaRPr lang="en-US" dirty="0"/>
           </a:p>
         </p:txBody>
       </p:sp>
@@ -11980,7 +11925,7 @@
                                           </p:stCondLst>
                                         </p:cTn>
                                         <p:tgtEl>
-                                          <p:spTgt spid="8"/>
+                                          <p:spTgt spid="10"/>
                                         </p:tgtEl>
                                         <p:attrNameLst>
                                           <p:attrName>style.visibility</p:attrName>
@@ -12024,7 +11969,7 @@
       <p:bldP spid="5" grpId="0" animBg="1"/>
       <p:bldP spid="6" grpId="0" animBg="1"/>
       <p:bldP spid="7" grpId="0" animBg="1"/>
-      <p:bldP spid="8" grpId="0" animBg="1"/>
+      <p:bldP spid="10" grpId="0" animBg="1"/>
     </p:bldLst>
   </p:timing>
 </p:sld>
@@ -12082,7 +12027,9 @@
         </p:nvSpPr>
         <p:spPr/>
         <p:txBody>
-          <a:bodyPr/>
+          <a:bodyPr>
+            <a:normAutofit lnSpcReduction="10000"/>
+          </a:bodyPr>
           <a:lstStyle/>
           <a:p>
             <a:r>
@@ -12105,7 +12052,24 @@
           <a:p>
             <a:r>
               <a:rPr lang="en-US" dirty="0" smtClean="0"/>
-              <a:t>Other properties</a:t>
+              <a:t>List of c</a:t>
+            </a:r>
+            <a:r>
+              <a:rPr lang="en-US" dirty="0" smtClean="0"/>
+              <a:t>hildren</a:t>
+            </a:r>
+          </a:p>
+          <a:p>
+            <a:endParaRPr lang="en-US" dirty="0" smtClean="0"/>
+          </a:p>
+          <a:p>
+            <a:r>
+              <a:rPr lang="en-US" dirty="0" smtClean="0"/>
+              <a:t>Other </a:t>
+            </a:r>
+            <a:r>
+              <a:rPr lang="en-US" dirty="0" smtClean="0"/>
+              <a:t>properties</a:t>
             </a:r>
           </a:p>
           <a:p>
@@ -12120,6 +12084,13 @@
             <a:r>
               <a:rPr lang="en-US" dirty="0" smtClean="0"/>
               <a:t>comment</a:t>
+            </a:r>
+          </a:p>
+          <a:p>
+            <a:pPr lvl="1"/>
+            <a:r>
+              <a:rPr lang="en-US" dirty="0" smtClean="0"/>
+              <a:t>confidence</a:t>
             </a:r>
             <a:endParaRPr lang="en-US" dirty="0"/>
           </a:p>
@@ -12156,8 +12127,8 @@
         </p:nvSpPr>
         <p:spPr>
           <a:xfrm>
-            <a:off x="807026" y="2337877"/>
-            <a:ext cx="5978238" cy="369332"/>
+            <a:off x="807026" y="2296313"/>
+            <a:ext cx="4565074" cy="369332"/>
           </a:xfrm>
           <a:prstGeom prst="rect">
             <a:avLst/>
@@ -12186,10 +12157,6 @@
               </a:rPr>
               <a:t>print(clade.name)</a:t>
             </a:r>
-            <a:endParaRPr lang="en-US" dirty="0" smtClean="0">
-              <a:latin typeface="Courier New" panose="02070309020205020404" pitchFamily="49" charset="0"/>
-              <a:cs typeface="Courier New" panose="02070309020205020404" pitchFamily="49" charset="0"/>
-            </a:endParaRPr>
           </a:p>
         </p:txBody>
       </p:sp>
@@ -12201,8 +12168,8 @@
         </p:nvSpPr>
         <p:spPr>
           <a:xfrm>
-            <a:off x="807026" y="3331941"/>
-            <a:ext cx="5978238" cy="369332"/>
+            <a:off x="807026" y="3228031"/>
+            <a:ext cx="4565074" cy="369332"/>
           </a:xfrm>
           <a:prstGeom prst="rect">
             <a:avLst/>
@@ -12237,6 +12204,61 @@
                 <a:cs typeface="Courier New" panose="02070309020205020404" pitchFamily="49" charset="0"/>
               </a:rPr>
               <a:t>clade.branch_length</a:t>
+            </a:r>
+            <a:r>
+              <a:rPr lang="en-US" dirty="0" smtClean="0">
+                <a:latin typeface="Courier New" panose="02070309020205020404" pitchFamily="49" charset="0"/>
+                <a:cs typeface="Courier New" panose="02070309020205020404" pitchFamily="49" charset="0"/>
+              </a:rPr>
+              <a:t>)</a:t>
+            </a:r>
+          </a:p>
+        </p:txBody>
+      </p:sp>
+      <p:sp>
+        <p:nvSpPr>
+          <p:cNvPr id="7" name="TextBox 6"/>
+          <p:cNvSpPr txBox="1"/>
+          <p:nvPr/>
+        </p:nvSpPr>
+        <p:spPr>
+          <a:xfrm>
+            <a:off x="807026" y="4141339"/>
+            <a:ext cx="4565074" cy="369332"/>
+          </a:xfrm>
+          <a:prstGeom prst="rect">
+            <a:avLst/>
+          </a:prstGeom>
+          <a:solidFill>
+            <a:schemeClr val="bg1">
+              <a:lumMod val="75000"/>
+            </a:schemeClr>
+          </a:solidFill>
+          <a:ln>
+            <a:solidFill>
+              <a:schemeClr val="tx1"/>
+            </a:solidFill>
+          </a:ln>
+        </p:spPr>
+        <p:txBody>
+          <a:bodyPr wrap="square" rtlCol="0">
+            <a:spAutoFit/>
+          </a:bodyPr>
+          <a:lstStyle/>
+          <a:p>
+            <a:r>
+              <a:rPr lang="en-US" dirty="0" smtClean="0">
+                <a:latin typeface="Courier New" panose="02070309020205020404" pitchFamily="49" charset="0"/>
+                <a:cs typeface="Courier New" panose="02070309020205020404" pitchFamily="49" charset="0"/>
+              </a:rPr>
+              <a:t>print(</a:t>
+            </a:r>
+            <a:r>
+              <a:rPr lang="en-US" dirty="0" err="1" smtClean="0">
+                <a:latin typeface="Courier New" panose="02070309020205020404" pitchFamily="49" charset="0"/>
+                <a:cs typeface="Courier New" panose="02070309020205020404" pitchFamily="49" charset="0"/>
+              </a:rPr>
+              <a:t>clade.clades</a:t>
             </a:r>
             <a:r>
               <a:rPr lang="en-US" dirty="0" smtClean="0">
@@ -12339,6 +12361,33 @@
                                   </p:childTnLst>
                                 </p:cTn>
                               </p:par>
+                              <p:par>
+                                <p:cTn id="9" presetID="1" presetClass="entr" presetSubtype="0" fill="hold" grpId="0" nodeType="withEffect">
+                                  <p:stCondLst>
+                                    <p:cond delay="0"/>
+                                  </p:stCondLst>
+                                  <p:childTnLst>
+                                    <p:set>
+                                      <p:cBhvr>
+                                        <p:cTn id="10" dur="1" fill="hold">
+                                          <p:stCondLst>
+                                            <p:cond delay="0"/>
+                                          </p:stCondLst>
+                                        </p:cTn>
+                                        <p:tgtEl>
+                                          <p:spTgt spid="7"/>
+                                        </p:tgtEl>
+                                        <p:attrNameLst>
+                                          <p:attrName>style.visibility</p:attrName>
+                                        </p:attrNameLst>
+                                      </p:cBhvr>
+                                      <p:to>
+                                        <p:strVal val="visible"/>
+                                      </p:to>
+                                    </p:set>
+                                  </p:childTnLst>
+                                </p:cTn>
+                              </p:par>
                             </p:childTnLst>
                           </p:cTn>
                         </p:par>
@@ -12369,6 +12418,1176 @@
     <p:bldLst>
       <p:bldP spid="5" grpId="0" animBg="1"/>
       <p:bldP spid="6" grpId="0" animBg="1"/>
+      <p:bldP spid="7" grpId="0" animBg="1"/>
+    </p:bldLst>
+  </p:timing>
+</p:sld>
+</file>
+
+<file path=ppt/slides/slide25.xml><?xml version="1.0" encoding="utf-8"?>
+<p:sld xmlns:a="http://schemas.openxmlformats.org/drawingml/2006/main" xmlns:r="http://schemas.openxmlformats.org/officeDocument/2006/relationships" xmlns:p="http://schemas.openxmlformats.org/presentationml/2006/main">
+  <p:cSld>
+    <p:spTree>
+      <p:nvGrpSpPr>
+        <p:cNvPr id="1" name=""/>
+        <p:cNvGrpSpPr/>
+        <p:nvPr/>
+      </p:nvGrpSpPr>
+      <p:grpSpPr>
+        <a:xfrm>
+          <a:off x="0" y="0"/>
+          <a:ext cx="0" cy="0"/>
+          <a:chOff x="0" y="0"/>
+          <a:chExt cx="0" cy="0"/>
+        </a:xfrm>
+      </p:grpSpPr>
+      <p:sp>
+        <p:nvSpPr>
+          <p:cNvPr id="2" name="Title 1"/>
+          <p:cNvSpPr>
+            <a:spLocks noGrp="1"/>
+          </p:cNvSpPr>
+          <p:nvPr>
+            <p:ph type="title"/>
+          </p:nvPr>
+        </p:nvSpPr>
+        <p:spPr/>
+        <p:txBody>
+          <a:bodyPr/>
+          <a:lstStyle/>
+          <a:p>
+            <a:r>
+              <a:rPr lang="en-US" dirty="0" smtClean="0"/>
+              <a:t>Path lengths</a:t>
+            </a:r>
+            <a:endParaRPr lang="en-US" dirty="0"/>
+          </a:p>
+        </p:txBody>
+      </p:sp>
+      <p:sp>
+        <p:nvSpPr>
+          <p:cNvPr id="3" name="Content Placeholder 2"/>
+          <p:cNvSpPr>
+            <a:spLocks noGrp="1"/>
+          </p:cNvSpPr>
+          <p:nvPr>
+            <p:ph idx="1"/>
+          </p:nvPr>
+        </p:nvSpPr>
+        <p:spPr/>
+        <p:txBody>
+          <a:bodyPr/>
+          <a:lstStyle/>
+          <a:p>
+            <a:r>
+              <a:rPr lang="en-US" dirty="0" smtClean="0"/>
+              <a:t>Computing depth of all clades</a:t>
+            </a:r>
+          </a:p>
+          <a:p>
+            <a:pPr lvl="1"/>
+            <a:r>
+              <a:rPr lang="en-US" dirty="0" err="1"/>
+              <a:t>dict</a:t>
+            </a:r>
+            <a:r>
+              <a:rPr lang="en-US" dirty="0"/>
+              <a:t> with keys: clades, values: </a:t>
+            </a:r>
+            <a:r>
+              <a:rPr lang="en-US" dirty="0" smtClean="0"/>
+              <a:t>depths</a:t>
+            </a:r>
+          </a:p>
+          <a:p>
+            <a:pPr lvl="1"/>
+            <a:endParaRPr lang="en-US" dirty="0"/>
+          </a:p>
+          <a:p>
+            <a:pPr lvl="1"/>
+            <a:endParaRPr lang="en-US" dirty="0" smtClean="0"/>
+          </a:p>
+          <a:p>
+            <a:pPr lvl="1"/>
+            <a:r>
+              <a:rPr lang="en-US" dirty="0" smtClean="0"/>
+              <a:t>what is the minimum distance from root to terminal clade?</a:t>
+            </a:r>
+          </a:p>
+          <a:p>
+            <a:pPr lvl="1"/>
+            <a:endParaRPr lang="en-US" dirty="0"/>
+          </a:p>
+          <a:p>
+            <a:pPr lvl="1"/>
+            <a:endParaRPr lang="en-US" dirty="0" smtClean="0"/>
+          </a:p>
+          <a:p>
+            <a:pPr lvl="1"/>
+            <a:r>
+              <a:rPr lang="en-US" dirty="0" smtClean="0"/>
+              <a:t>which is the terminal clade with the minimum distance to root?</a:t>
+            </a:r>
+            <a:endParaRPr lang="en-US" dirty="0"/>
+          </a:p>
+          <a:p>
+            <a:pPr lvl="1"/>
+            <a:endParaRPr lang="en-US" dirty="0"/>
+          </a:p>
+        </p:txBody>
+      </p:sp>
+      <p:sp>
+        <p:nvSpPr>
+          <p:cNvPr id="4" name="Slide Number Placeholder 3"/>
+          <p:cNvSpPr>
+            <a:spLocks noGrp="1"/>
+          </p:cNvSpPr>
+          <p:nvPr>
+            <p:ph type="sldNum" sz="quarter" idx="12"/>
+          </p:nvPr>
+        </p:nvSpPr>
+        <p:spPr/>
+        <p:txBody>
+          <a:bodyPr/>
+          <a:lstStyle/>
+          <a:p>
+            <a:fld id="{CA586AD6-E5F2-4F25-940D-C674496063E2}" type="slidenum">
+              <a:rPr lang="en-US" smtClean="0"/>
+              <a:t>25</a:t>
+            </a:fld>
+            <a:endParaRPr lang="en-US"/>
+          </a:p>
+        </p:txBody>
+      </p:sp>
+      <p:sp>
+        <p:nvSpPr>
+          <p:cNvPr id="5" name="TextBox 4"/>
+          <p:cNvSpPr txBox="1"/>
+          <p:nvPr/>
+        </p:nvSpPr>
+        <p:spPr>
+          <a:xfrm>
+            <a:off x="807025" y="2788616"/>
+            <a:ext cx="6954983" cy="369332"/>
+          </a:xfrm>
+          <a:prstGeom prst="rect">
+            <a:avLst/>
+          </a:prstGeom>
+          <a:solidFill>
+            <a:schemeClr val="bg1">
+              <a:lumMod val="75000"/>
+            </a:schemeClr>
+          </a:solidFill>
+          <a:ln>
+            <a:solidFill>
+              <a:schemeClr val="tx1"/>
+            </a:solidFill>
+          </a:ln>
+        </p:spPr>
+        <p:txBody>
+          <a:bodyPr wrap="square" rtlCol="0">
+            <a:spAutoFit/>
+          </a:bodyPr>
+          <a:lstStyle/>
+          <a:p>
+            <a:r>
+              <a:rPr lang="en-US" dirty="0" err="1" smtClean="0">
+                <a:latin typeface="Courier New" panose="02070309020205020404" pitchFamily="49" charset="0"/>
+                <a:cs typeface="Courier New" panose="02070309020205020404" pitchFamily="49" charset="0"/>
+              </a:rPr>
+              <a:t>clade_depths</a:t>
+            </a:r>
+            <a:r>
+              <a:rPr lang="en-US" dirty="0" smtClean="0">
+                <a:latin typeface="Courier New" panose="02070309020205020404" pitchFamily="49" charset="0"/>
+                <a:cs typeface="Courier New" panose="02070309020205020404" pitchFamily="49" charset="0"/>
+              </a:rPr>
+              <a:t> = </a:t>
+            </a:r>
+            <a:r>
+              <a:rPr lang="en-US" dirty="0" err="1" smtClean="0">
+                <a:latin typeface="Courier New" panose="02070309020205020404" pitchFamily="49" charset="0"/>
+                <a:cs typeface="Courier New" panose="02070309020205020404" pitchFamily="49" charset="0"/>
+              </a:rPr>
+              <a:t>tree.depths</a:t>
+            </a:r>
+            <a:r>
+              <a:rPr lang="en-US" dirty="0" smtClean="0">
+                <a:latin typeface="Courier New" panose="02070309020205020404" pitchFamily="49" charset="0"/>
+                <a:cs typeface="Courier New" panose="02070309020205020404" pitchFamily="49" charset="0"/>
+              </a:rPr>
+              <a:t>()</a:t>
+            </a:r>
+          </a:p>
+        </p:txBody>
+      </p:sp>
+      <p:sp>
+        <p:nvSpPr>
+          <p:cNvPr id="7" name="TextBox 6"/>
+          <p:cNvSpPr txBox="1"/>
+          <p:nvPr/>
+        </p:nvSpPr>
+        <p:spPr>
+          <a:xfrm>
+            <a:off x="807025" y="4277342"/>
+            <a:ext cx="6954984" cy="369332"/>
+          </a:xfrm>
+          <a:prstGeom prst="rect">
+            <a:avLst/>
+          </a:prstGeom>
+          <a:solidFill>
+            <a:schemeClr val="bg1">
+              <a:lumMod val="75000"/>
+            </a:schemeClr>
+          </a:solidFill>
+          <a:ln>
+            <a:solidFill>
+              <a:schemeClr val="tx1"/>
+            </a:solidFill>
+          </a:ln>
+        </p:spPr>
+        <p:txBody>
+          <a:bodyPr wrap="square" rtlCol="0">
+            <a:spAutoFit/>
+          </a:bodyPr>
+          <a:lstStyle/>
+          <a:p>
+            <a:r>
+              <a:rPr lang="en-US" dirty="0" smtClean="0">
+                <a:latin typeface="Courier New" panose="02070309020205020404" pitchFamily="49" charset="0"/>
+                <a:cs typeface="Courier New" panose="02070309020205020404" pitchFamily="49" charset="0"/>
+              </a:rPr>
+              <a:t>min(</a:t>
+            </a:r>
+            <a:r>
+              <a:rPr lang="en-US" dirty="0" err="1" smtClean="0">
+                <a:latin typeface="Courier New" panose="02070309020205020404" pitchFamily="49" charset="0"/>
+                <a:cs typeface="Courier New" panose="02070309020205020404" pitchFamily="49" charset="0"/>
+              </a:rPr>
+              <a:t>clade_depths</a:t>
+            </a:r>
+            <a:r>
+              <a:rPr lang="en-US" dirty="0" smtClean="0">
+                <a:latin typeface="Courier New" panose="02070309020205020404" pitchFamily="49" charset="0"/>
+                <a:cs typeface="Courier New" panose="02070309020205020404" pitchFamily="49" charset="0"/>
+              </a:rPr>
+              <a:t>[t] for t in </a:t>
+            </a:r>
+            <a:r>
+              <a:rPr lang="en-US" dirty="0" err="1" smtClean="0">
+                <a:latin typeface="Courier New" panose="02070309020205020404" pitchFamily="49" charset="0"/>
+                <a:cs typeface="Courier New" panose="02070309020205020404" pitchFamily="49" charset="0"/>
+              </a:rPr>
+              <a:t>tree.get_terminals</a:t>
+            </a:r>
+            <a:r>
+              <a:rPr lang="en-US" dirty="0" smtClean="0">
+                <a:latin typeface="Courier New" panose="02070309020205020404" pitchFamily="49" charset="0"/>
+                <a:cs typeface="Courier New" panose="02070309020205020404" pitchFamily="49" charset="0"/>
+              </a:rPr>
+              <a:t>()</a:t>
+            </a:r>
+            <a:endParaRPr lang="en-US" dirty="0" smtClean="0">
+              <a:latin typeface="Courier New" panose="02070309020205020404" pitchFamily="49" charset="0"/>
+              <a:cs typeface="Courier New" panose="02070309020205020404" pitchFamily="49" charset="0"/>
+            </a:endParaRPr>
+          </a:p>
+        </p:txBody>
+      </p:sp>
+      <p:sp>
+        <p:nvSpPr>
+          <p:cNvPr id="8" name="TextBox 7"/>
+          <p:cNvSpPr txBox="1"/>
+          <p:nvPr/>
+        </p:nvSpPr>
+        <p:spPr>
+          <a:xfrm>
+            <a:off x="807024" y="5807631"/>
+            <a:ext cx="6954984" cy="923330"/>
+          </a:xfrm>
+          <a:prstGeom prst="rect">
+            <a:avLst/>
+          </a:prstGeom>
+          <a:solidFill>
+            <a:schemeClr val="bg1">
+              <a:lumMod val="75000"/>
+            </a:schemeClr>
+          </a:solidFill>
+          <a:ln>
+            <a:solidFill>
+              <a:schemeClr val="tx1"/>
+            </a:solidFill>
+          </a:ln>
+        </p:spPr>
+        <p:txBody>
+          <a:bodyPr wrap="square" rtlCol="0">
+            <a:spAutoFit/>
+          </a:bodyPr>
+          <a:lstStyle/>
+          <a:p>
+            <a:r>
+              <a:rPr lang="en-US" dirty="0" smtClean="0">
+                <a:latin typeface="Courier New" panose="02070309020205020404" pitchFamily="49" charset="0"/>
+                <a:cs typeface="Courier New" panose="02070309020205020404" pitchFamily="49" charset="0"/>
+              </a:rPr>
+              <a:t>min(((</a:t>
+            </a:r>
+            <a:r>
+              <a:rPr lang="en-US" dirty="0" smtClean="0">
+                <a:latin typeface="Courier New" panose="02070309020205020404" pitchFamily="49" charset="0"/>
+                <a:cs typeface="Courier New" panose="02070309020205020404" pitchFamily="49" charset="0"/>
+              </a:rPr>
+              <a:t>t.name, </a:t>
+            </a:r>
+            <a:r>
+              <a:rPr lang="en-US" dirty="0" err="1" smtClean="0">
+                <a:latin typeface="Courier New" panose="02070309020205020404" pitchFamily="49" charset="0"/>
+                <a:cs typeface="Courier New" panose="02070309020205020404" pitchFamily="49" charset="0"/>
+              </a:rPr>
+              <a:t>clade_depths</a:t>
+            </a:r>
+            <a:r>
+              <a:rPr lang="en-US" dirty="0" smtClean="0">
+                <a:latin typeface="Courier New" panose="02070309020205020404" pitchFamily="49" charset="0"/>
+                <a:cs typeface="Courier New" panose="02070309020205020404" pitchFamily="49" charset="0"/>
+              </a:rPr>
+              <a:t>[t])</a:t>
+            </a:r>
+          </a:p>
+          <a:p>
+            <a:r>
+              <a:rPr lang="en-US" dirty="0">
+                <a:latin typeface="Courier New" panose="02070309020205020404" pitchFamily="49" charset="0"/>
+                <a:cs typeface="Courier New" panose="02070309020205020404" pitchFamily="49" charset="0"/>
+              </a:rPr>
+              <a:t> </a:t>
+            </a:r>
+            <a:r>
+              <a:rPr lang="en-US" dirty="0" smtClean="0">
+                <a:latin typeface="Courier New" panose="02070309020205020404" pitchFamily="49" charset="0"/>
+                <a:cs typeface="Courier New" panose="02070309020205020404" pitchFamily="49" charset="0"/>
+              </a:rPr>
+              <a:t>   </a:t>
+            </a:r>
+            <a:r>
+              <a:rPr lang="en-US" dirty="0" smtClean="0">
+                <a:latin typeface="Courier New" panose="02070309020205020404" pitchFamily="49" charset="0"/>
+                <a:cs typeface="Courier New" panose="02070309020205020404" pitchFamily="49" charset="0"/>
+              </a:rPr>
+              <a:t>for t in </a:t>
+            </a:r>
+            <a:r>
+              <a:rPr lang="en-US" dirty="0" err="1" smtClean="0">
+                <a:latin typeface="Courier New" panose="02070309020205020404" pitchFamily="49" charset="0"/>
+                <a:cs typeface="Courier New" panose="02070309020205020404" pitchFamily="49" charset="0"/>
+              </a:rPr>
+              <a:t>tree.get_terminals</a:t>
+            </a:r>
+            <a:r>
+              <a:rPr lang="en-US" dirty="0" smtClean="0">
+                <a:latin typeface="Courier New" panose="02070309020205020404" pitchFamily="49" charset="0"/>
+                <a:cs typeface="Courier New" panose="02070309020205020404" pitchFamily="49" charset="0"/>
+              </a:rPr>
+              <a:t>()),</a:t>
+            </a:r>
+          </a:p>
+          <a:p>
+            <a:r>
+              <a:rPr lang="en-US" dirty="0">
+                <a:latin typeface="Courier New" panose="02070309020205020404" pitchFamily="49" charset="0"/>
+                <a:cs typeface="Courier New" panose="02070309020205020404" pitchFamily="49" charset="0"/>
+              </a:rPr>
+              <a:t> </a:t>
+            </a:r>
+            <a:r>
+              <a:rPr lang="en-US" dirty="0" smtClean="0">
+                <a:latin typeface="Courier New" panose="02070309020205020404" pitchFamily="49" charset="0"/>
+                <a:cs typeface="Courier New" panose="02070309020205020404" pitchFamily="49" charset="0"/>
+              </a:rPr>
+              <a:t>   key=lambda x: x[1])</a:t>
+            </a:r>
+            <a:endParaRPr lang="en-US" dirty="0" smtClean="0">
+              <a:latin typeface="Courier New" panose="02070309020205020404" pitchFamily="49" charset="0"/>
+              <a:cs typeface="Courier New" panose="02070309020205020404" pitchFamily="49" charset="0"/>
+            </a:endParaRPr>
+          </a:p>
+        </p:txBody>
+      </p:sp>
+    </p:spTree>
+    <p:extLst>
+      <p:ext uri="{BB962C8B-B14F-4D97-AF65-F5344CB8AC3E}">
+        <p14:creationId xmlns:p14="http://schemas.microsoft.com/office/powerpoint/2010/main" val="2036342768"/>
+      </p:ext>
+    </p:extLst>
+  </p:cSld>
+  <p:clrMapOvr>
+    <a:masterClrMapping/>
+  </p:clrMapOvr>
+  <p:timing>
+    <p:tnLst>
+      <p:par>
+        <p:cTn id="1" dur="indefinite" restart="never" nodeType="tmRoot">
+          <p:childTnLst>
+            <p:seq concurrent="1" nextAc="seek">
+              <p:cTn id="2" dur="indefinite" nodeType="mainSeq">
+                <p:childTnLst>
+                  <p:par>
+                    <p:cTn id="3" fill="hold">
+                      <p:stCondLst>
+                        <p:cond delay="indefinite"/>
+                        <p:cond evt="onBegin" delay="0">
+                          <p:tn val="2"/>
+                        </p:cond>
+                      </p:stCondLst>
+                      <p:childTnLst>
+                        <p:par>
+                          <p:cTn id="4" fill="hold">
+                            <p:stCondLst>
+                              <p:cond delay="0"/>
+                            </p:stCondLst>
+                            <p:childTnLst>
+                              <p:par>
+                                <p:cTn id="5" presetID="1" presetClass="entr" presetSubtype="0" fill="hold" grpId="0" nodeType="withEffect">
+                                  <p:stCondLst>
+                                    <p:cond delay="0"/>
+                                  </p:stCondLst>
+                                  <p:childTnLst>
+                                    <p:set>
+                                      <p:cBhvr>
+                                        <p:cTn id="6" dur="1" fill="hold">
+                                          <p:stCondLst>
+                                            <p:cond delay="0"/>
+                                          </p:stCondLst>
+                                        </p:cTn>
+                                        <p:tgtEl>
+                                          <p:spTgt spid="5"/>
+                                        </p:tgtEl>
+                                        <p:attrNameLst>
+                                          <p:attrName>style.visibility</p:attrName>
+                                        </p:attrNameLst>
+                                      </p:cBhvr>
+                                      <p:to>
+                                        <p:strVal val="visible"/>
+                                      </p:to>
+                                    </p:set>
+                                  </p:childTnLst>
+                                </p:cTn>
+                              </p:par>
+                              <p:par>
+                                <p:cTn id="7" presetID="1" presetClass="entr" presetSubtype="0" fill="hold" grpId="0" nodeType="withEffect">
+                                  <p:stCondLst>
+                                    <p:cond delay="0"/>
+                                  </p:stCondLst>
+                                  <p:childTnLst>
+                                    <p:set>
+                                      <p:cBhvr>
+                                        <p:cTn id="8" dur="1" fill="hold">
+                                          <p:stCondLst>
+                                            <p:cond delay="0"/>
+                                          </p:stCondLst>
+                                        </p:cTn>
+                                        <p:tgtEl>
+                                          <p:spTgt spid="7"/>
+                                        </p:tgtEl>
+                                        <p:attrNameLst>
+                                          <p:attrName>style.visibility</p:attrName>
+                                        </p:attrNameLst>
+                                      </p:cBhvr>
+                                      <p:to>
+                                        <p:strVal val="visible"/>
+                                      </p:to>
+                                    </p:set>
+                                  </p:childTnLst>
+                                </p:cTn>
+                              </p:par>
+                              <p:par>
+                                <p:cTn id="9" presetID="1" presetClass="entr" presetSubtype="0" fill="hold" grpId="0" nodeType="withEffect">
+                                  <p:stCondLst>
+                                    <p:cond delay="0"/>
+                                  </p:stCondLst>
+                                  <p:childTnLst>
+                                    <p:set>
+                                      <p:cBhvr>
+                                        <p:cTn id="10" dur="1" fill="hold">
+                                          <p:stCondLst>
+                                            <p:cond delay="0"/>
+                                          </p:stCondLst>
+                                        </p:cTn>
+                                        <p:tgtEl>
+                                          <p:spTgt spid="8"/>
+                                        </p:tgtEl>
+                                        <p:attrNameLst>
+                                          <p:attrName>style.visibility</p:attrName>
+                                        </p:attrNameLst>
+                                      </p:cBhvr>
+                                      <p:to>
+                                        <p:strVal val="visible"/>
+                                      </p:to>
+                                    </p:set>
+                                  </p:childTnLst>
+                                </p:cTn>
+                              </p:par>
+                            </p:childTnLst>
+                          </p:cTn>
+                        </p:par>
+                      </p:childTnLst>
+                    </p:cTn>
+                  </p:par>
+                </p:childTnLst>
+              </p:cTn>
+              <p:prevCondLst>
+                <p:cond evt="onPrev" delay="0">
+                  <p:tgtEl>
+                    <p:sldTgt/>
+                  </p:tgtEl>
+                </p:cond>
+              </p:prevCondLst>
+              <p:nextCondLst>
+                <p:cond evt="onNext" delay="0">
+                  <p:tgtEl>
+                    <p:sldTgt/>
+                  </p:tgtEl>
+                </p:cond>
+              </p:nextCondLst>
+            </p:seq>
+          </p:childTnLst>
+        </p:cTn>
+      </p:par>
+    </p:tnLst>
+    <p:bldLst>
+      <p:bldP spid="5" grpId="0" animBg="1"/>
+      <p:bldP spid="7" grpId="0" animBg="1"/>
+      <p:bldP spid="8" grpId="0" animBg="1"/>
+    </p:bldLst>
+  </p:timing>
+</p:sld>
+</file>
+
+<file path=ppt/slides/slide26.xml><?xml version="1.0" encoding="utf-8"?>
+<p:sld xmlns:a="http://schemas.openxmlformats.org/drawingml/2006/main" xmlns:r="http://schemas.openxmlformats.org/officeDocument/2006/relationships" xmlns:p="http://schemas.openxmlformats.org/presentationml/2006/main">
+  <p:cSld>
+    <p:spTree>
+      <p:nvGrpSpPr>
+        <p:cNvPr id="1" name=""/>
+        <p:cNvGrpSpPr/>
+        <p:nvPr/>
+      </p:nvGrpSpPr>
+      <p:grpSpPr>
+        <a:xfrm>
+          <a:off x="0" y="0"/>
+          <a:ext cx="0" cy="0"/>
+          <a:chOff x="0" y="0"/>
+          <a:chExt cx="0" cy="0"/>
+        </a:xfrm>
+      </p:grpSpPr>
+      <p:sp>
+        <p:nvSpPr>
+          <p:cNvPr id="2" name="Title 1"/>
+          <p:cNvSpPr>
+            <a:spLocks noGrp="1"/>
+          </p:cNvSpPr>
+          <p:nvPr>
+            <p:ph type="title"/>
+          </p:nvPr>
+        </p:nvSpPr>
+        <p:spPr/>
+        <p:txBody>
+          <a:bodyPr/>
+          <a:lstStyle/>
+          <a:p>
+            <a:r>
+              <a:rPr lang="en-US" dirty="0" smtClean="0"/>
+              <a:t>Navigating the tree</a:t>
+            </a:r>
+            <a:endParaRPr lang="en-US" dirty="0"/>
+          </a:p>
+        </p:txBody>
+      </p:sp>
+      <p:sp>
+        <p:nvSpPr>
+          <p:cNvPr id="3" name="Content Placeholder 2"/>
+          <p:cNvSpPr>
+            <a:spLocks noGrp="1"/>
+          </p:cNvSpPr>
+          <p:nvPr>
+            <p:ph idx="1"/>
+          </p:nvPr>
+        </p:nvSpPr>
+        <p:spPr/>
+        <p:txBody>
+          <a:bodyPr/>
+          <a:lstStyle/>
+          <a:p>
+            <a:r>
+              <a:rPr lang="en-US" dirty="0" smtClean="0"/>
+              <a:t>Get path to descendant</a:t>
+            </a:r>
+          </a:p>
+          <a:p>
+            <a:endParaRPr lang="en-US" dirty="0"/>
+          </a:p>
+          <a:p>
+            <a:endParaRPr lang="en-US" dirty="0" smtClean="0"/>
+          </a:p>
+          <a:p>
+            <a:endParaRPr lang="en-US" dirty="0"/>
+          </a:p>
+          <a:p>
+            <a:endParaRPr lang="en-US" dirty="0" smtClean="0"/>
+          </a:p>
+          <a:p>
+            <a:endParaRPr lang="en-US" dirty="0"/>
+          </a:p>
+          <a:p>
+            <a:r>
+              <a:rPr lang="en-US" dirty="0" smtClean="0"/>
+              <a:t>Get common ancestor</a:t>
+            </a:r>
+            <a:endParaRPr lang="en-US" dirty="0"/>
+          </a:p>
+        </p:txBody>
+      </p:sp>
+      <p:sp>
+        <p:nvSpPr>
+          <p:cNvPr id="4" name="Slide Number Placeholder 3"/>
+          <p:cNvSpPr>
+            <a:spLocks noGrp="1"/>
+          </p:cNvSpPr>
+          <p:nvPr>
+            <p:ph type="sldNum" sz="quarter" idx="12"/>
+          </p:nvPr>
+        </p:nvSpPr>
+        <p:spPr/>
+        <p:txBody>
+          <a:bodyPr/>
+          <a:lstStyle/>
+          <a:p>
+            <a:fld id="{CA586AD6-E5F2-4F25-940D-C674496063E2}" type="slidenum">
+              <a:rPr lang="en-US" smtClean="0"/>
+              <a:t>26</a:t>
+            </a:fld>
+            <a:endParaRPr lang="en-US"/>
+          </a:p>
+        </p:txBody>
+      </p:sp>
+      <p:sp>
+        <p:nvSpPr>
+          <p:cNvPr id="5" name="TextBox 4"/>
+          <p:cNvSpPr txBox="1"/>
+          <p:nvPr/>
+        </p:nvSpPr>
+        <p:spPr>
+          <a:xfrm>
+            <a:off x="807025" y="2393758"/>
+            <a:ext cx="6954983" cy="369332"/>
+          </a:xfrm>
+          <a:prstGeom prst="rect">
+            <a:avLst/>
+          </a:prstGeom>
+          <a:solidFill>
+            <a:schemeClr val="bg1">
+              <a:lumMod val="75000"/>
+            </a:schemeClr>
+          </a:solidFill>
+          <a:ln>
+            <a:solidFill>
+              <a:schemeClr val="tx1"/>
+            </a:solidFill>
+          </a:ln>
+        </p:spPr>
+        <p:txBody>
+          <a:bodyPr wrap="square" rtlCol="0">
+            <a:spAutoFit/>
+          </a:bodyPr>
+          <a:lstStyle/>
+          <a:p>
+            <a:r>
+              <a:rPr lang="en-US" dirty="0" err="1" smtClean="0">
+                <a:latin typeface="Courier New" panose="02070309020205020404" pitchFamily="49" charset="0"/>
+                <a:cs typeface="Courier New" panose="02070309020205020404" pitchFamily="49" charset="0"/>
+              </a:rPr>
+              <a:t>root.get_path</a:t>
+            </a:r>
+            <a:r>
+              <a:rPr lang="en-US" dirty="0" smtClean="0">
+                <a:latin typeface="Courier New" panose="02070309020205020404" pitchFamily="49" charset="0"/>
+                <a:cs typeface="Courier New" panose="02070309020205020404" pitchFamily="49" charset="0"/>
+              </a:rPr>
+              <a:t>(</a:t>
+            </a:r>
+            <a:r>
+              <a:rPr lang="en-US" dirty="0" err="1" smtClean="0">
+                <a:latin typeface="Courier New" panose="02070309020205020404" pitchFamily="49" charset="0"/>
+                <a:cs typeface="Courier New" panose="02070309020205020404" pitchFamily="49" charset="0"/>
+              </a:rPr>
+              <a:t>terminal_clades</a:t>
+            </a:r>
+            <a:r>
+              <a:rPr lang="en-US" dirty="0" smtClean="0">
+                <a:latin typeface="Courier New" panose="02070309020205020404" pitchFamily="49" charset="0"/>
+                <a:cs typeface="Courier New" panose="02070309020205020404" pitchFamily="49" charset="0"/>
+              </a:rPr>
+              <a:t>[0])</a:t>
+            </a:r>
+            <a:endParaRPr lang="en-US" dirty="0" smtClean="0">
+              <a:latin typeface="Courier New" panose="02070309020205020404" pitchFamily="49" charset="0"/>
+              <a:cs typeface="Courier New" panose="02070309020205020404" pitchFamily="49" charset="0"/>
+            </a:endParaRPr>
+          </a:p>
+        </p:txBody>
+      </p:sp>
+      <p:sp>
+        <p:nvSpPr>
+          <p:cNvPr id="6" name="TextBox 5"/>
+          <p:cNvSpPr txBox="1"/>
+          <p:nvPr/>
+        </p:nvSpPr>
+        <p:spPr>
+          <a:xfrm>
+            <a:off x="807024" y="3023755"/>
+            <a:ext cx="6954983" cy="1754326"/>
+          </a:xfrm>
+          <a:prstGeom prst="rect">
+            <a:avLst/>
+          </a:prstGeom>
+          <a:solidFill>
+            <a:schemeClr val="tx1"/>
+          </a:solidFill>
+          <a:ln>
+            <a:solidFill>
+              <a:schemeClr val="tx1"/>
+            </a:solidFill>
+          </a:ln>
+        </p:spPr>
+        <p:txBody>
+          <a:bodyPr wrap="square" rtlCol="0">
+            <a:spAutoFit/>
+          </a:bodyPr>
+          <a:lstStyle/>
+          <a:p>
+            <a:r>
+              <a:rPr lang="en-US" b="1" dirty="0">
+                <a:solidFill>
+                  <a:schemeClr val="bg2"/>
+                </a:solidFill>
+                <a:latin typeface="Courier New" panose="02070309020205020404" pitchFamily="49" charset="0"/>
+                <a:cs typeface="Courier New" panose="02070309020205020404" pitchFamily="49" charset="0"/>
+              </a:rPr>
+              <a:t>[Clade(</a:t>
+            </a:r>
+            <a:r>
+              <a:rPr lang="en-US" b="1" dirty="0" err="1">
+                <a:solidFill>
+                  <a:schemeClr val="bg2"/>
+                </a:solidFill>
+                <a:latin typeface="Courier New" panose="02070309020205020404" pitchFamily="49" charset="0"/>
+                <a:cs typeface="Courier New" panose="02070309020205020404" pitchFamily="49" charset="0"/>
+              </a:rPr>
+              <a:t>branch_length</a:t>
+            </a:r>
+            <a:r>
+              <a:rPr lang="en-US" b="1" dirty="0">
+                <a:solidFill>
+                  <a:schemeClr val="bg2"/>
+                </a:solidFill>
+                <a:latin typeface="Courier New" panose="02070309020205020404" pitchFamily="49" charset="0"/>
+                <a:cs typeface="Courier New" panose="02070309020205020404" pitchFamily="49" charset="0"/>
+              </a:rPr>
+              <a:t>=0.045735),</a:t>
+            </a:r>
+          </a:p>
+          <a:p>
+            <a:r>
+              <a:rPr lang="en-US" b="1" dirty="0">
+                <a:solidFill>
+                  <a:schemeClr val="bg2"/>
+                </a:solidFill>
+                <a:latin typeface="Courier New" panose="02070309020205020404" pitchFamily="49" charset="0"/>
+                <a:cs typeface="Courier New" panose="02070309020205020404" pitchFamily="49" charset="0"/>
+              </a:rPr>
+              <a:t> Clade(</a:t>
+            </a:r>
+            <a:r>
+              <a:rPr lang="en-US" b="1" dirty="0" err="1">
+                <a:solidFill>
+                  <a:schemeClr val="bg2"/>
+                </a:solidFill>
+                <a:latin typeface="Courier New" panose="02070309020205020404" pitchFamily="49" charset="0"/>
+                <a:cs typeface="Courier New" panose="02070309020205020404" pitchFamily="49" charset="0"/>
+              </a:rPr>
+              <a:t>branch_length</a:t>
+            </a:r>
+            <a:r>
+              <a:rPr lang="en-US" b="1" dirty="0">
+                <a:solidFill>
+                  <a:schemeClr val="bg2"/>
+                </a:solidFill>
+                <a:latin typeface="Courier New" panose="02070309020205020404" pitchFamily="49" charset="0"/>
+                <a:cs typeface="Courier New" panose="02070309020205020404" pitchFamily="49" charset="0"/>
+              </a:rPr>
+              <a:t>=0.045783),</a:t>
+            </a:r>
+          </a:p>
+          <a:p>
+            <a:r>
+              <a:rPr lang="en-US" b="1" dirty="0">
+                <a:solidFill>
+                  <a:schemeClr val="bg2"/>
+                </a:solidFill>
+                <a:latin typeface="Courier New" panose="02070309020205020404" pitchFamily="49" charset="0"/>
+                <a:cs typeface="Courier New" panose="02070309020205020404" pitchFamily="49" charset="0"/>
+              </a:rPr>
+              <a:t> Clade(</a:t>
+            </a:r>
+            <a:r>
+              <a:rPr lang="en-US" b="1" dirty="0" err="1">
+                <a:solidFill>
+                  <a:schemeClr val="bg2"/>
+                </a:solidFill>
+                <a:latin typeface="Courier New" panose="02070309020205020404" pitchFamily="49" charset="0"/>
+                <a:cs typeface="Courier New" panose="02070309020205020404" pitchFamily="49" charset="0"/>
+              </a:rPr>
+              <a:t>branch_length</a:t>
+            </a:r>
+            <a:r>
+              <a:rPr lang="en-US" b="1" dirty="0">
+                <a:solidFill>
+                  <a:schemeClr val="bg2"/>
+                </a:solidFill>
+                <a:latin typeface="Courier New" panose="02070309020205020404" pitchFamily="49" charset="0"/>
+                <a:cs typeface="Courier New" panose="02070309020205020404" pitchFamily="49" charset="0"/>
+              </a:rPr>
+              <a:t>=0.037123),</a:t>
+            </a:r>
+          </a:p>
+          <a:p>
+            <a:r>
+              <a:rPr lang="en-US" b="1" dirty="0">
+                <a:solidFill>
+                  <a:schemeClr val="bg2"/>
+                </a:solidFill>
+                <a:latin typeface="Courier New" panose="02070309020205020404" pitchFamily="49" charset="0"/>
+                <a:cs typeface="Courier New" panose="02070309020205020404" pitchFamily="49" charset="0"/>
+              </a:rPr>
+              <a:t> Clade(</a:t>
+            </a:r>
+            <a:r>
+              <a:rPr lang="en-US" b="1" dirty="0" err="1">
+                <a:solidFill>
+                  <a:schemeClr val="bg2"/>
+                </a:solidFill>
+                <a:latin typeface="Courier New" panose="02070309020205020404" pitchFamily="49" charset="0"/>
+                <a:cs typeface="Courier New" panose="02070309020205020404" pitchFamily="49" charset="0"/>
+              </a:rPr>
+              <a:t>branch_length</a:t>
+            </a:r>
+            <a:r>
+              <a:rPr lang="en-US" b="1" dirty="0">
+                <a:solidFill>
+                  <a:schemeClr val="bg2"/>
+                </a:solidFill>
+                <a:latin typeface="Courier New" panose="02070309020205020404" pitchFamily="49" charset="0"/>
+                <a:cs typeface="Courier New" panose="02070309020205020404" pitchFamily="49" charset="0"/>
+              </a:rPr>
+              <a:t>=0.019266),</a:t>
+            </a:r>
+          </a:p>
+          <a:p>
+            <a:r>
+              <a:rPr lang="en-US" b="1" dirty="0">
+                <a:solidFill>
+                  <a:schemeClr val="bg2"/>
+                </a:solidFill>
+                <a:latin typeface="Courier New" panose="02070309020205020404" pitchFamily="49" charset="0"/>
+                <a:cs typeface="Courier New" panose="02070309020205020404" pitchFamily="49" charset="0"/>
+              </a:rPr>
+              <a:t> Clade(</a:t>
+            </a:r>
+            <a:r>
+              <a:rPr lang="en-US" b="1" dirty="0" err="1">
+                <a:solidFill>
+                  <a:schemeClr val="bg2"/>
+                </a:solidFill>
+                <a:latin typeface="Courier New" panose="02070309020205020404" pitchFamily="49" charset="0"/>
+                <a:cs typeface="Courier New" panose="02070309020205020404" pitchFamily="49" charset="0"/>
+              </a:rPr>
+              <a:t>branch_length</a:t>
+            </a:r>
+            <a:r>
+              <a:rPr lang="en-US" b="1" dirty="0">
+                <a:solidFill>
+                  <a:schemeClr val="bg2"/>
+                </a:solidFill>
+                <a:latin typeface="Courier New" panose="02070309020205020404" pitchFamily="49" charset="0"/>
+                <a:cs typeface="Courier New" panose="02070309020205020404" pitchFamily="49" charset="0"/>
+              </a:rPr>
+              <a:t>=0.018156),</a:t>
+            </a:r>
+          </a:p>
+          <a:p>
+            <a:r>
+              <a:rPr lang="en-US" b="1" dirty="0">
+                <a:solidFill>
+                  <a:schemeClr val="bg2"/>
+                </a:solidFill>
+                <a:latin typeface="Courier New" panose="02070309020205020404" pitchFamily="49" charset="0"/>
+                <a:cs typeface="Courier New" panose="02070309020205020404" pitchFamily="49" charset="0"/>
+              </a:rPr>
+              <a:t> Clade(</a:t>
+            </a:r>
+            <a:r>
+              <a:rPr lang="en-US" b="1" dirty="0" err="1">
+                <a:solidFill>
+                  <a:schemeClr val="bg2"/>
+                </a:solidFill>
+                <a:latin typeface="Courier New" panose="02070309020205020404" pitchFamily="49" charset="0"/>
+                <a:cs typeface="Courier New" panose="02070309020205020404" pitchFamily="49" charset="0"/>
+              </a:rPr>
+              <a:t>branch_length</a:t>
+            </a:r>
+            <a:r>
+              <a:rPr lang="en-US" b="1" dirty="0">
+                <a:solidFill>
+                  <a:schemeClr val="bg2"/>
+                </a:solidFill>
+                <a:latin typeface="Courier New" panose="02070309020205020404" pitchFamily="49" charset="0"/>
+                <a:cs typeface="Courier New" panose="02070309020205020404" pitchFamily="49" charset="0"/>
+              </a:rPr>
+              <a:t>=0.021138, name='2070OziPo</a:t>
+            </a:r>
+            <a:r>
+              <a:rPr lang="en-US" b="1" dirty="0" smtClean="0">
+                <a:solidFill>
+                  <a:schemeClr val="bg2"/>
+                </a:solidFill>
+                <a:latin typeface="Courier New" panose="02070309020205020404" pitchFamily="49" charset="0"/>
+                <a:cs typeface="Courier New" panose="02070309020205020404" pitchFamily="49" charset="0"/>
+              </a:rPr>
+              <a:t>')]</a:t>
+            </a:r>
+            <a:endParaRPr lang="en-US" b="1" dirty="0">
+              <a:solidFill>
+                <a:schemeClr val="bg2"/>
+              </a:solidFill>
+              <a:latin typeface="Courier New" panose="02070309020205020404" pitchFamily="49" charset="0"/>
+              <a:cs typeface="Courier New" panose="02070309020205020404" pitchFamily="49" charset="0"/>
+            </a:endParaRPr>
+          </a:p>
+        </p:txBody>
+      </p:sp>
+      <p:sp>
+        <p:nvSpPr>
+          <p:cNvPr id="7" name="TextBox 6"/>
+          <p:cNvSpPr txBox="1"/>
+          <p:nvPr/>
+        </p:nvSpPr>
+        <p:spPr>
+          <a:xfrm>
+            <a:off x="807024" y="5424440"/>
+            <a:ext cx="6954983" cy="646331"/>
+          </a:xfrm>
+          <a:prstGeom prst="rect">
+            <a:avLst/>
+          </a:prstGeom>
+          <a:solidFill>
+            <a:schemeClr val="bg1">
+              <a:lumMod val="75000"/>
+            </a:schemeClr>
+          </a:solidFill>
+          <a:ln>
+            <a:solidFill>
+              <a:schemeClr val="tx1"/>
+            </a:solidFill>
+          </a:ln>
+        </p:spPr>
+        <p:txBody>
+          <a:bodyPr wrap="square" rtlCol="0">
+            <a:spAutoFit/>
+          </a:bodyPr>
+          <a:lstStyle/>
+          <a:p>
+            <a:r>
+              <a:rPr lang="en-US" dirty="0" err="1" smtClean="0">
+                <a:latin typeface="Courier New" panose="02070309020205020404" pitchFamily="49" charset="0"/>
+                <a:cs typeface="Courier New" panose="02070309020205020404" pitchFamily="49" charset="0"/>
+              </a:rPr>
+              <a:t>tree.common_ancestor</a:t>
+            </a:r>
+            <a:r>
+              <a:rPr lang="en-US" dirty="0" smtClean="0">
+                <a:latin typeface="Courier New" panose="02070309020205020404" pitchFamily="49" charset="0"/>
+                <a:cs typeface="Courier New" panose="02070309020205020404" pitchFamily="49" charset="0"/>
+              </a:rPr>
+              <a:t>(</a:t>
+            </a:r>
+            <a:r>
+              <a:rPr lang="en-US" dirty="0" err="1" smtClean="0">
+                <a:latin typeface="Courier New" panose="02070309020205020404" pitchFamily="49" charset="0"/>
+                <a:cs typeface="Courier New" panose="02070309020205020404" pitchFamily="49" charset="0"/>
+              </a:rPr>
+              <a:t>terminal_clades</a:t>
+            </a:r>
+            <a:r>
+              <a:rPr lang="en-US" dirty="0" smtClean="0">
+                <a:latin typeface="Courier New" panose="02070309020205020404" pitchFamily="49" charset="0"/>
+                <a:cs typeface="Courier New" panose="02070309020205020404" pitchFamily="49" charset="0"/>
+              </a:rPr>
+              <a:t>[0],</a:t>
+            </a:r>
+          </a:p>
+          <a:p>
+            <a:r>
+              <a:rPr lang="en-US" dirty="0">
+                <a:latin typeface="Courier New" panose="02070309020205020404" pitchFamily="49" charset="0"/>
+                <a:cs typeface="Courier New" panose="02070309020205020404" pitchFamily="49" charset="0"/>
+              </a:rPr>
+              <a:t> </a:t>
+            </a:r>
+            <a:r>
+              <a:rPr lang="en-US" dirty="0" smtClean="0">
+                <a:latin typeface="Courier New" panose="02070309020205020404" pitchFamily="49" charset="0"/>
+                <a:cs typeface="Courier New" panose="02070309020205020404" pitchFamily="49" charset="0"/>
+              </a:rPr>
+              <a:t>                    </a:t>
+            </a:r>
+            <a:r>
+              <a:rPr lang="en-US" dirty="0" err="1" smtClean="0">
+                <a:latin typeface="Courier New" panose="02070309020205020404" pitchFamily="49" charset="0"/>
+                <a:cs typeface="Courier New" panose="02070309020205020404" pitchFamily="49" charset="0"/>
+              </a:rPr>
+              <a:t>terminal_clades</a:t>
+            </a:r>
+            <a:r>
+              <a:rPr lang="en-US" dirty="0" smtClean="0">
+                <a:latin typeface="Courier New" panose="02070309020205020404" pitchFamily="49" charset="0"/>
+                <a:cs typeface="Courier New" panose="02070309020205020404" pitchFamily="49" charset="0"/>
+              </a:rPr>
+              <a:t>[5])</a:t>
+            </a:r>
+            <a:endParaRPr lang="en-US" dirty="0" smtClean="0">
+              <a:latin typeface="Courier New" panose="02070309020205020404" pitchFamily="49" charset="0"/>
+              <a:cs typeface="Courier New" panose="02070309020205020404" pitchFamily="49" charset="0"/>
+            </a:endParaRPr>
+          </a:p>
+        </p:txBody>
+      </p:sp>
+    </p:spTree>
+    <p:extLst>
+      <p:ext uri="{BB962C8B-B14F-4D97-AF65-F5344CB8AC3E}">
+        <p14:creationId xmlns:p14="http://schemas.microsoft.com/office/powerpoint/2010/main" val="411386177"/>
+      </p:ext>
+    </p:extLst>
+  </p:cSld>
+  <p:clrMapOvr>
+    <a:masterClrMapping/>
+  </p:clrMapOvr>
+  <p:timing>
+    <p:tnLst>
+      <p:par>
+        <p:cTn id="1" dur="indefinite" restart="never" nodeType="tmRoot">
+          <p:childTnLst>
+            <p:seq concurrent="1" nextAc="seek">
+              <p:cTn id="2" dur="indefinite" nodeType="mainSeq">
+                <p:childTnLst>
+                  <p:par>
+                    <p:cTn id="3" fill="hold">
+                      <p:stCondLst>
+                        <p:cond delay="indefinite"/>
+                        <p:cond evt="onBegin" delay="0">
+                          <p:tn val="2"/>
+                        </p:cond>
+                      </p:stCondLst>
+                      <p:childTnLst>
+                        <p:par>
+                          <p:cTn id="4" fill="hold">
+                            <p:stCondLst>
+                              <p:cond delay="0"/>
+                            </p:stCondLst>
+                            <p:childTnLst>
+                              <p:par>
+                                <p:cTn id="5" presetID="1" presetClass="entr" presetSubtype="0" fill="hold" grpId="0" nodeType="withEffect">
+                                  <p:stCondLst>
+                                    <p:cond delay="0"/>
+                                  </p:stCondLst>
+                                  <p:childTnLst>
+                                    <p:set>
+                                      <p:cBhvr>
+                                        <p:cTn id="6" dur="1" fill="hold">
+                                          <p:stCondLst>
+                                            <p:cond delay="0"/>
+                                          </p:stCondLst>
+                                        </p:cTn>
+                                        <p:tgtEl>
+                                          <p:spTgt spid="5"/>
+                                        </p:tgtEl>
+                                        <p:attrNameLst>
+                                          <p:attrName>style.visibility</p:attrName>
+                                        </p:attrNameLst>
+                                      </p:cBhvr>
+                                      <p:to>
+                                        <p:strVal val="visible"/>
+                                      </p:to>
+                                    </p:set>
+                                  </p:childTnLst>
+                                </p:cTn>
+                              </p:par>
+                              <p:par>
+                                <p:cTn id="7" presetID="1" presetClass="entr" presetSubtype="0" fill="hold" grpId="0" nodeType="withEffect">
+                                  <p:stCondLst>
+                                    <p:cond delay="0"/>
+                                  </p:stCondLst>
+                                  <p:childTnLst>
+                                    <p:set>
+                                      <p:cBhvr>
+                                        <p:cTn id="8" dur="1" fill="hold">
+                                          <p:stCondLst>
+                                            <p:cond delay="0"/>
+                                          </p:stCondLst>
+                                        </p:cTn>
+                                        <p:tgtEl>
+                                          <p:spTgt spid="7"/>
+                                        </p:tgtEl>
+                                        <p:attrNameLst>
+                                          <p:attrName>style.visibility</p:attrName>
+                                        </p:attrNameLst>
+                                      </p:cBhvr>
+                                      <p:to>
+                                        <p:strVal val="visible"/>
+                                      </p:to>
+                                    </p:set>
+                                  </p:childTnLst>
+                                </p:cTn>
+                              </p:par>
+                            </p:childTnLst>
+                          </p:cTn>
+                        </p:par>
+                      </p:childTnLst>
+                    </p:cTn>
+                  </p:par>
+                </p:childTnLst>
+              </p:cTn>
+              <p:prevCondLst>
+                <p:cond evt="onPrev" delay="0">
+                  <p:tgtEl>
+                    <p:sldTgt/>
+                  </p:tgtEl>
+                </p:cond>
+              </p:prevCondLst>
+              <p:nextCondLst>
+                <p:cond evt="onNext" delay="0">
+                  <p:tgtEl>
+                    <p:sldTgt/>
+                  </p:tgtEl>
+                </p:cond>
+              </p:nextCondLst>
+            </p:seq>
+          </p:childTnLst>
+        </p:cTn>
+      </p:par>
+    </p:tnLst>
+    <p:bldLst>
+      <p:bldP spid="5" grpId="0" animBg="1"/>
+      <p:bldP spid="7" grpId="0" animBg="1"/>
     </p:bldLst>
   </p:timing>
 </p:sld>

</xml_diff>

<commit_message>
Added slides on phylogenetic trees
</commit_message>
<xml_diff>
--- a/Python/biopython.pptx
+++ b/Python/biopython.pptx
@@ -5,7 +5,7 @@
     <p:sldMasterId id="2147483660" r:id="rId1"/>
   </p:sldMasterIdLst>
   <p:notesMasterIdLst>
-    <p:notesMasterId r:id="rId28"/>
+    <p:notesMasterId r:id="rId30"/>
   </p:notesMasterIdLst>
   <p:sldIdLst>
     <p:sldId id="256" r:id="rId2"/>
@@ -27,13 +27,15 @@
     <p:sldId id="272" r:id="rId18"/>
     <p:sldId id="273" r:id="rId19"/>
     <p:sldId id="274" r:id="rId20"/>
-    <p:sldId id="275" r:id="rId21"/>
-    <p:sldId id="276" r:id="rId22"/>
-    <p:sldId id="277" r:id="rId23"/>
-    <p:sldId id="278" r:id="rId24"/>
-    <p:sldId id="279" r:id="rId25"/>
-    <p:sldId id="280" r:id="rId26"/>
-    <p:sldId id="281" r:id="rId27"/>
+    <p:sldId id="283" r:id="rId21"/>
+    <p:sldId id="275" r:id="rId22"/>
+    <p:sldId id="276" r:id="rId23"/>
+    <p:sldId id="277" r:id="rId24"/>
+    <p:sldId id="278" r:id="rId25"/>
+    <p:sldId id="279" r:id="rId26"/>
+    <p:sldId id="280" r:id="rId27"/>
+    <p:sldId id="281" r:id="rId28"/>
+    <p:sldId id="282" r:id="rId29"/>
   </p:sldIdLst>
   <p:sldSz cx="9144000" cy="6858000" type="screen4x3"/>
   <p:notesSz cx="6858000" cy="9144000"/>
@@ -222,7 +224,7 @@
           <a:p>
             <a:fld id="{E50739E9-DC4A-4901-8195-7CE430F840D8}" type="datetimeFigureOut">
               <a:rPr lang="en-US" smtClean="0"/>
-              <a:t>2016-08-04</a:t>
+              <a:t>2016-08-08</a:t>
             </a:fld>
             <a:endParaRPr lang="en-US"/>
           </a:p>
@@ -705,7 +707,7 @@
           <a:p>
             <a:fld id="{EBC2714F-B822-455B-B016-0228B6AA8BE9}" type="datetime1">
               <a:rPr lang="en-US" smtClean="0"/>
-              <a:t>2016-08-04</a:t>
+              <a:t>2016-08-08</a:t>
             </a:fld>
             <a:endParaRPr lang="en-US"/>
           </a:p>
@@ -875,7 +877,7 @@
           <a:p>
             <a:fld id="{F3822F19-B516-497C-9005-1997989AD109}" type="datetime1">
               <a:rPr lang="en-US" smtClean="0"/>
-              <a:t>2016-08-04</a:t>
+              <a:t>2016-08-08</a:t>
             </a:fld>
             <a:endParaRPr lang="en-US"/>
           </a:p>
@@ -1055,7 +1057,7 @@
           <a:p>
             <a:fld id="{DC6E6076-3AC8-4591-A5B3-5701E86BC391}" type="datetime1">
               <a:rPr lang="en-US" smtClean="0"/>
-              <a:t>2016-08-04</a:t>
+              <a:t>2016-08-08</a:t>
             </a:fld>
             <a:endParaRPr lang="en-US"/>
           </a:p>
@@ -1225,7 +1227,7 @@
           <a:p>
             <a:fld id="{10101B39-3B57-4A7B-8CB6-E6BDB118061D}" type="datetime1">
               <a:rPr lang="en-US" smtClean="0"/>
-              <a:t>2016-08-04</a:t>
+              <a:t>2016-08-08</a:t>
             </a:fld>
             <a:endParaRPr lang="en-US"/>
           </a:p>
@@ -1469,7 +1471,7 @@
           <a:p>
             <a:fld id="{C27B26EE-8ECF-4FF3-9A38-87EFFDA62A28}" type="datetime1">
               <a:rPr lang="en-US" smtClean="0"/>
-              <a:t>2016-08-04</a:t>
+              <a:t>2016-08-08</a:t>
             </a:fld>
             <a:endParaRPr lang="en-US"/>
           </a:p>
@@ -1701,7 +1703,7 @@
           <a:p>
             <a:fld id="{6742683C-23EC-4C0D-AC9A-17C98B40DAA7}" type="datetime1">
               <a:rPr lang="en-US" smtClean="0"/>
-              <a:t>2016-08-04</a:t>
+              <a:t>2016-08-08</a:t>
             </a:fld>
             <a:endParaRPr lang="en-US"/>
           </a:p>
@@ -2068,7 +2070,7 @@
           <a:p>
             <a:fld id="{61B639F5-7095-4C4C-8D13-AB3C116C2681}" type="datetime1">
               <a:rPr lang="en-US" smtClean="0"/>
-              <a:t>2016-08-04</a:t>
+              <a:t>2016-08-08</a:t>
             </a:fld>
             <a:endParaRPr lang="en-US"/>
           </a:p>
@@ -2186,7 +2188,7 @@
           <a:p>
             <a:fld id="{565C75B5-128F-4C63-85A2-EABB3B9088B2}" type="datetime1">
               <a:rPr lang="en-US" smtClean="0"/>
-              <a:t>2016-08-04</a:t>
+              <a:t>2016-08-08</a:t>
             </a:fld>
             <a:endParaRPr lang="en-US"/>
           </a:p>
@@ -2281,7 +2283,7 @@
           <a:p>
             <a:fld id="{EB500747-7144-41D3-89B7-0E40926A8757}" type="datetime1">
               <a:rPr lang="en-US" smtClean="0"/>
-              <a:t>2016-08-04</a:t>
+              <a:t>2016-08-08</a:t>
             </a:fld>
             <a:endParaRPr lang="en-US"/>
           </a:p>
@@ -2558,7 +2560,7 @@
           <a:p>
             <a:fld id="{09A9D774-0B51-4CD9-9147-A6BD4D353F07}" type="datetime1">
               <a:rPr lang="en-US" smtClean="0"/>
-              <a:t>2016-08-04</a:t>
+              <a:t>2016-08-08</a:t>
             </a:fld>
             <a:endParaRPr lang="en-US"/>
           </a:p>
@@ -2815,7 +2817,7 @@
           <a:p>
             <a:fld id="{2618F069-DB72-4F16-8512-37A179AE1774}" type="datetime1">
               <a:rPr lang="en-US" smtClean="0"/>
-              <a:t>2016-08-04</a:t>
+              <a:t>2016-08-08</a:t>
             </a:fld>
             <a:endParaRPr lang="en-US"/>
           </a:p>
@@ -3028,7 +3030,7 @@
           <a:p>
             <a:fld id="{7784AB71-9685-428C-BE48-FB64D9C8B81F}" type="datetime1">
               <a:rPr lang="en-US" smtClean="0"/>
-              <a:t>2016-08-04</a:t>
+              <a:t>2016-08-08</a:t>
             </a:fld>
             <a:endParaRPr lang="en-US"/>
           </a:p>
@@ -9863,10 +9865,10 @@
           <a:lstStyle/>
           <a:p>
             <a:r>
-              <a:rPr lang="en-US" dirty="0" smtClean="0"/>
-              <a:t>Phylogenetic trees</a:t>
-            </a:r>
-            <a:endParaRPr lang="en-US" dirty="0"/>
+              <a:rPr lang="en-US" smtClean="0"/>
+              <a:t>Alignment</a:t>
+            </a:r>
+            <a:endParaRPr lang="en-US"/>
           </a:p>
         </p:txBody>
       </p:sp>
@@ -9915,7 +9917,7 @@
     </p:spTree>
     <p:extLst>
       <p:ext uri="{BB962C8B-B14F-4D97-AF65-F5344CB8AC3E}">
-        <p14:creationId xmlns:p14="http://schemas.microsoft.com/office/powerpoint/2010/main" val="3995878730"/>
+        <p14:creationId xmlns:p14="http://schemas.microsoft.com/office/powerpoint/2010/main" val="4246974038"/>
       </p:ext>
     </p:extLst>
   </p:cSld>
@@ -9966,6 +9968,108 @@
           <a:p>
             <a:r>
               <a:rPr lang="en-US" dirty="0" smtClean="0"/>
+              <a:t>Phylogenetic trees</a:t>
+            </a:r>
+            <a:endParaRPr lang="en-US" dirty="0"/>
+          </a:p>
+        </p:txBody>
+      </p:sp>
+      <p:sp>
+        <p:nvSpPr>
+          <p:cNvPr id="3" name="Text Placeholder 2"/>
+          <p:cNvSpPr>
+            <a:spLocks noGrp="1"/>
+          </p:cNvSpPr>
+          <p:nvPr>
+            <p:ph type="body" idx="1"/>
+          </p:nvPr>
+        </p:nvSpPr>
+        <p:spPr/>
+        <p:txBody>
+          <a:bodyPr/>
+          <a:lstStyle/>
+          <a:p>
+            <a:endParaRPr lang="en-US"/>
+          </a:p>
+        </p:txBody>
+      </p:sp>
+      <p:sp>
+        <p:nvSpPr>
+          <p:cNvPr id="4" name="Slide Number Placeholder 3"/>
+          <p:cNvSpPr>
+            <a:spLocks noGrp="1"/>
+          </p:cNvSpPr>
+          <p:nvPr>
+            <p:ph type="sldNum" sz="quarter" idx="12"/>
+          </p:nvPr>
+        </p:nvSpPr>
+        <p:spPr/>
+        <p:txBody>
+          <a:bodyPr/>
+          <a:lstStyle/>
+          <a:p>
+            <a:fld id="{CA586AD6-E5F2-4F25-940D-C674496063E2}" type="slidenum">
+              <a:rPr lang="en-US" smtClean="0"/>
+              <a:t>21</a:t>
+            </a:fld>
+            <a:endParaRPr lang="en-US"/>
+          </a:p>
+        </p:txBody>
+      </p:sp>
+    </p:spTree>
+    <p:extLst>
+      <p:ext uri="{BB962C8B-B14F-4D97-AF65-F5344CB8AC3E}">
+        <p14:creationId xmlns:p14="http://schemas.microsoft.com/office/powerpoint/2010/main" val="3995878730"/>
+      </p:ext>
+    </p:extLst>
+  </p:cSld>
+  <p:clrMapOvr>
+    <a:masterClrMapping/>
+  </p:clrMapOvr>
+  <p:timing>
+    <p:tnLst>
+      <p:par>
+        <p:cTn id="1" dur="indefinite" restart="never" nodeType="tmRoot"/>
+      </p:par>
+    </p:tnLst>
+  </p:timing>
+</p:sld>
+</file>
+
+<file path=ppt/slides/slide22.xml><?xml version="1.0" encoding="utf-8"?>
+<p:sld xmlns:a="http://schemas.openxmlformats.org/drawingml/2006/main" xmlns:r="http://schemas.openxmlformats.org/officeDocument/2006/relationships" xmlns:p="http://schemas.openxmlformats.org/presentationml/2006/main">
+  <p:cSld>
+    <p:spTree>
+      <p:nvGrpSpPr>
+        <p:cNvPr id="1" name=""/>
+        <p:cNvGrpSpPr/>
+        <p:nvPr/>
+      </p:nvGrpSpPr>
+      <p:grpSpPr>
+        <a:xfrm>
+          <a:off x="0" y="0"/>
+          <a:ext cx="0" cy="0"/>
+          <a:chOff x="0" y="0"/>
+          <a:chExt cx="0" cy="0"/>
+        </a:xfrm>
+      </p:grpSpPr>
+      <p:sp>
+        <p:nvSpPr>
+          <p:cNvPr id="2" name="Title 1"/>
+          <p:cNvSpPr>
+            <a:spLocks noGrp="1"/>
+          </p:cNvSpPr>
+          <p:nvPr>
+            <p:ph type="title"/>
+          </p:nvPr>
+        </p:nvSpPr>
+        <p:spPr/>
+        <p:txBody>
+          <a:bodyPr/>
+          <a:lstStyle/>
+          <a:p>
+            <a:r>
+              <a:rPr lang="en-US" dirty="0" smtClean="0"/>
               <a:t>Tree representation</a:t>
             </a:r>
             <a:endParaRPr lang="en-US" dirty="0"/>
@@ -10020,7 +10124,7 @@
           <a:p>
             <a:fld id="{CA586AD6-E5F2-4F25-940D-C674496063E2}" type="slidenum">
               <a:rPr lang="en-US" smtClean="0"/>
-              <a:t>21</a:t>
+              <a:t>22</a:t>
             </a:fld>
             <a:endParaRPr lang="en-US"/>
           </a:p>
@@ -10958,9 +11062,6 @@
                     <p:cTn id="3" fill="hold">
                       <p:stCondLst>
                         <p:cond delay="indefinite"/>
-                        <p:cond evt="onBegin" delay="0">
-                          <p:tn val="2"/>
-                        </p:cond>
                       </p:stCondLst>
                       <p:childTnLst>
                         <p:par>
@@ -10970,7 +11071,7 @@
                             </p:stCondLst>
                             <p:childTnLst>
                               <p:par>
-                                <p:cTn id="5" presetID="1" presetClass="entr" presetSubtype="0" fill="hold" grpId="0" nodeType="withEffect">
+                                <p:cTn id="5" presetID="1" presetClass="entr" presetSubtype="0" fill="hold" grpId="0" nodeType="clickEffect">
                                   <p:stCondLst>
                                     <p:cond delay="0"/>
                                   </p:stCondLst>
@@ -10978,6 +11079,96 @@
                                     <p:set>
                                       <p:cBhvr>
                                         <p:cTn id="6" dur="1" fill="hold">
+                                          <p:stCondLst>
+                                            <p:cond delay="0"/>
+                                          </p:stCondLst>
+                                        </p:cTn>
+                                        <p:tgtEl>
+                                          <p:spTgt spid="31"/>
+                                        </p:tgtEl>
+                                        <p:attrNameLst>
+                                          <p:attrName>style.visibility</p:attrName>
+                                        </p:attrNameLst>
+                                      </p:cBhvr>
+                                      <p:to>
+                                        <p:strVal val="visible"/>
+                                      </p:to>
+                                    </p:set>
+                                  </p:childTnLst>
+                                </p:cTn>
+                              </p:par>
+                            </p:childTnLst>
+                          </p:cTn>
+                        </p:par>
+                      </p:childTnLst>
+                    </p:cTn>
+                  </p:par>
+                  <p:par>
+                    <p:cTn id="7" fill="hold">
+                      <p:stCondLst>
+                        <p:cond delay="indefinite"/>
+                      </p:stCondLst>
+                      <p:childTnLst>
+                        <p:par>
+                          <p:cTn id="8" fill="hold">
+                            <p:stCondLst>
+                              <p:cond delay="0"/>
+                            </p:stCondLst>
+                            <p:childTnLst>
+                              <p:par>
+                                <p:cTn id="9" presetID="1" presetClass="entr" presetSubtype="0" fill="hold" grpId="0" nodeType="clickEffect">
+                                  <p:stCondLst>
+                                    <p:cond delay="0"/>
+                                  </p:stCondLst>
+                                  <p:childTnLst>
+                                    <p:set>
+                                      <p:cBhvr>
+                                        <p:cTn id="10" dur="1" fill="hold">
+                                          <p:stCondLst>
+                                            <p:cond delay="0"/>
+                                          </p:stCondLst>
+                                        </p:cTn>
+                                        <p:tgtEl>
+                                          <p:spTgt spid="5"/>
+                                        </p:tgtEl>
+                                        <p:attrNameLst>
+                                          <p:attrName>style.visibility</p:attrName>
+                                        </p:attrNameLst>
+                                      </p:cBhvr>
+                                      <p:to>
+                                        <p:strVal val="visible"/>
+                                      </p:to>
+                                    </p:set>
+                                  </p:childTnLst>
+                                </p:cTn>
+                              </p:par>
+                            </p:childTnLst>
+                          </p:cTn>
+                        </p:par>
+                      </p:childTnLst>
+                    </p:cTn>
+                  </p:par>
+                  <p:par>
+                    <p:cTn id="11" fill="hold">
+                      <p:stCondLst>
+                        <p:cond delay="indefinite"/>
+                      </p:stCondLst>
+                      <p:childTnLst>
+                        <p:par>
+                          <p:cTn id="12" fill="hold">
+                            <p:stCondLst>
+                              <p:cond delay="0"/>
+                            </p:stCondLst>
+                            <p:childTnLst>
+                              <p:par>
+                                <p:cTn id="13" presetID="1" presetClass="entr" presetSubtype="0" fill="hold" grpId="0" nodeType="clickEffect">
+                                  <p:stCondLst>
+                                    <p:cond delay="0"/>
+                                  </p:stCondLst>
+                                  <p:childTnLst>
+                                    <p:set>
+                                      <p:cBhvr>
+                                        <p:cTn id="14" dur="1" fill="hold">
                                           <p:stCondLst>
                                             <p:cond delay="0"/>
                                           </p:stCondLst>
@@ -11024,13 +11215,15 @@
       </p:par>
     </p:tnLst>
     <p:bldLst>
+      <p:bldP spid="5" grpId="0" animBg="1"/>
+      <p:bldP spid="31" grpId="0"/>
       <p:bldP spid="33" grpId="0" animBg="1"/>
     </p:bldLst>
   </p:timing>
 </p:sld>
 </file>
 
-<file path=ppt/slides/slide22.xml><?xml version="1.0" encoding="utf-8"?>
+<file path=ppt/slides/slide23.xml><?xml version="1.0" encoding="utf-8"?>
 <p:sld xmlns:a="http://schemas.openxmlformats.org/drawingml/2006/main" xmlns:r="http://schemas.openxmlformats.org/officeDocument/2006/relationships" xmlns:p="http://schemas.openxmlformats.org/presentationml/2006/main">
   <p:cSld>
     <p:spTree>
@@ -11069,8 +11262,8 @@
         </p:blipFill>
         <p:spPr>
           <a:xfrm>
-            <a:off x="3176760" y="3317100"/>
-            <a:ext cx="4827100" cy="3404376"/>
+            <a:off x="4122330" y="2776768"/>
+            <a:ext cx="4393020" cy="3098235"/>
           </a:xfrm>
           <a:prstGeom prst="rect">
             <a:avLst/>
@@ -11099,7 +11292,7 @@
           <a:p>
             <a:r>
               <a:rPr lang="en-US" dirty="0" smtClean="0"/>
-              <a:t>Reading and displaying</a:t>
+              <a:t>Reading, displaying and writing</a:t>
             </a:r>
             <a:endParaRPr lang="en-US" dirty="0"/>
           </a:p>
@@ -11142,7 +11335,34 @@
           <a:p>
             <a:r>
               <a:rPr lang="en-US" dirty="0" smtClean="0"/>
-              <a:t>Displaying tree</a:t>
+              <a:t>Displaying </a:t>
+            </a:r>
+            <a:r>
+              <a:rPr lang="en-US" dirty="0" smtClean="0"/>
+              <a:t>tree</a:t>
+            </a:r>
+          </a:p>
+          <a:p>
+            <a:endParaRPr lang="en-US" dirty="0"/>
+          </a:p>
+          <a:p>
+            <a:endParaRPr lang="en-US" dirty="0" smtClean="0"/>
+          </a:p>
+          <a:p>
+            <a:endParaRPr lang="en-US" dirty="0" smtClean="0"/>
+          </a:p>
+          <a:p>
+            <a:r>
+              <a:rPr lang="en-US" dirty="0" smtClean="0"/>
+              <a:t>Writing </a:t>
+            </a:r>
+            <a:r>
+              <a:rPr lang="en-US" dirty="0" err="1" smtClean="0"/>
+              <a:t>PhyloXML</a:t>
+            </a:r>
+            <a:r>
+              <a:rPr lang="en-US" dirty="0" smtClean="0"/>
+              <a:t> file</a:t>
             </a:r>
             <a:endParaRPr lang="en-US" dirty="0"/>
           </a:p>
@@ -11165,7 +11385,7 @@
           <a:p>
             <a:fld id="{CA586AD6-E5F2-4F25-940D-C674496063E2}" type="slidenum">
               <a:rPr lang="en-US" smtClean="0"/>
-              <a:t>22</a:t>
+              <a:t>23</a:t>
             </a:fld>
             <a:endParaRPr lang="en-US"/>
           </a:p>
@@ -11310,6 +11530,86 @@
               </a:rPr>
               <a:t>(tree)</a:t>
             </a:r>
+          </a:p>
+        </p:txBody>
+      </p:sp>
+      <p:sp>
+        <p:nvSpPr>
+          <p:cNvPr id="10" name="TextBox 9"/>
+          <p:cNvSpPr txBox="1"/>
+          <p:nvPr/>
+        </p:nvSpPr>
+        <p:spPr>
+          <a:xfrm>
+            <a:off x="807026" y="5985930"/>
+            <a:ext cx="5978238" cy="369332"/>
+          </a:xfrm>
+          <a:prstGeom prst="rect">
+            <a:avLst/>
+          </a:prstGeom>
+          <a:solidFill>
+            <a:schemeClr val="bg1">
+              <a:lumMod val="75000"/>
+            </a:schemeClr>
+          </a:solidFill>
+          <a:ln>
+            <a:solidFill>
+              <a:schemeClr val="tx1"/>
+            </a:solidFill>
+          </a:ln>
+        </p:spPr>
+        <p:txBody>
+          <a:bodyPr wrap="square" rtlCol="0">
+            <a:spAutoFit/>
+          </a:bodyPr>
+          <a:lstStyle/>
+          <a:p>
+            <a:r>
+              <a:rPr lang="en-US" dirty="0" err="1" smtClean="0">
+                <a:latin typeface="Courier New" panose="02070309020205020404" pitchFamily="49" charset="0"/>
+                <a:cs typeface="Courier New" panose="02070309020205020404" pitchFamily="49" charset="0"/>
+              </a:rPr>
+              <a:t>Phylo.write</a:t>
+            </a:r>
+            <a:r>
+              <a:rPr lang="en-US" dirty="0" smtClean="0">
+                <a:latin typeface="Courier New" panose="02070309020205020404" pitchFamily="49" charset="0"/>
+                <a:cs typeface="Courier New" panose="02070309020205020404" pitchFamily="49" charset="0"/>
+              </a:rPr>
+              <a:t>(tree, </a:t>
+            </a:r>
+            <a:r>
+              <a:rPr lang="en-US" dirty="0" err="1" smtClean="0">
+                <a:latin typeface="Courier New" panose="02070309020205020404" pitchFamily="49" charset="0"/>
+                <a:cs typeface="Courier New" panose="02070309020205020404" pitchFamily="49" charset="0"/>
+              </a:rPr>
+              <a:t>out_file</a:t>
+            </a:r>
+            <a:r>
+              <a:rPr lang="en-US" dirty="0" smtClean="0">
+                <a:latin typeface="Courier New" panose="02070309020205020404" pitchFamily="49" charset="0"/>
+                <a:cs typeface="Courier New" panose="02070309020205020404" pitchFamily="49" charset="0"/>
+              </a:rPr>
+              <a:t>, '</a:t>
+            </a:r>
+            <a:r>
+              <a:rPr lang="en-US" dirty="0" err="1" smtClean="0">
+                <a:latin typeface="Courier New" panose="02070309020205020404" pitchFamily="49" charset="0"/>
+                <a:cs typeface="Courier New" panose="02070309020205020404" pitchFamily="49" charset="0"/>
+              </a:rPr>
+              <a:t>phyloxm</a:t>
+            </a:r>
+            <a:r>
+              <a:rPr lang="en-US" dirty="0" smtClean="0">
+                <a:latin typeface="Courier New" panose="02070309020205020404" pitchFamily="49" charset="0"/>
+                <a:cs typeface="Courier New" panose="02070309020205020404" pitchFamily="49" charset="0"/>
+              </a:rPr>
+              <a:t>')</a:t>
+            </a:r>
+            <a:endParaRPr lang="en-US" dirty="0" smtClean="0">
+              <a:latin typeface="Courier New" panose="02070309020205020404" pitchFamily="49" charset="0"/>
+              <a:cs typeface="Courier New" panose="02070309020205020404" pitchFamily="49" charset="0"/>
+            </a:endParaRPr>
           </a:p>
         </p:txBody>
       </p:sp>
@@ -11360,7 +11660,11 @@
                                           </p:stCondLst>
                                         </p:cTn>
                                         <p:tgtEl>
-                                          <p:spTgt spid="5"/>
+                                          <p:spTgt spid="3">
+                                            <p:txEl>
+                                              <p:pRg st="0" end="0"/>
+                                            </p:txEl>
+                                          </p:spTgt>
                                         </p:tgtEl>
                                         <p:attrNameLst>
                                           <p:attrName>style.visibility</p:attrName>
@@ -11387,7 +11691,186 @@
                                           </p:stCondLst>
                                         </p:cTn>
                                         <p:tgtEl>
+                                          <p:spTgt spid="5"/>
+                                        </p:tgtEl>
+                                        <p:attrNameLst>
+                                          <p:attrName>style.visibility</p:attrName>
+                                        </p:attrNameLst>
+                                      </p:cBhvr>
+                                      <p:to>
+                                        <p:strVal val="visible"/>
+                                      </p:to>
+                                    </p:set>
+                                  </p:childTnLst>
+                                </p:cTn>
+                              </p:par>
+                            </p:childTnLst>
+                          </p:cTn>
+                        </p:par>
+                      </p:childTnLst>
+                    </p:cTn>
+                  </p:par>
+                  <p:par>
+                    <p:cTn id="9" fill="hold">
+                      <p:stCondLst>
+                        <p:cond delay="indefinite"/>
+                      </p:stCondLst>
+                      <p:childTnLst>
+                        <p:par>
+                          <p:cTn id="10" fill="hold">
+                            <p:stCondLst>
+                              <p:cond delay="0"/>
+                            </p:stCondLst>
+                            <p:childTnLst>
+                              <p:par>
+                                <p:cTn id="11" presetID="1" presetClass="entr" presetSubtype="0" fill="hold" grpId="0" nodeType="clickEffect">
+                                  <p:stCondLst>
+                                    <p:cond delay="0"/>
+                                  </p:stCondLst>
+                                  <p:childTnLst>
+                                    <p:set>
+                                      <p:cBhvr>
+                                        <p:cTn id="12" dur="1" fill="hold">
+                                          <p:stCondLst>
+                                            <p:cond delay="0"/>
+                                          </p:stCondLst>
+                                        </p:cTn>
+                                        <p:tgtEl>
+                                          <p:spTgt spid="3">
+                                            <p:txEl>
+                                              <p:pRg st="3" end="3"/>
+                                            </p:txEl>
+                                          </p:spTgt>
+                                        </p:tgtEl>
+                                        <p:attrNameLst>
+                                          <p:attrName>style.visibility</p:attrName>
+                                        </p:attrNameLst>
+                                      </p:cBhvr>
+                                      <p:to>
+                                        <p:strVal val="visible"/>
+                                      </p:to>
+                                    </p:set>
+                                  </p:childTnLst>
+                                </p:cTn>
+                              </p:par>
+                              <p:par>
+                                <p:cTn id="13" presetID="1" presetClass="entr" presetSubtype="0" fill="hold" grpId="0" nodeType="withEffect">
+                                  <p:stCondLst>
+                                    <p:cond delay="0"/>
+                                  </p:stCondLst>
+                                  <p:childTnLst>
+                                    <p:set>
+                                      <p:cBhvr>
+                                        <p:cTn id="14" dur="1" fill="hold">
+                                          <p:stCondLst>
+                                            <p:cond delay="0"/>
+                                          </p:stCondLst>
+                                        </p:cTn>
+                                        <p:tgtEl>
                                           <p:spTgt spid="8"/>
+                                        </p:tgtEl>
+                                        <p:attrNameLst>
+                                          <p:attrName>style.visibility</p:attrName>
+                                        </p:attrNameLst>
+                                      </p:cBhvr>
+                                      <p:to>
+                                        <p:strVal val="visible"/>
+                                      </p:to>
+                                    </p:set>
+                                  </p:childTnLst>
+                                </p:cTn>
+                              </p:par>
+                              <p:par>
+                                <p:cTn id="15" presetID="1" presetClass="entr" presetSubtype="0" fill="hold" nodeType="withEffect">
+                                  <p:stCondLst>
+                                    <p:cond delay="0"/>
+                                  </p:stCondLst>
+                                  <p:childTnLst>
+                                    <p:set>
+                                      <p:cBhvr>
+                                        <p:cTn id="16" dur="1" fill="hold">
+                                          <p:stCondLst>
+                                            <p:cond delay="0"/>
+                                          </p:stCondLst>
+                                        </p:cTn>
+                                        <p:tgtEl>
+                                          <p:spTgt spid="9"/>
+                                        </p:tgtEl>
+                                        <p:attrNameLst>
+                                          <p:attrName>style.visibility</p:attrName>
+                                        </p:attrNameLst>
+                                      </p:cBhvr>
+                                      <p:to>
+                                        <p:strVal val="visible"/>
+                                      </p:to>
+                                    </p:set>
+                                  </p:childTnLst>
+                                </p:cTn>
+                              </p:par>
+                            </p:childTnLst>
+                          </p:cTn>
+                        </p:par>
+                      </p:childTnLst>
+                    </p:cTn>
+                  </p:par>
+                  <p:par>
+                    <p:cTn id="17" fill="hold">
+                      <p:stCondLst>
+                        <p:cond delay="indefinite"/>
+                      </p:stCondLst>
+                      <p:childTnLst>
+                        <p:par>
+                          <p:cTn id="18" fill="hold">
+                            <p:stCondLst>
+                              <p:cond delay="0"/>
+                            </p:stCondLst>
+                            <p:childTnLst>
+                              <p:par>
+                                <p:cTn id="19" presetID="1" presetClass="entr" presetSubtype="0" fill="hold" grpId="0" nodeType="clickEffect">
+                                  <p:stCondLst>
+                                    <p:cond delay="0"/>
+                                  </p:stCondLst>
+                                  <p:childTnLst>
+                                    <p:set>
+                                      <p:cBhvr>
+                                        <p:cTn id="20" dur="1" fill="hold">
+                                          <p:stCondLst>
+                                            <p:cond delay="0"/>
+                                          </p:stCondLst>
+                                        </p:cTn>
+                                        <p:tgtEl>
+                                          <p:spTgt spid="3">
+                                            <p:txEl>
+                                              <p:pRg st="7" end="7"/>
+                                            </p:txEl>
+                                          </p:spTgt>
+                                        </p:tgtEl>
+                                        <p:attrNameLst>
+                                          <p:attrName>style.visibility</p:attrName>
+                                        </p:attrNameLst>
+                                      </p:cBhvr>
+                                      <p:to>
+                                        <p:strVal val="visible"/>
+                                      </p:to>
+                                    </p:set>
+                                  </p:childTnLst>
+                                </p:cTn>
+                              </p:par>
+                              <p:par>
+                                <p:cTn id="21" presetID="1" presetClass="entr" presetSubtype="0" fill="hold" grpId="0" nodeType="withEffect">
+                                  <p:stCondLst>
+                                    <p:cond delay="0"/>
+                                  </p:stCondLst>
+                                  <p:childTnLst>
+                                    <p:set>
+                                      <p:cBhvr>
+                                        <p:cTn id="22" dur="1" fill="hold">
+                                          <p:stCondLst>
+                                            <p:cond delay="0"/>
+                                          </p:stCondLst>
+                                        </p:cTn>
+                                        <p:tgtEl>
+                                          <p:spTgt spid="10"/>
                                         </p:tgtEl>
                                         <p:attrNameLst>
                                           <p:attrName>style.visibility</p:attrName>
@@ -11428,14 +11911,16 @@
       </p:par>
     </p:tnLst>
     <p:bldLst>
+      <p:bldP spid="3" grpId="0" uiExpand="1" build="p"/>
       <p:bldP spid="5" grpId="0" animBg="1"/>
       <p:bldP spid="8" grpId="0" animBg="1"/>
+      <p:bldP spid="10" grpId="0" animBg="1"/>
     </p:bldLst>
   </p:timing>
 </p:sld>
 </file>
 
-<file path=ppt/slides/slide23.xml><?xml version="1.0" encoding="utf-8"?>
+<file path=ppt/slides/slide24.xml><?xml version="1.0" encoding="utf-8"?>
 <p:sld xmlns:a="http://schemas.openxmlformats.org/drawingml/2006/main" xmlns:r="http://schemas.openxmlformats.org/officeDocument/2006/relationships" xmlns:p="http://schemas.openxmlformats.org/presentationml/2006/main">
   <p:cSld>
     <p:spTree>
@@ -11546,7 +12031,7 @@
           <a:p>
             <a:fld id="{CA586AD6-E5F2-4F25-940D-C674496063E2}" type="slidenum">
               <a:rPr lang="en-US" smtClean="0"/>
-              <a:t>23</a:t>
+              <a:t>24</a:t>
             </a:fld>
             <a:endParaRPr lang="en-US"/>
           </a:p>
@@ -11790,10 +12275,6 @@
               </a:rPr>
               <a:t>())</a:t>
             </a:r>
-            <a:endParaRPr lang="en-US" dirty="0" smtClean="0">
-              <a:latin typeface="Courier New" panose="02070309020205020404" pitchFamily="49" charset="0"/>
-              <a:cs typeface="Courier New" panose="02070309020205020404" pitchFamily="49" charset="0"/>
-            </a:endParaRPr>
           </a:p>
         </p:txBody>
       </p:sp>
@@ -11844,7 +12325,11 @@
                                           </p:stCondLst>
                                         </p:cTn>
                                         <p:tgtEl>
-                                          <p:spTgt spid="5"/>
+                                          <p:spTgt spid="3">
+                                            <p:txEl>
+                                              <p:pRg st="0" end="0"/>
+                                            </p:txEl>
+                                          </p:spTgt>
                                         </p:tgtEl>
                                         <p:attrNameLst>
                                           <p:attrName>style.visibility</p:attrName>
@@ -11871,7 +12356,56 @@
                                           </p:stCondLst>
                                         </p:cTn>
                                         <p:tgtEl>
-                                          <p:spTgt spid="6"/>
+                                          <p:spTgt spid="5"/>
+                                        </p:tgtEl>
+                                        <p:attrNameLst>
+                                          <p:attrName>style.visibility</p:attrName>
+                                        </p:attrNameLst>
+                                      </p:cBhvr>
+                                      <p:to>
+                                        <p:strVal val="visible"/>
+                                      </p:to>
+                                    </p:set>
+                                  </p:childTnLst>
+                                </p:cTn>
+                              </p:par>
+                            </p:childTnLst>
+                          </p:cTn>
+                        </p:par>
+                      </p:childTnLst>
+                    </p:cTn>
+                  </p:par>
+                  <p:par>
+                    <p:cTn id="9" fill="hold">
+                      <p:stCondLst>
+                        <p:cond delay="indefinite"/>
+                      </p:stCondLst>
+                      <p:childTnLst>
+                        <p:par>
+                          <p:cTn id="10" fill="hold">
+                            <p:stCondLst>
+                              <p:cond delay="0"/>
+                            </p:stCondLst>
+                            <p:childTnLst>
+                              <p:par>
+                                <p:cTn id="11" presetID="1" presetClass="entr" presetSubtype="0" fill="hold" grpId="0" nodeType="clickEffect">
+                                  <p:stCondLst>
+                                    <p:cond delay="0"/>
+                                  </p:stCondLst>
+                                  <p:childTnLst>
+                                    <p:set>
+                                      <p:cBhvr>
+                                        <p:cTn id="12" dur="1" fill="hold">
+                                          <p:stCondLst>
+                                            <p:cond delay="0"/>
+                                          </p:stCondLst>
+                                        </p:cTn>
+                                        <p:tgtEl>
+                                          <p:spTgt spid="3">
+                                            <p:txEl>
+                                              <p:pRg st="2" end="2"/>
+                                            </p:txEl>
+                                          </p:spTgt>
                                         </p:tgtEl>
                                         <p:attrNameLst>
                                           <p:attrName>style.visibility</p:attrName>
@@ -11885,14 +12419,14 @@
                                 </p:cTn>
                               </p:par>
                               <p:par>
-                                <p:cTn id="9" presetID="1" presetClass="entr" presetSubtype="0" fill="hold" grpId="0" nodeType="withEffect">
+                                <p:cTn id="13" presetID="1" presetClass="entr" presetSubtype="0" fill="hold" grpId="0" nodeType="withEffect">
                                   <p:stCondLst>
                                     <p:cond delay="0"/>
                                   </p:stCondLst>
                                   <p:childTnLst>
                                     <p:set>
                                       <p:cBhvr>
-                                        <p:cTn id="10" dur="1" fill="hold">
+                                        <p:cTn id="14" dur="1" fill="hold">
                                           <p:stCondLst>
                                             <p:cond delay="0"/>
                                           </p:stCondLst>
@@ -11911,15 +12445,140 @@
                                   </p:childTnLst>
                                 </p:cTn>
                               </p:par>
+                            </p:childTnLst>
+                          </p:cTn>
+                        </p:par>
+                      </p:childTnLst>
+                    </p:cTn>
+                  </p:par>
+                  <p:par>
+                    <p:cTn id="15" fill="hold">
+                      <p:stCondLst>
+                        <p:cond delay="indefinite"/>
+                      </p:stCondLst>
+                      <p:childTnLst>
+                        <p:par>
+                          <p:cTn id="16" fill="hold">
+                            <p:stCondLst>
+                              <p:cond delay="0"/>
+                            </p:stCondLst>
+                            <p:childTnLst>
                               <p:par>
-                                <p:cTn id="11" presetID="1" presetClass="entr" presetSubtype="0" fill="hold" grpId="0" nodeType="withEffect">
+                                <p:cTn id="17" presetID="1" presetClass="entr" presetSubtype="0" fill="hold" grpId="0" nodeType="clickEffect">
                                   <p:stCondLst>
                                     <p:cond delay="0"/>
                                   </p:stCondLst>
                                   <p:childTnLst>
                                     <p:set>
                                       <p:cBhvr>
-                                        <p:cTn id="12" dur="1" fill="hold">
+                                        <p:cTn id="18" dur="1" fill="hold">
+                                          <p:stCondLst>
+                                            <p:cond delay="0"/>
+                                          </p:stCondLst>
+                                        </p:cTn>
+                                        <p:tgtEl>
+                                          <p:spTgt spid="3">
+                                            <p:txEl>
+                                              <p:pRg st="4" end="4"/>
+                                            </p:txEl>
+                                          </p:spTgt>
+                                        </p:tgtEl>
+                                        <p:attrNameLst>
+                                          <p:attrName>style.visibility</p:attrName>
+                                        </p:attrNameLst>
+                                      </p:cBhvr>
+                                      <p:to>
+                                        <p:strVal val="visible"/>
+                                      </p:to>
+                                    </p:set>
+                                  </p:childTnLst>
+                                </p:cTn>
+                              </p:par>
+                              <p:par>
+                                <p:cTn id="19" presetID="1" presetClass="entr" presetSubtype="0" fill="hold" grpId="0" nodeType="withEffect">
+                                  <p:stCondLst>
+                                    <p:cond delay="0"/>
+                                  </p:stCondLst>
+                                  <p:childTnLst>
+                                    <p:set>
+                                      <p:cBhvr>
+                                        <p:cTn id="20" dur="1" fill="hold">
+                                          <p:stCondLst>
+                                            <p:cond delay="0"/>
+                                          </p:stCondLst>
+                                        </p:cTn>
+                                        <p:tgtEl>
+                                          <p:spTgt spid="6"/>
+                                        </p:tgtEl>
+                                        <p:attrNameLst>
+                                          <p:attrName>style.visibility</p:attrName>
+                                        </p:attrNameLst>
+                                      </p:cBhvr>
+                                      <p:to>
+                                        <p:strVal val="visible"/>
+                                      </p:to>
+                                    </p:set>
+                                  </p:childTnLst>
+                                </p:cTn>
+                              </p:par>
+                            </p:childTnLst>
+                          </p:cTn>
+                        </p:par>
+                      </p:childTnLst>
+                    </p:cTn>
+                  </p:par>
+                  <p:par>
+                    <p:cTn id="21" fill="hold">
+                      <p:stCondLst>
+                        <p:cond delay="indefinite"/>
+                      </p:stCondLst>
+                      <p:childTnLst>
+                        <p:par>
+                          <p:cTn id="22" fill="hold">
+                            <p:stCondLst>
+                              <p:cond delay="0"/>
+                            </p:stCondLst>
+                            <p:childTnLst>
+                              <p:par>
+                                <p:cTn id="23" presetID="1" presetClass="entr" presetSubtype="0" fill="hold" grpId="0" nodeType="clickEffect">
+                                  <p:stCondLst>
+                                    <p:cond delay="0"/>
+                                  </p:stCondLst>
+                                  <p:childTnLst>
+                                    <p:set>
+                                      <p:cBhvr>
+                                        <p:cTn id="24" dur="1" fill="hold">
+                                          <p:stCondLst>
+                                            <p:cond delay="0"/>
+                                          </p:stCondLst>
+                                        </p:cTn>
+                                        <p:tgtEl>
+                                          <p:spTgt spid="3">
+                                            <p:txEl>
+                                              <p:pRg st="6" end="6"/>
+                                            </p:txEl>
+                                          </p:spTgt>
+                                        </p:tgtEl>
+                                        <p:attrNameLst>
+                                          <p:attrName>style.visibility</p:attrName>
+                                        </p:attrNameLst>
+                                      </p:cBhvr>
+                                      <p:to>
+                                        <p:strVal val="visible"/>
+                                      </p:to>
+                                    </p:set>
+                                  </p:childTnLst>
+                                </p:cTn>
+                              </p:par>
+                              <p:par>
+                                <p:cTn id="25" presetID="1" presetClass="entr" presetSubtype="0" fill="hold" grpId="0" nodeType="withEffect">
+                                  <p:stCondLst>
+                                    <p:cond delay="0"/>
+                                  </p:stCondLst>
+                                  <p:childTnLst>
+                                    <p:set>
+                                      <p:cBhvr>
+                                        <p:cTn id="26" dur="1" fill="hold">
                                           <p:stCondLst>
                                             <p:cond delay="0"/>
                                           </p:stCondLst>
@@ -11966,6 +12625,7 @@
       </p:par>
     </p:tnLst>
     <p:bldLst>
+      <p:bldP spid="3" grpId="0" uiExpand="1" build="p"/>
       <p:bldP spid="5" grpId="0" animBg="1"/>
       <p:bldP spid="6" grpId="0" animBg="1"/>
       <p:bldP spid="7" grpId="0" animBg="1"/>
@@ -11975,7 +12635,7 @@
 </p:sld>
 </file>
 
-<file path=ppt/slides/slide24.xml><?xml version="1.0" encoding="utf-8"?>
+<file path=ppt/slides/slide25.xml><?xml version="1.0" encoding="utf-8"?>
 <p:sld xmlns:a="http://schemas.openxmlformats.org/drawingml/2006/main" xmlns:r="http://schemas.openxmlformats.org/officeDocument/2006/relationships" xmlns:p="http://schemas.openxmlformats.org/presentationml/2006/main">
   <p:cSld>
     <p:spTree>
@@ -12052,24 +12712,16 @@
           <a:p>
             <a:r>
               <a:rPr lang="en-US" dirty="0" smtClean="0"/>
-              <a:t>List of c</a:t>
-            </a:r>
+              <a:t>List of children</a:t>
+            </a:r>
+          </a:p>
+          <a:p>
+            <a:endParaRPr lang="en-US" dirty="0" smtClean="0"/>
+          </a:p>
+          <a:p>
             <a:r>
               <a:rPr lang="en-US" dirty="0" smtClean="0"/>
-              <a:t>hildren</a:t>
-            </a:r>
-          </a:p>
-          <a:p>
-            <a:endParaRPr lang="en-US" dirty="0" smtClean="0"/>
-          </a:p>
-          <a:p>
-            <a:r>
-              <a:rPr lang="en-US" dirty="0" smtClean="0"/>
-              <a:t>Other </a:t>
-            </a:r>
-            <a:r>
-              <a:rPr lang="en-US" dirty="0" smtClean="0"/>
-              <a:t>properties</a:t>
+              <a:t>Other properties</a:t>
             </a:r>
           </a:p>
           <a:p>
@@ -12113,7 +12765,7 @@
           <a:p>
             <a:fld id="{CA586AD6-E5F2-4F25-940D-C674496063E2}" type="slidenum">
               <a:rPr lang="en-US" smtClean="0"/>
-              <a:t>24</a:t>
+              <a:t>25</a:t>
             </a:fld>
             <a:endParaRPr lang="en-US"/>
           </a:p>
@@ -12267,10 +12919,6 @@
               </a:rPr>
               <a:t>)</a:t>
             </a:r>
-            <a:endParaRPr lang="en-US" dirty="0" smtClean="0">
-              <a:latin typeface="Courier New" panose="02070309020205020404" pitchFamily="49" charset="0"/>
-              <a:cs typeface="Courier New" panose="02070309020205020404" pitchFamily="49" charset="0"/>
-            </a:endParaRPr>
           </a:p>
         </p:txBody>
       </p:sp>
@@ -12321,7 +12969,11 @@
                                           </p:stCondLst>
                                         </p:cTn>
                                         <p:tgtEl>
-                                          <p:spTgt spid="5"/>
+                                          <p:spTgt spid="3">
+                                            <p:txEl>
+                                              <p:pRg st="0" end="0"/>
+                                            </p:txEl>
+                                          </p:spTgt>
                                         </p:tgtEl>
                                         <p:attrNameLst>
                                           <p:attrName>style.visibility</p:attrName>
@@ -12348,6 +13000,82 @@
                                           </p:stCondLst>
                                         </p:cTn>
                                         <p:tgtEl>
+                                          <p:spTgt spid="5"/>
+                                        </p:tgtEl>
+                                        <p:attrNameLst>
+                                          <p:attrName>style.visibility</p:attrName>
+                                        </p:attrNameLst>
+                                      </p:cBhvr>
+                                      <p:to>
+                                        <p:strVal val="visible"/>
+                                      </p:to>
+                                    </p:set>
+                                  </p:childTnLst>
+                                </p:cTn>
+                              </p:par>
+                            </p:childTnLst>
+                          </p:cTn>
+                        </p:par>
+                      </p:childTnLst>
+                    </p:cTn>
+                  </p:par>
+                  <p:par>
+                    <p:cTn id="9" fill="hold">
+                      <p:stCondLst>
+                        <p:cond delay="indefinite"/>
+                      </p:stCondLst>
+                      <p:childTnLst>
+                        <p:par>
+                          <p:cTn id="10" fill="hold">
+                            <p:stCondLst>
+                              <p:cond delay="0"/>
+                            </p:stCondLst>
+                            <p:childTnLst>
+                              <p:par>
+                                <p:cTn id="11" presetID="1" presetClass="entr" presetSubtype="0" fill="hold" grpId="0" nodeType="clickEffect">
+                                  <p:stCondLst>
+                                    <p:cond delay="0"/>
+                                  </p:stCondLst>
+                                  <p:childTnLst>
+                                    <p:set>
+                                      <p:cBhvr>
+                                        <p:cTn id="12" dur="1" fill="hold">
+                                          <p:stCondLst>
+                                            <p:cond delay="0"/>
+                                          </p:stCondLst>
+                                        </p:cTn>
+                                        <p:tgtEl>
+                                          <p:spTgt spid="3">
+                                            <p:txEl>
+                                              <p:pRg st="2" end="2"/>
+                                            </p:txEl>
+                                          </p:spTgt>
+                                        </p:tgtEl>
+                                        <p:attrNameLst>
+                                          <p:attrName>style.visibility</p:attrName>
+                                        </p:attrNameLst>
+                                      </p:cBhvr>
+                                      <p:to>
+                                        <p:strVal val="visible"/>
+                                      </p:to>
+                                    </p:set>
+                                  </p:childTnLst>
+                                </p:cTn>
+                              </p:par>
+                              <p:par>
+                                <p:cTn id="13" presetID="1" presetClass="entr" presetSubtype="0" fill="hold" grpId="0" nodeType="withEffect">
+                                  <p:stCondLst>
+                                    <p:cond delay="0"/>
+                                  </p:stCondLst>
+                                  <p:childTnLst>
+                                    <p:set>
+                                      <p:cBhvr>
+                                        <p:cTn id="14" dur="1" fill="hold">
+                                          <p:stCondLst>
+                                            <p:cond delay="0"/>
+                                          </p:stCondLst>
+                                        </p:cTn>
+                                        <p:tgtEl>
                                           <p:spTgt spid="6"/>
                                         </p:tgtEl>
                                         <p:attrNameLst>
@@ -12361,21 +13089,212 @@
                                   </p:childTnLst>
                                 </p:cTn>
                               </p:par>
+                            </p:childTnLst>
+                          </p:cTn>
+                        </p:par>
+                      </p:childTnLst>
+                    </p:cTn>
+                  </p:par>
+                  <p:par>
+                    <p:cTn id="15" fill="hold">
+                      <p:stCondLst>
+                        <p:cond delay="indefinite"/>
+                      </p:stCondLst>
+                      <p:childTnLst>
+                        <p:par>
+                          <p:cTn id="16" fill="hold">
+                            <p:stCondLst>
+                              <p:cond delay="0"/>
+                            </p:stCondLst>
+                            <p:childTnLst>
                               <p:par>
-                                <p:cTn id="9" presetID="1" presetClass="entr" presetSubtype="0" fill="hold" grpId="0" nodeType="withEffect">
+                                <p:cTn id="17" presetID="1" presetClass="entr" presetSubtype="0" fill="hold" grpId="0" nodeType="clickEffect">
                                   <p:stCondLst>
                                     <p:cond delay="0"/>
                                   </p:stCondLst>
                                   <p:childTnLst>
                                     <p:set>
                                       <p:cBhvr>
-                                        <p:cTn id="10" dur="1" fill="hold">
+                                        <p:cTn id="18" dur="1" fill="hold">
+                                          <p:stCondLst>
+                                            <p:cond delay="0"/>
+                                          </p:stCondLst>
+                                        </p:cTn>
+                                        <p:tgtEl>
+                                          <p:spTgt spid="3">
+                                            <p:txEl>
+                                              <p:pRg st="4" end="4"/>
+                                            </p:txEl>
+                                          </p:spTgt>
+                                        </p:tgtEl>
+                                        <p:attrNameLst>
+                                          <p:attrName>style.visibility</p:attrName>
+                                        </p:attrNameLst>
+                                      </p:cBhvr>
+                                      <p:to>
+                                        <p:strVal val="visible"/>
+                                      </p:to>
+                                    </p:set>
+                                  </p:childTnLst>
+                                </p:cTn>
+                              </p:par>
+                              <p:par>
+                                <p:cTn id="19" presetID="1" presetClass="entr" presetSubtype="0" fill="hold" grpId="0" nodeType="withEffect">
+                                  <p:stCondLst>
+                                    <p:cond delay="0"/>
+                                  </p:stCondLst>
+                                  <p:childTnLst>
+                                    <p:set>
+                                      <p:cBhvr>
+                                        <p:cTn id="20" dur="1" fill="hold">
                                           <p:stCondLst>
                                             <p:cond delay="0"/>
                                           </p:stCondLst>
                                         </p:cTn>
                                         <p:tgtEl>
                                           <p:spTgt spid="7"/>
+                                        </p:tgtEl>
+                                        <p:attrNameLst>
+                                          <p:attrName>style.visibility</p:attrName>
+                                        </p:attrNameLst>
+                                      </p:cBhvr>
+                                      <p:to>
+                                        <p:strVal val="visible"/>
+                                      </p:to>
+                                    </p:set>
+                                  </p:childTnLst>
+                                </p:cTn>
+                              </p:par>
+                            </p:childTnLst>
+                          </p:cTn>
+                        </p:par>
+                      </p:childTnLst>
+                    </p:cTn>
+                  </p:par>
+                  <p:par>
+                    <p:cTn id="21" fill="hold">
+                      <p:stCondLst>
+                        <p:cond delay="indefinite"/>
+                      </p:stCondLst>
+                      <p:childTnLst>
+                        <p:par>
+                          <p:cTn id="22" fill="hold">
+                            <p:stCondLst>
+                              <p:cond delay="0"/>
+                            </p:stCondLst>
+                            <p:childTnLst>
+                              <p:par>
+                                <p:cTn id="23" presetID="1" presetClass="entr" presetSubtype="0" fill="hold" grpId="0" nodeType="clickEffect">
+                                  <p:stCondLst>
+                                    <p:cond delay="0"/>
+                                  </p:stCondLst>
+                                  <p:childTnLst>
+                                    <p:set>
+                                      <p:cBhvr>
+                                        <p:cTn id="24" dur="1" fill="hold">
+                                          <p:stCondLst>
+                                            <p:cond delay="0"/>
+                                          </p:stCondLst>
+                                        </p:cTn>
+                                        <p:tgtEl>
+                                          <p:spTgt spid="3">
+                                            <p:txEl>
+                                              <p:pRg st="6" end="6"/>
+                                            </p:txEl>
+                                          </p:spTgt>
+                                        </p:tgtEl>
+                                        <p:attrNameLst>
+                                          <p:attrName>style.visibility</p:attrName>
+                                        </p:attrNameLst>
+                                      </p:cBhvr>
+                                      <p:to>
+                                        <p:strVal val="visible"/>
+                                      </p:to>
+                                    </p:set>
+                                  </p:childTnLst>
+                                </p:cTn>
+                              </p:par>
+                              <p:par>
+                                <p:cTn id="25" presetID="1" presetClass="entr" presetSubtype="0" fill="hold" grpId="0" nodeType="withEffect">
+                                  <p:stCondLst>
+                                    <p:cond delay="0"/>
+                                  </p:stCondLst>
+                                  <p:childTnLst>
+                                    <p:set>
+                                      <p:cBhvr>
+                                        <p:cTn id="26" dur="1" fill="hold">
+                                          <p:stCondLst>
+                                            <p:cond delay="0"/>
+                                          </p:stCondLst>
+                                        </p:cTn>
+                                        <p:tgtEl>
+                                          <p:spTgt spid="3">
+                                            <p:txEl>
+                                              <p:pRg st="7" end="7"/>
+                                            </p:txEl>
+                                          </p:spTgt>
+                                        </p:tgtEl>
+                                        <p:attrNameLst>
+                                          <p:attrName>style.visibility</p:attrName>
+                                        </p:attrNameLst>
+                                      </p:cBhvr>
+                                      <p:to>
+                                        <p:strVal val="visible"/>
+                                      </p:to>
+                                    </p:set>
+                                  </p:childTnLst>
+                                </p:cTn>
+                              </p:par>
+                              <p:par>
+                                <p:cTn id="27" presetID="1" presetClass="entr" presetSubtype="0" fill="hold" grpId="0" nodeType="withEffect">
+                                  <p:stCondLst>
+                                    <p:cond delay="0"/>
+                                  </p:stCondLst>
+                                  <p:childTnLst>
+                                    <p:set>
+                                      <p:cBhvr>
+                                        <p:cTn id="28" dur="1" fill="hold">
+                                          <p:stCondLst>
+                                            <p:cond delay="0"/>
+                                          </p:stCondLst>
+                                        </p:cTn>
+                                        <p:tgtEl>
+                                          <p:spTgt spid="3">
+                                            <p:txEl>
+                                              <p:pRg st="8" end="8"/>
+                                            </p:txEl>
+                                          </p:spTgt>
+                                        </p:tgtEl>
+                                        <p:attrNameLst>
+                                          <p:attrName>style.visibility</p:attrName>
+                                        </p:attrNameLst>
+                                      </p:cBhvr>
+                                      <p:to>
+                                        <p:strVal val="visible"/>
+                                      </p:to>
+                                    </p:set>
+                                  </p:childTnLst>
+                                </p:cTn>
+                              </p:par>
+                              <p:par>
+                                <p:cTn id="29" presetID="1" presetClass="entr" presetSubtype="0" fill="hold" grpId="0" nodeType="withEffect">
+                                  <p:stCondLst>
+                                    <p:cond delay="0"/>
+                                  </p:stCondLst>
+                                  <p:childTnLst>
+                                    <p:set>
+                                      <p:cBhvr>
+                                        <p:cTn id="30" dur="1" fill="hold">
+                                          <p:stCondLst>
+                                            <p:cond delay="0"/>
+                                          </p:stCondLst>
+                                        </p:cTn>
+                                        <p:tgtEl>
+                                          <p:spTgt spid="3">
+                                            <p:txEl>
+                                              <p:pRg st="9" end="9"/>
+                                            </p:txEl>
+                                          </p:spTgt>
                                         </p:tgtEl>
                                         <p:attrNameLst>
                                           <p:attrName>style.visibility</p:attrName>
@@ -12416,6 +13335,7 @@
       </p:par>
     </p:tnLst>
     <p:bldLst>
+      <p:bldP spid="3" grpId="0" uiExpand="1" build="p"/>
       <p:bldP spid="5" grpId="0" animBg="1"/>
       <p:bldP spid="6" grpId="0" animBg="1"/>
       <p:bldP spid="7" grpId="0" animBg="1"/>
@@ -12424,7 +13344,7 @@
 </p:sld>
 </file>
 
-<file path=ppt/slides/slide25.xml><?xml version="1.0" encoding="utf-8"?>
+<file path=ppt/slides/slide26.xml><?xml version="1.0" encoding="utf-8"?>
 <p:sld xmlns:a="http://schemas.openxmlformats.org/drawingml/2006/main" xmlns:r="http://schemas.openxmlformats.org/officeDocument/2006/relationships" xmlns:p="http://schemas.openxmlformats.org/presentationml/2006/main">
   <p:cSld>
     <p:spTree>
@@ -12474,9 +13394,16 @@
             <p:ph idx="1"/>
           </p:nvPr>
         </p:nvSpPr>
-        <p:spPr/>
+        <p:spPr>
+          <a:xfrm>
+            <a:off x="628650" y="1825625"/>
+            <a:ext cx="7886700" cy="3806248"/>
+          </a:xfrm>
+        </p:spPr>
         <p:txBody>
-          <a:bodyPr/>
+          <a:bodyPr>
+            <a:normAutofit lnSpcReduction="10000"/>
+          </a:bodyPr>
           <a:lstStyle/>
           <a:p>
             <a:r>
@@ -12508,10 +13435,26 @@
             <a:endParaRPr lang="en-US" dirty="0" smtClean="0"/>
           </a:p>
           <a:p>
-            <a:pPr lvl="1"/>
             <a:r>
               <a:rPr lang="en-US" dirty="0" smtClean="0"/>
-              <a:t>what is the minimum distance from root to terminal clade?</a:t>
+              <a:t>Distance between two clades</a:t>
+            </a:r>
+          </a:p>
+          <a:p>
+            <a:endParaRPr lang="en-US" dirty="0"/>
+          </a:p>
+          <a:p>
+            <a:r>
+              <a:rPr lang="en-US" dirty="0" smtClean="0"/>
+              <a:t>M</a:t>
+            </a:r>
+            <a:r>
+              <a:rPr lang="en-US" dirty="0" smtClean="0"/>
+              <a:t>inimum </a:t>
+            </a:r>
+            <a:r>
+              <a:rPr lang="en-US" dirty="0" smtClean="0"/>
+              <a:t>distance from root to terminal clade?</a:t>
             </a:r>
           </a:p>
           <a:p>
@@ -12519,14 +13462,13 @@
             <a:endParaRPr lang="en-US" dirty="0"/>
           </a:p>
           <a:p>
-            <a:pPr lvl="1"/>
-            <a:endParaRPr lang="en-US" dirty="0" smtClean="0"/>
-          </a:p>
-          <a:p>
-            <a:pPr lvl="1"/>
             <a:r>
               <a:rPr lang="en-US" dirty="0" smtClean="0"/>
-              <a:t>which is the terminal clade with the minimum distance to root?</a:t>
+              <a:t>Terminal </a:t>
+            </a:r>
+            <a:r>
+              <a:rPr lang="en-US" dirty="0" smtClean="0"/>
+              <a:t>clade with the minimum distance to root?</a:t>
             </a:r>
             <a:endParaRPr lang="en-US" dirty="0"/>
           </a:p>
@@ -12553,7 +13495,7 @@
           <a:p>
             <a:fld id="{CA586AD6-E5F2-4F25-940D-C674496063E2}" type="slidenum">
               <a:rPr lang="en-US" smtClean="0"/>
-              <a:t>25</a:t>
+              <a:t>26</a:t>
             </a:fld>
             <a:endParaRPr lang="en-US"/>
           </a:p>
@@ -12567,7 +13509,7 @@
         </p:nvSpPr>
         <p:spPr>
           <a:xfrm>
-            <a:off x="807025" y="2788616"/>
+            <a:off x="807025" y="2684706"/>
             <a:ext cx="6954983" cy="369332"/>
           </a:xfrm>
           <a:prstGeom prst="rect">
@@ -12629,7 +13571,7 @@
         </p:nvSpPr>
         <p:spPr>
           <a:xfrm>
-            <a:off x="807025" y="4277342"/>
+            <a:off x="807024" y="4688014"/>
             <a:ext cx="6954984" cy="369332"/>
           </a:xfrm>
           <a:prstGeom prst="rect">
@@ -12687,10 +13629,6 @@
               </a:rPr>
               <a:t>()</a:t>
             </a:r>
-            <a:endParaRPr lang="en-US" dirty="0" smtClean="0">
-              <a:latin typeface="Courier New" panose="02070309020205020404" pitchFamily="49" charset="0"/>
-              <a:cs typeface="Courier New" panose="02070309020205020404" pitchFamily="49" charset="0"/>
-            </a:endParaRPr>
           </a:p>
         </p:txBody>
       </p:sp>
@@ -12702,7 +13640,7 @@
         </p:nvSpPr>
         <p:spPr>
           <a:xfrm>
-            <a:off x="807024" y="5807631"/>
+            <a:off x="807024" y="5558247"/>
             <a:ext cx="6954984" cy="923330"/>
           </a:xfrm>
           <a:prstGeom prst="rect">
@@ -12730,28 +13668,51 @@
                 <a:latin typeface="Courier New" panose="02070309020205020404" pitchFamily="49" charset="0"/>
                 <a:cs typeface="Courier New" panose="02070309020205020404" pitchFamily="49" charset="0"/>
               </a:rPr>
-              <a:t>min(((</a:t>
+              <a:t>min(((t.name, </a:t>
+            </a:r>
+            <a:r>
+              <a:rPr lang="en-US" dirty="0" err="1" smtClean="0">
+                <a:latin typeface="Courier New" panose="02070309020205020404" pitchFamily="49" charset="0"/>
+                <a:cs typeface="Courier New" panose="02070309020205020404" pitchFamily="49" charset="0"/>
+              </a:rPr>
+              <a:t>clade_depths</a:t>
             </a:r>
             <a:r>
               <a:rPr lang="en-US" dirty="0" smtClean="0">
                 <a:latin typeface="Courier New" panose="02070309020205020404" pitchFamily="49" charset="0"/>
                 <a:cs typeface="Courier New" panose="02070309020205020404" pitchFamily="49" charset="0"/>
               </a:rPr>
-              <a:t>t.name, </a:t>
+              <a:t>[t])</a:t>
+            </a:r>
+          </a:p>
+          <a:p>
+            <a:r>
+              <a:rPr lang="en-US" dirty="0">
+                <a:latin typeface="Courier New" panose="02070309020205020404" pitchFamily="49" charset="0"/>
+                <a:cs typeface="Courier New" panose="02070309020205020404" pitchFamily="49" charset="0"/>
+              </a:rPr>
+              <a:t> </a:t>
+            </a:r>
+            <a:r>
+              <a:rPr lang="en-US" dirty="0" smtClean="0">
+                <a:latin typeface="Courier New" panose="02070309020205020404" pitchFamily="49" charset="0"/>
+                <a:cs typeface="Courier New" panose="02070309020205020404" pitchFamily="49" charset="0"/>
+              </a:rPr>
+              <a:t>   for t in </a:t>
             </a:r>
             <a:r>
               <a:rPr lang="en-US" dirty="0" err="1" smtClean="0">
                 <a:latin typeface="Courier New" panose="02070309020205020404" pitchFamily="49" charset="0"/>
                 <a:cs typeface="Courier New" panose="02070309020205020404" pitchFamily="49" charset="0"/>
               </a:rPr>
-              <a:t>clade_depths</a:t>
+              <a:t>tree.get_terminals</a:t>
             </a:r>
             <a:r>
               <a:rPr lang="en-US" dirty="0" smtClean="0">
                 <a:latin typeface="Courier New" panose="02070309020205020404" pitchFamily="49" charset="0"/>
                 <a:cs typeface="Courier New" panose="02070309020205020404" pitchFamily="49" charset="0"/>
               </a:rPr>
-              <a:t>[t])</a:t>
+              <a:t>()),</a:t>
             </a:r>
           </a:p>
           <a:p>
@@ -12767,44 +13728,55 @@
                 <a:latin typeface="Courier New" panose="02070309020205020404" pitchFamily="49" charset="0"/>
                 <a:cs typeface="Courier New" panose="02070309020205020404" pitchFamily="49" charset="0"/>
               </a:rPr>
-              <a:t>   </a:t>
+              <a:t>   key=lambda x: x[1])</a:t>
+            </a:r>
+          </a:p>
+        </p:txBody>
+      </p:sp>
+      <p:sp>
+        <p:nvSpPr>
+          <p:cNvPr id="9" name="TextBox 8"/>
+          <p:cNvSpPr txBox="1"/>
+          <p:nvPr/>
+        </p:nvSpPr>
+        <p:spPr>
+          <a:xfrm>
+            <a:off x="807024" y="3844514"/>
+            <a:ext cx="6954984" cy="369332"/>
+          </a:xfrm>
+          <a:prstGeom prst="rect">
+            <a:avLst/>
+          </a:prstGeom>
+          <a:solidFill>
+            <a:schemeClr val="bg1">
+              <a:lumMod val="75000"/>
+            </a:schemeClr>
+          </a:solidFill>
+          <a:ln>
+            <a:solidFill>
+              <a:schemeClr val="tx1"/>
+            </a:solidFill>
+          </a:ln>
+        </p:spPr>
+        <p:txBody>
+          <a:bodyPr wrap="square" rtlCol="0">
+            <a:spAutoFit/>
+          </a:bodyPr>
+          <a:lstStyle/>
+          <a:p>
+            <a:r>
+              <a:rPr lang="en-US" dirty="0" err="1" smtClean="0">
+                <a:latin typeface="Courier New" panose="02070309020205020404" pitchFamily="49" charset="0"/>
+                <a:cs typeface="Courier New" panose="02070309020205020404" pitchFamily="49" charset="0"/>
+              </a:rPr>
+              <a:t>tree.distance</a:t>
             </a:r>
             <a:r>
               <a:rPr lang="en-US" dirty="0" smtClean="0">
                 <a:latin typeface="Courier New" panose="02070309020205020404" pitchFamily="49" charset="0"/>
                 <a:cs typeface="Courier New" panose="02070309020205020404" pitchFamily="49" charset="0"/>
               </a:rPr>
-              <a:t>for t in </a:t>
-            </a:r>
-            <a:r>
-              <a:rPr lang="en-US" dirty="0" err="1" smtClean="0">
-                <a:latin typeface="Courier New" panose="02070309020205020404" pitchFamily="49" charset="0"/>
-                <a:cs typeface="Courier New" panose="02070309020205020404" pitchFamily="49" charset="0"/>
-              </a:rPr>
-              <a:t>tree.get_terminals</a:t>
-            </a:r>
-            <a:r>
-              <a:rPr lang="en-US" dirty="0" smtClean="0">
-                <a:latin typeface="Courier New" panose="02070309020205020404" pitchFamily="49" charset="0"/>
-                <a:cs typeface="Courier New" panose="02070309020205020404" pitchFamily="49" charset="0"/>
-              </a:rPr>
-              <a:t>()),</a:t>
-            </a:r>
-          </a:p>
-          <a:p>
-            <a:r>
-              <a:rPr lang="en-US" dirty="0">
-                <a:latin typeface="Courier New" panose="02070309020205020404" pitchFamily="49" charset="0"/>
-                <a:cs typeface="Courier New" panose="02070309020205020404" pitchFamily="49" charset="0"/>
-              </a:rPr>
-              <a:t> </a:t>
-            </a:r>
-            <a:r>
-              <a:rPr lang="en-US" dirty="0" smtClean="0">
-                <a:latin typeface="Courier New" panose="02070309020205020404" pitchFamily="49" charset="0"/>
-                <a:cs typeface="Courier New" panose="02070309020205020404" pitchFamily="49" charset="0"/>
-              </a:rPr>
-              <a:t>   key=lambda x: x[1])</a:t>
+              <a:t>(clades[0], clades[5])</a:t>
             </a:r>
             <a:endParaRPr lang="en-US" dirty="0" smtClean="0">
               <a:latin typeface="Courier New" panose="02070309020205020404" pitchFamily="49" charset="0"/>
@@ -12860,7 +13832,1687 @@
                                           </p:stCondLst>
                                         </p:cTn>
                                         <p:tgtEl>
+                                          <p:spTgt spid="3">
+                                            <p:txEl>
+                                              <p:pRg st="0" end="0"/>
+                                            </p:txEl>
+                                          </p:spTgt>
+                                        </p:tgtEl>
+                                        <p:attrNameLst>
+                                          <p:attrName>style.visibility</p:attrName>
+                                        </p:attrNameLst>
+                                      </p:cBhvr>
+                                      <p:to>
+                                        <p:strVal val="visible"/>
+                                      </p:to>
+                                    </p:set>
+                                  </p:childTnLst>
+                                </p:cTn>
+                              </p:par>
+                              <p:par>
+                                <p:cTn id="7" presetID="1" presetClass="entr" presetSubtype="0" fill="hold" grpId="0" nodeType="withEffect">
+                                  <p:stCondLst>
+                                    <p:cond delay="0"/>
+                                  </p:stCondLst>
+                                  <p:childTnLst>
+                                    <p:set>
+                                      <p:cBhvr>
+                                        <p:cTn id="8" dur="1" fill="hold">
+                                          <p:stCondLst>
+                                            <p:cond delay="0"/>
+                                          </p:stCondLst>
+                                        </p:cTn>
+                                        <p:tgtEl>
+                                          <p:spTgt spid="3">
+                                            <p:txEl>
+                                              <p:pRg st="1" end="1"/>
+                                            </p:txEl>
+                                          </p:spTgt>
+                                        </p:tgtEl>
+                                        <p:attrNameLst>
+                                          <p:attrName>style.visibility</p:attrName>
+                                        </p:attrNameLst>
+                                      </p:cBhvr>
+                                      <p:to>
+                                        <p:strVal val="visible"/>
+                                      </p:to>
+                                    </p:set>
+                                  </p:childTnLst>
+                                </p:cTn>
+                              </p:par>
+                              <p:par>
+                                <p:cTn id="9" presetID="1" presetClass="entr" presetSubtype="0" fill="hold" grpId="0" nodeType="withEffect">
+                                  <p:stCondLst>
+                                    <p:cond delay="0"/>
+                                  </p:stCondLst>
+                                  <p:childTnLst>
+                                    <p:set>
+                                      <p:cBhvr>
+                                        <p:cTn id="10" dur="1" fill="hold">
+                                          <p:stCondLst>
+                                            <p:cond delay="0"/>
+                                          </p:stCondLst>
+                                        </p:cTn>
+                                        <p:tgtEl>
                                           <p:spTgt spid="5"/>
+                                        </p:tgtEl>
+                                        <p:attrNameLst>
+                                          <p:attrName>style.visibility</p:attrName>
+                                        </p:attrNameLst>
+                                      </p:cBhvr>
+                                      <p:to>
+                                        <p:strVal val="visible"/>
+                                      </p:to>
+                                    </p:set>
+                                  </p:childTnLst>
+                                </p:cTn>
+                              </p:par>
+                            </p:childTnLst>
+                          </p:cTn>
+                        </p:par>
+                      </p:childTnLst>
+                    </p:cTn>
+                  </p:par>
+                  <p:par>
+                    <p:cTn id="11" fill="hold">
+                      <p:stCondLst>
+                        <p:cond delay="indefinite"/>
+                      </p:stCondLst>
+                      <p:childTnLst>
+                        <p:par>
+                          <p:cTn id="12" fill="hold">
+                            <p:stCondLst>
+                              <p:cond delay="0"/>
+                            </p:stCondLst>
+                            <p:childTnLst>
+                              <p:par>
+                                <p:cTn id="13" presetID="1" presetClass="entr" presetSubtype="0" fill="hold" grpId="0" nodeType="clickEffect">
+                                  <p:stCondLst>
+                                    <p:cond delay="0"/>
+                                  </p:stCondLst>
+                                  <p:childTnLst>
+                                    <p:set>
+                                      <p:cBhvr>
+                                        <p:cTn id="14" dur="1" fill="hold">
+                                          <p:stCondLst>
+                                            <p:cond delay="0"/>
+                                          </p:stCondLst>
+                                        </p:cTn>
+                                        <p:tgtEl>
+                                          <p:spTgt spid="3">
+                                            <p:txEl>
+                                              <p:pRg st="4" end="4"/>
+                                            </p:txEl>
+                                          </p:spTgt>
+                                        </p:tgtEl>
+                                        <p:attrNameLst>
+                                          <p:attrName>style.visibility</p:attrName>
+                                        </p:attrNameLst>
+                                      </p:cBhvr>
+                                      <p:to>
+                                        <p:strVal val="visible"/>
+                                      </p:to>
+                                    </p:set>
+                                  </p:childTnLst>
+                                </p:cTn>
+                              </p:par>
+                              <p:par>
+                                <p:cTn id="15" presetID="1" presetClass="entr" presetSubtype="0" fill="hold" grpId="0" nodeType="withEffect">
+                                  <p:stCondLst>
+                                    <p:cond delay="0"/>
+                                  </p:stCondLst>
+                                  <p:childTnLst>
+                                    <p:set>
+                                      <p:cBhvr>
+                                        <p:cTn id="16" dur="1" fill="hold">
+                                          <p:stCondLst>
+                                            <p:cond delay="0"/>
+                                          </p:stCondLst>
+                                        </p:cTn>
+                                        <p:tgtEl>
+                                          <p:spTgt spid="9"/>
+                                        </p:tgtEl>
+                                        <p:attrNameLst>
+                                          <p:attrName>style.visibility</p:attrName>
+                                        </p:attrNameLst>
+                                      </p:cBhvr>
+                                      <p:to>
+                                        <p:strVal val="visible"/>
+                                      </p:to>
+                                    </p:set>
+                                  </p:childTnLst>
+                                </p:cTn>
+                              </p:par>
+                            </p:childTnLst>
+                          </p:cTn>
+                        </p:par>
+                      </p:childTnLst>
+                    </p:cTn>
+                  </p:par>
+                  <p:par>
+                    <p:cTn id="17" fill="hold">
+                      <p:stCondLst>
+                        <p:cond delay="indefinite"/>
+                      </p:stCondLst>
+                      <p:childTnLst>
+                        <p:par>
+                          <p:cTn id="18" fill="hold">
+                            <p:stCondLst>
+                              <p:cond delay="0"/>
+                            </p:stCondLst>
+                            <p:childTnLst>
+                              <p:par>
+                                <p:cTn id="19" presetID="1" presetClass="entr" presetSubtype="0" fill="hold" grpId="0" nodeType="clickEffect">
+                                  <p:stCondLst>
+                                    <p:cond delay="0"/>
+                                  </p:stCondLst>
+                                  <p:childTnLst>
+                                    <p:set>
+                                      <p:cBhvr>
+                                        <p:cTn id="20" dur="1" fill="hold">
+                                          <p:stCondLst>
+                                            <p:cond delay="0"/>
+                                          </p:stCondLst>
+                                        </p:cTn>
+                                        <p:tgtEl>
+                                          <p:spTgt spid="3">
+                                            <p:txEl>
+                                              <p:pRg st="6" end="6"/>
+                                            </p:txEl>
+                                          </p:spTgt>
+                                        </p:tgtEl>
+                                        <p:attrNameLst>
+                                          <p:attrName>style.visibility</p:attrName>
+                                        </p:attrNameLst>
+                                      </p:cBhvr>
+                                      <p:to>
+                                        <p:strVal val="visible"/>
+                                      </p:to>
+                                    </p:set>
+                                  </p:childTnLst>
+                                </p:cTn>
+                              </p:par>
+                              <p:par>
+                                <p:cTn id="21" presetID="1" presetClass="entr" presetSubtype="0" fill="hold" grpId="0" nodeType="withEffect">
+                                  <p:stCondLst>
+                                    <p:cond delay="0"/>
+                                  </p:stCondLst>
+                                  <p:childTnLst>
+                                    <p:set>
+                                      <p:cBhvr>
+                                        <p:cTn id="22" dur="1" fill="hold">
+                                          <p:stCondLst>
+                                            <p:cond delay="0"/>
+                                          </p:stCondLst>
+                                        </p:cTn>
+                                        <p:tgtEl>
+                                          <p:spTgt spid="7"/>
+                                        </p:tgtEl>
+                                        <p:attrNameLst>
+                                          <p:attrName>style.visibility</p:attrName>
+                                        </p:attrNameLst>
+                                      </p:cBhvr>
+                                      <p:to>
+                                        <p:strVal val="visible"/>
+                                      </p:to>
+                                    </p:set>
+                                  </p:childTnLst>
+                                </p:cTn>
+                              </p:par>
+                            </p:childTnLst>
+                          </p:cTn>
+                        </p:par>
+                      </p:childTnLst>
+                    </p:cTn>
+                  </p:par>
+                  <p:par>
+                    <p:cTn id="23" fill="hold">
+                      <p:stCondLst>
+                        <p:cond delay="indefinite"/>
+                      </p:stCondLst>
+                      <p:childTnLst>
+                        <p:par>
+                          <p:cTn id="24" fill="hold">
+                            <p:stCondLst>
+                              <p:cond delay="0"/>
+                            </p:stCondLst>
+                            <p:childTnLst>
+                              <p:par>
+                                <p:cTn id="25" presetID="1" presetClass="entr" presetSubtype="0" fill="hold" grpId="0" nodeType="clickEffect">
+                                  <p:stCondLst>
+                                    <p:cond delay="0"/>
+                                  </p:stCondLst>
+                                  <p:childTnLst>
+                                    <p:set>
+                                      <p:cBhvr>
+                                        <p:cTn id="26" dur="1" fill="hold">
+                                          <p:stCondLst>
+                                            <p:cond delay="0"/>
+                                          </p:stCondLst>
+                                        </p:cTn>
+                                        <p:tgtEl>
+                                          <p:spTgt spid="3">
+                                            <p:txEl>
+                                              <p:pRg st="8" end="8"/>
+                                            </p:txEl>
+                                          </p:spTgt>
+                                        </p:tgtEl>
+                                        <p:attrNameLst>
+                                          <p:attrName>style.visibility</p:attrName>
+                                        </p:attrNameLst>
+                                      </p:cBhvr>
+                                      <p:to>
+                                        <p:strVal val="visible"/>
+                                      </p:to>
+                                    </p:set>
+                                  </p:childTnLst>
+                                </p:cTn>
+                              </p:par>
+                              <p:par>
+                                <p:cTn id="27" presetID="1" presetClass="entr" presetSubtype="0" fill="hold" grpId="0" nodeType="withEffect">
+                                  <p:stCondLst>
+                                    <p:cond delay="0"/>
+                                  </p:stCondLst>
+                                  <p:childTnLst>
+                                    <p:set>
+                                      <p:cBhvr>
+                                        <p:cTn id="28" dur="1" fill="hold">
+                                          <p:stCondLst>
+                                            <p:cond delay="0"/>
+                                          </p:stCondLst>
+                                        </p:cTn>
+                                        <p:tgtEl>
+                                          <p:spTgt spid="8"/>
+                                        </p:tgtEl>
+                                        <p:attrNameLst>
+                                          <p:attrName>style.visibility</p:attrName>
+                                        </p:attrNameLst>
+                                      </p:cBhvr>
+                                      <p:to>
+                                        <p:strVal val="visible"/>
+                                      </p:to>
+                                    </p:set>
+                                  </p:childTnLst>
+                                </p:cTn>
+                              </p:par>
+                            </p:childTnLst>
+                          </p:cTn>
+                        </p:par>
+                      </p:childTnLst>
+                    </p:cTn>
+                  </p:par>
+                </p:childTnLst>
+              </p:cTn>
+              <p:prevCondLst>
+                <p:cond evt="onPrev" delay="0">
+                  <p:tgtEl>
+                    <p:sldTgt/>
+                  </p:tgtEl>
+                </p:cond>
+              </p:prevCondLst>
+              <p:nextCondLst>
+                <p:cond evt="onNext" delay="0">
+                  <p:tgtEl>
+                    <p:sldTgt/>
+                  </p:tgtEl>
+                </p:cond>
+              </p:nextCondLst>
+            </p:seq>
+          </p:childTnLst>
+        </p:cTn>
+      </p:par>
+    </p:tnLst>
+    <p:bldLst>
+      <p:bldP spid="3" grpId="0" uiExpand="1" build="p"/>
+      <p:bldP spid="5" grpId="0" animBg="1"/>
+      <p:bldP spid="7" grpId="0" animBg="1"/>
+      <p:bldP spid="8" grpId="0" animBg="1"/>
+      <p:bldP spid="9" grpId="0" animBg="1"/>
+    </p:bldLst>
+  </p:timing>
+</p:sld>
+</file>
+
+<file path=ppt/slides/slide27.xml><?xml version="1.0" encoding="utf-8"?>
+<p:sld xmlns:a="http://schemas.openxmlformats.org/drawingml/2006/main" xmlns:r="http://schemas.openxmlformats.org/officeDocument/2006/relationships" xmlns:p="http://schemas.openxmlformats.org/presentationml/2006/main">
+  <p:cSld>
+    <p:spTree>
+      <p:nvGrpSpPr>
+        <p:cNvPr id="1" name=""/>
+        <p:cNvGrpSpPr/>
+        <p:nvPr/>
+      </p:nvGrpSpPr>
+      <p:grpSpPr>
+        <a:xfrm>
+          <a:off x="0" y="0"/>
+          <a:ext cx="0" cy="0"/>
+          <a:chOff x="0" y="0"/>
+          <a:chExt cx="0" cy="0"/>
+        </a:xfrm>
+      </p:grpSpPr>
+      <p:sp>
+        <p:nvSpPr>
+          <p:cNvPr id="2" name="Title 1"/>
+          <p:cNvSpPr>
+            <a:spLocks noGrp="1"/>
+          </p:cNvSpPr>
+          <p:nvPr>
+            <p:ph type="title"/>
+          </p:nvPr>
+        </p:nvSpPr>
+        <p:spPr/>
+        <p:txBody>
+          <a:bodyPr/>
+          <a:lstStyle/>
+          <a:p>
+            <a:r>
+              <a:rPr lang="en-US" dirty="0" smtClean="0"/>
+              <a:t>Navigating </a:t>
+            </a:r>
+            <a:r>
+              <a:rPr lang="en-US" dirty="0" smtClean="0"/>
+              <a:t>trees</a:t>
+            </a:r>
+            <a:endParaRPr lang="en-US" dirty="0"/>
+          </a:p>
+        </p:txBody>
+      </p:sp>
+      <p:sp>
+        <p:nvSpPr>
+          <p:cNvPr id="3" name="Content Placeholder 2"/>
+          <p:cNvSpPr>
+            <a:spLocks noGrp="1"/>
+          </p:cNvSpPr>
+          <p:nvPr>
+            <p:ph idx="1"/>
+          </p:nvPr>
+        </p:nvSpPr>
+        <p:spPr/>
+        <p:txBody>
+          <a:bodyPr>
+            <a:normAutofit lnSpcReduction="10000"/>
+          </a:bodyPr>
+          <a:lstStyle/>
+          <a:p>
+            <a:r>
+              <a:rPr lang="en-US" dirty="0" smtClean="0"/>
+              <a:t>Get path to descendant</a:t>
+            </a:r>
+          </a:p>
+          <a:p>
+            <a:endParaRPr lang="en-US" dirty="0"/>
+          </a:p>
+          <a:p>
+            <a:endParaRPr lang="en-US" dirty="0" smtClean="0"/>
+          </a:p>
+          <a:p>
+            <a:endParaRPr lang="en-US" dirty="0"/>
+          </a:p>
+          <a:p>
+            <a:endParaRPr lang="en-US" dirty="0" smtClean="0"/>
+          </a:p>
+          <a:p>
+            <a:r>
+              <a:rPr lang="en-US" dirty="0" smtClean="0"/>
+              <a:t>Find path </a:t>
+            </a:r>
+            <a:r>
+              <a:rPr lang="en-US" dirty="0"/>
+              <a:t>from one clade to </a:t>
+            </a:r>
+            <a:r>
+              <a:rPr lang="en-US" dirty="0" smtClean="0"/>
+              <a:t>another</a:t>
+            </a:r>
+            <a:endParaRPr lang="en-US" dirty="0" smtClean="0"/>
+          </a:p>
+          <a:p>
+            <a:endParaRPr lang="en-US" dirty="0"/>
+          </a:p>
+          <a:p>
+            <a:endParaRPr lang="en-US" dirty="0" smtClean="0"/>
+          </a:p>
+          <a:p>
+            <a:r>
+              <a:rPr lang="en-US" dirty="0" smtClean="0"/>
+              <a:t>Get </a:t>
+            </a:r>
+            <a:r>
+              <a:rPr lang="en-US" dirty="0" smtClean="0"/>
+              <a:t>common ancestor</a:t>
+            </a:r>
+            <a:endParaRPr lang="en-US" dirty="0"/>
+          </a:p>
+        </p:txBody>
+      </p:sp>
+      <p:sp>
+        <p:nvSpPr>
+          <p:cNvPr id="4" name="Slide Number Placeholder 3"/>
+          <p:cNvSpPr>
+            <a:spLocks noGrp="1"/>
+          </p:cNvSpPr>
+          <p:nvPr>
+            <p:ph type="sldNum" sz="quarter" idx="12"/>
+          </p:nvPr>
+        </p:nvSpPr>
+        <p:spPr/>
+        <p:txBody>
+          <a:bodyPr/>
+          <a:lstStyle/>
+          <a:p>
+            <a:fld id="{CA586AD6-E5F2-4F25-940D-C674496063E2}" type="slidenum">
+              <a:rPr lang="en-US" smtClean="0"/>
+              <a:t>27</a:t>
+            </a:fld>
+            <a:endParaRPr lang="en-US"/>
+          </a:p>
+        </p:txBody>
+      </p:sp>
+      <p:sp>
+        <p:nvSpPr>
+          <p:cNvPr id="5" name="TextBox 4"/>
+          <p:cNvSpPr txBox="1"/>
+          <p:nvPr/>
+        </p:nvSpPr>
+        <p:spPr>
+          <a:xfrm>
+            <a:off x="807025" y="2393758"/>
+            <a:ext cx="6954983" cy="369332"/>
+          </a:xfrm>
+          <a:prstGeom prst="rect">
+            <a:avLst/>
+          </a:prstGeom>
+          <a:solidFill>
+            <a:schemeClr val="bg1">
+              <a:lumMod val="75000"/>
+            </a:schemeClr>
+          </a:solidFill>
+          <a:ln>
+            <a:solidFill>
+              <a:schemeClr val="tx1"/>
+            </a:solidFill>
+          </a:ln>
+        </p:spPr>
+        <p:txBody>
+          <a:bodyPr wrap="square" rtlCol="0">
+            <a:spAutoFit/>
+          </a:bodyPr>
+          <a:lstStyle/>
+          <a:p>
+            <a:r>
+              <a:rPr lang="en-US" dirty="0" err="1" smtClean="0">
+                <a:latin typeface="Courier New" panose="02070309020205020404" pitchFamily="49" charset="0"/>
+                <a:cs typeface="Courier New" panose="02070309020205020404" pitchFamily="49" charset="0"/>
+              </a:rPr>
+              <a:t>root.get_path</a:t>
+            </a:r>
+            <a:r>
+              <a:rPr lang="en-US" dirty="0" smtClean="0">
+                <a:latin typeface="Courier New" panose="02070309020205020404" pitchFamily="49" charset="0"/>
+                <a:cs typeface="Courier New" panose="02070309020205020404" pitchFamily="49" charset="0"/>
+              </a:rPr>
+              <a:t>(</a:t>
+            </a:r>
+            <a:r>
+              <a:rPr lang="en-US" dirty="0" err="1" smtClean="0">
+                <a:latin typeface="Courier New" panose="02070309020205020404" pitchFamily="49" charset="0"/>
+                <a:cs typeface="Courier New" panose="02070309020205020404" pitchFamily="49" charset="0"/>
+              </a:rPr>
+              <a:t>terminal_clades</a:t>
+            </a:r>
+            <a:r>
+              <a:rPr lang="en-US" dirty="0" smtClean="0">
+                <a:latin typeface="Courier New" panose="02070309020205020404" pitchFamily="49" charset="0"/>
+                <a:cs typeface="Courier New" panose="02070309020205020404" pitchFamily="49" charset="0"/>
+              </a:rPr>
+              <a:t>[0])</a:t>
+            </a:r>
+          </a:p>
+        </p:txBody>
+      </p:sp>
+      <p:sp>
+        <p:nvSpPr>
+          <p:cNvPr id="6" name="TextBox 5"/>
+          <p:cNvSpPr txBox="1"/>
+          <p:nvPr/>
+        </p:nvSpPr>
+        <p:spPr>
+          <a:xfrm>
+            <a:off x="807024" y="2919845"/>
+            <a:ext cx="6954983" cy="923330"/>
+          </a:xfrm>
+          <a:prstGeom prst="rect">
+            <a:avLst/>
+          </a:prstGeom>
+          <a:solidFill>
+            <a:schemeClr val="tx1"/>
+          </a:solidFill>
+          <a:ln>
+            <a:solidFill>
+              <a:schemeClr val="tx1"/>
+            </a:solidFill>
+          </a:ln>
+        </p:spPr>
+        <p:txBody>
+          <a:bodyPr wrap="square" rtlCol="0">
+            <a:spAutoFit/>
+          </a:bodyPr>
+          <a:lstStyle/>
+          <a:p>
+            <a:r>
+              <a:rPr lang="en-US" b="1" dirty="0">
+                <a:solidFill>
+                  <a:schemeClr val="bg2"/>
+                </a:solidFill>
+                <a:latin typeface="Courier New" panose="02070309020205020404" pitchFamily="49" charset="0"/>
+                <a:cs typeface="Courier New" panose="02070309020205020404" pitchFamily="49" charset="0"/>
+              </a:rPr>
+              <a:t>[Clade(</a:t>
+            </a:r>
+            <a:r>
+              <a:rPr lang="en-US" b="1" dirty="0" err="1">
+                <a:solidFill>
+                  <a:schemeClr val="bg2"/>
+                </a:solidFill>
+                <a:latin typeface="Courier New" panose="02070309020205020404" pitchFamily="49" charset="0"/>
+                <a:cs typeface="Courier New" panose="02070309020205020404" pitchFamily="49" charset="0"/>
+              </a:rPr>
+              <a:t>branch_length</a:t>
+            </a:r>
+            <a:r>
+              <a:rPr lang="en-US" b="1" dirty="0">
+                <a:solidFill>
+                  <a:schemeClr val="bg2"/>
+                </a:solidFill>
+                <a:latin typeface="Courier New" panose="02070309020205020404" pitchFamily="49" charset="0"/>
+                <a:cs typeface="Courier New" panose="02070309020205020404" pitchFamily="49" charset="0"/>
+              </a:rPr>
+              <a:t>=0.045735),</a:t>
+            </a:r>
+          </a:p>
+          <a:p>
+            <a:r>
+              <a:rPr lang="en-US" b="1" dirty="0" smtClean="0">
+                <a:solidFill>
+                  <a:schemeClr val="bg2"/>
+                </a:solidFill>
+                <a:latin typeface="Courier New" panose="02070309020205020404" pitchFamily="49" charset="0"/>
+                <a:cs typeface="Courier New" panose="02070309020205020404" pitchFamily="49" charset="0"/>
+              </a:rPr>
+              <a:t>…</a:t>
+            </a:r>
+          </a:p>
+          <a:p>
+            <a:r>
+              <a:rPr lang="en-US" b="1" dirty="0" smtClean="0">
+                <a:solidFill>
+                  <a:schemeClr val="bg2"/>
+                </a:solidFill>
+                <a:latin typeface="Courier New" panose="02070309020205020404" pitchFamily="49" charset="0"/>
+                <a:cs typeface="Courier New" panose="02070309020205020404" pitchFamily="49" charset="0"/>
+              </a:rPr>
+              <a:t> </a:t>
+            </a:r>
+            <a:r>
+              <a:rPr lang="en-US" b="1" dirty="0">
+                <a:solidFill>
+                  <a:schemeClr val="bg2"/>
+                </a:solidFill>
+                <a:latin typeface="Courier New" panose="02070309020205020404" pitchFamily="49" charset="0"/>
+                <a:cs typeface="Courier New" panose="02070309020205020404" pitchFamily="49" charset="0"/>
+              </a:rPr>
+              <a:t>Clade(</a:t>
+            </a:r>
+            <a:r>
+              <a:rPr lang="en-US" b="1" dirty="0" err="1">
+                <a:solidFill>
+                  <a:schemeClr val="bg2"/>
+                </a:solidFill>
+                <a:latin typeface="Courier New" panose="02070309020205020404" pitchFamily="49" charset="0"/>
+                <a:cs typeface="Courier New" panose="02070309020205020404" pitchFamily="49" charset="0"/>
+              </a:rPr>
+              <a:t>branch_length</a:t>
+            </a:r>
+            <a:r>
+              <a:rPr lang="en-US" b="1" dirty="0">
+                <a:solidFill>
+                  <a:schemeClr val="bg2"/>
+                </a:solidFill>
+                <a:latin typeface="Courier New" panose="02070309020205020404" pitchFamily="49" charset="0"/>
+                <a:cs typeface="Courier New" panose="02070309020205020404" pitchFamily="49" charset="0"/>
+              </a:rPr>
+              <a:t>=0.021138, name='2070OziPo</a:t>
+            </a:r>
+            <a:r>
+              <a:rPr lang="en-US" b="1" dirty="0" smtClean="0">
+                <a:solidFill>
+                  <a:schemeClr val="bg2"/>
+                </a:solidFill>
+                <a:latin typeface="Courier New" panose="02070309020205020404" pitchFamily="49" charset="0"/>
+                <a:cs typeface="Courier New" panose="02070309020205020404" pitchFamily="49" charset="0"/>
+              </a:rPr>
+              <a:t>')]</a:t>
+            </a:r>
+            <a:endParaRPr lang="en-US" b="1" dirty="0">
+              <a:solidFill>
+                <a:schemeClr val="bg2"/>
+              </a:solidFill>
+              <a:latin typeface="Courier New" panose="02070309020205020404" pitchFamily="49" charset="0"/>
+              <a:cs typeface="Courier New" panose="02070309020205020404" pitchFamily="49" charset="0"/>
+            </a:endParaRPr>
+          </a:p>
+        </p:txBody>
+      </p:sp>
+      <p:sp>
+        <p:nvSpPr>
+          <p:cNvPr id="7" name="TextBox 6"/>
+          <p:cNvSpPr txBox="1"/>
+          <p:nvPr/>
+        </p:nvSpPr>
+        <p:spPr>
+          <a:xfrm>
+            <a:off x="807024" y="6016727"/>
+            <a:ext cx="6954983" cy="646331"/>
+          </a:xfrm>
+          <a:prstGeom prst="rect">
+            <a:avLst/>
+          </a:prstGeom>
+          <a:solidFill>
+            <a:schemeClr val="bg1">
+              <a:lumMod val="75000"/>
+            </a:schemeClr>
+          </a:solidFill>
+          <a:ln>
+            <a:solidFill>
+              <a:schemeClr val="tx1"/>
+            </a:solidFill>
+          </a:ln>
+        </p:spPr>
+        <p:txBody>
+          <a:bodyPr wrap="square" rtlCol="0">
+            <a:spAutoFit/>
+          </a:bodyPr>
+          <a:lstStyle/>
+          <a:p>
+            <a:r>
+              <a:rPr lang="en-US" dirty="0" err="1" smtClean="0">
+                <a:latin typeface="Courier New" panose="02070309020205020404" pitchFamily="49" charset="0"/>
+                <a:cs typeface="Courier New" panose="02070309020205020404" pitchFamily="49" charset="0"/>
+              </a:rPr>
+              <a:t>tree.common_ancestor</a:t>
+            </a:r>
+            <a:r>
+              <a:rPr lang="en-US" dirty="0" smtClean="0">
+                <a:latin typeface="Courier New" panose="02070309020205020404" pitchFamily="49" charset="0"/>
+                <a:cs typeface="Courier New" panose="02070309020205020404" pitchFamily="49" charset="0"/>
+              </a:rPr>
+              <a:t>(</a:t>
+            </a:r>
+            <a:r>
+              <a:rPr lang="en-US" dirty="0" err="1" smtClean="0">
+                <a:latin typeface="Courier New" panose="02070309020205020404" pitchFamily="49" charset="0"/>
+                <a:cs typeface="Courier New" panose="02070309020205020404" pitchFamily="49" charset="0"/>
+              </a:rPr>
+              <a:t>terminal_clades</a:t>
+            </a:r>
+            <a:r>
+              <a:rPr lang="en-US" dirty="0" smtClean="0">
+                <a:latin typeface="Courier New" panose="02070309020205020404" pitchFamily="49" charset="0"/>
+                <a:cs typeface="Courier New" panose="02070309020205020404" pitchFamily="49" charset="0"/>
+              </a:rPr>
+              <a:t>[0],</a:t>
+            </a:r>
+          </a:p>
+          <a:p>
+            <a:r>
+              <a:rPr lang="en-US" dirty="0">
+                <a:latin typeface="Courier New" panose="02070309020205020404" pitchFamily="49" charset="0"/>
+                <a:cs typeface="Courier New" panose="02070309020205020404" pitchFamily="49" charset="0"/>
+              </a:rPr>
+              <a:t> </a:t>
+            </a:r>
+            <a:r>
+              <a:rPr lang="en-US" dirty="0" smtClean="0">
+                <a:latin typeface="Courier New" panose="02070309020205020404" pitchFamily="49" charset="0"/>
+                <a:cs typeface="Courier New" panose="02070309020205020404" pitchFamily="49" charset="0"/>
+              </a:rPr>
+              <a:t>                    </a:t>
+            </a:r>
+            <a:r>
+              <a:rPr lang="en-US" dirty="0" err="1" smtClean="0">
+                <a:latin typeface="Courier New" panose="02070309020205020404" pitchFamily="49" charset="0"/>
+                <a:cs typeface="Courier New" panose="02070309020205020404" pitchFamily="49" charset="0"/>
+              </a:rPr>
+              <a:t>terminal_clades</a:t>
+            </a:r>
+            <a:r>
+              <a:rPr lang="en-US" dirty="0" smtClean="0">
+                <a:latin typeface="Courier New" panose="02070309020205020404" pitchFamily="49" charset="0"/>
+                <a:cs typeface="Courier New" panose="02070309020205020404" pitchFamily="49" charset="0"/>
+              </a:rPr>
+              <a:t>[5])</a:t>
+            </a:r>
+          </a:p>
+        </p:txBody>
+      </p:sp>
+      <p:sp>
+        <p:nvSpPr>
+          <p:cNvPr id="8" name="TextBox 7"/>
+          <p:cNvSpPr txBox="1"/>
+          <p:nvPr/>
+        </p:nvSpPr>
+        <p:spPr>
+          <a:xfrm>
+            <a:off x="807025" y="4658978"/>
+            <a:ext cx="6954982" cy="646331"/>
+          </a:xfrm>
+          <a:prstGeom prst="rect">
+            <a:avLst/>
+          </a:prstGeom>
+          <a:solidFill>
+            <a:schemeClr val="bg1">
+              <a:lumMod val="75000"/>
+            </a:schemeClr>
+          </a:solidFill>
+          <a:ln>
+            <a:solidFill>
+              <a:schemeClr val="tx1"/>
+            </a:solidFill>
+          </a:ln>
+        </p:spPr>
+        <p:txBody>
+          <a:bodyPr wrap="square" rtlCol="0">
+            <a:spAutoFit/>
+          </a:bodyPr>
+          <a:lstStyle/>
+          <a:p>
+            <a:r>
+              <a:rPr lang="en-US" dirty="0" err="1" smtClean="0">
+                <a:latin typeface="Courier New" panose="02070309020205020404" pitchFamily="49" charset="0"/>
+                <a:cs typeface="Courier New" panose="02070309020205020404" pitchFamily="49" charset="0"/>
+              </a:rPr>
+              <a:t>tree</a:t>
+            </a:r>
+            <a:r>
+              <a:rPr lang="en-US" dirty="0" err="1" smtClean="0">
+                <a:latin typeface="Courier New" panose="02070309020205020404" pitchFamily="49" charset="0"/>
+                <a:cs typeface="Courier New" panose="02070309020205020404" pitchFamily="49" charset="0"/>
+              </a:rPr>
+              <a:t>.get_path</a:t>
+            </a:r>
+            <a:r>
+              <a:rPr lang="en-US" dirty="0" smtClean="0">
+                <a:latin typeface="Courier New" panose="02070309020205020404" pitchFamily="49" charset="0"/>
+                <a:cs typeface="Courier New" panose="02070309020205020404" pitchFamily="49" charset="0"/>
+              </a:rPr>
+              <a:t>(</a:t>
+            </a:r>
+            <a:r>
+              <a:rPr lang="en-US" dirty="0" err="1" smtClean="0">
+                <a:latin typeface="Courier New" panose="02070309020205020404" pitchFamily="49" charset="0"/>
+                <a:cs typeface="Courier New" panose="02070309020205020404" pitchFamily="49" charset="0"/>
+              </a:rPr>
+              <a:t>terminal_clades</a:t>
+            </a:r>
+            <a:r>
+              <a:rPr lang="en-US" dirty="0" smtClean="0">
+                <a:latin typeface="Courier New" panose="02070309020205020404" pitchFamily="49" charset="0"/>
+                <a:cs typeface="Courier New" panose="02070309020205020404" pitchFamily="49" charset="0"/>
+              </a:rPr>
+              <a:t>[0],</a:t>
+            </a:r>
+          </a:p>
+          <a:p>
+            <a:r>
+              <a:rPr lang="en-US" dirty="0">
+                <a:latin typeface="Courier New" panose="02070309020205020404" pitchFamily="49" charset="0"/>
+                <a:cs typeface="Courier New" panose="02070309020205020404" pitchFamily="49" charset="0"/>
+              </a:rPr>
+              <a:t> </a:t>
+            </a:r>
+            <a:r>
+              <a:rPr lang="en-US" dirty="0" smtClean="0">
+                <a:latin typeface="Courier New" panose="02070309020205020404" pitchFamily="49" charset="0"/>
+                <a:cs typeface="Courier New" panose="02070309020205020404" pitchFamily="49" charset="0"/>
+              </a:rPr>
+              <a:t>            </a:t>
+            </a:r>
+            <a:r>
+              <a:rPr lang="en-US" dirty="0" smtClean="0">
+                <a:latin typeface="Courier New" panose="02070309020205020404" pitchFamily="49" charset="0"/>
+                <a:cs typeface="Courier New" panose="02070309020205020404" pitchFamily="49" charset="0"/>
+              </a:rPr>
+              <a:t> </a:t>
+            </a:r>
+            <a:r>
+              <a:rPr lang="en-US" dirty="0" err="1" smtClean="0">
+                <a:latin typeface="Courier New" panose="02070309020205020404" pitchFamily="49" charset="0"/>
+                <a:cs typeface="Courier New" panose="02070309020205020404" pitchFamily="49" charset="0"/>
+              </a:rPr>
+              <a:t>terminal_clades</a:t>
+            </a:r>
+            <a:r>
+              <a:rPr lang="en-US" dirty="0" smtClean="0">
+                <a:latin typeface="Courier New" panose="02070309020205020404" pitchFamily="49" charset="0"/>
+                <a:cs typeface="Courier New" panose="02070309020205020404" pitchFamily="49" charset="0"/>
+              </a:rPr>
+              <a:t>[5])</a:t>
+            </a:r>
+            <a:endParaRPr lang="en-US" dirty="0" smtClean="0">
+              <a:latin typeface="Courier New" panose="02070309020205020404" pitchFamily="49" charset="0"/>
+              <a:cs typeface="Courier New" panose="02070309020205020404" pitchFamily="49" charset="0"/>
+            </a:endParaRPr>
+          </a:p>
+        </p:txBody>
+      </p:sp>
+    </p:spTree>
+    <p:extLst>
+      <p:ext uri="{BB962C8B-B14F-4D97-AF65-F5344CB8AC3E}">
+        <p14:creationId xmlns:p14="http://schemas.microsoft.com/office/powerpoint/2010/main" val="411386177"/>
+      </p:ext>
+    </p:extLst>
+  </p:cSld>
+  <p:clrMapOvr>
+    <a:masterClrMapping/>
+  </p:clrMapOvr>
+  <p:timing>
+    <p:tnLst>
+      <p:par>
+        <p:cTn id="1" dur="indefinite" restart="never" nodeType="tmRoot">
+          <p:childTnLst>
+            <p:seq concurrent="1" nextAc="seek">
+              <p:cTn id="2" dur="indefinite" nodeType="mainSeq">
+                <p:childTnLst>
+                  <p:par>
+                    <p:cTn id="3" fill="hold">
+                      <p:stCondLst>
+                        <p:cond delay="indefinite"/>
+                        <p:cond evt="onBegin" delay="0">
+                          <p:tn val="2"/>
+                        </p:cond>
+                      </p:stCondLst>
+                      <p:childTnLst>
+                        <p:par>
+                          <p:cTn id="4" fill="hold">
+                            <p:stCondLst>
+                              <p:cond delay="0"/>
+                            </p:stCondLst>
+                            <p:childTnLst>
+                              <p:par>
+                                <p:cTn id="5" presetID="1" presetClass="entr" presetSubtype="0" fill="hold" grpId="0" nodeType="withEffect">
+                                  <p:stCondLst>
+                                    <p:cond delay="0"/>
+                                  </p:stCondLst>
+                                  <p:childTnLst>
+                                    <p:set>
+                                      <p:cBhvr>
+                                        <p:cTn id="6" dur="1" fill="hold">
+                                          <p:stCondLst>
+                                            <p:cond delay="0"/>
+                                          </p:stCondLst>
+                                        </p:cTn>
+                                        <p:tgtEl>
+                                          <p:spTgt spid="3">
+                                            <p:txEl>
+                                              <p:pRg st="0" end="0"/>
+                                            </p:txEl>
+                                          </p:spTgt>
+                                        </p:tgtEl>
+                                        <p:attrNameLst>
+                                          <p:attrName>style.visibility</p:attrName>
+                                        </p:attrNameLst>
+                                      </p:cBhvr>
+                                      <p:to>
+                                        <p:strVal val="visible"/>
+                                      </p:to>
+                                    </p:set>
+                                  </p:childTnLst>
+                                </p:cTn>
+                              </p:par>
+                              <p:par>
+                                <p:cTn id="7" presetID="1" presetClass="entr" presetSubtype="0" fill="hold" grpId="0" nodeType="withEffect">
+                                  <p:stCondLst>
+                                    <p:cond delay="0"/>
+                                  </p:stCondLst>
+                                  <p:childTnLst>
+                                    <p:set>
+                                      <p:cBhvr>
+                                        <p:cTn id="8" dur="1" fill="hold">
+                                          <p:stCondLst>
+                                            <p:cond delay="0"/>
+                                          </p:stCondLst>
+                                        </p:cTn>
+                                        <p:tgtEl>
+                                          <p:spTgt spid="5"/>
+                                        </p:tgtEl>
+                                        <p:attrNameLst>
+                                          <p:attrName>style.visibility</p:attrName>
+                                        </p:attrNameLst>
+                                      </p:cBhvr>
+                                      <p:to>
+                                        <p:strVal val="visible"/>
+                                      </p:to>
+                                    </p:set>
+                                  </p:childTnLst>
+                                </p:cTn>
+                              </p:par>
+                              <p:par>
+                                <p:cTn id="9" presetID="1" presetClass="entr" presetSubtype="0" fill="hold" grpId="0" nodeType="withEffect">
+                                  <p:stCondLst>
+                                    <p:cond delay="0"/>
+                                  </p:stCondLst>
+                                  <p:childTnLst>
+                                    <p:set>
+                                      <p:cBhvr>
+                                        <p:cTn id="10" dur="1" fill="hold">
+                                          <p:stCondLst>
+                                            <p:cond delay="0"/>
+                                          </p:stCondLst>
+                                        </p:cTn>
+                                        <p:tgtEl>
+                                          <p:spTgt spid="6"/>
+                                        </p:tgtEl>
+                                        <p:attrNameLst>
+                                          <p:attrName>style.visibility</p:attrName>
+                                        </p:attrNameLst>
+                                      </p:cBhvr>
+                                      <p:to>
+                                        <p:strVal val="visible"/>
+                                      </p:to>
+                                    </p:set>
+                                  </p:childTnLst>
+                                </p:cTn>
+                              </p:par>
+                            </p:childTnLst>
+                          </p:cTn>
+                        </p:par>
+                      </p:childTnLst>
+                    </p:cTn>
+                  </p:par>
+                  <p:par>
+                    <p:cTn id="11" fill="hold">
+                      <p:stCondLst>
+                        <p:cond delay="indefinite"/>
+                      </p:stCondLst>
+                      <p:childTnLst>
+                        <p:par>
+                          <p:cTn id="12" fill="hold">
+                            <p:stCondLst>
+                              <p:cond delay="0"/>
+                            </p:stCondLst>
+                            <p:childTnLst>
+                              <p:par>
+                                <p:cTn id="13" presetID="1" presetClass="entr" presetSubtype="0" fill="hold" grpId="0" nodeType="clickEffect">
+                                  <p:stCondLst>
+                                    <p:cond delay="0"/>
+                                  </p:stCondLst>
+                                  <p:childTnLst>
+                                    <p:set>
+                                      <p:cBhvr>
+                                        <p:cTn id="14" dur="1" fill="hold">
+                                          <p:stCondLst>
+                                            <p:cond delay="0"/>
+                                          </p:stCondLst>
+                                        </p:cTn>
+                                        <p:tgtEl>
+                                          <p:spTgt spid="3">
+                                            <p:txEl>
+                                              <p:pRg st="5" end="5"/>
+                                            </p:txEl>
+                                          </p:spTgt>
+                                        </p:tgtEl>
+                                        <p:attrNameLst>
+                                          <p:attrName>style.visibility</p:attrName>
+                                        </p:attrNameLst>
+                                      </p:cBhvr>
+                                      <p:to>
+                                        <p:strVal val="visible"/>
+                                      </p:to>
+                                    </p:set>
+                                  </p:childTnLst>
+                                </p:cTn>
+                              </p:par>
+                              <p:par>
+                                <p:cTn id="15" presetID="1" presetClass="entr" presetSubtype="0" fill="hold" grpId="0" nodeType="withEffect">
+                                  <p:stCondLst>
+                                    <p:cond delay="0"/>
+                                  </p:stCondLst>
+                                  <p:childTnLst>
+                                    <p:set>
+                                      <p:cBhvr>
+                                        <p:cTn id="16" dur="1" fill="hold">
+                                          <p:stCondLst>
+                                            <p:cond delay="0"/>
+                                          </p:stCondLst>
+                                        </p:cTn>
+                                        <p:tgtEl>
+                                          <p:spTgt spid="8"/>
+                                        </p:tgtEl>
+                                        <p:attrNameLst>
+                                          <p:attrName>style.visibility</p:attrName>
+                                        </p:attrNameLst>
+                                      </p:cBhvr>
+                                      <p:to>
+                                        <p:strVal val="visible"/>
+                                      </p:to>
+                                    </p:set>
+                                  </p:childTnLst>
+                                </p:cTn>
+                              </p:par>
+                            </p:childTnLst>
+                          </p:cTn>
+                        </p:par>
+                      </p:childTnLst>
+                    </p:cTn>
+                  </p:par>
+                  <p:par>
+                    <p:cTn id="17" fill="hold">
+                      <p:stCondLst>
+                        <p:cond delay="indefinite"/>
+                      </p:stCondLst>
+                      <p:childTnLst>
+                        <p:par>
+                          <p:cTn id="18" fill="hold">
+                            <p:stCondLst>
+                              <p:cond delay="0"/>
+                            </p:stCondLst>
+                            <p:childTnLst>
+                              <p:par>
+                                <p:cTn id="19" presetID="1" presetClass="entr" presetSubtype="0" fill="hold" grpId="0" nodeType="clickEffect">
+                                  <p:stCondLst>
+                                    <p:cond delay="0"/>
+                                  </p:stCondLst>
+                                  <p:childTnLst>
+                                    <p:set>
+                                      <p:cBhvr>
+                                        <p:cTn id="20" dur="1" fill="hold">
+                                          <p:stCondLst>
+                                            <p:cond delay="0"/>
+                                          </p:stCondLst>
+                                        </p:cTn>
+                                        <p:tgtEl>
+                                          <p:spTgt spid="3">
+                                            <p:txEl>
+                                              <p:pRg st="8" end="8"/>
+                                            </p:txEl>
+                                          </p:spTgt>
+                                        </p:tgtEl>
+                                        <p:attrNameLst>
+                                          <p:attrName>style.visibility</p:attrName>
+                                        </p:attrNameLst>
+                                      </p:cBhvr>
+                                      <p:to>
+                                        <p:strVal val="visible"/>
+                                      </p:to>
+                                    </p:set>
+                                  </p:childTnLst>
+                                </p:cTn>
+                              </p:par>
+                              <p:par>
+                                <p:cTn id="21" presetID="1" presetClass="entr" presetSubtype="0" fill="hold" grpId="0" nodeType="withEffect">
+                                  <p:stCondLst>
+                                    <p:cond delay="0"/>
+                                  </p:stCondLst>
+                                  <p:childTnLst>
+                                    <p:set>
+                                      <p:cBhvr>
+                                        <p:cTn id="22" dur="1" fill="hold">
+                                          <p:stCondLst>
+                                            <p:cond delay="0"/>
+                                          </p:stCondLst>
+                                        </p:cTn>
+                                        <p:tgtEl>
+                                          <p:spTgt spid="7"/>
+                                        </p:tgtEl>
+                                        <p:attrNameLst>
+                                          <p:attrName>style.visibility</p:attrName>
+                                        </p:attrNameLst>
+                                      </p:cBhvr>
+                                      <p:to>
+                                        <p:strVal val="visible"/>
+                                      </p:to>
+                                    </p:set>
+                                  </p:childTnLst>
+                                </p:cTn>
+                              </p:par>
+                            </p:childTnLst>
+                          </p:cTn>
+                        </p:par>
+                      </p:childTnLst>
+                    </p:cTn>
+                  </p:par>
+                </p:childTnLst>
+              </p:cTn>
+              <p:prevCondLst>
+                <p:cond evt="onPrev" delay="0">
+                  <p:tgtEl>
+                    <p:sldTgt/>
+                  </p:tgtEl>
+                </p:cond>
+              </p:prevCondLst>
+              <p:nextCondLst>
+                <p:cond evt="onNext" delay="0">
+                  <p:tgtEl>
+                    <p:sldTgt/>
+                  </p:tgtEl>
+                </p:cond>
+              </p:nextCondLst>
+            </p:seq>
+          </p:childTnLst>
+        </p:cTn>
+      </p:par>
+    </p:tnLst>
+    <p:bldLst>
+      <p:bldP spid="3" grpId="0" uiExpand="1" build="p"/>
+      <p:bldP spid="5" grpId="0" animBg="1"/>
+      <p:bldP spid="6" grpId="0" animBg="1"/>
+      <p:bldP spid="7" grpId="0" animBg="1"/>
+      <p:bldP spid="8" grpId="0" animBg="1"/>
+    </p:bldLst>
+  </p:timing>
+</p:sld>
+</file>
+
+<file path=ppt/slides/slide28.xml><?xml version="1.0" encoding="utf-8"?>
+<p:sld xmlns:a="http://schemas.openxmlformats.org/drawingml/2006/main" xmlns:r="http://schemas.openxmlformats.org/officeDocument/2006/relationships" xmlns:p="http://schemas.openxmlformats.org/presentationml/2006/main">
+  <p:cSld>
+    <p:spTree>
+      <p:nvGrpSpPr>
+        <p:cNvPr id="1" name=""/>
+        <p:cNvGrpSpPr/>
+        <p:nvPr/>
+      </p:nvGrpSpPr>
+      <p:grpSpPr>
+        <a:xfrm>
+          <a:off x="0" y="0"/>
+          <a:ext cx="0" cy="0"/>
+          <a:chOff x="0" y="0"/>
+          <a:chExt cx="0" cy="0"/>
+        </a:xfrm>
+      </p:grpSpPr>
+      <p:sp>
+        <p:nvSpPr>
+          <p:cNvPr id="2" name="Title 1"/>
+          <p:cNvSpPr>
+            <a:spLocks noGrp="1"/>
+          </p:cNvSpPr>
+          <p:nvPr>
+            <p:ph type="title"/>
+          </p:nvPr>
+        </p:nvSpPr>
+        <p:spPr/>
+        <p:txBody>
+          <a:bodyPr/>
+          <a:lstStyle/>
+          <a:p>
+            <a:r>
+              <a:rPr lang="en-US" dirty="0" smtClean="0"/>
+              <a:t>Navigating &amp; searching</a:t>
+            </a:r>
+            <a:endParaRPr lang="en-US" dirty="0"/>
+          </a:p>
+        </p:txBody>
+      </p:sp>
+      <p:sp>
+        <p:nvSpPr>
+          <p:cNvPr id="3" name="Content Placeholder 2"/>
+          <p:cNvSpPr>
+            <a:spLocks noGrp="1"/>
+          </p:cNvSpPr>
+          <p:nvPr>
+            <p:ph idx="1"/>
+          </p:nvPr>
+        </p:nvSpPr>
+        <p:spPr/>
+        <p:txBody>
+          <a:bodyPr/>
+          <a:lstStyle/>
+          <a:p>
+            <a:r>
+              <a:rPr lang="en-US" dirty="0" smtClean="0"/>
+              <a:t>Find clades with pattern for name</a:t>
+            </a:r>
+          </a:p>
+          <a:p>
+            <a:endParaRPr lang="en-US" dirty="0"/>
+          </a:p>
+          <a:p>
+            <a:endParaRPr lang="en-US" dirty="0" smtClean="0"/>
+          </a:p>
+          <a:p>
+            <a:endParaRPr lang="en-US" dirty="0"/>
+          </a:p>
+          <a:p>
+            <a:endParaRPr lang="en-US" dirty="0" smtClean="0"/>
+          </a:p>
+          <a:p>
+            <a:r>
+              <a:rPr lang="en-US" dirty="0" smtClean="0"/>
+              <a:t>Find clades with long branches</a:t>
+            </a:r>
+            <a:endParaRPr lang="en-US" dirty="0"/>
+          </a:p>
+        </p:txBody>
+      </p:sp>
+      <p:sp>
+        <p:nvSpPr>
+          <p:cNvPr id="4" name="Slide Number Placeholder 3"/>
+          <p:cNvSpPr>
+            <a:spLocks noGrp="1"/>
+          </p:cNvSpPr>
+          <p:nvPr>
+            <p:ph type="sldNum" sz="quarter" idx="12"/>
+          </p:nvPr>
+        </p:nvSpPr>
+        <p:spPr/>
+        <p:txBody>
+          <a:bodyPr/>
+          <a:lstStyle/>
+          <a:p>
+            <a:fld id="{CA586AD6-E5F2-4F25-940D-C674496063E2}" type="slidenum">
+              <a:rPr lang="en-US" smtClean="0"/>
+              <a:t>28</a:t>
+            </a:fld>
+            <a:endParaRPr lang="en-US"/>
+          </a:p>
+        </p:txBody>
+      </p:sp>
+      <p:sp>
+        <p:nvSpPr>
+          <p:cNvPr id="7" name="TextBox 6"/>
+          <p:cNvSpPr txBox="1"/>
+          <p:nvPr/>
+        </p:nvSpPr>
+        <p:spPr>
+          <a:xfrm>
+            <a:off x="472789" y="2355927"/>
+            <a:ext cx="8255577" cy="646331"/>
+          </a:xfrm>
+          <a:prstGeom prst="rect">
+            <a:avLst/>
+          </a:prstGeom>
+          <a:solidFill>
+            <a:schemeClr val="bg1">
+              <a:lumMod val="75000"/>
+            </a:schemeClr>
+          </a:solidFill>
+          <a:ln>
+            <a:solidFill>
+              <a:schemeClr val="tx1"/>
+            </a:solidFill>
+          </a:ln>
+        </p:spPr>
+        <p:txBody>
+          <a:bodyPr wrap="square" rtlCol="0">
+            <a:spAutoFit/>
+          </a:bodyPr>
+          <a:lstStyle/>
+          <a:p>
+            <a:r>
+              <a:rPr lang="en-US" dirty="0" smtClean="0">
+                <a:latin typeface="Courier New" panose="02070309020205020404" pitchFamily="49" charset="0"/>
+                <a:cs typeface="Courier New" panose="02070309020205020404" pitchFamily="49" charset="0"/>
+              </a:rPr>
+              <a:t>for clade in </a:t>
+            </a:r>
+            <a:r>
+              <a:rPr lang="en-US" dirty="0" err="1" smtClean="0">
+                <a:latin typeface="Courier New" panose="02070309020205020404" pitchFamily="49" charset="0"/>
+                <a:cs typeface="Courier New" panose="02070309020205020404" pitchFamily="49" charset="0"/>
+              </a:rPr>
+              <a:t>tree.find_clades</a:t>
+            </a:r>
+            <a:r>
+              <a:rPr lang="en-US" dirty="0">
+                <a:latin typeface="Courier New" panose="02070309020205020404" pitchFamily="49" charset="0"/>
+                <a:cs typeface="Courier New" panose="02070309020205020404" pitchFamily="49" charset="0"/>
+              </a:rPr>
+              <a:t>({'name': r'.*</a:t>
+            </a:r>
+            <a:r>
+              <a:rPr lang="en-US" dirty="0" err="1">
+                <a:latin typeface="Courier New" panose="02070309020205020404" pitchFamily="49" charset="0"/>
+                <a:cs typeface="Courier New" panose="02070309020205020404" pitchFamily="49" charset="0"/>
+              </a:rPr>
+              <a:t>PerN</a:t>
+            </a:r>
+            <a:r>
+              <a:rPr lang="en-US" dirty="0" smtClean="0">
+                <a:latin typeface="Courier New" panose="02070309020205020404" pitchFamily="49" charset="0"/>
+                <a:cs typeface="Courier New" panose="02070309020205020404" pitchFamily="49" charset="0"/>
+              </a:rPr>
+              <a:t>.*'}):</a:t>
+            </a:r>
+          </a:p>
+          <a:p>
+            <a:r>
+              <a:rPr lang="en-US" dirty="0">
+                <a:latin typeface="Courier New" panose="02070309020205020404" pitchFamily="49" charset="0"/>
+                <a:cs typeface="Courier New" panose="02070309020205020404" pitchFamily="49" charset="0"/>
+              </a:rPr>
+              <a:t> </a:t>
+            </a:r>
+            <a:r>
+              <a:rPr lang="en-US" dirty="0" smtClean="0">
+                <a:latin typeface="Courier New" panose="02070309020205020404" pitchFamily="49" charset="0"/>
+                <a:cs typeface="Courier New" panose="02070309020205020404" pitchFamily="49" charset="0"/>
+              </a:rPr>
+              <a:t>   print(clade.name)</a:t>
+            </a:r>
+            <a:endParaRPr lang="en-US" dirty="0">
+              <a:latin typeface="Courier New" panose="02070309020205020404" pitchFamily="49" charset="0"/>
+              <a:cs typeface="Courier New" panose="02070309020205020404" pitchFamily="49" charset="0"/>
+            </a:endParaRPr>
+          </a:p>
+        </p:txBody>
+      </p:sp>
+      <p:sp>
+        <p:nvSpPr>
+          <p:cNvPr id="8" name="TextBox 7"/>
+          <p:cNvSpPr txBox="1"/>
+          <p:nvPr/>
+        </p:nvSpPr>
+        <p:spPr>
+          <a:xfrm>
+            <a:off x="472789" y="3200584"/>
+            <a:ext cx="5938406" cy="923330"/>
+          </a:xfrm>
+          <a:prstGeom prst="rect">
+            <a:avLst/>
+          </a:prstGeom>
+          <a:solidFill>
+            <a:schemeClr val="tx1"/>
+          </a:solidFill>
+          <a:ln>
+            <a:solidFill>
+              <a:schemeClr val="tx1"/>
+            </a:solidFill>
+          </a:ln>
+        </p:spPr>
+        <p:txBody>
+          <a:bodyPr wrap="square" rtlCol="0">
+            <a:spAutoFit/>
+          </a:bodyPr>
+          <a:lstStyle/>
+          <a:p>
+            <a:r>
+              <a:rPr lang="en-US" dirty="0" smtClean="0">
+                <a:solidFill>
+                  <a:schemeClr val="bg1"/>
+                </a:solidFill>
+              </a:rPr>
+              <a:t>2013PerNa</a:t>
+            </a:r>
+            <a:endParaRPr lang="en-US" dirty="0">
+              <a:solidFill>
+                <a:schemeClr val="bg1"/>
+              </a:solidFill>
+            </a:endParaRPr>
+          </a:p>
+          <a:p>
+            <a:r>
+              <a:rPr lang="en-US" dirty="0" smtClean="0">
+                <a:solidFill>
+                  <a:schemeClr val="bg1"/>
+                </a:solidFill>
+              </a:rPr>
+              <a:t>2119PerN</a:t>
+            </a:r>
+            <a:endParaRPr lang="en-US" dirty="0">
+              <a:solidFill>
+                <a:schemeClr val="bg1"/>
+              </a:solidFill>
+            </a:endParaRPr>
+          </a:p>
+          <a:p>
+            <a:r>
+              <a:rPr lang="en-US" dirty="0" smtClean="0">
+                <a:solidFill>
+                  <a:schemeClr val="bg1"/>
+                </a:solidFill>
+              </a:rPr>
+              <a:t>2126PerN</a:t>
+            </a:r>
+            <a:endParaRPr lang="en-US" b="1" dirty="0">
+              <a:solidFill>
+                <a:schemeClr val="bg1"/>
+              </a:solidFill>
+              <a:latin typeface="Courier New" panose="02070309020205020404" pitchFamily="49" charset="0"/>
+              <a:cs typeface="Courier New" panose="02070309020205020404" pitchFamily="49" charset="0"/>
+            </a:endParaRPr>
+          </a:p>
+        </p:txBody>
+      </p:sp>
+      <p:sp>
+        <p:nvSpPr>
+          <p:cNvPr id="10" name="TextBox 9"/>
+          <p:cNvSpPr txBox="1"/>
+          <p:nvPr/>
+        </p:nvSpPr>
+        <p:spPr>
+          <a:xfrm>
+            <a:off x="472789" y="4829423"/>
+            <a:ext cx="8255577" cy="584775"/>
+          </a:xfrm>
+          <a:prstGeom prst="rect">
+            <a:avLst/>
+          </a:prstGeom>
+          <a:solidFill>
+            <a:schemeClr val="bg1">
+              <a:lumMod val="75000"/>
+            </a:schemeClr>
+          </a:solidFill>
+          <a:ln>
+            <a:solidFill>
+              <a:schemeClr val="tx1"/>
+            </a:solidFill>
+          </a:ln>
+        </p:spPr>
+        <p:txBody>
+          <a:bodyPr wrap="square" rtlCol="0">
+            <a:spAutoFit/>
+          </a:bodyPr>
+          <a:lstStyle/>
+          <a:p>
+            <a:r>
+              <a:rPr lang="en-US" sz="1600" dirty="0" smtClean="0">
+                <a:latin typeface="Courier New" panose="02070309020205020404" pitchFamily="49" charset="0"/>
+                <a:cs typeface="Courier New" panose="02070309020205020404" pitchFamily="49" charset="0"/>
+              </a:rPr>
+              <a:t>for clade in </a:t>
+            </a:r>
+            <a:r>
+              <a:rPr lang="en-US" sz="1600" dirty="0" err="1" smtClean="0">
+                <a:latin typeface="Courier New" panose="02070309020205020404" pitchFamily="49" charset="0"/>
+                <a:cs typeface="Courier New" panose="02070309020205020404" pitchFamily="49" charset="0"/>
+              </a:rPr>
+              <a:t>tree.find_clades</a:t>
+            </a:r>
+            <a:r>
+              <a:rPr lang="en-US" sz="1600" dirty="0" smtClean="0">
+                <a:latin typeface="Courier New" panose="02070309020205020404" pitchFamily="49" charset="0"/>
+                <a:cs typeface="Courier New" panose="02070309020205020404" pitchFamily="49" charset="0"/>
+              </a:rPr>
+              <a:t>(lambda x: </a:t>
+            </a:r>
+            <a:r>
+              <a:rPr lang="en-US" sz="1600" dirty="0" err="1" smtClean="0">
+                <a:latin typeface="Courier New" panose="02070309020205020404" pitchFamily="49" charset="0"/>
+                <a:cs typeface="Courier New" panose="02070309020205020404" pitchFamily="49" charset="0"/>
+              </a:rPr>
+              <a:t>x.branch_length</a:t>
+            </a:r>
+            <a:r>
+              <a:rPr lang="en-US" sz="1600" dirty="0" smtClean="0">
+                <a:latin typeface="Courier New" panose="02070309020205020404" pitchFamily="49" charset="0"/>
+                <a:cs typeface="Courier New" panose="02070309020205020404" pitchFamily="49" charset="0"/>
+              </a:rPr>
+              <a:t> &gt; 0.15):</a:t>
+            </a:r>
+          </a:p>
+          <a:p>
+            <a:r>
+              <a:rPr lang="en-US" sz="1600" dirty="0">
+                <a:latin typeface="Courier New" panose="02070309020205020404" pitchFamily="49" charset="0"/>
+                <a:cs typeface="Courier New" panose="02070309020205020404" pitchFamily="49" charset="0"/>
+              </a:rPr>
+              <a:t> </a:t>
+            </a:r>
+            <a:r>
+              <a:rPr lang="en-US" sz="1600" dirty="0" smtClean="0">
+                <a:latin typeface="Courier New" panose="02070309020205020404" pitchFamily="49" charset="0"/>
+                <a:cs typeface="Courier New" panose="02070309020205020404" pitchFamily="49" charset="0"/>
+              </a:rPr>
+              <a:t>   print('{0}: {1:.2f}'.format(clade.name, </a:t>
+            </a:r>
+            <a:r>
+              <a:rPr lang="en-US" sz="1600" dirty="0" err="1" smtClean="0">
+                <a:latin typeface="Courier New" panose="02070309020205020404" pitchFamily="49" charset="0"/>
+                <a:cs typeface="Courier New" panose="02070309020205020404" pitchFamily="49" charset="0"/>
+              </a:rPr>
+              <a:t>clade.brach_length</a:t>
+            </a:r>
+            <a:r>
+              <a:rPr lang="en-US" sz="1600" dirty="0" smtClean="0">
+                <a:latin typeface="Courier New" panose="02070309020205020404" pitchFamily="49" charset="0"/>
+                <a:cs typeface="Courier New" panose="02070309020205020404" pitchFamily="49" charset="0"/>
+              </a:rPr>
+              <a:t>))</a:t>
+            </a:r>
+            <a:endParaRPr lang="en-US" sz="1600" dirty="0">
+              <a:latin typeface="Courier New" panose="02070309020205020404" pitchFamily="49" charset="0"/>
+              <a:cs typeface="Courier New" panose="02070309020205020404" pitchFamily="49" charset="0"/>
+            </a:endParaRPr>
+          </a:p>
+        </p:txBody>
+      </p:sp>
+      <p:sp>
+        <p:nvSpPr>
+          <p:cNvPr id="11" name="TextBox 10"/>
+          <p:cNvSpPr txBox="1"/>
+          <p:nvPr/>
+        </p:nvSpPr>
+        <p:spPr>
+          <a:xfrm>
+            <a:off x="472790" y="5635016"/>
+            <a:ext cx="5938406" cy="923330"/>
+          </a:xfrm>
+          <a:prstGeom prst="rect">
+            <a:avLst/>
+          </a:prstGeom>
+          <a:solidFill>
+            <a:schemeClr val="tx1"/>
+          </a:solidFill>
+          <a:ln>
+            <a:solidFill>
+              <a:schemeClr val="tx1"/>
+            </a:solidFill>
+          </a:ln>
+        </p:spPr>
+        <p:txBody>
+          <a:bodyPr wrap="square" rtlCol="0">
+            <a:spAutoFit/>
+          </a:bodyPr>
+          <a:lstStyle/>
+          <a:p>
+            <a:r>
+              <a:rPr lang="en-US" dirty="0" smtClean="0">
+                <a:solidFill>
+                  <a:schemeClr val="bg1"/>
+                </a:solidFill>
+              </a:rPr>
+              <a:t>2140PasRu: 0.16</a:t>
+            </a:r>
+            <a:endParaRPr lang="en-US" dirty="0">
+              <a:solidFill>
+                <a:schemeClr val="bg1"/>
+              </a:solidFill>
+            </a:endParaRPr>
+          </a:p>
+          <a:p>
+            <a:r>
+              <a:rPr lang="en-US" dirty="0" smtClean="0">
+                <a:solidFill>
+                  <a:schemeClr val="bg1"/>
+                </a:solidFill>
+              </a:rPr>
+              <a:t>2086TraSc 0.17</a:t>
+            </a:r>
+            <a:endParaRPr lang="en-US" dirty="0">
+              <a:solidFill>
+                <a:schemeClr val="bg1"/>
+              </a:solidFill>
+            </a:endParaRPr>
+          </a:p>
+          <a:p>
+            <a:r>
+              <a:rPr lang="en-US" dirty="0" smtClean="0">
+                <a:solidFill>
+                  <a:schemeClr val="bg1"/>
+                </a:solidFill>
+              </a:rPr>
+              <a:t>2158GubN: 0.16</a:t>
+            </a:r>
+            <a:endParaRPr lang="en-US" dirty="0">
+              <a:solidFill>
+                <a:schemeClr val="bg1"/>
+              </a:solidFill>
+            </a:endParaRPr>
+          </a:p>
+        </p:txBody>
+      </p:sp>
+    </p:spTree>
+    <p:extLst>
+      <p:ext uri="{BB962C8B-B14F-4D97-AF65-F5344CB8AC3E}">
+        <p14:creationId xmlns:p14="http://schemas.microsoft.com/office/powerpoint/2010/main" val="1288015880"/>
+      </p:ext>
+    </p:extLst>
+  </p:cSld>
+  <p:clrMapOvr>
+    <a:masterClrMapping/>
+  </p:clrMapOvr>
+  <p:timing>
+    <p:tnLst>
+      <p:par>
+        <p:cTn id="1" dur="indefinite" restart="never" nodeType="tmRoot">
+          <p:childTnLst>
+            <p:seq concurrent="1" nextAc="seek">
+              <p:cTn id="2" dur="indefinite" nodeType="mainSeq">
+                <p:childTnLst>
+                  <p:par>
+                    <p:cTn id="3" fill="hold">
+                      <p:stCondLst>
+                        <p:cond delay="indefinite"/>
+                        <p:cond evt="onBegin" delay="0">
+                          <p:tn val="2"/>
+                        </p:cond>
+                      </p:stCondLst>
+                      <p:childTnLst>
+                        <p:par>
+                          <p:cTn id="4" fill="hold">
+                            <p:stCondLst>
+                              <p:cond delay="0"/>
+                            </p:stCondLst>
+                            <p:childTnLst>
+                              <p:par>
+                                <p:cTn id="5" presetID="1" presetClass="entr" presetSubtype="0" fill="hold" grpId="0" nodeType="withEffect">
+                                  <p:stCondLst>
+                                    <p:cond delay="0"/>
+                                  </p:stCondLst>
+                                  <p:childTnLst>
+                                    <p:set>
+                                      <p:cBhvr>
+                                        <p:cTn id="6" dur="1" fill="hold">
+                                          <p:stCondLst>
+                                            <p:cond delay="0"/>
+                                          </p:stCondLst>
+                                        </p:cTn>
+                                        <p:tgtEl>
+                                          <p:spTgt spid="3">
+                                            <p:txEl>
+                                              <p:pRg st="0" end="0"/>
+                                            </p:txEl>
+                                          </p:spTgt>
                                         </p:tgtEl>
                                         <p:attrNameLst>
                                           <p:attrName>style.visibility</p:attrName>
@@ -12933,592 +15585,37 @@
                       </p:childTnLst>
                     </p:cTn>
                   </p:par>
-                </p:childTnLst>
-              </p:cTn>
-              <p:prevCondLst>
-                <p:cond evt="onPrev" delay="0">
-                  <p:tgtEl>
-                    <p:sldTgt/>
-                  </p:tgtEl>
-                </p:cond>
-              </p:prevCondLst>
-              <p:nextCondLst>
-                <p:cond evt="onNext" delay="0">
-                  <p:tgtEl>
-                    <p:sldTgt/>
-                  </p:tgtEl>
-                </p:cond>
-              </p:nextCondLst>
-            </p:seq>
-          </p:childTnLst>
-        </p:cTn>
-      </p:par>
-    </p:tnLst>
-    <p:bldLst>
-      <p:bldP spid="5" grpId="0" animBg="1"/>
-      <p:bldP spid="7" grpId="0" animBg="1"/>
-      <p:bldP spid="8" grpId="0" animBg="1"/>
-    </p:bldLst>
-  </p:timing>
-</p:sld>
-</file>
-
-<file path=ppt/slides/slide26.xml><?xml version="1.0" encoding="utf-8"?>
-<p:sld xmlns:a="http://schemas.openxmlformats.org/drawingml/2006/main" xmlns:r="http://schemas.openxmlformats.org/officeDocument/2006/relationships" xmlns:p="http://schemas.openxmlformats.org/presentationml/2006/main">
-  <p:cSld>
-    <p:spTree>
-      <p:nvGrpSpPr>
-        <p:cNvPr id="1" name=""/>
-        <p:cNvGrpSpPr/>
-        <p:nvPr/>
-      </p:nvGrpSpPr>
-      <p:grpSpPr>
-        <a:xfrm>
-          <a:off x="0" y="0"/>
-          <a:ext cx="0" cy="0"/>
-          <a:chOff x="0" y="0"/>
-          <a:chExt cx="0" cy="0"/>
-        </a:xfrm>
-      </p:grpSpPr>
-      <p:sp>
-        <p:nvSpPr>
-          <p:cNvPr id="2" name="Title 1"/>
-          <p:cNvSpPr>
-            <a:spLocks noGrp="1"/>
-          </p:cNvSpPr>
-          <p:nvPr>
-            <p:ph type="title"/>
-          </p:nvPr>
-        </p:nvSpPr>
-        <p:spPr/>
-        <p:txBody>
-          <a:bodyPr/>
-          <a:lstStyle/>
-          <a:p>
-            <a:r>
-              <a:rPr lang="en-US" dirty="0" smtClean="0"/>
-              <a:t>Navigating the tree</a:t>
-            </a:r>
-            <a:endParaRPr lang="en-US" dirty="0"/>
-          </a:p>
-        </p:txBody>
-      </p:sp>
-      <p:sp>
-        <p:nvSpPr>
-          <p:cNvPr id="3" name="Content Placeholder 2"/>
-          <p:cNvSpPr>
-            <a:spLocks noGrp="1"/>
-          </p:cNvSpPr>
-          <p:nvPr>
-            <p:ph idx="1"/>
-          </p:nvPr>
-        </p:nvSpPr>
-        <p:spPr/>
-        <p:txBody>
-          <a:bodyPr/>
-          <a:lstStyle/>
-          <a:p>
-            <a:r>
-              <a:rPr lang="en-US" dirty="0" smtClean="0"/>
-              <a:t>Get path to descendant</a:t>
-            </a:r>
-          </a:p>
-          <a:p>
-            <a:endParaRPr lang="en-US" dirty="0"/>
-          </a:p>
-          <a:p>
-            <a:endParaRPr lang="en-US" dirty="0" smtClean="0"/>
-          </a:p>
-          <a:p>
-            <a:endParaRPr lang="en-US" dirty="0"/>
-          </a:p>
-          <a:p>
-            <a:endParaRPr lang="en-US" dirty="0" smtClean="0"/>
-          </a:p>
-          <a:p>
-            <a:endParaRPr lang="en-US" dirty="0"/>
-          </a:p>
-          <a:p>
-            <a:r>
-              <a:rPr lang="en-US" dirty="0" smtClean="0"/>
-              <a:t>Get common ancestor</a:t>
-            </a:r>
-            <a:endParaRPr lang="en-US" dirty="0"/>
-          </a:p>
-        </p:txBody>
-      </p:sp>
-      <p:sp>
-        <p:nvSpPr>
-          <p:cNvPr id="4" name="Slide Number Placeholder 3"/>
-          <p:cNvSpPr>
-            <a:spLocks noGrp="1"/>
-          </p:cNvSpPr>
-          <p:nvPr>
-            <p:ph type="sldNum" sz="quarter" idx="12"/>
-          </p:nvPr>
-        </p:nvSpPr>
-        <p:spPr/>
-        <p:txBody>
-          <a:bodyPr/>
-          <a:lstStyle/>
-          <a:p>
-            <a:fld id="{CA586AD6-E5F2-4F25-940D-C674496063E2}" type="slidenum">
-              <a:rPr lang="en-US" smtClean="0"/>
-              <a:t>26</a:t>
-            </a:fld>
-            <a:endParaRPr lang="en-US"/>
-          </a:p>
-        </p:txBody>
-      </p:sp>
-      <p:sp>
-        <p:nvSpPr>
-          <p:cNvPr id="5" name="TextBox 4"/>
-          <p:cNvSpPr txBox="1"/>
-          <p:nvPr/>
-        </p:nvSpPr>
-        <p:spPr>
-          <a:xfrm>
-            <a:off x="807025" y="2393758"/>
-            <a:ext cx="6954983" cy="369332"/>
-          </a:xfrm>
-          <a:prstGeom prst="rect">
-            <a:avLst/>
-          </a:prstGeom>
-          <a:solidFill>
-            <a:schemeClr val="bg1">
-              <a:lumMod val="75000"/>
-            </a:schemeClr>
-          </a:solidFill>
-          <a:ln>
-            <a:solidFill>
-              <a:schemeClr val="tx1"/>
-            </a:solidFill>
-          </a:ln>
-        </p:spPr>
-        <p:txBody>
-          <a:bodyPr wrap="square" rtlCol="0">
-            <a:spAutoFit/>
-          </a:bodyPr>
-          <a:lstStyle/>
-          <a:p>
-            <a:r>
-              <a:rPr lang="en-US" dirty="0" err="1" smtClean="0">
-                <a:latin typeface="Courier New" panose="02070309020205020404" pitchFamily="49" charset="0"/>
-                <a:cs typeface="Courier New" panose="02070309020205020404" pitchFamily="49" charset="0"/>
-              </a:rPr>
-              <a:t>root.get_path</a:t>
-            </a:r>
-            <a:r>
-              <a:rPr lang="en-US" dirty="0" smtClean="0">
-                <a:latin typeface="Courier New" panose="02070309020205020404" pitchFamily="49" charset="0"/>
-                <a:cs typeface="Courier New" panose="02070309020205020404" pitchFamily="49" charset="0"/>
-              </a:rPr>
-              <a:t>(</a:t>
-            </a:r>
-            <a:r>
-              <a:rPr lang="en-US" dirty="0" err="1" smtClean="0">
-                <a:latin typeface="Courier New" panose="02070309020205020404" pitchFamily="49" charset="0"/>
-                <a:cs typeface="Courier New" panose="02070309020205020404" pitchFamily="49" charset="0"/>
-              </a:rPr>
-              <a:t>terminal_clades</a:t>
-            </a:r>
-            <a:r>
-              <a:rPr lang="en-US" dirty="0" smtClean="0">
-                <a:latin typeface="Courier New" panose="02070309020205020404" pitchFamily="49" charset="0"/>
-                <a:cs typeface="Courier New" panose="02070309020205020404" pitchFamily="49" charset="0"/>
-              </a:rPr>
-              <a:t>[0])</a:t>
-            </a:r>
-            <a:endParaRPr lang="en-US" dirty="0" smtClean="0">
-              <a:latin typeface="Courier New" panose="02070309020205020404" pitchFamily="49" charset="0"/>
-              <a:cs typeface="Courier New" panose="02070309020205020404" pitchFamily="49" charset="0"/>
-            </a:endParaRPr>
-          </a:p>
-        </p:txBody>
-      </p:sp>
-      <p:sp>
-        <p:nvSpPr>
-          <p:cNvPr id="6" name="TextBox 5"/>
-          <p:cNvSpPr txBox="1"/>
-          <p:nvPr/>
-        </p:nvSpPr>
-        <p:spPr>
-          <a:xfrm>
-            <a:off x="807024" y="3023755"/>
-            <a:ext cx="6954983" cy="1754326"/>
-          </a:xfrm>
-          <a:prstGeom prst="rect">
-            <a:avLst/>
-          </a:prstGeom>
-          <a:solidFill>
-            <a:schemeClr val="tx1"/>
-          </a:solidFill>
-          <a:ln>
-            <a:solidFill>
-              <a:schemeClr val="tx1"/>
-            </a:solidFill>
-          </a:ln>
-        </p:spPr>
-        <p:txBody>
-          <a:bodyPr wrap="square" rtlCol="0">
-            <a:spAutoFit/>
-          </a:bodyPr>
-          <a:lstStyle/>
-          <a:p>
-            <a:r>
-              <a:rPr lang="en-US" b="1" dirty="0">
-                <a:solidFill>
-                  <a:schemeClr val="bg2"/>
-                </a:solidFill>
-                <a:latin typeface="Courier New" panose="02070309020205020404" pitchFamily="49" charset="0"/>
-                <a:cs typeface="Courier New" panose="02070309020205020404" pitchFamily="49" charset="0"/>
-              </a:rPr>
-              <a:t>[Clade(</a:t>
-            </a:r>
-            <a:r>
-              <a:rPr lang="en-US" b="1" dirty="0" err="1">
-                <a:solidFill>
-                  <a:schemeClr val="bg2"/>
-                </a:solidFill>
-                <a:latin typeface="Courier New" panose="02070309020205020404" pitchFamily="49" charset="0"/>
-                <a:cs typeface="Courier New" panose="02070309020205020404" pitchFamily="49" charset="0"/>
-              </a:rPr>
-              <a:t>branch_length</a:t>
-            </a:r>
-            <a:r>
-              <a:rPr lang="en-US" b="1" dirty="0">
-                <a:solidFill>
-                  <a:schemeClr val="bg2"/>
-                </a:solidFill>
-                <a:latin typeface="Courier New" panose="02070309020205020404" pitchFamily="49" charset="0"/>
-                <a:cs typeface="Courier New" panose="02070309020205020404" pitchFamily="49" charset="0"/>
-              </a:rPr>
-              <a:t>=0.045735),</a:t>
-            </a:r>
-          </a:p>
-          <a:p>
-            <a:r>
-              <a:rPr lang="en-US" b="1" dirty="0">
-                <a:solidFill>
-                  <a:schemeClr val="bg2"/>
-                </a:solidFill>
-                <a:latin typeface="Courier New" panose="02070309020205020404" pitchFamily="49" charset="0"/>
-                <a:cs typeface="Courier New" panose="02070309020205020404" pitchFamily="49" charset="0"/>
-              </a:rPr>
-              <a:t> Clade(</a:t>
-            </a:r>
-            <a:r>
-              <a:rPr lang="en-US" b="1" dirty="0" err="1">
-                <a:solidFill>
-                  <a:schemeClr val="bg2"/>
-                </a:solidFill>
-                <a:latin typeface="Courier New" panose="02070309020205020404" pitchFamily="49" charset="0"/>
-                <a:cs typeface="Courier New" panose="02070309020205020404" pitchFamily="49" charset="0"/>
-              </a:rPr>
-              <a:t>branch_length</a:t>
-            </a:r>
-            <a:r>
-              <a:rPr lang="en-US" b="1" dirty="0">
-                <a:solidFill>
-                  <a:schemeClr val="bg2"/>
-                </a:solidFill>
-                <a:latin typeface="Courier New" panose="02070309020205020404" pitchFamily="49" charset="0"/>
-                <a:cs typeface="Courier New" panose="02070309020205020404" pitchFamily="49" charset="0"/>
-              </a:rPr>
-              <a:t>=0.045783),</a:t>
-            </a:r>
-          </a:p>
-          <a:p>
-            <a:r>
-              <a:rPr lang="en-US" b="1" dirty="0">
-                <a:solidFill>
-                  <a:schemeClr val="bg2"/>
-                </a:solidFill>
-                <a:latin typeface="Courier New" panose="02070309020205020404" pitchFamily="49" charset="0"/>
-                <a:cs typeface="Courier New" panose="02070309020205020404" pitchFamily="49" charset="0"/>
-              </a:rPr>
-              <a:t> Clade(</a:t>
-            </a:r>
-            <a:r>
-              <a:rPr lang="en-US" b="1" dirty="0" err="1">
-                <a:solidFill>
-                  <a:schemeClr val="bg2"/>
-                </a:solidFill>
-                <a:latin typeface="Courier New" panose="02070309020205020404" pitchFamily="49" charset="0"/>
-                <a:cs typeface="Courier New" panose="02070309020205020404" pitchFamily="49" charset="0"/>
-              </a:rPr>
-              <a:t>branch_length</a:t>
-            </a:r>
-            <a:r>
-              <a:rPr lang="en-US" b="1" dirty="0">
-                <a:solidFill>
-                  <a:schemeClr val="bg2"/>
-                </a:solidFill>
-                <a:latin typeface="Courier New" panose="02070309020205020404" pitchFamily="49" charset="0"/>
-                <a:cs typeface="Courier New" panose="02070309020205020404" pitchFamily="49" charset="0"/>
-              </a:rPr>
-              <a:t>=0.037123),</a:t>
-            </a:r>
-          </a:p>
-          <a:p>
-            <a:r>
-              <a:rPr lang="en-US" b="1" dirty="0">
-                <a:solidFill>
-                  <a:schemeClr val="bg2"/>
-                </a:solidFill>
-                <a:latin typeface="Courier New" panose="02070309020205020404" pitchFamily="49" charset="0"/>
-                <a:cs typeface="Courier New" panose="02070309020205020404" pitchFamily="49" charset="0"/>
-              </a:rPr>
-              <a:t> Clade(</a:t>
-            </a:r>
-            <a:r>
-              <a:rPr lang="en-US" b="1" dirty="0" err="1">
-                <a:solidFill>
-                  <a:schemeClr val="bg2"/>
-                </a:solidFill>
-                <a:latin typeface="Courier New" panose="02070309020205020404" pitchFamily="49" charset="0"/>
-                <a:cs typeface="Courier New" panose="02070309020205020404" pitchFamily="49" charset="0"/>
-              </a:rPr>
-              <a:t>branch_length</a:t>
-            </a:r>
-            <a:r>
-              <a:rPr lang="en-US" b="1" dirty="0">
-                <a:solidFill>
-                  <a:schemeClr val="bg2"/>
-                </a:solidFill>
-                <a:latin typeface="Courier New" panose="02070309020205020404" pitchFamily="49" charset="0"/>
-                <a:cs typeface="Courier New" panose="02070309020205020404" pitchFamily="49" charset="0"/>
-              </a:rPr>
-              <a:t>=0.019266),</a:t>
-            </a:r>
-          </a:p>
-          <a:p>
-            <a:r>
-              <a:rPr lang="en-US" b="1" dirty="0">
-                <a:solidFill>
-                  <a:schemeClr val="bg2"/>
-                </a:solidFill>
-                <a:latin typeface="Courier New" panose="02070309020205020404" pitchFamily="49" charset="0"/>
-                <a:cs typeface="Courier New" panose="02070309020205020404" pitchFamily="49" charset="0"/>
-              </a:rPr>
-              <a:t> Clade(</a:t>
-            </a:r>
-            <a:r>
-              <a:rPr lang="en-US" b="1" dirty="0" err="1">
-                <a:solidFill>
-                  <a:schemeClr val="bg2"/>
-                </a:solidFill>
-                <a:latin typeface="Courier New" panose="02070309020205020404" pitchFamily="49" charset="0"/>
-                <a:cs typeface="Courier New" panose="02070309020205020404" pitchFamily="49" charset="0"/>
-              </a:rPr>
-              <a:t>branch_length</a:t>
-            </a:r>
-            <a:r>
-              <a:rPr lang="en-US" b="1" dirty="0">
-                <a:solidFill>
-                  <a:schemeClr val="bg2"/>
-                </a:solidFill>
-                <a:latin typeface="Courier New" panose="02070309020205020404" pitchFamily="49" charset="0"/>
-                <a:cs typeface="Courier New" panose="02070309020205020404" pitchFamily="49" charset="0"/>
-              </a:rPr>
-              <a:t>=0.018156),</a:t>
-            </a:r>
-          </a:p>
-          <a:p>
-            <a:r>
-              <a:rPr lang="en-US" b="1" dirty="0">
-                <a:solidFill>
-                  <a:schemeClr val="bg2"/>
-                </a:solidFill>
-                <a:latin typeface="Courier New" panose="02070309020205020404" pitchFamily="49" charset="0"/>
-                <a:cs typeface="Courier New" panose="02070309020205020404" pitchFamily="49" charset="0"/>
-              </a:rPr>
-              <a:t> Clade(</a:t>
-            </a:r>
-            <a:r>
-              <a:rPr lang="en-US" b="1" dirty="0" err="1">
-                <a:solidFill>
-                  <a:schemeClr val="bg2"/>
-                </a:solidFill>
-                <a:latin typeface="Courier New" panose="02070309020205020404" pitchFamily="49" charset="0"/>
-                <a:cs typeface="Courier New" panose="02070309020205020404" pitchFamily="49" charset="0"/>
-              </a:rPr>
-              <a:t>branch_length</a:t>
-            </a:r>
-            <a:r>
-              <a:rPr lang="en-US" b="1" dirty="0">
-                <a:solidFill>
-                  <a:schemeClr val="bg2"/>
-                </a:solidFill>
-                <a:latin typeface="Courier New" panose="02070309020205020404" pitchFamily="49" charset="0"/>
-                <a:cs typeface="Courier New" panose="02070309020205020404" pitchFamily="49" charset="0"/>
-              </a:rPr>
-              <a:t>=0.021138, name='2070OziPo</a:t>
-            </a:r>
-            <a:r>
-              <a:rPr lang="en-US" b="1" dirty="0" smtClean="0">
-                <a:solidFill>
-                  <a:schemeClr val="bg2"/>
-                </a:solidFill>
-                <a:latin typeface="Courier New" panose="02070309020205020404" pitchFamily="49" charset="0"/>
-                <a:cs typeface="Courier New" panose="02070309020205020404" pitchFamily="49" charset="0"/>
-              </a:rPr>
-              <a:t>')]</a:t>
-            </a:r>
-            <a:endParaRPr lang="en-US" b="1" dirty="0">
-              <a:solidFill>
-                <a:schemeClr val="bg2"/>
-              </a:solidFill>
-              <a:latin typeface="Courier New" panose="02070309020205020404" pitchFamily="49" charset="0"/>
-              <a:cs typeface="Courier New" panose="02070309020205020404" pitchFamily="49" charset="0"/>
-            </a:endParaRPr>
-          </a:p>
-        </p:txBody>
-      </p:sp>
-      <p:sp>
-        <p:nvSpPr>
-          <p:cNvPr id="7" name="TextBox 6"/>
-          <p:cNvSpPr txBox="1"/>
-          <p:nvPr/>
-        </p:nvSpPr>
-        <p:spPr>
-          <a:xfrm>
-            <a:off x="807024" y="5424440"/>
-            <a:ext cx="6954983" cy="646331"/>
-          </a:xfrm>
-          <a:prstGeom prst="rect">
-            <a:avLst/>
-          </a:prstGeom>
-          <a:solidFill>
-            <a:schemeClr val="bg1">
-              <a:lumMod val="75000"/>
-            </a:schemeClr>
-          </a:solidFill>
-          <a:ln>
-            <a:solidFill>
-              <a:schemeClr val="tx1"/>
-            </a:solidFill>
-          </a:ln>
-        </p:spPr>
-        <p:txBody>
-          <a:bodyPr wrap="square" rtlCol="0">
-            <a:spAutoFit/>
-          </a:bodyPr>
-          <a:lstStyle/>
-          <a:p>
-            <a:r>
-              <a:rPr lang="en-US" dirty="0" err="1" smtClean="0">
-                <a:latin typeface="Courier New" panose="02070309020205020404" pitchFamily="49" charset="0"/>
-                <a:cs typeface="Courier New" panose="02070309020205020404" pitchFamily="49" charset="0"/>
-              </a:rPr>
-              <a:t>tree.common_ancestor</a:t>
-            </a:r>
-            <a:r>
-              <a:rPr lang="en-US" dirty="0" smtClean="0">
-                <a:latin typeface="Courier New" panose="02070309020205020404" pitchFamily="49" charset="0"/>
-                <a:cs typeface="Courier New" panose="02070309020205020404" pitchFamily="49" charset="0"/>
-              </a:rPr>
-              <a:t>(</a:t>
-            </a:r>
-            <a:r>
-              <a:rPr lang="en-US" dirty="0" err="1" smtClean="0">
-                <a:latin typeface="Courier New" panose="02070309020205020404" pitchFamily="49" charset="0"/>
-                <a:cs typeface="Courier New" panose="02070309020205020404" pitchFamily="49" charset="0"/>
-              </a:rPr>
-              <a:t>terminal_clades</a:t>
-            </a:r>
-            <a:r>
-              <a:rPr lang="en-US" dirty="0" smtClean="0">
-                <a:latin typeface="Courier New" panose="02070309020205020404" pitchFamily="49" charset="0"/>
-                <a:cs typeface="Courier New" panose="02070309020205020404" pitchFamily="49" charset="0"/>
-              </a:rPr>
-              <a:t>[0],</a:t>
-            </a:r>
-          </a:p>
-          <a:p>
-            <a:r>
-              <a:rPr lang="en-US" dirty="0">
-                <a:latin typeface="Courier New" panose="02070309020205020404" pitchFamily="49" charset="0"/>
-                <a:cs typeface="Courier New" panose="02070309020205020404" pitchFamily="49" charset="0"/>
-              </a:rPr>
-              <a:t> </a:t>
-            </a:r>
-            <a:r>
-              <a:rPr lang="en-US" dirty="0" smtClean="0">
-                <a:latin typeface="Courier New" panose="02070309020205020404" pitchFamily="49" charset="0"/>
-                <a:cs typeface="Courier New" panose="02070309020205020404" pitchFamily="49" charset="0"/>
-              </a:rPr>
-              <a:t>                    </a:t>
-            </a:r>
-            <a:r>
-              <a:rPr lang="en-US" dirty="0" err="1" smtClean="0">
-                <a:latin typeface="Courier New" panose="02070309020205020404" pitchFamily="49" charset="0"/>
-                <a:cs typeface="Courier New" panose="02070309020205020404" pitchFamily="49" charset="0"/>
-              </a:rPr>
-              <a:t>terminal_clades</a:t>
-            </a:r>
-            <a:r>
-              <a:rPr lang="en-US" dirty="0" smtClean="0">
-                <a:latin typeface="Courier New" panose="02070309020205020404" pitchFamily="49" charset="0"/>
-                <a:cs typeface="Courier New" panose="02070309020205020404" pitchFamily="49" charset="0"/>
-              </a:rPr>
-              <a:t>[5])</a:t>
-            </a:r>
-            <a:endParaRPr lang="en-US" dirty="0" smtClean="0">
-              <a:latin typeface="Courier New" panose="02070309020205020404" pitchFamily="49" charset="0"/>
-              <a:cs typeface="Courier New" panose="02070309020205020404" pitchFamily="49" charset="0"/>
-            </a:endParaRPr>
-          </a:p>
-        </p:txBody>
-      </p:sp>
-    </p:spTree>
-    <p:extLst>
-      <p:ext uri="{BB962C8B-B14F-4D97-AF65-F5344CB8AC3E}">
-        <p14:creationId xmlns:p14="http://schemas.microsoft.com/office/powerpoint/2010/main" val="411386177"/>
-      </p:ext>
-    </p:extLst>
-  </p:cSld>
-  <p:clrMapOvr>
-    <a:masterClrMapping/>
-  </p:clrMapOvr>
-  <p:timing>
-    <p:tnLst>
-      <p:par>
-        <p:cTn id="1" dur="indefinite" restart="never" nodeType="tmRoot">
-          <p:childTnLst>
-            <p:seq concurrent="1" nextAc="seek">
-              <p:cTn id="2" dur="indefinite" nodeType="mainSeq">
-                <p:childTnLst>
                   <p:par>
-                    <p:cTn id="3" fill="hold">
+                    <p:cTn id="11" fill="hold">
                       <p:stCondLst>
                         <p:cond delay="indefinite"/>
-                        <p:cond evt="onBegin" delay="0">
-                          <p:tn val="2"/>
-                        </p:cond>
                       </p:stCondLst>
                       <p:childTnLst>
                         <p:par>
-                          <p:cTn id="4" fill="hold">
+                          <p:cTn id="12" fill="hold">
                             <p:stCondLst>
                               <p:cond delay="0"/>
                             </p:stCondLst>
                             <p:childTnLst>
                               <p:par>
-                                <p:cTn id="5" presetID="1" presetClass="entr" presetSubtype="0" fill="hold" grpId="0" nodeType="withEffect">
+                                <p:cTn id="13" presetID="1" presetClass="entr" presetSubtype="0" fill="hold" grpId="0" nodeType="clickEffect">
                                   <p:stCondLst>
                                     <p:cond delay="0"/>
                                   </p:stCondLst>
                                   <p:childTnLst>
                                     <p:set>
                                       <p:cBhvr>
-                                        <p:cTn id="6" dur="1" fill="hold">
+                                        <p:cTn id="14" dur="1" fill="hold">
                                           <p:stCondLst>
                                             <p:cond delay="0"/>
                                           </p:stCondLst>
                                         </p:cTn>
                                         <p:tgtEl>
-                                          <p:spTgt spid="5"/>
+                                          <p:spTgt spid="3">
+                                            <p:txEl>
+                                              <p:pRg st="5" end="5"/>
+                                            </p:txEl>
+                                          </p:spTgt>
                                         </p:tgtEl>
                                         <p:attrNameLst>
                                           <p:attrName>style.visibility</p:attrName>
@@ -13532,20 +15629,47 @@
                                 </p:cTn>
                               </p:par>
                               <p:par>
-                                <p:cTn id="7" presetID="1" presetClass="entr" presetSubtype="0" fill="hold" grpId="0" nodeType="withEffect">
+                                <p:cTn id="15" presetID="1" presetClass="entr" presetSubtype="0" fill="hold" grpId="0" nodeType="withEffect">
                                   <p:stCondLst>
                                     <p:cond delay="0"/>
                                   </p:stCondLst>
                                   <p:childTnLst>
                                     <p:set>
                                       <p:cBhvr>
-                                        <p:cTn id="8" dur="1" fill="hold">
+                                        <p:cTn id="16" dur="1" fill="hold">
                                           <p:stCondLst>
                                             <p:cond delay="0"/>
                                           </p:stCondLst>
                                         </p:cTn>
                                         <p:tgtEl>
-                                          <p:spTgt spid="7"/>
+                                          <p:spTgt spid="10"/>
+                                        </p:tgtEl>
+                                        <p:attrNameLst>
+                                          <p:attrName>style.visibility</p:attrName>
+                                        </p:attrNameLst>
+                                      </p:cBhvr>
+                                      <p:to>
+                                        <p:strVal val="visible"/>
+                                      </p:to>
+                                    </p:set>
+                                  </p:childTnLst>
+                                </p:cTn>
+                              </p:par>
+                              <p:par>
+                                <p:cTn id="17" presetID="1" presetClass="entr" presetSubtype="0" fill="hold" grpId="0" nodeType="withEffect">
+                                  <p:stCondLst>
+                                    <p:cond delay="0"/>
+                                  </p:stCondLst>
+                                  <p:childTnLst>
+                                    <p:set>
+                                      <p:cBhvr>
+                                        <p:cTn id="18" dur="1" fill="hold">
+                                          <p:stCondLst>
+                                            <p:cond delay="0"/>
+                                          </p:stCondLst>
+                                        </p:cTn>
+                                        <p:tgtEl>
+                                          <p:spTgt spid="11"/>
                                         </p:tgtEl>
                                         <p:attrNameLst>
                                           <p:attrName>style.visibility</p:attrName>
@@ -13586,8 +15710,11 @@
       </p:par>
     </p:tnLst>
     <p:bldLst>
-      <p:bldP spid="5" grpId="0" animBg="1"/>
+      <p:bldP spid="3" grpId="0" uiExpand="1" build="p"/>
       <p:bldP spid="7" grpId="0" animBg="1"/>
+      <p:bldP spid="8" grpId="0" animBg="1"/>
+      <p:bldP spid="10" grpId="0" animBg="1"/>
+      <p:bldP spid="11" grpId="0" animBg="1"/>
     </p:bldLst>
   </p:timing>
 </p:sld>

</xml_diff>

<commit_message>
Added slides on multiple alignments
</commit_message>
<xml_diff>
--- a/Python/biopython.pptx
+++ b/Python/biopython.pptx
@@ -5,7 +5,7 @@
     <p:sldMasterId id="2147483660" r:id="rId1"/>
   </p:sldMasterIdLst>
   <p:notesMasterIdLst>
-    <p:notesMasterId r:id="rId30"/>
+    <p:notesMasterId r:id="rId34"/>
   </p:notesMasterIdLst>
   <p:sldIdLst>
     <p:sldId id="256" r:id="rId2"/>
@@ -28,14 +28,18 @@
     <p:sldId id="273" r:id="rId19"/>
     <p:sldId id="274" r:id="rId20"/>
     <p:sldId id="283" r:id="rId21"/>
-    <p:sldId id="275" r:id="rId22"/>
-    <p:sldId id="276" r:id="rId23"/>
-    <p:sldId id="277" r:id="rId24"/>
-    <p:sldId id="278" r:id="rId25"/>
-    <p:sldId id="279" r:id="rId26"/>
-    <p:sldId id="280" r:id="rId27"/>
-    <p:sldId id="281" r:id="rId28"/>
-    <p:sldId id="282" r:id="rId29"/>
+    <p:sldId id="285" r:id="rId22"/>
+    <p:sldId id="286" r:id="rId23"/>
+    <p:sldId id="287" r:id="rId24"/>
+    <p:sldId id="284" r:id="rId25"/>
+    <p:sldId id="275" r:id="rId26"/>
+    <p:sldId id="276" r:id="rId27"/>
+    <p:sldId id="277" r:id="rId28"/>
+    <p:sldId id="278" r:id="rId29"/>
+    <p:sldId id="279" r:id="rId30"/>
+    <p:sldId id="280" r:id="rId31"/>
+    <p:sldId id="281" r:id="rId32"/>
+    <p:sldId id="282" r:id="rId33"/>
   </p:sldIdLst>
   <p:sldSz cx="9144000" cy="6858000" type="screen4x3"/>
   <p:notesSz cx="6858000" cy="9144000"/>
@@ -9865,10 +9869,14 @@
           <a:lstStyle/>
           <a:p>
             <a:r>
-              <a:rPr lang="en-US" smtClean="0"/>
-              <a:t>Alignment</a:t>
-            </a:r>
-            <a:endParaRPr lang="en-US"/>
+              <a:rPr lang="en-US" dirty="0" smtClean="0"/>
+              <a:t>Multiple a</a:t>
+            </a:r>
+            <a:r>
+              <a:rPr lang="en-US" dirty="0" smtClean="0"/>
+              <a:t>lignment</a:t>
+            </a:r>
+            <a:endParaRPr lang="en-US" dirty="0"/>
           </a:p>
         </p:txBody>
       </p:sp>
@@ -9968,7 +9976,7 @@
           <a:p>
             <a:r>
               <a:rPr lang="en-US" dirty="0" smtClean="0"/>
-              <a:t>Phylogenetic trees</a:t>
+              <a:t>Multiple alignment tools</a:t>
             </a:r>
             <a:endParaRPr lang="en-US" dirty="0"/>
           </a:p>
@@ -9976,12 +9984,12 @@
       </p:sp>
       <p:sp>
         <p:nvSpPr>
-          <p:cNvPr id="3" name="Text Placeholder 2"/>
+          <p:cNvPr id="3" name="Content Placeholder 2"/>
           <p:cNvSpPr>
             <a:spLocks noGrp="1"/>
           </p:cNvSpPr>
           <p:nvPr>
-            <p:ph type="body" idx="1"/>
+            <p:ph idx="1"/>
           </p:nvPr>
         </p:nvSpPr>
         <p:spPr/>
@@ -9989,7 +9997,37 @@
           <a:bodyPr/>
           <a:lstStyle/>
           <a:p>
-            <a:endParaRPr lang="en-US"/>
+            <a:r>
+              <a:rPr lang="en-US" dirty="0" err="1" smtClean="0"/>
+              <a:t>Biopython</a:t>
+            </a:r>
+            <a:r>
+              <a:rPr lang="en-US" dirty="0" smtClean="0"/>
+              <a:t> supports</a:t>
+            </a:r>
+          </a:p>
+          <a:p>
+            <a:pPr lvl="1"/>
+            <a:r>
+              <a:rPr lang="en-US" dirty="0" err="1" smtClean="0"/>
+              <a:t>clustalw</a:t>
+            </a:r>
+            <a:endParaRPr lang="en-US" dirty="0" smtClean="0"/>
+          </a:p>
+          <a:p>
+            <a:pPr lvl="1"/>
+            <a:r>
+              <a:rPr lang="en-US" dirty="0" smtClean="0"/>
+              <a:t>MUSCLE</a:t>
+            </a:r>
+          </a:p>
+          <a:p>
+            <a:pPr lvl="1"/>
+            <a:r>
+              <a:rPr lang="en-US" dirty="0" smtClean="0"/>
+              <a:t>…</a:t>
+            </a:r>
+            <a:endParaRPr lang="en-US" dirty="0"/>
           </a:p>
         </p:txBody>
       </p:sp>
@@ -10016,10 +10054,355 @@
           </a:p>
         </p:txBody>
       </p:sp>
+      <p:sp>
+        <p:nvSpPr>
+          <p:cNvPr id="5" name="TextBox 4"/>
+          <p:cNvSpPr txBox="1"/>
+          <p:nvPr/>
+        </p:nvSpPr>
+        <p:spPr>
+          <a:xfrm>
+            <a:off x="1007918" y="3653253"/>
+            <a:ext cx="7658100" cy="1200329"/>
+          </a:xfrm>
+          <a:prstGeom prst="rect">
+            <a:avLst/>
+          </a:prstGeom>
+          <a:solidFill>
+            <a:schemeClr val="bg1">
+              <a:lumMod val="75000"/>
+            </a:schemeClr>
+          </a:solidFill>
+          <a:ln>
+            <a:solidFill>
+              <a:schemeClr val="tx1"/>
+            </a:solidFill>
+          </a:ln>
+        </p:spPr>
+        <p:txBody>
+          <a:bodyPr wrap="square" rtlCol="0">
+            <a:spAutoFit/>
+          </a:bodyPr>
+          <a:lstStyle/>
+          <a:p>
+            <a:r>
+              <a:rPr lang="en-US" dirty="0">
+                <a:latin typeface="Courier New" panose="02070309020205020404" pitchFamily="49" charset="0"/>
+                <a:cs typeface="Courier New" panose="02070309020205020404" pitchFamily="49" charset="0"/>
+              </a:rPr>
+              <a:t>from </a:t>
+            </a:r>
+            <a:r>
+              <a:rPr lang="en-US" dirty="0" err="1">
+                <a:latin typeface="Courier New" panose="02070309020205020404" pitchFamily="49" charset="0"/>
+                <a:cs typeface="Courier New" panose="02070309020205020404" pitchFamily="49" charset="0"/>
+              </a:rPr>
+              <a:t>Bio.Align.Applications</a:t>
+            </a:r>
+            <a:r>
+              <a:rPr lang="en-US" dirty="0">
+                <a:latin typeface="Courier New" panose="02070309020205020404" pitchFamily="49" charset="0"/>
+                <a:cs typeface="Courier New" panose="02070309020205020404" pitchFamily="49" charset="0"/>
+              </a:rPr>
+              <a:t> import </a:t>
+            </a:r>
+            <a:r>
+              <a:rPr lang="en-US" dirty="0" err="1" smtClean="0">
+                <a:latin typeface="Courier New" panose="02070309020205020404" pitchFamily="49" charset="0"/>
+                <a:cs typeface="Courier New" panose="02070309020205020404" pitchFamily="49" charset="0"/>
+              </a:rPr>
+              <a:t>MuscleCommandline</a:t>
+            </a:r>
+            <a:endParaRPr lang="en-US" dirty="0" smtClean="0">
+              <a:latin typeface="Courier New" panose="02070309020205020404" pitchFamily="49" charset="0"/>
+              <a:cs typeface="Courier New" panose="02070309020205020404" pitchFamily="49" charset="0"/>
+            </a:endParaRPr>
+          </a:p>
+          <a:p>
+            <a:r>
+              <a:rPr lang="en-US" dirty="0" err="1" smtClean="0">
+                <a:latin typeface="Courier New" panose="02070309020205020404" pitchFamily="49" charset="0"/>
+                <a:cs typeface="Courier New" panose="02070309020205020404" pitchFamily="49" charset="0"/>
+              </a:rPr>
+              <a:t>muscle_cl</a:t>
+            </a:r>
+            <a:r>
+              <a:rPr lang="en-US" dirty="0" smtClean="0">
+                <a:latin typeface="Courier New" panose="02070309020205020404" pitchFamily="49" charset="0"/>
+                <a:cs typeface="Courier New" panose="02070309020205020404" pitchFamily="49" charset="0"/>
+              </a:rPr>
+              <a:t> </a:t>
+            </a:r>
+            <a:r>
+              <a:rPr lang="en-US" dirty="0">
+                <a:latin typeface="Courier New" panose="02070309020205020404" pitchFamily="49" charset="0"/>
+                <a:cs typeface="Courier New" panose="02070309020205020404" pitchFamily="49" charset="0"/>
+              </a:rPr>
+              <a:t>= </a:t>
+            </a:r>
+            <a:r>
+              <a:rPr lang="en-US" dirty="0" err="1" smtClean="0">
+                <a:latin typeface="Courier New" panose="02070309020205020404" pitchFamily="49" charset="0"/>
+                <a:cs typeface="Courier New" panose="02070309020205020404" pitchFamily="49" charset="0"/>
+              </a:rPr>
+              <a:t>MuscleCommandline</a:t>
+            </a:r>
+            <a:r>
+              <a:rPr lang="en-US" dirty="0" smtClean="0">
+                <a:latin typeface="Courier New" panose="02070309020205020404" pitchFamily="49" charset="0"/>
+                <a:cs typeface="Courier New" panose="02070309020205020404" pitchFamily="49" charset="0"/>
+              </a:rPr>
+              <a:t>(input='</a:t>
+            </a:r>
+            <a:r>
+              <a:rPr lang="en-US" dirty="0" err="1" smtClean="0">
+                <a:latin typeface="Courier New" panose="02070309020205020404" pitchFamily="49" charset="0"/>
+                <a:cs typeface="Courier New" panose="02070309020205020404" pitchFamily="49" charset="0"/>
+              </a:rPr>
+              <a:t>data.fasta</a:t>
+            </a:r>
+            <a:r>
+              <a:rPr lang="en-US" dirty="0" smtClean="0">
+                <a:latin typeface="Courier New" panose="02070309020205020404" pitchFamily="49" charset="0"/>
+                <a:cs typeface="Courier New" panose="02070309020205020404" pitchFamily="49" charset="0"/>
+              </a:rPr>
+              <a:t>')</a:t>
+            </a:r>
+          </a:p>
+          <a:p>
+            <a:r>
+              <a:rPr lang="en-US" dirty="0" smtClean="0">
+                <a:latin typeface="Courier New" panose="02070309020205020404" pitchFamily="49" charset="0"/>
+                <a:cs typeface="Courier New" panose="02070309020205020404" pitchFamily="49" charset="0"/>
+              </a:rPr>
+              <a:t>…</a:t>
+            </a:r>
+          </a:p>
+          <a:p>
+            <a:r>
+              <a:rPr lang="en-US" dirty="0" err="1" smtClean="0">
+                <a:latin typeface="Courier New" panose="02070309020205020404" pitchFamily="49" charset="0"/>
+                <a:cs typeface="Courier New" panose="02070309020205020404" pitchFamily="49" charset="0"/>
+              </a:rPr>
+              <a:t>stdout</a:t>
+            </a:r>
+            <a:r>
+              <a:rPr lang="en-US" dirty="0">
+                <a:latin typeface="Courier New" panose="02070309020205020404" pitchFamily="49" charset="0"/>
+                <a:cs typeface="Courier New" panose="02070309020205020404" pitchFamily="49" charset="0"/>
+              </a:rPr>
+              <a:t>, </a:t>
+            </a:r>
+            <a:r>
+              <a:rPr lang="en-US" dirty="0" err="1">
+                <a:latin typeface="Courier New" panose="02070309020205020404" pitchFamily="49" charset="0"/>
+                <a:cs typeface="Courier New" panose="02070309020205020404" pitchFamily="49" charset="0"/>
+              </a:rPr>
+              <a:t>stderr</a:t>
+            </a:r>
+            <a:r>
+              <a:rPr lang="en-US" dirty="0">
+                <a:latin typeface="Courier New" panose="02070309020205020404" pitchFamily="49" charset="0"/>
+                <a:cs typeface="Courier New" panose="02070309020205020404" pitchFamily="49" charset="0"/>
+              </a:rPr>
+              <a:t> = </a:t>
+            </a:r>
+            <a:r>
+              <a:rPr lang="en-US" dirty="0" err="1">
+                <a:latin typeface="Courier New" panose="02070309020205020404" pitchFamily="49" charset="0"/>
+                <a:cs typeface="Courier New" panose="02070309020205020404" pitchFamily="49" charset="0"/>
+              </a:rPr>
+              <a:t>muscle_cl</a:t>
+            </a:r>
+            <a:r>
+              <a:rPr lang="en-US" dirty="0" smtClean="0">
+                <a:latin typeface="Courier New" panose="02070309020205020404" pitchFamily="49" charset="0"/>
+                <a:cs typeface="Courier New" panose="02070309020205020404" pitchFamily="49" charset="0"/>
+              </a:rPr>
+              <a:t>() </a:t>
+            </a:r>
+            <a:endParaRPr lang="en-US" dirty="0" smtClean="0">
+              <a:latin typeface="Courier New" panose="02070309020205020404" pitchFamily="49" charset="0"/>
+              <a:cs typeface="Courier New" panose="02070309020205020404" pitchFamily="49" charset="0"/>
+            </a:endParaRPr>
+          </a:p>
+        </p:txBody>
+      </p:sp>
+      <p:grpSp>
+        <p:nvGrpSpPr>
+          <p:cNvPr id="6" name="Group 5"/>
+          <p:cNvGrpSpPr/>
+          <p:nvPr/>
+        </p:nvGrpSpPr>
+        <p:grpSpPr>
+          <a:xfrm>
+            <a:off x="1007918" y="4521599"/>
+            <a:ext cx="5836125" cy="1000693"/>
+            <a:chOff x="997528" y="4220260"/>
+            <a:chExt cx="5836125" cy="1000693"/>
+          </a:xfrm>
+        </p:grpSpPr>
+        <p:sp>
+          <p:nvSpPr>
+            <p:cNvPr id="7" name="Oval 6"/>
+            <p:cNvSpPr/>
+            <p:nvPr/>
+          </p:nvSpPr>
+          <p:spPr>
+            <a:xfrm>
+              <a:off x="997528" y="4220260"/>
+              <a:ext cx="1018309" cy="283490"/>
+            </a:xfrm>
+            <a:prstGeom prst="ellipse">
+              <a:avLst/>
+            </a:prstGeom>
+            <a:noFill/>
+            <a:ln w="28575">
+              <a:solidFill>
+                <a:srgbClr val="C00000"/>
+              </a:solidFill>
+            </a:ln>
+          </p:spPr>
+          <p:style>
+            <a:lnRef idx="2">
+              <a:schemeClr val="accent1">
+                <a:shade val="50000"/>
+              </a:schemeClr>
+            </a:lnRef>
+            <a:fillRef idx="1">
+              <a:schemeClr val="accent1"/>
+            </a:fillRef>
+            <a:effectRef idx="0">
+              <a:schemeClr val="accent1"/>
+            </a:effectRef>
+            <a:fontRef idx="minor">
+              <a:schemeClr val="lt1"/>
+            </a:fontRef>
+          </p:style>
+          <p:txBody>
+            <a:bodyPr rtlCol="0" anchor="ctr"/>
+            <a:lstStyle/>
+            <a:p>
+              <a:pPr algn="ctr"/>
+              <a:endParaRPr lang="en-US"/>
+            </a:p>
+          </p:txBody>
+        </p:sp>
+        <p:cxnSp>
+          <p:nvCxnSpPr>
+            <p:cNvPr id="8" name="Straight Arrow Connector 7"/>
+            <p:cNvCxnSpPr>
+              <a:stCxn id="9" idx="0"/>
+              <a:endCxn id="7" idx="5"/>
+            </p:cNvCxnSpPr>
+            <p:nvPr/>
+          </p:nvCxnSpPr>
+          <p:spPr>
+            <a:xfrm flipH="1" flipV="1">
+              <a:off x="1866709" y="4462234"/>
+              <a:ext cx="2941806" cy="389387"/>
+            </a:xfrm>
+            <a:prstGeom prst="straightConnector1">
+              <a:avLst/>
+            </a:prstGeom>
+            <a:ln w="28575">
+              <a:solidFill>
+                <a:srgbClr val="C00000"/>
+              </a:solidFill>
+              <a:tailEnd type="stealth" w="lg" len="lg"/>
+            </a:ln>
+          </p:spPr>
+          <p:style>
+            <a:lnRef idx="1">
+              <a:schemeClr val="accent1"/>
+            </a:lnRef>
+            <a:fillRef idx="0">
+              <a:schemeClr val="accent1"/>
+            </a:fillRef>
+            <a:effectRef idx="0">
+              <a:schemeClr val="accent1"/>
+            </a:effectRef>
+            <a:fontRef idx="minor">
+              <a:schemeClr val="tx1"/>
+            </a:fontRef>
+          </p:style>
+        </p:cxnSp>
+        <p:sp>
+          <p:nvSpPr>
+            <p:cNvPr id="9" name="TextBox 8"/>
+            <p:cNvSpPr txBox="1"/>
+            <p:nvPr/>
+          </p:nvSpPr>
+          <p:spPr>
+            <a:xfrm>
+              <a:off x="2783377" y="4851621"/>
+              <a:ext cx="4050276" cy="369332"/>
+            </a:xfrm>
+            <a:prstGeom prst="rect">
+              <a:avLst/>
+            </a:prstGeom>
+            <a:noFill/>
+            <a:ln>
+              <a:solidFill>
+                <a:srgbClr val="C00000"/>
+              </a:solidFill>
+            </a:ln>
+          </p:spPr>
+          <p:txBody>
+            <a:bodyPr wrap="none" rtlCol="0">
+              <a:spAutoFit/>
+            </a:bodyPr>
+            <a:lstStyle/>
+            <a:p>
+              <a:r>
+                <a:rPr lang="en-US" dirty="0" smtClean="0">
+                  <a:solidFill>
+                    <a:srgbClr val="C00000"/>
+                  </a:solidFill>
+                </a:rPr>
+                <a:t>aligned sequences in </a:t>
+              </a:r>
+              <a:r>
+                <a:rPr lang="en-US" dirty="0" err="1" smtClean="0">
+                  <a:solidFill>
+                    <a:srgbClr val="C00000"/>
+                  </a:solidFill>
+                </a:rPr>
+                <a:t>fasta</a:t>
+              </a:r>
+              <a:r>
+                <a:rPr lang="en-US" dirty="0" smtClean="0">
+                  <a:solidFill>
+                    <a:srgbClr val="C00000"/>
+                  </a:solidFill>
+                </a:rPr>
+                <a:t> format as </a:t>
+              </a:r>
+              <a:r>
+                <a:rPr lang="en-US" dirty="0" err="1" smtClean="0">
+                  <a:solidFill>
+                    <a:srgbClr val="C00000"/>
+                  </a:solidFill>
+                  <a:latin typeface="Courier New" panose="02070309020205020404" pitchFamily="49" charset="0"/>
+                  <a:cs typeface="Courier New" panose="02070309020205020404" pitchFamily="49" charset="0"/>
+                </a:rPr>
+                <a:t>str</a:t>
+              </a:r>
+              <a:endParaRPr lang="en-US" dirty="0">
+                <a:solidFill>
+                  <a:srgbClr val="C00000"/>
+                </a:solidFill>
+                <a:latin typeface="Courier New" panose="02070309020205020404" pitchFamily="49" charset="0"/>
+                <a:cs typeface="Courier New" panose="02070309020205020404" pitchFamily="49" charset="0"/>
+              </a:endParaRPr>
+            </a:p>
+          </p:txBody>
+        </p:sp>
+      </p:grpSp>
     </p:spTree>
     <p:extLst>
       <p:ext uri="{BB962C8B-B14F-4D97-AF65-F5344CB8AC3E}">
-        <p14:creationId xmlns:p14="http://schemas.microsoft.com/office/powerpoint/2010/main" val="3995878730"/>
+        <p14:creationId xmlns:p14="http://schemas.microsoft.com/office/powerpoint/2010/main" val="2951197463"/>
       </p:ext>
     </p:extLst>
   </p:cSld>
@@ -10029,9 +10412,125 @@
   <p:timing>
     <p:tnLst>
       <p:par>
-        <p:cTn id="1" dur="indefinite" restart="never" nodeType="tmRoot"/>
+        <p:cTn id="1" dur="indefinite" restart="never" nodeType="tmRoot">
+          <p:childTnLst>
+            <p:seq concurrent="1" nextAc="seek">
+              <p:cTn id="2" dur="indefinite" nodeType="mainSeq">
+                <p:childTnLst>
+                  <p:par>
+                    <p:cTn id="3" fill="hold">
+                      <p:stCondLst>
+                        <p:cond delay="indefinite"/>
+                      </p:stCondLst>
+                      <p:childTnLst>
+                        <p:par>
+                          <p:cTn id="4" fill="hold">
+                            <p:stCondLst>
+                              <p:cond delay="0"/>
+                            </p:stCondLst>
+                            <p:childTnLst>
+                              <p:par>
+                                <p:cTn id="5" presetID="1" presetClass="entr" presetSubtype="0" fill="hold" grpId="0" nodeType="clickEffect">
+                                  <p:stCondLst>
+                                    <p:cond delay="0"/>
+                                  </p:stCondLst>
+                                  <p:childTnLst>
+                                    <p:set>
+                                      <p:cBhvr>
+                                        <p:cTn id="6" dur="1" fill="hold">
+                                          <p:stCondLst>
+                                            <p:cond delay="0"/>
+                                          </p:stCondLst>
+                                        </p:cTn>
+                                        <p:tgtEl>
+                                          <p:spTgt spid="5"/>
+                                        </p:tgtEl>
+                                        <p:attrNameLst>
+                                          <p:attrName>style.visibility</p:attrName>
+                                        </p:attrNameLst>
+                                      </p:cBhvr>
+                                      <p:to>
+                                        <p:strVal val="visible"/>
+                                      </p:to>
+                                    </p:set>
+                                  </p:childTnLst>
+                                </p:cTn>
+                              </p:par>
+                            </p:childTnLst>
+                          </p:cTn>
+                        </p:par>
+                      </p:childTnLst>
+                    </p:cTn>
+                  </p:par>
+                  <p:par>
+                    <p:cTn id="7" fill="hold">
+                      <p:stCondLst>
+                        <p:cond delay="indefinite"/>
+                      </p:stCondLst>
+                      <p:childTnLst>
+                        <p:par>
+                          <p:cTn id="8" fill="hold">
+                            <p:stCondLst>
+                              <p:cond delay="0"/>
+                            </p:stCondLst>
+                            <p:childTnLst>
+                              <p:par>
+                                <p:cTn id="9" presetID="1" presetClass="entr" presetSubtype="0" fill="hold" nodeType="clickEffect">
+                                  <p:stCondLst>
+                                    <p:cond delay="0"/>
+                                  </p:stCondLst>
+                                  <p:childTnLst>
+                                    <p:set>
+                                      <p:cBhvr>
+                                        <p:cTn id="10" dur="1" fill="hold">
+                                          <p:stCondLst>
+                                            <p:cond delay="0"/>
+                                          </p:stCondLst>
+                                        </p:cTn>
+                                        <p:tgtEl>
+                                          <p:spTgt spid="6"/>
+                                        </p:tgtEl>
+                                        <p:attrNameLst>
+                                          <p:attrName>style.visibility</p:attrName>
+                                        </p:attrNameLst>
+                                      </p:cBhvr>
+                                      <p:to>
+                                        <p:strVal val="visible"/>
+                                      </p:to>
+                                    </p:set>
+                                  </p:childTnLst>
+                                </p:cTn>
+                              </p:par>
+                            </p:childTnLst>
+                          </p:cTn>
+                        </p:par>
+                      </p:childTnLst>
+                    </p:cTn>
+                  </p:par>
+                </p:childTnLst>
+              </p:cTn>
+              <p:prevCondLst>
+                <p:cond evt="onPrev" delay="0">
+                  <p:tgtEl>
+                    <p:sldTgt/>
+                  </p:tgtEl>
+                </p:cond>
+              </p:prevCondLst>
+              <p:nextCondLst>
+                <p:cond evt="onNext" delay="0">
+                  <p:tgtEl>
+                    <p:sldTgt/>
+                  </p:tgtEl>
+                </p:cond>
+              </p:nextCondLst>
+            </p:seq>
+          </p:childTnLst>
+        </p:cTn>
       </p:par>
     </p:tnLst>
+    <p:bldLst>
+      <p:bldP spid="5" grpId="0" animBg="1"/>
+    </p:bldLst>
   </p:timing>
 </p:sld>
 </file>
@@ -10070,7 +10569,561 @@
           <a:p>
             <a:r>
               <a:rPr lang="en-US" dirty="0" smtClean="0"/>
-              <a:t>Tree representation</a:t>
+              <a:t>Reading alignments</a:t>
+            </a:r>
+            <a:endParaRPr lang="en-US" dirty="0"/>
+          </a:p>
+        </p:txBody>
+      </p:sp>
+      <p:sp>
+        <p:nvSpPr>
+          <p:cNvPr id="3" name="Content Placeholder 2"/>
+          <p:cNvSpPr>
+            <a:spLocks noGrp="1"/>
+          </p:cNvSpPr>
+          <p:nvPr>
+            <p:ph idx="1"/>
+          </p:nvPr>
+        </p:nvSpPr>
+        <p:spPr>
+          <a:xfrm>
+            <a:off x="639041" y="1825625"/>
+            <a:ext cx="7886700" cy="4351338"/>
+          </a:xfrm>
+        </p:spPr>
+        <p:txBody>
+          <a:bodyPr/>
+          <a:lstStyle/>
+          <a:p>
+            <a:r>
+              <a:rPr lang="en-US" dirty="0" smtClean="0"/>
+              <a:t>Use </a:t>
+            </a:r>
+            <a:r>
+              <a:rPr lang="en-US" dirty="0" err="1" smtClean="0">
+                <a:latin typeface="Courier New" panose="02070309020205020404" pitchFamily="49" charset="0"/>
+                <a:cs typeface="Courier New" panose="02070309020205020404" pitchFamily="49" charset="0"/>
+              </a:rPr>
+              <a:t>Bio.AlignIO</a:t>
+            </a:r>
+            <a:r>
+              <a:rPr lang="en-US" dirty="0" smtClean="0"/>
+              <a:t> to read/parse/write</a:t>
+            </a:r>
+          </a:p>
+          <a:p>
+            <a:pPr lvl="1"/>
+            <a:r>
+              <a:rPr lang="en-US" dirty="0" smtClean="0"/>
+              <a:t>supports </a:t>
+            </a:r>
+            <a:r>
+              <a:rPr lang="en-US" dirty="0" err="1" smtClean="0"/>
+              <a:t>fasta</a:t>
+            </a:r>
+            <a:r>
+              <a:rPr lang="en-US" dirty="0" smtClean="0"/>
+              <a:t>, PHYLIP,… formats</a:t>
+            </a:r>
+            <a:endParaRPr lang="en-US" dirty="0"/>
+          </a:p>
+        </p:txBody>
+      </p:sp>
+      <p:sp>
+        <p:nvSpPr>
+          <p:cNvPr id="4" name="Slide Number Placeholder 3"/>
+          <p:cNvSpPr>
+            <a:spLocks noGrp="1"/>
+          </p:cNvSpPr>
+          <p:nvPr>
+            <p:ph type="sldNum" sz="quarter" idx="12"/>
+          </p:nvPr>
+        </p:nvSpPr>
+        <p:spPr/>
+        <p:txBody>
+          <a:bodyPr/>
+          <a:lstStyle/>
+          <a:p>
+            <a:fld id="{CA586AD6-E5F2-4F25-940D-C674496063E2}" type="slidenum">
+              <a:rPr lang="en-US" smtClean="0"/>
+              <a:t>22</a:t>
+            </a:fld>
+            <a:endParaRPr lang="en-US"/>
+          </a:p>
+        </p:txBody>
+      </p:sp>
+      <p:sp>
+        <p:nvSpPr>
+          <p:cNvPr id="5" name="TextBox 4"/>
+          <p:cNvSpPr txBox="1"/>
+          <p:nvPr/>
+        </p:nvSpPr>
+        <p:spPr>
+          <a:xfrm>
+            <a:off x="1007918" y="2977841"/>
+            <a:ext cx="7658100" cy="2031325"/>
+          </a:xfrm>
+          <a:prstGeom prst="rect">
+            <a:avLst/>
+          </a:prstGeom>
+          <a:solidFill>
+            <a:schemeClr val="bg1">
+              <a:lumMod val="75000"/>
+            </a:schemeClr>
+          </a:solidFill>
+          <a:ln>
+            <a:solidFill>
+              <a:schemeClr val="tx1"/>
+            </a:solidFill>
+          </a:ln>
+        </p:spPr>
+        <p:txBody>
+          <a:bodyPr wrap="square" rtlCol="0">
+            <a:spAutoFit/>
+          </a:bodyPr>
+          <a:lstStyle/>
+          <a:p>
+            <a:r>
+              <a:rPr lang="en-US" dirty="0" smtClean="0">
+                <a:latin typeface="Courier New" panose="02070309020205020404" pitchFamily="49" charset="0"/>
+                <a:cs typeface="Courier New" panose="02070309020205020404" pitchFamily="49" charset="0"/>
+              </a:rPr>
+              <a:t>from </a:t>
+            </a:r>
+            <a:r>
+              <a:rPr lang="en-US" dirty="0" err="1">
+                <a:latin typeface="Courier New" panose="02070309020205020404" pitchFamily="49" charset="0"/>
+                <a:cs typeface="Courier New" panose="02070309020205020404" pitchFamily="49" charset="0"/>
+              </a:rPr>
+              <a:t>Bio.Align.Applications</a:t>
+            </a:r>
+            <a:r>
+              <a:rPr lang="en-US" dirty="0">
+                <a:latin typeface="Courier New" panose="02070309020205020404" pitchFamily="49" charset="0"/>
+                <a:cs typeface="Courier New" panose="02070309020205020404" pitchFamily="49" charset="0"/>
+              </a:rPr>
+              <a:t> import </a:t>
+            </a:r>
+            <a:r>
+              <a:rPr lang="en-US" dirty="0" err="1" smtClean="0">
+                <a:latin typeface="Courier New" panose="02070309020205020404" pitchFamily="49" charset="0"/>
+                <a:cs typeface="Courier New" panose="02070309020205020404" pitchFamily="49" charset="0"/>
+              </a:rPr>
+              <a:t>MuscleCommandline</a:t>
+            </a:r>
+            <a:endParaRPr lang="en-US" dirty="0" smtClean="0">
+              <a:latin typeface="Courier New" panose="02070309020205020404" pitchFamily="49" charset="0"/>
+              <a:cs typeface="Courier New" panose="02070309020205020404" pitchFamily="49" charset="0"/>
+            </a:endParaRPr>
+          </a:p>
+          <a:p>
+            <a:r>
+              <a:rPr lang="en-US" dirty="0" smtClean="0">
+                <a:latin typeface="Courier New" panose="02070309020205020404" pitchFamily="49" charset="0"/>
+                <a:cs typeface="Courier New" panose="02070309020205020404" pitchFamily="49" charset="0"/>
+              </a:rPr>
+              <a:t>from Bio import </a:t>
+            </a:r>
+            <a:r>
+              <a:rPr lang="en-US" dirty="0" err="1" smtClean="0">
+                <a:latin typeface="Courier New" panose="02070309020205020404" pitchFamily="49" charset="0"/>
+                <a:cs typeface="Courier New" panose="02070309020205020404" pitchFamily="49" charset="0"/>
+              </a:rPr>
+              <a:t>AlignIO</a:t>
+            </a:r>
+            <a:endParaRPr lang="en-US" dirty="0" smtClean="0">
+              <a:latin typeface="Courier New" panose="02070309020205020404" pitchFamily="49" charset="0"/>
+              <a:cs typeface="Courier New" panose="02070309020205020404" pitchFamily="49" charset="0"/>
+            </a:endParaRPr>
+          </a:p>
+          <a:p>
+            <a:r>
+              <a:rPr lang="en-US" dirty="0" smtClean="0">
+                <a:latin typeface="Courier New" panose="02070309020205020404" pitchFamily="49" charset="0"/>
+                <a:cs typeface="Courier New" panose="02070309020205020404" pitchFamily="49" charset="0"/>
+              </a:rPr>
+              <a:t>from </a:t>
+            </a:r>
+            <a:r>
+              <a:rPr lang="en-US" dirty="0" err="1" smtClean="0">
+                <a:latin typeface="Courier New" panose="02070309020205020404" pitchFamily="49" charset="0"/>
+                <a:cs typeface="Courier New" panose="02070309020205020404" pitchFamily="49" charset="0"/>
+              </a:rPr>
+              <a:t>io</a:t>
+            </a:r>
+            <a:r>
+              <a:rPr lang="en-US" dirty="0" smtClean="0">
+                <a:latin typeface="Courier New" panose="02070309020205020404" pitchFamily="49" charset="0"/>
+                <a:cs typeface="Courier New" panose="02070309020205020404" pitchFamily="49" charset="0"/>
+              </a:rPr>
+              <a:t> import </a:t>
+            </a:r>
+            <a:r>
+              <a:rPr lang="en-US" dirty="0" err="1" smtClean="0">
+                <a:latin typeface="Courier New" panose="02070309020205020404" pitchFamily="49" charset="0"/>
+                <a:cs typeface="Courier New" panose="02070309020205020404" pitchFamily="49" charset="0"/>
+              </a:rPr>
+              <a:t>StringIO</a:t>
+            </a:r>
+            <a:endParaRPr lang="en-US" dirty="0" smtClean="0">
+              <a:latin typeface="Courier New" panose="02070309020205020404" pitchFamily="49" charset="0"/>
+              <a:cs typeface="Courier New" panose="02070309020205020404" pitchFamily="49" charset="0"/>
+            </a:endParaRPr>
+          </a:p>
+          <a:p>
+            <a:r>
+              <a:rPr lang="en-US" dirty="0" smtClean="0">
+                <a:latin typeface="Courier New" panose="02070309020205020404" pitchFamily="49" charset="0"/>
+                <a:cs typeface="Courier New" panose="02070309020205020404" pitchFamily="49" charset="0"/>
+              </a:rPr>
+              <a:t>…</a:t>
+            </a:r>
+          </a:p>
+          <a:p>
+            <a:r>
+              <a:rPr lang="en-US" dirty="0" err="1" smtClean="0">
+                <a:latin typeface="Courier New" panose="02070309020205020404" pitchFamily="49" charset="0"/>
+                <a:cs typeface="Courier New" panose="02070309020205020404" pitchFamily="49" charset="0"/>
+              </a:rPr>
+              <a:t>muscle_cl</a:t>
+            </a:r>
+            <a:r>
+              <a:rPr lang="en-US" dirty="0" smtClean="0">
+                <a:latin typeface="Courier New" panose="02070309020205020404" pitchFamily="49" charset="0"/>
+                <a:cs typeface="Courier New" panose="02070309020205020404" pitchFamily="49" charset="0"/>
+              </a:rPr>
+              <a:t> </a:t>
+            </a:r>
+            <a:r>
+              <a:rPr lang="en-US" dirty="0">
+                <a:latin typeface="Courier New" panose="02070309020205020404" pitchFamily="49" charset="0"/>
+                <a:cs typeface="Courier New" panose="02070309020205020404" pitchFamily="49" charset="0"/>
+              </a:rPr>
+              <a:t>= </a:t>
+            </a:r>
+            <a:r>
+              <a:rPr lang="en-US" dirty="0" err="1" smtClean="0">
+                <a:latin typeface="Courier New" panose="02070309020205020404" pitchFamily="49" charset="0"/>
+                <a:cs typeface="Courier New" panose="02070309020205020404" pitchFamily="49" charset="0"/>
+              </a:rPr>
+              <a:t>MuscleCommandline</a:t>
+            </a:r>
+            <a:r>
+              <a:rPr lang="en-US" dirty="0" smtClean="0">
+                <a:latin typeface="Courier New" panose="02070309020205020404" pitchFamily="49" charset="0"/>
+                <a:cs typeface="Courier New" panose="02070309020205020404" pitchFamily="49" charset="0"/>
+              </a:rPr>
+              <a:t>(input='</a:t>
+            </a:r>
+            <a:r>
+              <a:rPr lang="en-US" dirty="0" err="1" smtClean="0">
+                <a:latin typeface="Courier New" panose="02070309020205020404" pitchFamily="49" charset="0"/>
+                <a:cs typeface="Courier New" panose="02070309020205020404" pitchFamily="49" charset="0"/>
+              </a:rPr>
+              <a:t>data.fasta</a:t>
+            </a:r>
+            <a:r>
+              <a:rPr lang="en-US" dirty="0" smtClean="0">
+                <a:latin typeface="Courier New" panose="02070309020205020404" pitchFamily="49" charset="0"/>
+                <a:cs typeface="Courier New" panose="02070309020205020404" pitchFamily="49" charset="0"/>
+              </a:rPr>
+              <a:t>')</a:t>
+            </a:r>
+          </a:p>
+          <a:p>
+            <a:r>
+              <a:rPr lang="en-US" dirty="0" err="1" smtClean="0">
+                <a:latin typeface="Courier New" panose="02070309020205020404" pitchFamily="49" charset="0"/>
+                <a:cs typeface="Courier New" panose="02070309020205020404" pitchFamily="49" charset="0"/>
+              </a:rPr>
+              <a:t>stdout</a:t>
+            </a:r>
+            <a:r>
+              <a:rPr lang="en-US" dirty="0">
+                <a:latin typeface="Courier New" panose="02070309020205020404" pitchFamily="49" charset="0"/>
+                <a:cs typeface="Courier New" panose="02070309020205020404" pitchFamily="49" charset="0"/>
+              </a:rPr>
+              <a:t>, </a:t>
+            </a:r>
+            <a:r>
+              <a:rPr lang="en-US" dirty="0" err="1">
+                <a:latin typeface="Courier New" panose="02070309020205020404" pitchFamily="49" charset="0"/>
+                <a:cs typeface="Courier New" panose="02070309020205020404" pitchFamily="49" charset="0"/>
+              </a:rPr>
+              <a:t>stderr</a:t>
+            </a:r>
+            <a:r>
+              <a:rPr lang="en-US" dirty="0">
+                <a:latin typeface="Courier New" panose="02070309020205020404" pitchFamily="49" charset="0"/>
+                <a:cs typeface="Courier New" panose="02070309020205020404" pitchFamily="49" charset="0"/>
+              </a:rPr>
+              <a:t> = </a:t>
+            </a:r>
+            <a:r>
+              <a:rPr lang="en-US" dirty="0" err="1">
+                <a:latin typeface="Courier New" panose="02070309020205020404" pitchFamily="49" charset="0"/>
+                <a:cs typeface="Courier New" panose="02070309020205020404" pitchFamily="49" charset="0"/>
+              </a:rPr>
+              <a:t>muscle_cl</a:t>
+            </a:r>
+            <a:r>
+              <a:rPr lang="en-US" dirty="0" smtClean="0">
+                <a:latin typeface="Courier New" panose="02070309020205020404" pitchFamily="49" charset="0"/>
+                <a:cs typeface="Courier New" panose="02070309020205020404" pitchFamily="49" charset="0"/>
+              </a:rPr>
+              <a:t>()</a:t>
+            </a:r>
+          </a:p>
+          <a:p>
+            <a:r>
+              <a:rPr lang="en-US" dirty="0">
+                <a:latin typeface="Courier New" panose="02070309020205020404" pitchFamily="49" charset="0"/>
+                <a:cs typeface="Courier New" panose="02070309020205020404" pitchFamily="49" charset="0"/>
+              </a:rPr>
+              <a:t>alignment = </a:t>
+            </a:r>
+            <a:r>
+              <a:rPr lang="en-US" dirty="0" err="1">
+                <a:latin typeface="Courier New" panose="02070309020205020404" pitchFamily="49" charset="0"/>
+                <a:cs typeface="Courier New" panose="02070309020205020404" pitchFamily="49" charset="0"/>
+              </a:rPr>
+              <a:t>AlignIO.read</a:t>
+            </a:r>
+            <a:r>
+              <a:rPr lang="en-US" dirty="0">
+                <a:latin typeface="Courier New" panose="02070309020205020404" pitchFamily="49" charset="0"/>
+                <a:cs typeface="Courier New" panose="02070309020205020404" pitchFamily="49" charset="0"/>
+              </a:rPr>
+              <a:t>(</a:t>
+            </a:r>
+            <a:r>
+              <a:rPr lang="en-US" dirty="0" err="1">
+                <a:latin typeface="Courier New" panose="02070309020205020404" pitchFamily="49" charset="0"/>
+                <a:cs typeface="Courier New" panose="02070309020205020404" pitchFamily="49" charset="0"/>
+              </a:rPr>
+              <a:t>StringIO</a:t>
+            </a:r>
+            <a:r>
+              <a:rPr lang="en-US" dirty="0">
+                <a:latin typeface="Courier New" panose="02070309020205020404" pitchFamily="49" charset="0"/>
+                <a:cs typeface="Courier New" panose="02070309020205020404" pitchFamily="49" charset="0"/>
+              </a:rPr>
+              <a:t>(</a:t>
+            </a:r>
+            <a:r>
+              <a:rPr lang="en-US" dirty="0" err="1">
+                <a:latin typeface="Courier New" panose="02070309020205020404" pitchFamily="49" charset="0"/>
+                <a:cs typeface="Courier New" panose="02070309020205020404" pitchFamily="49" charset="0"/>
+              </a:rPr>
+              <a:t>stdout</a:t>
+            </a:r>
+            <a:r>
+              <a:rPr lang="en-US" dirty="0">
+                <a:latin typeface="Courier New" panose="02070309020205020404" pitchFamily="49" charset="0"/>
+                <a:cs typeface="Courier New" panose="02070309020205020404" pitchFamily="49" charset="0"/>
+              </a:rPr>
+              <a:t>), '</a:t>
+            </a:r>
+            <a:r>
+              <a:rPr lang="en-US" dirty="0" err="1">
+                <a:latin typeface="Courier New" panose="02070309020205020404" pitchFamily="49" charset="0"/>
+                <a:cs typeface="Courier New" panose="02070309020205020404" pitchFamily="49" charset="0"/>
+              </a:rPr>
+              <a:t>fasta</a:t>
+            </a:r>
+            <a:r>
+              <a:rPr lang="en-US" dirty="0">
+                <a:latin typeface="Courier New" panose="02070309020205020404" pitchFamily="49" charset="0"/>
+                <a:cs typeface="Courier New" panose="02070309020205020404" pitchFamily="49" charset="0"/>
+              </a:rPr>
+              <a:t>')</a:t>
+            </a:r>
+            <a:endParaRPr lang="en-US" dirty="0" smtClean="0">
+              <a:latin typeface="Courier New" panose="02070309020205020404" pitchFamily="49" charset="0"/>
+              <a:cs typeface="Courier New" panose="02070309020205020404" pitchFamily="49" charset="0"/>
+            </a:endParaRPr>
+          </a:p>
+        </p:txBody>
+      </p:sp>
+      <p:sp>
+        <p:nvSpPr>
+          <p:cNvPr id="6" name="TextBox 5"/>
+          <p:cNvSpPr txBox="1"/>
+          <p:nvPr/>
+        </p:nvSpPr>
+        <p:spPr>
+          <a:xfrm>
+            <a:off x="2836718" y="5413659"/>
+            <a:ext cx="4624920" cy="400110"/>
+          </a:xfrm>
+          <a:prstGeom prst="rect">
+            <a:avLst/>
+          </a:prstGeom>
+          <a:noFill/>
+          <a:ln>
+            <a:solidFill>
+              <a:schemeClr val="tx1"/>
+            </a:solidFill>
+          </a:ln>
+        </p:spPr>
+        <p:txBody>
+          <a:bodyPr wrap="none" rtlCol="0">
+            <a:spAutoFit/>
+          </a:bodyPr>
+          <a:lstStyle/>
+          <a:p>
+            <a:r>
+              <a:rPr lang="en-US" sz="2000" dirty="0" err="1" smtClean="0">
+                <a:latin typeface="Courier New" panose="02070309020205020404" pitchFamily="49" charset="0"/>
+                <a:cs typeface="Courier New" panose="02070309020205020404" pitchFamily="49" charset="0"/>
+              </a:rPr>
+              <a:t>io.StringIO</a:t>
+            </a:r>
+            <a:r>
+              <a:rPr lang="en-US" sz="2000" dirty="0" smtClean="0"/>
+              <a:t> turns </a:t>
+            </a:r>
+            <a:r>
+              <a:rPr lang="en-US" sz="2000" dirty="0" err="1" smtClean="0">
+                <a:latin typeface="Courier New" panose="02070309020205020404" pitchFamily="49" charset="0"/>
+                <a:cs typeface="Courier New" panose="02070309020205020404" pitchFamily="49" charset="0"/>
+              </a:rPr>
+              <a:t>str</a:t>
+            </a:r>
+            <a:r>
+              <a:rPr lang="en-US" sz="2000" dirty="0" smtClean="0"/>
+              <a:t> into file handle</a:t>
+            </a:r>
+            <a:endParaRPr lang="en-US" sz="2000" dirty="0"/>
+          </a:p>
+        </p:txBody>
+      </p:sp>
+    </p:spTree>
+    <p:extLst>
+      <p:ext uri="{BB962C8B-B14F-4D97-AF65-F5344CB8AC3E}">
+        <p14:creationId xmlns:p14="http://schemas.microsoft.com/office/powerpoint/2010/main" val="1495512233"/>
+      </p:ext>
+    </p:extLst>
+  </p:cSld>
+  <p:clrMapOvr>
+    <a:masterClrMapping/>
+  </p:clrMapOvr>
+  <p:timing>
+    <p:tnLst>
+      <p:par>
+        <p:cTn id="1" dur="indefinite" restart="never" nodeType="tmRoot">
+          <p:childTnLst>
+            <p:seq concurrent="1" nextAc="seek">
+              <p:cTn id="2" dur="indefinite" nodeType="mainSeq">
+                <p:childTnLst>
+                  <p:par>
+                    <p:cTn id="3" fill="hold">
+                      <p:stCondLst>
+                        <p:cond delay="indefinite"/>
+                      </p:stCondLst>
+                      <p:childTnLst>
+                        <p:par>
+                          <p:cTn id="4" fill="hold">
+                            <p:stCondLst>
+                              <p:cond delay="0"/>
+                            </p:stCondLst>
+                            <p:childTnLst>
+                              <p:par>
+                                <p:cTn id="5" presetID="1" presetClass="entr" presetSubtype="0" fill="hold" grpId="0" nodeType="clickEffect">
+                                  <p:stCondLst>
+                                    <p:cond delay="0"/>
+                                  </p:stCondLst>
+                                  <p:childTnLst>
+                                    <p:set>
+                                      <p:cBhvr>
+                                        <p:cTn id="6" dur="1" fill="hold">
+                                          <p:stCondLst>
+                                            <p:cond delay="0"/>
+                                          </p:stCondLst>
+                                        </p:cTn>
+                                        <p:tgtEl>
+                                          <p:spTgt spid="6"/>
+                                        </p:tgtEl>
+                                        <p:attrNameLst>
+                                          <p:attrName>style.visibility</p:attrName>
+                                        </p:attrNameLst>
+                                      </p:cBhvr>
+                                      <p:to>
+                                        <p:strVal val="visible"/>
+                                      </p:to>
+                                    </p:set>
+                                  </p:childTnLst>
+                                </p:cTn>
+                              </p:par>
+                            </p:childTnLst>
+                          </p:cTn>
+                        </p:par>
+                      </p:childTnLst>
+                    </p:cTn>
+                  </p:par>
+                </p:childTnLst>
+              </p:cTn>
+              <p:prevCondLst>
+                <p:cond evt="onPrev" delay="0">
+                  <p:tgtEl>
+                    <p:sldTgt/>
+                  </p:tgtEl>
+                </p:cond>
+              </p:prevCondLst>
+              <p:nextCondLst>
+                <p:cond evt="onNext" delay="0">
+                  <p:tgtEl>
+                    <p:sldTgt/>
+                  </p:tgtEl>
+                </p:cond>
+              </p:nextCondLst>
+            </p:seq>
+          </p:childTnLst>
+        </p:cTn>
+      </p:par>
+    </p:tnLst>
+    <p:bldLst>
+      <p:bldP spid="6" grpId="0" animBg="1"/>
+    </p:bldLst>
+  </p:timing>
+</p:sld>
+</file>
+
+<file path=ppt/slides/slide23.xml><?xml version="1.0" encoding="utf-8"?>
+<p:sld xmlns:a="http://schemas.openxmlformats.org/drawingml/2006/main" xmlns:r="http://schemas.openxmlformats.org/officeDocument/2006/relationships" xmlns:p="http://schemas.openxmlformats.org/presentationml/2006/main">
+  <p:cSld>
+    <p:spTree>
+      <p:nvGrpSpPr>
+        <p:cNvPr id="1" name=""/>
+        <p:cNvGrpSpPr/>
+        <p:nvPr/>
+      </p:nvGrpSpPr>
+      <p:grpSpPr>
+        <a:xfrm>
+          <a:off x="0" y="0"/>
+          <a:ext cx="0" cy="0"/>
+          <a:chOff x="0" y="0"/>
+          <a:chExt cx="0" cy="0"/>
+        </a:xfrm>
+      </p:grpSpPr>
+      <p:sp>
+        <p:nvSpPr>
+          <p:cNvPr id="2" name="Title 1"/>
+          <p:cNvSpPr>
+            <a:spLocks noGrp="1"/>
+          </p:cNvSpPr>
+          <p:nvPr>
+            <p:ph type="title"/>
+          </p:nvPr>
+        </p:nvSpPr>
+        <p:spPr/>
+        <p:txBody>
+          <a:bodyPr/>
+          <a:lstStyle/>
+          <a:p>
+            <a:r>
+              <a:rPr lang="en-US" dirty="0" smtClean="0"/>
+              <a:t>Working with alignments</a:t>
             </a:r>
             <a:endParaRPr lang="en-US" dirty="0"/>
           </a:p>
@@ -10093,15 +11146,44 @@
           <a:p>
             <a:r>
               <a:rPr lang="en-US" dirty="0" smtClean="0"/>
-              <a:t>E.g., </a:t>
-            </a:r>
-            <a:r>
-              <a:rPr lang="en-US" dirty="0" err="1" smtClean="0"/>
-              <a:t>Newick</a:t>
-            </a:r>
+              <a:t>Properties</a:t>
+            </a:r>
+          </a:p>
+          <a:p>
+            <a:pPr lvl="1"/>
             <a:r>
               <a:rPr lang="en-US" dirty="0" smtClean="0"/>
-              <a:t> format</a:t>
+              <a:t>number of sequences in alignment</a:t>
+            </a:r>
+          </a:p>
+          <a:p>
+            <a:pPr lvl="1"/>
+            <a:endParaRPr lang="en-US" dirty="0"/>
+          </a:p>
+          <a:p>
+            <a:pPr lvl="1"/>
+            <a:endParaRPr lang="en-US" dirty="0" smtClean="0"/>
+          </a:p>
+          <a:p>
+            <a:pPr lvl="1"/>
+            <a:r>
+              <a:rPr lang="en-US" dirty="0" smtClean="0"/>
+              <a:t>length of alignment</a:t>
+            </a:r>
+          </a:p>
+          <a:p>
+            <a:pPr lvl="1"/>
+            <a:endParaRPr lang="en-US" dirty="0"/>
+          </a:p>
+          <a:p>
+            <a:pPr lvl="1"/>
+            <a:endParaRPr lang="en-US" dirty="0" smtClean="0"/>
+          </a:p>
+          <a:p>
+            <a:pPr lvl="1"/>
+            <a:r>
+              <a:rPr lang="en-US" dirty="0" smtClean="0"/>
+              <a:t>working with sequences, e.g., print first 76 characters of each</a:t>
             </a:r>
             <a:endParaRPr lang="en-US" dirty="0"/>
           </a:p>
@@ -10124,7 +11206,823 @@
           <a:p>
             <a:fld id="{CA586AD6-E5F2-4F25-940D-C674496063E2}" type="slidenum">
               <a:rPr lang="en-US" smtClean="0"/>
-              <a:t>22</a:t>
+              <a:t>23</a:t>
+            </a:fld>
+            <a:endParaRPr lang="en-US"/>
+          </a:p>
+        </p:txBody>
+      </p:sp>
+      <p:sp>
+        <p:nvSpPr>
+          <p:cNvPr id="5" name="TextBox 4"/>
+          <p:cNvSpPr txBox="1"/>
+          <p:nvPr/>
+        </p:nvSpPr>
+        <p:spPr>
+          <a:xfrm>
+            <a:off x="987136" y="2752708"/>
+            <a:ext cx="6371195" cy="369332"/>
+          </a:xfrm>
+          <a:prstGeom prst="rect">
+            <a:avLst/>
+          </a:prstGeom>
+          <a:solidFill>
+            <a:schemeClr val="bg1">
+              <a:lumMod val="75000"/>
+            </a:schemeClr>
+          </a:solidFill>
+          <a:ln>
+            <a:solidFill>
+              <a:schemeClr val="tx1"/>
+            </a:solidFill>
+          </a:ln>
+        </p:spPr>
+        <p:txBody>
+          <a:bodyPr wrap="square" rtlCol="0">
+            <a:spAutoFit/>
+          </a:bodyPr>
+          <a:lstStyle/>
+          <a:p>
+            <a:r>
+              <a:rPr lang="en-US" dirty="0" smtClean="0">
+                <a:latin typeface="Courier New" panose="02070309020205020404" pitchFamily="49" charset="0"/>
+                <a:cs typeface="Courier New" panose="02070309020205020404" pitchFamily="49" charset="0"/>
+              </a:rPr>
+              <a:t>print(</a:t>
+            </a:r>
+            <a:r>
+              <a:rPr lang="en-US" dirty="0" err="1" smtClean="0">
+                <a:latin typeface="Courier New" panose="02070309020205020404" pitchFamily="49" charset="0"/>
+                <a:cs typeface="Courier New" panose="02070309020205020404" pitchFamily="49" charset="0"/>
+              </a:rPr>
+              <a:t>len</a:t>
+            </a:r>
+            <a:r>
+              <a:rPr lang="en-US" dirty="0" smtClean="0">
+                <a:latin typeface="Courier New" panose="02070309020205020404" pitchFamily="49" charset="0"/>
+                <a:cs typeface="Courier New" panose="02070309020205020404" pitchFamily="49" charset="0"/>
+              </a:rPr>
+              <a:t>(alignment))</a:t>
+            </a:r>
+            <a:endParaRPr lang="en-US" dirty="0" smtClean="0">
+              <a:latin typeface="Courier New" panose="02070309020205020404" pitchFamily="49" charset="0"/>
+              <a:cs typeface="Courier New" panose="02070309020205020404" pitchFamily="49" charset="0"/>
+            </a:endParaRPr>
+          </a:p>
+        </p:txBody>
+      </p:sp>
+      <p:sp>
+        <p:nvSpPr>
+          <p:cNvPr id="6" name="TextBox 5"/>
+          <p:cNvSpPr txBox="1"/>
+          <p:nvPr/>
+        </p:nvSpPr>
+        <p:spPr>
+          <a:xfrm>
+            <a:off x="987135" y="3939566"/>
+            <a:ext cx="6371195" cy="369332"/>
+          </a:xfrm>
+          <a:prstGeom prst="rect">
+            <a:avLst/>
+          </a:prstGeom>
+          <a:solidFill>
+            <a:schemeClr val="bg1">
+              <a:lumMod val="75000"/>
+            </a:schemeClr>
+          </a:solidFill>
+          <a:ln>
+            <a:solidFill>
+              <a:schemeClr val="tx1"/>
+            </a:solidFill>
+          </a:ln>
+        </p:spPr>
+        <p:txBody>
+          <a:bodyPr wrap="square" rtlCol="0">
+            <a:spAutoFit/>
+          </a:bodyPr>
+          <a:lstStyle/>
+          <a:p>
+            <a:r>
+              <a:rPr lang="en-US" dirty="0">
+                <a:latin typeface="Courier New" panose="02070309020205020404" pitchFamily="49" charset="0"/>
+                <a:cs typeface="Courier New" panose="02070309020205020404" pitchFamily="49" charset="0"/>
+              </a:rPr>
+              <a:t>print(</a:t>
+            </a:r>
+            <a:r>
+              <a:rPr lang="en-US" dirty="0" err="1">
+                <a:latin typeface="Courier New" panose="02070309020205020404" pitchFamily="49" charset="0"/>
+                <a:cs typeface="Courier New" panose="02070309020205020404" pitchFamily="49" charset="0"/>
+              </a:rPr>
+              <a:t>alignment.get_alignment_length</a:t>
+            </a:r>
+            <a:r>
+              <a:rPr lang="en-US" dirty="0">
+                <a:latin typeface="Courier New" panose="02070309020205020404" pitchFamily="49" charset="0"/>
+                <a:cs typeface="Courier New" panose="02070309020205020404" pitchFamily="49" charset="0"/>
+              </a:rPr>
+              <a:t>())</a:t>
+            </a:r>
+            <a:endParaRPr lang="en-US" dirty="0" smtClean="0">
+              <a:latin typeface="Courier New" panose="02070309020205020404" pitchFamily="49" charset="0"/>
+              <a:cs typeface="Courier New" panose="02070309020205020404" pitchFamily="49" charset="0"/>
+            </a:endParaRPr>
+          </a:p>
+        </p:txBody>
+      </p:sp>
+      <p:sp>
+        <p:nvSpPr>
+          <p:cNvPr id="7" name="TextBox 6"/>
+          <p:cNvSpPr txBox="1"/>
+          <p:nvPr/>
+        </p:nvSpPr>
+        <p:spPr>
+          <a:xfrm>
+            <a:off x="987134" y="5448545"/>
+            <a:ext cx="6371195" cy="646331"/>
+          </a:xfrm>
+          <a:prstGeom prst="rect">
+            <a:avLst/>
+          </a:prstGeom>
+          <a:solidFill>
+            <a:schemeClr val="bg1">
+              <a:lumMod val="75000"/>
+            </a:schemeClr>
+          </a:solidFill>
+          <a:ln>
+            <a:solidFill>
+              <a:schemeClr val="tx1"/>
+            </a:solidFill>
+          </a:ln>
+        </p:spPr>
+        <p:txBody>
+          <a:bodyPr wrap="square" rtlCol="0">
+            <a:spAutoFit/>
+          </a:bodyPr>
+          <a:lstStyle/>
+          <a:p>
+            <a:r>
+              <a:rPr lang="en-US" dirty="0" smtClean="0">
+                <a:latin typeface="Courier New" panose="02070309020205020404" pitchFamily="49" charset="0"/>
+                <a:cs typeface="Courier New" panose="02070309020205020404" pitchFamily="49" charset="0"/>
+              </a:rPr>
+              <a:t>for </a:t>
+            </a:r>
+            <a:r>
+              <a:rPr lang="en-US" dirty="0" err="1">
+                <a:latin typeface="Courier New" panose="02070309020205020404" pitchFamily="49" charset="0"/>
+                <a:cs typeface="Courier New" panose="02070309020205020404" pitchFamily="49" charset="0"/>
+              </a:rPr>
+              <a:t>seq_rec</a:t>
+            </a:r>
+            <a:r>
+              <a:rPr lang="en-US" dirty="0">
+                <a:latin typeface="Courier New" panose="02070309020205020404" pitchFamily="49" charset="0"/>
+                <a:cs typeface="Courier New" panose="02070309020205020404" pitchFamily="49" charset="0"/>
+              </a:rPr>
+              <a:t> in alignment:</a:t>
+            </a:r>
+          </a:p>
+          <a:p>
+            <a:r>
+              <a:rPr lang="en-US" dirty="0" smtClean="0">
+                <a:latin typeface="Courier New" panose="02070309020205020404" pitchFamily="49" charset="0"/>
+                <a:cs typeface="Courier New" panose="02070309020205020404" pitchFamily="49" charset="0"/>
+              </a:rPr>
+              <a:t>    </a:t>
+            </a:r>
+            <a:r>
+              <a:rPr lang="en-US" dirty="0">
+                <a:latin typeface="Courier New" panose="02070309020205020404" pitchFamily="49" charset="0"/>
+                <a:cs typeface="Courier New" panose="02070309020205020404" pitchFamily="49" charset="0"/>
+              </a:rPr>
+              <a:t>print(</a:t>
+            </a:r>
+            <a:r>
+              <a:rPr lang="en-US" dirty="0" err="1">
+                <a:latin typeface="Courier New" panose="02070309020205020404" pitchFamily="49" charset="0"/>
+                <a:cs typeface="Courier New" panose="02070309020205020404" pitchFamily="49" charset="0"/>
+              </a:rPr>
+              <a:t>seq_rec.seq</a:t>
+            </a:r>
+            <a:r>
+              <a:rPr lang="en-US" dirty="0">
+                <a:latin typeface="Courier New" panose="02070309020205020404" pitchFamily="49" charset="0"/>
+                <a:cs typeface="Courier New" panose="02070309020205020404" pitchFamily="49" charset="0"/>
+              </a:rPr>
+              <a:t>[:76])</a:t>
+            </a:r>
+            <a:endParaRPr lang="en-US" dirty="0" smtClean="0">
+              <a:latin typeface="Courier New" panose="02070309020205020404" pitchFamily="49" charset="0"/>
+              <a:cs typeface="Courier New" panose="02070309020205020404" pitchFamily="49" charset="0"/>
+            </a:endParaRPr>
+          </a:p>
+        </p:txBody>
+      </p:sp>
+    </p:spTree>
+    <p:extLst>
+      <p:ext uri="{BB962C8B-B14F-4D97-AF65-F5344CB8AC3E}">
+        <p14:creationId xmlns:p14="http://schemas.microsoft.com/office/powerpoint/2010/main" val="2799496777"/>
+      </p:ext>
+    </p:extLst>
+  </p:cSld>
+  <p:clrMapOvr>
+    <a:masterClrMapping/>
+  </p:clrMapOvr>
+  <p:timing>
+    <p:tnLst>
+      <p:par>
+        <p:cTn id="1" dur="indefinite" restart="never" nodeType="tmRoot">
+          <p:childTnLst>
+            <p:seq concurrent="1" nextAc="seek">
+              <p:cTn id="2" dur="indefinite" nodeType="mainSeq">
+                <p:childTnLst>
+                  <p:par>
+                    <p:cTn id="3" fill="hold">
+                      <p:stCondLst>
+                        <p:cond delay="indefinite"/>
+                        <p:cond evt="onBegin" delay="0">
+                          <p:tn val="2"/>
+                        </p:cond>
+                      </p:stCondLst>
+                      <p:childTnLst>
+                        <p:par>
+                          <p:cTn id="4" fill="hold">
+                            <p:stCondLst>
+                              <p:cond delay="0"/>
+                            </p:stCondLst>
+                            <p:childTnLst>
+                              <p:par>
+                                <p:cTn id="5" presetID="1" presetClass="entr" presetSubtype="0" fill="hold" grpId="0" nodeType="withEffect">
+                                  <p:stCondLst>
+                                    <p:cond delay="0"/>
+                                  </p:stCondLst>
+                                  <p:childTnLst>
+                                    <p:set>
+                                      <p:cBhvr>
+                                        <p:cTn id="6" dur="1" fill="hold">
+                                          <p:stCondLst>
+                                            <p:cond delay="0"/>
+                                          </p:stCondLst>
+                                        </p:cTn>
+                                        <p:tgtEl>
+                                          <p:spTgt spid="3">
+                                            <p:txEl>
+                                              <p:pRg st="0" end="0"/>
+                                            </p:txEl>
+                                          </p:spTgt>
+                                        </p:tgtEl>
+                                        <p:attrNameLst>
+                                          <p:attrName>style.visibility</p:attrName>
+                                        </p:attrNameLst>
+                                      </p:cBhvr>
+                                      <p:to>
+                                        <p:strVal val="visible"/>
+                                      </p:to>
+                                    </p:set>
+                                  </p:childTnLst>
+                                </p:cTn>
+                              </p:par>
+                              <p:par>
+                                <p:cTn id="7" presetID="1" presetClass="entr" presetSubtype="0" fill="hold" grpId="0" nodeType="withEffect">
+                                  <p:stCondLst>
+                                    <p:cond delay="0"/>
+                                  </p:stCondLst>
+                                  <p:childTnLst>
+                                    <p:set>
+                                      <p:cBhvr>
+                                        <p:cTn id="8" dur="1" fill="hold">
+                                          <p:stCondLst>
+                                            <p:cond delay="0"/>
+                                          </p:stCondLst>
+                                        </p:cTn>
+                                        <p:tgtEl>
+                                          <p:spTgt spid="3">
+                                            <p:txEl>
+                                              <p:pRg st="1" end="1"/>
+                                            </p:txEl>
+                                          </p:spTgt>
+                                        </p:tgtEl>
+                                        <p:attrNameLst>
+                                          <p:attrName>style.visibility</p:attrName>
+                                        </p:attrNameLst>
+                                      </p:cBhvr>
+                                      <p:to>
+                                        <p:strVal val="visible"/>
+                                      </p:to>
+                                    </p:set>
+                                  </p:childTnLst>
+                                </p:cTn>
+                              </p:par>
+                              <p:par>
+                                <p:cTn id="9" presetID="1" presetClass="entr" presetSubtype="0" fill="hold" grpId="0" nodeType="withEffect">
+                                  <p:stCondLst>
+                                    <p:cond delay="0"/>
+                                  </p:stCondLst>
+                                  <p:childTnLst>
+                                    <p:set>
+                                      <p:cBhvr>
+                                        <p:cTn id="10" dur="1" fill="hold">
+                                          <p:stCondLst>
+                                            <p:cond delay="0"/>
+                                          </p:stCondLst>
+                                        </p:cTn>
+                                        <p:tgtEl>
+                                          <p:spTgt spid="5"/>
+                                        </p:tgtEl>
+                                        <p:attrNameLst>
+                                          <p:attrName>style.visibility</p:attrName>
+                                        </p:attrNameLst>
+                                      </p:cBhvr>
+                                      <p:to>
+                                        <p:strVal val="visible"/>
+                                      </p:to>
+                                    </p:set>
+                                  </p:childTnLst>
+                                </p:cTn>
+                              </p:par>
+                            </p:childTnLst>
+                          </p:cTn>
+                        </p:par>
+                      </p:childTnLst>
+                    </p:cTn>
+                  </p:par>
+                  <p:par>
+                    <p:cTn id="11" fill="hold">
+                      <p:stCondLst>
+                        <p:cond delay="indefinite"/>
+                      </p:stCondLst>
+                      <p:childTnLst>
+                        <p:par>
+                          <p:cTn id="12" fill="hold">
+                            <p:stCondLst>
+                              <p:cond delay="0"/>
+                            </p:stCondLst>
+                            <p:childTnLst>
+                              <p:par>
+                                <p:cTn id="13" presetID="1" presetClass="entr" presetSubtype="0" fill="hold" grpId="0" nodeType="clickEffect">
+                                  <p:stCondLst>
+                                    <p:cond delay="0"/>
+                                  </p:stCondLst>
+                                  <p:childTnLst>
+                                    <p:set>
+                                      <p:cBhvr>
+                                        <p:cTn id="14" dur="1" fill="hold">
+                                          <p:stCondLst>
+                                            <p:cond delay="0"/>
+                                          </p:stCondLst>
+                                        </p:cTn>
+                                        <p:tgtEl>
+                                          <p:spTgt spid="3">
+                                            <p:txEl>
+                                              <p:pRg st="4" end="4"/>
+                                            </p:txEl>
+                                          </p:spTgt>
+                                        </p:tgtEl>
+                                        <p:attrNameLst>
+                                          <p:attrName>style.visibility</p:attrName>
+                                        </p:attrNameLst>
+                                      </p:cBhvr>
+                                      <p:to>
+                                        <p:strVal val="visible"/>
+                                      </p:to>
+                                    </p:set>
+                                  </p:childTnLst>
+                                </p:cTn>
+                              </p:par>
+                              <p:par>
+                                <p:cTn id="15" presetID="1" presetClass="entr" presetSubtype="0" fill="hold" grpId="0" nodeType="withEffect">
+                                  <p:stCondLst>
+                                    <p:cond delay="0"/>
+                                  </p:stCondLst>
+                                  <p:childTnLst>
+                                    <p:set>
+                                      <p:cBhvr>
+                                        <p:cTn id="16" dur="1" fill="hold">
+                                          <p:stCondLst>
+                                            <p:cond delay="0"/>
+                                          </p:stCondLst>
+                                        </p:cTn>
+                                        <p:tgtEl>
+                                          <p:spTgt spid="6"/>
+                                        </p:tgtEl>
+                                        <p:attrNameLst>
+                                          <p:attrName>style.visibility</p:attrName>
+                                        </p:attrNameLst>
+                                      </p:cBhvr>
+                                      <p:to>
+                                        <p:strVal val="visible"/>
+                                      </p:to>
+                                    </p:set>
+                                  </p:childTnLst>
+                                </p:cTn>
+                              </p:par>
+                            </p:childTnLst>
+                          </p:cTn>
+                        </p:par>
+                      </p:childTnLst>
+                    </p:cTn>
+                  </p:par>
+                  <p:par>
+                    <p:cTn id="17" fill="hold">
+                      <p:stCondLst>
+                        <p:cond delay="indefinite"/>
+                      </p:stCondLst>
+                      <p:childTnLst>
+                        <p:par>
+                          <p:cTn id="18" fill="hold">
+                            <p:stCondLst>
+                              <p:cond delay="0"/>
+                            </p:stCondLst>
+                            <p:childTnLst>
+                              <p:par>
+                                <p:cTn id="19" presetID="1" presetClass="entr" presetSubtype="0" fill="hold" grpId="0" nodeType="clickEffect">
+                                  <p:stCondLst>
+                                    <p:cond delay="0"/>
+                                  </p:stCondLst>
+                                  <p:childTnLst>
+                                    <p:set>
+                                      <p:cBhvr>
+                                        <p:cTn id="20" dur="1" fill="hold">
+                                          <p:stCondLst>
+                                            <p:cond delay="0"/>
+                                          </p:stCondLst>
+                                        </p:cTn>
+                                        <p:tgtEl>
+                                          <p:spTgt spid="3">
+                                            <p:txEl>
+                                              <p:pRg st="7" end="7"/>
+                                            </p:txEl>
+                                          </p:spTgt>
+                                        </p:tgtEl>
+                                        <p:attrNameLst>
+                                          <p:attrName>style.visibility</p:attrName>
+                                        </p:attrNameLst>
+                                      </p:cBhvr>
+                                      <p:to>
+                                        <p:strVal val="visible"/>
+                                      </p:to>
+                                    </p:set>
+                                  </p:childTnLst>
+                                </p:cTn>
+                              </p:par>
+                              <p:par>
+                                <p:cTn id="21" presetID="1" presetClass="entr" presetSubtype="0" fill="hold" grpId="0" nodeType="withEffect">
+                                  <p:stCondLst>
+                                    <p:cond delay="0"/>
+                                  </p:stCondLst>
+                                  <p:childTnLst>
+                                    <p:set>
+                                      <p:cBhvr>
+                                        <p:cTn id="22" dur="1" fill="hold">
+                                          <p:stCondLst>
+                                            <p:cond delay="0"/>
+                                          </p:stCondLst>
+                                        </p:cTn>
+                                        <p:tgtEl>
+                                          <p:spTgt spid="7"/>
+                                        </p:tgtEl>
+                                        <p:attrNameLst>
+                                          <p:attrName>style.visibility</p:attrName>
+                                        </p:attrNameLst>
+                                      </p:cBhvr>
+                                      <p:to>
+                                        <p:strVal val="visible"/>
+                                      </p:to>
+                                    </p:set>
+                                  </p:childTnLst>
+                                </p:cTn>
+                              </p:par>
+                            </p:childTnLst>
+                          </p:cTn>
+                        </p:par>
+                      </p:childTnLst>
+                    </p:cTn>
+                  </p:par>
+                </p:childTnLst>
+              </p:cTn>
+              <p:prevCondLst>
+                <p:cond evt="onPrev" delay="0">
+                  <p:tgtEl>
+                    <p:sldTgt/>
+                  </p:tgtEl>
+                </p:cond>
+              </p:prevCondLst>
+              <p:nextCondLst>
+                <p:cond evt="onNext" delay="0">
+                  <p:tgtEl>
+                    <p:sldTgt/>
+                  </p:tgtEl>
+                </p:cond>
+              </p:nextCondLst>
+            </p:seq>
+          </p:childTnLst>
+        </p:cTn>
+      </p:par>
+    </p:tnLst>
+    <p:bldLst>
+      <p:bldP spid="3" grpId="0" uiExpand="1" build="p" bldLvl="2"/>
+      <p:bldP spid="5" grpId="0" animBg="1"/>
+      <p:bldP spid="6" grpId="0" animBg="1"/>
+      <p:bldP spid="7" grpId="0" animBg="1"/>
+    </p:bldLst>
+  </p:timing>
+</p:sld>
+</file>
+
+<file path=ppt/slides/slide24.xml><?xml version="1.0" encoding="utf-8"?>
+<p:sld xmlns:a="http://schemas.openxmlformats.org/drawingml/2006/main" xmlns:r="http://schemas.openxmlformats.org/officeDocument/2006/relationships" xmlns:p="http://schemas.openxmlformats.org/presentationml/2006/main">
+  <p:cSld>
+    <p:spTree>
+      <p:nvGrpSpPr>
+        <p:cNvPr id="1" name=""/>
+        <p:cNvGrpSpPr/>
+        <p:nvPr/>
+      </p:nvGrpSpPr>
+      <p:grpSpPr>
+        <a:xfrm>
+          <a:off x="0" y="0"/>
+          <a:ext cx="0" cy="0"/>
+          <a:chOff x="0" y="0"/>
+          <a:chExt cx="0" cy="0"/>
+        </a:xfrm>
+      </p:grpSpPr>
+      <p:sp>
+        <p:nvSpPr>
+          <p:cNvPr id="2" name="Title 1"/>
+          <p:cNvSpPr>
+            <a:spLocks noGrp="1"/>
+          </p:cNvSpPr>
+          <p:nvPr>
+            <p:ph type="title"/>
+          </p:nvPr>
+        </p:nvSpPr>
+        <p:spPr/>
+        <p:txBody>
+          <a:bodyPr/>
+          <a:lstStyle/>
+          <a:p>
+            <a:r>
+              <a:rPr lang="en-US" dirty="0" smtClean="0"/>
+              <a:t>BLAST</a:t>
+            </a:r>
+            <a:endParaRPr lang="en-US" dirty="0"/>
+          </a:p>
+        </p:txBody>
+      </p:sp>
+      <p:sp>
+        <p:nvSpPr>
+          <p:cNvPr id="3" name="Text Placeholder 2"/>
+          <p:cNvSpPr>
+            <a:spLocks noGrp="1"/>
+          </p:cNvSpPr>
+          <p:nvPr>
+            <p:ph type="body" idx="1"/>
+          </p:nvPr>
+        </p:nvSpPr>
+        <p:spPr/>
+        <p:txBody>
+          <a:bodyPr/>
+          <a:lstStyle/>
+          <a:p>
+            <a:endParaRPr lang="en-US"/>
+          </a:p>
+        </p:txBody>
+      </p:sp>
+      <p:sp>
+        <p:nvSpPr>
+          <p:cNvPr id="4" name="Slide Number Placeholder 3"/>
+          <p:cNvSpPr>
+            <a:spLocks noGrp="1"/>
+          </p:cNvSpPr>
+          <p:nvPr>
+            <p:ph type="sldNum" sz="quarter" idx="12"/>
+          </p:nvPr>
+        </p:nvSpPr>
+        <p:spPr/>
+        <p:txBody>
+          <a:bodyPr/>
+          <a:lstStyle/>
+          <a:p>
+            <a:fld id="{CA586AD6-E5F2-4F25-940D-C674496063E2}" type="slidenum">
+              <a:rPr lang="en-US" smtClean="0"/>
+              <a:t>24</a:t>
+            </a:fld>
+            <a:endParaRPr lang="en-US"/>
+          </a:p>
+        </p:txBody>
+      </p:sp>
+    </p:spTree>
+    <p:extLst>
+      <p:ext uri="{BB962C8B-B14F-4D97-AF65-F5344CB8AC3E}">
+        <p14:creationId xmlns:p14="http://schemas.microsoft.com/office/powerpoint/2010/main" val="1600841018"/>
+      </p:ext>
+    </p:extLst>
+  </p:cSld>
+  <p:clrMapOvr>
+    <a:masterClrMapping/>
+  </p:clrMapOvr>
+  <p:timing>
+    <p:tnLst>
+      <p:par>
+        <p:cTn id="1" dur="indefinite" restart="never" nodeType="tmRoot"/>
+      </p:par>
+    </p:tnLst>
+  </p:timing>
+</p:sld>
+</file>
+
+<file path=ppt/slides/slide25.xml><?xml version="1.0" encoding="utf-8"?>
+<p:sld xmlns:a="http://schemas.openxmlformats.org/drawingml/2006/main" xmlns:r="http://schemas.openxmlformats.org/officeDocument/2006/relationships" xmlns:p="http://schemas.openxmlformats.org/presentationml/2006/main">
+  <p:cSld>
+    <p:spTree>
+      <p:nvGrpSpPr>
+        <p:cNvPr id="1" name=""/>
+        <p:cNvGrpSpPr/>
+        <p:nvPr/>
+      </p:nvGrpSpPr>
+      <p:grpSpPr>
+        <a:xfrm>
+          <a:off x="0" y="0"/>
+          <a:ext cx="0" cy="0"/>
+          <a:chOff x="0" y="0"/>
+          <a:chExt cx="0" cy="0"/>
+        </a:xfrm>
+      </p:grpSpPr>
+      <p:sp>
+        <p:nvSpPr>
+          <p:cNvPr id="2" name="Title 1"/>
+          <p:cNvSpPr>
+            <a:spLocks noGrp="1"/>
+          </p:cNvSpPr>
+          <p:nvPr>
+            <p:ph type="title"/>
+          </p:nvPr>
+        </p:nvSpPr>
+        <p:spPr/>
+        <p:txBody>
+          <a:bodyPr/>
+          <a:lstStyle/>
+          <a:p>
+            <a:r>
+              <a:rPr lang="en-US" dirty="0" smtClean="0"/>
+              <a:t>Phylogenetic trees</a:t>
+            </a:r>
+            <a:endParaRPr lang="en-US" dirty="0"/>
+          </a:p>
+        </p:txBody>
+      </p:sp>
+      <p:sp>
+        <p:nvSpPr>
+          <p:cNvPr id="3" name="Text Placeholder 2"/>
+          <p:cNvSpPr>
+            <a:spLocks noGrp="1"/>
+          </p:cNvSpPr>
+          <p:nvPr>
+            <p:ph type="body" idx="1"/>
+          </p:nvPr>
+        </p:nvSpPr>
+        <p:spPr/>
+        <p:txBody>
+          <a:bodyPr/>
+          <a:lstStyle/>
+          <a:p>
+            <a:endParaRPr lang="en-US"/>
+          </a:p>
+        </p:txBody>
+      </p:sp>
+      <p:sp>
+        <p:nvSpPr>
+          <p:cNvPr id="4" name="Slide Number Placeholder 3"/>
+          <p:cNvSpPr>
+            <a:spLocks noGrp="1"/>
+          </p:cNvSpPr>
+          <p:nvPr>
+            <p:ph type="sldNum" sz="quarter" idx="12"/>
+          </p:nvPr>
+        </p:nvSpPr>
+        <p:spPr/>
+        <p:txBody>
+          <a:bodyPr/>
+          <a:lstStyle/>
+          <a:p>
+            <a:fld id="{CA586AD6-E5F2-4F25-940D-C674496063E2}" type="slidenum">
+              <a:rPr lang="en-US" smtClean="0"/>
+              <a:t>25</a:t>
+            </a:fld>
+            <a:endParaRPr lang="en-US"/>
+          </a:p>
+        </p:txBody>
+      </p:sp>
+    </p:spTree>
+    <p:extLst>
+      <p:ext uri="{BB962C8B-B14F-4D97-AF65-F5344CB8AC3E}">
+        <p14:creationId xmlns:p14="http://schemas.microsoft.com/office/powerpoint/2010/main" val="3995878730"/>
+      </p:ext>
+    </p:extLst>
+  </p:cSld>
+  <p:clrMapOvr>
+    <a:masterClrMapping/>
+  </p:clrMapOvr>
+  <p:timing>
+    <p:tnLst>
+      <p:par>
+        <p:cTn id="1" dur="indefinite" restart="never" nodeType="tmRoot"/>
+      </p:par>
+    </p:tnLst>
+  </p:timing>
+</p:sld>
+</file>
+
+<file path=ppt/slides/slide26.xml><?xml version="1.0" encoding="utf-8"?>
+<p:sld xmlns:a="http://schemas.openxmlformats.org/drawingml/2006/main" xmlns:r="http://schemas.openxmlformats.org/officeDocument/2006/relationships" xmlns:p="http://schemas.openxmlformats.org/presentationml/2006/main">
+  <p:cSld>
+    <p:spTree>
+      <p:nvGrpSpPr>
+        <p:cNvPr id="1" name=""/>
+        <p:cNvGrpSpPr/>
+        <p:nvPr/>
+      </p:nvGrpSpPr>
+      <p:grpSpPr>
+        <a:xfrm>
+          <a:off x="0" y="0"/>
+          <a:ext cx="0" cy="0"/>
+          <a:chOff x="0" y="0"/>
+          <a:chExt cx="0" cy="0"/>
+        </a:xfrm>
+      </p:grpSpPr>
+      <p:sp>
+        <p:nvSpPr>
+          <p:cNvPr id="2" name="Title 1"/>
+          <p:cNvSpPr>
+            <a:spLocks noGrp="1"/>
+          </p:cNvSpPr>
+          <p:nvPr>
+            <p:ph type="title"/>
+          </p:nvPr>
+        </p:nvSpPr>
+        <p:spPr/>
+        <p:txBody>
+          <a:bodyPr/>
+          <a:lstStyle/>
+          <a:p>
+            <a:r>
+              <a:rPr lang="en-US" dirty="0" smtClean="0"/>
+              <a:t>Tree representation</a:t>
+            </a:r>
+            <a:endParaRPr lang="en-US" dirty="0"/>
+          </a:p>
+        </p:txBody>
+      </p:sp>
+      <p:sp>
+        <p:nvSpPr>
+          <p:cNvPr id="3" name="Content Placeholder 2"/>
+          <p:cNvSpPr>
+            <a:spLocks noGrp="1"/>
+          </p:cNvSpPr>
+          <p:nvPr>
+            <p:ph idx="1"/>
+          </p:nvPr>
+        </p:nvSpPr>
+        <p:spPr/>
+        <p:txBody>
+          <a:bodyPr/>
+          <a:lstStyle/>
+          <a:p>
+            <a:r>
+              <a:rPr lang="en-US" dirty="0" smtClean="0"/>
+              <a:t>E.g., </a:t>
+            </a:r>
+            <a:r>
+              <a:rPr lang="en-US" dirty="0" err="1" smtClean="0"/>
+              <a:t>Newick</a:t>
+            </a:r>
+            <a:r>
+              <a:rPr lang="en-US" dirty="0" smtClean="0"/>
+              <a:t> format</a:t>
+            </a:r>
+            <a:endParaRPr lang="en-US" dirty="0"/>
+          </a:p>
+        </p:txBody>
+      </p:sp>
+      <p:sp>
+        <p:nvSpPr>
+          <p:cNvPr id="4" name="Slide Number Placeholder 3"/>
+          <p:cNvSpPr>
+            <a:spLocks noGrp="1"/>
+          </p:cNvSpPr>
+          <p:nvPr>
+            <p:ph type="sldNum" sz="quarter" idx="12"/>
+          </p:nvPr>
+        </p:nvSpPr>
+        <p:spPr/>
+        <p:txBody>
+          <a:bodyPr/>
+          <a:lstStyle/>
+          <a:p>
+            <a:fld id="{CA586AD6-E5F2-4F25-940D-C674496063E2}" type="slidenum">
+              <a:rPr lang="en-US" smtClean="0"/>
+              <a:t>26</a:t>
             </a:fld>
             <a:endParaRPr lang="en-US"/>
           </a:p>
@@ -11223,7 +13121,7 @@
 </p:sld>
 </file>
 
-<file path=ppt/slides/slide23.xml><?xml version="1.0" encoding="utf-8"?>
+<file path=ppt/slides/slide27.xml><?xml version="1.0" encoding="utf-8"?>
 <p:sld xmlns:a="http://schemas.openxmlformats.org/drawingml/2006/main" xmlns:r="http://schemas.openxmlformats.org/officeDocument/2006/relationships" xmlns:p="http://schemas.openxmlformats.org/presentationml/2006/main">
   <p:cSld>
     <p:spTree>
@@ -11335,11 +13233,7 @@
           <a:p>
             <a:r>
               <a:rPr lang="en-US" dirty="0" smtClean="0"/>
-              <a:t>Displaying </a:t>
-            </a:r>
-            <a:r>
-              <a:rPr lang="en-US" dirty="0" smtClean="0"/>
-              <a:t>tree</a:t>
+              <a:t>Displaying tree</a:t>
             </a:r>
           </a:p>
           <a:p>
@@ -11385,7 +13279,7 @@
           <a:p>
             <a:fld id="{CA586AD6-E5F2-4F25-940D-C674496063E2}" type="slidenum">
               <a:rPr lang="en-US" smtClean="0"/>
-              <a:t>23</a:t>
+              <a:t>27</a:t>
             </a:fld>
             <a:endParaRPr lang="en-US"/>
           </a:p>
@@ -11606,10 +13500,6 @@
               </a:rPr>
               <a:t>')</a:t>
             </a:r>
-            <a:endParaRPr lang="en-US" dirty="0" smtClean="0">
-              <a:latin typeface="Courier New" panose="02070309020205020404" pitchFamily="49" charset="0"/>
-              <a:cs typeface="Courier New" panose="02070309020205020404" pitchFamily="49" charset="0"/>
-            </a:endParaRPr>
           </a:p>
         </p:txBody>
       </p:sp>
@@ -11920,7 +13810,7 @@
 </p:sld>
 </file>
 
-<file path=ppt/slides/slide24.xml><?xml version="1.0" encoding="utf-8"?>
+<file path=ppt/slides/slide28.xml><?xml version="1.0" encoding="utf-8"?>
 <p:sld xmlns:a="http://schemas.openxmlformats.org/drawingml/2006/main" xmlns:r="http://schemas.openxmlformats.org/officeDocument/2006/relationships" xmlns:p="http://schemas.openxmlformats.org/presentationml/2006/main">
   <p:cSld>
     <p:spTree>
@@ -12031,7 +13921,7 @@
           <a:p>
             <a:fld id="{CA586AD6-E5F2-4F25-940D-C674496063E2}" type="slidenum">
               <a:rPr lang="en-US" smtClean="0"/>
-              <a:t>24</a:t>
+              <a:t>28</a:t>
             </a:fld>
             <a:endParaRPr lang="en-US"/>
           </a:p>
@@ -12635,7 +14525,7 @@
 </p:sld>
 </file>
 
-<file path=ppt/slides/slide25.xml><?xml version="1.0" encoding="utf-8"?>
+<file path=ppt/slides/slide29.xml><?xml version="1.0" encoding="utf-8"?>
 <p:sld xmlns:a="http://schemas.openxmlformats.org/drawingml/2006/main" xmlns:r="http://schemas.openxmlformats.org/officeDocument/2006/relationships" xmlns:p="http://schemas.openxmlformats.org/presentationml/2006/main">
   <p:cSld>
     <p:spTree>
@@ -12765,7 +14655,7 @@
           <a:p>
             <a:fld id="{CA586AD6-E5F2-4F25-940D-C674496063E2}" type="slidenum">
               <a:rPr lang="en-US" smtClean="0"/>
-              <a:t>25</a:t>
+              <a:t>29</a:t>
             </a:fld>
             <a:endParaRPr lang="en-US"/>
           </a:p>
@@ -13344,7 +15234,7 @@
 </p:sld>
 </file>
 
-<file path=ppt/slides/slide26.xml><?xml version="1.0" encoding="utf-8"?>
+<file path=ppt/slides/slide3.xml><?xml version="1.0" encoding="utf-8"?>
 <p:sld xmlns:a="http://schemas.openxmlformats.org/drawingml/2006/main" xmlns:r="http://schemas.openxmlformats.org/officeDocument/2006/relationships" xmlns:p="http://schemas.openxmlformats.org/presentationml/2006/main">
   <p:cSld>
     <p:spTree>
@@ -13378,6 +15268,108 @@
           <a:p>
             <a:r>
               <a:rPr lang="en-US" dirty="0" smtClean="0"/>
+              <a:t>Sequences</a:t>
+            </a:r>
+            <a:endParaRPr lang="en-US" dirty="0"/>
+          </a:p>
+        </p:txBody>
+      </p:sp>
+      <p:sp>
+        <p:nvSpPr>
+          <p:cNvPr id="3" name="Text Placeholder 2"/>
+          <p:cNvSpPr>
+            <a:spLocks noGrp="1"/>
+          </p:cNvSpPr>
+          <p:nvPr>
+            <p:ph type="body" idx="1"/>
+          </p:nvPr>
+        </p:nvSpPr>
+        <p:spPr/>
+        <p:txBody>
+          <a:bodyPr/>
+          <a:lstStyle/>
+          <a:p>
+            <a:endParaRPr lang="en-US"/>
+          </a:p>
+        </p:txBody>
+      </p:sp>
+      <p:sp>
+        <p:nvSpPr>
+          <p:cNvPr id="4" name="Slide Number Placeholder 3"/>
+          <p:cNvSpPr>
+            <a:spLocks noGrp="1"/>
+          </p:cNvSpPr>
+          <p:nvPr>
+            <p:ph type="sldNum" sz="quarter" idx="12"/>
+          </p:nvPr>
+        </p:nvSpPr>
+        <p:spPr/>
+        <p:txBody>
+          <a:bodyPr/>
+          <a:lstStyle/>
+          <a:p>
+            <a:fld id="{CA586AD6-E5F2-4F25-940D-C674496063E2}" type="slidenum">
+              <a:rPr lang="en-US" smtClean="0"/>
+              <a:t>3</a:t>
+            </a:fld>
+            <a:endParaRPr lang="en-US"/>
+          </a:p>
+        </p:txBody>
+      </p:sp>
+    </p:spTree>
+    <p:extLst>
+      <p:ext uri="{BB962C8B-B14F-4D97-AF65-F5344CB8AC3E}">
+        <p14:creationId xmlns:p14="http://schemas.microsoft.com/office/powerpoint/2010/main" val="2536757022"/>
+      </p:ext>
+    </p:extLst>
+  </p:cSld>
+  <p:clrMapOvr>
+    <a:masterClrMapping/>
+  </p:clrMapOvr>
+  <p:timing>
+    <p:tnLst>
+      <p:par>
+        <p:cTn id="1" dur="indefinite" restart="never" nodeType="tmRoot"/>
+      </p:par>
+    </p:tnLst>
+  </p:timing>
+</p:sld>
+</file>
+
+<file path=ppt/slides/slide30.xml><?xml version="1.0" encoding="utf-8"?>
+<p:sld xmlns:a="http://schemas.openxmlformats.org/drawingml/2006/main" xmlns:r="http://schemas.openxmlformats.org/officeDocument/2006/relationships" xmlns:p="http://schemas.openxmlformats.org/presentationml/2006/main">
+  <p:cSld>
+    <p:spTree>
+      <p:nvGrpSpPr>
+        <p:cNvPr id="1" name=""/>
+        <p:cNvGrpSpPr/>
+        <p:nvPr/>
+      </p:nvGrpSpPr>
+      <p:grpSpPr>
+        <a:xfrm>
+          <a:off x="0" y="0"/>
+          <a:ext cx="0" cy="0"/>
+          <a:chOff x="0" y="0"/>
+          <a:chExt cx="0" cy="0"/>
+        </a:xfrm>
+      </p:grpSpPr>
+      <p:sp>
+        <p:nvSpPr>
+          <p:cNvPr id="2" name="Title 1"/>
+          <p:cNvSpPr>
+            <a:spLocks noGrp="1"/>
+          </p:cNvSpPr>
+          <p:nvPr>
+            <p:ph type="title"/>
+          </p:nvPr>
+        </p:nvSpPr>
+        <p:spPr/>
+        <p:txBody>
+          <a:bodyPr/>
+          <a:lstStyle/>
+          <a:p>
+            <a:r>
+              <a:rPr lang="en-US" dirty="0" smtClean="0"/>
               <a:t>Path lengths</a:t>
             </a:r>
             <a:endParaRPr lang="en-US" dirty="0"/>
@@ -13446,15 +15438,7 @@
           <a:p>
             <a:r>
               <a:rPr lang="en-US" dirty="0" smtClean="0"/>
-              <a:t>M</a:t>
-            </a:r>
-            <a:r>
-              <a:rPr lang="en-US" dirty="0" smtClean="0"/>
-              <a:t>inimum </a:t>
-            </a:r>
-            <a:r>
-              <a:rPr lang="en-US" dirty="0" smtClean="0"/>
-              <a:t>distance from root to terminal clade?</a:t>
+              <a:t>Minimum distance from root to terminal clade?</a:t>
             </a:r>
           </a:p>
           <a:p>
@@ -13464,11 +15448,7 @@
           <a:p>
             <a:r>
               <a:rPr lang="en-US" dirty="0" smtClean="0"/>
-              <a:t>Terminal </a:t>
-            </a:r>
-            <a:r>
-              <a:rPr lang="en-US" dirty="0" smtClean="0"/>
-              <a:t>clade with the minimum distance to root?</a:t>
+              <a:t>Terminal clade with the minimum distance to root?</a:t>
             </a:r>
             <a:endParaRPr lang="en-US" dirty="0"/>
           </a:p>
@@ -13495,7 +15475,7 @@
           <a:p>
             <a:fld id="{CA586AD6-E5F2-4F25-940D-C674496063E2}" type="slidenum">
               <a:rPr lang="en-US" smtClean="0"/>
-              <a:t>26</a:t>
+              <a:t>30</a:t>
             </a:fld>
             <a:endParaRPr lang="en-US"/>
           </a:p>
@@ -13778,10 +15758,6 @@
               </a:rPr>
               <a:t>(clades[0], clades[5])</a:t>
             </a:r>
-            <a:endParaRPr lang="en-US" dirty="0" smtClean="0">
-              <a:latin typeface="Courier New" panose="02070309020205020404" pitchFamily="49" charset="0"/>
-              <a:cs typeface="Courier New" panose="02070309020205020404" pitchFamily="49" charset="0"/>
-            </a:endParaRPr>
           </a:p>
         </p:txBody>
       </p:sp>
@@ -14173,7 +16149,7 @@
 </p:sld>
 </file>
 
-<file path=ppt/slides/slide27.xml><?xml version="1.0" encoding="utf-8"?>
+<file path=ppt/slides/slide31.xml><?xml version="1.0" encoding="utf-8"?>
 <p:sld xmlns:a="http://schemas.openxmlformats.org/drawingml/2006/main" xmlns:r="http://schemas.openxmlformats.org/officeDocument/2006/relationships" xmlns:p="http://schemas.openxmlformats.org/presentationml/2006/main">
   <p:cSld>
     <p:spTree>
@@ -14207,11 +16183,7 @@
           <a:p>
             <a:r>
               <a:rPr lang="en-US" dirty="0" smtClean="0"/>
-              <a:t>Navigating </a:t>
-            </a:r>
-            <a:r>
-              <a:rPr lang="en-US" dirty="0" smtClean="0"/>
-              <a:t>trees</a:t>
+              <a:t>Navigating trees</a:t>
             </a:r>
             <a:endParaRPr lang="en-US" dirty="0"/>
           </a:p>
@@ -14264,22 +16236,17 @@
               <a:rPr lang="en-US" dirty="0" smtClean="0"/>
               <a:t>another</a:t>
             </a:r>
+          </a:p>
+          <a:p>
+            <a:endParaRPr lang="en-US" dirty="0"/>
+          </a:p>
+          <a:p>
             <a:endParaRPr lang="en-US" dirty="0" smtClean="0"/>
           </a:p>
           <a:p>
-            <a:endParaRPr lang="en-US" dirty="0"/>
-          </a:p>
-          <a:p>
-            <a:endParaRPr lang="en-US" dirty="0" smtClean="0"/>
-          </a:p>
-          <a:p>
             <a:r>
               <a:rPr lang="en-US" dirty="0" smtClean="0"/>
-              <a:t>Get </a:t>
-            </a:r>
-            <a:r>
-              <a:rPr lang="en-US" dirty="0" smtClean="0"/>
-              <a:t>common ancestor</a:t>
+              <a:t>Get common ancestor</a:t>
             </a:r>
             <a:endParaRPr lang="en-US" dirty="0"/>
           </a:p>
@@ -14302,7 +16269,7 @@
           <a:p>
             <a:fld id="{CA586AD6-E5F2-4F25-940D-C674496063E2}" type="slidenum">
               <a:rPr lang="en-US" smtClean="0"/>
-              <a:t>27</a:t>
+              <a:t>31</a:t>
             </a:fld>
             <a:endParaRPr lang="en-US"/>
           </a:p>
@@ -14631,21 +16598,44 @@
                 <a:latin typeface="Courier New" panose="02070309020205020404" pitchFamily="49" charset="0"/>
                 <a:cs typeface="Courier New" panose="02070309020205020404" pitchFamily="49" charset="0"/>
               </a:rPr>
-              <a:t>tree</a:t>
+              <a:t>tree.get_path</a:t>
+            </a:r>
+            <a:r>
+              <a:rPr lang="en-US" dirty="0" smtClean="0">
+                <a:latin typeface="Courier New" panose="02070309020205020404" pitchFamily="49" charset="0"/>
+                <a:cs typeface="Courier New" panose="02070309020205020404" pitchFamily="49" charset="0"/>
+              </a:rPr>
+              <a:t>(</a:t>
             </a:r>
             <a:r>
               <a:rPr lang="en-US" dirty="0" err="1" smtClean="0">
                 <a:latin typeface="Courier New" panose="02070309020205020404" pitchFamily="49" charset="0"/>
                 <a:cs typeface="Courier New" panose="02070309020205020404" pitchFamily="49" charset="0"/>
               </a:rPr>
-              <a:t>.get_path</a:t>
+              <a:t>terminal_clades</a:t>
             </a:r>
             <a:r>
               <a:rPr lang="en-US" dirty="0" smtClean="0">
                 <a:latin typeface="Courier New" panose="02070309020205020404" pitchFamily="49" charset="0"/>
                 <a:cs typeface="Courier New" panose="02070309020205020404" pitchFamily="49" charset="0"/>
               </a:rPr>
-              <a:t>(</a:t>
+              <a:t>[0],</a:t>
+            </a:r>
+          </a:p>
+          <a:p>
+            <a:r>
+              <a:rPr lang="en-US" dirty="0">
+                <a:latin typeface="Courier New" panose="02070309020205020404" pitchFamily="49" charset="0"/>
+                <a:cs typeface="Courier New" panose="02070309020205020404" pitchFamily="49" charset="0"/>
+              </a:rPr>
+              <a:t> </a:t>
+            </a:r>
+            <a:r>
+              <a:rPr lang="en-US" dirty="0" smtClean="0">
+                <a:latin typeface="Courier New" panose="02070309020205020404" pitchFamily="49" charset="0"/>
+                <a:cs typeface="Courier New" panose="02070309020205020404" pitchFamily="49" charset="0"/>
+              </a:rPr>
+              <a:t>             </a:t>
             </a:r>
             <a:r>
               <a:rPr lang="en-US" dirty="0" err="1" smtClean="0">
@@ -14659,49 +16649,8 @@
                 <a:latin typeface="Courier New" panose="02070309020205020404" pitchFamily="49" charset="0"/>
                 <a:cs typeface="Courier New" panose="02070309020205020404" pitchFamily="49" charset="0"/>
               </a:rPr>
-              <a:t>[0],</a:t>
-            </a:r>
-          </a:p>
-          <a:p>
-            <a:r>
-              <a:rPr lang="en-US" dirty="0">
-                <a:latin typeface="Courier New" panose="02070309020205020404" pitchFamily="49" charset="0"/>
-                <a:cs typeface="Courier New" panose="02070309020205020404" pitchFamily="49" charset="0"/>
-              </a:rPr>
-              <a:t> </a:t>
-            </a:r>
-            <a:r>
-              <a:rPr lang="en-US" dirty="0" smtClean="0">
-                <a:latin typeface="Courier New" panose="02070309020205020404" pitchFamily="49" charset="0"/>
-                <a:cs typeface="Courier New" panose="02070309020205020404" pitchFamily="49" charset="0"/>
-              </a:rPr>
-              <a:t>            </a:t>
-            </a:r>
-            <a:r>
-              <a:rPr lang="en-US" dirty="0" smtClean="0">
-                <a:latin typeface="Courier New" panose="02070309020205020404" pitchFamily="49" charset="0"/>
-                <a:cs typeface="Courier New" panose="02070309020205020404" pitchFamily="49" charset="0"/>
-              </a:rPr>
-              <a:t> </a:t>
-            </a:r>
-            <a:r>
-              <a:rPr lang="en-US" dirty="0" err="1" smtClean="0">
-                <a:latin typeface="Courier New" panose="02070309020205020404" pitchFamily="49" charset="0"/>
-                <a:cs typeface="Courier New" panose="02070309020205020404" pitchFamily="49" charset="0"/>
-              </a:rPr>
-              <a:t>terminal_clades</a:t>
-            </a:r>
-            <a:r>
-              <a:rPr lang="en-US" dirty="0" smtClean="0">
-                <a:latin typeface="Courier New" panose="02070309020205020404" pitchFamily="49" charset="0"/>
-                <a:cs typeface="Courier New" panose="02070309020205020404" pitchFamily="49" charset="0"/>
-              </a:rPr>
               <a:t>[5])</a:t>
             </a:r>
-            <a:endParaRPr lang="en-US" dirty="0" smtClean="0">
-              <a:latin typeface="Courier New" panose="02070309020205020404" pitchFamily="49" charset="0"/>
-              <a:cs typeface="Courier New" panose="02070309020205020404" pitchFamily="49" charset="0"/>
-            </a:endParaRPr>
           </a:p>
         </p:txBody>
       </p:sp>
@@ -15013,7 +16962,7 @@
 </p:sld>
 </file>
 
-<file path=ppt/slides/slide28.xml><?xml version="1.0" encoding="utf-8"?>
+<file path=ppt/slides/slide32.xml><?xml version="1.0" encoding="utf-8"?>
 <p:sld xmlns:a="http://schemas.openxmlformats.org/drawingml/2006/main" xmlns:r="http://schemas.openxmlformats.org/officeDocument/2006/relationships" xmlns:p="http://schemas.openxmlformats.org/presentationml/2006/main">
   <p:cSld>
     <p:spTree>
@@ -15111,7 +17060,7 @@
           <a:p>
             <a:fld id="{CA586AD6-E5F2-4F25-940D-C674496063E2}" type="slidenum">
               <a:rPr lang="en-US" smtClean="0"/>
-              <a:t>28</a:t>
+              <a:t>32</a:t>
             </a:fld>
             <a:endParaRPr lang="en-US"/>
           </a:p>
@@ -15716,108 +17665,6 @@
       <p:bldP spid="10" grpId="0" animBg="1"/>
       <p:bldP spid="11" grpId="0" animBg="1"/>
     </p:bldLst>
-  </p:timing>
-</p:sld>
-</file>
-
-<file path=ppt/slides/slide3.xml><?xml version="1.0" encoding="utf-8"?>
-<p:sld xmlns:a="http://schemas.openxmlformats.org/drawingml/2006/main" xmlns:r="http://schemas.openxmlformats.org/officeDocument/2006/relationships" xmlns:p="http://schemas.openxmlformats.org/presentationml/2006/main">
-  <p:cSld>
-    <p:spTree>
-      <p:nvGrpSpPr>
-        <p:cNvPr id="1" name=""/>
-        <p:cNvGrpSpPr/>
-        <p:nvPr/>
-      </p:nvGrpSpPr>
-      <p:grpSpPr>
-        <a:xfrm>
-          <a:off x="0" y="0"/>
-          <a:ext cx="0" cy="0"/>
-          <a:chOff x="0" y="0"/>
-          <a:chExt cx="0" cy="0"/>
-        </a:xfrm>
-      </p:grpSpPr>
-      <p:sp>
-        <p:nvSpPr>
-          <p:cNvPr id="2" name="Title 1"/>
-          <p:cNvSpPr>
-            <a:spLocks noGrp="1"/>
-          </p:cNvSpPr>
-          <p:nvPr>
-            <p:ph type="title"/>
-          </p:nvPr>
-        </p:nvSpPr>
-        <p:spPr/>
-        <p:txBody>
-          <a:bodyPr/>
-          <a:lstStyle/>
-          <a:p>
-            <a:r>
-              <a:rPr lang="en-US" dirty="0" smtClean="0"/>
-              <a:t>Sequences</a:t>
-            </a:r>
-            <a:endParaRPr lang="en-US" dirty="0"/>
-          </a:p>
-        </p:txBody>
-      </p:sp>
-      <p:sp>
-        <p:nvSpPr>
-          <p:cNvPr id="3" name="Text Placeholder 2"/>
-          <p:cNvSpPr>
-            <a:spLocks noGrp="1"/>
-          </p:cNvSpPr>
-          <p:nvPr>
-            <p:ph type="body" idx="1"/>
-          </p:nvPr>
-        </p:nvSpPr>
-        <p:spPr/>
-        <p:txBody>
-          <a:bodyPr/>
-          <a:lstStyle/>
-          <a:p>
-            <a:endParaRPr lang="en-US"/>
-          </a:p>
-        </p:txBody>
-      </p:sp>
-      <p:sp>
-        <p:nvSpPr>
-          <p:cNvPr id="4" name="Slide Number Placeholder 3"/>
-          <p:cNvSpPr>
-            <a:spLocks noGrp="1"/>
-          </p:cNvSpPr>
-          <p:nvPr>
-            <p:ph type="sldNum" sz="quarter" idx="12"/>
-          </p:nvPr>
-        </p:nvSpPr>
-        <p:spPr/>
-        <p:txBody>
-          <a:bodyPr/>
-          <a:lstStyle/>
-          <a:p>
-            <a:fld id="{CA586AD6-E5F2-4F25-940D-C674496063E2}" type="slidenum">
-              <a:rPr lang="en-US" smtClean="0"/>
-              <a:t>3</a:t>
-            </a:fld>
-            <a:endParaRPr lang="en-US"/>
-          </a:p>
-        </p:txBody>
-      </p:sp>
-    </p:spTree>
-    <p:extLst>
-      <p:ext uri="{BB962C8B-B14F-4D97-AF65-F5344CB8AC3E}">
-        <p14:creationId xmlns:p14="http://schemas.microsoft.com/office/powerpoint/2010/main" val="2536757022"/>
-      </p:ext>
-    </p:extLst>
-  </p:cSld>
-  <p:clrMapOvr>
-    <a:masterClrMapping/>
-  </p:clrMapOvr>
-  <p:timing>
-    <p:tnLst>
-      <p:par>
-        <p:cTn id="1" dur="indefinite" restart="never" nodeType="tmRoot"/>
-      </p:par>
-    </p:tnLst>
   </p:timing>
 </p:sld>
 </file>

</xml_diff>

<commit_message>
Fix copy/paste error for phylogentic tree root; fix amination on HSP slide
</commit_message>
<xml_diff>
--- a/Python/biopython.pptx
+++ b/Python/biopython.pptx
@@ -233,7 +233,7 @@
           <a:p>
             <a:fld id="{E50739E9-DC4A-4901-8195-7CE430F840D8}" type="datetimeFigureOut">
               <a:rPr lang="en-US" smtClean="0"/>
-              <a:t>2016-11-26</a:t>
+              <a:t>2019-11-22</a:t>
             </a:fld>
             <a:endParaRPr lang="en-US"/>
           </a:p>
@@ -716,7 +716,7 @@
           <a:p>
             <a:fld id="{EBC2714F-B822-455B-B016-0228B6AA8BE9}" type="datetime1">
               <a:rPr lang="en-US" smtClean="0"/>
-              <a:t>2016-11-26</a:t>
+              <a:t>2019-11-22</a:t>
             </a:fld>
             <a:endParaRPr lang="en-US"/>
           </a:p>
@@ -886,7 +886,7 @@
           <a:p>
             <a:fld id="{F3822F19-B516-497C-9005-1997989AD109}" type="datetime1">
               <a:rPr lang="en-US" smtClean="0"/>
-              <a:t>2016-11-26</a:t>
+              <a:t>2019-11-22</a:t>
             </a:fld>
             <a:endParaRPr lang="en-US"/>
           </a:p>
@@ -1066,7 +1066,7 @@
           <a:p>
             <a:fld id="{DC6E6076-3AC8-4591-A5B3-5701E86BC391}" type="datetime1">
               <a:rPr lang="en-US" smtClean="0"/>
-              <a:t>2016-11-26</a:t>
+              <a:t>2019-11-22</a:t>
             </a:fld>
             <a:endParaRPr lang="en-US"/>
           </a:p>
@@ -1236,7 +1236,7 @@
           <a:p>
             <a:fld id="{10101B39-3B57-4A7B-8CB6-E6BDB118061D}" type="datetime1">
               <a:rPr lang="en-US" smtClean="0"/>
-              <a:t>2016-11-26</a:t>
+              <a:t>2019-11-22</a:t>
             </a:fld>
             <a:endParaRPr lang="en-US"/>
           </a:p>
@@ -1480,7 +1480,7 @@
           <a:p>
             <a:fld id="{C27B26EE-8ECF-4FF3-9A38-87EFFDA62A28}" type="datetime1">
               <a:rPr lang="en-US" smtClean="0"/>
-              <a:t>2016-11-26</a:t>
+              <a:t>2019-11-22</a:t>
             </a:fld>
             <a:endParaRPr lang="en-US"/>
           </a:p>
@@ -1712,7 +1712,7 @@
           <a:p>
             <a:fld id="{6742683C-23EC-4C0D-AC9A-17C98B40DAA7}" type="datetime1">
               <a:rPr lang="en-US" smtClean="0"/>
-              <a:t>2016-11-26</a:t>
+              <a:t>2019-11-22</a:t>
             </a:fld>
             <a:endParaRPr lang="en-US"/>
           </a:p>
@@ -2079,7 +2079,7 @@
           <a:p>
             <a:fld id="{61B639F5-7095-4C4C-8D13-AB3C116C2681}" type="datetime1">
               <a:rPr lang="en-US" smtClean="0"/>
-              <a:t>2016-11-26</a:t>
+              <a:t>2019-11-22</a:t>
             </a:fld>
             <a:endParaRPr lang="en-US"/>
           </a:p>
@@ -2197,7 +2197,7 @@
           <a:p>
             <a:fld id="{565C75B5-128F-4C63-85A2-EABB3B9088B2}" type="datetime1">
               <a:rPr lang="en-US" smtClean="0"/>
-              <a:t>2016-11-26</a:t>
+              <a:t>2019-11-22</a:t>
             </a:fld>
             <a:endParaRPr lang="en-US"/>
           </a:p>
@@ -2292,7 +2292,7 @@
           <a:p>
             <a:fld id="{EB500747-7144-41D3-89B7-0E40926A8757}" type="datetime1">
               <a:rPr lang="en-US" smtClean="0"/>
-              <a:t>2016-11-26</a:t>
+              <a:t>2019-11-22</a:t>
             </a:fld>
             <a:endParaRPr lang="en-US"/>
           </a:p>
@@ -2569,7 +2569,7 @@
           <a:p>
             <a:fld id="{09A9D774-0B51-4CD9-9147-A6BD4D353F07}" type="datetime1">
               <a:rPr lang="en-US" smtClean="0"/>
-              <a:t>2016-11-26</a:t>
+              <a:t>2019-11-22</a:t>
             </a:fld>
             <a:endParaRPr lang="en-US"/>
           </a:p>
@@ -2826,7 +2826,7 @@
           <a:p>
             <a:fld id="{2618F069-DB72-4F16-8512-37A179AE1774}" type="datetime1">
               <a:rPr lang="en-US" smtClean="0"/>
-              <a:t>2016-11-26</a:t>
+              <a:t>2019-11-22</a:t>
             </a:fld>
             <a:endParaRPr lang="en-US"/>
           </a:p>
@@ -3039,7 +3039,7 @@
           <a:p>
             <a:fld id="{7784AB71-9685-428C-BE48-FB64D9C8B81F}" type="datetime1">
               <a:rPr lang="en-US" smtClean="0"/>
-              <a:t>2016-11-26</a:t>
+              <a:t>2019-11-22</a:t>
             </a:fld>
             <a:endParaRPr lang="en-US"/>
           </a:p>
@@ -7517,42 +7517,21 @@
                 <a:latin typeface="Courier New" panose="02070309020205020404" pitchFamily="49" charset="0"/>
                 <a:cs typeface="Courier New" panose="02070309020205020404" pitchFamily="49" charset="0"/>
               </a:rPr>
-              <a:t>   term</a:t>
+              <a:t>   term='"homo </a:t>
+            </a:r>
+            <a:r>
+              <a:rPr lang="en-US" dirty="0">
+                <a:latin typeface="Courier New" panose="02070309020205020404" pitchFamily="49" charset="0"/>
+                <a:cs typeface="Courier New" panose="02070309020205020404" pitchFamily="49" charset="0"/>
+              </a:rPr>
+              <a:t>sapiens"[ORGN] AND </a:t>
             </a:r>
             <a:r>
               <a:rPr lang="en-US" dirty="0" smtClean="0">
                 <a:latin typeface="Courier New" panose="02070309020205020404" pitchFamily="49" charset="0"/>
                 <a:cs typeface="Courier New" panose="02070309020205020404" pitchFamily="49" charset="0"/>
               </a:rPr>
-              <a:t>='"</a:t>
-            </a:r>
-            <a:r>
-              <a:rPr lang="en-US" dirty="0" smtClean="0">
-                <a:latin typeface="Courier New" panose="02070309020205020404" pitchFamily="49" charset="0"/>
-                <a:cs typeface="Courier New" panose="02070309020205020404" pitchFamily="49" charset="0"/>
-              </a:rPr>
-              <a:t>homo </a:t>
-            </a:r>
-            <a:r>
-              <a:rPr lang="en-US" dirty="0">
-                <a:latin typeface="Courier New" panose="02070309020205020404" pitchFamily="49" charset="0"/>
-                <a:cs typeface="Courier New" panose="02070309020205020404" pitchFamily="49" charset="0"/>
-              </a:rPr>
-              <a:t>sapiens"[ORGN] AND </a:t>
-            </a:r>
-            <a:r>
-              <a:rPr lang="en-US" dirty="0" smtClean="0">
-                <a:latin typeface="Courier New" panose="02070309020205020404" pitchFamily="49" charset="0"/>
-                <a:cs typeface="Courier New" panose="02070309020205020404" pitchFamily="49" charset="0"/>
-              </a:rPr>
-              <a:t>MLH1[Gene</a:t>
-            </a:r>
-            <a:r>
-              <a:rPr lang="en-US" dirty="0" smtClean="0">
-                <a:latin typeface="Courier New" panose="02070309020205020404" pitchFamily="49" charset="0"/>
-                <a:cs typeface="Courier New" panose="02070309020205020404" pitchFamily="49" charset="0"/>
-              </a:rPr>
-              <a:t>]',</a:t>
+              <a:t>MLH1[Gene]',</a:t>
             </a:r>
             <a:endParaRPr lang="en-US" dirty="0">
               <a:latin typeface="Courier New" panose="02070309020205020404" pitchFamily="49" charset="0"/>
@@ -13963,7 +13942,7 @@
                                           </p:stCondLst>
                                         </p:cTn>
                                         <p:tgtEl>
-                                          <p:spTgt spid="5"/>
+                                          <p:spTgt spid="6"/>
                                         </p:tgtEl>
                                         <p:attrNameLst>
                                           <p:attrName>style.visibility</p:attrName>
@@ -14243,7 +14222,7 @@
                                           </p:stCondLst>
                                         </p:cTn>
                                         <p:tgtEl>
-                                          <p:spTgt spid="6"/>
+                                          <p:spTgt spid="5"/>
                                         </p:tgtEl>
                                         <p:attrNameLst>
                                           <p:attrName>style.visibility</p:attrName>
@@ -16663,15 +16642,12 @@
                 <a:latin typeface="Courier New" panose="02070309020205020404" pitchFamily="49" charset="0"/>
                 <a:cs typeface="Courier New" panose="02070309020205020404" pitchFamily="49" charset="0"/>
               </a:rPr>
-              <a:t>tree.count_terminals</a:t>
-            </a:r>
-            <a:r>
-              <a:rPr lang="en-US" dirty="0" smtClean="0">
-                <a:latin typeface="Courier New" panose="02070309020205020404" pitchFamily="49" charset="0"/>
-                <a:cs typeface="Courier New" panose="02070309020205020404" pitchFamily="49" charset="0"/>
-              </a:rPr>
-              <a:t>()</a:t>
-            </a:r>
+              <a:t>tree.root</a:t>
+            </a:r>
+            <a:endParaRPr lang="en-US" dirty="0" smtClean="0">
+              <a:latin typeface="Courier New" panose="02070309020205020404" pitchFamily="49" charset="0"/>
+              <a:cs typeface="Courier New" panose="02070309020205020404" pitchFamily="49" charset="0"/>
+            </a:endParaRPr>
           </a:p>
         </p:txBody>
       </p:sp>

</xml_diff>

<commit_message>
Update license to CC BY 4.0
</commit_message>
<xml_diff>
--- a/Python/biopython.pptx
+++ b/Python/biopython.pptx
@@ -3516,52 +3516,6 @@
       </p:sp>
       <p:sp>
         <p:nvSpPr>
-          <p:cNvPr id="4" name="TextBox 3"/>
-          <p:cNvSpPr txBox="1"/>
-          <p:nvPr/>
-        </p:nvSpPr>
-        <p:spPr>
-          <a:xfrm>
-            <a:off x="1775206" y="6009450"/>
-            <a:ext cx="6869573" cy="646331"/>
-          </a:xfrm>
-          <a:prstGeom prst="rect">
-            <a:avLst/>
-          </a:prstGeom>
-          <a:noFill/>
-        </p:spPr>
-        <p:txBody>
-          <a:bodyPr wrap="none" rtlCol="0">
-            <a:spAutoFit/>
-          </a:bodyPr>
-          <a:lstStyle/>
-          <a:p>
-            <a:r>
-              <a:rPr lang="en-US" b="1" dirty="0"/>
-              <a:t>License</a:t>
-            </a:r>
-            <a:r>
-              <a:rPr lang="en-US" dirty="0"/>
-              <a:t>: this presentation is released under the Creative Commons, see</a:t>
-            </a:r>
-            <a:br>
-              <a:rPr lang="en-US" dirty="0"/>
-            </a:br>
-            <a:r>
-              <a:rPr lang="nl-BE" dirty="0">
-                <a:hlinkClick r:id="rId3"/>
-              </a:rPr>
-              <a:t>http://creativecommons.org/publicdomain/zero/1.0/</a:t>
-            </a:r>
-            <a:r>
-              <a:rPr lang="nl-BE" dirty="0"/>
-              <a:t> </a:t>
-            </a:r>
-          </a:p>
-        </p:txBody>
-      </p:sp>
-      <p:sp>
-        <p:nvSpPr>
           <p:cNvPr id="5" name="Slide Number Placeholder 4"/>
           <p:cNvSpPr>
             <a:spLocks noGrp="1"/>
@@ -3580,6 +3534,59 @@
               <a:t>1</a:t>
             </a:fld>
             <a:endParaRPr lang="en-US"/>
+          </a:p>
+        </p:txBody>
+      </p:sp>
+      <p:sp>
+        <p:nvSpPr>
+          <p:cNvPr id="6" name="TextBox 5"/>
+          <p:cNvSpPr txBox="1"/>
+          <p:nvPr/>
+        </p:nvSpPr>
+        <p:spPr>
+          <a:xfrm>
+            <a:off x="1514853" y="6009448"/>
+            <a:ext cx="7424212" cy="646331"/>
+          </a:xfrm>
+          <a:prstGeom prst="rect">
+            <a:avLst/>
+          </a:prstGeom>
+          <a:noFill/>
+        </p:spPr>
+        <p:txBody>
+          <a:bodyPr wrap="none" rtlCol="0">
+            <a:spAutoFit/>
+          </a:bodyPr>
+          <a:lstStyle/>
+          <a:p>
+            <a:r>
+              <a:rPr lang="en-US" b="1" dirty="0" smtClean="0"/>
+              <a:t>License</a:t>
+            </a:r>
+            <a:r>
+              <a:rPr lang="en-US" dirty="0" smtClean="0"/>
+              <a:t>: this presentation is released under the Creative Commons CC BY 4.0,</a:t>
+            </a:r>
+            <a:br>
+              <a:rPr lang="en-US" dirty="0" smtClean="0"/>
+            </a:br>
+            <a:r>
+              <a:rPr lang="en-US" dirty="0" smtClean="0"/>
+              <a:t>see </a:t>
+            </a:r>
+            <a:r>
+              <a:rPr lang="en-US" dirty="0" smtClean="0">
+                <a:hlinkClick r:id="rId3"/>
+              </a:rPr>
+              <a:t>https</a:t>
+            </a:r>
+            <a:r>
+              <a:rPr lang="en-US" dirty="0">
+                <a:hlinkClick r:id="rId3"/>
+              </a:rPr>
+              <a:t>://creativecommons.org/licenses/by/4.0/deed.ast</a:t>
+            </a:r>
+            <a:endParaRPr lang="nl-BE" dirty="0"/>
           </a:p>
         </p:txBody>
       </p:sp>

</xml_diff>

<commit_message>
Remove references to sequence alphabets
</commit_message>
<xml_diff>
--- a/Python/biopython.pptx
+++ b/Python/biopython.pptx
@@ -233,7 +233,7 @@
           <a:p>
             <a:fld id="{E50739E9-DC4A-4901-8195-7CE430F840D8}" type="datetimeFigureOut">
               <a:rPr lang="en-US" smtClean="0"/>
-              <a:t>2020-11-24</a:t>
+              <a:t>11/30/2021</a:t>
             </a:fld>
             <a:endParaRPr lang="en-US"/>
           </a:p>
@@ -715,7 +715,7 @@
           <a:p>
             <a:fld id="{EBC2714F-B822-455B-B016-0228B6AA8BE9}" type="datetime1">
               <a:rPr lang="en-US" smtClean="0"/>
-              <a:t>2020-11-24</a:t>
+              <a:t>11/30/2021</a:t>
             </a:fld>
             <a:endParaRPr lang="en-US"/>
           </a:p>
@@ -885,7 +885,7 @@
           <a:p>
             <a:fld id="{F3822F19-B516-497C-9005-1997989AD109}" type="datetime1">
               <a:rPr lang="en-US" smtClean="0"/>
-              <a:t>2020-11-24</a:t>
+              <a:t>11/30/2021</a:t>
             </a:fld>
             <a:endParaRPr lang="en-US"/>
           </a:p>
@@ -1065,7 +1065,7 @@
           <a:p>
             <a:fld id="{DC6E6076-3AC8-4591-A5B3-5701E86BC391}" type="datetime1">
               <a:rPr lang="en-US" smtClean="0"/>
-              <a:t>2020-11-24</a:t>
+              <a:t>11/30/2021</a:t>
             </a:fld>
             <a:endParaRPr lang="en-US"/>
           </a:p>
@@ -1235,7 +1235,7 @@
           <a:p>
             <a:fld id="{10101B39-3B57-4A7B-8CB6-E6BDB118061D}" type="datetime1">
               <a:rPr lang="en-US" smtClean="0"/>
-              <a:t>2020-11-24</a:t>
+              <a:t>11/30/2021</a:t>
             </a:fld>
             <a:endParaRPr lang="en-US"/>
           </a:p>
@@ -1479,7 +1479,7 @@
           <a:p>
             <a:fld id="{C27B26EE-8ECF-4FF3-9A38-87EFFDA62A28}" type="datetime1">
               <a:rPr lang="en-US" smtClean="0"/>
-              <a:t>2020-11-24</a:t>
+              <a:t>11/30/2021</a:t>
             </a:fld>
             <a:endParaRPr lang="en-US"/>
           </a:p>
@@ -1711,7 +1711,7 @@
           <a:p>
             <a:fld id="{6742683C-23EC-4C0D-AC9A-17C98B40DAA7}" type="datetime1">
               <a:rPr lang="en-US" smtClean="0"/>
-              <a:t>2020-11-24</a:t>
+              <a:t>11/30/2021</a:t>
             </a:fld>
             <a:endParaRPr lang="en-US"/>
           </a:p>
@@ -2078,7 +2078,7 @@
           <a:p>
             <a:fld id="{61B639F5-7095-4C4C-8D13-AB3C116C2681}" type="datetime1">
               <a:rPr lang="en-US" smtClean="0"/>
-              <a:t>2020-11-24</a:t>
+              <a:t>11/30/2021</a:t>
             </a:fld>
             <a:endParaRPr lang="en-US"/>
           </a:p>
@@ -2196,7 +2196,7 @@
           <a:p>
             <a:fld id="{565C75B5-128F-4C63-85A2-EABB3B9088B2}" type="datetime1">
               <a:rPr lang="en-US" smtClean="0"/>
-              <a:t>2020-11-24</a:t>
+              <a:t>11/30/2021</a:t>
             </a:fld>
             <a:endParaRPr lang="en-US"/>
           </a:p>
@@ -2291,7 +2291,7 @@
           <a:p>
             <a:fld id="{EB500747-7144-41D3-89B7-0E40926A8757}" type="datetime1">
               <a:rPr lang="en-US" smtClean="0"/>
-              <a:t>2020-11-24</a:t>
+              <a:t>11/30/2021</a:t>
             </a:fld>
             <a:endParaRPr lang="en-US"/>
           </a:p>
@@ -2568,7 +2568,7 @@
           <a:p>
             <a:fld id="{09A9D774-0B51-4CD9-9147-A6BD4D353F07}" type="datetime1">
               <a:rPr lang="en-US" smtClean="0"/>
-              <a:t>2020-11-24</a:t>
+              <a:t>11/30/2021</a:t>
             </a:fld>
             <a:endParaRPr lang="en-US"/>
           </a:p>
@@ -2825,7 +2825,7 @@
           <a:p>
             <a:fld id="{2618F069-DB72-4F16-8512-37A179AE1774}" type="datetime1">
               <a:rPr lang="en-US" smtClean="0"/>
-              <a:t>2020-11-24</a:t>
+              <a:t>11/30/2021</a:t>
             </a:fld>
             <a:endParaRPr lang="en-US"/>
           </a:p>
@@ -3038,7 +3038,7 @@
           <a:p>
             <a:fld id="{7784AB71-9685-428C-BE48-FB64D9C8B81F}" type="datetime1">
               <a:rPr lang="en-US" smtClean="0"/>
-              <a:t>2020-11-24</a:t>
+              <a:t>11/30/2021</a:t>
             </a:fld>
             <a:endParaRPr lang="en-US"/>
           </a:p>
@@ -19745,15 +19745,6 @@
           <a:p>
             <a:r>
               <a:rPr lang="en-US" dirty="0"/>
-              <a:t>Read sequence file, inferring alphabet</a:t>
-            </a:r>
-          </a:p>
-          <a:p>
-            <a:endParaRPr lang="en-US" dirty="0"/>
-          </a:p>
-          <a:p>
-            <a:r>
-              <a:rPr lang="en-US" dirty="0"/>
               <a:t>Read sequence file</a:t>
             </a:r>
           </a:p>
@@ -19821,96 +19812,6 @@
           <a:xfrm>
             <a:off x="983674" y="3344328"/>
             <a:ext cx="7027716" cy="369332"/>
-          </a:xfrm>
-          <a:prstGeom prst="rect">
-            <a:avLst/>
-          </a:prstGeom>
-          <a:solidFill>
-            <a:schemeClr val="bg1">
-              <a:lumMod val="75000"/>
-            </a:schemeClr>
-          </a:solidFill>
-          <a:ln>
-            <a:solidFill>
-              <a:schemeClr val="tx1"/>
-            </a:solidFill>
-          </a:ln>
-        </p:spPr>
-        <p:txBody>
-          <a:bodyPr wrap="square" rtlCol="0">
-            <a:spAutoFit/>
-          </a:bodyPr>
-          <a:lstStyle/>
-          <a:p>
-            <a:r>
-              <a:rPr lang="en-US" dirty="0" err="1">
-                <a:latin typeface="Courier New" panose="02070309020205020404" pitchFamily="49" charset="0"/>
-                <a:cs typeface="Courier New" panose="02070309020205020404" pitchFamily="49" charset="0"/>
-              </a:rPr>
-              <a:t>seq_records</a:t>
-            </a:r>
-            <a:r>
-              <a:rPr lang="en-US" dirty="0">
-                <a:latin typeface="Courier New" panose="02070309020205020404" pitchFamily="49" charset="0"/>
-                <a:cs typeface="Courier New" panose="02070309020205020404" pitchFamily="49" charset="0"/>
-              </a:rPr>
-              <a:t> = </a:t>
-            </a:r>
-            <a:r>
-              <a:rPr lang="en-US" dirty="0" err="1">
-                <a:latin typeface="Courier New" panose="02070309020205020404" pitchFamily="49" charset="0"/>
-                <a:cs typeface="Courier New" panose="02070309020205020404" pitchFamily="49" charset="0"/>
-              </a:rPr>
-              <a:t>SeqIO.parse</a:t>
-            </a:r>
-            <a:r>
-              <a:rPr lang="en-US" dirty="0">
-                <a:latin typeface="Courier New" panose="02070309020205020404" pitchFamily="49" charset="0"/>
-                <a:cs typeface="Courier New" panose="02070309020205020404" pitchFamily="49" charset="0"/>
-              </a:rPr>
-              <a:t>('</a:t>
-            </a:r>
-            <a:r>
-              <a:rPr lang="en-US" dirty="0" err="1">
-                <a:latin typeface="Courier New" panose="02070309020205020404" pitchFamily="49" charset="0"/>
-                <a:cs typeface="Courier New" panose="02070309020205020404" pitchFamily="49" charset="0"/>
-              </a:rPr>
-              <a:t>data.fasta</a:t>
-            </a:r>
-            <a:r>
-              <a:rPr lang="en-US" dirty="0">
-                <a:latin typeface="Courier New" panose="02070309020205020404" pitchFamily="49" charset="0"/>
-                <a:cs typeface="Courier New" panose="02070309020205020404" pitchFamily="49" charset="0"/>
-              </a:rPr>
-              <a:t>', '</a:t>
-            </a:r>
-            <a:r>
-              <a:rPr lang="en-US" dirty="0" err="1">
-                <a:latin typeface="Courier New" panose="02070309020205020404" pitchFamily="49" charset="0"/>
-                <a:cs typeface="Courier New" panose="02070309020205020404" pitchFamily="49" charset="0"/>
-              </a:rPr>
-              <a:t>fasta</a:t>
-            </a:r>
-            <a:r>
-              <a:rPr lang="en-US" dirty="0">
-                <a:latin typeface="Courier New" panose="02070309020205020404" pitchFamily="49" charset="0"/>
-                <a:cs typeface="Courier New" panose="02070309020205020404" pitchFamily="49" charset="0"/>
-              </a:rPr>
-              <a:t>')</a:t>
-            </a:r>
-          </a:p>
-        </p:txBody>
-      </p:sp>
-      <p:sp>
-        <p:nvSpPr>
-          <p:cNvPr id="6" name="TextBox 5"/>
-          <p:cNvSpPr txBox="1"/>
-          <p:nvPr/>
-        </p:nvSpPr>
-        <p:spPr>
-          <a:xfrm>
-            <a:off x="990599" y="4382262"/>
-            <a:ext cx="7020791" cy="369332"/>
           </a:xfrm>
           <a:prstGeom prst="rect">
             <a:avLst/>
@@ -20187,82 +20088,6 @@
                       </p:childTnLst>
                     </p:cTn>
                   </p:par>
-                  <p:par>
-                    <p:cTn id="15" fill="hold">
-                      <p:stCondLst>
-                        <p:cond delay="indefinite"/>
-                      </p:stCondLst>
-                      <p:childTnLst>
-                        <p:par>
-                          <p:cTn id="16" fill="hold">
-                            <p:stCondLst>
-                              <p:cond delay="0"/>
-                            </p:stCondLst>
-                            <p:childTnLst>
-                              <p:par>
-                                <p:cTn id="17" presetID="1" presetClass="entr" presetSubtype="0" fill="hold" grpId="0" nodeType="clickEffect">
-                                  <p:stCondLst>
-                                    <p:cond delay="0"/>
-                                  </p:stCondLst>
-                                  <p:childTnLst>
-                                    <p:set>
-                                      <p:cBhvr>
-                                        <p:cTn id="18" dur="1" fill="hold">
-                                          <p:stCondLst>
-                                            <p:cond delay="0"/>
-                                          </p:stCondLst>
-                                        </p:cTn>
-                                        <p:tgtEl>
-                                          <p:spTgt spid="3">
-                                            <p:txEl>
-                                              <p:pRg st="4" end="4"/>
-                                            </p:txEl>
-                                          </p:spTgt>
-                                        </p:tgtEl>
-                                        <p:attrNameLst>
-                                          <p:attrName>style.visibility</p:attrName>
-                                        </p:attrNameLst>
-                                      </p:cBhvr>
-                                      <p:to>
-                                        <p:strVal val="visible"/>
-                                      </p:to>
-                                    </p:set>
-                                  </p:childTnLst>
-                                </p:cTn>
-                              </p:par>
-                              <p:par>
-                                <p:cTn id="19" presetID="1" presetClass="entr" presetSubtype="0" fill="hold" grpId="0" nodeType="withEffect">
-                                  <p:stCondLst>
-                                    <p:cond delay="0"/>
-                                  </p:stCondLst>
-                                  <p:childTnLst>
-                                    <p:set>
-                                      <p:cBhvr>
-                                        <p:cTn id="20" dur="1" fill="hold">
-                                          <p:stCondLst>
-                                            <p:cond delay="0"/>
-                                          </p:stCondLst>
-                                        </p:cTn>
-                                        <p:tgtEl>
-                                          <p:spTgt spid="6"/>
-                                        </p:tgtEl>
-                                        <p:attrNameLst>
-                                          <p:attrName>style.visibility</p:attrName>
-                                        </p:attrNameLst>
-                                      </p:cBhvr>
-                                      <p:to>
-                                        <p:strVal val="visible"/>
-                                      </p:to>
-                                    </p:set>
-                                  </p:childTnLst>
-                                </p:cTn>
-                              </p:par>
-                            </p:childTnLst>
-                          </p:cTn>
-                        </p:par>
-                      </p:childTnLst>
-                    </p:cTn>
-                  </p:par>
                 </p:childTnLst>
               </p:cTn>
               <p:prevCondLst>
@@ -20288,7 +20113,6 @@
       <p:bldP spid="3" grpId="0" uiExpand="1" build="p"/>
       <p:bldP spid="4" grpId="0" animBg="1"/>
       <p:bldP spid="5" grpId="0" animBg="1"/>
-      <p:bldP spid="6" grpId="0" animBg="1"/>
     </p:bldLst>
   </p:timing>
 </p:sld>
@@ -23610,51 +23434,6 @@
       </p:grpSp>
       <p:sp>
         <p:nvSpPr>
-          <p:cNvPr id="16" name="TextBox 15"/>
-          <p:cNvSpPr txBox="1"/>
-          <p:nvPr/>
-        </p:nvSpPr>
-        <p:spPr>
-          <a:xfrm>
-            <a:off x="4669606" y="4810426"/>
-            <a:ext cx="3431837" cy="369332"/>
-          </a:xfrm>
-          <a:prstGeom prst="rect">
-            <a:avLst/>
-          </a:prstGeom>
-          <a:noFill/>
-          <a:ln>
-            <a:solidFill>
-              <a:schemeClr val="tx1"/>
-            </a:solidFill>
-          </a:ln>
-        </p:spPr>
-        <p:txBody>
-          <a:bodyPr wrap="none" rtlCol="0">
-            <a:spAutoFit/>
-          </a:bodyPr>
-          <a:lstStyle/>
-          <a:p>
-            <a:r>
-              <a:rPr lang="en-US" dirty="0"/>
-              <a:t>Note: alphabet is </a:t>
-            </a:r>
-            <a:r>
-              <a:rPr lang="en-US" dirty="0" err="1">
-                <a:latin typeface="Courier New" panose="02070309020205020404" pitchFamily="49" charset="0"/>
-                <a:cs typeface="Courier New" panose="02070309020205020404" pitchFamily="49" charset="0"/>
-              </a:rPr>
-              <a:t>RNAAlphabet</a:t>
-            </a:r>
-            <a:r>
-              <a:rPr lang="en-US" dirty="0"/>
-              <a:t>!</a:t>
-            </a:r>
-          </a:p>
-        </p:txBody>
-      </p:sp>
-      <p:sp>
-        <p:nvSpPr>
           <p:cNvPr id="17" name="TextBox 16"/>
           <p:cNvSpPr txBox="1"/>
           <p:nvPr/>
@@ -24608,7 +24387,38 @@
                                           </p:stCondLst>
                                         </p:cTn>
                                         <p:tgtEl>
-                                          <p:spTgt spid="16"/>
+                                          <p:spTgt spid="3">
+                                            <p:txEl>
+                                              <p:pRg st="6" end="6"/>
+                                            </p:txEl>
+                                          </p:spTgt>
+                                        </p:tgtEl>
+                                        <p:attrNameLst>
+                                          <p:attrName>style.visibility</p:attrName>
+                                        </p:attrNameLst>
+                                      </p:cBhvr>
+                                      <p:to>
+                                        <p:strVal val="visible"/>
+                                      </p:to>
+                                    </p:set>
+                                  </p:childTnLst>
+                                </p:cTn>
+                              </p:par>
+                              <p:par>
+                                <p:cTn id="37" presetID="1" presetClass="entr" presetSubtype="0" fill="hold" grpId="0" nodeType="withEffect">
+                                  <p:stCondLst>
+                                    <p:cond delay="0"/>
+                                  </p:stCondLst>
+                                  <p:childTnLst>
+                                    <p:set>
+                                      <p:cBhvr>
+                                        <p:cTn id="38" dur="1" fill="hold">
+                                          <p:stCondLst>
+                                            <p:cond delay="0"/>
+                                          </p:stCondLst>
+                                        </p:cTn>
+                                        <p:tgtEl>
+                                          <p:spTgt spid="17"/>
                                         </p:tgtEl>
                                         <p:attrNameLst>
                                           <p:attrName>style.visibility</p:attrName>
@@ -24628,50 +24438,19 @@
                     </p:cTn>
                   </p:par>
                   <p:par>
-                    <p:cTn id="37" fill="hold">
+                    <p:cTn id="39" fill="hold">
                       <p:stCondLst>
                         <p:cond delay="indefinite"/>
                       </p:stCondLst>
                       <p:childTnLst>
                         <p:par>
-                          <p:cTn id="38" fill="hold">
+                          <p:cTn id="40" fill="hold">
                             <p:stCondLst>
                               <p:cond delay="0"/>
                             </p:stCondLst>
                             <p:childTnLst>
                               <p:par>
-                                <p:cTn id="39" presetID="1" presetClass="entr" presetSubtype="0" fill="hold" grpId="0" nodeType="clickEffect">
-                                  <p:stCondLst>
-                                    <p:cond delay="0"/>
-                                  </p:stCondLst>
-                                  <p:childTnLst>
-                                    <p:set>
-                                      <p:cBhvr>
-                                        <p:cTn id="40" dur="1" fill="hold">
-                                          <p:stCondLst>
-                                            <p:cond delay="0"/>
-                                          </p:stCondLst>
-                                        </p:cTn>
-                                        <p:tgtEl>
-                                          <p:spTgt spid="3">
-                                            <p:txEl>
-                                              <p:pRg st="6" end="6"/>
-                                            </p:txEl>
-                                          </p:spTgt>
-                                        </p:tgtEl>
-                                        <p:attrNameLst>
-                                          <p:attrName>style.visibility</p:attrName>
-                                        </p:attrNameLst>
-                                      </p:cBhvr>
-                                      <p:to>
-                                        <p:strVal val="visible"/>
-                                      </p:to>
-                                    </p:set>
-                                  </p:childTnLst>
-                                </p:cTn>
-                              </p:par>
-                              <p:par>
-                                <p:cTn id="41" presetID="1" presetClass="entr" presetSubtype="0" fill="hold" grpId="0" nodeType="withEffect">
+                                <p:cTn id="41" presetID="1" presetClass="entr" presetSubtype="0" fill="hold" nodeType="clickEffect">
                                   <p:stCondLst>
                                     <p:cond delay="0"/>
                                   </p:stCondLst>
@@ -24684,7 +24463,7 @@
                                           </p:stCondLst>
                                         </p:cTn>
                                         <p:tgtEl>
-                                          <p:spTgt spid="17"/>
+                                          <p:spTgt spid="36"/>
                                         </p:tgtEl>
                                         <p:attrNameLst>
                                           <p:attrName>style.visibility</p:attrName>
@@ -24724,51 +24503,6 @@
                                     <p:set>
                                       <p:cBhvr>
                                         <p:cTn id="46" dur="1" fill="hold">
-                                          <p:stCondLst>
-                                            <p:cond delay="0"/>
-                                          </p:stCondLst>
-                                        </p:cTn>
-                                        <p:tgtEl>
-                                          <p:spTgt spid="36"/>
-                                        </p:tgtEl>
-                                        <p:attrNameLst>
-                                          <p:attrName>style.visibility</p:attrName>
-                                        </p:attrNameLst>
-                                      </p:cBhvr>
-                                      <p:to>
-                                        <p:strVal val="visible"/>
-                                      </p:to>
-                                    </p:set>
-                                  </p:childTnLst>
-                                </p:cTn>
-                              </p:par>
-                            </p:childTnLst>
-                          </p:cTn>
-                        </p:par>
-                      </p:childTnLst>
-                    </p:cTn>
-                  </p:par>
-                  <p:par>
-                    <p:cTn id="47" fill="hold">
-                      <p:stCondLst>
-                        <p:cond delay="indefinite"/>
-                      </p:stCondLst>
-                      <p:childTnLst>
-                        <p:par>
-                          <p:cTn id="48" fill="hold">
-                            <p:stCondLst>
-                              <p:cond delay="0"/>
-                            </p:stCondLst>
-                            <p:childTnLst>
-                              <p:par>
-                                <p:cTn id="49" presetID="1" presetClass="entr" presetSubtype="0" fill="hold" nodeType="clickEffect">
-                                  <p:stCondLst>
-                                    <p:cond delay="0"/>
-                                  </p:stCondLst>
-                                  <p:childTnLst>
-                                    <p:set>
-                                      <p:cBhvr>
-                                        <p:cTn id="50" dur="1" fill="hold">
                                           <p:stCondLst>
                                             <p:cond delay="0"/>
                                           </p:stCondLst>
@@ -24818,7 +24552,6 @@
       <p:bldP spid="3" grpId="0" uiExpand="1" build="p"/>
       <p:bldP spid="4" grpId="0" animBg="1"/>
       <p:bldP spid="12" grpId="0" animBg="1"/>
-      <p:bldP spid="16" grpId="0" animBg="1"/>
       <p:bldP spid="17" grpId="0" animBg="1"/>
       <p:bldP spid="25" grpId="0" animBg="1"/>
     </p:bldLst>

</xml_diff>